<commit_message>
Update the install diagram
Signed-off-by: nannanli <nannanli@cn.ibm.com>
</commit_message>
<xml_diff>
--- a/docs/images/common/zowe-zos-install-diagram.pptx
+++ b/docs/images/common/zowe-zos-install-diagram.pptx
@@ -6,7 +6,6 @@
   </p:sldMasterIdLst>
   <p:sldIdLst>
     <p:sldId id="256" r:id="rId2"/>
-    <p:sldId id="257" r:id="rId3"/>
   </p:sldIdLst>
   <p:sldSz cx="10080625" cy="13320713"/>
   <p:notesSz cx="6858000" cy="9144000"/>
@@ -244,7 +243,7 @@
           <a:p>
             <a:fld id="{C4A90A56-7146-D847-92E1-256101539D4D}" type="datetimeFigureOut">
               <a:rPr lang="en-US" smtClean="0"/>
-              <a:t>1/27/20</a:t>
+              <a:t>2/6/20</a:t>
             </a:fld>
             <a:endParaRPr lang="en-US"/>
           </a:p>
@@ -414,7 +413,7 @@
           <a:p>
             <a:fld id="{C4A90A56-7146-D847-92E1-256101539D4D}" type="datetimeFigureOut">
               <a:rPr lang="en-US" smtClean="0"/>
-              <a:t>1/27/20</a:t>
+              <a:t>2/6/20</a:t>
             </a:fld>
             <a:endParaRPr lang="en-US"/>
           </a:p>
@@ -594,7 +593,7 @@
           <a:p>
             <a:fld id="{C4A90A56-7146-D847-92E1-256101539D4D}" type="datetimeFigureOut">
               <a:rPr lang="en-US" smtClean="0"/>
-              <a:t>1/27/20</a:t>
+              <a:t>2/6/20</a:t>
             </a:fld>
             <a:endParaRPr lang="en-US"/>
           </a:p>
@@ -764,7 +763,7 @@
           <a:p>
             <a:fld id="{C4A90A56-7146-D847-92E1-256101539D4D}" type="datetimeFigureOut">
               <a:rPr lang="en-US" smtClean="0"/>
-              <a:t>1/27/20</a:t>
+              <a:t>2/6/20</a:t>
             </a:fld>
             <a:endParaRPr lang="en-US"/>
           </a:p>
@@ -1008,7 +1007,7 @@
           <a:p>
             <a:fld id="{C4A90A56-7146-D847-92E1-256101539D4D}" type="datetimeFigureOut">
               <a:rPr lang="en-US" smtClean="0"/>
-              <a:t>1/27/20</a:t>
+              <a:t>2/6/20</a:t>
             </a:fld>
             <a:endParaRPr lang="en-US"/>
           </a:p>
@@ -1240,7 +1239,7 @@
           <a:p>
             <a:fld id="{C4A90A56-7146-D847-92E1-256101539D4D}" type="datetimeFigureOut">
               <a:rPr lang="en-US" smtClean="0"/>
-              <a:t>1/27/20</a:t>
+              <a:t>2/6/20</a:t>
             </a:fld>
             <a:endParaRPr lang="en-US"/>
           </a:p>
@@ -1607,7 +1606,7 @@
           <a:p>
             <a:fld id="{C4A90A56-7146-D847-92E1-256101539D4D}" type="datetimeFigureOut">
               <a:rPr lang="en-US" smtClean="0"/>
-              <a:t>1/27/20</a:t>
+              <a:t>2/6/20</a:t>
             </a:fld>
             <a:endParaRPr lang="en-US"/>
           </a:p>
@@ -1725,7 +1724,7 @@
           <a:p>
             <a:fld id="{C4A90A56-7146-D847-92E1-256101539D4D}" type="datetimeFigureOut">
               <a:rPr lang="en-US" smtClean="0"/>
-              <a:t>1/27/20</a:t>
+              <a:t>2/6/20</a:t>
             </a:fld>
             <a:endParaRPr lang="en-US"/>
           </a:p>
@@ -1820,7 +1819,7 @@
           <a:p>
             <a:fld id="{C4A90A56-7146-D847-92E1-256101539D4D}" type="datetimeFigureOut">
               <a:rPr lang="en-US" smtClean="0"/>
-              <a:t>1/27/20</a:t>
+              <a:t>2/6/20</a:t>
             </a:fld>
             <a:endParaRPr lang="en-US"/>
           </a:p>
@@ -2097,7 +2096,7 @@
           <a:p>
             <a:fld id="{C4A90A56-7146-D847-92E1-256101539D4D}" type="datetimeFigureOut">
               <a:rPr lang="en-US" smtClean="0"/>
-              <a:t>1/27/20</a:t>
+              <a:t>2/6/20</a:t>
             </a:fld>
             <a:endParaRPr lang="en-US"/>
           </a:p>
@@ -2354,7 +2353,7 @@
           <a:p>
             <a:fld id="{C4A90A56-7146-D847-92E1-256101539D4D}" type="datetimeFigureOut">
               <a:rPr lang="en-US" smtClean="0"/>
-              <a:t>1/27/20</a:t>
+              <a:t>2/6/20</a:t>
             </a:fld>
             <a:endParaRPr lang="en-US"/>
           </a:p>
@@ -2567,7 +2566,7 @@
           <a:p>
             <a:fld id="{C4A90A56-7146-D847-92E1-256101539D4D}" type="datetimeFigureOut">
               <a:rPr lang="en-US" smtClean="0"/>
-              <a:t>1/27/20</a:t>
+              <a:t>2/6/20</a:t>
             </a:fld>
             <a:endParaRPr lang="en-US"/>
           </a:p>
@@ -3671,13 +3670,13 @@
         <p:spPr>
           <a:xfrm>
             <a:off x="2498332" y="7102327"/>
-            <a:ext cx="4018152" cy="558971"/>
+            <a:ext cx="4239072" cy="558971"/>
           </a:xfrm>
           <a:prstGeom prst="rect">
             <a:avLst/>
           </a:prstGeom>
           <a:solidFill>
-            <a:srgbClr val="552E73"/>
+            <a:srgbClr val="4270C3"/>
           </a:solidFill>
           <a:ln>
             <a:noFill/>
@@ -3719,6 +3718,9 @@
               </a:rPr>
               <a:t>(One-time setup per z/OS environment) </a:t>
             </a:r>
+          </a:p>
+          <a:p>
+            <a:pPr algn="ctr"/>
             <a:r>
               <a:rPr lang="en-US" sz="1100" dirty="0">
                 <a:solidFill>
@@ -3727,8 +3729,115 @@
                 <a:latin typeface="Arial" panose="020B0604020202020204" pitchFamily="34" charset="0"/>
                 <a:cs typeface="Arial" panose="020B0604020202020204" pitchFamily="34" charset="0"/>
               </a:rPr>
-              <a:t>Configure the z/OS security manager</a:t>
-            </a:r>
+              <a:t>Configure the z/OS</a:t>
+            </a:r>
+            <a:r>
+              <a:rPr lang="zh-CN" altLang="en-US" sz="1100" dirty="0">
+                <a:solidFill>
+                  <a:schemeClr val="bg1"/>
+                </a:solidFill>
+                <a:latin typeface="Arial" panose="020B0604020202020204" pitchFamily="34" charset="0"/>
+                <a:cs typeface="Arial" panose="020B0604020202020204" pitchFamily="34" charset="0"/>
+              </a:rPr>
+              <a:t> </a:t>
+            </a:r>
+            <a:r>
+              <a:rPr lang="en-US" altLang="zh-CN" sz="1100" dirty="0">
+                <a:solidFill>
+                  <a:schemeClr val="bg1"/>
+                </a:solidFill>
+                <a:latin typeface="Arial" panose="020B0604020202020204" pitchFamily="34" charset="0"/>
+                <a:cs typeface="Arial" panose="020B0604020202020204" pitchFamily="34" charset="0"/>
+              </a:rPr>
+              <a:t>system</a:t>
+            </a:r>
+            <a:r>
+              <a:rPr lang="zh-CN" altLang="en-US" sz="1100" dirty="0">
+                <a:solidFill>
+                  <a:schemeClr val="bg1"/>
+                </a:solidFill>
+                <a:latin typeface="Arial" panose="020B0604020202020204" pitchFamily="34" charset="0"/>
+                <a:cs typeface="Arial" panose="020B0604020202020204" pitchFamily="34" charset="0"/>
+              </a:rPr>
+              <a:t> </a:t>
+            </a:r>
+            <a:r>
+              <a:rPr lang="en-US" altLang="zh-CN" sz="1100" dirty="0">
+                <a:solidFill>
+                  <a:schemeClr val="bg1"/>
+                </a:solidFill>
+                <a:latin typeface="Arial" panose="020B0604020202020204" pitchFamily="34" charset="0"/>
+                <a:cs typeface="Arial" panose="020B0604020202020204" pitchFamily="34" charset="0"/>
+              </a:rPr>
+              <a:t>for</a:t>
+            </a:r>
+            <a:r>
+              <a:rPr lang="zh-CN" altLang="en-US" sz="1100" dirty="0">
+                <a:solidFill>
+                  <a:schemeClr val="bg1"/>
+                </a:solidFill>
+                <a:latin typeface="Arial" panose="020B0604020202020204" pitchFamily="34" charset="0"/>
+                <a:cs typeface="Arial" panose="020B0604020202020204" pitchFamily="34" charset="0"/>
+              </a:rPr>
+              <a:t> </a:t>
+            </a:r>
+            <a:r>
+              <a:rPr lang="en-US" altLang="zh-CN" sz="1100" dirty="0" err="1">
+                <a:solidFill>
+                  <a:schemeClr val="bg1"/>
+                </a:solidFill>
+                <a:latin typeface="Arial" panose="020B0604020202020204" pitchFamily="34" charset="0"/>
+                <a:cs typeface="Arial" panose="020B0604020202020204" pitchFamily="34" charset="0"/>
+              </a:rPr>
+              <a:t>Zowe</a:t>
+            </a:r>
+            <a:endParaRPr lang="en-US" altLang="zh-CN" sz="1100" dirty="0">
+              <a:solidFill>
+                <a:schemeClr val="bg1"/>
+              </a:solidFill>
+              <a:latin typeface="Arial" panose="020B0604020202020204" pitchFamily="34" charset="0"/>
+              <a:cs typeface="Arial" panose="020B0604020202020204" pitchFamily="34" charset="0"/>
+            </a:endParaRPr>
+          </a:p>
+          <a:p>
+            <a:pPr algn="ctr"/>
+            <a:r>
+              <a:rPr lang="en-US" altLang="zh-CN" sz="1100" dirty="0">
+                <a:solidFill>
+                  <a:schemeClr val="bg1"/>
+                </a:solidFill>
+                <a:latin typeface="Arial" panose="020B0604020202020204" pitchFamily="34" charset="0"/>
+                <a:cs typeface="Arial" panose="020B0604020202020204" pitchFamily="34" charset="0"/>
+              </a:rPr>
+              <a:t>(JCL:</a:t>
+            </a:r>
+            <a:r>
+              <a:rPr lang="zh-CN" altLang="en-US" sz="1100" dirty="0">
+                <a:solidFill>
+                  <a:schemeClr val="bg1"/>
+                </a:solidFill>
+                <a:latin typeface="Arial" panose="020B0604020202020204" pitchFamily="34" charset="0"/>
+                <a:cs typeface="Arial" panose="020B0604020202020204" pitchFamily="34" charset="0"/>
+              </a:rPr>
+              <a:t> </a:t>
+            </a:r>
+            <a:r>
+              <a:rPr lang="en-US" altLang="zh-CN" sz="1100" dirty="0">
+                <a:solidFill>
+                  <a:schemeClr val="bg1"/>
+                </a:solidFill>
+                <a:latin typeface="Arial" panose="020B0604020202020204" pitchFamily="34" charset="0"/>
+                <a:cs typeface="Arial" panose="020B0604020202020204" pitchFamily="34" charset="0"/>
+              </a:rPr>
+              <a:t>ZWESECUR)</a:t>
+            </a:r>
+            <a:endParaRPr lang="en-US" sz="1100" dirty="0">
+              <a:solidFill>
+                <a:schemeClr val="bg1"/>
+              </a:solidFill>
+              <a:latin typeface="Arial" panose="020B0604020202020204" pitchFamily="34" charset="0"/>
+              <a:cs typeface="Arial" panose="020B0604020202020204" pitchFamily="34" charset="0"/>
+            </a:endParaRPr>
           </a:p>
         </p:txBody>
       </p:sp>
@@ -4303,14 +4412,14 @@
         </p:nvSpPr>
         <p:spPr>
           <a:xfrm>
-            <a:off x="2498332" y="8925067"/>
-            <a:ext cx="4018152" cy="558971"/>
+            <a:off x="2505125" y="7976784"/>
+            <a:ext cx="4232278" cy="558971"/>
           </a:xfrm>
           <a:prstGeom prst="rect">
             <a:avLst/>
           </a:prstGeom>
           <a:solidFill>
-            <a:srgbClr val="552E73"/>
+            <a:srgbClr val="4270C3"/>
           </a:solidFill>
           <a:ln>
             <a:noFill/>
@@ -4343,6 +4452,26 @@
           <a:p>
             <a:pPr algn="ctr"/>
             <a:r>
+              <a:rPr lang="en-US" altLang="zh-CN" sz="1100" dirty="0">
+                <a:solidFill>
+                  <a:schemeClr val="bg1"/>
+                </a:solidFill>
+                <a:latin typeface="Arial" panose="020B0604020202020204" pitchFamily="34" charset="0"/>
+                <a:cs typeface="Arial" panose="020B0604020202020204" pitchFamily="34" charset="0"/>
+              </a:rPr>
+              <a:t>(One-time setup per z/OS environment) </a:t>
+            </a:r>
+            <a:endParaRPr lang="en-US" sz="1100" dirty="0">
+              <a:solidFill>
+                <a:schemeClr val="bg1"/>
+              </a:solidFill>
+              <a:latin typeface="Arial" panose="020B0604020202020204" pitchFamily="34" charset="0"/>
+              <a:cs typeface="Arial" panose="020B0604020202020204" pitchFamily="34" charset="0"/>
+            </a:endParaRPr>
+          </a:p>
+          <a:p>
+            <a:pPr algn="ctr"/>
+            <a:r>
               <a:rPr lang="en-US" sz="1100" dirty="0">
                 <a:solidFill>
                   <a:schemeClr val="bg1"/>
@@ -4350,7 +4479,47 @@
                 <a:latin typeface="Arial" panose="020B0604020202020204" pitchFamily="34" charset="0"/>
                 <a:cs typeface="Arial" panose="020B0604020202020204" pitchFamily="34" charset="0"/>
               </a:rPr>
-              <a:t>Configure Zowe certificates </a:t>
+              <a:t>C</a:t>
+            </a:r>
+            <a:r>
+              <a:rPr lang="en-US" altLang="zh-CN" sz="1100" dirty="0">
+                <a:solidFill>
+                  <a:schemeClr val="bg1"/>
+                </a:solidFill>
+                <a:latin typeface="Arial" panose="020B0604020202020204" pitchFamily="34" charset="0"/>
+                <a:cs typeface="Arial" panose="020B0604020202020204" pitchFamily="34" charset="0"/>
+              </a:rPr>
+              <a:t>reate</a:t>
+            </a:r>
+            <a:r>
+              <a:rPr lang="zh-CN" altLang="en-US" sz="1100" dirty="0">
+                <a:solidFill>
+                  <a:schemeClr val="bg1"/>
+                </a:solidFill>
+                <a:latin typeface="Arial" panose="020B0604020202020204" pitchFamily="34" charset="0"/>
+                <a:cs typeface="Arial" panose="020B0604020202020204" pitchFamily="34" charset="0"/>
+              </a:rPr>
+              <a:t> </a:t>
+            </a:r>
+            <a:r>
+              <a:rPr lang="en-US" altLang="zh-CN" sz="1100" dirty="0">
+                <a:solidFill>
+                  <a:schemeClr val="bg1"/>
+                </a:solidFill>
+                <a:latin typeface="Arial" panose="020B0604020202020204" pitchFamily="34" charset="0"/>
+                <a:cs typeface="Arial" panose="020B0604020202020204" pitchFamily="34" charset="0"/>
+              </a:rPr>
+              <a:t>the</a:t>
+            </a:r>
+            <a:r>
+              <a:rPr lang="en-US" sz="1100" dirty="0">
+                <a:solidFill>
+                  <a:schemeClr val="bg1"/>
+                </a:solidFill>
+                <a:latin typeface="Arial" panose="020B0604020202020204" pitchFamily="34" charset="0"/>
+                <a:cs typeface="Arial" panose="020B0604020202020204" pitchFamily="34" charset="0"/>
+              </a:rPr>
+              <a:t> Zowe certificates </a:t>
             </a:r>
             <a:r>
               <a:rPr lang="en-US" sz="1100" dirty="0" err="1">
@@ -4370,7 +4539,7 @@
                 <a:latin typeface="Arial" panose="020B0604020202020204" pitchFamily="34" charset="0"/>
                 <a:cs typeface="Arial" panose="020B0604020202020204" pitchFamily="34" charset="0"/>
               </a:rPr>
-              <a:t> and trust store directory</a:t>
+              <a:t> directory</a:t>
             </a:r>
             <a:r>
               <a:rPr lang="zh-CN" altLang="en-US" sz="1100" dirty="0">
@@ -4395,9 +4564,7 @@
             <a:r>
               <a:rPr lang="en-US" altLang="zh-CN" sz="1100" dirty="0">
                 <a:solidFill>
-                  <a:schemeClr val="bg2">
-                    <a:lumMod val="90000"/>
-                  </a:schemeClr>
+                  <a:schemeClr val="bg1"/>
                 </a:solidFill>
                 <a:latin typeface="Arial" panose="020B0604020202020204" pitchFamily="34" charset="0"/>
                 <a:cs typeface="Arial" panose="020B0604020202020204" pitchFamily="34" charset="0"/>
@@ -4407,9 +4574,7 @@
             <a:r>
               <a:rPr lang="en-US" sz="1100" dirty="0">
                 <a:solidFill>
-                  <a:schemeClr val="bg2">
-                    <a:lumMod val="90000"/>
-                  </a:schemeClr>
+                  <a:schemeClr val="bg1"/>
                 </a:solidFill>
                 <a:latin typeface="Arial" panose="020B0604020202020204" pitchFamily="34" charset="0"/>
                 <a:cs typeface="Arial" panose="020B0604020202020204" pitchFamily="34" charset="0"/>
@@ -4419,9 +4584,7 @@
             <a:r>
               <a:rPr lang="en-US" sz="1100" dirty="0" err="1">
                 <a:solidFill>
-                  <a:schemeClr val="bg2">
-                    <a:lumMod val="90000"/>
-                  </a:schemeClr>
+                  <a:schemeClr val="bg1"/>
                 </a:solidFill>
                 <a:latin typeface="Arial" panose="020B0604020202020204" pitchFamily="34" charset="0"/>
                 <a:cs typeface="Arial" panose="020B0604020202020204" pitchFamily="34" charset="0"/>
@@ -4431,9 +4594,7 @@
             <a:r>
               <a:rPr lang="en-US" altLang="zh-CN" sz="1100" dirty="0">
                 <a:solidFill>
-                  <a:schemeClr val="bg2">
-                    <a:lumMod val="90000"/>
-                  </a:schemeClr>
+                  <a:schemeClr val="bg1"/>
                 </a:solidFill>
                 <a:latin typeface="Arial" panose="020B0604020202020204" pitchFamily="34" charset="0"/>
                 <a:cs typeface="Arial" panose="020B0604020202020204" pitchFamily="34" charset="0"/>
@@ -4442,9 +4603,7 @@
             </a:r>
             <a:endParaRPr lang="en-US" sz="1100" dirty="0">
               <a:solidFill>
-                <a:schemeClr val="bg2">
-                  <a:lumMod val="90000"/>
-                </a:schemeClr>
+                <a:schemeClr val="bg1"/>
               </a:solidFill>
               <a:latin typeface="Arial" panose="020B0604020202020204" pitchFamily="34" charset="0"/>
               <a:cs typeface="Arial" panose="020B0604020202020204" pitchFamily="34" charset="0"/>
@@ -4468,7 +4627,7 @@
         </p:nvCxnSpPr>
         <p:spPr>
           <a:xfrm>
-            <a:off x="4421626" y="7711516"/>
+            <a:off x="4607892" y="7711516"/>
             <a:ext cx="0" cy="212985"/>
           </a:xfrm>
           <a:prstGeom prst="straightConnector1">
@@ -4500,10 +4659,10 @@
       </p:cxnSp>
       <p:sp>
         <p:nvSpPr>
-          <p:cNvPr id="45" name="Rectangle 44">
+          <p:cNvPr id="44" name="Rectangle 43">
             <a:extLst>
               <a:ext uri="{FF2B5EF4-FFF2-40B4-BE49-F238E27FC236}">
-                <a16:creationId xmlns:a16="http://schemas.microsoft.com/office/drawing/2014/main" id="{60F7BE5A-B3D6-6A4C-9828-5B67879DF6D8}"/>
+                <a16:creationId xmlns:a16="http://schemas.microsoft.com/office/drawing/2014/main" id="{6AF4CDAB-F979-E143-9711-D9E6931E78F5}"/>
               </a:ext>
             </a:extLst>
           </p:cNvPr>
@@ -4512,14 +4671,14 @@
         </p:nvSpPr>
         <p:spPr>
           <a:xfrm>
-            <a:off x="7109963" y="7776201"/>
-            <a:ext cx="1047237" cy="628174"/>
+            <a:off x="6516484" y="8740065"/>
+            <a:ext cx="1047242" cy="628174"/>
           </a:xfrm>
           <a:prstGeom prst="rect">
             <a:avLst/>
           </a:prstGeom>
           <a:solidFill>
-            <a:srgbClr val="552E73"/>
+            <a:srgbClr val="4270C3"/>
           </a:solidFill>
           <a:ln>
             <a:solidFill>
@@ -4591,17 +4750,17 @@
                 <a:latin typeface="Arial" panose="020B0604020202020204" pitchFamily="34" charset="0"/>
                 <a:cs typeface="Arial" panose="020B0604020202020204" pitchFamily="34" charset="0"/>
               </a:rPr>
-              <a:t> N</a:t>
-            </a:r>
-          </a:p>
-        </p:txBody>
-      </p:sp>
-      <p:sp>
-        <p:nvSpPr>
-          <p:cNvPr id="44" name="Rectangle 43">
+              <a:t> 2</a:t>
+            </a:r>
+          </a:p>
+        </p:txBody>
+      </p:sp>
+      <p:sp>
+        <p:nvSpPr>
+          <p:cNvPr id="41" name="Rectangle 40">
             <a:extLst>
               <a:ext uri="{FF2B5EF4-FFF2-40B4-BE49-F238E27FC236}">
-                <a16:creationId xmlns:a16="http://schemas.microsoft.com/office/drawing/2014/main" id="{6AF4CDAB-F979-E143-9711-D9E6931E78F5}"/>
+                <a16:creationId xmlns:a16="http://schemas.microsoft.com/office/drawing/2014/main" id="{D241ABC9-99D2-994E-B685-7D82041E280C}"/>
               </a:ext>
             </a:extLst>
           </p:cNvPr>
@@ -4610,14 +4769,14 @@
         </p:nvSpPr>
         <p:spPr>
           <a:xfrm>
-            <a:off x="6277935" y="7865109"/>
-            <a:ext cx="1047242" cy="628174"/>
+            <a:off x="2491786" y="8854021"/>
+            <a:ext cx="4245613" cy="628174"/>
           </a:xfrm>
           <a:prstGeom prst="rect">
             <a:avLst/>
           </a:prstGeom>
           <a:solidFill>
-            <a:srgbClr val="552E73"/>
+            <a:srgbClr val="4270C3"/>
           </a:solidFill>
           <a:ln>
             <a:solidFill>
@@ -4650,7 +4809,57 @@
           </a:bodyPr>
           <a:lstStyle/>
           <a:p>
-            <a:pPr algn="r"/>
+            <a:pPr algn="ctr"/>
+            <a:r>
+              <a:rPr lang="en-US" altLang="zh-CN" sz="1100" dirty="0">
+                <a:solidFill>
+                  <a:schemeClr val="bg1"/>
+                </a:solidFill>
+                <a:latin typeface="Arial" panose="020B0604020202020204" pitchFamily="34" charset="0"/>
+                <a:cs typeface="Arial" panose="020B0604020202020204" pitchFamily="34" charset="0"/>
+              </a:rPr>
+              <a:t>Create</a:t>
+            </a:r>
+            <a:r>
+              <a:rPr lang="zh-CN" altLang="en-US" sz="1100" dirty="0">
+                <a:solidFill>
+                  <a:schemeClr val="bg1"/>
+                </a:solidFill>
+                <a:latin typeface="Arial" panose="020B0604020202020204" pitchFamily="34" charset="0"/>
+                <a:cs typeface="Arial" panose="020B0604020202020204" pitchFamily="34" charset="0"/>
+              </a:rPr>
+              <a:t> </a:t>
+            </a:r>
+            <a:r>
+              <a:rPr lang="en-US" altLang="zh-CN" sz="1100" dirty="0">
+                <a:solidFill>
+                  <a:schemeClr val="bg1"/>
+                </a:solidFill>
+                <a:latin typeface="Arial" panose="020B0604020202020204" pitchFamily="34" charset="0"/>
+                <a:cs typeface="Arial" panose="020B0604020202020204" pitchFamily="34" charset="0"/>
+              </a:rPr>
+              <a:t>and</a:t>
+            </a:r>
+            <a:r>
+              <a:rPr lang="zh-CN" altLang="en-US" sz="1100" dirty="0">
+                <a:solidFill>
+                  <a:schemeClr val="bg1"/>
+                </a:solidFill>
+                <a:latin typeface="Arial" panose="020B0604020202020204" pitchFamily="34" charset="0"/>
+                <a:cs typeface="Arial" panose="020B0604020202020204" pitchFamily="34" charset="0"/>
+              </a:rPr>
+              <a:t> </a:t>
+            </a:r>
+            <a:r>
+              <a:rPr lang="en-US" altLang="zh-CN" sz="1100" dirty="0">
+                <a:solidFill>
+                  <a:schemeClr val="bg1"/>
+                </a:solidFill>
+                <a:latin typeface="Arial" panose="020B0604020202020204" pitchFamily="34" charset="0"/>
+                <a:cs typeface="Arial" panose="020B0604020202020204" pitchFamily="34" charset="0"/>
+              </a:rPr>
+              <a:t>c</a:t>
+            </a:r>
             <a:r>
               <a:rPr lang="en-US" sz="1100" dirty="0">
                 <a:solidFill>
@@ -4659,105 +4868,7 @@
                 <a:latin typeface="Arial" panose="020B0604020202020204" pitchFamily="34" charset="0"/>
                 <a:cs typeface="Arial" panose="020B0604020202020204" pitchFamily="34" charset="0"/>
               </a:rPr>
-              <a:t>Instance</a:t>
-            </a:r>
-            <a:r>
-              <a:rPr lang="zh-CN" altLang="en-US" sz="1100" dirty="0">
-                <a:solidFill>
-                  <a:schemeClr val="bg1"/>
-                </a:solidFill>
-                <a:latin typeface="Arial" panose="020B0604020202020204" pitchFamily="34" charset="0"/>
-                <a:cs typeface="Arial" panose="020B0604020202020204" pitchFamily="34" charset="0"/>
-              </a:rPr>
-              <a:t> </a:t>
-            </a:r>
-            <a:r>
-              <a:rPr lang="en-US" altLang="zh-CN" sz="1100" dirty="0">
-                <a:solidFill>
-                  <a:schemeClr val="bg1"/>
-                </a:solidFill>
-                <a:latin typeface="Arial" panose="020B0604020202020204" pitchFamily="34" charset="0"/>
-                <a:cs typeface="Arial" panose="020B0604020202020204" pitchFamily="34" charset="0"/>
-              </a:rPr>
-              <a:t>directory</a:t>
-            </a:r>
-            <a:r>
-              <a:rPr lang="en-US" sz="1100" dirty="0">
-                <a:solidFill>
-                  <a:schemeClr val="bg1"/>
-                </a:solidFill>
-                <a:latin typeface="Arial" panose="020B0604020202020204" pitchFamily="34" charset="0"/>
-                <a:cs typeface="Arial" panose="020B0604020202020204" pitchFamily="34" charset="0"/>
-              </a:rPr>
-              <a:t> 2</a:t>
-            </a:r>
-          </a:p>
-        </p:txBody>
-      </p:sp>
-      <p:sp>
-        <p:nvSpPr>
-          <p:cNvPr id="41" name="Rectangle 40">
-            <a:extLst>
-              <a:ext uri="{FF2B5EF4-FFF2-40B4-BE49-F238E27FC236}">
-                <a16:creationId xmlns:a16="http://schemas.microsoft.com/office/drawing/2014/main" id="{D241ABC9-99D2-994E-B685-7D82041E280C}"/>
-              </a:ext>
-            </a:extLst>
-          </p:cNvPr>
-          <p:cNvSpPr/>
-          <p:nvPr/>
-        </p:nvSpPr>
-        <p:spPr>
-          <a:xfrm>
-            <a:off x="2498332" y="7973923"/>
-            <a:ext cx="4018152" cy="628174"/>
-          </a:xfrm>
-          <a:prstGeom prst="rect">
-            <a:avLst/>
-          </a:prstGeom>
-          <a:solidFill>
-            <a:srgbClr val="552E73"/>
-          </a:solidFill>
-          <a:ln>
-            <a:solidFill>
-              <a:schemeClr val="bg1"/>
-            </a:solidFill>
-          </a:ln>
-        </p:spPr>
-        <p:style>
-          <a:lnRef idx="2">
-            <a:schemeClr val="accent1">
-              <a:shade val="50000"/>
-            </a:schemeClr>
-          </a:lnRef>
-          <a:fillRef idx="1">
-            <a:schemeClr val="accent1"/>
-          </a:fillRef>
-          <a:effectRef idx="0">
-            <a:schemeClr val="accent1"/>
-          </a:effectRef>
-          <a:fontRef idx="minor">
-            <a:schemeClr val="lt1"/>
-          </a:fontRef>
-        </p:style>
-        <p:txBody>
-          <a:bodyPr rot="0" spcFirstLastPara="0" vertOverflow="overflow" horzOverflow="overflow" vert="horz" wrap="square" lIns="91440" tIns="45720" rIns="91440" bIns="45720" numCol="1" spcCol="0" rtlCol="0" fromWordArt="0" anchor="ctr" anchorCtr="0" forceAA="0" compatLnSpc="1">
-            <a:prstTxWarp prst="textNoShape">
-              <a:avLst/>
-            </a:prstTxWarp>
-            <a:noAutofit/>
-          </a:bodyPr>
-          <a:lstStyle/>
-          <a:p>
-            <a:pPr algn="ctr"/>
-            <a:r>
-              <a:rPr lang="en-US" sz="1100" dirty="0">
-                <a:solidFill>
-                  <a:schemeClr val="bg1"/>
-                </a:solidFill>
-                <a:latin typeface="Arial" panose="020B0604020202020204" pitchFamily="34" charset="0"/>
-                <a:cs typeface="Arial" panose="020B0604020202020204" pitchFamily="34" charset="0"/>
-              </a:rPr>
-              <a:t>Configure the Zowe instance directory</a:t>
+              <a:t>onfigure the Zowe instance directory</a:t>
             </a:r>
             <a:endParaRPr lang="en-US" altLang="zh-CN" sz="1100" dirty="0">
               <a:solidFill>
@@ -4772,9 +4883,7 @@
             <a:r>
               <a:rPr lang="en-US" altLang="zh-CN" sz="1100" dirty="0">
                 <a:solidFill>
-                  <a:schemeClr val="bg2">
-                    <a:lumMod val="90000"/>
-                  </a:schemeClr>
+                  <a:schemeClr val="bg1"/>
                 </a:solidFill>
                 <a:latin typeface="Arial" panose="020B0604020202020204" pitchFamily="34" charset="0"/>
                 <a:cs typeface="Arial" panose="020B0604020202020204" pitchFamily="34" charset="0"/>
@@ -4784,9 +4893,7 @@
             <a:r>
               <a:rPr lang="en-US" sz="1100" dirty="0">
                 <a:solidFill>
-                  <a:schemeClr val="bg2">
-                    <a:lumMod val="90000"/>
-                  </a:schemeClr>
+                  <a:schemeClr val="bg1"/>
                 </a:solidFill>
                 <a:latin typeface="Arial" panose="020B0604020202020204" pitchFamily="34" charset="0"/>
                 <a:cs typeface="Arial" panose="020B0604020202020204" pitchFamily="34" charset="0"/>
@@ -4796,9 +4903,7 @@
             <a:r>
               <a:rPr lang="en-US" sz="1100" dirty="0" err="1">
                 <a:solidFill>
-                  <a:schemeClr val="bg2">
-                    <a:lumMod val="90000"/>
-                  </a:schemeClr>
+                  <a:schemeClr val="bg1"/>
                 </a:solidFill>
                 <a:latin typeface="Arial" panose="020B0604020202020204" pitchFamily="34" charset="0"/>
                 <a:cs typeface="Arial" panose="020B0604020202020204" pitchFamily="34" charset="0"/>
@@ -4808,9 +4913,7 @@
             <a:r>
               <a:rPr lang="en-US" altLang="zh-CN" sz="1100" dirty="0" err="1">
                 <a:solidFill>
-                  <a:schemeClr val="bg2">
-                    <a:lumMod val="90000"/>
-                  </a:schemeClr>
+                  <a:schemeClr val="bg1"/>
                 </a:solidFill>
                 <a:latin typeface="Arial" panose="020B0604020202020204" pitchFamily="34" charset="0"/>
                 <a:cs typeface="Arial" panose="020B0604020202020204" pitchFamily="34" charset="0"/>
@@ -4820,9 +4923,7 @@
             <a:r>
               <a:rPr lang="en-US" altLang="zh-CN" sz="1100" dirty="0">
                 <a:solidFill>
-                  <a:schemeClr val="bg2">
-                    <a:lumMod val="90000"/>
-                  </a:schemeClr>
+                  <a:schemeClr val="bg1"/>
                 </a:solidFill>
                 <a:latin typeface="Arial" panose="020B0604020202020204" pitchFamily="34" charset="0"/>
                 <a:cs typeface="Arial" panose="020B0604020202020204" pitchFamily="34" charset="0"/>
@@ -4831,9 +4932,7 @@
             </a:r>
             <a:endParaRPr lang="en-US" sz="1100" dirty="0">
               <a:solidFill>
-                <a:schemeClr val="bg2">
-                  <a:lumMod val="90000"/>
-                </a:schemeClr>
+                <a:schemeClr val="bg1"/>
               </a:solidFill>
               <a:latin typeface="Arial" panose="020B0604020202020204" pitchFamily="34" charset="0"/>
               <a:cs typeface="Arial" panose="020B0604020202020204" pitchFamily="34" charset="0"/>
@@ -4855,14 +4954,14 @@
         </p:nvSpPr>
         <p:spPr>
           <a:xfrm>
-            <a:off x="2505125" y="10578282"/>
-            <a:ext cx="4018152" cy="558971"/>
+            <a:off x="2505124" y="10705280"/>
+            <a:ext cx="4232259" cy="558971"/>
           </a:xfrm>
           <a:prstGeom prst="rect">
             <a:avLst/>
           </a:prstGeom>
           <a:solidFill>
-            <a:srgbClr val="552E73"/>
+            <a:srgbClr val="4270C3"/>
           </a:solidFill>
           <a:ln>
             <a:noFill/>
@@ -4902,7 +5001,7 @@
                 <a:latin typeface="Arial" panose="020B0604020202020204" pitchFamily="34" charset="0"/>
                 <a:cs typeface="Arial" panose="020B0604020202020204" pitchFamily="34" charset="0"/>
               </a:rPr>
-              <a:t>Configure</a:t>
+              <a:t>Install</a:t>
             </a:r>
             <a:r>
               <a:rPr lang="zh-CN" altLang="en-US" sz="1100" dirty="0">
@@ -4982,7 +5081,70 @@
                 <a:latin typeface="Arial" panose="020B0604020202020204" pitchFamily="34" charset="0"/>
                 <a:cs typeface="Arial" panose="020B0604020202020204" pitchFamily="34" charset="0"/>
               </a:rPr>
-              <a:t>task ZWESVSTC</a:t>
+              <a:t>task (ZWESVSTC)</a:t>
+            </a:r>
+          </a:p>
+          <a:p>
+            <a:pPr algn="ctr"/>
+            <a:r>
+              <a:rPr lang="en-US" altLang="zh-CN" sz="1100" dirty="0">
+                <a:solidFill>
+                  <a:schemeClr val="bg1"/>
+                </a:solidFill>
+                <a:latin typeface="Arial" panose="020B0604020202020204" pitchFamily="34" charset="0"/>
+                <a:cs typeface="Arial" panose="020B0604020202020204" pitchFamily="34" charset="0"/>
+              </a:rPr>
+              <a:t>(Script:</a:t>
+            </a:r>
+            <a:r>
+              <a:rPr lang="zh-CN" altLang="en-US" sz="1100" dirty="0">
+                <a:solidFill>
+                  <a:schemeClr val="bg1"/>
+                </a:solidFill>
+                <a:latin typeface="Arial" panose="020B0604020202020204" pitchFamily="34" charset="0"/>
+                <a:cs typeface="Arial" panose="020B0604020202020204" pitchFamily="34" charset="0"/>
+              </a:rPr>
+              <a:t> </a:t>
+            </a:r>
+            <a:r>
+              <a:rPr lang="en-US" altLang="zh-CN" sz="1100" dirty="0" err="1">
+                <a:solidFill>
+                  <a:schemeClr val="bg1"/>
+                </a:solidFill>
+                <a:latin typeface="Arial" panose="020B0604020202020204" pitchFamily="34" charset="0"/>
+                <a:cs typeface="Arial" panose="020B0604020202020204" pitchFamily="34" charset="0"/>
+              </a:rPr>
+              <a:t>zowe</a:t>
+            </a:r>
+            <a:r>
+              <a:rPr lang="en-US" altLang="zh-CN" sz="1100" dirty="0">
+                <a:solidFill>
+                  <a:schemeClr val="bg1"/>
+                </a:solidFill>
+                <a:latin typeface="Arial" panose="020B0604020202020204" pitchFamily="34" charset="0"/>
+                <a:cs typeface="Arial" panose="020B0604020202020204" pitchFamily="34" charset="0"/>
+              </a:rPr>
+              <a:t>-install-</a:t>
+            </a:r>
+            <a:r>
+              <a:rPr lang="en-US" altLang="zh-CN" sz="1100" dirty="0" err="1">
+                <a:solidFill>
+                  <a:schemeClr val="bg1"/>
+                </a:solidFill>
+                <a:latin typeface="Arial" panose="020B0604020202020204" pitchFamily="34" charset="0"/>
+                <a:cs typeface="Arial" panose="020B0604020202020204" pitchFamily="34" charset="0"/>
+              </a:rPr>
+              <a:t>proc.sh</a:t>
+            </a:r>
+            <a:r>
+              <a:rPr lang="en-US" altLang="zh-CN" sz="1100" dirty="0">
+                <a:solidFill>
+                  <a:schemeClr val="bg1"/>
+                </a:solidFill>
+                <a:latin typeface="Arial" panose="020B0604020202020204" pitchFamily="34" charset="0"/>
+                <a:cs typeface="Arial" panose="020B0604020202020204" pitchFamily="34" charset="0"/>
+              </a:rPr>
+              <a:t>)</a:t>
             </a:r>
           </a:p>
         </p:txBody>
@@ -5003,7 +5165,7 @@
         </p:nvCxnSpPr>
         <p:spPr>
           <a:xfrm>
-            <a:off x="4421626" y="8657477"/>
+            <a:off x="4607892" y="8589741"/>
             <a:ext cx="0" cy="212985"/>
           </a:xfrm>
           <a:prstGeom prst="straightConnector1">
@@ -5049,7 +5211,7 @@
         </p:nvCxnSpPr>
         <p:spPr>
           <a:xfrm>
-            <a:off x="4421626" y="9508752"/>
+            <a:off x="4607892" y="9508752"/>
             <a:ext cx="0" cy="212985"/>
           </a:xfrm>
           <a:prstGeom prst="straightConnector1">
@@ -5093,14 +5255,14 @@
         </p:nvSpPr>
         <p:spPr>
           <a:xfrm>
-            <a:off x="2498332" y="9756583"/>
-            <a:ext cx="4018152" cy="558971"/>
+            <a:off x="2498331" y="9756583"/>
+            <a:ext cx="4239055" cy="641821"/>
           </a:xfrm>
           <a:prstGeom prst="rect">
             <a:avLst/>
           </a:prstGeom>
           <a:solidFill>
-            <a:srgbClr val="552E73"/>
+            <a:srgbClr val="4270C3"/>
           </a:solidFill>
           <a:ln>
             <a:noFill/>
@@ -5160,7 +5322,20 @@
                 <a:latin typeface="Arial" panose="020B0604020202020204" pitchFamily="34" charset="0"/>
                 <a:cs typeface="Arial" panose="020B0604020202020204" pitchFamily="34" charset="0"/>
               </a:rPr>
-              <a:t> Desktop) Configure</a:t>
+              <a:t> Desktop) </a:t>
+            </a:r>
+          </a:p>
+          <a:p>
+            <a:pPr algn="ctr"/>
+            <a:r>
+              <a:rPr lang="en-US" altLang="zh-CN" sz="1100" dirty="0">
+                <a:solidFill>
+                  <a:schemeClr val="bg1"/>
+                </a:solidFill>
+                <a:latin typeface="Arial" panose="020B0604020202020204" pitchFamily="34" charset="0"/>
+                <a:cs typeface="Arial" panose="020B0604020202020204" pitchFamily="34" charset="0"/>
+              </a:rPr>
+              <a:t>Install</a:t>
             </a:r>
             <a:r>
               <a:rPr lang="zh-CN" altLang="en-US" sz="1100" dirty="0">
@@ -5180,6 +5355,46 @@
                 <a:latin typeface="Arial" panose="020B0604020202020204" pitchFamily="34" charset="0"/>
                 <a:cs typeface="Arial" panose="020B0604020202020204" pitchFamily="34" charset="0"/>
               </a:rPr>
+              <a:t>and</a:t>
+            </a:r>
+            <a:r>
+              <a:rPr lang="zh-CN" altLang="en-US" sz="1100" dirty="0">
+                <a:solidFill>
+                  <a:schemeClr val="bg1"/>
+                </a:solidFill>
+                <a:latin typeface="Arial" panose="020B0604020202020204" pitchFamily="34" charset="0"/>
+                <a:cs typeface="Arial" panose="020B0604020202020204" pitchFamily="34" charset="0"/>
+              </a:rPr>
+              <a:t> </a:t>
+            </a:r>
+            <a:r>
+              <a:rPr lang="en-US" altLang="zh-CN" sz="1100" dirty="0">
+                <a:solidFill>
+                  <a:schemeClr val="bg1"/>
+                </a:solidFill>
+                <a:latin typeface="Arial" panose="020B0604020202020204" pitchFamily="34" charset="0"/>
+                <a:cs typeface="Arial" panose="020B0604020202020204" pitchFamily="34" charset="0"/>
+              </a:rPr>
+              <a:t>configure</a:t>
+            </a:r>
+            <a:r>
+              <a:rPr lang="zh-CN" altLang="en-US" sz="1100" dirty="0">
+                <a:solidFill>
+                  <a:schemeClr val="bg1"/>
+                </a:solidFill>
+                <a:latin typeface="Arial" panose="020B0604020202020204" pitchFamily="34" charset="0"/>
+                <a:cs typeface="Arial" panose="020B0604020202020204" pitchFamily="34" charset="0"/>
+              </a:rPr>
+              <a:t> </a:t>
+            </a:r>
+            <a:r>
+              <a:rPr lang="en-US" altLang="zh-CN" sz="1100" dirty="0">
+                <a:solidFill>
+                  <a:schemeClr val="bg1"/>
+                </a:solidFill>
+                <a:latin typeface="Arial" panose="020B0604020202020204" pitchFamily="34" charset="0"/>
+                <a:cs typeface="Arial" panose="020B0604020202020204" pitchFamily="34" charset="0"/>
+              </a:rPr>
               <a:t>the</a:t>
             </a:r>
             <a:r>
@@ -5260,8 +5475,98 @@
                 <a:latin typeface="Arial" panose="020B0604020202020204" pitchFamily="34" charset="0"/>
                 <a:cs typeface="Arial" panose="020B0604020202020204" pitchFamily="34" charset="0"/>
               </a:rPr>
-              <a:t>server ZWESISTC</a:t>
-            </a:r>
+              <a:t>server (ZWESISTC)</a:t>
+            </a:r>
+          </a:p>
+          <a:p>
+            <a:pPr algn="ctr"/>
+            <a:r>
+              <a:rPr lang="en-US" altLang="zh-CN" sz="1100" dirty="0">
+                <a:solidFill>
+                  <a:schemeClr val="bg1"/>
+                </a:solidFill>
+                <a:latin typeface="Arial" panose="020B0604020202020204" pitchFamily="34" charset="0"/>
+                <a:cs typeface="Arial" panose="020B0604020202020204" pitchFamily="34" charset="0"/>
+              </a:rPr>
+              <a:t>(Script: </a:t>
+            </a:r>
+            <a:r>
+              <a:rPr lang="en-US" sz="1100" dirty="0" err="1">
+                <a:solidFill>
+                  <a:schemeClr val="bg1"/>
+                </a:solidFill>
+                <a:latin typeface="Arial" panose="020B0604020202020204" pitchFamily="34" charset="0"/>
+                <a:cs typeface="Arial" panose="020B0604020202020204" pitchFamily="34" charset="0"/>
+              </a:rPr>
+              <a:t>zowe</a:t>
+            </a:r>
+            <a:r>
+              <a:rPr lang="en-US" sz="1100" dirty="0">
+                <a:solidFill>
+                  <a:schemeClr val="bg1"/>
+                </a:solidFill>
+                <a:latin typeface="Arial" panose="020B0604020202020204" pitchFamily="34" charset="0"/>
+                <a:cs typeface="Arial" panose="020B0604020202020204" pitchFamily="34" charset="0"/>
+              </a:rPr>
+              <a:t>-</a:t>
+            </a:r>
+            <a:r>
+              <a:rPr lang="en-US" altLang="zh-CN" sz="1100" dirty="0">
+                <a:solidFill>
+                  <a:schemeClr val="bg1"/>
+                </a:solidFill>
+                <a:latin typeface="Arial" panose="020B0604020202020204" pitchFamily="34" charset="0"/>
+                <a:cs typeface="Arial" panose="020B0604020202020204" pitchFamily="34" charset="0"/>
+              </a:rPr>
+              <a:t>install-</a:t>
+            </a:r>
+            <a:r>
+              <a:rPr lang="en-US" altLang="zh-CN" sz="1100" dirty="0" err="1">
+                <a:solidFill>
+                  <a:schemeClr val="bg1"/>
+                </a:solidFill>
+                <a:latin typeface="Arial" panose="020B0604020202020204" pitchFamily="34" charset="0"/>
+                <a:cs typeface="Arial" panose="020B0604020202020204" pitchFamily="34" charset="0"/>
+              </a:rPr>
+              <a:t>xmem</a:t>
+            </a:r>
+            <a:r>
+              <a:rPr lang="en-US" sz="1100" dirty="0" err="1">
+                <a:solidFill>
+                  <a:schemeClr val="bg1"/>
+                </a:solidFill>
+                <a:latin typeface="Arial" panose="020B0604020202020204" pitchFamily="34" charset="0"/>
+                <a:cs typeface="Arial" panose="020B0604020202020204" pitchFamily="34" charset="0"/>
+              </a:rPr>
+              <a:t>.s</a:t>
+            </a:r>
+            <a:r>
+              <a:rPr lang="en-US" altLang="zh-CN" sz="1100" dirty="0" err="1">
+                <a:solidFill>
+                  <a:schemeClr val="bg1"/>
+                </a:solidFill>
+                <a:latin typeface="Arial" panose="020B0604020202020204" pitchFamily="34" charset="0"/>
+                <a:cs typeface="Arial" panose="020B0604020202020204" pitchFamily="34" charset="0"/>
+              </a:rPr>
+              <a:t>h</a:t>
+            </a:r>
+            <a:r>
+              <a:rPr lang="en-US" altLang="zh-CN" sz="1100" dirty="0">
+                <a:solidFill>
+                  <a:schemeClr val="bg1"/>
+                </a:solidFill>
+                <a:latin typeface="Arial" panose="020B0604020202020204" pitchFamily="34" charset="0"/>
+                <a:cs typeface="Arial" panose="020B0604020202020204" pitchFamily="34" charset="0"/>
+              </a:rPr>
+              <a:t>)</a:t>
+            </a:r>
+            <a:endParaRPr lang="en-US" sz="1100" dirty="0">
+              <a:solidFill>
+                <a:schemeClr val="bg1"/>
+              </a:solidFill>
+              <a:latin typeface="Arial" panose="020B0604020202020204" pitchFamily="34" charset="0"/>
+              <a:cs typeface="Arial" panose="020B0604020202020204" pitchFamily="34" charset="0"/>
+            </a:endParaRPr>
           </a:p>
         </p:txBody>
       </p:sp>
@@ -5281,7 +5586,7 @@
         </p:nvCxnSpPr>
         <p:spPr>
           <a:xfrm>
-            <a:off x="4421626" y="10333727"/>
+            <a:off x="4607892" y="10435331"/>
             <a:ext cx="0" cy="212985"/>
           </a:xfrm>
           <a:prstGeom prst="straightConnector1">
@@ -6040,8 +6345,8 @@
         </p:nvCxnSpPr>
         <p:spPr>
           <a:xfrm>
-            <a:off x="4421626" y="11239118"/>
-            <a:ext cx="0" cy="475245"/>
+            <a:off x="4607892" y="11303000"/>
+            <a:ext cx="0" cy="411363"/>
           </a:xfrm>
           <a:prstGeom prst="straightConnector1">
             <a:avLst/>
@@ -6084,14 +6389,16 @@
         </p:nvSpPr>
         <p:spPr>
           <a:xfrm>
-            <a:off x="2498332" y="11783451"/>
-            <a:ext cx="4018152" cy="558971"/>
+            <a:off x="2498331" y="11783451"/>
+            <a:ext cx="4239039" cy="558971"/>
           </a:xfrm>
           <a:prstGeom prst="rect">
             <a:avLst/>
           </a:prstGeom>
           <a:solidFill>
-            <a:srgbClr val="1A8570"/>
+            <a:schemeClr val="accent1">
+              <a:lumMod val="50000"/>
+            </a:schemeClr>
           </a:solidFill>
           <a:ln>
             <a:noFill/>
@@ -6462,1981 +6769,6 @@
     <p:extLst>
       <p:ext uri="{BB962C8B-B14F-4D97-AF65-F5344CB8AC3E}">
         <p14:creationId xmlns:p14="http://schemas.microsoft.com/office/powerpoint/2010/main" val="2407308635"/>
-      </p:ext>
-    </p:extLst>
-  </p:cSld>
-  <p:clrMapOvr>
-    <a:masterClrMapping/>
-  </p:clrMapOvr>
-</p:sld>
-</file>
-
-<file path=ppt/slides/slide2.xml><?xml version="1.0" encoding="utf-8"?>
-<p:sld xmlns:a="http://schemas.openxmlformats.org/drawingml/2006/main" xmlns:r="http://schemas.openxmlformats.org/officeDocument/2006/relationships" xmlns:p="http://schemas.openxmlformats.org/presentationml/2006/main">
-  <p:cSld>
-    <p:spTree>
-      <p:nvGrpSpPr>
-        <p:cNvPr id="1" name=""/>
-        <p:cNvGrpSpPr/>
-        <p:nvPr/>
-      </p:nvGrpSpPr>
-      <p:grpSpPr>
-        <a:xfrm>
-          <a:off x="0" y="0"/>
-          <a:ext cx="0" cy="0"/>
-          <a:chOff x="0" y="0"/>
-          <a:chExt cx="0" cy="0"/>
-        </a:xfrm>
-      </p:grpSpPr>
-      <p:sp>
-        <p:nvSpPr>
-          <p:cNvPr id="2" name="TextBox 1">
-            <a:extLst>
-              <a:ext uri="{FF2B5EF4-FFF2-40B4-BE49-F238E27FC236}">
-                <a16:creationId xmlns:a16="http://schemas.microsoft.com/office/drawing/2014/main" id="{3D1B1EC4-B718-2946-B6DB-D80357F84375}"/>
-              </a:ext>
-            </a:extLst>
-          </p:cNvPr>
-          <p:cNvSpPr txBox="1"/>
-          <p:nvPr/>
-        </p:nvSpPr>
-        <p:spPr>
-          <a:xfrm>
-            <a:off x="480680" y="2919495"/>
-            <a:ext cx="5561532" cy="369332"/>
-          </a:xfrm>
-          <a:prstGeom prst="rect">
-            <a:avLst/>
-          </a:prstGeom>
-          <a:noFill/>
-        </p:spPr>
-        <p:txBody>
-          <a:bodyPr wrap="square" rtlCol="0">
-            <a:spAutoFit/>
-          </a:bodyPr>
-          <a:lstStyle/>
-          <a:p>
-            <a:r>
-              <a:rPr lang="en-US" b="1" dirty="0">
-                <a:latin typeface="Arial" panose="020B0604020202020204" pitchFamily="34" charset="0"/>
-                <a:cs typeface="Arial" panose="020B0604020202020204" pitchFamily="34" charset="0"/>
-              </a:rPr>
-              <a:t>Installing Zowe z/OS components</a:t>
-            </a:r>
-          </a:p>
-        </p:txBody>
-      </p:sp>
-      <p:sp>
-        <p:nvSpPr>
-          <p:cNvPr id="3" name="TextBox 2">
-            <a:extLst>
-              <a:ext uri="{FF2B5EF4-FFF2-40B4-BE49-F238E27FC236}">
-                <a16:creationId xmlns:a16="http://schemas.microsoft.com/office/drawing/2014/main" id="{42F15088-F8CC-2E43-A759-337F3852D8DB}"/>
-              </a:ext>
-            </a:extLst>
-          </p:cNvPr>
-          <p:cNvSpPr txBox="1"/>
-          <p:nvPr/>
-        </p:nvSpPr>
-        <p:spPr>
-          <a:xfrm>
-            <a:off x="480680" y="8844031"/>
-            <a:ext cx="5561532" cy="369332"/>
-          </a:xfrm>
-          <a:prstGeom prst="rect">
-            <a:avLst/>
-          </a:prstGeom>
-          <a:noFill/>
-        </p:spPr>
-        <p:txBody>
-          <a:bodyPr wrap="square" rtlCol="0">
-            <a:spAutoFit/>
-          </a:bodyPr>
-          <a:lstStyle/>
-          <a:p>
-            <a:r>
-              <a:rPr lang="en-US" b="1" dirty="0">
-                <a:latin typeface="Arial" panose="020B0604020202020204" pitchFamily="34" charset="0"/>
-                <a:cs typeface="Arial" panose="020B0604020202020204" pitchFamily="34" charset="0"/>
-              </a:rPr>
-              <a:t>Installing Zowe CLI</a:t>
-            </a:r>
-          </a:p>
-        </p:txBody>
-      </p:sp>
-      <p:sp>
-        <p:nvSpPr>
-          <p:cNvPr id="5" name="TextBox 4">
-            <a:extLst>
-              <a:ext uri="{FF2B5EF4-FFF2-40B4-BE49-F238E27FC236}">
-                <a16:creationId xmlns:a16="http://schemas.microsoft.com/office/drawing/2014/main" id="{3E8D8238-0BA7-C348-AFEC-A3617CA3002B}"/>
-              </a:ext>
-            </a:extLst>
-          </p:cNvPr>
-          <p:cNvSpPr txBox="1"/>
-          <p:nvPr/>
-        </p:nvSpPr>
-        <p:spPr>
-          <a:xfrm>
-            <a:off x="462751" y="485537"/>
-            <a:ext cx="5561532" cy="369332"/>
-          </a:xfrm>
-          <a:prstGeom prst="rect">
-            <a:avLst/>
-          </a:prstGeom>
-          <a:noFill/>
-        </p:spPr>
-        <p:txBody>
-          <a:bodyPr wrap="square" rtlCol="0">
-            <a:spAutoFit/>
-          </a:bodyPr>
-          <a:lstStyle/>
-          <a:p>
-            <a:r>
-              <a:rPr lang="en-US" b="1" dirty="0">
-                <a:latin typeface="Arial" panose="020B0604020202020204" pitchFamily="34" charset="0"/>
-                <a:cs typeface="Arial" panose="020B0604020202020204" pitchFamily="34" charset="0"/>
-              </a:rPr>
-              <a:t>Planning</a:t>
-            </a:r>
-            <a:r>
-              <a:rPr lang="zh-CN" altLang="en-US" b="1" dirty="0">
-                <a:latin typeface="Arial" panose="020B0604020202020204" pitchFamily="34" charset="0"/>
-                <a:cs typeface="Arial" panose="020B0604020202020204" pitchFamily="34" charset="0"/>
-              </a:rPr>
-              <a:t> </a:t>
-            </a:r>
-            <a:r>
-              <a:rPr lang="en-US" altLang="zh-CN" b="1" dirty="0">
-                <a:latin typeface="Arial" panose="020B0604020202020204" pitchFamily="34" charset="0"/>
-                <a:cs typeface="Arial" panose="020B0604020202020204" pitchFamily="34" charset="0"/>
-              </a:rPr>
-              <a:t>and</a:t>
-            </a:r>
-            <a:r>
-              <a:rPr lang="zh-CN" altLang="en-US" b="1" dirty="0">
-                <a:latin typeface="Arial" panose="020B0604020202020204" pitchFamily="34" charset="0"/>
-                <a:cs typeface="Arial" panose="020B0604020202020204" pitchFamily="34" charset="0"/>
-              </a:rPr>
-              <a:t> </a:t>
-            </a:r>
-            <a:r>
-              <a:rPr lang="en-US" altLang="zh-CN" b="1" dirty="0">
-                <a:latin typeface="Arial" panose="020B0604020202020204" pitchFamily="34" charset="0"/>
-                <a:cs typeface="Arial" panose="020B0604020202020204" pitchFamily="34" charset="0"/>
-              </a:rPr>
-              <a:t>preparing</a:t>
-            </a:r>
-            <a:r>
-              <a:rPr lang="en-US" b="1" dirty="0">
-                <a:latin typeface="Arial" panose="020B0604020202020204" pitchFamily="34" charset="0"/>
-                <a:cs typeface="Arial" panose="020B0604020202020204" pitchFamily="34" charset="0"/>
-              </a:rPr>
-              <a:t> the installation</a:t>
-            </a:r>
-          </a:p>
-        </p:txBody>
-      </p:sp>
-      <p:sp>
-        <p:nvSpPr>
-          <p:cNvPr id="6" name="TextBox 5">
-            <a:extLst>
-              <a:ext uri="{FF2B5EF4-FFF2-40B4-BE49-F238E27FC236}">
-                <a16:creationId xmlns:a16="http://schemas.microsoft.com/office/drawing/2014/main" id="{663DF711-7585-844C-BF1D-62966E5BF2DB}"/>
-              </a:ext>
-            </a:extLst>
-          </p:cNvPr>
-          <p:cNvSpPr txBox="1"/>
-          <p:nvPr/>
-        </p:nvSpPr>
-        <p:spPr>
-          <a:xfrm>
-            <a:off x="480680" y="10671487"/>
-            <a:ext cx="5561532" cy="369332"/>
-          </a:xfrm>
-          <a:prstGeom prst="rect">
-            <a:avLst/>
-          </a:prstGeom>
-          <a:noFill/>
-        </p:spPr>
-        <p:txBody>
-          <a:bodyPr wrap="square" rtlCol="0">
-            <a:spAutoFit/>
-          </a:bodyPr>
-          <a:lstStyle/>
-          <a:p>
-            <a:r>
-              <a:rPr lang="en-US" b="1" dirty="0">
-                <a:latin typeface="Arial" panose="020B0604020202020204" pitchFamily="34" charset="0"/>
-                <a:cs typeface="Arial" panose="020B0604020202020204" pitchFamily="34" charset="0"/>
-              </a:rPr>
-              <a:t>Configuring Zowe components</a:t>
-            </a:r>
-          </a:p>
-        </p:txBody>
-      </p:sp>
-      <p:sp>
-        <p:nvSpPr>
-          <p:cNvPr id="7" name="TextBox 6">
-            <a:extLst>
-              <a:ext uri="{FF2B5EF4-FFF2-40B4-BE49-F238E27FC236}">
-                <a16:creationId xmlns:a16="http://schemas.microsoft.com/office/drawing/2014/main" id="{0E701BE9-BC7A-2942-AD28-1BC048CEE5E7}"/>
-              </a:ext>
-            </a:extLst>
-          </p:cNvPr>
-          <p:cNvSpPr txBox="1"/>
-          <p:nvPr/>
-        </p:nvSpPr>
-        <p:spPr>
-          <a:xfrm>
-            <a:off x="1135105" y="3444914"/>
-            <a:ext cx="8654354" cy="369332"/>
-          </a:xfrm>
-          <a:prstGeom prst="rect">
-            <a:avLst/>
-          </a:prstGeom>
-          <a:noFill/>
-        </p:spPr>
-        <p:txBody>
-          <a:bodyPr wrap="square" rtlCol="0">
-            <a:spAutoFit/>
-          </a:bodyPr>
-          <a:lstStyle/>
-          <a:p>
-            <a:r>
-              <a:rPr lang="en-US" altLang="zh-CN" dirty="0">
-                <a:latin typeface="Arial" panose="020B0604020202020204" pitchFamily="34" charset="0"/>
-                <a:cs typeface="Arial" panose="020B0604020202020204" pitchFamily="34" charset="0"/>
-              </a:rPr>
-              <a:t>Installation</a:t>
-            </a:r>
-            <a:r>
-              <a:rPr lang="zh-CN" altLang="en-US" dirty="0">
-                <a:latin typeface="Arial" panose="020B0604020202020204" pitchFamily="34" charset="0"/>
-                <a:cs typeface="Arial" panose="020B0604020202020204" pitchFamily="34" charset="0"/>
-              </a:rPr>
-              <a:t> </a:t>
-            </a:r>
-            <a:r>
-              <a:rPr lang="en-US" altLang="zh-CN" dirty="0">
-                <a:latin typeface="Arial" panose="020B0604020202020204" pitchFamily="34" charset="0"/>
-                <a:cs typeface="Arial" panose="020B0604020202020204" pitchFamily="34" charset="0"/>
-              </a:rPr>
-              <a:t>introduction</a:t>
-            </a:r>
-            <a:r>
-              <a:rPr lang="zh-CN" altLang="en-US" dirty="0">
-                <a:latin typeface="Arial" panose="020B0604020202020204" pitchFamily="34" charset="0"/>
-                <a:cs typeface="Arial" panose="020B0604020202020204" pitchFamily="34" charset="0"/>
-              </a:rPr>
-              <a:t> </a:t>
-            </a:r>
-            <a:r>
-              <a:rPr lang="en-US" altLang="zh-CN" dirty="0">
-                <a:latin typeface="Arial" panose="020B0604020202020204" pitchFamily="34" charset="0"/>
-                <a:cs typeface="Arial" panose="020B0604020202020204" pitchFamily="34" charset="0"/>
-              </a:rPr>
-              <a:t>and</a:t>
-            </a:r>
-            <a:r>
-              <a:rPr lang="zh-CN" altLang="en-US" dirty="0">
-                <a:latin typeface="Arial" panose="020B0604020202020204" pitchFamily="34" charset="0"/>
-                <a:cs typeface="Arial" panose="020B0604020202020204" pitchFamily="34" charset="0"/>
-              </a:rPr>
-              <a:t> </a:t>
-            </a:r>
-            <a:r>
-              <a:rPr lang="en-US" altLang="zh-CN" dirty="0">
-                <a:latin typeface="Arial" panose="020B0604020202020204" pitchFamily="34" charset="0"/>
-                <a:cs typeface="Arial" panose="020B0604020202020204" pitchFamily="34" charset="0"/>
-              </a:rPr>
-              <a:t>task</a:t>
-            </a:r>
-            <a:r>
-              <a:rPr lang="zh-CN" altLang="en-US" dirty="0">
-                <a:latin typeface="Arial" panose="020B0604020202020204" pitchFamily="34" charset="0"/>
-                <a:cs typeface="Arial" panose="020B0604020202020204" pitchFamily="34" charset="0"/>
-              </a:rPr>
-              <a:t> </a:t>
-            </a:r>
-            <a:r>
-              <a:rPr lang="en-US" altLang="zh-CN" dirty="0">
-                <a:latin typeface="Arial" panose="020B0604020202020204" pitchFamily="34" charset="0"/>
-                <a:cs typeface="Arial" panose="020B0604020202020204" pitchFamily="34" charset="0"/>
-              </a:rPr>
-              <a:t>flow</a:t>
-            </a:r>
-            <a:endParaRPr lang="en-US" dirty="0">
-              <a:latin typeface="Arial" panose="020B0604020202020204" pitchFamily="34" charset="0"/>
-              <a:cs typeface="Arial" panose="020B0604020202020204" pitchFamily="34" charset="0"/>
-            </a:endParaRPr>
-          </a:p>
-        </p:txBody>
-      </p:sp>
-      <p:sp>
-        <p:nvSpPr>
-          <p:cNvPr id="8" name="TextBox 7">
-            <a:extLst>
-              <a:ext uri="{FF2B5EF4-FFF2-40B4-BE49-F238E27FC236}">
-                <a16:creationId xmlns:a16="http://schemas.microsoft.com/office/drawing/2014/main" id="{7F0C806F-2E9B-2D41-8357-5331CFB89978}"/>
-              </a:ext>
-            </a:extLst>
-          </p:cNvPr>
-          <p:cNvSpPr txBox="1"/>
-          <p:nvPr/>
-        </p:nvSpPr>
-        <p:spPr>
-          <a:xfrm>
-            <a:off x="1135104" y="4156855"/>
-            <a:ext cx="5767719" cy="369332"/>
-          </a:xfrm>
-          <a:prstGeom prst="rect">
-            <a:avLst/>
-          </a:prstGeom>
-          <a:noFill/>
-        </p:spPr>
-        <p:txBody>
-          <a:bodyPr wrap="square" rtlCol="0">
-            <a:spAutoFit/>
-          </a:bodyPr>
-          <a:lstStyle/>
-          <a:p>
-            <a:r>
-              <a:rPr lang="en-US" altLang="zh-CN" dirty="0">
-                <a:latin typeface="Arial" panose="020B0604020202020204" pitchFamily="34" charset="0"/>
-                <a:cs typeface="Arial" panose="020B0604020202020204" pitchFamily="34" charset="0"/>
-              </a:rPr>
-              <a:t>Installing Zowe runtime from a convenience build</a:t>
-            </a:r>
-          </a:p>
-        </p:txBody>
-      </p:sp>
-      <p:sp>
-        <p:nvSpPr>
-          <p:cNvPr id="9" name="Rectangle 8">
-            <a:extLst>
-              <a:ext uri="{FF2B5EF4-FFF2-40B4-BE49-F238E27FC236}">
-                <a16:creationId xmlns:a16="http://schemas.microsoft.com/office/drawing/2014/main" id="{6C77D8D9-3153-424F-951B-CD1CA08410F9}"/>
-              </a:ext>
-            </a:extLst>
-          </p:cNvPr>
-          <p:cNvSpPr/>
-          <p:nvPr/>
-        </p:nvSpPr>
-        <p:spPr>
-          <a:xfrm>
-            <a:off x="5219607" y="3144977"/>
-            <a:ext cx="4861018" cy="923330"/>
-          </a:xfrm>
-          <a:prstGeom prst="rect">
-            <a:avLst/>
-          </a:prstGeom>
-        </p:spPr>
-        <p:txBody>
-          <a:bodyPr wrap="square">
-            <a:spAutoFit/>
-          </a:bodyPr>
-          <a:lstStyle/>
-          <a:p>
-            <a:r>
-              <a:rPr lang="en-US" altLang="zh-CN" dirty="0">
-                <a:solidFill>
-                  <a:srgbClr val="7B3C9E"/>
-                </a:solidFill>
-                <a:latin typeface="Arial" panose="020B0604020202020204" pitchFamily="34" charset="0"/>
-                <a:cs typeface="Arial" panose="020B0604020202020204" pitchFamily="34" charset="0"/>
-              </a:rPr>
-              <a:t>Talk</a:t>
-            </a:r>
-            <a:r>
-              <a:rPr lang="zh-CN" altLang="en-US" dirty="0">
-                <a:solidFill>
-                  <a:srgbClr val="7B3C9E"/>
-                </a:solidFill>
-                <a:latin typeface="Arial" panose="020B0604020202020204" pitchFamily="34" charset="0"/>
-                <a:cs typeface="Arial" panose="020B0604020202020204" pitchFamily="34" charset="0"/>
-              </a:rPr>
-              <a:t> </a:t>
-            </a:r>
-            <a:r>
-              <a:rPr lang="en-US" altLang="zh-CN" dirty="0">
-                <a:solidFill>
-                  <a:srgbClr val="7B3C9E"/>
-                </a:solidFill>
-                <a:latin typeface="Arial" panose="020B0604020202020204" pitchFamily="34" charset="0"/>
-                <a:cs typeface="Arial" panose="020B0604020202020204" pitchFamily="34" charset="0"/>
-              </a:rPr>
-              <a:t>about</a:t>
-            </a:r>
-            <a:r>
-              <a:rPr lang="zh-CN" altLang="en-US" dirty="0">
-                <a:solidFill>
-                  <a:srgbClr val="7B3C9E"/>
-                </a:solidFill>
-                <a:latin typeface="Arial" panose="020B0604020202020204" pitchFamily="34" charset="0"/>
-                <a:cs typeface="Arial" panose="020B0604020202020204" pitchFamily="34" charset="0"/>
-              </a:rPr>
-              <a:t> </a:t>
-            </a:r>
-            <a:r>
-              <a:rPr lang="en-US" altLang="zh-CN" dirty="0">
-                <a:solidFill>
-                  <a:srgbClr val="7B3C9E"/>
-                </a:solidFill>
-                <a:latin typeface="Arial" panose="020B0604020202020204" pitchFamily="34" charset="0"/>
-                <a:cs typeface="Arial" panose="020B0604020202020204" pitchFamily="34" charset="0"/>
-              </a:rPr>
-              <a:t>the</a:t>
-            </a:r>
-            <a:r>
-              <a:rPr lang="zh-CN" altLang="en-US" dirty="0">
-                <a:solidFill>
-                  <a:srgbClr val="7B3C9E"/>
-                </a:solidFill>
-                <a:latin typeface="Arial" panose="020B0604020202020204" pitchFamily="34" charset="0"/>
-                <a:cs typeface="Arial" panose="020B0604020202020204" pitchFamily="34" charset="0"/>
-              </a:rPr>
-              <a:t> </a:t>
-            </a:r>
-            <a:r>
-              <a:rPr lang="en-US" altLang="zh-CN" dirty="0">
-                <a:solidFill>
-                  <a:srgbClr val="7B3C9E"/>
-                </a:solidFill>
-                <a:latin typeface="Arial" panose="020B0604020202020204" pitchFamily="34" charset="0"/>
-                <a:cs typeface="Arial" panose="020B0604020202020204" pitchFamily="34" charset="0"/>
-              </a:rPr>
-              <a:t>installation</a:t>
-            </a:r>
-            <a:r>
-              <a:rPr lang="zh-CN" altLang="en-US" dirty="0">
-                <a:solidFill>
-                  <a:srgbClr val="7B3C9E"/>
-                </a:solidFill>
-                <a:latin typeface="Arial" panose="020B0604020202020204" pitchFamily="34" charset="0"/>
-                <a:cs typeface="Arial" panose="020B0604020202020204" pitchFamily="34" charset="0"/>
-              </a:rPr>
-              <a:t> </a:t>
-            </a:r>
-            <a:r>
-              <a:rPr lang="en-US" altLang="zh-CN" dirty="0">
-                <a:solidFill>
-                  <a:srgbClr val="7B3C9E"/>
-                </a:solidFill>
-                <a:latin typeface="Arial" panose="020B0604020202020204" pitchFamily="34" charset="0"/>
-                <a:cs typeface="Arial" panose="020B0604020202020204" pitchFamily="34" charset="0"/>
-              </a:rPr>
-              <a:t>methods,</a:t>
-            </a:r>
-            <a:r>
-              <a:rPr lang="zh-CN" altLang="en-US" dirty="0">
-                <a:solidFill>
-                  <a:srgbClr val="7B3C9E"/>
-                </a:solidFill>
-                <a:latin typeface="Arial" panose="020B0604020202020204" pitchFamily="34" charset="0"/>
-                <a:cs typeface="Arial" panose="020B0604020202020204" pitchFamily="34" charset="0"/>
-              </a:rPr>
-              <a:t> </a:t>
-            </a:r>
-            <a:r>
-              <a:rPr lang="en-US" altLang="zh-CN" dirty="0">
-                <a:solidFill>
-                  <a:srgbClr val="7B3C9E"/>
-                </a:solidFill>
-                <a:latin typeface="Arial" panose="020B0604020202020204" pitchFamily="34" charset="0"/>
-                <a:cs typeface="Arial" panose="020B0604020202020204" pitchFamily="34" charset="0"/>
-              </a:rPr>
-              <a:t>provide</a:t>
-            </a:r>
-            <a:r>
-              <a:rPr lang="zh-CN" altLang="en-US" dirty="0">
-                <a:solidFill>
-                  <a:srgbClr val="7B3C9E"/>
-                </a:solidFill>
-                <a:latin typeface="Arial" panose="020B0604020202020204" pitchFamily="34" charset="0"/>
-                <a:cs typeface="Arial" panose="020B0604020202020204" pitchFamily="34" charset="0"/>
-              </a:rPr>
-              <a:t> </a:t>
-            </a:r>
-            <a:r>
-              <a:rPr lang="en-US" altLang="zh-CN" dirty="0">
-                <a:solidFill>
-                  <a:srgbClr val="7B3C9E"/>
-                </a:solidFill>
-                <a:latin typeface="Arial" panose="020B0604020202020204" pitchFamily="34" charset="0"/>
-                <a:cs typeface="Arial" panose="020B0604020202020204" pitchFamily="34" charset="0"/>
-              </a:rPr>
-              <a:t>the</a:t>
-            </a:r>
-            <a:r>
-              <a:rPr lang="zh-CN" altLang="en-US" dirty="0">
-                <a:solidFill>
-                  <a:srgbClr val="7B3C9E"/>
-                </a:solidFill>
-                <a:latin typeface="Arial" panose="020B0604020202020204" pitchFamily="34" charset="0"/>
-                <a:cs typeface="Arial" panose="020B0604020202020204" pitchFamily="34" charset="0"/>
-              </a:rPr>
-              <a:t> </a:t>
-            </a:r>
-            <a:r>
-              <a:rPr lang="en-US" altLang="zh-CN" dirty="0">
-                <a:solidFill>
-                  <a:srgbClr val="7B3C9E"/>
-                </a:solidFill>
-                <a:latin typeface="Arial" panose="020B0604020202020204" pitchFamily="34" charset="0"/>
-                <a:cs typeface="Arial" panose="020B0604020202020204" pitchFamily="34" charset="0"/>
-              </a:rPr>
-              <a:t>diagram</a:t>
-            </a:r>
-            <a:r>
-              <a:rPr lang="zh-CN" altLang="en-US" dirty="0">
-                <a:solidFill>
-                  <a:srgbClr val="7B3C9E"/>
-                </a:solidFill>
-                <a:latin typeface="Arial" panose="020B0604020202020204" pitchFamily="34" charset="0"/>
-                <a:cs typeface="Arial" panose="020B0604020202020204" pitchFamily="34" charset="0"/>
-              </a:rPr>
-              <a:t> </a:t>
-            </a:r>
-            <a:r>
-              <a:rPr lang="en-US" altLang="zh-CN" dirty="0">
-                <a:solidFill>
-                  <a:srgbClr val="7B3C9E"/>
-                </a:solidFill>
-                <a:latin typeface="Arial" panose="020B0604020202020204" pitchFamily="34" charset="0"/>
-                <a:cs typeface="Arial" panose="020B0604020202020204" pitchFamily="34" charset="0"/>
-              </a:rPr>
-              <a:t>together</a:t>
-            </a:r>
-            <a:r>
-              <a:rPr lang="zh-CN" altLang="en-US" dirty="0">
-                <a:solidFill>
-                  <a:srgbClr val="7B3C9E"/>
-                </a:solidFill>
-                <a:latin typeface="Arial" panose="020B0604020202020204" pitchFamily="34" charset="0"/>
-                <a:cs typeface="Arial" panose="020B0604020202020204" pitchFamily="34" charset="0"/>
-              </a:rPr>
-              <a:t> </a:t>
-            </a:r>
-            <a:r>
-              <a:rPr lang="en-US" altLang="zh-CN" dirty="0">
-                <a:solidFill>
-                  <a:srgbClr val="7B3C9E"/>
-                </a:solidFill>
-                <a:latin typeface="Arial" panose="020B0604020202020204" pitchFamily="34" charset="0"/>
-                <a:cs typeface="Arial" panose="020B0604020202020204" pitchFamily="34" charset="0"/>
-              </a:rPr>
-              <a:t>with</a:t>
-            </a:r>
-            <a:r>
-              <a:rPr lang="zh-CN" altLang="en-US" dirty="0">
-                <a:solidFill>
-                  <a:srgbClr val="7B3C9E"/>
-                </a:solidFill>
-                <a:latin typeface="Arial" panose="020B0604020202020204" pitchFamily="34" charset="0"/>
-                <a:cs typeface="Arial" panose="020B0604020202020204" pitchFamily="34" charset="0"/>
-              </a:rPr>
-              <a:t> </a:t>
-            </a:r>
-            <a:r>
-              <a:rPr lang="en-US" altLang="zh-CN" dirty="0">
-                <a:solidFill>
-                  <a:srgbClr val="7B3C9E"/>
-                </a:solidFill>
-                <a:latin typeface="Arial" panose="020B0604020202020204" pitchFamily="34" charset="0"/>
-                <a:cs typeface="Arial" panose="020B0604020202020204" pitchFamily="34" charset="0"/>
-              </a:rPr>
-              <a:t>task</a:t>
-            </a:r>
-            <a:r>
-              <a:rPr lang="zh-CN" altLang="en-US" dirty="0">
-                <a:solidFill>
-                  <a:srgbClr val="7B3C9E"/>
-                </a:solidFill>
-                <a:latin typeface="Arial" panose="020B0604020202020204" pitchFamily="34" charset="0"/>
-                <a:cs typeface="Arial" panose="020B0604020202020204" pitchFamily="34" charset="0"/>
-              </a:rPr>
-              <a:t> </a:t>
-            </a:r>
-            <a:r>
-              <a:rPr lang="en-US" altLang="zh-CN" dirty="0">
-                <a:solidFill>
-                  <a:srgbClr val="7B3C9E"/>
-                </a:solidFill>
-                <a:latin typeface="Arial" panose="020B0604020202020204" pitchFamily="34" charset="0"/>
-                <a:cs typeface="Arial" panose="020B0604020202020204" pitchFamily="34" charset="0"/>
-              </a:rPr>
-              <a:t>description</a:t>
-            </a:r>
-            <a:r>
-              <a:rPr lang="zh-CN" altLang="en-US" dirty="0">
-                <a:solidFill>
-                  <a:srgbClr val="7B3C9E"/>
-                </a:solidFill>
-                <a:latin typeface="Arial" panose="020B0604020202020204" pitchFamily="34" charset="0"/>
-                <a:cs typeface="Arial" panose="020B0604020202020204" pitchFamily="34" charset="0"/>
-              </a:rPr>
-              <a:t> </a:t>
-            </a:r>
-            <a:r>
-              <a:rPr lang="en-US" altLang="zh-CN" dirty="0">
-                <a:solidFill>
-                  <a:srgbClr val="7B3C9E"/>
-                </a:solidFill>
-                <a:latin typeface="Arial" panose="020B0604020202020204" pitchFamily="34" charset="0"/>
-                <a:cs typeface="Arial" panose="020B0604020202020204" pitchFamily="34" charset="0"/>
-              </a:rPr>
-              <a:t>and</a:t>
-            </a:r>
-            <a:r>
-              <a:rPr lang="zh-CN" altLang="en-US" dirty="0">
-                <a:solidFill>
-                  <a:srgbClr val="7B3C9E"/>
-                </a:solidFill>
-                <a:latin typeface="Arial" panose="020B0604020202020204" pitchFamily="34" charset="0"/>
-                <a:cs typeface="Arial" panose="020B0604020202020204" pitchFamily="34" charset="0"/>
-              </a:rPr>
-              <a:t> </a:t>
-            </a:r>
-            <a:r>
-              <a:rPr lang="en-US" altLang="zh-CN" dirty="0">
-                <a:solidFill>
-                  <a:srgbClr val="7B3C9E"/>
-                </a:solidFill>
-                <a:latin typeface="Arial" panose="020B0604020202020204" pitchFamily="34" charset="0"/>
-                <a:cs typeface="Arial" panose="020B0604020202020204" pitchFamily="34" charset="0"/>
-              </a:rPr>
-              <a:t>links</a:t>
-            </a:r>
-            <a:r>
-              <a:rPr lang="zh-CN" altLang="en-US" dirty="0">
-                <a:solidFill>
-                  <a:srgbClr val="7B3C9E"/>
-                </a:solidFill>
-                <a:latin typeface="Arial" panose="020B0604020202020204" pitchFamily="34" charset="0"/>
-                <a:cs typeface="Arial" panose="020B0604020202020204" pitchFamily="34" charset="0"/>
-              </a:rPr>
-              <a:t> </a:t>
-            </a:r>
-            <a:r>
-              <a:rPr lang="en-US" altLang="zh-CN" dirty="0">
-                <a:solidFill>
-                  <a:srgbClr val="7B3C9E"/>
-                </a:solidFill>
-                <a:latin typeface="Arial" panose="020B0604020202020204" pitchFamily="34" charset="0"/>
-                <a:cs typeface="Arial" panose="020B0604020202020204" pitchFamily="34" charset="0"/>
-              </a:rPr>
-              <a:t>(what’s</a:t>
-            </a:r>
-            <a:r>
-              <a:rPr lang="zh-CN" altLang="en-US" dirty="0">
-                <a:solidFill>
-                  <a:srgbClr val="7B3C9E"/>
-                </a:solidFill>
-                <a:latin typeface="Arial" panose="020B0604020202020204" pitchFamily="34" charset="0"/>
-                <a:cs typeface="Arial" panose="020B0604020202020204" pitchFamily="34" charset="0"/>
-              </a:rPr>
-              <a:t> </a:t>
-            </a:r>
-            <a:r>
-              <a:rPr lang="en-US" altLang="zh-CN" dirty="0">
-                <a:solidFill>
-                  <a:srgbClr val="7B3C9E"/>
-                </a:solidFill>
-                <a:latin typeface="Arial" panose="020B0604020202020204" pitchFamily="34" charset="0"/>
-                <a:cs typeface="Arial" panose="020B0604020202020204" pitchFamily="34" charset="0"/>
-              </a:rPr>
-              <a:t>written</a:t>
-            </a:r>
-            <a:r>
-              <a:rPr lang="zh-CN" altLang="en-US" dirty="0">
-                <a:solidFill>
-                  <a:srgbClr val="7B3C9E"/>
-                </a:solidFill>
-                <a:latin typeface="Arial" panose="020B0604020202020204" pitchFamily="34" charset="0"/>
-                <a:cs typeface="Arial" panose="020B0604020202020204" pitchFamily="34" charset="0"/>
-              </a:rPr>
-              <a:t> </a:t>
-            </a:r>
-            <a:r>
-              <a:rPr lang="en-US" altLang="zh-CN" dirty="0">
-                <a:solidFill>
-                  <a:srgbClr val="7B3C9E"/>
-                </a:solidFill>
-                <a:latin typeface="Arial" panose="020B0604020202020204" pitchFamily="34" charset="0"/>
-                <a:cs typeface="Arial" panose="020B0604020202020204" pitchFamily="34" charset="0"/>
-              </a:rPr>
-              <a:t>in</a:t>
-            </a:r>
-            <a:r>
-              <a:rPr lang="zh-CN" altLang="en-US" dirty="0">
-                <a:solidFill>
-                  <a:srgbClr val="7B3C9E"/>
-                </a:solidFill>
-                <a:latin typeface="Arial" panose="020B0604020202020204" pitchFamily="34" charset="0"/>
-                <a:cs typeface="Arial" panose="020B0604020202020204" pitchFamily="34" charset="0"/>
-              </a:rPr>
-              <a:t> </a:t>
-            </a:r>
-            <a:r>
-              <a:rPr lang="en-US" altLang="zh-CN" dirty="0">
-                <a:solidFill>
-                  <a:srgbClr val="7B3C9E"/>
-                </a:solidFill>
-                <a:latin typeface="Arial" panose="020B0604020202020204" pitchFamily="34" charset="0"/>
-                <a:cs typeface="Arial" panose="020B0604020202020204" pitchFamily="34" charset="0"/>
-              </a:rPr>
-              <a:t>install-</a:t>
-            </a:r>
-            <a:r>
-              <a:rPr lang="en-US" altLang="zh-CN" dirty="0" err="1">
-                <a:solidFill>
-                  <a:srgbClr val="7B3C9E"/>
-                </a:solidFill>
-                <a:latin typeface="Arial" panose="020B0604020202020204" pitchFamily="34" charset="0"/>
-                <a:cs typeface="Arial" panose="020B0604020202020204" pitchFamily="34" charset="0"/>
-              </a:rPr>
-              <a:t>zos.md</a:t>
-            </a:r>
-            <a:r>
-              <a:rPr lang="zh-CN" altLang="en-US" dirty="0">
-                <a:solidFill>
-                  <a:srgbClr val="7B3C9E"/>
-                </a:solidFill>
-                <a:latin typeface="Arial" panose="020B0604020202020204" pitchFamily="34" charset="0"/>
-                <a:cs typeface="Arial" panose="020B0604020202020204" pitchFamily="34" charset="0"/>
-              </a:rPr>
-              <a:t> </a:t>
-            </a:r>
-            <a:r>
-              <a:rPr lang="en-US" altLang="zh-CN" dirty="0">
-                <a:solidFill>
-                  <a:srgbClr val="7B3C9E"/>
-                </a:solidFill>
-                <a:latin typeface="Arial" panose="020B0604020202020204" pitchFamily="34" charset="0"/>
-                <a:cs typeface="Arial" panose="020B0604020202020204" pitchFamily="34" charset="0"/>
-              </a:rPr>
-              <a:t>now)</a:t>
-            </a:r>
-            <a:r>
-              <a:rPr lang="zh-CN" altLang="en-US" dirty="0">
-                <a:solidFill>
-                  <a:srgbClr val="7B3C9E"/>
-                </a:solidFill>
-                <a:latin typeface="Arial" panose="020B0604020202020204" pitchFamily="34" charset="0"/>
-                <a:cs typeface="Arial" panose="020B0604020202020204" pitchFamily="34" charset="0"/>
-              </a:rPr>
-              <a:t> </a:t>
-            </a:r>
-            <a:endParaRPr lang="en-US" dirty="0">
-              <a:solidFill>
-                <a:srgbClr val="7B3C9E"/>
-              </a:solidFill>
-            </a:endParaRPr>
-          </a:p>
-        </p:txBody>
-      </p:sp>
-      <p:sp>
-        <p:nvSpPr>
-          <p:cNvPr id="10" name="TextBox 9">
-            <a:extLst>
-              <a:ext uri="{FF2B5EF4-FFF2-40B4-BE49-F238E27FC236}">
-                <a16:creationId xmlns:a16="http://schemas.microsoft.com/office/drawing/2014/main" id="{F84EABC6-D78C-1C41-A794-4153F46C6636}"/>
-              </a:ext>
-            </a:extLst>
-          </p:cNvPr>
-          <p:cNvSpPr txBox="1"/>
-          <p:nvPr/>
-        </p:nvSpPr>
-        <p:spPr>
-          <a:xfrm>
-            <a:off x="1135105" y="866807"/>
-            <a:ext cx="5561532" cy="369332"/>
-          </a:xfrm>
-          <a:prstGeom prst="rect">
-            <a:avLst/>
-          </a:prstGeom>
-          <a:noFill/>
-        </p:spPr>
-        <p:txBody>
-          <a:bodyPr wrap="square" rtlCol="0">
-            <a:spAutoFit/>
-          </a:bodyPr>
-          <a:lstStyle/>
-          <a:p>
-            <a:r>
-              <a:rPr lang="en-US" altLang="zh-CN" dirty="0">
-                <a:latin typeface="Arial" panose="020B0604020202020204" pitchFamily="34" charset="0"/>
-                <a:cs typeface="Arial" panose="020B0604020202020204" pitchFamily="34" charset="0"/>
-              </a:rPr>
-              <a:t>Planning the installation of Zowe z/OS components</a:t>
-            </a:r>
-          </a:p>
-        </p:txBody>
-      </p:sp>
-      <p:sp>
-        <p:nvSpPr>
-          <p:cNvPr id="11" name="TextBox 10">
-            <a:extLst>
-              <a:ext uri="{FF2B5EF4-FFF2-40B4-BE49-F238E27FC236}">
-                <a16:creationId xmlns:a16="http://schemas.microsoft.com/office/drawing/2014/main" id="{D4AD6F15-B1FA-2B4B-AD1B-1EFA632F345A}"/>
-              </a:ext>
-            </a:extLst>
-          </p:cNvPr>
-          <p:cNvSpPr txBox="1"/>
-          <p:nvPr/>
-        </p:nvSpPr>
-        <p:spPr>
-          <a:xfrm>
-            <a:off x="1135105" y="1202847"/>
-            <a:ext cx="5561532" cy="369332"/>
-          </a:xfrm>
-          <a:prstGeom prst="rect">
-            <a:avLst/>
-          </a:prstGeom>
-          <a:noFill/>
-        </p:spPr>
-        <p:txBody>
-          <a:bodyPr wrap="square" rtlCol="0">
-            <a:spAutoFit/>
-          </a:bodyPr>
-          <a:lstStyle/>
-          <a:p>
-            <a:r>
-              <a:rPr lang="en-US" altLang="zh-CN" dirty="0">
-                <a:latin typeface="Arial" panose="020B0604020202020204" pitchFamily="34" charset="0"/>
-                <a:cs typeface="Arial" panose="020B0604020202020204" pitchFamily="34" charset="0"/>
-              </a:rPr>
-              <a:t>System</a:t>
-            </a:r>
-            <a:r>
-              <a:rPr lang="zh-CN" altLang="en-US" dirty="0">
-                <a:latin typeface="Arial" panose="020B0604020202020204" pitchFamily="34" charset="0"/>
-                <a:cs typeface="Arial" panose="020B0604020202020204" pitchFamily="34" charset="0"/>
-              </a:rPr>
-              <a:t> </a:t>
-            </a:r>
-            <a:r>
-              <a:rPr lang="en-US" altLang="zh-CN" dirty="0">
-                <a:latin typeface="Arial" panose="020B0604020202020204" pitchFamily="34" charset="0"/>
-                <a:cs typeface="Arial" panose="020B0604020202020204" pitchFamily="34" charset="0"/>
-              </a:rPr>
-              <a:t>requirements</a:t>
-            </a:r>
-          </a:p>
-        </p:txBody>
-      </p:sp>
-      <p:sp>
-        <p:nvSpPr>
-          <p:cNvPr id="12" name="Rectangle 11">
-            <a:extLst>
-              <a:ext uri="{FF2B5EF4-FFF2-40B4-BE49-F238E27FC236}">
-                <a16:creationId xmlns:a16="http://schemas.microsoft.com/office/drawing/2014/main" id="{06AE5574-4831-A640-85B6-79E6F4B339CC}"/>
-              </a:ext>
-            </a:extLst>
-          </p:cNvPr>
-          <p:cNvSpPr/>
-          <p:nvPr/>
-        </p:nvSpPr>
-        <p:spPr>
-          <a:xfrm>
-            <a:off x="1135105" y="1562718"/>
-            <a:ext cx="2839239" cy="369332"/>
-          </a:xfrm>
-          <a:prstGeom prst="rect">
-            <a:avLst/>
-          </a:prstGeom>
-          <a:noFill/>
-        </p:spPr>
-        <p:txBody>
-          <a:bodyPr wrap="square" rtlCol="0">
-            <a:spAutoFit/>
-          </a:bodyPr>
-          <a:lstStyle/>
-          <a:p>
-            <a:r>
-              <a:rPr lang="en-US" dirty="0">
-                <a:latin typeface="Arial" panose="020B0604020202020204" pitchFamily="34" charset="0"/>
-                <a:cs typeface="Arial" panose="020B0604020202020204" pitchFamily="34" charset="0"/>
-              </a:rPr>
-              <a:t>Installing Node.js on z/OS</a:t>
-            </a:r>
-          </a:p>
-        </p:txBody>
-      </p:sp>
-      <p:sp>
-        <p:nvSpPr>
-          <p:cNvPr id="13" name="Rectangle 12">
-            <a:extLst>
-              <a:ext uri="{FF2B5EF4-FFF2-40B4-BE49-F238E27FC236}">
-                <a16:creationId xmlns:a16="http://schemas.microsoft.com/office/drawing/2014/main" id="{0BE9C9F0-750A-A044-9614-195DD045F8B1}"/>
-              </a:ext>
-            </a:extLst>
-          </p:cNvPr>
-          <p:cNvSpPr/>
-          <p:nvPr/>
-        </p:nvSpPr>
-        <p:spPr>
-          <a:xfrm>
-            <a:off x="1135105" y="1948479"/>
-            <a:ext cx="2839239" cy="369332"/>
-          </a:xfrm>
-          <a:prstGeom prst="rect">
-            <a:avLst/>
-          </a:prstGeom>
-          <a:noFill/>
-        </p:spPr>
-        <p:txBody>
-          <a:bodyPr wrap="square" rtlCol="0">
-            <a:spAutoFit/>
-          </a:bodyPr>
-          <a:lstStyle/>
-          <a:p>
-            <a:r>
-              <a:rPr lang="en-US" altLang="zh-CN" dirty="0">
-                <a:latin typeface="Arial" panose="020B0604020202020204" pitchFamily="34" charset="0"/>
-                <a:cs typeface="Arial" panose="020B0604020202020204" pitchFamily="34" charset="0"/>
-              </a:rPr>
-              <a:t>Configuring</a:t>
-            </a:r>
-            <a:r>
-              <a:rPr lang="zh-CN" altLang="en-US" dirty="0">
-                <a:latin typeface="Arial" panose="020B0604020202020204" pitchFamily="34" charset="0"/>
-                <a:cs typeface="Arial" panose="020B0604020202020204" pitchFamily="34" charset="0"/>
-              </a:rPr>
-              <a:t> </a:t>
-            </a:r>
-            <a:r>
-              <a:rPr lang="en-US" altLang="zh-CN" dirty="0">
-                <a:latin typeface="Arial" panose="020B0604020202020204" pitchFamily="34" charset="0"/>
-                <a:cs typeface="Arial" panose="020B0604020202020204" pitchFamily="34" charset="0"/>
-              </a:rPr>
-              <a:t>z/OSMF</a:t>
-            </a:r>
-            <a:endParaRPr lang="en-US" dirty="0">
-              <a:latin typeface="Arial" panose="020B0604020202020204" pitchFamily="34" charset="0"/>
-              <a:cs typeface="Arial" panose="020B0604020202020204" pitchFamily="34" charset="0"/>
-            </a:endParaRPr>
-          </a:p>
-        </p:txBody>
-      </p:sp>
-      <p:sp>
-        <p:nvSpPr>
-          <p:cNvPr id="14" name="Rectangle 13">
-            <a:extLst>
-              <a:ext uri="{FF2B5EF4-FFF2-40B4-BE49-F238E27FC236}">
-                <a16:creationId xmlns:a16="http://schemas.microsoft.com/office/drawing/2014/main" id="{26403212-37FD-A640-A62D-326762D642E3}"/>
-              </a:ext>
-            </a:extLst>
-          </p:cNvPr>
-          <p:cNvSpPr/>
-          <p:nvPr/>
-        </p:nvSpPr>
-        <p:spPr>
-          <a:xfrm>
-            <a:off x="1125924" y="2333681"/>
-            <a:ext cx="5776900" cy="369332"/>
-          </a:xfrm>
-          <a:prstGeom prst="rect">
-            <a:avLst/>
-          </a:prstGeom>
-          <a:noFill/>
-        </p:spPr>
-        <p:txBody>
-          <a:bodyPr wrap="square" rtlCol="0">
-            <a:spAutoFit/>
-          </a:bodyPr>
-          <a:lstStyle/>
-          <a:p>
-            <a:r>
-              <a:rPr lang="en-US" altLang="zh-CN" dirty="0">
-                <a:latin typeface="Arial" panose="020B0604020202020204" pitchFamily="34" charset="0"/>
-                <a:cs typeface="Arial" panose="020B0604020202020204" pitchFamily="34" charset="0"/>
-              </a:rPr>
-              <a:t>Configuring</a:t>
-            </a:r>
-            <a:r>
-              <a:rPr lang="zh-CN" altLang="en-US" dirty="0">
-                <a:latin typeface="Arial" panose="020B0604020202020204" pitchFamily="34" charset="0"/>
-                <a:cs typeface="Arial" panose="020B0604020202020204" pitchFamily="34" charset="0"/>
-              </a:rPr>
-              <a:t> </a:t>
-            </a:r>
-            <a:r>
-              <a:rPr lang="en-US" altLang="zh-CN" dirty="0">
-                <a:latin typeface="Arial" panose="020B0604020202020204" pitchFamily="34" charset="0"/>
-                <a:cs typeface="Arial" panose="020B0604020202020204" pitchFamily="34" charset="0"/>
-              </a:rPr>
-              <a:t>z/OSMF</a:t>
-            </a:r>
-            <a:r>
-              <a:rPr lang="zh-CN" altLang="en-US" dirty="0">
-                <a:latin typeface="Arial" panose="020B0604020202020204" pitchFamily="34" charset="0"/>
-                <a:cs typeface="Arial" panose="020B0604020202020204" pitchFamily="34" charset="0"/>
-              </a:rPr>
-              <a:t> </a:t>
-            </a:r>
-            <a:r>
-              <a:rPr lang="en-US" altLang="zh-CN" dirty="0">
-                <a:latin typeface="Arial" panose="020B0604020202020204" pitchFamily="34" charset="0"/>
-                <a:cs typeface="Arial" panose="020B0604020202020204" pitchFamily="34" charset="0"/>
-              </a:rPr>
-              <a:t>Lite</a:t>
-            </a:r>
-            <a:r>
-              <a:rPr lang="zh-CN" altLang="en-US" dirty="0">
-                <a:latin typeface="Arial" panose="020B0604020202020204" pitchFamily="34" charset="0"/>
-                <a:cs typeface="Arial" panose="020B0604020202020204" pitchFamily="34" charset="0"/>
-              </a:rPr>
-              <a:t> </a:t>
-            </a:r>
-            <a:r>
-              <a:rPr lang="en-US" altLang="zh-CN" dirty="0">
-                <a:latin typeface="Arial" panose="020B0604020202020204" pitchFamily="34" charset="0"/>
-                <a:cs typeface="Arial" panose="020B0604020202020204" pitchFamily="34" charset="0"/>
-              </a:rPr>
-              <a:t>(for</a:t>
-            </a:r>
-            <a:r>
-              <a:rPr lang="zh-CN" altLang="en-US" dirty="0">
-                <a:latin typeface="Arial" panose="020B0604020202020204" pitchFamily="34" charset="0"/>
-                <a:cs typeface="Arial" panose="020B0604020202020204" pitchFamily="34" charset="0"/>
-              </a:rPr>
-              <a:t> </a:t>
-            </a:r>
-            <a:r>
-              <a:rPr lang="en-US" altLang="zh-CN" dirty="0">
-                <a:latin typeface="Arial" panose="020B0604020202020204" pitchFamily="34" charset="0"/>
-                <a:cs typeface="Arial" panose="020B0604020202020204" pitchFamily="34" charset="0"/>
-              </a:rPr>
-              <a:t>non-production</a:t>
-            </a:r>
-            <a:r>
-              <a:rPr lang="zh-CN" altLang="en-US" dirty="0">
-                <a:latin typeface="Arial" panose="020B0604020202020204" pitchFamily="34" charset="0"/>
-                <a:cs typeface="Arial" panose="020B0604020202020204" pitchFamily="34" charset="0"/>
-              </a:rPr>
-              <a:t> </a:t>
-            </a:r>
-            <a:r>
-              <a:rPr lang="en-US" altLang="zh-CN" dirty="0">
-                <a:latin typeface="Arial" panose="020B0604020202020204" pitchFamily="34" charset="0"/>
-                <a:cs typeface="Arial" panose="020B0604020202020204" pitchFamily="34" charset="0"/>
-              </a:rPr>
-              <a:t>use)</a:t>
-            </a:r>
-            <a:r>
-              <a:rPr lang="zh-CN" altLang="en-US" dirty="0">
-                <a:latin typeface="Arial" panose="020B0604020202020204" pitchFamily="34" charset="0"/>
-                <a:cs typeface="Arial" panose="020B0604020202020204" pitchFamily="34" charset="0"/>
-              </a:rPr>
-              <a:t> </a:t>
-            </a:r>
-            <a:endParaRPr lang="en-US" dirty="0">
-              <a:latin typeface="Arial" panose="020B0604020202020204" pitchFamily="34" charset="0"/>
-              <a:cs typeface="Arial" panose="020B0604020202020204" pitchFamily="34" charset="0"/>
-            </a:endParaRPr>
-          </a:p>
-        </p:txBody>
-      </p:sp>
-      <p:sp>
-        <p:nvSpPr>
-          <p:cNvPr id="16" name="TextBox 15">
-            <a:extLst>
-              <a:ext uri="{FF2B5EF4-FFF2-40B4-BE49-F238E27FC236}">
-                <a16:creationId xmlns:a16="http://schemas.microsoft.com/office/drawing/2014/main" id="{93A87A3A-D82D-824B-A030-D7DCCB37CB54}"/>
-              </a:ext>
-            </a:extLst>
-          </p:cNvPr>
-          <p:cNvSpPr txBox="1"/>
-          <p:nvPr/>
-        </p:nvSpPr>
-        <p:spPr>
-          <a:xfrm>
-            <a:off x="1135104" y="4673467"/>
-            <a:ext cx="5988428" cy="369332"/>
-          </a:xfrm>
-          <a:prstGeom prst="rect">
-            <a:avLst/>
-          </a:prstGeom>
-          <a:noFill/>
-        </p:spPr>
-        <p:txBody>
-          <a:bodyPr wrap="square" rtlCol="0">
-            <a:spAutoFit/>
-          </a:bodyPr>
-          <a:lstStyle/>
-          <a:p>
-            <a:r>
-              <a:rPr lang="en-US" altLang="zh-CN" dirty="0">
-                <a:latin typeface="Arial" panose="020B0604020202020204" pitchFamily="34" charset="0"/>
-                <a:cs typeface="Arial" panose="020B0604020202020204" pitchFamily="34" charset="0"/>
-              </a:rPr>
-              <a:t>Installing Zowe runtime from the</a:t>
-            </a:r>
-            <a:r>
-              <a:rPr lang="zh-CN" altLang="en-US" dirty="0">
-                <a:latin typeface="Arial" panose="020B0604020202020204" pitchFamily="34" charset="0"/>
-                <a:cs typeface="Arial" panose="020B0604020202020204" pitchFamily="34" charset="0"/>
-              </a:rPr>
-              <a:t> </a:t>
-            </a:r>
-            <a:r>
-              <a:rPr lang="en-US" altLang="zh-CN" dirty="0">
-                <a:latin typeface="Arial" panose="020B0604020202020204" pitchFamily="34" charset="0"/>
-                <a:cs typeface="Arial" panose="020B0604020202020204" pitchFamily="34" charset="0"/>
-              </a:rPr>
-              <a:t>SMP/E</a:t>
-            </a:r>
-            <a:r>
-              <a:rPr lang="zh-CN" altLang="en-US" dirty="0">
-                <a:latin typeface="Arial" panose="020B0604020202020204" pitchFamily="34" charset="0"/>
-                <a:cs typeface="Arial" panose="020B0604020202020204" pitchFamily="34" charset="0"/>
-              </a:rPr>
-              <a:t> </a:t>
-            </a:r>
-            <a:r>
-              <a:rPr lang="en-US" altLang="zh-CN" dirty="0">
-                <a:latin typeface="Arial" panose="020B0604020202020204" pitchFamily="34" charset="0"/>
-                <a:cs typeface="Arial" panose="020B0604020202020204" pitchFamily="34" charset="0"/>
-              </a:rPr>
-              <a:t>build</a:t>
-            </a:r>
-          </a:p>
-        </p:txBody>
-      </p:sp>
-      <p:sp>
-        <p:nvSpPr>
-          <p:cNvPr id="17" name="TextBox 16">
-            <a:extLst>
-              <a:ext uri="{FF2B5EF4-FFF2-40B4-BE49-F238E27FC236}">
-                <a16:creationId xmlns:a16="http://schemas.microsoft.com/office/drawing/2014/main" id="{3E15ADE6-ECEF-8844-AE2F-14461ECE2466}"/>
-              </a:ext>
-            </a:extLst>
-          </p:cNvPr>
-          <p:cNvSpPr txBox="1"/>
-          <p:nvPr/>
-        </p:nvSpPr>
-        <p:spPr>
-          <a:xfrm>
-            <a:off x="1125924" y="5116547"/>
-            <a:ext cx="4192078" cy="369332"/>
-          </a:xfrm>
-          <a:prstGeom prst="rect">
-            <a:avLst/>
-          </a:prstGeom>
-          <a:noFill/>
-        </p:spPr>
-        <p:txBody>
-          <a:bodyPr wrap="square" rtlCol="0">
-            <a:spAutoFit/>
-          </a:bodyPr>
-          <a:lstStyle/>
-          <a:p>
-            <a:r>
-              <a:rPr lang="en-US" altLang="zh-CN" dirty="0">
-                <a:latin typeface="Arial" panose="020B0604020202020204" pitchFamily="34" charset="0"/>
-                <a:cs typeface="Arial" panose="020B0604020202020204" pitchFamily="34" charset="0"/>
-              </a:rPr>
-              <a:t>Configuring a z/OS system for Zowe</a:t>
-            </a:r>
-          </a:p>
-        </p:txBody>
-      </p:sp>
-      <p:sp>
-        <p:nvSpPr>
-          <p:cNvPr id="18" name="TextBox 17">
-            <a:extLst>
-              <a:ext uri="{FF2B5EF4-FFF2-40B4-BE49-F238E27FC236}">
-                <a16:creationId xmlns:a16="http://schemas.microsoft.com/office/drawing/2014/main" id="{9451269B-CD17-AD48-B1DF-640AE60483CB}"/>
-              </a:ext>
-            </a:extLst>
-          </p:cNvPr>
-          <p:cNvSpPr txBox="1"/>
-          <p:nvPr/>
-        </p:nvSpPr>
-        <p:spPr>
-          <a:xfrm>
-            <a:off x="1147477" y="5611645"/>
-            <a:ext cx="5755345" cy="369332"/>
-          </a:xfrm>
-          <a:prstGeom prst="rect">
-            <a:avLst/>
-          </a:prstGeom>
-          <a:noFill/>
-        </p:spPr>
-        <p:txBody>
-          <a:bodyPr wrap="square" rtlCol="0">
-            <a:spAutoFit/>
-          </a:bodyPr>
-          <a:lstStyle/>
-          <a:p>
-            <a:r>
-              <a:rPr lang="en-US" altLang="zh-CN" dirty="0">
-                <a:latin typeface="Arial" panose="020B0604020202020204" pitchFamily="34" charset="0"/>
-                <a:cs typeface="Arial" panose="020B0604020202020204" pitchFamily="34" charset="0"/>
-              </a:rPr>
-              <a:t>Configuring the</a:t>
-            </a:r>
-            <a:r>
-              <a:rPr lang="zh-CN" altLang="en-US" dirty="0">
-                <a:latin typeface="Arial" panose="020B0604020202020204" pitchFamily="34" charset="0"/>
-                <a:cs typeface="Arial" panose="020B0604020202020204" pitchFamily="34" charset="0"/>
-              </a:rPr>
-              <a:t> </a:t>
-            </a:r>
-            <a:r>
-              <a:rPr lang="en-US" altLang="zh-CN" dirty="0">
-                <a:latin typeface="Arial" panose="020B0604020202020204" pitchFamily="34" charset="0"/>
-                <a:cs typeface="Arial" panose="020B0604020202020204" pitchFamily="34" charset="0"/>
-              </a:rPr>
-              <a:t>Zowe</a:t>
-            </a:r>
-            <a:r>
-              <a:rPr lang="zh-CN" altLang="en-US" dirty="0">
-                <a:latin typeface="Arial" panose="020B0604020202020204" pitchFamily="34" charset="0"/>
-                <a:cs typeface="Arial" panose="020B0604020202020204" pitchFamily="34" charset="0"/>
-              </a:rPr>
-              <a:t> </a:t>
-            </a:r>
-            <a:r>
-              <a:rPr lang="en-US" altLang="zh-CN" dirty="0">
-                <a:latin typeface="Arial" panose="020B0604020202020204" pitchFamily="34" charset="0"/>
-                <a:cs typeface="Arial" panose="020B0604020202020204" pitchFamily="34" charset="0"/>
-              </a:rPr>
-              <a:t>instance</a:t>
-            </a:r>
-            <a:r>
-              <a:rPr lang="zh-CN" altLang="en-US" dirty="0">
-                <a:latin typeface="Arial" panose="020B0604020202020204" pitchFamily="34" charset="0"/>
-                <a:cs typeface="Arial" panose="020B0604020202020204" pitchFamily="34" charset="0"/>
-              </a:rPr>
-              <a:t> </a:t>
-            </a:r>
-            <a:r>
-              <a:rPr lang="en-US" altLang="zh-CN" dirty="0">
-                <a:latin typeface="Arial" panose="020B0604020202020204" pitchFamily="34" charset="0"/>
-                <a:cs typeface="Arial" panose="020B0604020202020204" pitchFamily="34" charset="0"/>
-              </a:rPr>
-              <a:t>directory</a:t>
-            </a:r>
-          </a:p>
-        </p:txBody>
-      </p:sp>
-      <p:sp>
-        <p:nvSpPr>
-          <p:cNvPr id="19" name="TextBox 18">
-            <a:extLst>
-              <a:ext uri="{FF2B5EF4-FFF2-40B4-BE49-F238E27FC236}">
-                <a16:creationId xmlns:a16="http://schemas.microsoft.com/office/drawing/2014/main" id="{616C8E3C-C719-5045-ABB3-75C2DB3D596F}"/>
-              </a:ext>
-            </a:extLst>
-          </p:cNvPr>
-          <p:cNvSpPr txBox="1"/>
-          <p:nvPr/>
-        </p:nvSpPr>
-        <p:spPr>
-          <a:xfrm>
-            <a:off x="1165407" y="6129147"/>
-            <a:ext cx="4192078" cy="369332"/>
-          </a:xfrm>
-          <a:prstGeom prst="rect">
-            <a:avLst/>
-          </a:prstGeom>
-          <a:noFill/>
-        </p:spPr>
-        <p:txBody>
-          <a:bodyPr wrap="square" rtlCol="0">
-            <a:spAutoFit/>
-          </a:bodyPr>
-          <a:lstStyle/>
-          <a:p>
-            <a:r>
-              <a:rPr lang="en-US" altLang="zh-CN" dirty="0">
-                <a:latin typeface="Arial" panose="020B0604020202020204" pitchFamily="34" charset="0"/>
-                <a:cs typeface="Arial" panose="020B0604020202020204" pitchFamily="34" charset="0"/>
-              </a:rPr>
-              <a:t>Configuring the</a:t>
-            </a:r>
-            <a:r>
-              <a:rPr lang="zh-CN" altLang="en-US" dirty="0">
-                <a:latin typeface="Arial" panose="020B0604020202020204" pitchFamily="34" charset="0"/>
-                <a:cs typeface="Arial" panose="020B0604020202020204" pitchFamily="34" charset="0"/>
-              </a:rPr>
-              <a:t> </a:t>
-            </a:r>
-            <a:r>
-              <a:rPr lang="en-US" altLang="zh-CN" dirty="0">
-                <a:latin typeface="Arial" panose="020B0604020202020204" pitchFamily="34" charset="0"/>
-                <a:cs typeface="Arial" panose="020B0604020202020204" pitchFamily="34" charset="0"/>
-              </a:rPr>
-              <a:t>Zowe</a:t>
-            </a:r>
-            <a:r>
-              <a:rPr lang="zh-CN" altLang="en-US" dirty="0">
-                <a:latin typeface="Arial" panose="020B0604020202020204" pitchFamily="34" charset="0"/>
-                <a:cs typeface="Arial" panose="020B0604020202020204" pitchFamily="34" charset="0"/>
-              </a:rPr>
-              <a:t> </a:t>
-            </a:r>
-            <a:r>
-              <a:rPr lang="en-US" altLang="zh-CN" dirty="0">
-                <a:latin typeface="Arial" panose="020B0604020202020204" pitchFamily="34" charset="0"/>
-                <a:cs typeface="Arial" panose="020B0604020202020204" pitchFamily="34" charset="0"/>
-              </a:rPr>
-              <a:t>certificate</a:t>
-            </a:r>
-            <a:r>
-              <a:rPr lang="zh-CN" altLang="en-US" dirty="0">
-                <a:latin typeface="Arial" panose="020B0604020202020204" pitchFamily="34" charset="0"/>
-                <a:cs typeface="Arial" panose="020B0604020202020204" pitchFamily="34" charset="0"/>
-              </a:rPr>
-              <a:t> </a:t>
-            </a:r>
-            <a:r>
-              <a:rPr lang="en-US" altLang="zh-CN" dirty="0">
-                <a:latin typeface="Arial" panose="020B0604020202020204" pitchFamily="34" charset="0"/>
-                <a:cs typeface="Arial" panose="020B0604020202020204" pitchFamily="34" charset="0"/>
-              </a:rPr>
-              <a:t>store</a:t>
-            </a:r>
-          </a:p>
-        </p:txBody>
-      </p:sp>
-      <p:sp>
-        <p:nvSpPr>
-          <p:cNvPr id="20" name="TextBox 19">
-            <a:extLst>
-              <a:ext uri="{FF2B5EF4-FFF2-40B4-BE49-F238E27FC236}">
-                <a16:creationId xmlns:a16="http://schemas.microsoft.com/office/drawing/2014/main" id="{F0B6E448-C2B2-7643-BF13-32BC1BB14319}"/>
-              </a:ext>
-            </a:extLst>
-          </p:cNvPr>
-          <p:cNvSpPr txBox="1"/>
-          <p:nvPr/>
-        </p:nvSpPr>
-        <p:spPr>
-          <a:xfrm>
-            <a:off x="1165407" y="7070979"/>
-            <a:ext cx="4192078" cy="369332"/>
-          </a:xfrm>
-          <a:prstGeom prst="rect">
-            <a:avLst/>
-          </a:prstGeom>
-          <a:noFill/>
-        </p:spPr>
-        <p:txBody>
-          <a:bodyPr wrap="square" rtlCol="0">
-            <a:spAutoFit/>
-          </a:bodyPr>
-          <a:lstStyle/>
-          <a:p>
-            <a:r>
-              <a:rPr lang="en-US" altLang="zh-CN" dirty="0">
-                <a:latin typeface="Arial" panose="020B0604020202020204" pitchFamily="34" charset="0"/>
-                <a:cs typeface="Arial" panose="020B0604020202020204" pitchFamily="34" charset="0"/>
-              </a:rPr>
-              <a:t>Configuring the</a:t>
-            </a:r>
-            <a:r>
-              <a:rPr lang="zh-CN" altLang="en-US" dirty="0">
-                <a:latin typeface="Arial" panose="020B0604020202020204" pitchFamily="34" charset="0"/>
-                <a:cs typeface="Arial" panose="020B0604020202020204" pitchFamily="34" charset="0"/>
-              </a:rPr>
-              <a:t> </a:t>
-            </a:r>
-            <a:r>
-              <a:rPr lang="en-US" altLang="zh-CN" dirty="0">
-                <a:latin typeface="Arial" panose="020B0604020202020204" pitchFamily="34" charset="0"/>
-                <a:cs typeface="Arial" panose="020B0604020202020204" pitchFamily="34" charset="0"/>
-              </a:rPr>
-              <a:t>Zowe</a:t>
-            </a:r>
-            <a:r>
-              <a:rPr lang="zh-CN" altLang="en-US" dirty="0">
-                <a:latin typeface="Arial" panose="020B0604020202020204" pitchFamily="34" charset="0"/>
-                <a:cs typeface="Arial" panose="020B0604020202020204" pitchFamily="34" charset="0"/>
-              </a:rPr>
-              <a:t> </a:t>
-            </a:r>
-            <a:r>
-              <a:rPr lang="en-US" altLang="zh-CN" dirty="0">
-                <a:latin typeface="Arial" panose="020B0604020202020204" pitchFamily="34" charset="0"/>
-                <a:cs typeface="Arial" panose="020B0604020202020204" pitchFamily="34" charset="0"/>
-              </a:rPr>
-              <a:t>started</a:t>
-            </a:r>
-            <a:r>
-              <a:rPr lang="zh-CN" altLang="en-US" dirty="0">
-                <a:latin typeface="Arial" panose="020B0604020202020204" pitchFamily="34" charset="0"/>
-                <a:cs typeface="Arial" panose="020B0604020202020204" pitchFamily="34" charset="0"/>
-              </a:rPr>
-              <a:t> </a:t>
-            </a:r>
-            <a:r>
-              <a:rPr lang="en-US" altLang="zh-CN" dirty="0">
-                <a:latin typeface="Arial" panose="020B0604020202020204" pitchFamily="34" charset="0"/>
-                <a:cs typeface="Arial" panose="020B0604020202020204" pitchFamily="34" charset="0"/>
-              </a:rPr>
-              <a:t>tasks</a:t>
-            </a:r>
-          </a:p>
-        </p:txBody>
-      </p:sp>
-      <p:sp>
-        <p:nvSpPr>
-          <p:cNvPr id="21" name="TextBox 20">
-            <a:extLst>
-              <a:ext uri="{FF2B5EF4-FFF2-40B4-BE49-F238E27FC236}">
-                <a16:creationId xmlns:a16="http://schemas.microsoft.com/office/drawing/2014/main" id="{10A16A41-7DB9-2940-855E-776087CB18AB}"/>
-              </a:ext>
-            </a:extLst>
-          </p:cNvPr>
-          <p:cNvSpPr txBox="1"/>
-          <p:nvPr/>
-        </p:nvSpPr>
-        <p:spPr>
-          <a:xfrm>
-            <a:off x="1147477" y="6603514"/>
-            <a:ext cx="5199534" cy="369332"/>
-          </a:xfrm>
-          <a:prstGeom prst="rect">
-            <a:avLst/>
-          </a:prstGeom>
-          <a:noFill/>
-        </p:spPr>
-        <p:txBody>
-          <a:bodyPr wrap="square" rtlCol="0">
-            <a:spAutoFit/>
-          </a:bodyPr>
-          <a:lstStyle/>
-          <a:p>
-            <a:r>
-              <a:rPr lang="en-US" altLang="zh-CN" dirty="0">
-                <a:latin typeface="Arial" panose="020B0604020202020204" pitchFamily="34" charset="0"/>
-                <a:cs typeface="Arial" panose="020B0604020202020204" pitchFamily="34" charset="0"/>
-              </a:rPr>
-              <a:t>Configuring the</a:t>
-            </a:r>
-            <a:r>
-              <a:rPr lang="zh-CN" altLang="en-US" dirty="0">
-                <a:latin typeface="Arial" panose="020B0604020202020204" pitchFamily="34" charset="0"/>
-                <a:cs typeface="Arial" panose="020B0604020202020204" pitchFamily="34" charset="0"/>
-              </a:rPr>
-              <a:t> </a:t>
-            </a:r>
-            <a:r>
-              <a:rPr lang="en-US" altLang="zh-CN" dirty="0">
-                <a:latin typeface="Arial" panose="020B0604020202020204" pitchFamily="34" charset="0"/>
-                <a:cs typeface="Arial" panose="020B0604020202020204" pitchFamily="34" charset="0"/>
-              </a:rPr>
-              <a:t>Zowe</a:t>
-            </a:r>
-            <a:r>
-              <a:rPr lang="zh-CN" altLang="en-US" dirty="0">
-                <a:latin typeface="Arial" panose="020B0604020202020204" pitchFamily="34" charset="0"/>
-                <a:cs typeface="Arial" panose="020B0604020202020204" pitchFamily="34" charset="0"/>
-              </a:rPr>
-              <a:t> </a:t>
-            </a:r>
-            <a:r>
-              <a:rPr lang="en-US" altLang="zh-CN" dirty="0">
-                <a:latin typeface="Arial" panose="020B0604020202020204" pitchFamily="34" charset="0"/>
-                <a:cs typeface="Arial" panose="020B0604020202020204" pitchFamily="34" charset="0"/>
-              </a:rPr>
-              <a:t>Cross</a:t>
-            </a:r>
-            <a:r>
-              <a:rPr lang="zh-CN" altLang="en-US" dirty="0">
-                <a:latin typeface="Arial" panose="020B0604020202020204" pitchFamily="34" charset="0"/>
-                <a:cs typeface="Arial" panose="020B0604020202020204" pitchFamily="34" charset="0"/>
-              </a:rPr>
-              <a:t> </a:t>
-            </a:r>
-            <a:r>
-              <a:rPr lang="en-US" altLang="zh-CN" dirty="0">
-                <a:latin typeface="Arial" panose="020B0604020202020204" pitchFamily="34" charset="0"/>
-                <a:cs typeface="Arial" panose="020B0604020202020204" pitchFamily="34" charset="0"/>
-              </a:rPr>
-              <a:t>Memory</a:t>
-            </a:r>
-            <a:r>
-              <a:rPr lang="zh-CN" altLang="en-US" dirty="0">
-                <a:latin typeface="Arial" panose="020B0604020202020204" pitchFamily="34" charset="0"/>
-                <a:cs typeface="Arial" panose="020B0604020202020204" pitchFamily="34" charset="0"/>
-              </a:rPr>
-              <a:t> </a:t>
-            </a:r>
-            <a:r>
-              <a:rPr lang="en-US" altLang="zh-CN" dirty="0">
-                <a:latin typeface="Arial" panose="020B0604020202020204" pitchFamily="34" charset="0"/>
-                <a:cs typeface="Arial" panose="020B0604020202020204" pitchFamily="34" charset="0"/>
-              </a:rPr>
-              <a:t>Server</a:t>
-            </a:r>
-          </a:p>
-        </p:txBody>
-      </p:sp>
-      <p:sp>
-        <p:nvSpPr>
-          <p:cNvPr id="22" name="TextBox 21">
-            <a:extLst>
-              <a:ext uri="{FF2B5EF4-FFF2-40B4-BE49-F238E27FC236}">
-                <a16:creationId xmlns:a16="http://schemas.microsoft.com/office/drawing/2014/main" id="{10212617-F3B3-234A-A507-568FCBE89CAE}"/>
-              </a:ext>
-            </a:extLst>
-          </p:cNvPr>
-          <p:cNvSpPr txBox="1"/>
-          <p:nvPr/>
-        </p:nvSpPr>
-        <p:spPr>
-          <a:xfrm>
-            <a:off x="1165407" y="7563970"/>
-            <a:ext cx="5199534" cy="369332"/>
-          </a:xfrm>
-          <a:prstGeom prst="rect">
-            <a:avLst/>
-          </a:prstGeom>
-          <a:noFill/>
-        </p:spPr>
-        <p:txBody>
-          <a:bodyPr wrap="square" rtlCol="0">
-            <a:spAutoFit/>
-          </a:bodyPr>
-          <a:lstStyle/>
-          <a:p>
-            <a:r>
-              <a:rPr lang="en-US" altLang="zh-CN" dirty="0">
-                <a:latin typeface="Arial" panose="020B0604020202020204" pitchFamily="34" charset="0"/>
-                <a:cs typeface="Arial" panose="020B0604020202020204" pitchFamily="34" charset="0"/>
-              </a:rPr>
-              <a:t>Verifying</a:t>
-            </a:r>
-            <a:r>
-              <a:rPr lang="zh-CN" altLang="en-US" dirty="0">
-                <a:latin typeface="Arial" panose="020B0604020202020204" pitchFamily="34" charset="0"/>
-                <a:cs typeface="Arial" panose="020B0604020202020204" pitchFamily="34" charset="0"/>
-              </a:rPr>
-              <a:t> </a:t>
-            </a:r>
-            <a:r>
-              <a:rPr lang="en-US" altLang="zh-CN" dirty="0">
-                <a:latin typeface="Arial" panose="020B0604020202020204" pitchFamily="34" charset="0"/>
-                <a:cs typeface="Arial" panose="020B0604020202020204" pitchFamily="34" charset="0"/>
-              </a:rPr>
-              <a:t>Zowe</a:t>
-            </a:r>
-            <a:r>
-              <a:rPr lang="zh-CN" altLang="en-US" dirty="0">
-                <a:latin typeface="Arial" panose="020B0604020202020204" pitchFamily="34" charset="0"/>
-                <a:cs typeface="Arial" panose="020B0604020202020204" pitchFamily="34" charset="0"/>
-              </a:rPr>
-              <a:t> </a:t>
-            </a:r>
-            <a:r>
-              <a:rPr lang="en-US" altLang="zh-CN" dirty="0">
-                <a:latin typeface="Arial" panose="020B0604020202020204" pitchFamily="34" charset="0"/>
-                <a:cs typeface="Arial" panose="020B0604020202020204" pitchFamily="34" charset="0"/>
-              </a:rPr>
-              <a:t>installation</a:t>
-            </a:r>
-            <a:r>
-              <a:rPr lang="zh-CN" altLang="en-US" dirty="0">
-                <a:latin typeface="Arial" panose="020B0604020202020204" pitchFamily="34" charset="0"/>
-                <a:cs typeface="Arial" panose="020B0604020202020204" pitchFamily="34" charset="0"/>
-              </a:rPr>
-              <a:t> </a:t>
-            </a:r>
-            <a:r>
-              <a:rPr lang="en-US" altLang="zh-CN" dirty="0">
-                <a:latin typeface="Arial" panose="020B0604020202020204" pitchFamily="34" charset="0"/>
-                <a:cs typeface="Arial" panose="020B0604020202020204" pitchFamily="34" charset="0"/>
-              </a:rPr>
-              <a:t>on</a:t>
-            </a:r>
-            <a:r>
-              <a:rPr lang="zh-CN" altLang="en-US" dirty="0">
-                <a:latin typeface="Arial" panose="020B0604020202020204" pitchFamily="34" charset="0"/>
-                <a:cs typeface="Arial" panose="020B0604020202020204" pitchFamily="34" charset="0"/>
-              </a:rPr>
-              <a:t> </a:t>
-            </a:r>
-            <a:r>
-              <a:rPr lang="en-US" altLang="zh-CN" dirty="0">
-                <a:latin typeface="Arial" panose="020B0604020202020204" pitchFamily="34" charset="0"/>
-                <a:cs typeface="Arial" panose="020B0604020202020204" pitchFamily="34" charset="0"/>
-              </a:rPr>
-              <a:t>z/OS</a:t>
-            </a:r>
-          </a:p>
-        </p:txBody>
-      </p:sp>
-      <p:sp>
-        <p:nvSpPr>
-          <p:cNvPr id="23" name="TextBox 22">
-            <a:extLst>
-              <a:ext uri="{FF2B5EF4-FFF2-40B4-BE49-F238E27FC236}">
-                <a16:creationId xmlns:a16="http://schemas.microsoft.com/office/drawing/2014/main" id="{7F880A55-42D0-4642-8520-319EF156D828}"/>
-              </a:ext>
-            </a:extLst>
-          </p:cNvPr>
-          <p:cNvSpPr txBox="1"/>
-          <p:nvPr/>
-        </p:nvSpPr>
-        <p:spPr>
-          <a:xfrm>
-            <a:off x="1165407" y="9329928"/>
-            <a:ext cx="5767719" cy="369332"/>
-          </a:xfrm>
-          <a:prstGeom prst="rect">
-            <a:avLst/>
-          </a:prstGeom>
-          <a:noFill/>
-        </p:spPr>
-        <p:txBody>
-          <a:bodyPr wrap="square" rtlCol="0">
-            <a:spAutoFit/>
-          </a:bodyPr>
-          <a:lstStyle/>
-          <a:p>
-            <a:r>
-              <a:rPr lang="en-US" altLang="zh-CN" dirty="0">
-                <a:latin typeface="Arial" panose="020B0604020202020204" pitchFamily="34" charset="0"/>
-                <a:cs typeface="Arial" panose="020B0604020202020204" pitchFamily="34" charset="0"/>
-              </a:rPr>
-              <a:t>Installing Zowe CLI</a:t>
-            </a:r>
-          </a:p>
-        </p:txBody>
-      </p:sp>
-      <p:sp>
-        <p:nvSpPr>
-          <p:cNvPr id="24" name="TextBox 23">
-            <a:extLst>
-              <a:ext uri="{FF2B5EF4-FFF2-40B4-BE49-F238E27FC236}">
-                <a16:creationId xmlns:a16="http://schemas.microsoft.com/office/drawing/2014/main" id="{FF1F15CD-1357-964E-92B5-3FE438E17BB2}"/>
-              </a:ext>
-            </a:extLst>
-          </p:cNvPr>
-          <p:cNvSpPr txBox="1"/>
-          <p:nvPr/>
-        </p:nvSpPr>
-        <p:spPr>
-          <a:xfrm>
-            <a:off x="1165407" y="9732604"/>
-            <a:ext cx="5767719" cy="369332"/>
-          </a:xfrm>
-          <a:prstGeom prst="rect">
-            <a:avLst/>
-          </a:prstGeom>
-          <a:noFill/>
-        </p:spPr>
-        <p:txBody>
-          <a:bodyPr wrap="square" rtlCol="0">
-            <a:spAutoFit/>
-          </a:bodyPr>
-          <a:lstStyle/>
-          <a:p>
-            <a:r>
-              <a:rPr lang="en-US" altLang="zh-CN" dirty="0">
-                <a:latin typeface="Arial" panose="020B0604020202020204" pitchFamily="34" charset="0"/>
-                <a:cs typeface="Arial" panose="020B0604020202020204" pitchFamily="34" charset="0"/>
-              </a:rPr>
-              <a:t>Updating Zowe CLI</a:t>
-            </a:r>
-          </a:p>
-        </p:txBody>
-      </p:sp>
-      <p:sp>
-        <p:nvSpPr>
-          <p:cNvPr id="25" name="TextBox 24">
-            <a:extLst>
-              <a:ext uri="{FF2B5EF4-FFF2-40B4-BE49-F238E27FC236}">
-                <a16:creationId xmlns:a16="http://schemas.microsoft.com/office/drawing/2014/main" id="{A0342F5E-2476-2944-B960-E87A1DE0615B}"/>
-              </a:ext>
-            </a:extLst>
-          </p:cNvPr>
-          <p:cNvSpPr txBox="1"/>
-          <p:nvPr/>
-        </p:nvSpPr>
-        <p:spPr>
-          <a:xfrm>
-            <a:off x="1173742" y="8061873"/>
-            <a:ext cx="5767719" cy="369332"/>
-          </a:xfrm>
-          <a:prstGeom prst="rect">
-            <a:avLst/>
-          </a:prstGeom>
-          <a:noFill/>
-        </p:spPr>
-        <p:txBody>
-          <a:bodyPr wrap="square" rtlCol="0">
-            <a:spAutoFit/>
-          </a:bodyPr>
-          <a:lstStyle/>
-          <a:p>
-            <a:r>
-              <a:rPr lang="en-US" altLang="zh-CN" dirty="0">
-                <a:latin typeface="Arial" panose="020B0604020202020204" pitchFamily="34" charset="0"/>
-                <a:cs typeface="Arial" panose="020B0604020202020204" pitchFamily="34" charset="0"/>
-              </a:rPr>
-              <a:t>Uninstalling</a:t>
-            </a:r>
-            <a:r>
-              <a:rPr lang="zh-CN" altLang="en-US" dirty="0">
-                <a:latin typeface="Arial" panose="020B0604020202020204" pitchFamily="34" charset="0"/>
-                <a:cs typeface="Arial" panose="020B0604020202020204" pitchFamily="34" charset="0"/>
-              </a:rPr>
-              <a:t> </a:t>
-            </a:r>
-            <a:r>
-              <a:rPr lang="en-US" altLang="zh-CN" dirty="0">
-                <a:latin typeface="Arial" panose="020B0604020202020204" pitchFamily="34" charset="0"/>
-                <a:cs typeface="Arial" panose="020B0604020202020204" pitchFamily="34" charset="0"/>
-              </a:rPr>
-              <a:t>Zowe z/OS</a:t>
-            </a:r>
-            <a:r>
-              <a:rPr lang="zh-CN" altLang="en-US" dirty="0">
-                <a:latin typeface="Arial" panose="020B0604020202020204" pitchFamily="34" charset="0"/>
-                <a:cs typeface="Arial" panose="020B0604020202020204" pitchFamily="34" charset="0"/>
-              </a:rPr>
-              <a:t> </a:t>
-            </a:r>
-            <a:r>
-              <a:rPr lang="en-US" altLang="zh-CN" dirty="0">
-                <a:latin typeface="Arial" panose="020B0604020202020204" pitchFamily="34" charset="0"/>
-                <a:cs typeface="Arial" panose="020B0604020202020204" pitchFamily="34" charset="0"/>
-              </a:rPr>
-              <a:t>components</a:t>
-            </a:r>
-          </a:p>
-        </p:txBody>
-      </p:sp>
-      <p:sp>
-        <p:nvSpPr>
-          <p:cNvPr id="26" name="TextBox 25">
-            <a:extLst>
-              <a:ext uri="{FF2B5EF4-FFF2-40B4-BE49-F238E27FC236}">
-                <a16:creationId xmlns:a16="http://schemas.microsoft.com/office/drawing/2014/main" id="{3E00A7CB-E9BC-EB44-BF78-77E2307A63C2}"/>
-              </a:ext>
-            </a:extLst>
-          </p:cNvPr>
-          <p:cNvSpPr txBox="1"/>
-          <p:nvPr/>
-        </p:nvSpPr>
-        <p:spPr>
-          <a:xfrm>
-            <a:off x="1165407" y="10131803"/>
-            <a:ext cx="5767719" cy="369332"/>
-          </a:xfrm>
-          <a:prstGeom prst="rect">
-            <a:avLst/>
-          </a:prstGeom>
-          <a:noFill/>
-        </p:spPr>
-        <p:txBody>
-          <a:bodyPr wrap="square" rtlCol="0">
-            <a:spAutoFit/>
-          </a:bodyPr>
-          <a:lstStyle/>
-          <a:p>
-            <a:r>
-              <a:rPr lang="en-US" altLang="zh-CN" dirty="0">
-                <a:latin typeface="Arial" panose="020B0604020202020204" pitchFamily="34" charset="0"/>
-                <a:cs typeface="Arial" panose="020B0604020202020204" pitchFamily="34" charset="0"/>
-              </a:rPr>
-              <a:t>Uninstalling</a:t>
-            </a:r>
-            <a:r>
-              <a:rPr lang="zh-CN" altLang="en-US" dirty="0">
-                <a:latin typeface="Arial" panose="020B0604020202020204" pitchFamily="34" charset="0"/>
-                <a:cs typeface="Arial" panose="020B0604020202020204" pitchFamily="34" charset="0"/>
-              </a:rPr>
-              <a:t> </a:t>
-            </a:r>
-            <a:r>
-              <a:rPr lang="en-US" altLang="zh-CN" dirty="0">
-                <a:latin typeface="Arial" panose="020B0604020202020204" pitchFamily="34" charset="0"/>
-                <a:cs typeface="Arial" panose="020B0604020202020204" pitchFamily="34" charset="0"/>
-              </a:rPr>
-              <a:t>Zowe CLI</a:t>
-            </a:r>
-          </a:p>
-        </p:txBody>
-      </p:sp>
-      <p:pic>
-        <p:nvPicPr>
-          <p:cNvPr id="27" name="Picture 26">
-            <a:extLst>
-              <a:ext uri="{FF2B5EF4-FFF2-40B4-BE49-F238E27FC236}">
-                <a16:creationId xmlns:a16="http://schemas.microsoft.com/office/drawing/2014/main" id="{B9D80DAA-CF65-A04B-BA7D-E26845FFF542}"/>
-              </a:ext>
-            </a:extLst>
-          </p:cNvPr>
-          <p:cNvPicPr>
-            <a:picLocks noChangeAspect="1"/>
-          </p:cNvPicPr>
-          <p:nvPr/>
-        </p:nvPicPr>
-        <p:blipFill>
-          <a:blip r:embed="rId2"/>
-          <a:stretch>
-            <a:fillRect/>
-          </a:stretch>
-        </p:blipFill>
-        <p:spPr>
-          <a:xfrm>
-            <a:off x="6473825" y="5740281"/>
-            <a:ext cx="3606800" cy="7493000"/>
-          </a:xfrm>
-          <a:prstGeom prst="rect">
-            <a:avLst/>
-          </a:prstGeom>
-          <a:solidFill>
-            <a:srgbClr val="FFFFFF">
-              <a:shade val="85000"/>
-            </a:srgbClr>
-          </a:solidFill>
-          <a:ln w="88900" cap="sq">
-            <a:solidFill>
-              <a:srgbClr val="FFFFFF"/>
-            </a:solidFill>
-            <a:miter lim="800000"/>
-          </a:ln>
-          <a:effectLst>
-            <a:outerShdw blurRad="55000" dist="18000" dir="5400000" algn="tl" rotWithShape="0">
-              <a:srgbClr val="000000">
-                <a:alpha val="40000"/>
-              </a:srgbClr>
-            </a:outerShdw>
-          </a:effectLst>
-          <a:scene3d>
-            <a:camera prst="orthographicFront"/>
-            <a:lightRig rig="twoPt" dir="t">
-              <a:rot lat="0" lon="0" rev="7200000"/>
-            </a:lightRig>
-          </a:scene3d>
-          <a:sp3d>
-            <a:bevelT w="25400" h="19050"/>
-            <a:contourClr>
-              <a:srgbClr val="FFFFFF"/>
-            </a:contourClr>
-          </a:sp3d>
-        </p:spPr>
-      </p:pic>
-      <p:sp>
-        <p:nvSpPr>
-          <p:cNvPr id="28" name="Rectangle 27">
-            <a:extLst>
-              <a:ext uri="{FF2B5EF4-FFF2-40B4-BE49-F238E27FC236}">
-                <a16:creationId xmlns:a16="http://schemas.microsoft.com/office/drawing/2014/main" id="{FC4FD5CD-AFB8-D041-804D-A75F1825FB68}"/>
-              </a:ext>
-            </a:extLst>
-          </p:cNvPr>
-          <p:cNvSpPr/>
-          <p:nvPr/>
-        </p:nvSpPr>
-        <p:spPr>
-          <a:xfrm>
-            <a:off x="7513528" y="5301213"/>
-            <a:ext cx="2839239" cy="369332"/>
-          </a:xfrm>
-          <a:prstGeom prst="rect">
-            <a:avLst/>
-          </a:prstGeom>
-          <a:noFill/>
-        </p:spPr>
-        <p:txBody>
-          <a:bodyPr wrap="square" rtlCol="0">
-            <a:spAutoFit/>
-          </a:bodyPr>
-          <a:lstStyle/>
-          <a:p>
-            <a:r>
-              <a:rPr lang="en-US" altLang="zh-CN" b="1" dirty="0">
-                <a:latin typeface="Arial" panose="020B0604020202020204" pitchFamily="34" charset="0"/>
-                <a:cs typeface="Arial" panose="020B0604020202020204" pitchFamily="34" charset="0"/>
-              </a:rPr>
-              <a:t>OLD</a:t>
-            </a:r>
-            <a:r>
-              <a:rPr lang="zh-CN" altLang="en-US" b="1" dirty="0">
-                <a:latin typeface="Arial" panose="020B0604020202020204" pitchFamily="34" charset="0"/>
-                <a:cs typeface="Arial" panose="020B0604020202020204" pitchFamily="34" charset="0"/>
-              </a:rPr>
-              <a:t> </a:t>
-            </a:r>
-            <a:r>
-              <a:rPr lang="en-US" altLang="zh-CN" b="1" dirty="0">
-                <a:latin typeface="Arial" panose="020B0604020202020204" pitchFamily="34" charset="0"/>
-                <a:cs typeface="Arial" panose="020B0604020202020204" pitchFamily="34" charset="0"/>
-              </a:rPr>
-              <a:t>TOC</a:t>
-            </a:r>
-            <a:endParaRPr lang="en-US" b="1" dirty="0">
-              <a:latin typeface="Arial" panose="020B0604020202020204" pitchFamily="34" charset="0"/>
-              <a:cs typeface="Arial" panose="020B0604020202020204" pitchFamily="34" charset="0"/>
-            </a:endParaRPr>
-          </a:p>
-        </p:txBody>
-      </p:sp>
-      <p:sp>
-        <p:nvSpPr>
-          <p:cNvPr id="30" name="Rectangle 29">
-            <a:extLst>
-              <a:ext uri="{FF2B5EF4-FFF2-40B4-BE49-F238E27FC236}">
-                <a16:creationId xmlns:a16="http://schemas.microsoft.com/office/drawing/2014/main" id="{8EA2D732-260B-E940-B00D-4B61838E858A}"/>
-              </a:ext>
-            </a:extLst>
-          </p:cNvPr>
-          <p:cNvSpPr/>
-          <p:nvPr/>
-        </p:nvSpPr>
-        <p:spPr>
-          <a:xfrm>
-            <a:off x="1125924" y="5116547"/>
-            <a:ext cx="4916288" cy="2447423"/>
-          </a:xfrm>
-          <a:prstGeom prst="rect">
-            <a:avLst/>
-          </a:prstGeom>
-          <a:noFill/>
-          <a:ln>
-            <a:solidFill>
-              <a:schemeClr val="accent2"/>
-            </a:solidFill>
-          </a:ln>
-        </p:spPr>
-        <p:style>
-          <a:lnRef idx="2">
-            <a:schemeClr val="accent1">
-              <a:shade val="50000"/>
-            </a:schemeClr>
-          </a:lnRef>
-          <a:fillRef idx="1">
-            <a:schemeClr val="accent1"/>
-          </a:fillRef>
-          <a:effectRef idx="0">
-            <a:schemeClr val="accent1"/>
-          </a:effectRef>
-          <a:fontRef idx="minor">
-            <a:schemeClr val="lt1"/>
-          </a:fontRef>
-        </p:style>
-        <p:txBody>
-          <a:bodyPr rtlCol="0" anchor="ctr"/>
-          <a:lstStyle/>
-          <a:p>
-            <a:pPr algn="ctr"/>
-            <a:endParaRPr lang="en-US"/>
-          </a:p>
-        </p:txBody>
-      </p:sp>
-    </p:spTree>
-    <p:extLst>
-      <p:ext uri="{BB962C8B-B14F-4D97-AF65-F5344CB8AC3E}">
-        <p14:creationId xmlns:p14="http://schemas.microsoft.com/office/powerpoint/2010/main" val="1237773614"/>
       </p:ext>
     </p:extLst>
   </p:cSld>

</xml_diff>

<commit_message>
Fix the dataset name
Signed-off-by: nannanli <nannanli@cn.ibm.com>
</commit_message>
<xml_diff>
--- a/docs/images/common/zowe-zos-install-diagram.pptx
+++ b/docs/images/common/zowe-zos-install-diagram.pptx
@@ -243,7 +243,7 @@
           <a:p>
             <a:fld id="{C4A90A56-7146-D847-92E1-256101539D4D}" type="datetimeFigureOut">
               <a:rPr lang="en-US" smtClean="0"/>
-              <a:t>2/6/20</a:t>
+              <a:t>2/25/20</a:t>
             </a:fld>
             <a:endParaRPr lang="en-US"/>
           </a:p>
@@ -413,7 +413,7 @@
           <a:p>
             <a:fld id="{C4A90A56-7146-D847-92E1-256101539D4D}" type="datetimeFigureOut">
               <a:rPr lang="en-US" smtClean="0"/>
-              <a:t>2/6/20</a:t>
+              <a:t>2/25/20</a:t>
             </a:fld>
             <a:endParaRPr lang="en-US"/>
           </a:p>
@@ -593,7 +593,7 @@
           <a:p>
             <a:fld id="{C4A90A56-7146-D847-92E1-256101539D4D}" type="datetimeFigureOut">
               <a:rPr lang="en-US" smtClean="0"/>
-              <a:t>2/6/20</a:t>
+              <a:t>2/25/20</a:t>
             </a:fld>
             <a:endParaRPr lang="en-US"/>
           </a:p>
@@ -763,7 +763,7 @@
           <a:p>
             <a:fld id="{C4A90A56-7146-D847-92E1-256101539D4D}" type="datetimeFigureOut">
               <a:rPr lang="en-US" smtClean="0"/>
-              <a:t>2/6/20</a:t>
+              <a:t>2/25/20</a:t>
             </a:fld>
             <a:endParaRPr lang="en-US"/>
           </a:p>
@@ -1007,7 +1007,7 @@
           <a:p>
             <a:fld id="{C4A90A56-7146-D847-92E1-256101539D4D}" type="datetimeFigureOut">
               <a:rPr lang="en-US" smtClean="0"/>
-              <a:t>2/6/20</a:t>
+              <a:t>2/25/20</a:t>
             </a:fld>
             <a:endParaRPr lang="en-US"/>
           </a:p>
@@ -1239,7 +1239,7 @@
           <a:p>
             <a:fld id="{C4A90A56-7146-D847-92E1-256101539D4D}" type="datetimeFigureOut">
               <a:rPr lang="en-US" smtClean="0"/>
-              <a:t>2/6/20</a:t>
+              <a:t>2/25/20</a:t>
             </a:fld>
             <a:endParaRPr lang="en-US"/>
           </a:p>
@@ -1606,7 +1606,7 @@
           <a:p>
             <a:fld id="{C4A90A56-7146-D847-92E1-256101539D4D}" type="datetimeFigureOut">
               <a:rPr lang="en-US" smtClean="0"/>
-              <a:t>2/6/20</a:t>
+              <a:t>2/25/20</a:t>
             </a:fld>
             <a:endParaRPr lang="en-US"/>
           </a:p>
@@ -1724,7 +1724,7 @@
           <a:p>
             <a:fld id="{C4A90A56-7146-D847-92E1-256101539D4D}" type="datetimeFigureOut">
               <a:rPr lang="en-US" smtClean="0"/>
-              <a:t>2/6/20</a:t>
+              <a:t>2/25/20</a:t>
             </a:fld>
             <a:endParaRPr lang="en-US"/>
           </a:p>
@@ -1819,7 +1819,7 @@
           <a:p>
             <a:fld id="{C4A90A56-7146-D847-92E1-256101539D4D}" type="datetimeFigureOut">
               <a:rPr lang="en-US" smtClean="0"/>
-              <a:t>2/6/20</a:t>
+              <a:t>2/25/20</a:t>
             </a:fld>
             <a:endParaRPr lang="en-US"/>
           </a:p>
@@ -2096,7 +2096,7 @@
           <a:p>
             <a:fld id="{C4A90A56-7146-D847-92E1-256101539D4D}" type="datetimeFigureOut">
               <a:rPr lang="en-US" smtClean="0"/>
-              <a:t>2/6/20</a:t>
+              <a:t>2/25/20</a:t>
             </a:fld>
             <a:endParaRPr lang="en-US"/>
           </a:p>
@@ -2353,7 +2353,7 @@
           <a:p>
             <a:fld id="{C4A90A56-7146-D847-92E1-256101539D4D}" type="datetimeFigureOut">
               <a:rPr lang="en-US" smtClean="0"/>
-              <a:t>2/6/20</a:t>
+              <a:t>2/25/20</a:t>
             </a:fld>
             <a:endParaRPr lang="en-US"/>
           </a:p>
@@ -2566,7 +2566,7 @@
           <a:p>
             <a:fld id="{C4A90A56-7146-D847-92E1-256101539D4D}" type="datetimeFigureOut">
               <a:rPr lang="en-US" smtClean="0"/>
-              <a:t>2/6/20</a:t>
+              <a:t>2/25/20</a:t>
             </a:fld>
             <a:endParaRPr lang="en-US"/>
           </a:p>
@@ -4337,17 +4337,37 @@
                 <a:latin typeface="Arial" panose="020B0604020202020204" pitchFamily="34" charset="0"/>
                 <a:cs typeface="Arial" panose="020B0604020202020204" pitchFamily="34" charset="0"/>
               </a:rPr>
-              <a:t>A PDS SAMPLIB member </a:t>
+              <a:t>A SAMPLIB </a:t>
+            </a:r>
+            <a:r>
+              <a:rPr lang="en-US" altLang="zh-CN" sz="1000" dirty="0">
+                <a:solidFill>
+                  <a:srgbClr val="000000"/>
+                </a:solidFill>
+                <a:latin typeface="Arial" panose="020B0604020202020204" pitchFamily="34" charset="0"/>
+                <a:cs typeface="Arial" panose="020B0604020202020204" pitchFamily="34" charset="0"/>
+              </a:rPr>
+              <a:t>library</a:t>
             </a:r>
             <a:r>
               <a:rPr lang="en-US" sz="1000" dirty="0">
                 <a:solidFill>
+                  <a:srgbClr val="000000"/>
+                </a:solidFill>
+                <a:latin typeface="Arial" panose="020B0604020202020204" pitchFamily="34" charset="0"/>
+                <a:cs typeface="Arial" panose="020B0604020202020204" pitchFamily="34" charset="0"/>
+              </a:rPr>
+              <a:t> </a:t>
+            </a:r>
+            <a:r>
+              <a:rPr lang="en-US" sz="1000" dirty="0">
+                <a:solidFill>
                   <a:srgbClr val="800000"/>
                 </a:solidFill>
                 <a:latin typeface="Arial" panose="020B0604020202020204" pitchFamily="34" charset="0"/>
                 <a:cs typeface="Arial" panose="020B0604020202020204" pitchFamily="34" charset="0"/>
               </a:rPr>
-              <a:t>SZWESAMPE </a:t>
+              <a:t>SZWESAMP </a:t>
             </a:r>
             <a:r>
               <a:rPr lang="en-US" sz="1000" dirty="0">
@@ -4357,8 +4377,45 @@
                 <a:latin typeface="Arial" panose="020B0604020202020204" pitchFamily="34" charset="0"/>
                 <a:cs typeface="Arial" panose="020B0604020202020204" pitchFamily="34" charset="0"/>
               </a:rPr>
-              <a:t>containing example JCL</a:t>
-            </a:r>
+              <a:t>containing </a:t>
+            </a:r>
+            <a:r>
+              <a:rPr lang="en-US" altLang="zh-CN" sz="1000" dirty="0">
+                <a:solidFill>
+                  <a:srgbClr val="000000"/>
+                </a:solidFill>
+                <a:latin typeface="Arial" panose="020B0604020202020204" pitchFamily="34" charset="0"/>
+                <a:cs typeface="Arial" panose="020B0604020202020204" pitchFamily="34" charset="0"/>
+              </a:rPr>
+              <a:t>sample</a:t>
+            </a:r>
+            <a:r>
+              <a:rPr lang="zh-CN" altLang="en-US" sz="1000" dirty="0">
+                <a:solidFill>
+                  <a:srgbClr val="000000"/>
+                </a:solidFill>
+                <a:latin typeface="Arial" panose="020B0604020202020204" pitchFamily="34" charset="0"/>
+                <a:cs typeface="Arial" panose="020B0604020202020204" pitchFamily="34" charset="0"/>
+              </a:rPr>
+              <a:t> </a:t>
+            </a:r>
+            <a:r>
+              <a:rPr lang="en-US" altLang="zh-CN" sz="1000" dirty="0">
+                <a:solidFill>
+                  <a:srgbClr val="000000"/>
+                </a:solidFill>
+                <a:latin typeface="Arial" panose="020B0604020202020204" pitchFamily="34" charset="0"/>
+                <a:cs typeface="Arial" panose="020B0604020202020204" pitchFamily="34" charset="0"/>
+              </a:rPr>
+              <a:t>members</a:t>
+            </a:r>
+            <a:endParaRPr lang="en-US" sz="1000" dirty="0">
+              <a:solidFill>
+                <a:srgbClr val="000000"/>
+              </a:solidFill>
+              <a:latin typeface="Arial" panose="020B0604020202020204" pitchFamily="34" charset="0"/>
+              <a:cs typeface="Arial" panose="020B0604020202020204" pitchFamily="34" charset="0"/>
+            </a:endParaRPr>
           </a:p>
           <a:p>
             <a:pPr marL="171450" indent="-171450">
@@ -4373,7 +4430,7 @@
                 <a:latin typeface="Arial" panose="020B0604020202020204" pitchFamily="34" charset="0"/>
                 <a:cs typeface="Arial" panose="020B0604020202020204" pitchFamily="34" charset="0"/>
               </a:rPr>
-              <a:t>A PDS load library </a:t>
+              <a:t>A load library </a:t>
             </a:r>
             <a:r>
               <a:rPr lang="en-US" sz="1000" dirty="0">

</xml_diff>

<commit_message>
Fix the data set name
Signed-off-by: nannanli <nannanli@cn.ibm.com>

Fixed a bug where SZWESAMPE should be SZWESAMP.
</commit_message>
<xml_diff>
--- a/docs/images/common/zowe-zos-install-diagram.pptx
+++ b/docs/images/common/zowe-zos-install-diagram.pptx
@@ -243,7 +243,7 @@
           <a:p>
             <a:fld id="{C4A90A56-7146-D847-92E1-256101539D4D}" type="datetimeFigureOut">
               <a:rPr lang="en-US" smtClean="0"/>
-              <a:t>2/6/20</a:t>
+              <a:t>2/25/20</a:t>
             </a:fld>
             <a:endParaRPr lang="en-US"/>
           </a:p>
@@ -413,7 +413,7 @@
           <a:p>
             <a:fld id="{C4A90A56-7146-D847-92E1-256101539D4D}" type="datetimeFigureOut">
               <a:rPr lang="en-US" smtClean="0"/>
-              <a:t>2/6/20</a:t>
+              <a:t>2/25/20</a:t>
             </a:fld>
             <a:endParaRPr lang="en-US"/>
           </a:p>
@@ -593,7 +593,7 @@
           <a:p>
             <a:fld id="{C4A90A56-7146-D847-92E1-256101539D4D}" type="datetimeFigureOut">
               <a:rPr lang="en-US" smtClean="0"/>
-              <a:t>2/6/20</a:t>
+              <a:t>2/25/20</a:t>
             </a:fld>
             <a:endParaRPr lang="en-US"/>
           </a:p>
@@ -763,7 +763,7 @@
           <a:p>
             <a:fld id="{C4A90A56-7146-D847-92E1-256101539D4D}" type="datetimeFigureOut">
               <a:rPr lang="en-US" smtClean="0"/>
-              <a:t>2/6/20</a:t>
+              <a:t>2/25/20</a:t>
             </a:fld>
             <a:endParaRPr lang="en-US"/>
           </a:p>
@@ -1007,7 +1007,7 @@
           <a:p>
             <a:fld id="{C4A90A56-7146-D847-92E1-256101539D4D}" type="datetimeFigureOut">
               <a:rPr lang="en-US" smtClean="0"/>
-              <a:t>2/6/20</a:t>
+              <a:t>2/25/20</a:t>
             </a:fld>
             <a:endParaRPr lang="en-US"/>
           </a:p>
@@ -1239,7 +1239,7 @@
           <a:p>
             <a:fld id="{C4A90A56-7146-D847-92E1-256101539D4D}" type="datetimeFigureOut">
               <a:rPr lang="en-US" smtClean="0"/>
-              <a:t>2/6/20</a:t>
+              <a:t>2/25/20</a:t>
             </a:fld>
             <a:endParaRPr lang="en-US"/>
           </a:p>
@@ -1606,7 +1606,7 @@
           <a:p>
             <a:fld id="{C4A90A56-7146-D847-92E1-256101539D4D}" type="datetimeFigureOut">
               <a:rPr lang="en-US" smtClean="0"/>
-              <a:t>2/6/20</a:t>
+              <a:t>2/25/20</a:t>
             </a:fld>
             <a:endParaRPr lang="en-US"/>
           </a:p>
@@ -1724,7 +1724,7 @@
           <a:p>
             <a:fld id="{C4A90A56-7146-D847-92E1-256101539D4D}" type="datetimeFigureOut">
               <a:rPr lang="en-US" smtClean="0"/>
-              <a:t>2/6/20</a:t>
+              <a:t>2/25/20</a:t>
             </a:fld>
             <a:endParaRPr lang="en-US"/>
           </a:p>
@@ -1819,7 +1819,7 @@
           <a:p>
             <a:fld id="{C4A90A56-7146-D847-92E1-256101539D4D}" type="datetimeFigureOut">
               <a:rPr lang="en-US" smtClean="0"/>
-              <a:t>2/6/20</a:t>
+              <a:t>2/25/20</a:t>
             </a:fld>
             <a:endParaRPr lang="en-US"/>
           </a:p>
@@ -2096,7 +2096,7 @@
           <a:p>
             <a:fld id="{C4A90A56-7146-D847-92E1-256101539D4D}" type="datetimeFigureOut">
               <a:rPr lang="en-US" smtClean="0"/>
-              <a:t>2/6/20</a:t>
+              <a:t>2/25/20</a:t>
             </a:fld>
             <a:endParaRPr lang="en-US"/>
           </a:p>
@@ -2353,7 +2353,7 @@
           <a:p>
             <a:fld id="{C4A90A56-7146-D847-92E1-256101539D4D}" type="datetimeFigureOut">
               <a:rPr lang="en-US" smtClean="0"/>
-              <a:t>2/6/20</a:t>
+              <a:t>2/25/20</a:t>
             </a:fld>
             <a:endParaRPr lang="en-US"/>
           </a:p>
@@ -2566,7 +2566,7 @@
           <a:p>
             <a:fld id="{C4A90A56-7146-D847-92E1-256101539D4D}" type="datetimeFigureOut">
               <a:rPr lang="en-US" smtClean="0"/>
-              <a:t>2/6/20</a:t>
+              <a:t>2/25/20</a:t>
             </a:fld>
             <a:endParaRPr lang="en-US"/>
           </a:p>
@@ -4337,17 +4337,37 @@
                 <a:latin typeface="Arial" panose="020B0604020202020204" pitchFamily="34" charset="0"/>
                 <a:cs typeface="Arial" panose="020B0604020202020204" pitchFamily="34" charset="0"/>
               </a:rPr>
-              <a:t>A PDS SAMPLIB member </a:t>
+              <a:t>A SAMPLIB </a:t>
+            </a:r>
+            <a:r>
+              <a:rPr lang="en-US" altLang="zh-CN" sz="1000" dirty="0">
+                <a:solidFill>
+                  <a:srgbClr val="000000"/>
+                </a:solidFill>
+                <a:latin typeface="Arial" panose="020B0604020202020204" pitchFamily="34" charset="0"/>
+                <a:cs typeface="Arial" panose="020B0604020202020204" pitchFamily="34" charset="0"/>
+              </a:rPr>
+              <a:t>library</a:t>
             </a:r>
             <a:r>
               <a:rPr lang="en-US" sz="1000" dirty="0">
                 <a:solidFill>
+                  <a:srgbClr val="000000"/>
+                </a:solidFill>
+                <a:latin typeface="Arial" panose="020B0604020202020204" pitchFamily="34" charset="0"/>
+                <a:cs typeface="Arial" panose="020B0604020202020204" pitchFamily="34" charset="0"/>
+              </a:rPr>
+              <a:t> </a:t>
+            </a:r>
+            <a:r>
+              <a:rPr lang="en-US" sz="1000" dirty="0">
+                <a:solidFill>
                   <a:srgbClr val="800000"/>
                 </a:solidFill>
                 <a:latin typeface="Arial" panose="020B0604020202020204" pitchFamily="34" charset="0"/>
                 <a:cs typeface="Arial" panose="020B0604020202020204" pitchFamily="34" charset="0"/>
               </a:rPr>
-              <a:t>SZWESAMPE </a:t>
+              <a:t>SZWESAMP </a:t>
             </a:r>
             <a:r>
               <a:rPr lang="en-US" sz="1000" dirty="0">
@@ -4357,8 +4377,45 @@
                 <a:latin typeface="Arial" panose="020B0604020202020204" pitchFamily="34" charset="0"/>
                 <a:cs typeface="Arial" panose="020B0604020202020204" pitchFamily="34" charset="0"/>
               </a:rPr>
-              <a:t>containing example JCL</a:t>
-            </a:r>
+              <a:t>containing </a:t>
+            </a:r>
+            <a:r>
+              <a:rPr lang="en-US" altLang="zh-CN" sz="1000" dirty="0">
+                <a:solidFill>
+                  <a:srgbClr val="000000"/>
+                </a:solidFill>
+                <a:latin typeface="Arial" panose="020B0604020202020204" pitchFamily="34" charset="0"/>
+                <a:cs typeface="Arial" panose="020B0604020202020204" pitchFamily="34" charset="0"/>
+              </a:rPr>
+              <a:t>sample</a:t>
+            </a:r>
+            <a:r>
+              <a:rPr lang="zh-CN" altLang="en-US" sz="1000" dirty="0">
+                <a:solidFill>
+                  <a:srgbClr val="000000"/>
+                </a:solidFill>
+                <a:latin typeface="Arial" panose="020B0604020202020204" pitchFamily="34" charset="0"/>
+                <a:cs typeface="Arial" panose="020B0604020202020204" pitchFamily="34" charset="0"/>
+              </a:rPr>
+              <a:t> </a:t>
+            </a:r>
+            <a:r>
+              <a:rPr lang="en-US" altLang="zh-CN" sz="1000" dirty="0">
+                <a:solidFill>
+                  <a:srgbClr val="000000"/>
+                </a:solidFill>
+                <a:latin typeface="Arial" panose="020B0604020202020204" pitchFamily="34" charset="0"/>
+                <a:cs typeface="Arial" panose="020B0604020202020204" pitchFamily="34" charset="0"/>
+              </a:rPr>
+              <a:t>members</a:t>
+            </a:r>
+            <a:endParaRPr lang="en-US" sz="1000" dirty="0">
+              <a:solidFill>
+                <a:srgbClr val="000000"/>
+              </a:solidFill>
+              <a:latin typeface="Arial" panose="020B0604020202020204" pitchFamily="34" charset="0"/>
+              <a:cs typeface="Arial" panose="020B0604020202020204" pitchFamily="34" charset="0"/>
+            </a:endParaRPr>
           </a:p>
           <a:p>
             <a:pPr marL="171450" indent="-171450">
@@ -4373,7 +4430,7 @@
                 <a:latin typeface="Arial" panose="020B0604020202020204" pitchFamily="34" charset="0"/>
                 <a:cs typeface="Arial" panose="020B0604020202020204" pitchFamily="34" charset="0"/>
               </a:rPr>
-              <a:t>A PDS load library </a:t>
+              <a:t>A load library </a:t>
             </a:r>
             <a:r>
               <a:rPr lang="en-US" sz="1000" dirty="0">

</xml_diff>

<commit_message>
Fix the data set name (#1048)
Signed-off-by: nannanli <nannanli@cn.ibm.com>

Fixed a bug where SZWESAMPE should be SZWESAMP.
</commit_message>
<xml_diff>
--- a/docs/images/common/zowe-zos-install-diagram.pptx
+++ b/docs/images/common/zowe-zos-install-diagram.pptx
@@ -243,7 +243,7 @@
           <a:p>
             <a:fld id="{C4A90A56-7146-D847-92E1-256101539D4D}" type="datetimeFigureOut">
               <a:rPr lang="en-US" smtClean="0"/>
-              <a:t>2/6/20</a:t>
+              <a:t>2/25/20</a:t>
             </a:fld>
             <a:endParaRPr lang="en-US"/>
           </a:p>
@@ -413,7 +413,7 @@
           <a:p>
             <a:fld id="{C4A90A56-7146-D847-92E1-256101539D4D}" type="datetimeFigureOut">
               <a:rPr lang="en-US" smtClean="0"/>
-              <a:t>2/6/20</a:t>
+              <a:t>2/25/20</a:t>
             </a:fld>
             <a:endParaRPr lang="en-US"/>
           </a:p>
@@ -593,7 +593,7 @@
           <a:p>
             <a:fld id="{C4A90A56-7146-D847-92E1-256101539D4D}" type="datetimeFigureOut">
               <a:rPr lang="en-US" smtClean="0"/>
-              <a:t>2/6/20</a:t>
+              <a:t>2/25/20</a:t>
             </a:fld>
             <a:endParaRPr lang="en-US"/>
           </a:p>
@@ -763,7 +763,7 @@
           <a:p>
             <a:fld id="{C4A90A56-7146-D847-92E1-256101539D4D}" type="datetimeFigureOut">
               <a:rPr lang="en-US" smtClean="0"/>
-              <a:t>2/6/20</a:t>
+              <a:t>2/25/20</a:t>
             </a:fld>
             <a:endParaRPr lang="en-US"/>
           </a:p>
@@ -1007,7 +1007,7 @@
           <a:p>
             <a:fld id="{C4A90A56-7146-D847-92E1-256101539D4D}" type="datetimeFigureOut">
               <a:rPr lang="en-US" smtClean="0"/>
-              <a:t>2/6/20</a:t>
+              <a:t>2/25/20</a:t>
             </a:fld>
             <a:endParaRPr lang="en-US"/>
           </a:p>
@@ -1239,7 +1239,7 @@
           <a:p>
             <a:fld id="{C4A90A56-7146-D847-92E1-256101539D4D}" type="datetimeFigureOut">
               <a:rPr lang="en-US" smtClean="0"/>
-              <a:t>2/6/20</a:t>
+              <a:t>2/25/20</a:t>
             </a:fld>
             <a:endParaRPr lang="en-US"/>
           </a:p>
@@ -1606,7 +1606,7 @@
           <a:p>
             <a:fld id="{C4A90A56-7146-D847-92E1-256101539D4D}" type="datetimeFigureOut">
               <a:rPr lang="en-US" smtClean="0"/>
-              <a:t>2/6/20</a:t>
+              <a:t>2/25/20</a:t>
             </a:fld>
             <a:endParaRPr lang="en-US"/>
           </a:p>
@@ -1724,7 +1724,7 @@
           <a:p>
             <a:fld id="{C4A90A56-7146-D847-92E1-256101539D4D}" type="datetimeFigureOut">
               <a:rPr lang="en-US" smtClean="0"/>
-              <a:t>2/6/20</a:t>
+              <a:t>2/25/20</a:t>
             </a:fld>
             <a:endParaRPr lang="en-US"/>
           </a:p>
@@ -1819,7 +1819,7 @@
           <a:p>
             <a:fld id="{C4A90A56-7146-D847-92E1-256101539D4D}" type="datetimeFigureOut">
               <a:rPr lang="en-US" smtClean="0"/>
-              <a:t>2/6/20</a:t>
+              <a:t>2/25/20</a:t>
             </a:fld>
             <a:endParaRPr lang="en-US"/>
           </a:p>
@@ -2096,7 +2096,7 @@
           <a:p>
             <a:fld id="{C4A90A56-7146-D847-92E1-256101539D4D}" type="datetimeFigureOut">
               <a:rPr lang="en-US" smtClean="0"/>
-              <a:t>2/6/20</a:t>
+              <a:t>2/25/20</a:t>
             </a:fld>
             <a:endParaRPr lang="en-US"/>
           </a:p>
@@ -2353,7 +2353,7 @@
           <a:p>
             <a:fld id="{C4A90A56-7146-D847-92E1-256101539D4D}" type="datetimeFigureOut">
               <a:rPr lang="en-US" smtClean="0"/>
-              <a:t>2/6/20</a:t>
+              <a:t>2/25/20</a:t>
             </a:fld>
             <a:endParaRPr lang="en-US"/>
           </a:p>
@@ -2566,7 +2566,7 @@
           <a:p>
             <a:fld id="{C4A90A56-7146-D847-92E1-256101539D4D}" type="datetimeFigureOut">
               <a:rPr lang="en-US" smtClean="0"/>
-              <a:t>2/6/20</a:t>
+              <a:t>2/25/20</a:t>
             </a:fld>
             <a:endParaRPr lang="en-US"/>
           </a:p>
@@ -4337,17 +4337,37 @@
                 <a:latin typeface="Arial" panose="020B0604020202020204" pitchFamily="34" charset="0"/>
                 <a:cs typeface="Arial" panose="020B0604020202020204" pitchFamily="34" charset="0"/>
               </a:rPr>
-              <a:t>A PDS SAMPLIB member </a:t>
+              <a:t>A SAMPLIB </a:t>
+            </a:r>
+            <a:r>
+              <a:rPr lang="en-US" altLang="zh-CN" sz="1000" dirty="0">
+                <a:solidFill>
+                  <a:srgbClr val="000000"/>
+                </a:solidFill>
+                <a:latin typeface="Arial" panose="020B0604020202020204" pitchFamily="34" charset="0"/>
+                <a:cs typeface="Arial" panose="020B0604020202020204" pitchFamily="34" charset="0"/>
+              </a:rPr>
+              <a:t>library</a:t>
             </a:r>
             <a:r>
               <a:rPr lang="en-US" sz="1000" dirty="0">
                 <a:solidFill>
+                  <a:srgbClr val="000000"/>
+                </a:solidFill>
+                <a:latin typeface="Arial" panose="020B0604020202020204" pitchFamily="34" charset="0"/>
+                <a:cs typeface="Arial" panose="020B0604020202020204" pitchFamily="34" charset="0"/>
+              </a:rPr>
+              <a:t> </a:t>
+            </a:r>
+            <a:r>
+              <a:rPr lang="en-US" sz="1000" dirty="0">
+                <a:solidFill>
                   <a:srgbClr val="800000"/>
                 </a:solidFill>
                 <a:latin typeface="Arial" panose="020B0604020202020204" pitchFamily="34" charset="0"/>
                 <a:cs typeface="Arial" panose="020B0604020202020204" pitchFamily="34" charset="0"/>
               </a:rPr>
-              <a:t>SZWESAMPE </a:t>
+              <a:t>SZWESAMP </a:t>
             </a:r>
             <a:r>
               <a:rPr lang="en-US" sz="1000" dirty="0">
@@ -4357,8 +4377,45 @@
                 <a:latin typeface="Arial" panose="020B0604020202020204" pitchFamily="34" charset="0"/>
                 <a:cs typeface="Arial" panose="020B0604020202020204" pitchFamily="34" charset="0"/>
               </a:rPr>
-              <a:t>containing example JCL</a:t>
-            </a:r>
+              <a:t>containing </a:t>
+            </a:r>
+            <a:r>
+              <a:rPr lang="en-US" altLang="zh-CN" sz="1000" dirty="0">
+                <a:solidFill>
+                  <a:srgbClr val="000000"/>
+                </a:solidFill>
+                <a:latin typeface="Arial" panose="020B0604020202020204" pitchFamily="34" charset="0"/>
+                <a:cs typeface="Arial" panose="020B0604020202020204" pitchFamily="34" charset="0"/>
+              </a:rPr>
+              <a:t>sample</a:t>
+            </a:r>
+            <a:r>
+              <a:rPr lang="zh-CN" altLang="en-US" sz="1000" dirty="0">
+                <a:solidFill>
+                  <a:srgbClr val="000000"/>
+                </a:solidFill>
+                <a:latin typeface="Arial" panose="020B0604020202020204" pitchFamily="34" charset="0"/>
+                <a:cs typeface="Arial" panose="020B0604020202020204" pitchFamily="34" charset="0"/>
+              </a:rPr>
+              <a:t> </a:t>
+            </a:r>
+            <a:r>
+              <a:rPr lang="en-US" altLang="zh-CN" sz="1000" dirty="0">
+                <a:solidFill>
+                  <a:srgbClr val="000000"/>
+                </a:solidFill>
+                <a:latin typeface="Arial" panose="020B0604020202020204" pitchFamily="34" charset="0"/>
+                <a:cs typeface="Arial" panose="020B0604020202020204" pitchFamily="34" charset="0"/>
+              </a:rPr>
+              <a:t>members</a:t>
+            </a:r>
+            <a:endParaRPr lang="en-US" sz="1000" dirty="0">
+              <a:solidFill>
+                <a:srgbClr val="000000"/>
+              </a:solidFill>
+              <a:latin typeface="Arial" panose="020B0604020202020204" pitchFamily="34" charset="0"/>
+              <a:cs typeface="Arial" panose="020B0604020202020204" pitchFamily="34" charset="0"/>
+            </a:endParaRPr>
           </a:p>
           <a:p>
             <a:pPr marL="171450" indent="-171450">
@@ -4373,7 +4430,7 @@
                 <a:latin typeface="Arial" panose="020B0604020202020204" pitchFamily="34" charset="0"/>
                 <a:cs typeface="Arial" panose="020B0604020202020204" pitchFamily="34" charset="0"/>
               </a:rPr>
-              <a:t>A PDS load library </a:t>
+              <a:t>A load library </a:t>
             </a:r>
             <a:r>
               <a:rPr lang="en-US" sz="1000" dirty="0">

</xml_diff>

<commit_message>
Update the flow diagram for z/osmf workflow
Signed-off-by: nannanli <nannanli@cn.ibm.com>
</commit_message>
<xml_diff>
--- a/docs/images/common/zowe-zos-install-diagram.pptx
+++ b/docs/images/common/zowe-zos-install-diagram.pptx
@@ -2,12 +2,12 @@
 <file path=ppt/presentation.xml><?xml version="1.0" encoding="utf-8"?>
 <p:presentation xmlns:a="http://schemas.openxmlformats.org/drawingml/2006/main" xmlns:r="http://schemas.openxmlformats.org/officeDocument/2006/relationships" xmlns:p="http://schemas.openxmlformats.org/presentationml/2006/main" saveSubsetFonts="1" autoCompressPictures="0">
   <p:sldMasterIdLst>
-    <p:sldMasterId id="2147483720" r:id="rId1"/>
+    <p:sldMasterId id="2147483732" r:id="rId1"/>
   </p:sldMasterIdLst>
   <p:sldIdLst>
-    <p:sldId id="256" r:id="rId2"/>
+    <p:sldId id="257" r:id="rId2"/>
   </p:sldIdLst>
-  <p:sldSz cx="10080625" cy="13320713"/>
+  <p:sldSz cx="10080625" cy="14400213"/>
   <p:notesSz cx="6858000" cy="9144000"/>
   <p:defaultTextStyle>
     <a:defPPr>
@@ -141,8 +141,8 @@
         </p:nvSpPr>
         <p:spPr>
           <a:xfrm>
-            <a:off x="756047" y="2180034"/>
-            <a:ext cx="8568531" cy="4637582"/>
+            <a:off x="756047" y="2356703"/>
+            <a:ext cx="8568531" cy="5013407"/>
           </a:xfrm>
         </p:spPr>
         <p:txBody>
@@ -173,8 +173,8 @@
         </p:nvSpPr>
         <p:spPr>
           <a:xfrm>
-            <a:off x="1260078" y="6996459"/>
-            <a:ext cx="7560469" cy="3216088"/>
+            <a:off x="1260078" y="7563446"/>
+            <a:ext cx="7560469" cy="3476717"/>
           </a:xfrm>
         </p:spPr>
         <p:txBody>
@@ -243,7 +243,7 @@
           <a:p>
             <a:fld id="{C4A90A56-7146-D847-92E1-256101539D4D}" type="datetimeFigureOut">
               <a:rPr lang="en-US" smtClean="0"/>
-              <a:t>2/25/20</a:t>
+              <a:t>5/14/20</a:t>
             </a:fld>
             <a:endParaRPr lang="en-US"/>
           </a:p>
@@ -294,7 +294,7 @@
     </p:spTree>
     <p:extLst>
       <p:ext uri="{BB962C8B-B14F-4D97-AF65-F5344CB8AC3E}">
-        <p14:creationId xmlns:p14="http://schemas.microsoft.com/office/powerpoint/2010/main" val="2395352873"/>
+        <p14:creationId xmlns:p14="http://schemas.microsoft.com/office/powerpoint/2010/main" val="3888447981"/>
       </p:ext>
     </p:extLst>
   </p:cSld>
@@ -413,7 +413,7 @@
           <a:p>
             <a:fld id="{C4A90A56-7146-D847-92E1-256101539D4D}" type="datetimeFigureOut">
               <a:rPr lang="en-US" smtClean="0"/>
-              <a:t>2/25/20</a:t>
+              <a:t>5/14/20</a:t>
             </a:fld>
             <a:endParaRPr lang="en-US"/>
           </a:p>
@@ -464,7 +464,7 @@
     </p:spTree>
     <p:extLst>
       <p:ext uri="{BB962C8B-B14F-4D97-AF65-F5344CB8AC3E}">
-        <p14:creationId xmlns:p14="http://schemas.microsoft.com/office/powerpoint/2010/main" val="7122188"/>
+        <p14:creationId xmlns:p14="http://schemas.microsoft.com/office/powerpoint/2010/main" val="1107174681"/>
       </p:ext>
     </p:extLst>
   </p:cSld>
@@ -503,8 +503,8 @@
         </p:nvSpPr>
         <p:spPr>
           <a:xfrm>
-            <a:off x="7213948" y="709204"/>
-            <a:ext cx="2173635" cy="11288689"/>
+            <a:off x="7213948" y="766678"/>
+            <a:ext cx="2173635" cy="12203515"/>
           </a:xfrm>
         </p:spPr>
         <p:txBody>
@@ -531,8 +531,8 @@
         </p:nvSpPr>
         <p:spPr>
           <a:xfrm>
-            <a:off x="693044" y="709204"/>
-            <a:ext cx="6394896" cy="11288689"/>
+            <a:off x="693044" y="766678"/>
+            <a:ext cx="6394896" cy="12203515"/>
           </a:xfrm>
         </p:spPr>
         <p:txBody>
@@ -593,7 +593,7 @@
           <a:p>
             <a:fld id="{C4A90A56-7146-D847-92E1-256101539D4D}" type="datetimeFigureOut">
               <a:rPr lang="en-US" smtClean="0"/>
-              <a:t>2/25/20</a:t>
+              <a:t>5/14/20</a:t>
             </a:fld>
             <a:endParaRPr lang="en-US"/>
           </a:p>
@@ -644,7 +644,7 @@
     </p:spTree>
     <p:extLst>
       <p:ext uri="{BB962C8B-B14F-4D97-AF65-F5344CB8AC3E}">
-        <p14:creationId xmlns:p14="http://schemas.microsoft.com/office/powerpoint/2010/main" val="151982273"/>
+        <p14:creationId xmlns:p14="http://schemas.microsoft.com/office/powerpoint/2010/main" val="4005149872"/>
       </p:ext>
     </p:extLst>
   </p:cSld>
@@ -763,7 +763,7 @@
           <a:p>
             <a:fld id="{C4A90A56-7146-D847-92E1-256101539D4D}" type="datetimeFigureOut">
               <a:rPr lang="en-US" smtClean="0"/>
-              <a:t>2/25/20</a:t>
+              <a:t>5/14/20</a:t>
             </a:fld>
             <a:endParaRPr lang="en-US"/>
           </a:p>
@@ -814,7 +814,7 @@
     </p:spTree>
     <p:extLst>
       <p:ext uri="{BB962C8B-B14F-4D97-AF65-F5344CB8AC3E}">
-        <p14:creationId xmlns:p14="http://schemas.microsoft.com/office/powerpoint/2010/main" val="711893432"/>
+        <p14:creationId xmlns:p14="http://schemas.microsoft.com/office/powerpoint/2010/main" val="858141302"/>
       </p:ext>
     </p:extLst>
   </p:cSld>
@@ -853,8 +853,8 @@
         </p:nvSpPr>
         <p:spPr>
           <a:xfrm>
-            <a:off x="687793" y="3320931"/>
-            <a:ext cx="8694539" cy="5541046"/>
+            <a:off x="687793" y="3590057"/>
+            <a:ext cx="8694539" cy="5990088"/>
           </a:xfrm>
         </p:spPr>
         <p:txBody>
@@ -885,8 +885,8 @@
         </p:nvSpPr>
         <p:spPr>
           <a:xfrm>
-            <a:off x="687793" y="8914398"/>
-            <a:ext cx="8694539" cy="2913905"/>
+            <a:off x="687793" y="9636813"/>
+            <a:ext cx="8694539" cy="3150046"/>
           </a:xfrm>
         </p:spPr>
         <p:txBody>
@@ -1007,7 +1007,7 @@
           <a:p>
             <a:fld id="{C4A90A56-7146-D847-92E1-256101539D4D}" type="datetimeFigureOut">
               <a:rPr lang="en-US" smtClean="0"/>
-              <a:t>2/25/20</a:t>
+              <a:t>5/14/20</a:t>
             </a:fld>
             <a:endParaRPr lang="en-US"/>
           </a:p>
@@ -1058,7 +1058,7 @@
     </p:spTree>
     <p:extLst>
       <p:ext uri="{BB962C8B-B14F-4D97-AF65-F5344CB8AC3E}">
-        <p14:creationId xmlns:p14="http://schemas.microsoft.com/office/powerpoint/2010/main" val="614506776"/>
+        <p14:creationId xmlns:p14="http://schemas.microsoft.com/office/powerpoint/2010/main" val="1151330638"/>
       </p:ext>
     </p:extLst>
   </p:cSld>
@@ -1120,8 +1120,8 @@
         </p:nvSpPr>
         <p:spPr>
           <a:xfrm>
-            <a:off x="693043" y="3546023"/>
-            <a:ext cx="4284266" cy="8451870"/>
+            <a:off x="693043" y="3833390"/>
+            <a:ext cx="4284266" cy="9136803"/>
           </a:xfrm>
         </p:spPr>
         <p:txBody>
@@ -1177,8 +1177,8 @@
         </p:nvSpPr>
         <p:spPr>
           <a:xfrm>
-            <a:off x="5103316" y="3546023"/>
-            <a:ext cx="4284266" cy="8451870"/>
+            <a:off x="5103316" y="3833390"/>
+            <a:ext cx="4284266" cy="9136803"/>
           </a:xfrm>
         </p:spPr>
         <p:txBody>
@@ -1239,7 +1239,7 @@
           <a:p>
             <a:fld id="{C4A90A56-7146-D847-92E1-256101539D4D}" type="datetimeFigureOut">
               <a:rPr lang="en-US" smtClean="0"/>
-              <a:t>2/25/20</a:t>
+              <a:t>5/14/20</a:t>
             </a:fld>
             <a:endParaRPr lang="en-US"/>
           </a:p>
@@ -1290,7 +1290,7 @@
     </p:spTree>
     <p:extLst>
       <p:ext uri="{BB962C8B-B14F-4D97-AF65-F5344CB8AC3E}">
-        <p14:creationId xmlns:p14="http://schemas.microsoft.com/office/powerpoint/2010/main" val="3898524748"/>
+        <p14:creationId xmlns:p14="http://schemas.microsoft.com/office/powerpoint/2010/main" val="2016199847"/>
       </p:ext>
     </p:extLst>
   </p:cSld>
@@ -1329,8 +1329,8 @@
         </p:nvSpPr>
         <p:spPr>
           <a:xfrm>
-            <a:off x="694356" y="709208"/>
-            <a:ext cx="8694539" cy="2574722"/>
+            <a:off x="694356" y="766681"/>
+            <a:ext cx="8694539" cy="2783376"/>
           </a:xfrm>
         </p:spPr>
         <p:txBody>
@@ -1357,8 +1357,8 @@
         </p:nvSpPr>
         <p:spPr>
           <a:xfrm>
-            <a:off x="694357" y="3265426"/>
-            <a:ext cx="4264576" cy="1600335"/>
+            <a:off x="694357" y="3530053"/>
+            <a:ext cx="4264576" cy="1730025"/>
           </a:xfrm>
         </p:spPr>
         <p:txBody>
@@ -1422,8 +1422,8 @@
         </p:nvSpPr>
         <p:spPr>
           <a:xfrm>
-            <a:off x="694357" y="4865760"/>
-            <a:ext cx="4264576" cy="7156801"/>
+            <a:off x="694357" y="5260078"/>
+            <a:ext cx="4264576" cy="7736782"/>
           </a:xfrm>
         </p:spPr>
         <p:txBody>
@@ -1479,8 +1479,8 @@
         </p:nvSpPr>
         <p:spPr>
           <a:xfrm>
-            <a:off x="5103317" y="3265426"/>
-            <a:ext cx="4285579" cy="1600335"/>
+            <a:off x="5103317" y="3530053"/>
+            <a:ext cx="4285579" cy="1730025"/>
           </a:xfrm>
         </p:spPr>
         <p:txBody>
@@ -1544,8 +1544,8 @@
         </p:nvSpPr>
         <p:spPr>
           <a:xfrm>
-            <a:off x="5103317" y="4865760"/>
-            <a:ext cx="4285579" cy="7156801"/>
+            <a:off x="5103317" y="5260078"/>
+            <a:ext cx="4285579" cy="7736782"/>
           </a:xfrm>
         </p:spPr>
         <p:txBody>
@@ -1606,7 +1606,7 @@
           <a:p>
             <a:fld id="{C4A90A56-7146-D847-92E1-256101539D4D}" type="datetimeFigureOut">
               <a:rPr lang="en-US" smtClean="0"/>
-              <a:t>2/25/20</a:t>
+              <a:t>5/14/20</a:t>
             </a:fld>
             <a:endParaRPr lang="en-US"/>
           </a:p>
@@ -1657,7 +1657,7 @@
     </p:spTree>
     <p:extLst>
       <p:ext uri="{BB962C8B-B14F-4D97-AF65-F5344CB8AC3E}">
-        <p14:creationId xmlns:p14="http://schemas.microsoft.com/office/powerpoint/2010/main" val="2989870379"/>
+        <p14:creationId xmlns:p14="http://schemas.microsoft.com/office/powerpoint/2010/main" val="3214748213"/>
       </p:ext>
     </p:extLst>
   </p:cSld>
@@ -1724,7 +1724,7 @@
           <a:p>
             <a:fld id="{C4A90A56-7146-D847-92E1-256101539D4D}" type="datetimeFigureOut">
               <a:rPr lang="en-US" smtClean="0"/>
-              <a:t>2/25/20</a:t>
+              <a:t>5/14/20</a:t>
             </a:fld>
             <a:endParaRPr lang="en-US"/>
           </a:p>
@@ -1775,7 +1775,7 @@
     </p:spTree>
     <p:extLst>
       <p:ext uri="{BB962C8B-B14F-4D97-AF65-F5344CB8AC3E}">
-        <p14:creationId xmlns:p14="http://schemas.microsoft.com/office/powerpoint/2010/main" val="2366837216"/>
+        <p14:creationId xmlns:p14="http://schemas.microsoft.com/office/powerpoint/2010/main" val="1760525366"/>
       </p:ext>
     </p:extLst>
   </p:cSld>
@@ -1819,7 +1819,7 @@
           <a:p>
             <a:fld id="{C4A90A56-7146-D847-92E1-256101539D4D}" type="datetimeFigureOut">
               <a:rPr lang="en-US" smtClean="0"/>
-              <a:t>2/25/20</a:t>
+              <a:t>5/14/20</a:t>
             </a:fld>
             <a:endParaRPr lang="en-US"/>
           </a:p>
@@ -1870,7 +1870,7 @@
     </p:spTree>
     <p:extLst>
       <p:ext uri="{BB962C8B-B14F-4D97-AF65-F5344CB8AC3E}">
-        <p14:creationId xmlns:p14="http://schemas.microsoft.com/office/powerpoint/2010/main" val="3169526979"/>
+        <p14:creationId xmlns:p14="http://schemas.microsoft.com/office/powerpoint/2010/main" val="2667973542"/>
       </p:ext>
     </p:extLst>
   </p:cSld>
@@ -1909,8 +1909,8 @@
         </p:nvSpPr>
         <p:spPr>
           <a:xfrm>
-            <a:off x="694356" y="888048"/>
-            <a:ext cx="3251264" cy="3108166"/>
+            <a:off x="694356" y="960014"/>
+            <a:ext cx="3251264" cy="3360050"/>
           </a:xfrm>
         </p:spPr>
         <p:txBody>
@@ -1941,8 +1941,8 @@
         </p:nvSpPr>
         <p:spPr>
           <a:xfrm>
-            <a:off x="4285579" y="1917939"/>
-            <a:ext cx="5103316" cy="9466340"/>
+            <a:off x="4285579" y="2073367"/>
+            <a:ext cx="5103316" cy="10233485"/>
           </a:xfrm>
         </p:spPr>
         <p:txBody>
@@ -2026,8 +2026,8 @@
         </p:nvSpPr>
         <p:spPr>
           <a:xfrm>
-            <a:off x="694356" y="3996214"/>
-            <a:ext cx="3251264" cy="7403481"/>
+            <a:off x="694356" y="4320064"/>
+            <a:ext cx="3251264" cy="8003453"/>
           </a:xfrm>
         </p:spPr>
         <p:txBody>
@@ -2096,7 +2096,7 @@
           <a:p>
             <a:fld id="{C4A90A56-7146-D847-92E1-256101539D4D}" type="datetimeFigureOut">
               <a:rPr lang="en-US" smtClean="0"/>
-              <a:t>2/25/20</a:t>
+              <a:t>5/14/20</a:t>
             </a:fld>
             <a:endParaRPr lang="en-US"/>
           </a:p>
@@ -2147,7 +2147,7 @@
     </p:spTree>
     <p:extLst>
       <p:ext uri="{BB962C8B-B14F-4D97-AF65-F5344CB8AC3E}">
-        <p14:creationId xmlns:p14="http://schemas.microsoft.com/office/powerpoint/2010/main" val="2306677679"/>
+        <p14:creationId xmlns:p14="http://schemas.microsoft.com/office/powerpoint/2010/main" val="2833463524"/>
       </p:ext>
     </p:extLst>
   </p:cSld>
@@ -2186,8 +2186,8 @@
         </p:nvSpPr>
         <p:spPr>
           <a:xfrm>
-            <a:off x="694356" y="888048"/>
-            <a:ext cx="3251264" cy="3108166"/>
+            <a:off x="694356" y="960014"/>
+            <a:ext cx="3251264" cy="3360050"/>
           </a:xfrm>
         </p:spPr>
         <p:txBody>
@@ -2218,8 +2218,8 @@
         </p:nvSpPr>
         <p:spPr>
           <a:xfrm>
-            <a:off x="4285579" y="1917939"/>
-            <a:ext cx="5103316" cy="9466340"/>
+            <a:off x="4285579" y="2073367"/>
+            <a:ext cx="5103316" cy="10233485"/>
           </a:xfrm>
         </p:spPr>
         <p:txBody>
@@ -2283,8 +2283,8 @@
         </p:nvSpPr>
         <p:spPr>
           <a:xfrm>
-            <a:off x="694356" y="3996214"/>
-            <a:ext cx="3251264" cy="7403481"/>
+            <a:off x="694356" y="4320064"/>
+            <a:ext cx="3251264" cy="8003453"/>
           </a:xfrm>
         </p:spPr>
         <p:txBody>
@@ -2353,7 +2353,7 @@
           <a:p>
             <a:fld id="{C4A90A56-7146-D847-92E1-256101539D4D}" type="datetimeFigureOut">
               <a:rPr lang="en-US" smtClean="0"/>
-              <a:t>2/25/20</a:t>
+              <a:t>5/14/20</a:t>
             </a:fld>
             <a:endParaRPr lang="en-US"/>
           </a:p>
@@ -2404,7 +2404,7 @@
     </p:spTree>
     <p:extLst>
       <p:ext uri="{BB962C8B-B14F-4D97-AF65-F5344CB8AC3E}">
-        <p14:creationId xmlns:p14="http://schemas.microsoft.com/office/powerpoint/2010/main" val="802816067"/>
+        <p14:creationId xmlns:p14="http://schemas.microsoft.com/office/powerpoint/2010/main" val="3440151996"/>
       </p:ext>
     </p:extLst>
   </p:cSld>
@@ -2448,8 +2448,8 @@
         </p:nvSpPr>
         <p:spPr>
           <a:xfrm>
-            <a:off x="693043" y="709208"/>
-            <a:ext cx="8694539" cy="2574722"/>
+            <a:off x="693043" y="766681"/>
+            <a:ext cx="8694539" cy="2783376"/>
           </a:xfrm>
           <a:prstGeom prst="rect">
             <a:avLst/>
@@ -2481,8 +2481,8 @@
         </p:nvSpPr>
         <p:spPr>
           <a:xfrm>
-            <a:off x="693043" y="3546023"/>
-            <a:ext cx="8694539" cy="8451870"/>
+            <a:off x="693043" y="3833390"/>
+            <a:ext cx="8694539" cy="9136803"/>
           </a:xfrm>
           <a:prstGeom prst="rect">
             <a:avLst/>
@@ -2543,8 +2543,8 @@
         </p:nvSpPr>
         <p:spPr>
           <a:xfrm>
-            <a:off x="693043" y="12346330"/>
-            <a:ext cx="2268141" cy="709205"/>
+            <a:off x="693043" y="13346867"/>
+            <a:ext cx="2268141" cy="766678"/>
           </a:xfrm>
           <a:prstGeom prst="rect">
             <a:avLst/>
@@ -2566,7 +2566,7 @@
           <a:p>
             <a:fld id="{C4A90A56-7146-D847-92E1-256101539D4D}" type="datetimeFigureOut">
               <a:rPr lang="en-US" smtClean="0"/>
-              <a:t>2/25/20</a:t>
+              <a:t>5/14/20</a:t>
             </a:fld>
             <a:endParaRPr lang="en-US"/>
           </a:p>
@@ -2584,8 +2584,8 @@
         </p:nvSpPr>
         <p:spPr>
           <a:xfrm>
-            <a:off x="3339207" y="12346330"/>
-            <a:ext cx="3402211" cy="709205"/>
+            <a:off x="3339207" y="13346867"/>
+            <a:ext cx="3402211" cy="766678"/>
           </a:xfrm>
           <a:prstGeom prst="rect">
             <a:avLst/>
@@ -2621,8 +2621,8 @@
         </p:nvSpPr>
         <p:spPr>
           <a:xfrm>
-            <a:off x="7119441" y="12346330"/>
-            <a:ext cx="2268141" cy="709205"/>
+            <a:off x="7119441" y="13346867"/>
+            <a:ext cx="2268141" cy="766678"/>
           </a:xfrm>
           <a:prstGeom prst="rect">
             <a:avLst/>
@@ -2653,23 +2653,23 @@
     </p:spTree>
     <p:extLst>
       <p:ext uri="{BB962C8B-B14F-4D97-AF65-F5344CB8AC3E}">
-        <p14:creationId xmlns:p14="http://schemas.microsoft.com/office/powerpoint/2010/main" val="1135596371"/>
+        <p14:creationId xmlns:p14="http://schemas.microsoft.com/office/powerpoint/2010/main" val="1278784598"/>
       </p:ext>
     </p:extLst>
   </p:cSld>
   <p:clrMap bg1="lt1" tx1="dk1" bg2="lt2" tx2="dk2" accent1="accent1" accent2="accent2" accent3="accent3" accent4="accent4" accent5="accent5" accent6="accent6" hlink="hlink" folHlink="folHlink"/>
   <p:sldLayoutIdLst>
-    <p:sldLayoutId id="2147483721" r:id="rId1"/>
-    <p:sldLayoutId id="2147483722" r:id="rId2"/>
-    <p:sldLayoutId id="2147483723" r:id="rId3"/>
-    <p:sldLayoutId id="2147483724" r:id="rId4"/>
-    <p:sldLayoutId id="2147483725" r:id="rId5"/>
-    <p:sldLayoutId id="2147483726" r:id="rId6"/>
-    <p:sldLayoutId id="2147483727" r:id="rId7"/>
-    <p:sldLayoutId id="2147483728" r:id="rId8"/>
-    <p:sldLayoutId id="2147483729" r:id="rId9"/>
-    <p:sldLayoutId id="2147483730" r:id="rId10"/>
-    <p:sldLayoutId id="2147483731" r:id="rId11"/>
+    <p:sldLayoutId id="2147483733" r:id="rId1"/>
+    <p:sldLayoutId id="2147483734" r:id="rId2"/>
+    <p:sldLayoutId id="2147483735" r:id="rId3"/>
+    <p:sldLayoutId id="2147483736" r:id="rId4"/>
+    <p:sldLayoutId id="2147483737" r:id="rId5"/>
+    <p:sldLayoutId id="2147483738" r:id="rId6"/>
+    <p:sldLayoutId id="2147483739" r:id="rId7"/>
+    <p:sldLayoutId id="2147483740" r:id="rId8"/>
+    <p:sldLayoutId id="2147483741" r:id="rId9"/>
+    <p:sldLayoutId id="2147483742" r:id="rId10"/>
+    <p:sldLayoutId id="2147483743" r:id="rId11"/>
   </p:sldLayoutIdLst>
   <p:txStyles>
     <p:titleStyle>
@@ -2985,112 +2985,14 @@
         </p:nvSpPr>
         <p:spPr>
           <a:xfrm>
-            <a:off x="4164230" y="1577335"/>
+            <a:off x="4303395" y="1689393"/>
             <a:ext cx="180000" cy="180000"/>
           </a:xfrm>
           <a:prstGeom prst="ellipse">
             <a:avLst/>
           </a:prstGeom>
-          <a:noFill/>
-          <a:ln>
-            <a:solidFill>
-              <a:srgbClr val="265E83"/>
-            </a:solidFill>
-          </a:ln>
-        </p:spPr>
-        <p:style>
-          <a:lnRef idx="2">
-            <a:schemeClr val="accent1">
-              <a:shade val="50000"/>
-            </a:schemeClr>
-          </a:lnRef>
-          <a:fillRef idx="1">
-            <a:schemeClr val="accent1"/>
-          </a:fillRef>
-          <a:effectRef idx="0">
-            <a:schemeClr val="accent1"/>
-          </a:effectRef>
-          <a:fontRef idx="minor">
-            <a:schemeClr val="lt1"/>
-          </a:fontRef>
-        </p:style>
-        <p:txBody>
-          <a:bodyPr rot="0" spcFirstLastPara="0" vertOverflow="overflow" horzOverflow="overflow" vert="horz" wrap="square" lIns="91440" tIns="45720" rIns="91440" bIns="45720" numCol="1" spcCol="0" rtlCol="0" fromWordArt="0" anchor="ctr" anchorCtr="0" forceAA="0" compatLnSpc="1">
-            <a:prstTxWarp prst="textNoShape">
-              <a:avLst/>
-            </a:prstTxWarp>
-            <a:noAutofit/>
-          </a:bodyPr>
-          <a:lstStyle/>
-          <a:p>
-            <a:pPr algn="ctr"/>
-            <a:endParaRPr lang="en-US">
-              <a:latin typeface="Arial" panose="020B0604020202020204" pitchFamily="34" charset="0"/>
-              <a:cs typeface="Arial" panose="020B0604020202020204" pitchFamily="34" charset="0"/>
-            </a:endParaRPr>
-          </a:p>
-        </p:txBody>
-      </p:sp>
-      <p:sp>
-        <p:nvSpPr>
-          <p:cNvPr id="7" name="TextBox 6">
-            <a:extLst>
-              <a:ext uri="{FF2B5EF4-FFF2-40B4-BE49-F238E27FC236}">
-                <a16:creationId xmlns:a16="http://schemas.microsoft.com/office/drawing/2014/main" id="{1E65944C-7423-EA4F-9720-8AE0C58E5142}"/>
-              </a:ext>
-            </a:extLst>
-          </p:cNvPr>
-          <p:cNvSpPr txBox="1"/>
-          <p:nvPr/>
-        </p:nvSpPr>
-        <p:spPr>
-          <a:xfrm>
-            <a:off x="4303950" y="1524613"/>
-            <a:ext cx="2219327" cy="307777"/>
-          </a:xfrm>
-          <a:prstGeom prst="rect">
-            <a:avLst/>
-          </a:prstGeom>
-          <a:noFill/>
-        </p:spPr>
-        <p:txBody>
-          <a:bodyPr wrap="square" rtlCol="0">
-            <a:spAutoFit/>
-          </a:bodyPr>
-          <a:lstStyle/>
-          <a:p>
-            <a:r>
-              <a:rPr lang="en-US" sz="1400" dirty="0">
-                <a:latin typeface="Arial" panose="020B0604020202020204" pitchFamily="34" charset="0"/>
-                <a:cs typeface="Arial" panose="020B0604020202020204" pitchFamily="34" charset="0"/>
-              </a:rPr>
-              <a:t>Start the installation</a:t>
-            </a:r>
-          </a:p>
-        </p:txBody>
-      </p:sp>
-      <p:sp>
-        <p:nvSpPr>
-          <p:cNvPr id="8" name="Rectangle 7">
-            <a:extLst>
-              <a:ext uri="{FF2B5EF4-FFF2-40B4-BE49-F238E27FC236}">
-                <a16:creationId xmlns:a16="http://schemas.microsoft.com/office/drawing/2014/main" id="{702ABCD3-0E98-4F43-88A3-5ACCFBACBCBF}"/>
-              </a:ext>
-            </a:extLst>
-          </p:cNvPr>
-          <p:cNvSpPr/>
-          <p:nvPr/>
-        </p:nvSpPr>
-        <p:spPr>
-          <a:xfrm>
-            <a:off x="3324945" y="2085471"/>
-            <a:ext cx="1958008" cy="558971"/>
-          </a:xfrm>
-          <a:prstGeom prst="rect">
-            <a:avLst/>
-          </a:prstGeom>
           <a:solidFill>
-            <a:srgbClr val="265F82"/>
+            <a:schemeClr val="accent1"/>
           </a:solidFill>
           <a:ln>
             <a:noFill/>
@@ -3122,10 +3024,108 @@
           <a:lstStyle/>
           <a:p>
             <a:pPr algn="ctr"/>
+            <a:endParaRPr lang="en-US">
+              <a:latin typeface="Arial" panose="020B0604020202020204" pitchFamily="34" charset="0"/>
+              <a:cs typeface="Arial" panose="020B0604020202020204" pitchFamily="34" charset="0"/>
+            </a:endParaRPr>
+          </a:p>
+        </p:txBody>
+      </p:sp>
+      <p:sp>
+        <p:nvSpPr>
+          <p:cNvPr id="7" name="TextBox 6">
+            <a:extLst>
+              <a:ext uri="{FF2B5EF4-FFF2-40B4-BE49-F238E27FC236}">
+                <a16:creationId xmlns:a16="http://schemas.microsoft.com/office/drawing/2014/main" id="{1E65944C-7423-EA4F-9720-8AE0C58E5142}"/>
+              </a:ext>
+            </a:extLst>
+          </p:cNvPr>
+          <p:cNvSpPr txBox="1"/>
+          <p:nvPr/>
+        </p:nvSpPr>
+        <p:spPr>
+          <a:xfrm>
+            <a:off x="4431541" y="1636672"/>
+            <a:ext cx="2219327" cy="307777"/>
+          </a:xfrm>
+          <a:prstGeom prst="rect">
+            <a:avLst/>
+          </a:prstGeom>
+          <a:noFill/>
+        </p:spPr>
+        <p:txBody>
+          <a:bodyPr wrap="square" rtlCol="0">
+            <a:spAutoFit/>
+          </a:bodyPr>
+          <a:lstStyle/>
+          <a:p>
+            <a:r>
+              <a:rPr lang="en-US" sz="1400" dirty="0">
+                <a:latin typeface="Arial" panose="020B0604020202020204" pitchFamily="34" charset="0"/>
+                <a:cs typeface="Arial" panose="020B0604020202020204" pitchFamily="34" charset="0"/>
+              </a:rPr>
+              <a:t>Start the installation</a:t>
+            </a:r>
+          </a:p>
+        </p:txBody>
+      </p:sp>
+      <p:sp>
+        <p:nvSpPr>
+          <p:cNvPr id="8" name="Rectangle 7">
+            <a:extLst>
+              <a:ext uri="{FF2B5EF4-FFF2-40B4-BE49-F238E27FC236}">
+                <a16:creationId xmlns:a16="http://schemas.microsoft.com/office/drawing/2014/main" id="{702ABCD3-0E98-4F43-88A3-5ACCFBACBCBF}"/>
+              </a:ext>
+            </a:extLst>
+          </p:cNvPr>
+          <p:cNvSpPr/>
+          <p:nvPr/>
+        </p:nvSpPr>
+        <p:spPr>
+          <a:xfrm>
+            <a:off x="3452535" y="2197530"/>
+            <a:ext cx="1958008" cy="558971"/>
+          </a:xfrm>
+          <a:prstGeom prst="rect">
+            <a:avLst/>
+          </a:prstGeom>
+          <a:solidFill>
+            <a:srgbClr val="CEE7E9"/>
+          </a:solidFill>
+          <a:ln>
+            <a:noFill/>
+          </a:ln>
+        </p:spPr>
+        <p:style>
+          <a:lnRef idx="2">
+            <a:schemeClr val="accent1">
+              <a:shade val="50000"/>
+            </a:schemeClr>
+          </a:lnRef>
+          <a:fillRef idx="1">
+            <a:schemeClr val="accent1"/>
+          </a:fillRef>
+          <a:effectRef idx="0">
+            <a:schemeClr val="accent1"/>
+          </a:effectRef>
+          <a:fontRef idx="minor">
+            <a:schemeClr val="lt1"/>
+          </a:fontRef>
+        </p:style>
+        <p:txBody>
+          <a:bodyPr rot="0" spcFirstLastPara="0" vertOverflow="overflow" horzOverflow="overflow" vert="horz" wrap="square" lIns="91440" tIns="45720" rIns="91440" bIns="45720" numCol="1" spcCol="0" rtlCol="0" fromWordArt="0" anchor="ctr" anchorCtr="0" forceAA="0" compatLnSpc="1">
+            <a:prstTxWarp prst="textNoShape">
+              <a:avLst/>
+            </a:prstTxWarp>
+            <a:noAutofit/>
+          </a:bodyPr>
+          <a:lstStyle/>
+          <a:p>
+            <a:pPr algn="ctr"/>
             <a:r>
               <a:rPr lang="en-US" sz="1100" dirty="0">
                 <a:solidFill>
-                  <a:schemeClr val="bg1"/>
+                  <a:schemeClr val="tx1"/>
                 </a:solidFill>
                 <a:latin typeface="Arial" panose="020B0604020202020204" pitchFamily="34" charset="0"/>
                 <a:cs typeface="Arial" panose="020B0604020202020204" pitchFamily="34" charset="0"/>
@@ -3149,17 +3149,17 @@
         </p:nvSpPr>
         <p:spPr>
           <a:xfrm>
-            <a:off x="2958690" y="3164773"/>
+            <a:off x="3086280" y="3076806"/>
             <a:ext cx="2559738" cy="809368"/>
           </a:xfrm>
           <a:prstGeom prst="diamond">
             <a:avLst/>
           </a:prstGeom>
-          <a:noFill/>
+          <a:solidFill>
+            <a:srgbClr val="FBD589"/>
+          </a:solidFill>
           <a:ln>
-            <a:solidFill>
-              <a:srgbClr val="265E83"/>
-            </a:solidFill>
+            <a:noFill/>
           </a:ln>
         </p:spPr>
         <p:style>
@@ -3212,7 +3212,7 @@
         </p:nvCxnSpPr>
         <p:spPr>
           <a:xfrm>
-            <a:off x="3014110" y="3698195"/>
+            <a:off x="3141700" y="3610229"/>
             <a:ext cx="0" cy="635129"/>
           </a:xfrm>
           <a:prstGeom prst="straightConnector1">
@@ -3220,8 +3220,9 @@
           </a:prstGeom>
           <a:ln>
             <a:solidFill>
-              <a:schemeClr val="bg2">
-                <a:lumMod val="25000"/>
+              <a:schemeClr val="tx1">
+                <a:lumMod val="50000"/>
+                <a:lumOff val="50000"/>
               </a:schemeClr>
             </a:solidFill>
             <a:tailEnd type="triangle"/>
@@ -3256,7 +3257,7 @@
         </p:nvCxnSpPr>
         <p:spPr>
           <a:xfrm>
-            <a:off x="5504435" y="3670434"/>
+            <a:off x="5632025" y="3582468"/>
             <a:ext cx="0" cy="635129"/>
           </a:xfrm>
           <a:prstGeom prst="straightConnector1">
@@ -3264,8 +3265,9 @@
           </a:prstGeom>
           <a:ln>
             <a:solidFill>
-              <a:schemeClr val="bg2">
-                <a:lumMod val="25000"/>
+              <a:schemeClr val="tx1">
+                <a:lumMod val="50000"/>
+                <a:lumOff val="50000"/>
               </a:schemeClr>
             </a:solidFill>
             <a:tailEnd type="triangle"/>
@@ -3300,14 +3302,14 @@
         </p:nvSpPr>
         <p:spPr>
           <a:xfrm>
-            <a:off x="4609065" y="4354300"/>
+            <a:off x="4736656" y="4266334"/>
             <a:ext cx="2243289" cy="558971"/>
           </a:xfrm>
           <a:prstGeom prst="rect">
             <a:avLst/>
           </a:prstGeom>
           <a:solidFill>
-            <a:srgbClr val="265F82"/>
+            <a:srgbClr val="CEE7E9"/>
           </a:solidFill>
           <a:ln>
             <a:noFill/>
@@ -3342,7 +3344,7 @@
             <a:r>
               <a:rPr lang="en-US" sz="1100" dirty="0">
                 <a:solidFill>
-                  <a:schemeClr val="bg1"/>
+                  <a:schemeClr val="tx1"/>
                 </a:solidFill>
                 <a:latin typeface="Arial" panose="020B0604020202020204" pitchFamily="34" charset="0"/>
                 <a:cs typeface="Arial" panose="020B0604020202020204" pitchFamily="34" charset="0"/>
@@ -3366,14 +3368,14 @@
         </p:nvSpPr>
         <p:spPr>
           <a:xfrm>
-            <a:off x="2250212" y="4354300"/>
+            <a:off x="2377803" y="4266334"/>
             <a:ext cx="2250655" cy="558971"/>
           </a:xfrm>
           <a:prstGeom prst="rect">
             <a:avLst/>
           </a:prstGeom>
           <a:solidFill>
-            <a:srgbClr val="265F82"/>
+            <a:srgbClr val="CEE7E9"/>
           </a:solidFill>
           <a:ln>
             <a:noFill/>
@@ -3408,7 +3410,7 @@
             <a:r>
               <a:rPr lang="en-US" sz="1100" dirty="0">
                 <a:solidFill>
-                  <a:schemeClr val="bg1"/>
+                  <a:schemeClr val="tx1"/>
                 </a:solidFill>
                 <a:latin typeface="Arial" panose="020B0604020202020204" pitchFamily="34" charset="0"/>
                 <a:cs typeface="Arial" panose="020B0604020202020204" pitchFamily="34" charset="0"/>
@@ -3432,14 +3434,14 @@
         </p:nvSpPr>
         <p:spPr>
           <a:xfrm>
-            <a:off x="4608558" y="5142747"/>
+            <a:off x="4736149" y="5054781"/>
             <a:ext cx="2243285" cy="558971"/>
           </a:xfrm>
           <a:prstGeom prst="rect">
             <a:avLst/>
           </a:prstGeom>
           <a:solidFill>
-            <a:srgbClr val="265F82"/>
+            <a:srgbClr val="CEE7E9"/>
           </a:solidFill>
           <a:ln>
             <a:noFill/>
@@ -3474,7 +3476,7 @@
             <a:r>
               <a:rPr lang="en-US" sz="1100" dirty="0">
                 <a:solidFill>
-                  <a:schemeClr val="bg1"/>
+                  <a:schemeClr val="tx1"/>
                 </a:solidFill>
                 <a:latin typeface="Arial" panose="020B0604020202020204" pitchFamily="34" charset="0"/>
                 <a:cs typeface="Arial" panose="020B0604020202020204" pitchFamily="34" charset="0"/>
@@ -3498,14 +3500,14 @@
         </p:nvSpPr>
         <p:spPr>
           <a:xfrm>
-            <a:off x="4608558" y="5904952"/>
-            <a:ext cx="2243279" cy="558971"/>
+            <a:off x="4736150" y="5816985"/>
+            <a:ext cx="4087766" cy="947863"/>
           </a:xfrm>
           <a:prstGeom prst="rect">
             <a:avLst/>
           </a:prstGeom>
           <a:solidFill>
-            <a:srgbClr val="265F82"/>
+            <a:srgbClr val="CEE7E9"/>
           </a:solidFill>
           <a:ln>
             <a:noFill/>
@@ -3536,55 +3538,35 @@
           </a:bodyPr>
           <a:lstStyle/>
           <a:p>
-            <a:pPr algn="ctr"/>
             <a:r>
               <a:rPr lang="en-US" sz="1100" dirty="0">
                 <a:solidFill>
-                  <a:schemeClr val="bg1"/>
-                </a:solidFill>
-                <a:latin typeface="Arial" panose="020B0604020202020204" pitchFamily="34" charset="0"/>
-                <a:cs typeface="Arial" panose="020B0604020202020204" pitchFamily="34" charset="0"/>
-              </a:rPr>
-              <a:t>Install the Zowe runtime </a:t>
-            </a:r>
-          </a:p>
-          <a:p>
-            <a:pPr algn="ctr"/>
+                  <a:schemeClr val="tx1"/>
+                </a:solidFill>
+                <a:latin typeface="Arial" panose="020B0604020202020204" pitchFamily="34" charset="0"/>
+                <a:cs typeface="Arial" panose="020B0604020202020204" pitchFamily="34" charset="0"/>
+              </a:rPr>
+              <a:t>Install the </a:t>
+            </a:r>
+            <a:r>
+              <a:rPr lang="en-US" sz="1100" dirty="0" err="1">
+                <a:solidFill>
+                  <a:schemeClr val="tx1"/>
+                </a:solidFill>
+                <a:latin typeface="Arial" panose="020B0604020202020204" pitchFamily="34" charset="0"/>
+                <a:cs typeface="Arial" panose="020B0604020202020204" pitchFamily="34" charset="0"/>
+              </a:rPr>
+              <a:t>Zowe</a:t>
+            </a:r>
             <a:r>
               <a:rPr lang="en-US" sz="1100" dirty="0">
                 <a:solidFill>
-                  <a:schemeClr val="bg2">
-                    <a:lumMod val="90000"/>
-                  </a:schemeClr>
-                </a:solidFill>
-                <a:latin typeface="Arial" panose="020B0604020202020204" pitchFamily="34" charset="0"/>
-                <a:cs typeface="Arial" panose="020B0604020202020204" pitchFamily="34" charset="0"/>
-              </a:rPr>
-              <a:t>(Script: zowe-</a:t>
-            </a:r>
-            <a:r>
-              <a:rPr lang="en-US" sz="1100" dirty="0" err="1">
-                <a:solidFill>
-                  <a:schemeClr val="bg2">
-                    <a:lumMod val="90000"/>
-                  </a:schemeClr>
-                </a:solidFill>
-                <a:latin typeface="Arial" panose="020B0604020202020204" pitchFamily="34" charset="0"/>
-                <a:cs typeface="Arial" panose="020B0604020202020204" pitchFamily="34" charset="0"/>
-              </a:rPr>
-              <a:t>install.sh</a:t>
-            </a:r>
-            <a:r>
-              <a:rPr lang="en-US" sz="1100" dirty="0">
-                <a:solidFill>
-                  <a:schemeClr val="bg2">
-                    <a:lumMod val="90000"/>
-                  </a:schemeClr>
-                </a:solidFill>
-                <a:latin typeface="Arial" panose="020B0604020202020204" pitchFamily="34" charset="0"/>
-                <a:cs typeface="Arial" panose="020B0604020202020204" pitchFamily="34" charset="0"/>
-              </a:rPr>
-              <a:t>)</a:t>
+                  <a:schemeClr val="tx1"/>
+                </a:solidFill>
+                <a:latin typeface="Arial" panose="020B0604020202020204" pitchFamily="34" charset="0"/>
+                <a:cs typeface="Arial" panose="020B0604020202020204" pitchFamily="34" charset="0"/>
+              </a:rPr>
+              <a:t> runtime</a:t>
             </a:r>
           </a:p>
         </p:txBody>
@@ -3603,14 +3585,14 @@
         </p:nvSpPr>
         <p:spPr>
           <a:xfrm>
-            <a:off x="2250212" y="5142747"/>
+            <a:off x="2377803" y="5054781"/>
             <a:ext cx="2250651" cy="558971"/>
           </a:xfrm>
           <a:prstGeom prst="rect">
             <a:avLst/>
           </a:prstGeom>
           <a:solidFill>
-            <a:srgbClr val="265F82"/>
+            <a:srgbClr val="CEE7E9"/>
           </a:solidFill>
           <a:ln>
             <a:noFill/>
@@ -3645,7 +3627,7 @@
             <a:r>
               <a:rPr lang="en-US" sz="1100" dirty="0">
                 <a:solidFill>
-                  <a:schemeClr val="bg1"/>
+                  <a:schemeClr val="tx1"/>
                 </a:solidFill>
                 <a:latin typeface="Arial" panose="020B0604020202020204" pitchFamily="34" charset="0"/>
                 <a:cs typeface="Arial" panose="020B0604020202020204" pitchFamily="34" charset="0"/>
@@ -3669,17 +3651,25 @@
         </p:nvSpPr>
         <p:spPr>
           <a:xfrm>
-            <a:off x="2498332" y="7102327"/>
-            <a:ext cx="4239072" cy="558971"/>
+            <a:off x="2498332" y="7214386"/>
+            <a:ext cx="5165215" cy="1161482"/>
           </a:xfrm>
           <a:prstGeom prst="rect">
             <a:avLst/>
           </a:prstGeom>
           <a:solidFill>
-            <a:srgbClr val="4270C3"/>
+            <a:schemeClr val="bg1">
+              <a:lumMod val="95000"/>
+              <a:alpha val="74000"/>
+            </a:schemeClr>
           </a:solidFill>
           <a:ln>
-            <a:noFill/>
+            <a:solidFill>
+              <a:schemeClr val="accent3">
+                <a:lumMod val="60000"/>
+                <a:lumOff val="40000"/>
+              </a:schemeClr>
+            </a:solidFill>
           </a:ln>
         </p:spPr>
         <p:style>
@@ -3699,7 +3689,7 @@
           </a:fontRef>
         </p:style>
         <p:txBody>
-          <a:bodyPr rot="0" spcFirstLastPara="0" vertOverflow="overflow" horzOverflow="overflow" vert="horz" wrap="square" lIns="91440" tIns="45720" rIns="91440" bIns="45720" numCol="1" spcCol="0" rtlCol="0" fromWordArt="0" anchor="ctr" anchorCtr="0" forceAA="0" compatLnSpc="1">
+          <a:bodyPr rot="0" spcFirstLastPara="0" vertOverflow="overflow" horzOverflow="overflow" vert="horz" wrap="square" lIns="91440" tIns="45720" rIns="91440" bIns="45720" numCol="1" spcCol="0" rtlCol="0" fromWordArt="0" anchor="t" anchorCtr="0" forceAA="0" compatLnSpc="1">
             <a:prstTxWarp prst="textNoShape">
               <a:avLst/>
             </a:prstTxWarp>
@@ -3711,7 +3701,7 @@
             <a:r>
               <a:rPr lang="en-US" altLang="zh-CN" sz="1100" dirty="0">
                 <a:solidFill>
-                  <a:schemeClr val="bg1"/>
+                  <a:schemeClr val="tx1"/>
                 </a:solidFill>
                 <a:latin typeface="Arial" panose="020B0604020202020204" pitchFamily="34" charset="0"/>
                 <a:cs typeface="Arial" panose="020B0604020202020204" pitchFamily="34" charset="0"/>
@@ -3724,7 +3714,7 @@
             <a:r>
               <a:rPr lang="en-US" sz="1100" dirty="0">
                 <a:solidFill>
-                  <a:schemeClr val="bg1"/>
+                  <a:schemeClr val="tx1"/>
                 </a:solidFill>
                 <a:latin typeface="Arial" panose="020B0604020202020204" pitchFamily="34" charset="0"/>
                 <a:cs typeface="Arial" panose="020B0604020202020204" pitchFamily="34" charset="0"/>
@@ -3734,7 +3724,7 @@
             <a:r>
               <a:rPr lang="zh-CN" altLang="en-US" sz="1100" dirty="0">
                 <a:solidFill>
-                  <a:schemeClr val="bg1"/>
+                  <a:schemeClr val="tx1"/>
                 </a:solidFill>
                 <a:latin typeface="Arial" panose="020B0604020202020204" pitchFamily="34" charset="0"/>
                 <a:cs typeface="Arial" panose="020B0604020202020204" pitchFamily="34" charset="0"/>
@@ -3744,7 +3734,7 @@
             <a:r>
               <a:rPr lang="en-US" altLang="zh-CN" sz="1100" dirty="0">
                 <a:solidFill>
-                  <a:schemeClr val="bg1"/>
+                  <a:schemeClr val="tx1"/>
                 </a:solidFill>
                 <a:latin typeface="Arial" panose="020B0604020202020204" pitchFamily="34" charset="0"/>
                 <a:cs typeface="Arial" panose="020B0604020202020204" pitchFamily="34" charset="0"/>
@@ -3754,7 +3744,7 @@
             <a:r>
               <a:rPr lang="zh-CN" altLang="en-US" sz="1100" dirty="0">
                 <a:solidFill>
-                  <a:schemeClr val="bg1"/>
+                  <a:schemeClr val="tx1"/>
                 </a:solidFill>
                 <a:latin typeface="Arial" panose="020B0604020202020204" pitchFamily="34" charset="0"/>
                 <a:cs typeface="Arial" panose="020B0604020202020204" pitchFamily="34" charset="0"/>
@@ -3764,7 +3754,7 @@
             <a:r>
               <a:rPr lang="en-US" altLang="zh-CN" sz="1100" dirty="0">
                 <a:solidFill>
-                  <a:schemeClr val="bg1"/>
+                  <a:schemeClr val="tx1"/>
                 </a:solidFill>
                 <a:latin typeface="Arial" panose="020B0604020202020204" pitchFamily="34" charset="0"/>
                 <a:cs typeface="Arial" panose="020B0604020202020204" pitchFamily="34" charset="0"/>
@@ -3774,7 +3764,7 @@
             <a:r>
               <a:rPr lang="zh-CN" altLang="en-US" sz="1100" dirty="0">
                 <a:solidFill>
-                  <a:schemeClr val="bg1"/>
+                  <a:schemeClr val="tx1"/>
                 </a:solidFill>
                 <a:latin typeface="Arial" panose="020B0604020202020204" pitchFamily="34" charset="0"/>
                 <a:cs typeface="Arial" panose="020B0604020202020204" pitchFamily="34" charset="0"/>
@@ -3784,7 +3774,7 @@
             <a:r>
               <a:rPr lang="en-US" altLang="zh-CN" sz="1100" dirty="0" err="1">
                 <a:solidFill>
-                  <a:schemeClr val="bg1"/>
+                  <a:schemeClr val="tx1"/>
                 </a:solidFill>
                 <a:latin typeface="Arial" panose="020B0604020202020204" pitchFamily="34" charset="0"/>
                 <a:cs typeface="Arial" panose="020B0604020202020204" pitchFamily="34" charset="0"/>
@@ -3793,47 +3783,7 @@
             </a:r>
             <a:endParaRPr lang="en-US" altLang="zh-CN" sz="1100" dirty="0">
               <a:solidFill>
-                <a:schemeClr val="bg1"/>
-              </a:solidFill>
-              <a:latin typeface="Arial" panose="020B0604020202020204" pitchFamily="34" charset="0"/>
-              <a:cs typeface="Arial" panose="020B0604020202020204" pitchFamily="34" charset="0"/>
-            </a:endParaRPr>
-          </a:p>
-          <a:p>
-            <a:pPr algn="ctr"/>
-            <a:r>
-              <a:rPr lang="en-US" altLang="zh-CN" sz="1100" dirty="0">
-                <a:solidFill>
-                  <a:schemeClr val="bg1"/>
-                </a:solidFill>
-                <a:latin typeface="Arial" panose="020B0604020202020204" pitchFamily="34" charset="0"/>
-                <a:cs typeface="Arial" panose="020B0604020202020204" pitchFamily="34" charset="0"/>
-              </a:rPr>
-              <a:t>(JCL:</a:t>
-            </a:r>
-            <a:r>
-              <a:rPr lang="zh-CN" altLang="en-US" sz="1100" dirty="0">
-                <a:solidFill>
-                  <a:schemeClr val="bg1"/>
-                </a:solidFill>
-                <a:latin typeface="Arial" panose="020B0604020202020204" pitchFamily="34" charset="0"/>
-                <a:cs typeface="Arial" panose="020B0604020202020204" pitchFamily="34" charset="0"/>
-              </a:rPr>
-              <a:t> </a:t>
-            </a:r>
-            <a:r>
-              <a:rPr lang="en-US" altLang="zh-CN" sz="1100" dirty="0">
-                <a:solidFill>
-                  <a:schemeClr val="bg1"/>
-                </a:solidFill>
-                <a:latin typeface="Arial" panose="020B0604020202020204" pitchFamily="34" charset="0"/>
-                <a:cs typeface="Arial" panose="020B0604020202020204" pitchFamily="34" charset="0"/>
-              </a:rPr>
-              <a:t>ZWESECUR)</a:t>
-            </a:r>
-            <a:endParaRPr lang="en-US" sz="1100" dirty="0">
-              <a:solidFill>
-                <a:schemeClr val="bg1"/>
+                <a:schemeClr val="tx1"/>
               </a:solidFill>
               <a:latin typeface="Arial" panose="020B0604020202020204" pitchFamily="34" charset="0"/>
               <a:cs typeface="Arial" panose="020B0604020202020204" pitchFamily="34" charset="0"/>
@@ -3857,7 +3807,7 @@
         </p:nvCxnSpPr>
         <p:spPr>
           <a:xfrm>
-            <a:off x="3014110" y="4929762"/>
+            <a:off x="3141700" y="4841796"/>
             <a:ext cx="0" cy="212985"/>
           </a:xfrm>
           <a:prstGeom prst="straightConnector1">
@@ -3865,8 +3815,9 @@
           </a:prstGeom>
           <a:ln>
             <a:solidFill>
-              <a:schemeClr val="bg2">
-                <a:lumMod val="25000"/>
+              <a:schemeClr val="tx1">
+                <a:lumMod val="50000"/>
+                <a:lumOff val="50000"/>
               </a:schemeClr>
             </a:solidFill>
             <a:tailEnd type="triangle"/>
@@ -3903,7 +3854,7 @@
         </p:nvCxnSpPr>
         <p:spPr>
           <a:xfrm>
-            <a:off x="5504435" y="4940573"/>
+            <a:off x="5632025" y="4852607"/>
             <a:ext cx="0" cy="212985"/>
           </a:xfrm>
           <a:prstGeom prst="straightConnector1">
@@ -3911,8 +3862,9 @@
           </a:prstGeom>
           <a:ln>
             <a:solidFill>
-              <a:schemeClr val="bg2">
-                <a:lumMod val="25000"/>
+              <a:schemeClr val="tx1">
+                <a:lumMod val="50000"/>
+                <a:lumOff val="50000"/>
               </a:schemeClr>
             </a:solidFill>
             <a:tailEnd type="triangle"/>
@@ -3949,7 +3901,7 @@
         </p:nvCxnSpPr>
         <p:spPr>
           <a:xfrm>
-            <a:off x="5504435" y="5691967"/>
+            <a:off x="5632025" y="5604001"/>
             <a:ext cx="0" cy="212985"/>
           </a:xfrm>
           <a:prstGeom prst="straightConnector1">
@@ -3957,8 +3909,9 @@
           </a:prstGeom>
           <a:ln>
             <a:solidFill>
-              <a:schemeClr val="bg2">
-                <a:lumMod val="25000"/>
+              <a:schemeClr val="tx1">
+                <a:lumMod val="50000"/>
+                <a:lumOff val="50000"/>
               </a:schemeClr>
             </a:solidFill>
             <a:tailEnd type="triangle"/>
@@ -3995,7 +3948,7 @@
         </p:nvCxnSpPr>
         <p:spPr>
           <a:xfrm>
-            <a:off x="5504435" y="6482007"/>
+            <a:off x="5518428" y="6574958"/>
             <a:ext cx="0" cy="602224"/>
           </a:xfrm>
           <a:prstGeom prst="straightConnector1">
@@ -4003,8 +3956,9 @@
           </a:prstGeom>
           <a:ln>
             <a:solidFill>
-              <a:schemeClr val="bg2">
-                <a:lumMod val="25000"/>
+              <a:schemeClr val="tx1">
+                <a:lumMod val="50000"/>
+                <a:lumOff val="50000"/>
               </a:schemeClr>
             </a:solidFill>
             <a:tailEnd type="triangle"/>
@@ -4041,16 +3995,17 @@
         </p:nvCxnSpPr>
         <p:spPr>
           <a:xfrm>
-            <a:off x="3380417" y="5712524"/>
-            <a:ext cx="0" cy="1359350"/>
+            <a:off x="3380417" y="5624557"/>
+            <a:ext cx="0" cy="1523074"/>
           </a:xfrm>
           <a:prstGeom prst="straightConnector1">
             <a:avLst/>
           </a:prstGeom>
           <a:ln>
             <a:solidFill>
-              <a:schemeClr val="bg2">
-                <a:lumMod val="25000"/>
+              <a:schemeClr val="tx1">
+                <a:lumMod val="50000"/>
+                <a:lumOff val="50000"/>
               </a:schemeClr>
             </a:solidFill>
             <a:tailEnd type="triangle"/>
@@ -4087,16 +4042,17 @@
         </p:nvCxnSpPr>
         <p:spPr>
           <a:xfrm>
-            <a:off x="4238556" y="2644442"/>
-            <a:ext cx="0" cy="479467"/>
+            <a:off x="4366146" y="2756501"/>
+            <a:ext cx="0" cy="262924"/>
           </a:xfrm>
           <a:prstGeom prst="straightConnector1">
             <a:avLst/>
           </a:prstGeom>
           <a:ln>
             <a:solidFill>
-              <a:schemeClr val="bg2">
-                <a:lumMod val="25000"/>
+              <a:schemeClr val="tx1">
+                <a:lumMod val="50000"/>
+                <a:lumOff val="50000"/>
               </a:schemeClr>
             </a:solidFill>
             <a:tailEnd type="triangle"/>
@@ -4131,7 +4087,7 @@
         </p:nvSpPr>
         <p:spPr>
           <a:xfrm>
-            <a:off x="1810878" y="3808397"/>
+            <a:off x="1938468" y="3720431"/>
             <a:ext cx="1365668" cy="307777"/>
           </a:xfrm>
           <a:prstGeom prst="rect">
@@ -4189,7 +4145,7 @@
         </p:nvSpPr>
         <p:spPr>
           <a:xfrm>
-            <a:off x="5508247" y="3808397"/>
+            <a:off x="5635838" y="3720431"/>
             <a:ext cx="1682987" cy="307777"/>
           </a:xfrm>
           <a:prstGeom prst="rect">
@@ -4229,228 +4185,6 @@
                 <a:cs typeface="Arial" panose="020B0604020202020204" pitchFamily="34" charset="0"/>
               </a:rPr>
               <a:t> </a:t>
-            </a:r>
-          </a:p>
-        </p:txBody>
-      </p:sp>
-      <p:sp>
-        <p:nvSpPr>
-          <p:cNvPr id="40" name="Rectangle 39">
-            <a:extLst>
-              <a:ext uri="{FF2B5EF4-FFF2-40B4-BE49-F238E27FC236}">
-                <a16:creationId xmlns:a16="http://schemas.microsoft.com/office/drawing/2014/main" id="{D5FC487A-44ED-3448-8B11-9485EBC99FA7}"/>
-              </a:ext>
-            </a:extLst>
-          </p:cNvPr>
-          <p:cNvSpPr/>
-          <p:nvPr/>
-        </p:nvSpPr>
-        <p:spPr>
-          <a:xfrm>
-            <a:off x="7066691" y="5613568"/>
-            <a:ext cx="2612484" cy="1169551"/>
-          </a:xfrm>
-          <a:prstGeom prst="rect">
-            <a:avLst/>
-          </a:prstGeom>
-        </p:spPr>
-        <p:txBody>
-          <a:bodyPr wrap="square">
-            <a:spAutoFit/>
-          </a:bodyPr>
-          <a:lstStyle/>
-          <a:p>
-            <a:r>
-              <a:rPr lang="en-US" sz="1000" dirty="0">
-                <a:solidFill>
-                  <a:srgbClr val="000000"/>
-                </a:solidFill>
-                <a:latin typeface="Arial" panose="020B0604020202020204" pitchFamily="34" charset="0"/>
-                <a:cs typeface="Arial" panose="020B0604020202020204" pitchFamily="34" charset="0"/>
-              </a:rPr>
-              <a:t>Installation Output: </a:t>
-            </a:r>
-          </a:p>
-          <a:p>
-            <a:pPr marL="171450" indent="-171450">
-              <a:buFont typeface="Arial" panose="020B0604020202020204" pitchFamily="34" charset="0"/>
-              <a:buChar char="•"/>
-            </a:pPr>
-            <a:r>
-              <a:rPr lang="en-US" sz="1000" dirty="0">
-                <a:solidFill>
-                  <a:srgbClr val="000000"/>
-                </a:solidFill>
-                <a:latin typeface="Arial" panose="020B0604020202020204" pitchFamily="34" charset="0"/>
-                <a:cs typeface="Arial" panose="020B0604020202020204" pitchFamily="34" charset="0"/>
-              </a:rPr>
-              <a:t>A </a:t>
-            </a:r>
-            <a:r>
-              <a:rPr lang="en-US" sz="1000" dirty="0" err="1">
-                <a:solidFill>
-                  <a:srgbClr val="000000"/>
-                </a:solidFill>
-                <a:latin typeface="Arial" panose="020B0604020202020204" pitchFamily="34" charset="0"/>
-                <a:cs typeface="Arial" panose="020B0604020202020204" pitchFamily="34" charset="0"/>
-              </a:rPr>
-              <a:t>zFS</a:t>
-            </a:r>
-            <a:r>
-              <a:rPr lang="en-US" sz="1000" dirty="0">
-                <a:solidFill>
-                  <a:srgbClr val="000000"/>
-                </a:solidFill>
-                <a:latin typeface="Arial" panose="020B0604020202020204" pitchFamily="34" charset="0"/>
-                <a:cs typeface="Arial" panose="020B0604020202020204" pitchFamily="34" charset="0"/>
-              </a:rPr>
-              <a:t> folder containing unconfigured Zowe runtime </a:t>
-            </a:r>
-            <a:r>
-              <a:rPr lang="en-US" sz="1000" dirty="0">
-                <a:solidFill>
-                  <a:srgbClr val="800000"/>
-                </a:solidFill>
-                <a:latin typeface="Arial" panose="020B0604020202020204" pitchFamily="34" charset="0"/>
-                <a:cs typeface="Arial" panose="020B0604020202020204" pitchFamily="34" charset="0"/>
-              </a:rPr>
-              <a:t>&lt;RUNTIME_DIR&gt;</a:t>
-            </a:r>
-            <a:endParaRPr lang="en-US" sz="1000" dirty="0">
-              <a:solidFill>
-                <a:srgbClr val="000000"/>
-              </a:solidFill>
-              <a:latin typeface="Arial" panose="020B0604020202020204" pitchFamily="34" charset="0"/>
-              <a:cs typeface="Arial" panose="020B0604020202020204" pitchFamily="34" charset="0"/>
-            </a:endParaRPr>
-          </a:p>
-          <a:p>
-            <a:pPr marL="171450" indent="-171450">
-              <a:buFont typeface="Arial" panose="020B0604020202020204" pitchFamily="34" charset="0"/>
-              <a:buChar char="•"/>
-            </a:pPr>
-            <a:r>
-              <a:rPr lang="en-US" sz="1000" dirty="0">
-                <a:solidFill>
-                  <a:srgbClr val="000000"/>
-                </a:solidFill>
-                <a:latin typeface="Arial" panose="020B0604020202020204" pitchFamily="34" charset="0"/>
-                <a:cs typeface="Arial" panose="020B0604020202020204" pitchFamily="34" charset="0"/>
-              </a:rPr>
-              <a:t>A SAMPLIB </a:t>
-            </a:r>
-            <a:r>
-              <a:rPr lang="en-US" altLang="zh-CN" sz="1000" dirty="0">
-                <a:solidFill>
-                  <a:srgbClr val="000000"/>
-                </a:solidFill>
-                <a:latin typeface="Arial" panose="020B0604020202020204" pitchFamily="34" charset="0"/>
-                <a:cs typeface="Arial" panose="020B0604020202020204" pitchFamily="34" charset="0"/>
-              </a:rPr>
-              <a:t>library</a:t>
-            </a:r>
-            <a:r>
-              <a:rPr lang="en-US" sz="1000" dirty="0">
-                <a:solidFill>
-                  <a:srgbClr val="000000"/>
-                </a:solidFill>
-                <a:latin typeface="Arial" panose="020B0604020202020204" pitchFamily="34" charset="0"/>
-                <a:cs typeface="Arial" panose="020B0604020202020204" pitchFamily="34" charset="0"/>
-              </a:rPr>
-              <a:t> </a:t>
-            </a:r>
-            <a:r>
-              <a:rPr lang="en-US" sz="1000" dirty="0">
-                <a:solidFill>
-                  <a:srgbClr val="800000"/>
-                </a:solidFill>
-                <a:latin typeface="Arial" panose="020B0604020202020204" pitchFamily="34" charset="0"/>
-                <a:cs typeface="Arial" panose="020B0604020202020204" pitchFamily="34" charset="0"/>
-              </a:rPr>
-              <a:t>SZWESAMP </a:t>
-            </a:r>
-            <a:r>
-              <a:rPr lang="en-US" sz="1000" dirty="0">
-                <a:solidFill>
-                  <a:srgbClr val="000000"/>
-                </a:solidFill>
-                <a:latin typeface="Arial" panose="020B0604020202020204" pitchFamily="34" charset="0"/>
-                <a:cs typeface="Arial" panose="020B0604020202020204" pitchFamily="34" charset="0"/>
-              </a:rPr>
-              <a:t>containing </a:t>
-            </a:r>
-            <a:r>
-              <a:rPr lang="en-US" altLang="zh-CN" sz="1000" dirty="0">
-                <a:solidFill>
-                  <a:srgbClr val="000000"/>
-                </a:solidFill>
-                <a:latin typeface="Arial" panose="020B0604020202020204" pitchFamily="34" charset="0"/>
-                <a:cs typeface="Arial" panose="020B0604020202020204" pitchFamily="34" charset="0"/>
-              </a:rPr>
-              <a:t>sample</a:t>
-            </a:r>
-            <a:r>
-              <a:rPr lang="zh-CN" altLang="en-US" sz="1000" dirty="0">
-                <a:solidFill>
-                  <a:srgbClr val="000000"/>
-                </a:solidFill>
-                <a:latin typeface="Arial" panose="020B0604020202020204" pitchFamily="34" charset="0"/>
-                <a:cs typeface="Arial" panose="020B0604020202020204" pitchFamily="34" charset="0"/>
-              </a:rPr>
-              <a:t> </a:t>
-            </a:r>
-            <a:r>
-              <a:rPr lang="en-US" altLang="zh-CN" sz="1000" dirty="0">
-                <a:solidFill>
-                  <a:srgbClr val="000000"/>
-                </a:solidFill>
-                <a:latin typeface="Arial" panose="020B0604020202020204" pitchFamily="34" charset="0"/>
-                <a:cs typeface="Arial" panose="020B0604020202020204" pitchFamily="34" charset="0"/>
-              </a:rPr>
-              <a:t>members</a:t>
-            </a:r>
-            <a:endParaRPr lang="en-US" sz="1000" dirty="0">
-              <a:solidFill>
-                <a:srgbClr val="000000"/>
-              </a:solidFill>
-              <a:latin typeface="Arial" panose="020B0604020202020204" pitchFamily="34" charset="0"/>
-              <a:cs typeface="Arial" panose="020B0604020202020204" pitchFamily="34" charset="0"/>
-            </a:endParaRPr>
-          </a:p>
-          <a:p>
-            <a:pPr marL="171450" indent="-171450">
-              <a:buFont typeface="Arial" panose="020B0604020202020204" pitchFamily="34" charset="0"/>
-              <a:buChar char="•"/>
-            </a:pPr>
-            <a:r>
-              <a:rPr lang="en-US" sz="1000" dirty="0">
-                <a:solidFill>
-                  <a:srgbClr val="000000"/>
-                </a:solidFill>
-                <a:latin typeface="Arial" panose="020B0604020202020204" pitchFamily="34" charset="0"/>
-                <a:cs typeface="Arial" panose="020B0604020202020204" pitchFamily="34" charset="0"/>
-              </a:rPr>
-              <a:t>A load library </a:t>
-            </a:r>
-            <a:r>
-              <a:rPr lang="en-US" sz="1000" dirty="0">
-                <a:solidFill>
-                  <a:srgbClr val="800000"/>
-                </a:solidFill>
-                <a:latin typeface="Arial" panose="020B0604020202020204" pitchFamily="34" charset="0"/>
-                <a:cs typeface="Arial" panose="020B0604020202020204" pitchFamily="34" charset="0"/>
-              </a:rPr>
-              <a:t>SZWEAUTH</a:t>
-            </a:r>
-            <a:r>
-              <a:rPr lang="en-US" sz="1000" dirty="0">
-                <a:solidFill>
-                  <a:srgbClr val="000000"/>
-                </a:solidFill>
-                <a:latin typeface="Arial" panose="020B0604020202020204" pitchFamily="34" charset="0"/>
-                <a:cs typeface="Arial" panose="020B0604020202020204" pitchFamily="34" charset="0"/>
-              </a:rPr>
-              <a:t> containing load modules</a:t>
             </a:r>
           </a:p>
         </p:txBody>
@@ -4469,17 +4203,25 @@
         </p:nvSpPr>
         <p:spPr>
           <a:xfrm>
-            <a:off x="2505125" y="7976784"/>
-            <a:ext cx="4232278" cy="558971"/>
+            <a:off x="2505125" y="8716198"/>
+            <a:ext cx="5165207" cy="1100583"/>
           </a:xfrm>
           <a:prstGeom prst="rect">
             <a:avLst/>
           </a:prstGeom>
           <a:solidFill>
-            <a:srgbClr val="4270C3"/>
+            <a:schemeClr val="bg1">
+              <a:lumMod val="95000"/>
+              <a:alpha val="74000"/>
+            </a:schemeClr>
           </a:solidFill>
           <a:ln>
-            <a:noFill/>
+            <a:solidFill>
+              <a:schemeClr val="accent3">
+                <a:lumMod val="60000"/>
+                <a:lumOff val="40000"/>
+              </a:schemeClr>
+            </a:solidFill>
           </a:ln>
         </p:spPr>
         <p:style>
@@ -4499,7 +4241,7 @@
           </a:fontRef>
         </p:style>
         <p:txBody>
-          <a:bodyPr rot="0" spcFirstLastPara="0" vertOverflow="overflow" horzOverflow="overflow" vert="horz" wrap="square" lIns="91440" tIns="45720" rIns="91440" bIns="45720" numCol="1" spcCol="0" rtlCol="0" fromWordArt="0" anchor="ctr" anchorCtr="0" forceAA="0" compatLnSpc="1">
+          <a:bodyPr rot="0" spcFirstLastPara="0" vertOverflow="overflow" horzOverflow="overflow" vert="horz" wrap="square" lIns="91440" tIns="45720" rIns="91440" bIns="45720" numCol="1" spcCol="0" rtlCol="0" fromWordArt="0" anchor="t" anchorCtr="0" forceAA="0" compatLnSpc="1">
             <a:prstTxWarp prst="textNoShape">
               <a:avLst/>
             </a:prstTxWarp>
@@ -4511,7 +4253,7 @@
             <a:r>
               <a:rPr lang="en-US" altLang="zh-CN" sz="1100" dirty="0">
                 <a:solidFill>
-                  <a:schemeClr val="bg1"/>
+                  <a:schemeClr val="tx1"/>
                 </a:solidFill>
                 <a:latin typeface="Arial" panose="020B0604020202020204" pitchFamily="34" charset="0"/>
                 <a:cs typeface="Arial" panose="020B0604020202020204" pitchFamily="34" charset="0"/>
@@ -4520,7 +4262,7 @@
             </a:r>
             <a:endParaRPr lang="en-US" sz="1100" dirty="0">
               <a:solidFill>
-                <a:schemeClr val="bg1"/>
+                <a:schemeClr val="tx1"/>
               </a:solidFill>
               <a:latin typeface="Arial" panose="020B0604020202020204" pitchFamily="34" charset="0"/>
               <a:cs typeface="Arial" panose="020B0604020202020204" pitchFamily="34" charset="0"/>
@@ -4531,7 +4273,7 @@
             <a:r>
               <a:rPr lang="en-US" sz="1100" dirty="0">
                 <a:solidFill>
-                  <a:schemeClr val="bg1"/>
+                  <a:schemeClr val="tx1"/>
                 </a:solidFill>
                 <a:latin typeface="Arial" panose="020B0604020202020204" pitchFamily="34" charset="0"/>
                 <a:cs typeface="Arial" panose="020B0604020202020204" pitchFamily="34" charset="0"/>
@@ -4541,7 +4283,7 @@
             <a:r>
               <a:rPr lang="en-US" altLang="zh-CN" sz="1100" dirty="0">
                 <a:solidFill>
-                  <a:schemeClr val="bg1"/>
+                  <a:schemeClr val="tx1"/>
                 </a:solidFill>
                 <a:latin typeface="Arial" panose="020B0604020202020204" pitchFamily="34" charset="0"/>
                 <a:cs typeface="Arial" panose="020B0604020202020204" pitchFamily="34" charset="0"/>
@@ -4551,7 +4293,7 @@
             <a:r>
               <a:rPr lang="zh-CN" altLang="en-US" sz="1100" dirty="0">
                 <a:solidFill>
-                  <a:schemeClr val="bg1"/>
+                  <a:schemeClr val="tx1"/>
                 </a:solidFill>
                 <a:latin typeface="Arial" panose="020B0604020202020204" pitchFamily="34" charset="0"/>
                 <a:cs typeface="Arial" panose="020B0604020202020204" pitchFamily="34" charset="0"/>
@@ -4561,7 +4303,7 @@
             <a:r>
               <a:rPr lang="en-US" altLang="zh-CN" sz="1100" dirty="0">
                 <a:solidFill>
-                  <a:schemeClr val="bg1"/>
+                  <a:schemeClr val="tx1"/>
                 </a:solidFill>
                 <a:latin typeface="Arial" panose="020B0604020202020204" pitchFamily="34" charset="0"/>
                 <a:cs typeface="Arial" panose="020B0604020202020204" pitchFamily="34" charset="0"/>
@@ -4571,7 +4313,7 @@
             <a:r>
               <a:rPr lang="en-US" sz="1100" dirty="0">
                 <a:solidFill>
-                  <a:schemeClr val="bg1"/>
+                  <a:schemeClr val="tx1"/>
                 </a:solidFill>
                 <a:latin typeface="Arial" panose="020B0604020202020204" pitchFamily="34" charset="0"/>
                 <a:cs typeface="Arial" panose="020B0604020202020204" pitchFamily="34" charset="0"/>
@@ -4581,7 +4323,7 @@
             <a:r>
               <a:rPr lang="en-US" sz="1100" dirty="0" err="1">
                 <a:solidFill>
-                  <a:schemeClr val="bg1"/>
+                  <a:schemeClr val="tx1"/>
                 </a:solidFill>
                 <a:latin typeface="Arial" panose="020B0604020202020204" pitchFamily="34" charset="0"/>
                 <a:cs typeface="Arial" panose="020B0604020202020204" pitchFamily="34" charset="0"/>
@@ -4591,7 +4333,7 @@
             <a:r>
               <a:rPr lang="en-US" sz="1100" dirty="0">
                 <a:solidFill>
-                  <a:schemeClr val="bg1"/>
+                  <a:schemeClr val="tx1"/>
                 </a:solidFill>
                 <a:latin typeface="Arial" panose="020B0604020202020204" pitchFamily="34" charset="0"/>
                 <a:cs typeface="Arial" panose="020B0604020202020204" pitchFamily="34" charset="0"/>
@@ -4601,7 +4343,7 @@
             <a:r>
               <a:rPr lang="zh-CN" altLang="en-US" sz="1100" dirty="0">
                 <a:solidFill>
-                  <a:schemeClr val="bg1"/>
+                  <a:schemeClr val="tx1"/>
                 </a:solidFill>
                 <a:latin typeface="Arial" panose="020B0604020202020204" pitchFamily="34" charset="0"/>
                 <a:cs typeface="Arial" panose="020B0604020202020204" pitchFamily="34" charset="0"/>
@@ -4610,57 +4352,7 @@
             </a:r>
             <a:endParaRPr lang="en-US" altLang="zh-CN" sz="1100" dirty="0">
               <a:solidFill>
-                <a:schemeClr val="bg1"/>
-              </a:solidFill>
-              <a:latin typeface="Arial" panose="020B0604020202020204" pitchFamily="34" charset="0"/>
-              <a:cs typeface="Arial" panose="020B0604020202020204" pitchFamily="34" charset="0"/>
-            </a:endParaRPr>
-          </a:p>
-          <a:p>
-            <a:pPr algn="ctr"/>
-            <a:r>
-              <a:rPr lang="en-US" altLang="zh-CN" sz="1100" dirty="0">
-                <a:solidFill>
-                  <a:schemeClr val="bg1"/>
-                </a:solidFill>
-                <a:latin typeface="Arial" panose="020B0604020202020204" pitchFamily="34" charset="0"/>
-                <a:cs typeface="Arial" panose="020B0604020202020204" pitchFamily="34" charset="0"/>
-              </a:rPr>
-              <a:t>(Script: </a:t>
-            </a:r>
-            <a:r>
-              <a:rPr lang="en-US" sz="1100" dirty="0">
-                <a:solidFill>
-                  <a:schemeClr val="bg1"/>
-                </a:solidFill>
-                <a:latin typeface="Arial" panose="020B0604020202020204" pitchFamily="34" charset="0"/>
-                <a:cs typeface="Arial" panose="020B0604020202020204" pitchFamily="34" charset="0"/>
-              </a:rPr>
-              <a:t>zowe-setup-</a:t>
-            </a:r>
-            <a:r>
-              <a:rPr lang="en-US" sz="1100" dirty="0" err="1">
-                <a:solidFill>
-                  <a:schemeClr val="bg1"/>
-                </a:solidFill>
-                <a:latin typeface="Arial" panose="020B0604020202020204" pitchFamily="34" charset="0"/>
-                <a:cs typeface="Arial" panose="020B0604020202020204" pitchFamily="34" charset="0"/>
-              </a:rPr>
-              <a:t>certificates.sh</a:t>
-            </a:r>
-            <a:r>
-              <a:rPr lang="en-US" altLang="zh-CN" sz="1100" dirty="0">
-                <a:solidFill>
-                  <a:schemeClr val="bg1"/>
-                </a:solidFill>
-                <a:latin typeface="Arial" panose="020B0604020202020204" pitchFamily="34" charset="0"/>
-                <a:cs typeface="Arial" panose="020B0604020202020204" pitchFamily="34" charset="0"/>
-              </a:rPr>
-              <a:t>)</a:t>
-            </a:r>
-            <a:endParaRPr lang="en-US" sz="1100" dirty="0">
-              <a:solidFill>
-                <a:schemeClr val="bg1"/>
+                <a:schemeClr val="tx1"/>
               </a:solidFill>
               <a:latin typeface="Arial" panose="020B0604020202020204" pitchFamily="34" charset="0"/>
               <a:cs typeface="Arial" panose="020B0604020202020204" pitchFamily="34" charset="0"/>
@@ -4684,16 +4376,17 @@
         </p:nvCxnSpPr>
         <p:spPr>
           <a:xfrm>
-            <a:off x="4607892" y="7711516"/>
-            <a:ext cx="0" cy="212985"/>
+            <a:off x="5100719" y="8375868"/>
+            <a:ext cx="0" cy="340330"/>
           </a:xfrm>
           <a:prstGeom prst="straightConnector1">
             <a:avLst/>
           </a:prstGeom>
           <a:ln>
             <a:solidFill>
-              <a:schemeClr val="bg2">
-                <a:lumMod val="25000"/>
+              <a:schemeClr val="tx1">
+                <a:lumMod val="50000"/>
+                <a:lumOff val="50000"/>
               </a:schemeClr>
             </a:solidFill>
             <a:tailEnd type="triangle"/>
@@ -4728,18 +4421,24 @@
         </p:nvSpPr>
         <p:spPr>
           <a:xfrm>
-            <a:off x="6516484" y="8740065"/>
-            <a:ext cx="1047242" cy="628174"/>
+            <a:off x="7447734" y="10282485"/>
+            <a:ext cx="1047242" cy="920904"/>
           </a:xfrm>
           <a:prstGeom prst="rect">
             <a:avLst/>
           </a:prstGeom>
           <a:solidFill>
-            <a:srgbClr val="4270C3"/>
+            <a:schemeClr val="bg1">
+              <a:lumMod val="95000"/>
+              <a:alpha val="74000"/>
+            </a:schemeClr>
           </a:solidFill>
           <a:ln>
             <a:solidFill>
-              <a:schemeClr val="bg1"/>
+              <a:schemeClr val="accent3">
+                <a:lumMod val="60000"/>
+                <a:lumOff val="40000"/>
+              </a:schemeClr>
             </a:solidFill>
           </a:ln>
         </p:spPr>
@@ -4772,7 +4471,7 @@
             <a:r>
               <a:rPr lang="en-US" sz="1100" dirty="0">
                 <a:solidFill>
-                  <a:schemeClr val="bg1"/>
+                  <a:schemeClr val="tx1"/>
                 </a:solidFill>
                 <a:latin typeface="Arial" panose="020B0604020202020204" pitchFamily="34" charset="0"/>
                 <a:cs typeface="Arial" panose="020B0604020202020204" pitchFamily="34" charset="0"/>
@@ -4782,7 +4481,7 @@
             <a:r>
               <a:rPr lang="zh-CN" altLang="en-US" sz="1100" dirty="0">
                 <a:solidFill>
-                  <a:schemeClr val="bg1"/>
+                  <a:schemeClr val="tx1"/>
                 </a:solidFill>
                 <a:latin typeface="Arial" panose="020B0604020202020204" pitchFamily="34" charset="0"/>
                 <a:cs typeface="Arial" panose="020B0604020202020204" pitchFamily="34" charset="0"/>
@@ -4792,7 +4491,7 @@
             <a:r>
               <a:rPr lang="en-US" altLang="zh-CN" sz="1100" dirty="0">
                 <a:solidFill>
-                  <a:schemeClr val="bg1"/>
+                  <a:schemeClr val="tx1"/>
                 </a:solidFill>
                 <a:latin typeface="Arial" panose="020B0604020202020204" pitchFamily="34" charset="0"/>
                 <a:cs typeface="Arial" panose="020B0604020202020204" pitchFamily="34" charset="0"/>
@@ -4802,7 +4501,7 @@
             <a:r>
               <a:rPr lang="en-US" sz="1100" dirty="0">
                 <a:solidFill>
-                  <a:schemeClr val="bg1"/>
+                  <a:schemeClr val="tx1"/>
                 </a:solidFill>
                 <a:latin typeface="Arial" panose="020B0604020202020204" pitchFamily="34" charset="0"/>
                 <a:cs typeface="Arial" panose="020B0604020202020204" pitchFamily="34" charset="0"/>
@@ -4826,18 +4525,24 @@
         </p:nvSpPr>
         <p:spPr>
           <a:xfrm>
-            <a:off x="2491786" y="8854021"/>
-            <a:ext cx="4245613" cy="628174"/>
+            <a:off x="2491786" y="10156109"/>
+            <a:ext cx="5178545" cy="920905"/>
           </a:xfrm>
           <a:prstGeom prst="rect">
             <a:avLst/>
           </a:prstGeom>
           <a:solidFill>
-            <a:srgbClr val="4270C3"/>
+            <a:schemeClr val="bg1">
+              <a:lumMod val="95000"/>
+              <a:alpha val="74000"/>
+            </a:schemeClr>
           </a:solidFill>
           <a:ln>
             <a:solidFill>
-              <a:schemeClr val="bg1"/>
+              <a:schemeClr val="accent3">
+                <a:lumMod val="60000"/>
+                <a:lumOff val="40000"/>
+              </a:schemeClr>
             </a:solidFill>
           </a:ln>
         </p:spPr>
@@ -4858,7 +4563,7 @@
           </a:fontRef>
         </p:style>
         <p:txBody>
-          <a:bodyPr rot="0" spcFirstLastPara="0" vertOverflow="overflow" horzOverflow="overflow" vert="horz" wrap="square" lIns="91440" tIns="45720" rIns="91440" bIns="45720" numCol="1" spcCol="0" rtlCol="0" fromWordArt="0" anchor="ctr" anchorCtr="0" forceAA="0" compatLnSpc="1">
+          <a:bodyPr rot="0" spcFirstLastPara="0" vertOverflow="overflow" horzOverflow="overflow" vert="horz" wrap="square" lIns="91440" tIns="45720" rIns="91440" bIns="45720" numCol="1" spcCol="0" rtlCol="0" fromWordArt="0" anchor="t" anchorCtr="0" forceAA="0" compatLnSpc="1">
             <a:prstTxWarp prst="textNoShape">
               <a:avLst/>
             </a:prstTxWarp>
@@ -4870,7 +4575,7 @@
             <a:r>
               <a:rPr lang="en-US" altLang="zh-CN" sz="1100" dirty="0">
                 <a:solidFill>
-                  <a:schemeClr val="bg1"/>
+                  <a:schemeClr val="tx1"/>
                 </a:solidFill>
                 <a:latin typeface="Arial" panose="020B0604020202020204" pitchFamily="34" charset="0"/>
                 <a:cs typeface="Arial" panose="020B0604020202020204" pitchFamily="34" charset="0"/>
@@ -4880,7 +4585,7 @@
             <a:r>
               <a:rPr lang="zh-CN" altLang="en-US" sz="1100" dirty="0">
                 <a:solidFill>
-                  <a:schemeClr val="bg1"/>
+                  <a:schemeClr val="tx1"/>
                 </a:solidFill>
                 <a:latin typeface="Arial" panose="020B0604020202020204" pitchFamily="34" charset="0"/>
                 <a:cs typeface="Arial" panose="020B0604020202020204" pitchFamily="34" charset="0"/>
@@ -4890,7 +4595,7 @@
             <a:r>
               <a:rPr lang="en-US" altLang="zh-CN" sz="1100" dirty="0">
                 <a:solidFill>
-                  <a:schemeClr val="bg1"/>
+                  <a:schemeClr val="tx1"/>
                 </a:solidFill>
                 <a:latin typeface="Arial" panose="020B0604020202020204" pitchFamily="34" charset="0"/>
                 <a:cs typeface="Arial" panose="020B0604020202020204" pitchFamily="34" charset="0"/>
@@ -4900,7 +4605,7 @@
             <a:r>
               <a:rPr lang="zh-CN" altLang="en-US" sz="1100" dirty="0">
                 <a:solidFill>
-                  <a:schemeClr val="bg1"/>
+                  <a:schemeClr val="tx1"/>
                 </a:solidFill>
                 <a:latin typeface="Arial" panose="020B0604020202020204" pitchFamily="34" charset="0"/>
                 <a:cs typeface="Arial" panose="020B0604020202020204" pitchFamily="34" charset="0"/>
@@ -4910,7 +4615,7 @@
             <a:r>
               <a:rPr lang="en-US" altLang="zh-CN" sz="1100" dirty="0">
                 <a:solidFill>
-                  <a:schemeClr val="bg1"/>
+                  <a:schemeClr val="tx1"/>
                 </a:solidFill>
                 <a:latin typeface="Arial" panose="020B0604020202020204" pitchFamily="34" charset="0"/>
                 <a:cs typeface="Arial" panose="020B0604020202020204" pitchFamily="34" charset="0"/>
@@ -4920,7 +4625,7 @@
             <a:r>
               <a:rPr lang="en-US" sz="1100" dirty="0">
                 <a:solidFill>
-                  <a:schemeClr val="bg1"/>
+                  <a:schemeClr val="tx1"/>
                 </a:solidFill>
                 <a:latin typeface="Arial" panose="020B0604020202020204" pitchFamily="34" charset="0"/>
                 <a:cs typeface="Arial" panose="020B0604020202020204" pitchFamily="34" charset="0"/>
@@ -4929,67 +4634,7 @@
             </a:r>
             <a:endParaRPr lang="en-US" altLang="zh-CN" sz="1100" dirty="0">
               <a:solidFill>
-                <a:schemeClr val="bg1"/>
-              </a:solidFill>
-              <a:latin typeface="Arial" panose="020B0604020202020204" pitchFamily="34" charset="0"/>
-              <a:cs typeface="Arial" panose="020B0604020202020204" pitchFamily="34" charset="0"/>
-            </a:endParaRPr>
-          </a:p>
-          <a:p>
-            <a:pPr algn="ctr"/>
-            <a:r>
-              <a:rPr lang="en-US" altLang="zh-CN" sz="1100" dirty="0">
-                <a:solidFill>
-                  <a:schemeClr val="bg1"/>
-                </a:solidFill>
-                <a:latin typeface="Arial" panose="020B0604020202020204" pitchFamily="34" charset="0"/>
-                <a:cs typeface="Arial" panose="020B0604020202020204" pitchFamily="34" charset="0"/>
-              </a:rPr>
-              <a:t>(Script: </a:t>
-            </a:r>
-            <a:r>
-              <a:rPr lang="en-US" sz="1100" dirty="0">
-                <a:solidFill>
-                  <a:schemeClr val="bg1"/>
-                </a:solidFill>
-                <a:latin typeface="Arial" panose="020B0604020202020204" pitchFamily="34" charset="0"/>
-                <a:cs typeface="Arial" panose="020B0604020202020204" pitchFamily="34" charset="0"/>
-              </a:rPr>
-              <a:t>zowe-configure-</a:t>
-            </a:r>
-            <a:r>
-              <a:rPr lang="en-US" sz="1100" dirty="0" err="1">
-                <a:solidFill>
-                  <a:schemeClr val="bg1"/>
-                </a:solidFill>
-                <a:latin typeface="Arial" panose="020B0604020202020204" pitchFamily="34" charset="0"/>
-                <a:cs typeface="Arial" panose="020B0604020202020204" pitchFamily="34" charset="0"/>
-              </a:rPr>
-              <a:t>instance.s</a:t>
-            </a:r>
-            <a:r>
-              <a:rPr lang="en-US" altLang="zh-CN" sz="1100" dirty="0" err="1">
-                <a:solidFill>
-                  <a:schemeClr val="bg1"/>
-                </a:solidFill>
-                <a:latin typeface="Arial" panose="020B0604020202020204" pitchFamily="34" charset="0"/>
-                <a:cs typeface="Arial" panose="020B0604020202020204" pitchFamily="34" charset="0"/>
-              </a:rPr>
-              <a:t>h</a:t>
-            </a:r>
-            <a:r>
-              <a:rPr lang="en-US" altLang="zh-CN" sz="1100" dirty="0">
-                <a:solidFill>
-                  <a:schemeClr val="bg1"/>
-                </a:solidFill>
-                <a:latin typeface="Arial" panose="020B0604020202020204" pitchFamily="34" charset="0"/>
-                <a:cs typeface="Arial" panose="020B0604020202020204" pitchFamily="34" charset="0"/>
-              </a:rPr>
-              <a:t>)</a:t>
-            </a:r>
-            <a:endParaRPr lang="en-US" sz="1100" dirty="0">
-              <a:solidFill>
-                <a:schemeClr val="bg1"/>
+                <a:schemeClr val="tx1"/>
               </a:solidFill>
               <a:latin typeface="Arial" panose="020B0604020202020204" pitchFamily="34" charset="0"/>
               <a:cs typeface="Arial" panose="020B0604020202020204" pitchFamily="34" charset="0"/>
@@ -5011,17 +4656,25 @@
         </p:nvSpPr>
         <p:spPr>
           <a:xfrm>
-            <a:off x="2505124" y="10705280"/>
-            <a:ext cx="4232259" cy="558971"/>
+            <a:off x="2505125" y="12491831"/>
+            <a:ext cx="5158421" cy="558971"/>
           </a:xfrm>
           <a:prstGeom prst="rect">
             <a:avLst/>
           </a:prstGeom>
           <a:solidFill>
-            <a:srgbClr val="4270C3"/>
+            <a:schemeClr val="bg1">
+              <a:lumMod val="95000"/>
+              <a:alpha val="74000"/>
+            </a:schemeClr>
           </a:solidFill>
           <a:ln>
-            <a:noFill/>
+            <a:solidFill>
+              <a:schemeClr val="accent3">
+                <a:lumMod val="60000"/>
+                <a:lumOff val="40000"/>
+              </a:schemeClr>
+            </a:solidFill>
           </a:ln>
         </p:spPr>
         <p:style>
@@ -5053,7 +4706,7 @@
             <a:r>
               <a:rPr lang="en-US" altLang="zh-CN" sz="1100" dirty="0">
                 <a:solidFill>
-                  <a:schemeClr val="bg1"/>
+                  <a:schemeClr val="tx1"/>
                 </a:solidFill>
                 <a:latin typeface="Arial" panose="020B0604020202020204" pitchFamily="34" charset="0"/>
                 <a:cs typeface="Arial" panose="020B0604020202020204" pitchFamily="34" charset="0"/>
@@ -5063,7 +4716,7 @@
             <a:r>
               <a:rPr lang="zh-CN" altLang="en-US" sz="1100" dirty="0">
                 <a:solidFill>
-                  <a:schemeClr val="bg1"/>
+                  <a:schemeClr val="tx1"/>
                 </a:solidFill>
                 <a:latin typeface="Arial" panose="020B0604020202020204" pitchFamily="34" charset="0"/>
                 <a:cs typeface="Arial" panose="020B0604020202020204" pitchFamily="34" charset="0"/>
@@ -5073,7 +4726,7 @@
             <a:r>
               <a:rPr lang="en-US" altLang="zh-CN" sz="1100" dirty="0">
                 <a:solidFill>
-                  <a:schemeClr val="bg1"/>
+                  <a:schemeClr val="tx1"/>
                 </a:solidFill>
                 <a:latin typeface="Arial" panose="020B0604020202020204" pitchFamily="34" charset="0"/>
                 <a:cs typeface="Arial" panose="020B0604020202020204" pitchFamily="34" charset="0"/>
@@ -5083,7 +4736,7 @@
             <a:r>
               <a:rPr lang="zh-CN" altLang="en-US" sz="1100" dirty="0">
                 <a:solidFill>
-                  <a:schemeClr val="bg1"/>
+                  <a:schemeClr val="tx1"/>
                 </a:solidFill>
                 <a:latin typeface="Arial" panose="020B0604020202020204" pitchFamily="34" charset="0"/>
                 <a:cs typeface="Arial" panose="020B0604020202020204" pitchFamily="34" charset="0"/>
@@ -5093,7 +4746,7 @@
             <a:r>
               <a:rPr lang="en-US" altLang="zh-CN" sz="1100" dirty="0" err="1">
                 <a:solidFill>
-                  <a:schemeClr val="bg1"/>
+                  <a:schemeClr val="tx1"/>
                 </a:solidFill>
                 <a:latin typeface="Arial" panose="020B0604020202020204" pitchFamily="34" charset="0"/>
                 <a:cs typeface="Arial" panose="020B0604020202020204" pitchFamily="34" charset="0"/>
@@ -5103,7 +4756,7 @@
             <a:r>
               <a:rPr lang="zh-CN" altLang="en-US" sz="1100" dirty="0">
                 <a:solidFill>
-                  <a:schemeClr val="bg1"/>
+                  <a:schemeClr val="tx1"/>
                 </a:solidFill>
                 <a:latin typeface="Arial" panose="020B0604020202020204" pitchFamily="34" charset="0"/>
                 <a:cs typeface="Arial" panose="020B0604020202020204" pitchFamily="34" charset="0"/>
@@ -5113,7 +4766,7 @@
             <a:r>
               <a:rPr lang="en-US" altLang="zh-CN" sz="1100" dirty="0">
                 <a:solidFill>
-                  <a:schemeClr val="bg1"/>
+                  <a:schemeClr val="tx1"/>
                 </a:solidFill>
                 <a:latin typeface="Arial" panose="020B0604020202020204" pitchFamily="34" charset="0"/>
                 <a:cs typeface="Arial" panose="020B0604020202020204" pitchFamily="34" charset="0"/>
@@ -5123,7 +4776,7 @@
             <a:r>
               <a:rPr lang="zh-CN" altLang="en-US" sz="1100" dirty="0">
                 <a:solidFill>
-                  <a:schemeClr val="bg1"/>
+                  <a:schemeClr val="tx1"/>
                 </a:solidFill>
                 <a:latin typeface="Arial" panose="020B0604020202020204" pitchFamily="34" charset="0"/>
                 <a:cs typeface="Arial" panose="020B0604020202020204" pitchFamily="34" charset="0"/>
@@ -5133,7 +4786,7 @@
             <a:r>
               <a:rPr lang="en-US" altLang="zh-CN" sz="1100" dirty="0">
                 <a:solidFill>
-                  <a:schemeClr val="bg1"/>
+                  <a:schemeClr val="tx1"/>
                 </a:solidFill>
                 <a:latin typeface="Arial" panose="020B0604020202020204" pitchFamily="34" charset="0"/>
                 <a:cs typeface="Arial" panose="020B0604020202020204" pitchFamily="34" charset="0"/>
@@ -5146,7 +4799,7 @@
             <a:r>
               <a:rPr lang="en-US" altLang="zh-CN" sz="1100" dirty="0">
                 <a:solidFill>
-                  <a:schemeClr val="bg1"/>
+                  <a:srgbClr val="0070C0"/>
                 </a:solidFill>
                 <a:latin typeface="Arial" panose="020B0604020202020204" pitchFamily="34" charset="0"/>
                 <a:cs typeface="Arial" panose="020B0604020202020204" pitchFamily="34" charset="0"/>
@@ -5156,7 +4809,7 @@
             <a:r>
               <a:rPr lang="zh-CN" altLang="en-US" sz="1100" dirty="0">
                 <a:solidFill>
-                  <a:schemeClr val="bg1"/>
+                  <a:srgbClr val="0070C0"/>
                 </a:solidFill>
                 <a:latin typeface="Arial" panose="020B0604020202020204" pitchFamily="34" charset="0"/>
                 <a:cs typeface="Arial" panose="020B0604020202020204" pitchFamily="34" charset="0"/>
@@ -5166,7 +4819,7 @@
             <a:r>
               <a:rPr lang="en-US" altLang="zh-CN" sz="1100" dirty="0" err="1">
                 <a:solidFill>
-                  <a:schemeClr val="bg1"/>
+                  <a:srgbClr val="0070C0"/>
                 </a:solidFill>
                 <a:latin typeface="Arial" panose="020B0604020202020204" pitchFamily="34" charset="0"/>
                 <a:cs typeface="Arial" panose="020B0604020202020204" pitchFamily="34" charset="0"/>
@@ -5176,7 +4829,7 @@
             <a:r>
               <a:rPr lang="en-US" altLang="zh-CN" sz="1100" dirty="0">
                 <a:solidFill>
-                  <a:schemeClr val="bg1"/>
+                  <a:srgbClr val="0070C0"/>
                 </a:solidFill>
                 <a:latin typeface="Arial" panose="020B0604020202020204" pitchFamily="34" charset="0"/>
                 <a:cs typeface="Arial" panose="020B0604020202020204" pitchFamily="34" charset="0"/>
@@ -5186,7 +4839,7 @@
             <a:r>
               <a:rPr lang="en-US" altLang="zh-CN" sz="1100" dirty="0" err="1">
                 <a:solidFill>
-                  <a:schemeClr val="bg1"/>
+                  <a:srgbClr val="0070C0"/>
                 </a:solidFill>
                 <a:latin typeface="Arial" panose="020B0604020202020204" pitchFamily="34" charset="0"/>
                 <a:cs typeface="Arial" panose="020B0604020202020204" pitchFamily="34" charset="0"/>
@@ -5196,7 +4849,7 @@
             <a:r>
               <a:rPr lang="en-US" altLang="zh-CN" sz="1100" dirty="0">
                 <a:solidFill>
-                  <a:schemeClr val="bg1"/>
+                  <a:srgbClr val="0070C0"/>
                 </a:solidFill>
                 <a:latin typeface="Arial" panose="020B0604020202020204" pitchFamily="34" charset="0"/>
                 <a:cs typeface="Arial" panose="020B0604020202020204" pitchFamily="34" charset="0"/>
@@ -5206,98 +4859,6 @@
           </a:p>
         </p:txBody>
       </p:sp>
-      <p:cxnSp>
-        <p:nvCxnSpPr>
-          <p:cNvPr id="47" name="Straight Arrow Connector 46">
-            <a:extLst>
-              <a:ext uri="{FF2B5EF4-FFF2-40B4-BE49-F238E27FC236}">
-                <a16:creationId xmlns:a16="http://schemas.microsoft.com/office/drawing/2014/main" id="{178E77DD-87C1-834F-86C4-4B8AFF4CDD43}"/>
-              </a:ext>
-            </a:extLst>
-          </p:cNvPr>
-          <p:cNvCxnSpPr>
-            <a:cxnSpLocks/>
-          </p:cNvCxnSpPr>
-          <p:nvPr/>
-        </p:nvCxnSpPr>
-        <p:spPr>
-          <a:xfrm>
-            <a:off x="4607892" y="8589741"/>
-            <a:ext cx="0" cy="212985"/>
-          </a:xfrm>
-          <a:prstGeom prst="straightConnector1">
-            <a:avLst/>
-          </a:prstGeom>
-          <a:ln>
-            <a:solidFill>
-              <a:schemeClr val="bg2">
-                <a:lumMod val="25000"/>
-              </a:schemeClr>
-            </a:solidFill>
-            <a:tailEnd type="triangle"/>
-          </a:ln>
-        </p:spPr>
-        <p:style>
-          <a:lnRef idx="1">
-            <a:schemeClr val="accent1"/>
-          </a:lnRef>
-          <a:fillRef idx="0">
-            <a:schemeClr val="accent1"/>
-          </a:fillRef>
-          <a:effectRef idx="0">
-            <a:schemeClr val="accent1"/>
-          </a:effectRef>
-          <a:fontRef idx="minor">
-            <a:schemeClr val="tx1"/>
-          </a:fontRef>
-        </p:style>
-      </p:cxnSp>
-      <p:cxnSp>
-        <p:nvCxnSpPr>
-          <p:cNvPr id="48" name="Straight Arrow Connector 47">
-            <a:extLst>
-              <a:ext uri="{FF2B5EF4-FFF2-40B4-BE49-F238E27FC236}">
-                <a16:creationId xmlns:a16="http://schemas.microsoft.com/office/drawing/2014/main" id="{8DADF49F-B169-8649-BE32-7A34A720EC2C}"/>
-              </a:ext>
-            </a:extLst>
-          </p:cNvPr>
-          <p:cNvCxnSpPr>
-            <a:cxnSpLocks/>
-          </p:cNvCxnSpPr>
-          <p:nvPr/>
-        </p:nvCxnSpPr>
-        <p:spPr>
-          <a:xfrm>
-            <a:off x="4607892" y="9508752"/>
-            <a:ext cx="0" cy="212985"/>
-          </a:xfrm>
-          <a:prstGeom prst="straightConnector1">
-            <a:avLst/>
-          </a:prstGeom>
-          <a:ln>
-            <a:solidFill>
-              <a:schemeClr val="bg2">
-                <a:lumMod val="25000"/>
-              </a:schemeClr>
-            </a:solidFill>
-            <a:tailEnd type="triangle"/>
-          </a:ln>
-        </p:spPr>
-        <p:style>
-          <a:lnRef idx="1">
-            <a:schemeClr val="accent1"/>
-          </a:lnRef>
-          <a:fillRef idx="0">
-            <a:schemeClr val="accent1"/>
-          </a:fillRef>
-          <a:effectRef idx="0">
-            <a:schemeClr val="accent1"/>
-          </a:effectRef>
-          <a:fontRef idx="minor">
-            <a:schemeClr val="tx1"/>
-          </a:fontRef>
-        </p:style>
-      </p:cxnSp>
       <p:sp>
         <p:nvSpPr>
           <p:cNvPr id="49" name="Rectangle 48">
@@ -5312,17 +4873,25 @@
         </p:nvSpPr>
         <p:spPr>
           <a:xfrm>
-            <a:off x="2498331" y="9756583"/>
-            <a:ext cx="4239055" cy="641821"/>
+            <a:off x="2498332" y="11484142"/>
+            <a:ext cx="5171999" cy="641821"/>
           </a:xfrm>
           <a:prstGeom prst="rect">
             <a:avLst/>
           </a:prstGeom>
           <a:solidFill>
-            <a:srgbClr val="4270C3"/>
+            <a:schemeClr val="bg1">
+              <a:lumMod val="95000"/>
+              <a:alpha val="74000"/>
+            </a:schemeClr>
           </a:solidFill>
           <a:ln>
-            <a:noFill/>
+            <a:solidFill>
+              <a:schemeClr val="accent3">
+                <a:lumMod val="60000"/>
+                <a:lumOff val="40000"/>
+              </a:schemeClr>
+            </a:solidFill>
           </a:ln>
         </p:spPr>
         <p:style>
@@ -5354,7 +4923,7 @@
             <a:r>
               <a:rPr lang="en-US" altLang="zh-CN" sz="1100" dirty="0">
                 <a:solidFill>
-                  <a:schemeClr val="bg1"/>
+                  <a:schemeClr val="tx1"/>
                 </a:solidFill>
                 <a:latin typeface="Arial" panose="020B0604020202020204" pitchFamily="34" charset="0"/>
                 <a:cs typeface="Arial" panose="020B0604020202020204" pitchFamily="34" charset="0"/>
@@ -5364,7 +4933,7 @@
             <a:r>
               <a:rPr lang="en-US" altLang="zh-CN" sz="1100" dirty="0" err="1">
                 <a:solidFill>
-                  <a:schemeClr val="bg1"/>
+                  <a:schemeClr val="tx1"/>
                 </a:solidFill>
                 <a:latin typeface="Arial" panose="020B0604020202020204" pitchFamily="34" charset="0"/>
                 <a:cs typeface="Arial" panose="020B0604020202020204" pitchFamily="34" charset="0"/>
@@ -5374,7 +4943,7 @@
             <a:r>
               <a:rPr lang="en-US" altLang="zh-CN" sz="1100" dirty="0">
                 <a:solidFill>
-                  <a:schemeClr val="bg1"/>
+                  <a:schemeClr val="tx1"/>
                 </a:solidFill>
                 <a:latin typeface="Arial" panose="020B0604020202020204" pitchFamily="34" charset="0"/>
                 <a:cs typeface="Arial" panose="020B0604020202020204" pitchFamily="34" charset="0"/>
@@ -5387,7 +4956,7 @@
             <a:r>
               <a:rPr lang="en-US" altLang="zh-CN" sz="1100" dirty="0">
                 <a:solidFill>
-                  <a:schemeClr val="bg1"/>
+                  <a:schemeClr val="tx1"/>
                 </a:solidFill>
                 <a:latin typeface="Arial" panose="020B0604020202020204" pitchFamily="34" charset="0"/>
                 <a:cs typeface="Arial" panose="020B0604020202020204" pitchFamily="34" charset="0"/>
@@ -5397,7 +4966,7 @@
             <a:r>
               <a:rPr lang="zh-CN" altLang="en-US" sz="1100" dirty="0">
                 <a:solidFill>
-                  <a:schemeClr val="bg1"/>
+                  <a:schemeClr val="tx1"/>
                 </a:solidFill>
                 <a:latin typeface="Arial" panose="020B0604020202020204" pitchFamily="34" charset="0"/>
                 <a:cs typeface="Arial" panose="020B0604020202020204" pitchFamily="34" charset="0"/>
@@ -5407,7 +4976,7 @@
             <a:r>
               <a:rPr lang="en-US" altLang="zh-CN" sz="1100" dirty="0">
                 <a:solidFill>
-                  <a:schemeClr val="bg1"/>
+                  <a:schemeClr val="tx1"/>
                 </a:solidFill>
                 <a:latin typeface="Arial" panose="020B0604020202020204" pitchFamily="34" charset="0"/>
                 <a:cs typeface="Arial" panose="020B0604020202020204" pitchFamily="34" charset="0"/>
@@ -5417,7 +4986,7 @@
             <a:r>
               <a:rPr lang="zh-CN" altLang="en-US" sz="1100" dirty="0">
                 <a:solidFill>
-                  <a:schemeClr val="bg1"/>
+                  <a:schemeClr val="tx1"/>
                 </a:solidFill>
                 <a:latin typeface="Arial" panose="020B0604020202020204" pitchFamily="34" charset="0"/>
                 <a:cs typeface="Arial" panose="020B0604020202020204" pitchFamily="34" charset="0"/>
@@ -5427,7 +4996,7 @@
             <a:r>
               <a:rPr lang="en-US" altLang="zh-CN" sz="1100" dirty="0">
                 <a:solidFill>
-                  <a:schemeClr val="bg1"/>
+                  <a:schemeClr val="tx1"/>
                 </a:solidFill>
                 <a:latin typeface="Arial" panose="020B0604020202020204" pitchFamily="34" charset="0"/>
                 <a:cs typeface="Arial" panose="020B0604020202020204" pitchFamily="34" charset="0"/>
@@ -5437,7 +5006,7 @@
             <a:r>
               <a:rPr lang="zh-CN" altLang="en-US" sz="1100" dirty="0">
                 <a:solidFill>
-                  <a:schemeClr val="bg1"/>
+                  <a:schemeClr val="tx1"/>
                 </a:solidFill>
                 <a:latin typeface="Arial" panose="020B0604020202020204" pitchFamily="34" charset="0"/>
                 <a:cs typeface="Arial" panose="020B0604020202020204" pitchFamily="34" charset="0"/>
@@ -5447,7 +5016,7 @@
             <a:r>
               <a:rPr lang="en-US" altLang="zh-CN" sz="1100" dirty="0">
                 <a:solidFill>
-                  <a:schemeClr val="bg1"/>
+                  <a:schemeClr val="tx1"/>
                 </a:solidFill>
                 <a:latin typeface="Arial" panose="020B0604020202020204" pitchFamily="34" charset="0"/>
                 <a:cs typeface="Arial" panose="020B0604020202020204" pitchFamily="34" charset="0"/>
@@ -5457,7 +5026,7 @@
             <a:r>
               <a:rPr lang="zh-CN" altLang="en-US" sz="1100" dirty="0">
                 <a:solidFill>
-                  <a:schemeClr val="bg1"/>
+                  <a:schemeClr val="tx1"/>
                 </a:solidFill>
                 <a:latin typeface="Arial" panose="020B0604020202020204" pitchFamily="34" charset="0"/>
                 <a:cs typeface="Arial" panose="020B0604020202020204" pitchFamily="34" charset="0"/>
@@ -5467,7 +5036,7 @@
             <a:r>
               <a:rPr lang="en-US" altLang="zh-CN" sz="1100" dirty="0" err="1">
                 <a:solidFill>
-                  <a:schemeClr val="bg1"/>
+                  <a:schemeClr val="tx1"/>
                 </a:solidFill>
                 <a:latin typeface="Arial" panose="020B0604020202020204" pitchFamily="34" charset="0"/>
                 <a:cs typeface="Arial" panose="020B0604020202020204" pitchFamily="34" charset="0"/>
@@ -5477,7 +5046,7 @@
             <a:r>
               <a:rPr lang="zh-CN" altLang="en-US" sz="1100" dirty="0">
                 <a:solidFill>
-                  <a:schemeClr val="bg1"/>
+                  <a:schemeClr val="tx1"/>
                 </a:solidFill>
                 <a:latin typeface="Arial" panose="020B0604020202020204" pitchFamily="34" charset="0"/>
                 <a:cs typeface="Arial" panose="020B0604020202020204" pitchFamily="34" charset="0"/>
@@ -5487,7 +5056,7 @@
             <a:r>
               <a:rPr lang="en-US" altLang="zh-CN" sz="1100" dirty="0">
                 <a:solidFill>
-                  <a:schemeClr val="bg1"/>
+                  <a:schemeClr val="tx1"/>
                 </a:solidFill>
                 <a:latin typeface="Arial" panose="020B0604020202020204" pitchFamily="34" charset="0"/>
                 <a:cs typeface="Arial" panose="020B0604020202020204" pitchFamily="34" charset="0"/>
@@ -5497,7 +5066,7 @@
             <a:r>
               <a:rPr lang="zh-CN" altLang="en-US" sz="1100" dirty="0">
                 <a:solidFill>
-                  <a:schemeClr val="bg1"/>
+                  <a:schemeClr val="tx1"/>
                 </a:solidFill>
                 <a:latin typeface="Arial" panose="020B0604020202020204" pitchFamily="34" charset="0"/>
                 <a:cs typeface="Arial" panose="020B0604020202020204" pitchFamily="34" charset="0"/>
@@ -5507,7 +5076,7 @@
             <a:r>
               <a:rPr lang="en-US" altLang="zh-CN" sz="1100" dirty="0">
                 <a:solidFill>
-                  <a:schemeClr val="bg1"/>
+                  <a:schemeClr val="tx1"/>
                 </a:solidFill>
                 <a:latin typeface="Arial" panose="020B0604020202020204" pitchFamily="34" charset="0"/>
                 <a:cs typeface="Arial" panose="020B0604020202020204" pitchFamily="34" charset="0"/>
@@ -5517,7 +5086,7 @@
             <a:r>
               <a:rPr lang="zh-CN" altLang="en-US" sz="1100" dirty="0">
                 <a:solidFill>
-                  <a:schemeClr val="bg1"/>
+                  <a:schemeClr val="tx1"/>
                 </a:solidFill>
                 <a:latin typeface="Arial" panose="020B0604020202020204" pitchFamily="34" charset="0"/>
                 <a:cs typeface="Arial" panose="020B0604020202020204" pitchFamily="34" charset="0"/>
@@ -5527,7 +5096,7 @@
             <a:r>
               <a:rPr lang="en-US" altLang="zh-CN" sz="1100" dirty="0">
                 <a:solidFill>
-                  <a:schemeClr val="bg1"/>
+                  <a:schemeClr val="tx1"/>
                 </a:solidFill>
                 <a:latin typeface="Arial" panose="020B0604020202020204" pitchFamily="34" charset="0"/>
                 <a:cs typeface="Arial" panose="020B0604020202020204" pitchFamily="34" charset="0"/>
@@ -5540,7 +5109,7 @@
             <a:r>
               <a:rPr lang="en-US" altLang="zh-CN" sz="1100" dirty="0">
                 <a:solidFill>
-                  <a:schemeClr val="bg1"/>
+                  <a:srgbClr val="0070C0"/>
                 </a:solidFill>
                 <a:latin typeface="Arial" panose="020B0604020202020204" pitchFamily="34" charset="0"/>
                 <a:cs typeface="Arial" panose="020B0604020202020204" pitchFamily="34" charset="0"/>
@@ -5550,7 +5119,7 @@
             <a:r>
               <a:rPr lang="en-US" sz="1100" dirty="0" err="1">
                 <a:solidFill>
-                  <a:schemeClr val="bg1"/>
+                  <a:srgbClr val="0070C0"/>
                 </a:solidFill>
                 <a:latin typeface="Arial" panose="020B0604020202020204" pitchFamily="34" charset="0"/>
                 <a:cs typeface="Arial" panose="020B0604020202020204" pitchFamily="34" charset="0"/>
@@ -5560,7 +5129,7 @@
             <a:r>
               <a:rPr lang="en-US" sz="1100" dirty="0">
                 <a:solidFill>
-                  <a:schemeClr val="bg1"/>
+                  <a:srgbClr val="0070C0"/>
                 </a:solidFill>
                 <a:latin typeface="Arial" panose="020B0604020202020204" pitchFamily="34" charset="0"/>
                 <a:cs typeface="Arial" panose="020B0604020202020204" pitchFamily="34" charset="0"/>
@@ -5570,7 +5139,7 @@
             <a:r>
               <a:rPr lang="en-US" altLang="zh-CN" sz="1100" dirty="0">
                 <a:solidFill>
-                  <a:schemeClr val="bg1"/>
+                  <a:srgbClr val="0070C0"/>
                 </a:solidFill>
                 <a:latin typeface="Arial" panose="020B0604020202020204" pitchFamily="34" charset="0"/>
                 <a:cs typeface="Arial" panose="020B0604020202020204" pitchFamily="34" charset="0"/>
@@ -5580,7 +5149,7 @@
             <a:r>
               <a:rPr lang="en-US" altLang="zh-CN" sz="1100" dirty="0" err="1">
                 <a:solidFill>
-                  <a:schemeClr val="bg1"/>
+                  <a:srgbClr val="0070C0"/>
                 </a:solidFill>
                 <a:latin typeface="Arial" panose="020B0604020202020204" pitchFamily="34" charset="0"/>
                 <a:cs typeface="Arial" panose="020B0604020202020204" pitchFamily="34" charset="0"/>
@@ -5590,7 +5159,7 @@
             <a:r>
               <a:rPr lang="en-US" sz="1100" dirty="0" err="1">
                 <a:solidFill>
-                  <a:schemeClr val="bg1"/>
+                  <a:srgbClr val="0070C0"/>
                 </a:solidFill>
                 <a:latin typeface="Arial" panose="020B0604020202020204" pitchFamily="34" charset="0"/>
                 <a:cs typeface="Arial" panose="020B0604020202020204" pitchFamily="34" charset="0"/>
@@ -5600,7 +5169,7 @@
             <a:r>
               <a:rPr lang="en-US" altLang="zh-CN" sz="1100" dirty="0" err="1">
                 <a:solidFill>
-                  <a:schemeClr val="bg1"/>
+                  <a:srgbClr val="0070C0"/>
                 </a:solidFill>
                 <a:latin typeface="Arial" panose="020B0604020202020204" pitchFamily="34" charset="0"/>
                 <a:cs typeface="Arial" panose="020B0604020202020204" pitchFamily="34" charset="0"/>
@@ -5610,7 +5179,7 @@
             <a:r>
               <a:rPr lang="en-US" altLang="zh-CN" sz="1100" dirty="0">
                 <a:solidFill>
-                  <a:schemeClr val="bg1"/>
+                  <a:srgbClr val="0070C0"/>
                 </a:solidFill>
                 <a:latin typeface="Arial" panose="020B0604020202020204" pitchFamily="34" charset="0"/>
                 <a:cs typeface="Arial" panose="020B0604020202020204" pitchFamily="34" charset="0"/>
@@ -5619,7 +5188,7 @@
             </a:r>
             <a:endParaRPr lang="en-US" sz="1100" dirty="0">
               <a:solidFill>
-                <a:schemeClr val="bg1"/>
+                <a:srgbClr val="0070C0"/>
               </a:solidFill>
               <a:latin typeface="Arial" panose="020B0604020202020204" pitchFamily="34" charset="0"/>
               <a:cs typeface="Arial" panose="020B0604020202020204" pitchFamily="34" charset="0"/>
@@ -5627,52 +5196,6 @@
           </a:p>
         </p:txBody>
       </p:sp>
-      <p:cxnSp>
-        <p:nvCxnSpPr>
-          <p:cNvPr id="50" name="Straight Arrow Connector 49">
-            <a:extLst>
-              <a:ext uri="{FF2B5EF4-FFF2-40B4-BE49-F238E27FC236}">
-                <a16:creationId xmlns:a16="http://schemas.microsoft.com/office/drawing/2014/main" id="{4945AA63-82D1-0D46-9A09-6454D3D4EF25}"/>
-              </a:ext>
-            </a:extLst>
-          </p:cNvPr>
-          <p:cNvCxnSpPr>
-            <a:cxnSpLocks/>
-          </p:cNvCxnSpPr>
-          <p:nvPr/>
-        </p:nvCxnSpPr>
-        <p:spPr>
-          <a:xfrm>
-            <a:off x="4607892" y="10435331"/>
-            <a:ext cx="0" cy="212985"/>
-          </a:xfrm>
-          <a:prstGeom prst="straightConnector1">
-            <a:avLst/>
-          </a:prstGeom>
-          <a:ln>
-            <a:solidFill>
-              <a:schemeClr val="bg2">
-                <a:lumMod val="25000"/>
-              </a:schemeClr>
-            </a:solidFill>
-            <a:tailEnd type="triangle"/>
-          </a:ln>
-        </p:spPr>
-        <p:style>
-          <a:lnRef idx="1">
-            <a:schemeClr val="accent1"/>
-          </a:lnRef>
-          <a:fillRef idx="0">
-            <a:schemeClr val="accent1"/>
-          </a:fillRef>
-          <a:effectRef idx="0">
-            <a:schemeClr val="accent1"/>
-          </a:effectRef>
-          <a:fontRef idx="minor">
-            <a:schemeClr val="tx1"/>
-          </a:fontRef>
-        </p:style>
-      </p:cxnSp>
       <p:cxnSp>
         <p:nvCxnSpPr>
           <p:cNvPr id="52" name="Straight Connector 51">
@@ -5689,16 +5212,16 @@
         </p:nvCxnSpPr>
         <p:spPr>
           <a:xfrm>
-            <a:off x="624113" y="6783119"/>
-            <a:ext cx="6113290" cy="0"/>
+            <a:off x="624113" y="6866602"/>
+            <a:ext cx="8072213" cy="0"/>
           </a:xfrm>
           <a:prstGeom prst="line">
             <a:avLst/>
           </a:prstGeom>
           <a:ln>
             <a:solidFill>
-              <a:schemeClr val="bg2">
-                <a:lumMod val="75000"/>
+              <a:schemeClr val="bg1">
+                <a:lumMod val="50000"/>
               </a:schemeClr>
             </a:solidFill>
             <a:prstDash val="dash"/>
@@ -5735,8 +5258,8 @@
         </p:nvCxnSpPr>
         <p:spPr>
           <a:xfrm>
-            <a:off x="624113" y="1471008"/>
-            <a:ext cx="5740480" cy="0"/>
+            <a:off x="624113" y="1583066"/>
+            <a:ext cx="7982472" cy="0"/>
           </a:xfrm>
           <a:prstGeom prst="line">
             <a:avLst/>
@@ -5781,7 +5304,7 @@
         </p:nvCxnSpPr>
         <p:spPr>
           <a:xfrm>
-            <a:off x="4254230" y="1788214"/>
+            <a:off x="4381820" y="1900273"/>
             <a:ext cx="0" cy="258831"/>
           </a:xfrm>
           <a:prstGeom prst="straightConnector1">
@@ -5789,8 +5312,9 @@
           </a:prstGeom>
           <a:ln>
             <a:solidFill>
-              <a:schemeClr val="bg2">
-                <a:lumMod val="25000"/>
+              <a:schemeClr val="tx1">
+                <a:lumMod val="50000"/>
+                <a:lumOff val="50000"/>
               </a:schemeClr>
             </a:solidFill>
             <a:tailEnd type="triangle"/>
@@ -5825,18 +5349,16 @@
         </p:nvSpPr>
         <p:spPr>
           <a:xfrm>
-            <a:off x="3334918" y="615090"/>
+            <a:off x="3462508" y="727149"/>
             <a:ext cx="1958008" cy="558971"/>
           </a:xfrm>
           <a:prstGeom prst="rect">
             <a:avLst/>
           </a:prstGeom>
           <a:solidFill>
-            <a:schemeClr val="accent2">
-              <a:lumMod val="75000"/>
-            </a:schemeClr>
+            <a:srgbClr val="B4D7EE"/>
           </a:solidFill>
-          <a:ln>
+          <a:ln cap="flat">
             <a:noFill/>
           </a:ln>
         </p:spPr>
@@ -5869,7 +5391,7 @@
             <a:r>
               <a:rPr lang="en-US" altLang="zh-CN" sz="1100" dirty="0">
                 <a:solidFill>
-                  <a:schemeClr val="bg1"/>
+                  <a:schemeClr val="tx1"/>
                 </a:solidFill>
                 <a:latin typeface="Arial" panose="020B0604020202020204" pitchFamily="34" charset="0"/>
                 <a:cs typeface="Arial" panose="020B0604020202020204" pitchFamily="34" charset="0"/>
@@ -5879,7 +5401,7 @@
             <a:r>
               <a:rPr lang="zh-CN" altLang="en-US" sz="1100" dirty="0">
                 <a:solidFill>
-                  <a:schemeClr val="bg1"/>
+                  <a:schemeClr val="tx1"/>
                 </a:solidFill>
                 <a:latin typeface="Arial" panose="020B0604020202020204" pitchFamily="34" charset="0"/>
                 <a:cs typeface="Arial" panose="020B0604020202020204" pitchFamily="34" charset="0"/>
@@ -5889,7 +5411,7 @@
             <a:r>
               <a:rPr lang="en-US" altLang="zh-CN" sz="1100" dirty="0">
                 <a:solidFill>
-                  <a:schemeClr val="bg1"/>
+                  <a:schemeClr val="tx1"/>
                 </a:solidFill>
                 <a:latin typeface="Arial" panose="020B0604020202020204" pitchFamily="34" charset="0"/>
                 <a:cs typeface="Arial" panose="020B0604020202020204" pitchFamily="34" charset="0"/>
@@ -5899,7 +5421,7 @@
             <a:r>
               <a:rPr lang="zh-CN" altLang="en-US" sz="1100" dirty="0">
                 <a:solidFill>
-                  <a:schemeClr val="bg1"/>
+                  <a:schemeClr val="tx1"/>
                 </a:solidFill>
                 <a:latin typeface="Arial" panose="020B0604020202020204" pitchFamily="34" charset="0"/>
                 <a:cs typeface="Arial" panose="020B0604020202020204" pitchFamily="34" charset="0"/>
@@ -5909,7 +5431,7 @@
             <a:r>
               <a:rPr lang="en-US" altLang="zh-CN" sz="1100" dirty="0">
                 <a:solidFill>
-                  <a:schemeClr val="bg1"/>
+                  <a:schemeClr val="tx1"/>
                 </a:solidFill>
                 <a:latin typeface="Arial" panose="020B0604020202020204" pitchFamily="34" charset="0"/>
                 <a:cs typeface="Arial" panose="020B0604020202020204" pitchFamily="34" charset="0"/>
@@ -5919,7 +5441,7 @@
             <a:r>
               <a:rPr lang="zh-CN" altLang="en-US" sz="1100" dirty="0">
                 <a:solidFill>
-                  <a:schemeClr val="bg1"/>
+                  <a:schemeClr val="tx1"/>
                 </a:solidFill>
                 <a:latin typeface="Arial" panose="020B0604020202020204" pitchFamily="34" charset="0"/>
                 <a:cs typeface="Arial" panose="020B0604020202020204" pitchFamily="34" charset="0"/>
@@ -5929,7 +5451,7 @@
             <a:r>
               <a:rPr lang="en-US" altLang="zh-CN" sz="1100" dirty="0">
                 <a:solidFill>
-                  <a:schemeClr val="bg1"/>
+                  <a:schemeClr val="tx1"/>
                 </a:solidFill>
                 <a:latin typeface="Arial" panose="020B0604020202020204" pitchFamily="34" charset="0"/>
                 <a:cs typeface="Arial" panose="020B0604020202020204" pitchFamily="34" charset="0"/>
@@ -5939,7 +5461,7 @@
             <a:r>
               <a:rPr lang="zh-CN" altLang="en-US" sz="1100" dirty="0">
                 <a:solidFill>
-                  <a:schemeClr val="bg1"/>
+                  <a:schemeClr val="tx1"/>
                 </a:solidFill>
                 <a:latin typeface="Arial" panose="020B0604020202020204" pitchFamily="34" charset="0"/>
                 <a:cs typeface="Arial" panose="020B0604020202020204" pitchFamily="34" charset="0"/>
@@ -5949,7 +5471,7 @@
             <a:r>
               <a:rPr lang="en-US" altLang="zh-CN" sz="1100" dirty="0">
                 <a:solidFill>
-                  <a:schemeClr val="bg1"/>
+                  <a:schemeClr val="tx1"/>
                 </a:solidFill>
                 <a:latin typeface="Arial" panose="020B0604020202020204" pitchFamily="34" charset="0"/>
                 <a:cs typeface="Arial" panose="020B0604020202020204" pitchFamily="34" charset="0"/>
@@ -5959,7 +5481,7 @@
             <a:r>
               <a:rPr lang="zh-CN" altLang="en-US" sz="1100" dirty="0">
                 <a:solidFill>
-                  <a:schemeClr val="bg1"/>
+                  <a:schemeClr val="tx1"/>
                 </a:solidFill>
                 <a:latin typeface="Arial" panose="020B0604020202020204" pitchFamily="34" charset="0"/>
                 <a:cs typeface="Arial" panose="020B0604020202020204" pitchFamily="34" charset="0"/>
@@ -5969,7 +5491,7 @@
             <a:r>
               <a:rPr lang="en-US" altLang="zh-CN" sz="1100" dirty="0">
                 <a:solidFill>
-                  <a:schemeClr val="bg1"/>
+                  <a:schemeClr val="tx1"/>
                 </a:solidFill>
                 <a:latin typeface="Arial" panose="020B0604020202020204" pitchFamily="34" charset="0"/>
                 <a:cs typeface="Arial" panose="020B0604020202020204" pitchFamily="34" charset="0"/>
@@ -5978,7 +5500,7 @@
             </a:r>
             <a:endParaRPr lang="en-US" sz="1100" dirty="0">
               <a:solidFill>
-                <a:schemeClr val="bg1"/>
+                <a:schemeClr val="tx1"/>
               </a:solidFill>
               <a:latin typeface="Arial" panose="020B0604020202020204" pitchFamily="34" charset="0"/>
               <a:cs typeface="Arial" panose="020B0604020202020204" pitchFamily="34" charset="0"/>
@@ -6002,7 +5524,7 @@
         </p:nvCxnSpPr>
         <p:spPr>
           <a:xfrm>
-            <a:off x="4254230" y="1221503"/>
+            <a:off x="4381820" y="1333562"/>
             <a:ext cx="0" cy="212985"/>
           </a:xfrm>
           <a:prstGeom prst="straightConnector1">
@@ -6010,8 +5532,9 @@
           </a:prstGeom>
           <a:ln>
             <a:solidFill>
-              <a:schemeClr val="bg2">
-                <a:lumMod val="25000"/>
+              <a:schemeClr val="tx1">
+                <a:lumMod val="50000"/>
+                <a:lumOff val="50000"/>
               </a:schemeClr>
             </a:solidFill>
             <a:tailEnd type="triangle"/>
@@ -6046,7 +5569,7 @@
         </p:nvSpPr>
         <p:spPr>
           <a:xfrm>
-            <a:off x="606186" y="263775"/>
+            <a:off x="534468" y="375834"/>
             <a:ext cx="2322161" cy="276999"/>
           </a:xfrm>
           <a:prstGeom prst="rect">
@@ -6144,7 +5667,7 @@
         </p:nvSpPr>
         <p:spPr>
           <a:xfrm>
-            <a:off x="624115" y="1538925"/>
+            <a:off x="534468" y="1650984"/>
             <a:ext cx="2566915" cy="276999"/>
           </a:xfrm>
           <a:prstGeom prst="rect">
@@ -6242,8 +5765,8 @@
         </p:nvSpPr>
         <p:spPr>
           <a:xfrm>
-            <a:off x="624114" y="6804740"/>
-            <a:ext cx="1626096" cy="461665"/>
+            <a:off x="534468" y="6916799"/>
+            <a:ext cx="1881011" cy="646331"/>
           </a:xfrm>
           <a:prstGeom prst="rect">
             <a:avLst/>
@@ -6284,6 +5807,12 @@
               </a:rPr>
               <a:t> </a:t>
             </a:r>
+            <a:endParaRPr lang="en-US" altLang="zh-CN" sz="1200" b="1" dirty="0">
+              <a:latin typeface="Arial" panose="020B0604020202020204" pitchFamily="34" charset="0"/>
+              <a:cs typeface="Arial" panose="020B0604020202020204" pitchFamily="34" charset="0"/>
+            </a:endParaRPr>
+          </a:p>
+          <a:p>
             <a:r>
               <a:rPr lang="en-US" altLang="zh-CN" sz="1200" b="1" dirty="0">
                 <a:latin typeface="Arial" panose="020B0604020202020204" pitchFamily="34" charset="0"/>
@@ -6313,25 +5842,67 @@
               <a:t> </a:t>
             </a:r>
             <a:r>
+              <a:rPr lang="en-US" altLang="zh-CN" sz="1200" b="1" dirty="0" err="1">
+                <a:latin typeface="Arial" panose="020B0604020202020204" pitchFamily="34" charset="0"/>
+                <a:cs typeface="Arial" panose="020B0604020202020204" pitchFamily="34" charset="0"/>
+              </a:rPr>
+              <a:t>Zowe</a:t>
+            </a:r>
+            <a:r>
+              <a:rPr lang="zh-CN" altLang="en-US" sz="1200" b="1" dirty="0">
+                <a:latin typeface="Arial" panose="020B0604020202020204" pitchFamily="34" charset="0"/>
+                <a:cs typeface="Arial" panose="020B0604020202020204" pitchFamily="34" charset="0"/>
+              </a:rPr>
+              <a:t> </a:t>
+            </a:r>
+            <a:r>
               <a:rPr lang="en-US" altLang="zh-CN" sz="1200" b="1" dirty="0">
                 <a:latin typeface="Arial" panose="020B0604020202020204" pitchFamily="34" charset="0"/>
                 <a:cs typeface="Arial" panose="020B0604020202020204" pitchFamily="34" charset="0"/>
               </a:rPr>
+              <a:t>runtime</a:t>
+            </a:r>
+            <a:r>
+              <a:rPr lang="zh-CN" altLang="en-US" sz="1200" b="1" dirty="0">
+                <a:latin typeface="Arial" panose="020B0604020202020204" pitchFamily="34" charset="0"/>
+                <a:cs typeface="Arial" panose="020B0604020202020204" pitchFamily="34" charset="0"/>
+              </a:rPr>
+              <a:t> </a:t>
+            </a:r>
+            <a:r>
+              <a:rPr lang="en-US" altLang="zh-CN" sz="1200" b="1" dirty="0">
+                <a:latin typeface="Arial" panose="020B0604020202020204" pitchFamily="34" charset="0"/>
+                <a:cs typeface="Arial" panose="020B0604020202020204" pitchFamily="34" charset="0"/>
+              </a:rPr>
+              <a:t>and</a:t>
+            </a:r>
+            <a:r>
+              <a:rPr lang="zh-CN" altLang="en-US" sz="1200" b="1" dirty="0">
+                <a:latin typeface="Arial" panose="020B0604020202020204" pitchFamily="34" charset="0"/>
+                <a:cs typeface="Arial" panose="020B0604020202020204" pitchFamily="34" charset="0"/>
+              </a:rPr>
+              <a:t> </a:t>
+            </a:r>
+            <a:r>
+              <a:rPr lang="en-US" altLang="zh-CN" sz="1200" b="1" dirty="0">
+                <a:latin typeface="Arial" panose="020B0604020202020204" pitchFamily="34" charset="0"/>
+                <a:cs typeface="Arial" panose="020B0604020202020204" pitchFamily="34" charset="0"/>
+              </a:rPr>
+              <a:t>start</a:t>
+            </a:r>
+            <a:r>
+              <a:rPr lang="zh-CN" altLang="en-US" sz="1200" b="1" dirty="0">
+                <a:latin typeface="Arial" panose="020B0604020202020204" pitchFamily="34" charset="0"/>
+                <a:cs typeface="Arial" panose="020B0604020202020204" pitchFamily="34" charset="0"/>
+              </a:rPr>
+              <a:t> </a:t>
+            </a:r>
+            <a:r>
+              <a:rPr lang="en-US" altLang="zh-CN" sz="1200" b="1" dirty="0" err="1">
+                <a:latin typeface="Arial" panose="020B0604020202020204" pitchFamily="34" charset="0"/>
+                <a:cs typeface="Arial" panose="020B0604020202020204" pitchFamily="34" charset="0"/>
+              </a:rPr>
               <a:t>Zowe</a:t>
-            </a:r>
-            <a:r>
-              <a:rPr lang="zh-CN" altLang="en-US" sz="1200" b="1" dirty="0">
-                <a:latin typeface="Arial" panose="020B0604020202020204" pitchFamily="34" charset="0"/>
-                <a:cs typeface="Arial" panose="020B0604020202020204" pitchFamily="34" charset="0"/>
-              </a:rPr>
-              <a:t> </a:t>
-            </a:r>
-            <a:r>
-              <a:rPr lang="en-US" altLang="zh-CN" sz="1200" b="1" dirty="0">
-                <a:latin typeface="Arial" panose="020B0604020202020204" pitchFamily="34" charset="0"/>
-                <a:cs typeface="Arial" panose="020B0604020202020204" pitchFamily="34" charset="0"/>
-              </a:rPr>
-              <a:t>runtime</a:t>
             </a:r>
             <a:endParaRPr lang="en-US" sz="1200" b="1" dirty="0">
               <a:latin typeface="Arial" panose="020B0604020202020204" pitchFamily="34" charset="0"/>
@@ -6356,8 +5927,8 @@
         </p:nvCxnSpPr>
         <p:spPr>
           <a:xfrm>
-            <a:off x="624113" y="11479810"/>
-            <a:ext cx="6113290" cy="0"/>
+            <a:off x="624113" y="13266360"/>
+            <a:ext cx="8072213" cy="0"/>
           </a:xfrm>
           <a:prstGeom prst="line">
             <a:avLst/>
@@ -6386,52 +5957,6 @@
           </a:fontRef>
         </p:style>
       </p:cxnSp>
-      <p:cxnSp>
-        <p:nvCxnSpPr>
-          <p:cNvPr id="66" name="Straight Arrow Connector 65">
-            <a:extLst>
-              <a:ext uri="{FF2B5EF4-FFF2-40B4-BE49-F238E27FC236}">
-                <a16:creationId xmlns:a16="http://schemas.microsoft.com/office/drawing/2014/main" id="{BF74C147-42B7-F64D-B40B-214ED12D1CFD}"/>
-              </a:ext>
-            </a:extLst>
-          </p:cNvPr>
-          <p:cNvCxnSpPr>
-            <a:cxnSpLocks/>
-          </p:cNvCxnSpPr>
-          <p:nvPr/>
-        </p:nvCxnSpPr>
-        <p:spPr>
-          <a:xfrm>
-            <a:off x="4607892" y="11303000"/>
-            <a:ext cx="0" cy="411363"/>
-          </a:xfrm>
-          <a:prstGeom prst="straightConnector1">
-            <a:avLst/>
-          </a:prstGeom>
-          <a:ln>
-            <a:solidFill>
-              <a:schemeClr val="bg2">
-                <a:lumMod val="25000"/>
-              </a:schemeClr>
-            </a:solidFill>
-            <a:tailEnd type="triangle"/>
-          </a:ln>
-        </p:spPr>
-        <p:style>
-          <a:lnRef idx="1">
-            <a:schemeClr val="accent1"/>
-          </a:lnRef>
-          <a:fillRef idx="0">
-            <a:schemeClr val="accent1"/>
-          </a:fillRef>
-          <a:effectRef idx="0">
-            <a:schemeClr val="accent1"/>
-          </a:effectRef>
-          <a:fontRef idx="minor">
-            <a:schemeClr val="tx1"/>
-          </a:fontRef>
-        </p:style>
-      </p:cxnSp>
       <p:sp>
         <p:nvSpPr>
           <p:cNvPr id="67" name="Rectangle 66">
@@ -6446,16 +5971,14 @@
         </p:nvSpPr>
         <p:spPr>
           <a:xfrm>
-            <a:off x="2498331" y="11783451"/>
-            <a:ext cx="4239039" cy="558971"/>
+            <a:off x="2498332" y="13570002"/>
+            <a:ext cx="5171997" cy="558971"/>
           </a:xfrm>
           <a:prstGeom prst="rect">
             <a:avLst/>
           </a:prstGeom>
           <a:solidFill>
-            <a:schemeClr val="accent1">
-              <a:lumMod val="50000"/>
-            </a:schemeClr>
+            <a:srgbClr val="B4D7EE"/>
           </a:solidFill>
           <a:ln>
             <a:noFill/>
@@ -6490,7 +6013,7 @@
             <a:r>
               <a:rPr lang="en-US" altLang="zh-CN" sz="1100" dirty="0">
                 <a:solidFill>
-                  <a:schemeClr val="bg1"/>
+                  <a:schemeClr val="tx1"/>
                 </a:solidFill>
                 <a:latin typeface="Arial" panose="020B0604020202020204" pitchFamily="34" charset="0"/>
                 <a:cs typeface="Arial" panose="020B0604020202020204" pitchFamily="34" charset="0"/>
@@ -6500,7 +6023,7 @@
             <a:r>
               <a:rPr lang="zh-CN" altLang="en-US" sz="1100" dirty="0">
                 <a:solidFill>
-                  <a:schemeClr val="bg1"/>
+                  <a:schemeClr val="tx1"/>
                 </a:solidFill>
                 <a:latin typeface="Arial" panose="020B0604020202020204" pitchFamily="34" charset="0"/>
                 <a:cs typeface="Arial" panose="020B0604020202020204" pitchFamily="34" charset="0"/>
@@ -6510,7 +6033,7 @@
             <a:r>
               <a:rPr lang="en-US" altLang="zh-CN" sz="1100" dirty="0">
                 <a:solidFill>
-                  <a:schemeClr val="bg1"/>
+                  <a:schemeClr val="tx1"/>
                 </a:solidFill>
                 <a:latin typeface="Arial" panose="020B0604020202020204" pitchFamily="34" charset="0"/>
                 <a:cs typeface="Arial" panose="020B0604020202020204" pitchFamily="34" charset="0"/>
@@ -6520,7 +6043,7 @@
             <a:r>
               <a:rPr lang="zh-CN" altLang="en-US" sz="1100" dirty="0">
                 <a:solidFill>
-                  <a:schemeClr val="bg1"/>
+                  <a:schemeClr val="tx1"/>
                 </a:solidFill>
                 <a:latin typeface="Arial" panose="020B0604020202020204" pitchFamily="34" charset="0"/>
                 <a:cs typeface="Arial" panose="020B0604020202020204" pitchFamily="34" charset="0"/>
@@ -6530,7 +6053,7 @@
             <a:r>
               <a:rPr lang="en-US" altLang="zh-CN" sz="1100" dirty="0">
                 <a:solidFill>
-                  <a:schemeClr val="bg1"/>
+                  <a:schemeClr val="tx1"/>
                 </a:solidFill>
                 <a:latin typeface="Arial" panose="020B0604020202020204" pitchFamily="34" charset="0"/>
                 <a:cs typeface="Arial" panose="020B0604020202020204" pitchFamily="34" charset="0"/>
@@ -6540,7 +6063,7 @@
             <a:r>
               <a:rPr lang="zh-CN" altLang="en-US" sz="1100" dirty="0">
                 <a:solidFill>
-                  <a:schemeClr val="bg1"/>
+                  <a:schemeClr val="tx1"/>
                 </a:solidFill>
                 <a:latin typeface="Arial" panose="020B0604020202020204" pitchFamily="34" charset="0"/>
                 <a:cs typeface="Arial" panose="020B0604020202020204" pitchFamily="34" charset="0"/>
@@ -6550,7 +6073,7 @@
             <a:r>
               <a:rPr lang="en-US" altLang="zh-CN" sz="1100" dirty="0">
                 <a:solidFill>
-                  <a:schemeClr val="bg1"/>
+                  <a:schemeClr val="tx1"/>
                 </a:solidFill>
                 <a:latin typeface="Arial" panose="020B0604020202020204" pitchFamily="34" charset="0"/>
                 <a:cs typeface="Arial" panose="020B0604020202020204" pitchFamily="34" charset="0"/>
@@ -6560,7 +6083,7 @@
             <a:r>
               <a:rPr lang="zh-CN" altLang="en-US" sz="1100" dirty="0">
                 <a:solidFill>
-                  <a:schemeClr val="bg1"/>
+                  <a:schemeClr val="tx1"/>
                 </a:solidFill>
                 <a:latin typeface="Arial" panose="020B0604020202020204" pitchFamily="34" charset="0"/>
                 <a:cs typeface="Arial" panose="020B0604020202020204" pitchFamily="34" charset="0"/>
@@ -6570,7 +6093,7 @@
             <a:r>
               <a:rPr lang="en-US" altLang="zh-CN" sz="1100" dirty="0">
                 <a:solidFill>
-                  <a:schemeClr val="bg1"/>
+                  <a:schemeClr val="tx1"/>
                 </a:solidFill>
                 <a:latin typeface="Arial" panose="020B0604020202020204" pitchFamily="34" charset="0"/>
                 <a:cs typeface="Arial" panose="020B0604020202020204" pitchFamily="34" charset="0"/>
@@ -6580,7 +6103,7 @@
             <a:r>
               <a:rPr lang="zh-CN" altLang="en-US" sz="1100" dirty="0">
                 <a:solidFill>
-                  <a:schemeClr val="bg1"/>
+                  <a:schemeClr val="tx1"/>
                 </a:solidFill>
                 <a:latin typeface="Arial" panose="020B0604020202020204" pitchFamily="34" charset="0"/>
                 <a:cs typeface="Arial" panose="020B0604020202020204" pitchFamily="34" charset="0"/>
@@ -6590,7 +6113,7 @@
             <a:r>
               <a:rPr lang="en-US" altLang="zh-CN" sz="1100" dirty="0">
                 <a:solidFill>
-                  <a:schemeClr val="bg1"/>
+                  <a:schemeClr val="tx1"/>
                 </a:solidFill>
                 <a:latin typeface="Arial" panose="020B0604020202020204" pitchFamily="34" charset="0"/>
                 <a:cs typeface="Arial" panose="020B0604020202020204" pitchFamily="34" charset="0"/>
@@ -6600,7 +6123,7 @@
             <a:r>
               <a:rPr lang="zh-CN" altLang="en-US" sz="1100" dirty="0">
                 <a:solidFill>
-                  <a:schemeClr val="bg1"/>
+                  <a:schemeClr val="tx1"/>
                 </a:solidFill>
                 <a:latin typeface="Arial" panose="020B0604020202020204" pitchFamily="34" charset="0"/>
                 <a:cs typeface="Arial" panose="020B0604020202020204" pitchFamily="34" charset="0"/>
@@ -6610,7 +6133,7 @@
             <a:r>
               <a:rPr lang="en-US" altLang="zh-CN" sz="1100" dirty="0">
                 <a:solidFill>
-                  <a:schemeClr val="bg1"/>
+                  <a:schemeClr val="tx1"/>
                 </a:solidFill>
                 <a:latin typeface="Arial" panose="020B0604020202020204" pitchFamily="34" charset="0"/>
                 <a:cs typeface="Arial" panose="020B0604020202020204" pitchFamily="34" charset="0"/>
@@ -6620,7 +6143,7 @@
             <a:r>
               <a:rPr lang="zh-CN" altLang="en-US" sz="1100" dirty="0">
                 <a:solidFill>
-                  <a:schemeClr val="bg1"/>
+                  <a:schemeClr val="tx1"/>
                 </a:solidFill>
                 <a:latin typeface="Arial" panose="020B0604020202020204" pitchFamily="34" charset="0"/>
                 <a:cs typeface="Arial" panose="020B0604020202020204" pitchFamily="34" charset="0"/>
@@ -6630,7 +6153,7 @@
             <a:r>
               <a:rPr lang="en-US" altLang="zh-CN" sz="1100" dirty="0">
                 <a:solidFill>
-                  <a:schemeClr val="bg1"/>
+                  <a:schemeClr val="tx1"/>
                 </a:solidFill>
                 <a:latin typeface="Arial" panose="020B0604020202020204" pitchFamily="34" charset="0"/>
                 <a:cs typeface="Arial" panose="020B0604020202020204" pitchFamily="34" charset="0"/>
@@ -6654,7 +6177,7 @@
         </p:nvSpPr>
         <p:spPr>
           <a:xfrm>
-            <a:off x="624115" y="11496735"/>
+            <a:off x="534468" y="13283286"/>
             <a:ext cx="2566919" cy="276999"/>
           </a:xfrm>
           <a:prstGeom prst="rect">
@@ -6752,7 +6275,7 @@
         </p:nvSpPr>
         <p:spPr>
           <a:xfrm>
-            <a:off x="3376399" y="3361944"/>
+            <a:off x="3503990" y="3273978"/>
             <a:ext cx="1724319" cy="430887"/>
           </a:xfrm>
           <a:prstGeom prst="rect">
@@ -6792,8 +6315,8 @@
         </p:nvCxnSpPr>
         <p:spPr>
           <a:xfrm>
-            <a:off x="624113" y="263775"/>
-            <a:ext cx="5740480" cy="0"/>
+            <a:off x="624113" y="375833"/>
+            <a:ext cx="7982472" cy="0"/>
           </a:xfrm>
           <a:prstGeom prst="line">
             <a:avLst/>
@@ -6822,10 +6345,939 @@
           </a:fontRef>
         </p:style>
       </p:cxnSp>
+      <p:sp>
+        <p:nvSpPr>
+          <p:cNvPr id="51" name="Rectangle 50">
+            <a:extLst>
+              <a:ext uri="{FF2B5EF4-FFF2-40B4-BE49-F238E27FC236}">
+                <a16:creationId xmlns:a16="http://schemas.microsoft.com/office/drawing/2014/main" id="{0E337C55-5CEA-7D45-A843-ED3785889B04}"/>
+              </a:ext>
+            </a:extLst>
+          </p:cNvPr>
+          <p:cNvSpPr/>
+          <p:nvPr/>
+        </p:nvSpPr>
+        <p:spPr>
+          <a:xfrm>
+            <a:off x="6416473" y="5850038"/>
+            <a:ext cx="2317702" cy="503314"/>
+          </a:xfrm>
+          <a:prstGeom prst="rect">
+            <a:avLst/>
+          </a:prstGeom>
+          <a:solidFill>
+            <a:schemeClr val="accent4">
+              <a:lumMod val="20000"/>
+              <a:lumOff val="80000"/>
+            </a:schemeClr>
+          </a:solidFill>
+          <a:ln>
+            <a:solidFill>
+              <a:schemeClr val="accent4">
+                <a:lumMod val="60000"/>
+                <a:lumOff val="40000"/>
+              </a:schemeClr>
+            </a:solidFill>
+            <a:prstDash val="dash"/>
+          </a:ln>
+        </p:spPr>
+        <p:style>
+          <a:lnRef idx="2">
+            <a:schemeClr val="accent1">
+              <a:shade val="50000"/>
+            </a:schemeClr>
+          </a:lnRef>
+          <a:fillRef idx="1">
+            <a:schemeClr val="accent1"/>
+          </a:fillRef>
+          <a:effectRef idx="0">
+            <a:schemeClr val="accent1"/>
+          </a:effectRef>
+          <a:fontRef idx="minor">
+            <a:schemeClr val="lt1"/>
+          </a:fontRef>
+        </p:style>
+        <p:txBody>
+          <a:bodyPr rot="0" spcFirstLastPara="0" vertOverflow="overflow" horzOverflow="overflow" vert="horz" wrap="square" lIns="91440" tIns="45720" rIns="91440" bIns="45720" numCol="1" spcCol="0" rtlCol="0" fromWordArt="0" anchor="ctr" anchorCtr="0" forceAA="0" compatLnSpc="1">
+            <a:prstTxWarp prst="textNoShape">
+              <a:avLst/>
+            </a:prstTxWarp>
+            <a:noAutofit/>
+          </a:bodyPr>
+          <a:lstStyle/>
+          <a:p>
+            <a:r>
+              <a:rPr lang="en-US" sz="1100" dirty="0">
+                <a:solidFill>
+                  <a:schemeClr val="tx1"/>
+                </a:solidFill>
+                <a:latin typeface="Arial" panose="020B0604020202020204" pitchFamily="34" charset="0"/>
+                <a:cs typeface="Arial" panose="020B0604020202020204" pitchFamily="34" charset="0"/>
+              </a:rPr>
+              <a:t>Method 1: Use shell script </a:t>
+            </a:r>
+          </a:p>
+          <a:p>
+            <a:r>
+              <a:rPr lang="en-US" sz="1100" dirty="0">
+                <a:solidFill>
+                  <a:schemeClr val="accent1"/>
+                </a:solidFill>
+                <a:latin typeface="Arial" panose="020B0604020202020204" pitchFamily="34" charset="0"/>
+                <a:cs typeface="Arial" panose="020B0604020202020204" pitchFamily="34" charset="0"/>
+              </a:rPr>
+              <a:t>(Script: </a:t>
+            </a:r>
+            <a:r>
+              <a:rPr lang="en-US" sz="1100" dirty="0" err="1">
+                <a:solidFill>
+                  <a:schemeClr val="accent1"/>
+                </a:solidFill>
+                <a:latin typeface="Arial" panose="020B0604020202020204" pitchFamily="34" charset="0"/>
+                <a:cs typeface="Arial" panose="020B0604020202020204" pitchFamily="34" charset="0"/>
+              </a:rPr>
+              <a:t>zowe-install.sh</a:t>
+            </a:r>
+            <a:r>
+              <a:rPr lang="en-US" sz="1100" dirty="0">
+                <a:solidFill>
+                  <a:schemeClr val="accent1"/>
+                </a:solidFill>
+                <a:latin typeface="Arial" panose="020B0604020202020204" pitchFamily="34" charset="0"/>
+                <a:cs typeface="Arial" panose="020B0604020202020204" pitchFamily="34" charset="0"/>
+              </a:rPr>
+              <a:t>)</a:t>
+            </a:r>
+          </a:p>
+        </p:txBody>
+      </p:sp>
+      <p:sp>
+        <p:nvSpPr>
+          <p:cNvPr id="53" name="Rectangle 52">
+            <a:extLst>
+              <a:ext uri="{FF2B5EF4-FFF2-40B4-BE49-F238E27FC236}">
+                <a16:creationId xmlns:a16="http://schemas.microsoft.com/office/drawing/2014/main" id="{20D00F0E-D4CD-F545-8E1F-63A049D7B467}"/>
+              </a:ext>
+            </a:extLst>
+          </p:cNvPr>
+          <p:cNvSpPr/>
+          <p:nvPr/>
+        </p:nvSpPr>
+        <p:spPr>
+          <a:xfrm>
+            <a:off x="6416473" y="6398686"/>
+            <a:ext cx="2317702" cy="307777"/>
+          </a:xfrm>
+          <a:prstGeom prst="rect">
+            <a:avLst/>
+          </a:prstGeom>
+          <a:solidFill>
+            <a:schemeClr val="accent4">
+              <a:lumMod val="20000"/>
+              <a:lumOff val="80000"/>
+            </a:schemeClr>
+          </a:solidFill>
+          <a:ln>
+            <a:solidFill>
+              <a:schemeClr val="accent4">
+                <a:lumMod val="60000"/>
+                <a:lumOff val="40000"/>
+              </a:schemeClr>
+            </a:solidFill>
+            <a:prstDash val="dash"/>
+          </a:ln>
+        </p:spPr>
+        <p:style>
+          <a:lnRef idx="2">
+            <a:schemeClr val="accent1">
+              <a:shade val="50000"/>
+            </a:schemeClr>
+          </a:lnRef>
+          <a:fillRef idx="1">
+            <a:schemeClr val="accent1"/>
+          </a:fillRef>
+          <a:effectRef idx="0">
+            <a:schemeClr val="accent1"/>
+          </a:effectRef>
+          <a:fontRef idx="minor">
+            <a:schemeClr val="lt1"/>
+          </a:fontRef>
+        </p:style>
+        <p:txBody>
+          <a:bodyPr rot="0" spcFirstLastPara="0" vertOverflow="overflow" horzOverflow="overflow" vert="horz" wrap="square" lIns="91440" tIns="45720" rIns="91440" bIns="45720" numCol="1" spcCol="0" rtlCol="0" fromWordArt="0" anchor="ctr" anchorCtr="0" forceAA="0" compatLnSpc="1">
+            <a:prstTxWarp prst="textNoShape">
+              <a:avLst/>
+            </a:prstTxWarp>
+            <a:noAutofit/>
+          </a:bodyPr>
+          <a:lstStyle/>
+          <a:p>
+            <a:r>
+              <a:rPr lang="en-US" sz="1100" dirty="0">
+                <a:solidFill>
+                  <a:schemeClr val="tx1"/>
+                </a:solidFill>
+                <a:latin typeface="Arial" panose="020B0604020202020204" pitchFamily="34" charset="0"/>
+                <a:cs typeface="Arial" panose="020B0604020202020204" pitchFamily="34" charset="0"/>
+              </a:rPr>
+              <a:t>Method 2: Use z/</a:t>
+            </a:r>
+            <a:r>
+              <a:rPr lang="en-US" sz="1100">
+                <a:solidFill>
+                  <a:schemeClr val="tx1"/>
+                </a:solidFill>
+                <a:latin typeface="Arial" panose="020B0604020202020204" pitchFamily="34" charset="0"/>
+                <a:cs typeface="Arial" panose="020B0604020202020204" pitchFamily="34" charset="0"/>
+              </a:rPr>
+              <a:t>OSMF Workflow</a:t>
+            </a:r>
+            <a:endParaRPr lang="en-US" sz="1100" dirty="0">
+              <a:solidFill>
+                <a:schemeClr val="tx1"/>
+              </a:solidFill>
+              <a:latin typeface="Arial" panose="020B0604020202020204" pitchFamily="34" charset="0"/>
+              <a:cs typeface="Arial" panose="020B0604020202020204" pitchFamily="34" charset="0"/>
+            </a:endParaRPr>
+          </a:p>
+        </p:txBody>
+      </p:sp>
+      <p:sp>
+        <p:nvSpPr>
+          <p:cNvPr id="68" name="Rectangle 67">
+            <a:extLst>
+              <a:ext uri="{FF2B5EF4-FFF2-40B4-BE49-F238E27FC236}">
+                <a16:creationId xmlns:a16="http://schemas.microsoft.com/office/drawing/2014/main" id="{D669B208-6833-D847-9550-91D3FC0D2ACA}"/>
+              </a:ext>
+            </a:extLst>
+          </p:cNvPr>
+          <p:cNvSpPr/>
+          <p:nvPr/>
+        </p:nvSpPr>
+        <p:spPr>
+          <a:xfrm>
+            <a:off x="2606340" y="9190501"/>
+            <a:ext cx="2474599" cy="503314"/>
+          </a:xfrm>
+          <a:prstGeom prst="rect">
+            <a:avLst/>
+          </a:prstGeom>
+          <a:solidFill>
+            <a:srgbClr val="DEECF8"/>
+          </a:solidFill>
+          <a:ln>
+            <a:solidFill>
+              <a:schemeClr val="accent5">
+                <a:lumMod val="60000"/>
+                <a:lumOff val="40000"/>
+              </a:schemeClr>
+            </a:solidFill>
+            <a:prstDash val="dash"/>
+          </a:ln>
+        </p:spPr>
+        <p:style>
+          <a:lnRef idx="2">
+            <a:schemeClr val="accent1">
+              <a:shade val="50000"/>
+            </a:schemeClr>
+          </a:lnRef>
+          <a:fillRef idx="1">
+            <a:schemeClr val="accent1"/>
+          </a:fillRef>
+          <a:effectRef idx="0">
+            <a:schemeClr val="accent1"/>
+          </a:effectRef>
+          <a:fontRef idx="minor">
+            <a:schemeClr val="lt1"/>
+          </a:fontRef>
+        </p:style>
+        <p:txBody>
+          <a:bodyPr rot="0" spcFirstLastPara="0" vertOverflow="overflow" horzOverflow="overflow" vert="horz" wrap="square" lIns="91440" tIns="45720" rIns="91440" bIns="45720" numCol="1" spcCol="0" rtlCol="0" fromWordArt="0" anchor="ctr" anchorCtr="0" forceAA="0" compatLnSpc="1">
+            <a:prstTxWarp prst="textNoShape">
+              <a:avLst/>
+            </a:prstTxWarp>
+            <a:noAutofit/>
+          </a:bodyPr>
+          <a:lstStyle/>
+          <a:p>
+            <a:r>
+              <a:rPr lang="en-US" sz="1100" dirty="0">
+                <a:solidFill>
+                  <a:schemeClr val="tx1"/>
+                </a:solidFill>
+                <a:latin typeface="Arial" panose="020B0604020202020204" pitchFamily="34" charset="0"/>
+                <a:cs typeface="Arial" panose="020B0604020202020204" pitchFamily="34" charset="0"/>
+              </a:rPr>
+              <a:t>Method 1: Use shell script </a:t>
+            </a:r>
+          </a:p>
+          <a:p>
+            <a:r>
+              <a:rPr lang="en-US" sz="1100" dirty="0">
+                <a:solidFill>
+                  <a:schemeClr val="accent1"/>
+                </a:solidFill>
+                <a:latin typeface="Arial" panose="020B0604020202020204" pitchFamily="34" charset="0"/>
+                <a:cs typeface="Arial" panose="020B0604020202020204" pitchFamily="34" charset="0"/>
+              </a:rPr>
+              <a:t>(Script: </a:t>
+            </a:r>
+            <a:r>
+              <a:rPr lang="en-US" sz="1100" dirty="0" err="1">
+                <a:solidFill>
+                  <a:schemeClr val="accent1"/>
+                </a:solidFill>
+                <a:latin typeface="Arial" panose="020B0604020202020204" pitchFamily="34" charset="0"/>
+                <a:cs typeface="Arial" panose="020B0604020202020204" pitchFamily="34" charset="0"/>
+              </a:rPr>
+              <a:t>zowe</a:t>
+            </a:r>
+            <a:r>
+              <a:rPr lang="en-US" sz="1100" dirty="0">
+                <a:solidFill>
+                  <a:schemeClr val="accent1"/>
+                </a:solidFill>
+                <a:latin typeface="Arial" panose="020B0604020202020204" pitchFamily="34" charset="0"/>
+                <a:cs typeface="Arial" panose="020B0604020202020204" pitchFamily="34" charset="0"/>
+              </a:rPr>
+              <a:t>-setup-</a:t>
+            </a:r>
+            <a:r>
+              <a:rPr lang="en-US" sz="1100" dirty="0" err="1">
+                <a:solidFill>
+                  <a:schemeClr val="accent1"/>
+                </a:solidFill>
+                <a:latin typeface="Arial" panose="020B0604020202020204" pitchFamily="34" charset="0"/>
+                <a:cs typeface="Arial" panose="020B0604020202020204" pitchFamily="34" charset="0"/>
+              </a:rPr>
+              <a:t>certificates.sh</a:t>
+            </a:r>
+            <a:r>
+              <a:rPr lang="en-US" sz="1100" dirty="0">
+                <a:solidFill>
+                  <a:schemeClr val="accent1"/>
+                </a:solidFill>
+                <a:latin typeface="Arial" panose="020B0604020202020204" pitchFamily="34" charset="0"/>
+                <a:cs typeface="Arial" panose="020B0604020202020204" pitchFamily="34" charset="0"/>
+              </a:rPr>
+              <a:t>)</a:t>
+            </a:r>
+          </a:p>
+        </p:txBody>
+      </p:sp>
+      <p:sp>
+        <p:nvSpPr>
+          <p:cNvPr id="69" name="Rectangle 68">
+            <a:extLst>
+              <a:ext uri="{FF2B5EF4-FFF2-40B4-BE49-F238E27FC236}">
+                <a16:creationId xmlns:a16="http://schemas.microsoft.com/office/drawing/2014/main" id="{58EED663-37F9-F245-802C-26BFB766AD91}"/>
+              </a:ext>
+            </a:extLst>
+          </p:cNvPr>
+          <p:cNvSpPr/>
+          <p:nvPr/>
+        </p:nvSpPr>
+        <p:spPr>
+          <a:xfrm>
+            <a:off x="5198304" y="9190431"/>
+            <a:ext cx="2361039" cy="499558"/>
+          </a:xfrm>
+          <a:prstGeom prst="rect">
+            <a:avLst/>
+          </a:prstGeom>
+          <a:solidFill>
+            <a:srgbClr val="DEECF8"/>
+          </a:solidFill>
+          <a:ln>
+            <a:solidFill>
+              <a:schemeClr val="accent5">
+                <a:lumMod val="60000"/>
+                <a:lumOff val="40000"/>
+              </a:schemeClr>
+            </a:solidFill>
+            <a:prstDash val="dash"/>
+          </a:ln>
+        </p:spPr>
+        <p:style>
+          <a:lnRef idx="2">
+            <a:schemeClr val="accent1">
+              <a:shade val="50000"/>
+            </a:schemeClr>
+          </a:lnRef>
+          <a:fillRef idx="1">
+            <a:schemeClr val="accent1"/>
+          </a:fillRef>
+          <a:effectRef idx="0">
+            <a:schemeClr val="accent1"/>
+          </a:effectRef>
+          <a:fontRef idx="minor">
+            <a:schemeClr val="lt1"/>
+          </a:fontRef>
+        </p:style>
+        <p:txBody>
+          <a:bodyPr rot="0" spcFirstLastPara="0" vertOverflow="overflow" horzOverflow="overflow" vert="horz" wrap="square" lIns="91440" tIns="45720" rIns="91440" bIns="45720" numCol="1" spcCol="0" rtlCol="0" fromWordArt="0" anchor="ctr" anchorCtr="0" forceAA="0" compatLnSpc="1">
+            <a:prstTxWarp prst="textNoShape">
+              <a:avLst/>
+            </a:prstTxWarp>
+            <a:noAutofit/>
+          </a:bodyPr>
+          <a:lstStyle/>
+          <a:p>
+            <a:r>
+              <a:rPr lang="en-US" sz="1100" dirty="0">
+                <a:solidFill>
+                  <a:schemeClr val="tx1"/>
+                </a:solidFill>
+                <a:latin typeface="Arial" panose="020B0604020202020204" pitchFamily="34" charset="0"/>
+                <a:cs typeface="Arial" panose="020B0604020202020204" pitchFamily="34" charset="0"/>
+              </a:rPr>
+              <a:t>Method 2: Use z/OSMF Workflow</a:t>
+            </a:r>
+          </a:p>
+        </p:txBody>
+      </p:sp>
+      <p:sp>
+        <p:nvSpPr>
+          <p:cNvPr id="73" name="Rectangle 72">
+            <a:extLst>
+              <a:ext uri="{FF2B5EF4-FFF2-40B4-BE49-F238E27FC236}">
+                <a16:creationId xmlns:a16="http://schemas.microsoft.com/office/drawing/2014/main" id="{0DD4F608-E798-6F4B-8A90-39D3F7736AB6}"/>
+              </a:ext>
+            </a:extLst>
+          </p:cNvPr>
+          <p:cNvSpPr/>
+          <p:nvPr/>
+        </p:nvSpPr>
+        <p:spPr>
+          <a:xfrm>
+            <a:off x="2580953" y="7729030"/>
+            <a:ext cx="2474599" cy="503314"/>
+          </a:xfrm>
+          <a:prstGeom prst="rect">
+            <a:avLst/>
+          </a:prstGeom>
+          <a:solidFill>
+            <a:srgbClr val="DEECF8"/>
+          </a:solidFill>
+          <a:ln>
+            <a:solidFill>
+              <a:schemeClr val="accent5">
+                <a:lumMod val="60000"/>
+                <a:lumOff val="40000"/>
+              </a:schemeClr>
+            </a:solidFill>
+            <a:prstDash val="dash"/>
+          </a:ln>
+        </p:spPr>
+        <p:style>
+          <a:lnRef idx="2">
+            <a:schemeClr val="accent1">
+              <a:shade val="50000"/>
+            </a:schemeClr>
+          </a:lnRef>
+          <a:fillRef idx="1">
+            <a:schemeClr val="accent1"/>
+          </a:fillRef>
+          <a:effectRef idx="0">
+            <a:schemeClr val="accent1"/>
+          </a:effectRef>
+          <a:fontRef idx="minor">
+            <a:schemeClr val="lt1"/>
+          </a:fontRef>
+        </p:style>
+        <p:txBody>
+          <a:bodyPr rot="0" spcFirstLastPara="0" vertOverflow="overflow" horzOverflow="overflow" vert="horz" wrap="square" lIns="91440" tIns="45720" rIns="91440" bIns="45720" numCol="1" spcCol="0" rtlCol="0" fromWordArt="0" anchor="ctr" anchorCtr="0" forceAA="0" compatLnSpc="1">
+            <a:prstTxWarp prst="textNoShape">
+              <a:avLst/>
+            </a:prstTxWarp>
+            <a:noAutofit/>
+          </a:bodyPr>
+          <a:lstStyle/>
+          <a:p>
+            <a:pPr algn="ctr"/>
+            <a:r>
+              <a:rPr lang="en-US" sz="1100" dirty="0">
+                <a:solidFill>
+                  <a:schemeClr val="tx1"/>
+                </a:solidFill>
+                <a:latin typeface="Arial" panose="020B0604020202020204" pitchFamily="34" charset="0"/>
+                <a:cs typeface="Arial" panose="020B0604020202020204" pitchFamily="34" charset="0"/>
+              </a:rPr>
+              <a:t>Method 1: Use JCL</a:t>
+            </a:r>
+          </a:p>
+          <a:p>
+            <a:pPr algn="ctr"/>
+            <a:r>
+              <a:rPr lang="en-US" sz="1100" dirty="0">
+                <a:solidFill>
+                  <a:schemeClr val="accent1"/>
+                </a:solidFill>
+                <a:latin typeface="Arial" panose="020B0604020202020204" pitchFamily="34" charset="0"/>
+                <a:cs typeface="Arial" panose="020B0604020202020204" pitchFamily="34" charset="0"/>
+              </a:rPr>
+              <a:t>(JCL: ZWESECUR)</a:t>
+            </a:r>
+          </a:p>
+        </p:txBody>
+      </p:sp>
+      <p:sp>
+        <p:nvSpPr>
+          <p:cNvPr id="74" name="Rectangle 73">
+            <a:extLst>
+              <a:ext uri="{FF2B5EF4-FFF2-40B4-BE49-F238E27FC236}">
+                <a16:creationId xmlns:a16="http://schemas.microsoft.com/office/drawing/2014/main" id="{7E0FAF8F-3D46-0F4E-9992-07F484E98B22}"/>
+              </a:ext>
+            </a:extLst>
+          </p:cNvPr>
+          <p:cNvSpPr/>
+          <p:nvPr/>
+        </p:nvSpPr>
+        <p:spPr>
+          <a:xfrm>
+            <a:off x="5157766" y="7719511"/>
+            <a:ext cx="2401577" cy="509885"/>
+          </a:xfrm>
+          <a:prstGeom prst="rect">
+            <a:avLst/>
+          </a:prstGeom>
+          <a:solidFill>
+            <a:srgbClr val="DEECF8"/>
+          </a:solidFill>
+          <a:ln>
+            <a:solidFill>
+              <a:schemeClr val="accent5">
+                <a:lumMod val="60000"/>
+                <a:lumOff val="40000"/>
+              </a:schemeClr>
+            </a:solidFill>
+            <a:prstDash val="dash"/>
+          </a:ln>
+        </p:spPr>
+        <p:style>
+          <a:lnRef idx="2">
+            <a:schemeClr val="accent1">
+              <a:shade val="50000"/>
+            </a:schemeClr>
+          </a:lnRef>
+          <a:fillRef idx="1">
+            <a:schemeClr val="accent1"/>
+          </a:fillRef>
+          <a:effectRef idx="0">
+            <a:schemeClr val="accent1"/>
+          </a:effectRef>
+          <a:fontRef idx="minor">
+            <a:schemeClr val="lt1"/>
+          </a:fontRef>
+        </p:style>
+        <p:txBody>
+          <a:bodyPr rot="0" spcFirstLastPara="0" vertOverflow="overflow" horzOverflow="overflow" vert="horz" wrap="square" lIns="91440" tIns="45720" rIns="91440" bIns="45720" numCol="1" spcCol="0" rtlCol="0" fromWordArt="0" anchor="ctr" anchorCtr="0" forceAA="0" compatLnSpc="1">
+            <a:prstTxWarp prst="textNoShape">
+              <a:avLst/>
+            </a:prstTxWarp>
+            <a:noAutofit/>
+          </a:bodyPr>
+          <a:lstStyle/>
+          <a:p>
+            <a:r>
+              <a:rPr lang="en-US" sz="1100" dirty="0">
+                <a:solidFill>
+                  <a:schemeClr val="tx1"/>
+                </a:solidFill>
+                <a:latin typeface="Arial" panose="020B0604020202020204" pitchFamily="34" charset="0"/>
+                <a:cs typeface="Arial" panose="020B0604020202020204" pitchFamily="34" charset="0"/>
+              </a:rPr>
+              <a:t>Method 2: Use z/OSMF Workflow</a:t>
+            </a:r>
+          </a:p>
+        </p:txBody>
+      </p:sp>
+      <p:sp>
+        <p:nvSpPr>
+          <p:cNvPr id="76" name="Rectangle 75">
+            <a:extLst>
+              <a:ext uri="{FF2B5EF4-FFF2-40B4-BE49-F238E27FC236}">
+                <a16:creationId xmlns:a16="http://schemas.microsoft.com/office/drawing/2014/main" id="{EE3CF47B-5654-8745-9DF1-4AB8E56948E3}"/>
+              </a:ext>
+            </a:extLst>
+          </p:cNvPr>
+          <p:cNvSpPr/>
+          <p:nvPr/>
+        </p:nvSpPr>
+        <p:spPr>
+          <a:xfrm>
+            <a:off x="2626120" y="10471949"/>
+            <a:ext cx="2474599" cy="503314"/>
+          </a:xfrm>
+          <a:prstGeom prst="rect">
+            <a:avLst/>
+          </a:prstGeom>
+          <a:solidFill>
+            <a:srgbClr val="DEECF8"/>
+          </a:solidFill>
+          <a:ln>
+            <a:solidFill>
+              <a:schemeClr val="accent5">
+                <a:lumMod val="60000"/>
+                <a:lumOff val="40000"/>
+              </a:schemeClr>
+            </a:solidFill>
+            <a:prstDash val="dash"/>
+          </a:ln>
+        </p:spPr>
+        <p:style>
+          <a:lnRef idx="2">
+            <a:schemeClr val="accent1">
+              <a:shade val="50000"/>
+            </a:schemeClr>
+          </a:lnRef>
+          <a:fillRef idx="1">
+            <a:schemeClr val="accent1"/>
+          </a:fillRef>
+          <a:effectRef idx="0">
+            <a:schemeClr val="accent1"/>
+          </a:effectRef>
+          <a:fontRef idx="minor">
+            <a:schemeClr val="lt1"/>
+          </a:fontRef>
+        </p:style>
+        <p:txBody>
+          <a:bodyPr rot="0" spcFirstLastPara="0" vertOverflow="overflow" horzOverflow="overflow" vert="horz" wrap="square" lIns="91440" tIns="45720" rIns="91440" bIns="45720" numCol="1" spcCol="0" rtlCol="0" fromWordArt="0" anchor="ctr" anchorCtr="0" forceAA="0" compatLnSpc="1">
+            <a:prstTxWarp prst="textNoShape">
+              <a:avLst/>
+            </a:prstTxWarp>
+            <a:noAutofit/>
+          </a:bodyPr>
+          <a:lstStyle/>
+          <a:p>
+            <a:r>
+              <a:rPr lang="en-US" sz="1100" dirty="0">
+                <a:solidFill>
+                  <a:schemeClr val="tx1"/>
+                </a:solidFill>
+                <a:latin typeface="Arial" panose="020B0604020202020204" pitchFamily="34" charset="0"/>
+                <a:cs typeface="Arial" panose="020B0604020202020204" pitchFamily="34" charset="0"/>
+              </a:rPr>
+              <a:t>Method 1: Use shell script </a:t>
+            </a:r>
+          </a:p>
+          <a:p>
+            <a:r>
+              <a:rPr lang="en-US" sz="1100" dirty="0">
+                <a:solidFill>
+                  <a:schemeClr val="accent1"/>
+                </a:solidFill>
+                <a:latin typeface="Arial" panose="020B0604020202020204" pitchFamily="34" charset="0"/>
+                <a:cs typeface="Arial" panose="020B0604020202020204" pitchFamily="34" charset="0"/>
+              </a:rPr>
+              <a:t>(Script: </a:t>
+            </a:r>
+            <a:r>
+              <a:rPr lang="en-US" sz="1100" dirty="0" err="1">
+                <a:solidFill>
+                  <a:schemeClr val="accent1"/>
+                </a:solidFill>
+                <a:latin typeface="Arial" panose="020B0604020202020204" pitchFamily="34" charset="0"/>
+                <a:cs typeface="Arial" panose="020B0604020202020204" pitchFamily="34" charset="0"/>
+              </a:rPr>
+              <a:t>zowe</a:t>
+            </a:r>
+            <a:r>
+              <a:rPr lang="en-US" sz="1100" dirty="0">
+                <a:solidFill>
+                  <a:schemeClr val="accent1"/>
+                </a:solidFill>
+                <a:latin typeface="Arial" panose="020B0604020202020204" pitchFamily="34" charset="0"/>
+                <a:cs typeface="Arial" panose="020B0604020202020204" pitchFamily="34" charset="0"/>
+              </a:rPr>
+              <a:t>-configure-</a:t>
+            </a:r>
+            <a:r>
+              <a:rPr lang="en-US" sz="1100" dirty="0" err="1">
+                <a:solidFill>
+                  <a:schemeClr val="accent1"/>
+                </a:solidFill>
+                <a:latin typeface="Arial" panose="020B0604020202020204" pitchFamily="34" charset="0"/>
+                <a:cs typeface="Arial" panose="020B0604020202020204" pitchFamily="34" charset="0"/>
+              </a:rPr>
+              <a:t>instance.sh</a:t>
+            </a:r>
+            <a:r>
+              <a:rPr lang="en-US" sz="1100" dirty="0">
+                <a:solidFill>
+                  <a:schemeClr val="accent1"/>
+                </a:solidFill>
+                <a:latin typeface="Arial" panose="020B0604020202020204" pitchFamily="34" charset="0"/>
+                <a:cs typeface="Arial" panose="020B0604020202020204" pitchFamily="34" charset="0"/>
+              </a:rPr>
+              <a:t>)</a:t>
+            </a:r>
+          </a:p>
+        </p:txBody>
+      </p:sp>
+      <p:sp>
+        <p:nvSpPr>
+          <p:cNvPr id="77" name="Rectangle 76">
+            <a:extLst>
+              <a:ext uri="{FF2B5EF4-FFF2-40B4-BE49-F238E27FC236}">
+                <a16:creationId xmlns:a16="http://schemas.microsoft.com/office/drawing/2014/main" id="{72BA429A-185B-6542-80B5-60AC80328BC4}"/>
+              </a:ext>
+            </a:extLst>
+          </p:cNvPr>
+          <p:cNvSpPr/>
+          <p:nvPr/>
+        </p:nvSpPr>
+        <p:spPr>
+          <a:xfrm>
+            <a:off x="5220394" y="10469144"/>
+            <a:ext cx="2338949" cy="515061"/>
+          </a:xfrm>
+          <a:prstGeom prst="rect">
+            <a:avLst/>
+          </a:prstGeom>
+          <a:solidFill>
+            <a:srgbClr val="DEECF8"/>
+          </a:solidFill>
+          <a:ln>
+            <a:solidFill>
+              <a:schemeClr val="accent5">
+                <a:lumMod val="60000"/>
+                <a:lumOff val="40000"/>
+              </a:schemeClr>
+            </a:solidFill>
+            <a:prstDash val="dash"/>
+          </a:ln>
+        </p:spPr>
+        <p:style>
+          <a:lnRef idx="2">
+            <a:schemeClr val="accent1">
+              <a:shade val="50000"/>
+            </a:schemeClr>
+          </a:lnRef>
+          <a:fillRef idx="1">
+            <a:schemeClr val="accent1"/>
+          </a:fillRef>
+          <a:effectRef idx="0">
+            <a:schemeClr val="accent1"/>
+          </a:effectRef>
+          <a:fontRef idx="minor">
+            <a:schemeClr val="lt1"/>
+          </a:fontRef>
+        </p:style>
+        <p:txBody>
+          <a:bodyPr rot="0" spcFirstLastPara="0" vertOverflow="overflow" horzOverflow="overflow" vert="horz" wrap="square" lIns="91440" tIns="45720" rIns="91440" bIns="45720" numCol="1" spcCol="0" rtlCol="0" fromWordArt="0" anchor="ctr" anchorCtr="0" forceAA="0" compatLnSpc="1">
+            <a:prstTxWarp prst="textNoShape">
+              <a:avLst/>
+            </a:prstTxWarp>
+            <a:noAutofit/>
+          </a:bodyPr>
+          <a:lstStyle/>
+          <a:p>
+            <a:r>
+              <a:rPr lang="en-US" sz="1100" dirty="0">
+                <a:solidFill>
+                  <a:schemeClr val="tx1"/>
+                </a:solidFill>
+                <a:latin typeface="Arial" panose="020B0604020202020204" pitchFamily="34" charset="0"/>
+                <a:cs typeface="Arial" panose="020B0604020202020204" pitchFamily="34" charset="0"/>
+              </a:rPr>
+              <a:t>Method 2: Use z/OSMF Workflow</a:t>
+            </a:r>
+          </a:p>
+        </p:txBody>
+      </p:sp>
+      <p:cxnSp>
+        <p:nvCxnSpPr>
+          <p:cNvPr id="60" name="Straight Arrow Connector 59">
+            <a:extLst>
+              <a:ext uri="{FF2B5EF4-FFF2-40B4-BE49-F238E27FC236}">
+                <a16:creationId xmlns:a16="http://schemas.microsoft.com/office/drawing/2014/main" id="{80584741-C0CA-8844-A96F-8DFB5F6261FA}"/>
+              </a:ext>
+            </a:extLst>
+          </p:cNvPr>
+          <p:cNvCxnSpPr>
+            <a:cxnSpLocks/>
+          </p:cNvCxnSpPr>
+          <p:nvPr/>
+        </p:nvCxnSpPr>
+        <p:spPr>
+          <a:xfrm>
+            <a:off x="5084556" y="9829410"/>
+            <a:ext cx="0" cy="340330"/>
+          </a:xfrm>
+          <a:prstGeom prst="straightConnector1">
+            <a:avLst/>
+          </a:prstGeom>
+          <a:ln>
+            <a:solidFill>
+              <a:schemeClr val="tx1">
+                <a:lumMod val="50000"/>
+                <a:lumOff val="50000"/>
+              </a:schemeClr>
+            </a:solidFill>
+            <a:tailEnd type="triangle"/>
+          </a:ln>
+        </p:spPr>
+        <p:style>
+          <a:lnRef idx="1">
+            <a:schemeClr val="accent1"/>
+          </a:lnRef>
+          <a:fillRef idx="0">
+            <a:schemeClr val="accent1"/>
+          </a:fillRef>
+          <a:effectRef idx="0">
+            <a:schemeClr val="accent1"/>
+          </a:effectRef>
+          <a:fontRef idx="minor">
+            <a:schemeClr val="tx1"/>
+          </a:fontRef>
+        </p:style>
+      </p:cxnSp>
+      <p:cxnSp>
+        <p:nvCxnSpPr>
+          <p:cNvPr id="61" name="Straight Arrow Connector 60">
+            <a:extLst>
+              <a:ext uri="{FF2B5EF4-FFF2-40B4-BE49-F238E27FC236}">
+                <a16:creationId xmlns:a16="http://schemas.microsoft.com/office/drawing/2014/main" id="{1428AE51-8321-614B-9F78-E711328B7082}"/>
+              </a:ext>
+            </a:extLst>
+          </p:cNvPr>
+          <p:cNvCxnSpPr>
+            <a:cxnSpLocks/>
+          </p:cNvCxnSpPr>
+          <p:nvPr/>
+        </p:nvCxnSpPr>
+        <p:spPr>
+          <a:xfrm>
+            <a:off x="5056339" y="11077014"/>
+            <a:ext cx="0" cy="340330"/>
+          </a:xfrm>
+          <a:prstGeom prst="straightConnector1">
+            <a:avLst/>
+          </a:prstGeom>
+          <a:ln>
+            <a:solidFill>
+              <a:schemeClr val="tx1">
+                <a:lumMod val="50000"/>
+                <a:lumOff val="50000"/>
+              </a:schemeClr>
+            </a:solidFill>
+            <a:tailEnd type="triangle"/>
+          </a:ln>
+        </p:spPr>
+        <p:style>
+          <a:lnRef idx="1">
+            <a:schemeClr val="accent1"/>
+          </a:lnRef>
+          <a:fillRef idx="0">
+            <a:schemeClr val="accent1"/>
+          </a:fillRef>
+          <a:effectRef idx="0">
+            <a:schemeClr val="accent1"/>
+          </a:effectRef>
+          <a:fontRef idx="minor">
+            <a:schemeClr val="tx1"/>
+          </a:fontRef>
+        </p:style>
+      </p:cxnSp>
+      <p:cxnSp>
+        <p:nvCxnSpPr>
+          <p:cNvPr id="79" name="Straight Arrow Connector 78">
+            <a:extLst>
+              <a:ext uri="{FF2B5EF4-FFF2-40B4-BE49-F238E27FC236}">
+                <a16:creationId xmlns:a16="http://schemas.microsoft.com/office/drawing/2014/main" id="{90624AB8-1AEC-0B4E-9CB1-79D29B4301AE}"/>
+              </a:ext>
+            </a:extLst>
+          </p:cNvPr>
+          <p:cNvCxnSpPr>
+            <a:cxnSpLocks/>
+          </p:cNvCxnSpPr>
+          <p:nvPr/>
+        </p:nvCxnSpPr>
+        <p:spPr>
+          <a:xfrm>
+            <a:off x="5040312" y="12125963"/>
+            <a:ext cx="0" cy="340330"/>
+          </a:xfrm>
+          <a:prstGeom prst="straightConnector1">
+            <a:avLst/>
+          </a:prstGeom>
+          <a:ln>
+            <a:solidFill>
+              <a:schemeClr val="tx1">
+                <a:lumMod val="50000"/>
+                <a:lumOff val="50000"/>
+              </a:schemeClr>
+            </a:solidFill>
+            <a:tailEnd type="triangle"/>
+          </a:ln>
+        </p:spPr>
+        <p:style>
+          <a:lnRef idx="1">
+            <a:schemeClr val="accent1"/>
+          </a:lnRef>
+          <a:fillRef idx="0">
+            <a:schemeClr val="accent1"/>
+          </a:fillRef>
+          <a:effectRef idx="0">
+            <a:schemeClr val="accent1"/>
+          </a:effectRef>
+          <a:fontRef idx="minor">
+            <a:schemeClr val="tx1"/>
+          </a:fontRef>
+        </p:style>
+      </p:cxnSp>
+      <p:cxnSp>
+        <p:nvCxnSpPr>
+          <p:cNvPr id="80" name="Straight Arrow Connector 79">
+            <a:extLst>
+              <a:ext uri="{FF2B5EF4-FFF2-40B4-BE49-F238E27FC236}">
+                <a16:creationId xmlns:a16="http://schemas.microsoft.com/office/drawing/2014/main" id="{30184696-6146-BE47-B491-F25D60E7D167}"/>
+              </a:ext>
+            </a:extLst>
+          </p:cNvPr>
+          <p:cNvCxnSpPr>
+            <a:cxnSpLocks/>
+          </p:cNvCxnSpPr>
+          <p:nvPr/>
+        </p:nvCxnSpPr>
+        <p:spPr>
+          <a:xfrm>
+            <a:off x="5026843" y="13096195"/>
+            <a:ext cx="0" cy="464090"/>
+          </a:xfrm>
+          <a:prstGeom prst="straightConnector1">
+            <a:avLst/>
+          </a:prstGeom>
+          <a:ln>
+            <a:solidFill>
+              <a:schemeClr val="tx1">
+                <a:lumMod val="50000"/>
+                <a:lumOff val="50000"/>
+              </a:schemeClr>
+            </a:solidFill>
+            <a:tailEnd type="triangle"/>
+          </a:ln>
+        </p:spPr>
+        <p:style>
+          <a:lnRef idx="1">
+            <a:schemeClr val="accent1"/>
+          </a:lnRef>
+          <a:fillRef idx="0">
+            <a:schemeClr val="accent1"/>
+          </a:fillRef>
+          <a:effectRef idx="0">
+            <a:schemeClr val="accent1"/>
+          </a:effectRef>
+          <a:fontRef idx="minor">
+            <a:schemeClr val="tx1"/>
+          </a:fontRef>
+        </p:style>
+      </p:cxnSp>
     </p:spTree>
     <p:extLst>
       <p:ext uri="{BB962C8B-B14F-4D97-AF65-F5344CB8AC3E}">
-        <p14:creationId xmlns:p14="http://schemas.microsoft.com/office/powerpoint/2010/main" val="2407308635"/>
+        <p14:creationId xmlns:p14="http://schemas.microsoft.com/office/powerpoint/2010/main" val="960402841"/>
       </p:ext>
     </p:extLst>
   </p:cSld>

</xml_diff>

<commit_message>
Update the install diagram to reflect z/OSMF workflow changes (#1212)
* Update the flow diagram for z/osmf workflow

Signed-off-by: nannanli <nannanli@cn.ibm.com>

* Fix link

Signed-off-by: nannanli <nannanli@cn.ibm.com>

* Fix broken links

Signed-off-by: nannanli <nannanli@cn.ibm.com>
</commit_message>
<xml_diff>
--- a/docs/images/common/zowe-zos-install-diagram.pptx
+++ b/docs/images/common/zowe-zos-install-diagram.pptx
@@ -2,12 +2,12 @@
 <file path=ppt/presentation.xml><?xml version="1.0" encoding="utf-8"?>
 <p:presentation xmlns:a="http://schemas.openxmlformats.org/drawingml/2006/main" xmlns:r="http://schemas.openxmlformats.org/officeDocument/2006/relationships" xmlns:p="http://schemas.openxmlformats.org/presentationml/2006/main" saveSubsetFonts="1" autoCompressPictures="0">
   <p:sldMasterIdLst>
-    <p:sldMasterId id="2147483720" r:id="rId1"/>
+    <p:sldMasterId id="2147483732" r:id="rId1"/>
   </p:sldMasterIdLst>
   <p:sldIdLst>
-    <p:sldId id="256" r:id="rId2"/>
+    <p:sldId id="257" r:id="rId2"/>
   </p:sldIdLst>
-  <p:sldSz cx="10080625" cy="13320713"/>
+  <p:sldSz cx="10080625" cy="14400213"/>
   <p:notesSz cx="6858000" cy="9144000"/>
   <p:defaultTextStyle>
     <a:defPPr>
@@ -141,8 +141,8 @@
         </p:nvSpPr>
         <p:spPr>
           <a:xfrm>
-            <a:off x="756047" y="2180034"/>
-            <a:ext cx="8568531" cy="4637582"/>
+            <a:off x="756047" y="2356703"/>
+            <a:ext cx="8568531" cy="5013407"/>
           </a:xfrm>
         </p:spPr>
         <p:txBody>
@@ -173,8 +173,8 @@
         </p:nvSpPr>
         <p:spPr>
           <a:xfrm>
-            <a:off x="1260078" y="6996459"/>
-            <a:ext cx="7560469" cy="3216088"/>
+            <a:off x="1260078" y="7563446"/>
+            <a:ext cx="7560469" cy="3476717"/>
           </a:xfrm>
         </p:spPr>
         <p:txBody>
@@ -243,7 +243,7 @@
           <a:p>
             <a:fld id="{C4A90A56-7146-D847-92E1-256101539D4D}" type="datetimeFigureOut">
               <a:rPr lang="en-US" smtClean="0"/>
-              <a:t>2/25/20</a:t>
+              <a:t>5/14/20</a:t>
             </a:fld>
             <a:endParaRPr lang="en-US"/>
           </a:p>
@@ -294,7 +294,7 @@
     </p:spTree>
     <p:extLst>
       <p:ext uri="{BB962C8B-B14F-4D97-AF65-F5344CB8AC3E}">
-        <p14:creationId xmlns:p14="http://schemas.microsoft.com/office/powerpoint/2010/main" val="2395352873"/>
+        <p14:creationId xmlns:p14="http://schemas.microsoft.com/office/powerpoint/2010/main" val="3888447981"/>
       </p:ext>
     </p:extLst>
   </p:cSld>
@@ -413,7 +413,7 @@
           <a:p>
             <a:fld id="{C4A90A56-7146-D847-92E1-256101539D4D}" type="datetimeFigureOut">
               <a:rPr lang="en-US" smtClean="0"/>
-              <a:t>2/25/20</a:t>
+              <a:t>5/14/20</a:t>
             </a:fld>
             <a:endParaRPr lang="en-US"/>
           </a:p>
@@ -464,7 +464,7 @@
     </p:spTree>
     <p:extLst>
       <p:ext uri="{BB962C8B-B14F-4D97-AF65-F5344CB8AC3E}">
-        <p14:creationId xmlns:p14="http://schemas.microsoft.com/office/powerpoint/2010/main" val="7122188"/>
+        <p14:creationId xmlns:p14="http://schemas.microsoft.com/office/powerpoint/2010/main" val="1107174681"/>
       </p:ext>
     </p:extLst>
   </p:cSld>
@@ -503,8 +503,8 @@
         </p:nvSpPr>
         <p:spPr>
           <a:xfrm>
-            <a:off x="7213948" y="709204"/>
-            <a:ext cx="2173635" cy="11288689"/>
+            <a:off x="7213948" y="766678"/>
+            <a:ext cx="2173635" cy="12203515"/>
           </a:xfrm>
         </p:spPr>
         <p:txBody>
@@ -531,8 +531,8 @@
         </p:nvSpPr>
         <p:spPr>
           <a:xfrm>
-            <a:off x="693044" y="709204"/>
-            <a:ext cx="6394896" cy="11288689"/>
+            <a:off x="693044" y="766678"/>
+            <a:ext cx="6394896" cy="12203515"/>
           </a:xfrm>
         </p:spPr>
         <p:txBody>
@@ -593,7 +593,7 @@
           <a:p>
             <a:fld id="{C4A90A56-7146-D847-92E1-256101539D4D}" type="datetimeFigureOut">
               <a:rPr lang="en-US" smtClean="0"/>
-              <a:t>2/25/20</a:t>
+              <a:t>5/14/20</a:t>
             </a:fld>
             <a:endParaRPr lang="en-US"/>
           </a:p>
@@ -644,7 +644,7 @@
     </p:spTree>
     <p:extLst>
       <p:ext uri="{BB962C8B-B14F-4D97-AF65-F5344CB8AC3E}">
-        <p14:creationId xmlns:p14="http://schemas.microsoft.com/office/powerpoint/2010/main" val="151982273"/>
+        <p14:creationId xmlns:p14="http://schemas.microsoft.com/office/powerpoint/2010/main" val="4005149872"/>
       </p:ext>
     </p:extLst>
   </p:cSld>
@@ -763,7 +763,7 @@
           <a:p>
             <a:fld id="{C4A90A56-7146-D847-92E1-256101539D4D}" type="datetimeFigureOut">
               <a:rPr lang="en-US" smtClean="0"/>
-              <a:t>2/25/20</a:t>
+              <a:t>5/14/20</a:t>
             </a:fld>
             <a:endParaRPr lang="en-US"/>
           </a:p>
@@ -814,7 +814,7 @@
     </p:spTree>
     <p:extLst>
       <p:ext uri="{BB962C8B-B14F-4D97-AF65-F5344CB8AC3E}">
-        <p14:creationId xmlns:p14="http://schemas.microsoft.com/office/powerpoint/2010/main" val="711893432"/>
+        <p14:creationId xmlns:p14="http://schemas.microsoft.com/office/powerpoint/2010/main" val="858141302"/>
       </p:ext>
     </p:extLst>
   </p:cSld>
@@ -853,8 +853,8 @@
         </p:nvSpPr>
         <p:spPr>
           <a:xfrm>
-            <a:off x="687793" y="3320931"/>
-            <a:ext cx="8694539" cy="5541046"/>
+            <a:off x="687793" y="3590057"/>
+            <a:ext cx="8694539" cy="5990088"/>
           </a:xfrm>
         </p:spPr>
         <p:txBody>
@@ -885,8 +885,8 @@
         </p:nvSpPr>
         <p:spPr>
           <a:xfrm>
-            <a:off x="687793" y="8914398"/>
-            <a:ext cx="8694539" cy="2913905"/>
+            <a:off x="687793" y="9636813"/>
+            <a:ext cx="8694539" cy="3150046"/>
           </a:xfrm>
         </p:spPr>
         <p:txBody>
@@ -1007,7 +1007,7 @@
           <a:p>
             <a:fld id="{C4A90A56-7146-D847-92E1-256101539D4D}" type="datetimeFigureOut">
               <a:rPr lang="en-US" smtClean="0"/>
-              <a:t>2/25/20</a:t>
+              <a:t>5/14/20</a:t>
             </a:fld>
             <a:endParaRPr lang="en-US"/>
           </a:p>
@@ -1058,7 +1058,7 @@
     </p:spTree>
     <p:extLst>
       <p:ext uri="{BB962C8B-B14F-4D97-AF65-F5344CB8AC3E}">
-        <p14:creationId xmlns:p14="http://schemas.microsoft.com/office/powerpoint/2010/main" val="614506776"/>
+        <p14:creationId xmlns:p14="http://schemas.microsoft.com/office/powerpoint/2010/main" val="1151330638"/>
       </p:ext>
     </p:extLst>
   </p:cSld>
@@ -1120,8 +1120,8 @@
         </p:nvSpPr>
         <p:spPr>
           <a:xfrm>
-            <a:off x="693043" y="3546023"/>
-            <a:ext cx="4284266" cy="8451870"/>
+            <a:off x="693043" y="3833390"/>
+            <a:ext cx="4284266" cy="9136803"/>
           </a:xfrm>
         </p:spPr>
         <p:txBody>
@@ -1177,8 +1177,8 @@
         </p:nvSpPr>
         <p:spPr>
           <a:xfrm>
-            <a:off x="5103316" y="3546023"/>
-            <a:ext cx="4284266" cy="8451870"/>
+            <a:off x="5103316" y="3833390"/>
+            <a:ext cx="4284266" cy="9136803"/>
           </a:xfrm>
         </p:spPr>
         <p:txBody>
@@ -1239,7 +1239,7 @@
           <a:p>
             <a:fld id="{C4A90A56-7146-D847-92E1-256101539D4D}" type="datetimeFigureOut">
               <a:rPr lang="en-US" smtClean="0"/>
-              <a:t>2/25/20</a:t>
+              <a:t>5/14/20</a:t>
             </a:fld>
             <a:endParaRPr lang="en-US"/>
           </a:p>
@@ -1290,7 +1290,7 @@
     </p:spTree>
     <p:extLst>
       <p:ext uri="{BB962C8B-B14F-4D97-AF65-F5344CB8AC3E}">
-        <p14:creationId xmlns:p14="http://schemas.microsoft.com/office/powerpoint/2010/main" val="3898524748"/>
+        <p14:creationId xmlns:p14="http://schemas.microsoft.com/office/powerpoint/2010/main" val="2016199847"/>
       </p:ext>
     </p:extLst>
   </p:cSld>
@@ -1329,8 +1329,8 @@
         </p:nvSpPr>
         <p:spPr>
           <a:xfrm>
-            <a:off x="694356" y="709208"/>
-            <a:ext cx="8694539" cy="2574722"/>
+            <a:off x="694356" y="766681"/>
+            <a:ext cx="8694539" cy="2783376"/>
           </a:xfrm>
         </p:spPr>
         <p:txBody>
@@ -1357,8 +1357,8 @@
         </p:nvSpPr>
         <p:spPr>
           <a:xfrm>
-            <a:off x="694357" y="3265426"/>
-            <a:ext cx="4264576" cy="1600335"/>
+            <a:off x="694357" y="3530053"/>
+            <a:ext cx="4264576" cy="1730025"/>
           </a:xfrm>
         </p:spPr>
         <p:txBody>
@@ -1422,8 +1422,8 @@
         </p:nvSpPr>
         <p:spPr>
           <a:xfrm>
-            <a:off x="694357" y="4865760"/>
-            <a:ext cx="4264576" cy="7156801"/>
+            <a:off x="694357" y="5260078"/>
+            <a:ext cx="4264576" cy="7736782"/>
           </a:xfrm>
         </p:spPr>
         <p:txBody>
@@ -1479,8 +1479,8 @@
         </p:nvSpPr>
         <p:spPr>
           <a:xfrm>
-            <a:off x="5103317" y="3265426"/>
-            <a:ext cx="4285579" cy="1600335"/>
+            <a:off x="5103317" y="3530053"/>
+            <a:ext cx="4285579" cy="1730025"/>
           </a:xfrm>
         </p:spPr>
         <p:txBody>
@@ -1544,8 +1544,8 @@
         </p:nvSpPr>
         <p:spPr>
           <a:xfrm>
-            <a:off x="5103317" y="4865760"/>
-            <a:ext cx="4285579" cy="7156801"/>
+            <a:off x="5103317" y="5260078"/>
+            <a:ext cx="4285579" cy="7736782"/>
           </a:xfrm>
         </p:spPr>
         <p:txBody>
@@ -1606,7 +1606,7 @@
           <a:p>
             <a:fld id="{C4A90A56-7146-D847-92E1-256101539D4D}" type="datetimeFigureOut">
               <a:rPr lang="en-US" smtClean="0"/>
-              <a:t>2/25/20</a:t>
+              <a:t>5/14/20</a:t>
             </a:fld>
             <a:endParaRPr lang="en-US"/>
           </a:p>
@@ -1657,7 +1657,7 @@
     </p:spTree>
     <p:extLst>
       <p:ext uri="{BB962C8B-B14F-4D97-AF65-F5344CB8AC3E}">
-        <p14:creationId xmlns:p14="http://schemas.microsoft.com/office/powerpoint/2010/main" val="2989870379"/>
+        <p14:creationId xmlns:p14="http://schemas.microsoft.com/office/powerpoint/2010/main" val="3214748213"/>
       </p:ext>
     </p:extLst>
   </p:cSld>
@@ -1724,7 +1724,7 @@
           <a:p>
             <a:fld id="{C4A90A56-7146-D847-92E1-256101539D4D}" type="datetimeFigureOut">
               <a:rPr lang="en-US" smtClean="0"/>
-              <a:t>2/25/20</a:t>
+              <a:t>5/14/20</a:t>
             </a:fld>
             <a:endParaRPr lang="en-US"/>
           </a:p>
@@ -1775,7 +1775,7 @@
     </p:spTree>
     <p:extLst>
       <p:ext uri="{BB962C8B-B14F-4D97-AF65-F5344CB8AC3E}">
-        <p14:creationId xmlns:p14="http://schemas.microsoft.com/office/powerpoint/2010/main" val="2366837216"/>
+        <p14:creationId xmlns:p14="http://schemas.microsoft.com/office/powerpoint/2010/main" val="1760525366"/>
       </p:ext>
     </p:extLst>
   </p:cSld>
@@ -1819,7 +1819,7 @@
           <a:p>
             <a:fld id="{C4A90A56-7146-D847-92E1-256101539D4D}" type="datetimeFigureOut">
               <a:rPr lang="en-US" smtClean="0"/>
-              <a:t>2/25/20</a:t>
+              <a:t>5/14/20</a:t>
             </a:fld>
             <a:endParaRPr lang="en-US"/>
           </a:p>
@@ -1870,7 +1870,7 @@
     </p:spTree>
     <p:extLst>
       <p:ext uri="{BB962C8B-B14F-4D97-AF65-F5344CB8AC3E}">
-        <p14:creationId xmlns:p14="http://schemas.microsoft.com/office/powerpoint/2010/main" val="3169526979"/>
+        <p14:creationId xmlns:p14="http://schemas.microsoft.com/office/powerpoint/2010/main" val="2667973542"/>
       </p:ext>
     </p:extLst>
   </p:cSld>
@@ -1909,8 +1909,8 @@
         </p:nvSpPr>
         <p:spPr>
           <a:xfrm>
-            <a:off x="694356" y="888048"/>
-            <a:ext cx="3251264" cy="3108166"/>
+            <a:off x="694356" y="960014"/>
+            <a:ext cx="3251264" cy="3360050"/>
           </a:xfrm>
         </p:spPr>
         <p:txBody>
@@ -1941,8 +1941,8 @@
         </p:nvSpPr>
         <p:spPr>
           <a:xfrm>
-            <a:off x="4285579" y="1917939"/>
-            <a:ext cx="5103316" cy="9466340"/>
+            <a:off x="4285579" y="2073367"/>
+            <a:ext cx="5103316" cy="10233485"/>
           </a:xfrm>
         </p:spPr>
         <p:txBody>
@@ -2026,8 +2026,8 @@
         </p:nvSpPr>
         <p:spPr>
           <a:xfrm>
-            <a:off x="694356" y="3996214"/>
-            <a:ext cx="3251264" cy="7403481"/>
+            <a:off x="694356" y="4320064"/>
+            <a:ext cx="3251264" cy="8003453"/>
           </a:xfrm>
         </p:spPr>
         <p:txBody>
@@ -2096,7 +2096,7 @@
           <a:p>
             <a:fld id="{C4A90A56-7146-D847-92E1-256101539D4D}" type="datetimeFigureOut">
               <a:rPr lang="en-US" smtClean="0"/>
-              <a:t>2/25/20</a:t>
+              <a:t>5/14/20</a:t>
             </a:fld>
             <a:endParaRPr lang="en-US"/>
           </a:p>
@@ -2147,7 +2147,7 @@
     </p:spTree>
     <p:extLst>
       <p:ext uri="{BB962C8B-B14F-4D97-AF65-F5344CB8AC3E}">
-        <p14:creationId xmlns:p14="http://schemas.microsoft.com/office/powerpoint/2010/main" val="2306677679"/>
+        <p14:creationId xmlns:p14="http://schemas.microsoft.com/office/powerpoint/2010/main" val="2833463524"/>
       </p:ext>
     </p:extLst>
   </p:cSld>
@@ -2186,8 +2186,8 @@
         </p:nvSpPr>
         <p:spPr>
           <a:xfrm>
-            <a:off x="694356" y="888048"/>
-            <a:ext cx="3251264" cy="3108166"/>
+            <a:off x="694356" y="960014"/>
+            <a:ext cx="3251264" cy="3360050"/>
           </a:xfrm>
         </p:spPr>
         <p:txBody>
@@ -2218,8 +2218,8 @@
         </p:nvSpPr>
         <p:spPr>
           <a:xfrm>
-            <a:off x="4285579" y="1917939"/>
-            <a:ext cx="5103316" cy="9466340"/>
+            <a:off x="4285579" y="2073367"/>
+            <a:ext cx="5103316" cy="10233485"/>
           </a:xfrm>
         </p:spPr>
         <p:txBody>
@@ -2283,8 +2283,8 @@
         </p:nvSpPr>
         <p:spPr>
           <a:xfrm>
-            <a:off x="694356" y="3996214"/>
-            <a:ext cx="3251264" cy="7403481"/>
+            <a:off x="694356" y="4320064"/>
+            <a:ext cx="3251264" cy="8003453"/>
           </a:xfrm>
         </p:spPr>
         <p:txBody>
@@ -2353,7 +2353,7 @@
           <a:p>
             <a:fld id="{C4A90A56-7146-D847-92E1-256101539D4D}" type="datetimeFigureOut">
               <a:rPr lang="en-US" smtClean="0"/>
-              <a:t>2/25/20</a:t>
+              <a:t>5/14/20</a:t>
             </a:fld>
             <a:endParaRPr lang="en-US"/>
           </a:p>
@@ -2404,7 +2404,7 @@
     </p:spTree>
     <p:extLst>
       <p:ext uri="{BB962C8B-B14F-4D97-AF65-F5344CB8AC3E}">
-        <p14:creationId xmlns:p14="http://schemas.microsoft.com/office/powerpoint/2010/main" val="802816067"/>
+        <p14:creationId xmlns:p14="http://schemas.microsoft.com/office/powerpoint/2010/main" val="3440151996"/>
       </p:ext>
     </p:extLst>
   </p:cSld>
@@ -2448,8 +2448,8 @@
         </p:nvSpPr>
         <p:spPr>
           <a:xfrm>
-            <a:off x="693043" y="709208"/>
-            <a:ext cx="8694539" cy="2574722"/>
+            <a:off x="693043" y="766681"/>
+            <a:ext cx="8694539" cy="2783376"/>
           </a:xfrm>
           <a:prstGeom prst="rect">
             <a:avLst/>
@@ -2481,8 +2481,8 @@
         </p:nvSpPr>
         <p:spPr>
           <a:xfrm>
-            <a:off x="693043" y="3546023"/>
-            <a:ext cx="8694539" cy="8451870"/>
+            <a:off x="693043" y="3833390"/>
+            <a:ext cx="8694539" cy="9136803"/>
           </a:xfrm>
           <a:prstGeom prst="rect">
             <a:avLst/>
@@ -2543,8 +2543,8 @@
         </p:nvSpPr>
         <p:spPr>
           <a:xfrm>
-            <a:off x="693043" y="12346330"/>
-            <a:ext cx="2268141" cy="709205"/>
+            <a:off x="693043" y="13346867"/>
+            <a:ext cx="2268141" cy="766678"/>
           </a:xfrm>
           <a:prstGeom prst="rect">
             <a:avLst/>
@@ -2566,7 +2566,7 @@
           <a:p>
             <a:fld id="{C4A90A56-7146-D847-92E1-256101539D4D}" type="datetimeFigureOut">
               <a:rPr lang="en-US" smtClean="0"/>
-              <a:t>2/25/20</a:t>
+              <a:t>5/14/20</a:t>
             </a:fld>
             <a:endParaRPr lang="en-US"/>
           </a:p>
@@ -2584,8 +2584,8 @@
         </p:nvSpPr>
         <p:spPr>
           <a:xfrm>
-            <a:off x="3339207" y="12346330"/>
-            <a:ext cx="3402211" cy="709205"/>
+            <a:off x="3339207" y="13346867"/>
+            <a:ext cx="3402211" cy="766678"/>
           </a:xfrm>
           <a:prstGeom prst="rect">
             <a:avLst/>
@@ -2621,8 +2621,8 @@
         </p:nvSpPr>
         <p:spPr>
           <a:xfrm>
-            <a:off x="7119441" y="12346330"/>
-            <a:ext cx="2268141" cy="709205"/>
+            <a:off x="7119441" y="13346867"/>
+            <a:ext cx="2268141" cy="766678"/>
           </a:xfrm>
           <a:prstGeom prst="rect">
             <a:avLst/>
@@ -2653,23 +2653,23 @@
     </p:spTree>
     <p:extLst>
       <p:ext uri="{BB962C8B-B14F-4D97-AF65-F5344CB8AC3E}">
-        <p14:creationId xmlns:p14="http://schemas.microsoft.com/office/powerpoint/2010/main" val="1135596371"/>
+        <p14:creationId xmlns:p14="http://schemas.microsoft.com/office/powerpoint/2010/main" val="1278784598"/>
       </p:ext>
     </p:extLst>
   </p:cSld>
   <p:clrMap bg1="lt1" tx1="dk1" bg2="lt2" tx2="dk2" accent1="accent1" accent2="accent2" accent3="accent3" accent4="accent4" accent5="accent5" accent6="accent6" hlink="hlink" folHlink="folHlink"/>
   <p:sldLayoutIdLst>
-    <p:sldLayoutId id="2147483721" r:id="rId1"/>
-    <p:sldLayoutId id="2147483722" r:id="rId2"/>
-    <p:sldLayoutId id="2147483723" r:id="rId3"/>
-    <p:sldLayoutId id="2147483724" r:id="rId4"/>
-    <p:sldLayoutId id="2147483725" r:id="rId5"/>
-    <p:sldLayoutId id="2147483726" r:id="rId6"/>
-    <p:sldLayoutId id="2147483727" r:id="rId7"/>
-    <p:sldLayoutId id="2147483728" r:id="rId8"/>
-    <p:sldLayoutId id="2147483729" r:id="rId9"/>
-    <p:sldLayoutId id="2147483730" r:id="rId10"/>
-    <p:sldLayoutId id="2147483731" r:id="rId11"/>
+    <p:sldLayoutId id="2147483733" r:id="rId1"/>
+    <p:sldLayoutId id="2147483734" r:id="rId2"/>
+    <p:sldLayoutId id="2147483735" r:id="rId3"/>
+    <p:sldLayoutId id="2147483736" r:id="rId4"/>
+    <p:sldLayoutId id="2147483737" r:id="rId5"/>
+    <p:sldLayoutId id="2147483738" r:id="rId6"/>
+    <p:sldLayoutId id="2147483739" r:id="rId7"/>
+    <p:sldLayoutId id="2147483740" r:id="rId8"/>
+    <p:sldLayoutId id="2147483741" r:id="rId9"/>
+    <p:sldLayoutId id="2147483742" r:id="rId10"/>
+    <p:sldLayoutId id="2147483743" r:id="rId11"/>
   </p:sldLayoutIdLst>
   <p:txStyles>
     <p:titleStyle>
@@ -2985,112 +2985,14 @@
         </p:nvSpPr>
         <p:spPr>
           <a:xfrm>
-            <a:off x="4164230" y="1577335"/>
+            <a:off x="4303395" y="1689393"/>
             <a:ext cx="180000" cy="180000"/>
           </a:xfrm>
           <a:prstGeom prst="ellipse">
             <a:avLst/>
           </a:prstGeom>
-          <a:noFill/>
-          <a:ln>
-            <a:solidFill>
-              <a:srgbClr val="265E83"/>
-            </a:solidFill>
-          </a:ln>
-        </p:spPr>
-        <p:style>
-          <a:lnRef idx="2">
-            <a:schemeClr val="accent1">
-              <a:shade val="50000"/>
-            </a:schemeClr>
-          </a:lnRef>
-          <a:fillRef idx="1">
-            <a:schemeClr val="accent1"/>
-          </a:fillRef>
-          <a:effectRef idx="0">
-            <a:schemeClr val="accent1"/>
-          </a:effectRef>
-          <a:fontRef idx="minor">
-            <a:schemeClr val="lt1"/>
-          </a:fontRef>
-        </p:style>
-        <p:txBody>
-          <a:bodyPr rot="0" spcFirstLastPara="0" vertOverflow="overflow" horzOverflow="overflow" vert="horz" wrap="square" lIns="91440" tIns="45720" rIns="91440" bIns="45720" numCol="1" spcCol="0" rtlCol="0" fromWordArt="0" anchor="ctr" anchorCtr="0" forceAA="0" compatLnSpc="1">
-            <a:prstTxWarp prst="textNoShape">
-              <a:avLst/>
-            </a:prstTxWarp>
-            <a:noAutofit/>
-          </a:bodyPr>
-          <a:lstStyle/>
-          <a:p>
-            <a:pPr algn="ctr"/>
-            <a:endParaRPr lang="en-US">
-              <a:latin typeface="Arial" panose="020B0604020202020204" pitchFamily="34" charset="0"/>
-              <a:cs typeface="Arial" panose="020B0604020202020204" pitchFamily="34" charset="0"/>
-            </a:endParaRPr>
-          </a:p>
-        </p:txBody>
-      </p:sp>
-      <p:sp>
-        <p:nvSpPr>
-          <p:cNvPr id="7" name="TextBox 6">
-            <a:extLst>
-              <a:ext uri="{FF2B5EF4-FFF2-40B4-BE49-F238E27FC236}">
-                <a16:creationId xmlns:a16="http://schemas.microsoft.com/office/drawing/2014/main" id="{1E65944C-7423-EA4F-9720-8AE0C58E5142}"/>
-              </a:ext>
-            </a:extLst>
-          </p:cNvPr>
-          <p:cNvSpPr txBox="1"/>
-          <p:nvPr/>
-        </p:nvSpPr>
-        <p:spPr>
-          <a:xfrm>
-            <a:off x="4303950" y="1524613"/>
-            <a:ext cx="2219327" cy="307777"/>
-          </a:xfrm>
-          <a:prstGeom prst="rect">
-            <a:avLst/>
-          </a:prstGeom>
-          <a:noFill/>
-        </p:spPr>
-        <p:txBody>
-          <a:bodyPr wrap="square" rtlCol="0">
-            <a:spAutoFit/>
-          </a:bodyPr>
-          <a:lstStyle/>
-          <a:p>
-            <a:r>
-              <a:rPr lang="en-US" sz="1400" dirty="0">
-                <a:latin typeface="Arial" panose="020B0604020202020204" pitchFamily="34" charset="0"/>
-                <a:cs typeface="Arial" panose="020B0604020202020204" pitchFamily="34" charset="0"/>
-              </a:rPr>
-              <a:t>Start the installation</a:t>
-            </a:r>
-          </a:p>
-        </p:txBody>
-      </p:sp>
-      <p:sp>
-        <p:nvSpPr>
-          <p:cNvPr id="8" name="Rectangle 7">
-            <a:extLst>
-              <a:ext uri="{FF2B5EF4-FFF2-40B4-BE49-F238E27FC236}">
-                <a16:creationId xmlns:a16="http://schemas.microsoft.com/office/drawing/2014/main" id="{702ABCD3-0E98-4F43-88A3-5ACCFBACBCBF}"/>
-              </a:ext>
-            </a:extLst>
-          </p:cNvPr>
-          <p:cNvSpPr/>
-          <p:nvPr/>
-        </p:nvSpPr>
-        <p:spPr>
-          <a:xfrm>
-            <a:off x="3324945" y="2085471"/>
-            <a:ext cx="1958008" cy="558971"/>
-          </a:xfrm>
-          <a:prstGeom prst="rect">
-            <a:avLst/>
-          </a:prstGeom>
           <a:solidFill>
-            <a:srgbClr val="265F82"/>
+            <a:schemeClr val="accent1"/>
           </a:solidFill>
           <a:ln>
             <a:noFill/>
@@ -3122,10 +3024,108 @@
           <a:lstStyle/>
           <a:p>
             <a:pPr algn="ctr"/>
+            <a:endParaRPr lang="en-US">
+              <a:latin typeface="Arial" panose="020B0604020202020204" pitchFamily="34" charset="0"/>
+              <a:cs typeface="Arial" panose="020B0604020202020204" pitchFamily="34" charset="0"/>
+            </a:endParaRPr>
+          </a:p>
+        </p:txBody>
+      </p:sp>
+      <p:sp>
+        <p:nvSpPr>
+          <p:cNvPr id="7" name="TextBox 6">
+            <a:extLst>
+              <a:ext uri="{FF2B5EF4-FFF2-40B4-BE49-F238E27FC236}">
+                <a16:creationId xmlns:a16="http://schemas.microsoft.com/office/drawing/2014/main" id="{1E65944C-7423-EA4F-9720-8AE0C58E5142}"/>
+              </a:ext>
+            </a:extLst>
+          </p:cNvPr>
+          <p:cNvSpPr txBox="1"/>
+          <p:nvPr/>
+        </p:nvSpPr>
+        <p:spPr>
+          <a:xfrm>
+            <a:off x="4431541" y="1636672"/>
+            <a:ext cx="2219327" cy="307777"/>
+          </a:xfrm>
+          <a:prstGeom prst="rect">
+            <a:avLst/>
+          </a:prstGeom>
+          <a:noFill/>
+        </p:spPr>
+        <p:txBody>
+          <a:bodyPr wrap="square" rtlCol="0">
+            <a:spAutoFit/>
+          </a:bodyPr>
+          <a:lstStyle/>
+          <a:p>
+            <a:r>
+              <a:rPr lang="en-US" sz="1400" dirty="0">
+                <a:latin typeface="Arial" panose="020B0604020202020204" pitchFamily="34" charset="0"/>
+                <a:cs typeface="Arial" panose="020B0604020202020204" pitchFamily="34" charset="0"/>
+              </a:rPr>
+              <a:t>Start the installation</a:t>
+            </a:r>
+          </a:p>
+        </p:txBody>
+      </p:sp>
+      <p:sp>
+        <p:nvSpPr>
+          <p:cNvPr id="8" name="Rectangle 7">
+            <a:extLst>
+              <a:ext uri="{FF2B5EF4-FFF2-40B4-BE49-F238E27FC236}">
+                <a16:creationId xmlns:a16="http://schemas.microsoft.com/office/drawing/2014/main" id="{702ABCD3-0E98-4F43-88A3-5ACCFBACBCBF}"/>
+              </a:ext>
+            </a:extLst>
+          </p:cNvPr>
+          <p:cNvSpPr/>
+          <p:nvPr/>
+        </p:nvSpPr>
+        <p:spPr>
+          <a:xfrm>
+            <a:off x="3452535" y="2197530"/>
+            <a:ext cx="1958008" cy="558971"/>
+          </a:xfrm>
+          <a:prstGeom prst="rect">
+            <a:avLst/>
+          </a:prstGeom>
+          <a:solidFill>
+            <a:srgbClr val="CEE7E9"/>
+          </a:solidFill>
+          <a:ln>
+            <a:noFill/>
+          </a:ln>
+        </p:spPr>
+        <p:style>
+          <a:lnRef idx="2">
+            <a:schemeClr val="accent1">
+              <a:shade val="50000"/>
+            </a:schemeClr>
+          </a:lnRef>
+          <a:fillRef idx="1">
+            <a:schemeClr val="accent1"/>
+          </a:fillRef>
+          <a:effectRef idx="0">
+            <a:schemeClr val="accent1"/>
+          </a:effectRef>
+          <a:fontRef idx="minor">
+            <a:schemeClr val="lt1"/>
+          </a:fontRef>
+        </p:style>
+        <p:txBody>
+          <a:bodyPr rot="0" spcFirstLastPara="0" vertOverflow="overflow" horzOverflow="overflow" vert="horz" wrap="square" lIns="91440" tIns="45720" rIns="91440" bIns="45720" numCol="1" spcCol="0" rtlCol="0" fromWordArt="0" anchor="ctr" anchorCtr="0" forceAA="0" compatLnSpc="1">
+            <a:prstTxWarp prst="textNoShape">
+              <a:avLst/>
+            </a:prstTxWarp>
+            <a:noAutofit/>
+          </a:bodyPr>
+          <a:lstStyle/>
+          <a:p>
+            <a:pPr algn="ctr"/>
             <a:r>
               <a:rPr lang="en-US" sz="1100" dirty="0">
                 <a:solidFill>
-                  <a:schemeClr val="bg1"/>
+                  <a:schemeClr val="tx1"/>
                 </a:solidFill>
                 <a:latin typeface="Arial" panose="020B0604020202020204" pitchFamily="34" charset="0"/>
                 <a:cs typeface="Arial" panose="020B0604020202020204" pitchFamily="34" charset="0"/>
@@ -3149,17 +3149,17 @@
         </p:nvSpPr>
         <p:spPr>
           <a:xfrm>
-            <a:off x="2958690" y="3164773"/>
+            <a:off x="3086280" y="3076806"/>
             <a:ext cx="2559738" cy="809368"/>
           </a:xfrm>
           <a:prstGeom prst="diamond">
             <a:avLst/>
           </a:prstGeom>
-          <a:noFill/>
+          <a:solidFill>
+            <a:srgbClr val="FBD589"/>
+          </a:solidFill>
           <a:ln>
-            <a:solidFill>
-              <a:srgbClr val="265E83"/>
-            </a:solidFill>
+            <a:noFill/>
           </a:ln>
         </p:spPr>
         <p:style>
@@ -3212,7 +3212,7 @@
         </p:nvCxnSpPr>
         <p:spPr>
           <a:xfrm>
-            <a:off x="3014110" y="3698195"/>
+            <a:off x="3141700" y="3610229"/>
             <a:ext cx="0" cy="635129"/>
           </a:xfrm>
           <a:prstGeom prst="straightConnector1">
@@ -3220,8 +3220,9 @@
           </a:prstGeom>
           <a:ln>
             <a:solidFill>
-              <a:schemeClr val="bg2">
-                <a:lumMod val="25000"/>
+              <a:schemeClr val="tx1">
+                <a:lumMod val="50000"/>
+                <a:lumOff val="50000"/>
               </a:schemeClr>
             </a:solidFill>
             <a:tailEnd type="triangle"/>
@@ -3256,7 +3257,7 @@
         </p:nvCxnSpPr>
         <p:spPr>
           <a:xfrm>
-            <a:off x="5504435" y="3670434"/>
+            <a:off x="5632025" y="3582468"/>
             <a:ext cx="0" cy="635129"/>
           </a:xfrm>
           <a:prstGeom prst="straightConnector1">
@@ -3264,8 +3265,9 @@
           </a:prstGeom>
           <a:ln>
             <a:solidFill>
-              <a:schemeClr val="bg2">
-                <a:lumMod val="25000"/>
+              <a:schemeClr val="tx1">
+                <a:lumMod val="50000"/>
+                <a:lumOff val="50000"/>
               </a:schemeClr>
             </a:solidFill>
             <a:tailEnd type="triangle"/>
@@ -3300,14 +3302,14 @@
         </p:nvSpPr>
         <p:spPr>
           <a:xfrm>
-            <a:off x="4609065" y="4354300"/>
+            <a:off x="4736656" y="4266334"/>
             <a:ext cx="2243289" cy="558971"/>
           </a:xfrm>
           <a:prstGeom prst="rect">
             <a:avLst/>
           </a:prstGeom>
           <a:solidFill>
-            <a:srgbClr val="265F82"/>
+            <a:srgbClr val="CEE7E9"/>
           </a:solidFill>
           <a:ln>
             <a:noFill/>
@@ -3342,7 +3344,7 @@
             <a:r>
               <a:rPr lang="en-US" sz="1100" dirty="0">
                 <a:solidFill>
-                  <a:schemeClr val="bg1"/>
+                  <a:schemeClr val="tx1"/>
                 </a:solidFill>
                 <a:latin typeface="Arial" panose="020B0604020202020204" pitchFamily="34" charset="0"/>
                 <a:cs typeface="Arial" panose="020B0604020202020204" pitchFamily="34" charset="0"/>
@@ -3366,14 +3368,14 @@
         </p:nvSpPr>
         <p:spPr>
           <a:xfrm>
-            <a:off x="2250212" y="4354300"/>
+            <a:off x="2377803" y="4266334"/>
             <a:ext cx="2250655" cy="558971"/>
           </a:xfrm>
           <a:prstGeom prst="rect">
             <a:avLst/>
           </a:prstGeom>
           <a:solidFill>
-            <a:srgbClr val="265F82"/>
+            <a:srgbClr val="CEE7E9"/>
           </a:solidFill>
           <a:ln>
             <a:noFill/>
@@ -3408,7 +3410,7 @@
             <a:r>
               <a:rPr lang="en-US" sz="1100" dirty="0">
                 <a:solidFill>
-                  <a:schemeClr val="bg1"/>
+                  <a:schemeClr val="tx1"/>
                 </a:solidFill>
                 <a:latin typeface="Arial" panose="020B0604020202020204" pitchFamily="34" charset="0"/>
                 <a:cs typeface="Arial" panose="020B0604020202020204" pitchFamily="34" charset="0"/>
@@ -3432,14 +3434,14 @@
         </p:nvSpPr>
         <p:spPr>
           <a:xfrm>
-            <a:off x="4608558" y="5142747"/>
+            <a:off x="4736149" y="5054781"/>
             <a:ext cx="2243285" cy="558971"/>
           </a:xfrm>
           <a:prstGeom prst="rect">
             <a:avLst/>
           </a:prstGeom>
           <a:solidFill>
-            <a:srgbClr val="265F82"/>
+            <a:srgbClr val="CEE7E9"/>
           </a:solidFill>
           <a:ln>
             <a:noFill/>
@@ -3474,7 +3476,7 @@
             <a:r>
               <a:rPr lang="en-US" sz="1100" dirty="0">
                 <a:solidFill>
-                  <a:schemeClr val="bg1"/>
+                  <a:schemeClr val="tx1"/>
                 </a:solidFill>
                 <a:latin typeface="Arial" panose="020B0604020202020204" pitchFamily="34" charset="0"/>
                 <a:cs typeface="Arial" panose="020B0604020202020204" pitchFamily="34" charset="0"/>
@@ -3498,14 +3500,14 @@
         </p:nvSpPr>
         <p:spPr>
           <a:xfrm>
-            <a:off x="4608558" y="5904952"/>
-            <a:ext cx="2243279" cy="558971"/>
+            <a:off x="4736150" y="5816985"/>
+            <a:ext cx="4087766" cy="947863"/>
           </a:xfrm>
           <a:prstGeom prst="rect">
             <a:avLst/>
           </a:prstGeom>
           <a:solidFill>
-            <a:srgbClr val="265F82"/>
+            <a:srgbClr val="CEE7E9"/>
           </a:solidFill>
           <a:ln>
             <a:noFill/>
@@ -3536,55 +3538,35 @@
           </a:bodyPr>
           <a:lstStyle/>
           <a:p>
-            <a:pPr algn="ctr"/>
             <a:r>
               <a:rPr lang="en-US" sz="1100" dirty="0">
                 <a:solidFill>
-                  <a:schemeClr val="bg1"/>
-                </a:solidFill>
-                <a:latin typeface="Arial" panose="020B0604020202020204" pitchFamily="34" charset="0"/>
-                <a:cs typeface="Arial" panose="020B0604020202020204" pitchFamily="34" charset="0"/>
-              </a:rPr>
-              <a:t>Install the Zowe runtime </a:t>
-            </a:r>
-          </a:p>
-          <a:p>
-            <a:pPr algn="ctr"/>
+                  <a:schemeClr val="tx1"/>
+                </a:solidFill>
+                <a:latin typeface="Arial" panose="020B0604020202020204" pitchFamily="34" charset="0"/>
+                <a:cs typeface="Arial" panose="020B0604020202020204" pitchFamily="34" charset="0"/>
+              </a:rPr>
+              <a:t>Install the </a:t>
+            </a:r>
+            <a:r>
+              <a:rPr lang="en-US" sz="1100" dirty="0" err="1">
+                <a:solidFill>
+                  <a:schemeClr val="tx1"/>
+                </a:solidFill>
+                <a:latin typeface="Arial" panose="020B0604020202020204" pitchFamily="34" charset="0"/>
+                <a:cs typeface="Arial" panose="020B0604020202020204" pitchFamily="34" charset="0"/>
+              </a:rPr>
+              <a:t>Zowe</a:t>
+            </a:r>
             <a:r>
               <a:rPr lang="en-US" sz="1100" dirty="0">
                 <a:solidFill>
-                  <a:schemeClr val="bg2">
-                    <a:lumMod val="90000"/>
-                  </a:schemeClr>
-                </a:solidFill>
-                <a:latin typeface="Arial" panose="020B0604020202020204" pitchFamily="34" charset="0"/>
-                <a:cs typeface="Arial" panose="020B0604020202020204" pitchFamily="34" charset="0"/>
-              </a:rPr>
-              <a:t>(Script: zowe-</a:t>
-            </a:r>
-            <a:r>
-              <a:rPr lang="en-US" sz="1100" dirty="0" err="1">
-                <a:solidFill>
-                  <a:schemeClr val="bg2">
-                    <a:lumMod val="90000"/>
-                  </a:schemeClr>
-                </a:solidFill>
-                <a:latin typeface="Arial" panose="020B0604020202020204" pitchFamily="34" charset="0"/>
-                <a:cs typeface="Arial" panose="020B0604020202020204" pitchFamily="34" charset="0"/>
-              </a:rPr>
-              <a:t>install.sh</a:t>
-            </a:r>
-            <a:r>
-              <a:rPr lang="en-US" sz="1100" dirty="0">
-                <a:solidFill>
-                  <a:schemeClr val="bg2">
-                    <a:lumMod val="90000"/>
-                  </a:schemeClr>
-                </a:solidFill>
-                <a:latin typeface="Arial" panose="020B0604020202020204" pitchFamily="34" charset="0"/>
-                <a:cs typeface="Arial" panose="020B0604020202020204" pitchFamily="34" charset="0"/>
-              </a:rPr>
-              <a:t>)</a:t>
+                  <a:schemeClr val="tx1"/>
+                </a:solidFill>
+                <a:latin typeface="Arial" panose="020B0604020202020204" pitchFamily="34" charset="0"/>
+                <a:cs typeface="Arial" panose="020B0604020202020204" pitchFamily="34" charset="0"/>
+              </a:rPr>
+              <a:t> runtime</a:t>
             </a:r>
           </a:p>
         </p:txBody>
@@ -3603,14 +3585,14 @@
         </p:nvSpPr>
         <p:spPr>
           <a:xfrm>
-            <a:off x="2250212" y="5142747"/>
+            <a:off x="2377803" y="5054781"/>
             <a:ext cx="2250651" cy="558971"/>
           </a:xfrm>
           <a:prstGeom prst="rect">
             <a:avLst/>
           </a:prstGeom>
           <a:solidFill>
-            <a:srgbClr val="265F82"/>
+            <a:srgbClr val="CEE7E9"/>
           </a:solidFill>
           <a:ln>
             <a:noFill/>
@@ -3645,7 +3627,7 @@
             <a:r>
               <a:rPr lang="en-US" sz="1100" dirty="0">
                 <a:solidFill>
-                  <a:schemeClr val="bg1"/>
+                  <a:schemeClr val="tx1"/>
                 </a:solidFill>
                 <a:latin typeface="Arial" panose="020B0604020202020204" pitchFamily="34" charset="0"/>
                 <a:cs typeface="Arial" panose="020B0604020202020204" pitchFamily="34" charset="0"/>
@@ -3669,17 +3651,25 @@
         </p:nvSpPr>
         <p:spPr>
           <a:xfrm>
-            <a:off x="2498332" y="7102327"/>
-            <a:ext cx="4239072" cy="558971"/>
+            <a:off x="2498332" y="7214386"/>
+            <a:ext cx="5165215" cy="1161482"/>
           </a:xfrm>
           <a:prstGeom prst="rect">
             <a:avLst/>
           </a:prstGeom>
           <a:solidFill>
-            <a:srgbClr val="4270C3"/>
+            <a:schemeClr val="bg1">
+              <a:lumMod val="95000"/>
+              <a:alpha val="74000"/>
+            </a:schemeClr>
           </a:solidFill>
           <a:ln>
-            <a:noFill/>
+            <a:solidFill>
+              <a:schemeClr val="accent3">
+                <a:lumMod val="60000"/>
+                <a:lumOff val="40000"/>
+              </a:schemeClr>
+            </a:solidFill>
           </a:ln>
         </p:spPr>
         <p:style>
@@ -3699,7 +3689,7 @@
           </a:fontRef>
         </p:style>
         <p:txBody>
-          <a:bodyPr rot="0" spcFirstLastPara="0" vertOverflow="overflow" horzOverflow="overflow" vert="horz" wrap="square" lIns="91440" tIns="45720" rIns="91440" bIns="45720" numCol="1" spcCol="0" rtlCol="0" fromWordArt="0" anchor="ctr" anchorCtr="0" forceAA="0" compatLnSpc="1">
+          <a:bodyPr rot="0" spcFirstLastPara="0" vertOverflow="overflow" horzOverflow="overflow" vert="horz" wrap="square" lIns="91440" tIns="45720" rIns="91440" bIns="45720" numCol="1" spcCol="0" rtlCol="0" fromWordArt="0" anchor="t" anchorCtr="0" forceAA="0" compatLnSpc="1">
             <a:prstTxWarp prst="textNoShape">
               <a:avLst/>
             </a:prstTxWarp>
@@ -3711,7 +3701,7 @@
             <a:r>
               <a:rPr lang="en-US" altLang="zh-CN" sz="1100" dirty="0">
                 <a:solidFill>
-                  <a:schemeClr val="bg1"/>
+                  <a:schemeClr val="tx1"/>
                 </a:solidFill>
                 <a:latin typeface="Arial" panose="020B0604020202020204" pitchFamily="34" charset="0"/>
                 <a:cs typeface="Arial" panose="020B0604020202020204" pitchFamily="34" charset="0"/>
@@ -3724,7 +3714,7 @@
             <a:r>
               <a:rPr lang="en-US" sz="1100" dirty="0">
                 <a:solidFill>
-                  <a:schemeClr val="bg1"/>
+                  <a:schemeClr val="tx1"/>
                 </a:solidFill>
                 <a:latin typeface="Arial" panose="020B0604020202020204" pitchFamily="34" charset="0"/>
                 <a:cs typeface="Arial" panose="020B0604020202020204" pitchFamily="34" charset="0"/>
@@ -3734,7 +3724,7 @@
             <a:r>
               <a:rPr lang="zh-CN" altLang="en-US" sz="1100" dirty="0">
                 <a:solidFill>
-                  <a:schemeClr val="bg1"/>
+                  <a:schemeClr val="tx1"/>
                 </a:solidFill>
                 <a:latin typeface="Arial" panose="020B0604020202020204" pitchFamily="34" charset="0"/>
                 <a:cs typeface="Arial" panose="020B0604020202020204" pitchFamily="34" charset="0"/>
@@ -3744,7 +3734,7 @@
             <a:r>
               <a:rPr lang="en-US" altLang="zh-CN" sz="1100" dirty="0">
                 <a:solidFill>
-                  <a:schemeClr val="bg1"/>
+                  <a:schemeClr val="tx1"/>
                 </a:solidFill>
                 <a:latin typeface="Arial" panose="020B0604020202020204" pitchFamily="34" charset="0"/>
                 <a:cs typeface="Arial" panose="020B0604020202020204" pitchFamily="34" charset="0"/>
@@ -3754,7 +3744,7 @@
             <a:r>
               <a:rPr lang="zh-CN" altLang="en-US" sz="1100" dirty="0">
                 <a:solidFill>
-                  <a:schemeClr val="bg1"/>
+                  <a:schemeClr val="tx1"/>
                 </a:solidFill>
                 <a:latin typeface="Arial" panose="020B0604020202020204" pitchFamily="34" charset="0"/>
                 <a:cs typeface="Arial" panose="020B0604020202020204" pitchFamily="34" charset="0"/>
@@ -3764,7 +3754,7 @@
             <a:r>
               <a:rPr lang="en-US" altLang="zh-CN" sz="1100" dirty="0">
                 <a:solidFill>
-                  <a:schemeClr val="bg1"/>
+                  <a:schemeClr val="tx1"/>
                 </a:solidFill>
                 <a:latin typeface="Arial" panose="020B0604020202020204" pitchFamily="34" charset="0"/>
                 <a:cs typeface="Arial" panose="020B0604020202020204" pitchFamily="34" charset="0"/>
@@ -3774,7 +3764,7 @@
             <a:r>
               <a:rPr lang="zh-CN" altLang="en-US" sz="1100" dirty="0">
                 <a:solidFill>
-                  <a:schemeClr val="bg1"/>
+                  <a:schemeClr val="tx1"/>
                 </a:solidFill>
                 <a:latin typeface="Arial" panose="020B0604020202020204" pitchFamily="34" charset="0"/>
                 <a:cs typeface="Arial" panose="020B0604020202020204" pitchFamily="34" charset="0"/>
@@ -3784,7 +3774,7 @@
             <a:r>
               <a:rPr lang="en-US" altLang="zh-CN" sz="1100" dirty="0" err="1">
                 <a:solidFill>
-                  <a:schemeClr val="bg1"/>
+                  <a:schemeClr val="tx1"/>
                 </a:solidFill>
                 <a:latin typeface="Arial" panose="020B0604020202020204" pitchFamily="34" charset="0"/>
                 <a:cs typeface="Arial" panose="020B0604020202020204" pitchFamily="34" charset="0"/>
@@ -3793,47 +3783,7 @@
             </a:r>
             <a:endParaRPr lang="en-US" altLang="zh-CN" sz="1100" dirty="0">
               <a:solidFill>
-                <a:schemeClr val="bg1"/>
-              </a:solidFill>
-              <a:latin typeface="Arial" panose="020B0604020202020204" pitchFamily="34" charset="0"/>
-              <a:cs typeface="Arial" panose="020B0604020202020204" pitchFamily="34" charset="0"/>
-            </a:endParaRPr>
-          </a:p>
-          <a:p>
-            <a:pPr algn="ctr"/>
-            <a:r>
-              <a:rPr lang="en-US" altLang="zh-CN" sz="1100" dirty="0">
-                <a:solidFill>
-                  <a:schemeClr val="bg1"/>
-                </a:solidFill>
-                <a:latin typeface="Arial" panose="020B0604020202020204" pitchFamily="34" charset="0"/>
-                <a:cs typeface="Arial" panose="020B0604020202020204" pitchFamily="34" charset="0"/>
-              </a:rPr>
-              <a:t>(JCL:</a:t>
-            </a:r>
-            <a:r>
-              <a:rPr lang="zh-CN" altLang="en-US" sz="1100" dirty="0">
-                <a:solidFill>
-                  <a:schemeClr val="bg1"/>
-                </a:solidFill>
-                <a:latin typeface="Arial" panose="020B0604020202020204" pitchFamily="34" charset="0"/>
-                <a:cs typeface="Arial" panose="020B0604020202020204" pitchFamily="34" charset="0"/>
-              </a:rPr>
-              <a:t> </a:t>
-            </a:r>
-            <a:r>
-              <a:rPr lang="en-US" altLang="zh-CN" sz="1100" dirty="0">
-                <a:solidFill>
-                  <a:schemeClr val="bg1"/>
-                </a:solidFill>
-                <a:latin typeface="Arial" panose="020B0604020202020204" pitchFamily="34" charset="0"/>
-                <a:cs typeface="Arial" panose="020B0604020202020204" pitchFamily="34" charset="0"/>
-              </a:rPr>
-              <a:t>ZWESECUR)</a:t>
-            </a:r>
-            <a:endParaRPr lang="en-US" sz="1100" dirty="0">
-              <a:solidFill>
-                <a:schemeClr val="bg1"/>
+                <a:schemeClr val="tx1"/>
               </a:solidFill>
               <a:latin typeface="Arial" panose="020B0604020202020204" pitchFamily="34" charset="0"/>
               <a:cs typeface="Arial" panose="020B0604020202020204" pitchFamily="34" charset="0"/>
@@ -3857,7 +3807,7 @@
         </p:nvCxnSpPr>
         <p:spPr>
           <a:xfrm>
-            <a:off x="3014110" y="4929762"/>
+            <a:off x="3141700" y="4841796"/>
             <a:ext cx="0" cy="212985"/>
           </a:xfrm>
           <a:prstGeom prst="straightConnector1">
@@ -3865,8 +3815,9 @@
           </a:prstGeom>
           <a:ln>
             <a:solidFill>
-              <a:schemeClr val="bg2">
-                <a:lumMod val="25000"/>
+              <a:schemeClr val="tx1">
+                <a:lumMod val="50000"/>
+                <a:lumOff val="50000"/>
               </a:schemeClr>
             </a:solidFill>
             <a:tailEnd type="triangle"/>
@@ -3903,7 +3854,7 @@
         </p:nvCxnSpPr>
         <p:spPr>
           <a:xfrm>
-            <a:off x="5504435" y="4940573"/>
+            <a:off x="5632025" y="4852607"/>
             <a:ext cx="0" cy="212985"/>
           </a:xfrm>
           <a:prstGeom prst="straightConnector1">
@@ -3911,8 +3862,9 @@
           </a:prstGeom>
           <a:ln>
             <a:solidFill>
-              <a:schemeClr val="bg2">
-                <a:lumMod val="25000"/>
+              <a:schemeClr val="tx1">
+                <a:lumMod val="50000"/>
+                <a:lumOff val="50000"/>
               </a:schemeClr>
             </a:solidFill>
             <a:tailEnd type="triangle"/>
@@ -3949,7 +3901,7 @@
         </p:nvCxnSpPr>
         <p:spPr>
           <a:xfrm>
-            <a:off x="5504435" y="5691967"/>
+            <a:off x="5632025" y="5604001"/>
             <a:ext cx="0" cy="212985"/>
           </a:xfrm>
           <a:prstGeom prst="straightConnector1">
@@ -3957,8 +3909,9 @@
           </a:prstGeom>
           <a:ln>
             <a:solidFill>
-              <a:schemeClr val="bg2">
-                <a:lumMod val="25000"/>
+              <a:schemeClr val="tx1">
+                <a:lumMod val="50000"/>
+                <a:lumOff val="50000"/>
               </a:schemeClr>
             </a:solidFill>
             <a:tailEnd type="triangle"/>
@@ -3995,7 +3948,7 @@
         </p:nvCxnSpPr>
         <p:spPr>
           <a:xfrm>
-            <a:off x="5504435" y="6482007"/>
+            <a:off x="5518428" y="6574958"/>
             <a:ext cx="0" cy="602224"/>
           </a:xfrm>
           <a:prstGeom prst="straightConnector1">
@@ -4003,8 +3956,9 @@
           </a:prstGeom>
           <a:ln>
             <a:solidFill>
-              <a:schemeClr val="bg2">
-                <a:lumMod val="25000"/>
+              <a:schemeClr val="tx1">
+                <a:lumMod val="50000"/>
+                <a:lumOff val="50000"/>
               </a:schemeClr>
             </a:solidFill>
             <a:tailEnd type="triangle"/>
@@ -4041,16 +3995,17 @@
         </p:nvCxnSpPr>
         <p:spPr>
           <a:xfrm>
-            <a:off x="3380417" y="5712524"/>
-            <a:ext cx="0" cy="1359350"/>
+            <a:off x="3380417" y="5624557"/>
+            <a:ext cx="0" cy="1523074"/>
           </a:xfrm>
           <a:prstGeom prst="straightConnector1">
             <a:avLst/>
           </a:prstGeom>
           <a:ln>
             <a:solidFill>
-              <a:schemeClr val="bg2">
-                <a:lumMod val="25000"/>
+              <a:schemeClr val="tx1">
+                <a:lumMod val="50000"/>
+                <a:lumOff val="50000"/>
               </a:schemeClr>
             </a:solidFill>
             <a:tailEnd type="triangle"/>
@@ -4087,16 +4042,17 @@
         </p:nvCxnSpPr>
         <p:spPr>
           <a:xfrm>
-            <a:off x="4238556" y="2644442"/>
-            <a:ext cx="0" cy="479467"/>
+            <a:off x="4366146" y="2756501"/>
+            <a:ext cx="0" cy="262924"/>
           </a:xfrm>
           <a:prstGeom prst="straightConnector1">
             <a:avLst/>
           </a:prstGeom>
           <a:ln>
             <a:solidFill>
-              <a:schemeClr val="bg2">
-                <a:lumMod val="25000"/>
+              <a:schemeClr val="tx1">
+                <a:lumMod val="50000"/>
+                <a:lumOff val="50000"/>
               </a:schemeClr>
             </a:solidFill>
             <a:tailEnd type="triangle"/>
@@ -4131,7 +4087,7 @@
         </p:nvSpPr>
         <p:spPr>
           <a:xfrm>
-            <a:off x="1810878" y="3808397"/>
+            <a:off x="1938468" y="3720431"/>
             <a:ext cx="1365668" cy="307777"/>
           </a:xfrm>
           <a:prstGeom prst="rect">
@@ -4189,7 +4145,7 @@
         </p:nvSpPr>
         <p:spPr>
           <a:xfrm>
-            <a:off x="5508247" y="3808397"/>
+            <a:off x="5635838" y="3720431"/>
             <a:ext cx="1682987" cy="307777"/>
           </a:xfrm>
           <a:prstGeom prst="rect">
@@ -4229,228 +4185,6 @@
                 <a:cs typeface="Arial" panose="020B0604020202020204" pitchFamily="34" charset="0"/>
               </a:rPr>
               <a:t> </a:t>
-            </a:r>
-          </a:p>
-        </p:txBody>
-      </p:sp>
-      <p:sp>
-        <p:nvSpPr>
-          <p:cNvPr id="40" name="Rectangle 39">
-            <a:extLst>
-              <a:ext uri="{FF2B5EF4-FFF2-40B4-BE49-F238E27FC236}">
-                <a16:creationId xmlns:a16="http://schemas.microsoft.com/office/drawing/2014/main" id="{D5FC487A-44ED-3448-8B11-9485EBC99FA7}"/>
-              </a:ext>
-            </a:extLst>
-          </p:cNvPr>
-          <p:cNvSpPr/>
-          <p:nvPr/>
-        </p:nvSpPr>
-        <p:spPr>
-          <a:xfrm>
-            <a:off x="7066691" y="5613568"/>
-            <a:ext cx="2612484" cy="1169551"/>
-          </a:xfrm>
-          <a:prstGeom prst="rect">
-            <a:avLst/>
-          </a:prstGeom>
-        </p:spPr>
-        <p:txBody>
-          <a:bodyPr wrap="square">
-            <a:spAutoFit/>
-          </a:bodyPr>
-          <a:lstStyle/>
-          <a:p>
-            <a:r>
-              <a:rPr lang="en-US" sz="1000" dirty="0">
-                <a:solidFill>
-                  <a:srgbClr val="000000"/>
-                </a:solidFill>
-                <a:latin typeface="Arial" panose="020B0604020202020204" pitchFamily="34" charset="0"/>
-                <a:cs typeface="Arial" panose="020B0604020202020204" pitchFamily="34" charset="0"/>
-              </a:rPr>
-              <a:t>Installation Output: </a:t>
-            </a:r>
-          </a:p>
-          <a:p>
-            <a:pPr marL="171450" indent="-171450">
-              <a:buFont typeface="Arial" panose="020B0604020202020204" pitchFamily="34" charset="0"/>
-              <a:buChar char="•"/>
-            </a:pPr>
-            <a:r>
-              <a:rPr lang="en-US" sz="1000" dirty="0">
-                <a:solidFill>
-                  <a:srgbClr val="000000"/>
-                </a:solidFill>
-                <a:latin typeface="Arial" panose="020B0604020202020204" pitchFamily="34" charset="0"/>
-                <a:cs typeface="Arial" panose="020B0604020202020204" pitchFamily="34" charset="0"/>
-              </a:rPr>
-              <a:t>A </a:t>
-            </a:r>
-            <a:r>
-              <a:rPr lang="en-US" sz="1000" dirty="0" err="1">
-                <a:solidFill>
-                  <a:srgbClr val="000000"/>
-                </a:solidFill>
-                <a:latin typeface="Arial" panose="020B0604020202020204" pitchFamily="34" charset="0"/>
-                <a:cs typeface="Arial" panose="020B0604020202020204" pitchFamily="34" charset="0"/>
-              </a:rPr>
-              <a:t>zFS</a:t>
-            </a:r>
-            <a:r>
-              <a:rPr lang="en-US" sz="1000" dirty="0">
-                <a:solidFill>
-                  <a:srgbClr val="000000"/>
-                </a:solidFill>
-                <a:latin typeface="Arial" panose="020B0604020202020204" pitchFamily="34" charset="0"/>
-                <a:cs typeface="Arial" panose="020B0604020202020204" pitchFamily="34" charset="0"/>
-              </a:rPr>
-              <a:t> folder containing unconfigured Zowe runtime </a:t>
-            </a:r>
-            <a:r>
-              <a:rPr lang="en-US" sz="1000" dirty="0">
-                <a:solidFill>
-                  <a:srgbClr val="800000"/>
-                </a:solidFill>
-                <a:latin typeface="Arial" panose="020B0604020202020204" pitchFamily="34" charset="0"/>
-                <a:cs typeface="Arial" panose="020B0604020202020204" pitchFamily="34" charset="0"/>
-              </a:rPr>
-              <a:t>&lt;RUNTIME_DIR&gt;</a:t>
-            </a:r>
-            <a:endParaRPr lang="en-US" sz="1000" dirty="0">
-              <a:solidFill>
-                <a:srgbClr val="000000"/>
-              </a:solidFill>
-              <a:latin typeface="Arial" panose="020B0604020202020204" pitchFamily="34" charset="0"/>
-              <a:cs typeface="Arial" panose="020B0604020202020204" pitchFamily="34" charset="0"/>
-            </a:endParaRPr>
-          </a:p>
-          <a:p>
-            <a:pPr marL="171450" indent="-171450">
-              <a:buFont typeface="Arial" panose="020B0604020202020204" pitchFamily="34" charset="0"/>
-              <a:buChar char="•"/>
-            </a:pPr>
-            <a:r>
-              <a:rPr lang="en-US" sz="1000" dirty="0">
-                <a:solidFill>
-                  <a:srgbClr val="000000"/>
-                </a:solidFill>
-                <a:latin typeface="Arial" panose="020B0604020202020204" pitchFamily="34" charset="0"/>
-                <a:cs typeface="Arial" panose="020B0604020202020204" pitchFamily="34" charset="0"/>
-              </a:rPr>
-              <a:t>A SAMPLIB </a:t>
-            </a:r>
-            <a:r>
-              <a:rPr lang="en-US" altLang="zh-CN" sz="1000" dirty="0">
-                <a:solidFill>
-                  <a:srgbClr val="000000"/>
-                </a:solidFill>
-                <a:latin typeface="Arial" panose="020B0604020202020204" pitchFamily="34" charset="0"/>
-                <a:cs typeface="Arial" panose="020B0604020202020204" pitchFamily="34" charset="0"/>
-              </a:rPr>
-              <a:t>library</a:t>
-            </a:r>
-            <a:r>
-              <a:rPr lang="en-US" sz="1000" dirty="0">
-                <a:solidFill>
-                  <a:srgbClr val="000000"/>
-                </a:solidFill>
-                <a:latin typeface="Arial" panose="020B0604020202020204" pitchFamily="34" charset="0"/>
-                <a:cs typeface="Arial" panose="020B0604020202020204" pitchFamily="34" charset="0"/>
-              </a:rPr>
-              <a:t> </a:t>
-            </a:r>
-            <a:r>
-              <a:rPr lang="en-US" sz="1000" dirty="0">
-                <a:solidFill>
-                  <a:srgbClr val="800000"/>
-                </a:solidFill>
-                <a:latin typeface="Arial" panose="020B0604020202020204" pitchFamily="34" charset="0"/>
-                <a:cs typeface="Arial" panose="020B0604020202020204" pitchFamily="34" charset="0"/>
-              </a:rPr>
-              <a:t>SZWESAMP </a:t>
-            </a:r>
-            <a:r>
-              <a:rPr lang="en-US" sz="1000" dirty="0">
-                <a:solidFill>
-                  <a:srgbClr val="000000"/>
-                </a:solidFill>
-                <a:latin typeface="Arial" panose="020B0604020202020204" pitchFamily="34" charset="0"/>
-                <a:cs typeface="Arial" panose="020B0604020202020204" pitchFamily="34" charset="0"/>
-              </a:rPr>
-              <a:t>containing </a:t>
-            </a:r>
-            <a:r>
-              <a:rPr lang="en-US" altLang="zh-CN" sz="1000" dirty="0">
-                <a:solidFill>
-                  <a:srgbClr val="000000"/>
-                </a:solidFill>
-                <a:latin typeface="Arial" panose="020B0604020202020204" pitchFamily="34" charset="0"/>
-                <a:cs typeface="Arial" panose="020B0604020202020204" pitchFamily="34" charset="0"/>
-              </a:rPr>
-              <a:t>sample</a:t>
-            </a:r>
-            <a:r>
-              <a:rPr lang="zh-CN" altLang="en-US" sz="1000" dirty="0">
-                <a:solidFill>
-                  <a:srgbClr val="000000"/>
-                </a:solidFill>
-                <a:latin typeface="Arial" panose="020B0604020202020204" pitchFamily="34" charset="0"/>
-                <a:cs typeface="Arial" panose="020B0604020202020204" pitchFamily="34" charset="0"/>
-              </a:rPr>
-              <a:t> </a:t>
-            </a:r>
-            <a:r>
-              <a:rPr lang="en-US" altLang="zh-CN" sz="1000" dirty="0">
-                <a:solidFill>
-                  <a:srgbClr val="000000"/>
-                </a:solidFill>
-                <a:latin typeface="Arial" panose="020B0604020202020204" pitchFamily="34" charset="0"/>
-                <a:cs typeface="Arial" panose="020B0604020202020204" pitchFamily="34" charset="0"/>
-              </a:rPr>
-              <a:t>members</a:t>
-            </a:r>
-            <a:endParaRPr lang="en-US" sz="1000" dirty="0">
-              <a:solidFill>
-                <a:srgbClr val="000000"/>
-              </a:solidFill>
-              <a:latin typeface="Arial" panose="020B0604020202020204" pitchFamily="34" charset="0"/>
-              <a:cs typeface="Arial" panose="020B0604020202020204" pitchFamily="34" charset="0"/>
-            </a:endParaRPr>
-          </a:p>
-          <a:p>
-            <a:pPr marL="171450" indent="-171450">
-              <a:buFont typeface="Arial" panose="020B0604020202020204" pitchFamily="34" charset="0"/>
-              <a:buChar char="•"/>
-            </a:pPr>
-            <a:r>
-              <a:rPr lang="en-US" sz="1000" dirty="0">
-                <a:solidFill>
-                  <a:srgbClr val="000000"/>
-                </a:solidFill>
-                <a:latin typeface="Arial" panose="020B0604020202020204" pitchFamily="34" charset="0"/>
-                <a:cs typeface="Arial" panose="020B0604020202020204" pitchFamily="34" charset="0"/>
-              </a:rPr>
-              <a:t>A load library </a:t>
-            </a:r>
-            <a:r>
-              <a:rPr lang="en-US" sz="1000" dirty="0">
-                <a:solidFill>
-                  <a:srgbClr val="800000"/>
-                </a:solidFill>
-                <a:latin typeface="Arial" panose="020B0604020202020204" pitchFamily="34" charset="0"/>
-                <a:cs typeface="Arial" panose="020B0604020202020204" pitchFamily="34" charset="0"/>
-              </a:rPr>
-              <a:t>SZWEAUTH</a:t>
-            </a:r>
-            <a:r>
-              <a:rPr lang="en-US" sz="1000" dirty="0">
-                <a:solidFill>
-                  <a:srgbClr val="000000"/>
-                </a:solidFill>
-                <a:latin typeface="Arial" panose="020B0604020202020204" pitchFamily="34" charset="0"/>
-                <a:cs typeface="Arial" panose="020B0604020202020204" pitchFamily="34" charset="0"/>
-              </a:rPr>
-              <a:t> containing load modules</a:t>
             </a:r>
           </a:p>
         </p:txBody>
@@ -4469,17 +4203,25 @@
         </p:nvSpPr>
         <p:spPr>
           <a:xfrm>
-            <a:off x="2505125" y="7976784"/>
-            <a:ext cx="4232278" cy="558971"/>
+            <a:off x="2505125" y="8716198"/>
+            <a:ext cx="5165207" cy="1100583"/>
           </a:xfrm>
           <a:prstGeom prst="rect">
             <a:avLst/>
           </a:prstGeom>
           <a:solidFill>
-            <a:srgbClr val="4270C3"/>
+            <a:schemeClr val="bg1">
+              <a:lumMod val="95000"/>
+              <a:alpha val="74000"/>
+            </a:schemeClr>
           </a:solidFill>
           <a:ln>
-            <a:noFill/>
+            <a:solidFill>
+              <a:schemeClr val="accent3">
+                <a:lumMod val="60000"/>
+                <a:lumOff val="40000"/>
+              </a:schemeClr>
+            </a:solidFill>
           </a:ln>
         </p:spPr>
         <p:style>
@@ -4499,7 +4241,7 @@
           </a:fontRef>
         </p:style>
         <p:txBody>
-          <a:bodyPr rot="0" spcFirstLastPara="0" vertOverflow="overflow" horzOverflow="overflow" vert="horz" wrap="square" lIns="91440" tIns="45720" rIns="91440" bIns="45720" numCol="1" spcCol="0" rtlCol="0" fromWordArt="0" anchor="ctr" anchorCtr="0" forceAA="0" compatLnSpc="1">
+          <a:bodyPr rot="0" spcFirstLastPara="0" vertOverflow="overflow" horzOverflow="overflow" vert="horz" wrap="square" lIns="91440" tIns="45720" rIns="91440" bIns="45720" numCol="1" spcCol="0" rtlCol="0" fromWordArt="0" anchor="t" anchorCtr="0" forceAA="0" compatLnSpc="1">
             <a:prstTxWarp prst="textNoShape">
               <a:avLst/>
             </a:prstTxWarp>
@@ -4511,7 +4253,7 @@
             <a:r>
               <a:rPr lang="en-US" altLang="zh-CN" sz="1100" dirty="0">
                 <a:solidFill>
-                  <a:schemeClr val="bg1"/>
+                  <a:schemeClr val="tx1"/>
                 </a:solidFill>
                 <a:latin typeface="Arial" panose="020B0604020202020204" pitchFamily="34" charset="0"/>
                 <a:cs typeface="Arial" panose="020B0604020202020204" pitchFamily="34" charset="0"/>
@@ -4520,7 +4262,7 @@
             </a:r>
             <a:endParaRPr lang="en-US" sz="1100" dirty="0">
               <a:solidFill>
-                <a:schemeClr val="bg1"/>
+                <a:schemeClr val="tx1"/>
               </a:solidFill>
               <a:latin typeface="Arial" panose="020B0604020202020204" pitchFamily="34" charset="0"/>
               <a:cs typeface="Arial" panose="020B0604020202020204" pitchFamily="34" charset="0"/>
@@ -4531,7 +4273,7 @@
             <a:r>
               <a:rPr lang="en-US" sz="1100" dirty="0">
                 <a:solidFill>
-                  <a:schemeClr val="bg1"/>
+                  <a:schemeClr val="tx1"/>
                 </a:solidFill>
                 <a:latin typeface="Arial" panose="020B0604020202020204" pitchFamily="34" charset="0"/>
                 <a:cs typeface="Arial" panose="020B0604020202020204" pitchFamily="34" charset="0"/>
@@ -4541,7 +4283,7 @@
             <a:r>
               <a:rPr lang="en-US" altLang="zh-CN" sz="1100" dirty="0">
                 <a:solidFill>
-                  <a:schemeClr val="bg1"/>
+                  <a:schemeClr val="tx1"/>
                 </a:solidFill>
                 <a:latin typeface="Arial" panose="020B0604020202020204" pitchFamily="34" charset="0"/>
                 <a:cs typeface="Arial" panose="020B0604020202020204" pitchFamily="34" charset="0"/>
@@ -4551,7 +4293,7 @@
             <a:r>
               <a:rPr lang="zh-CN" altLang="en-US" sz="1100" dirty="0">
                 <a:solidFill>
-                  <a:schemeClr val="bg1"/>
+                  <a:schemeClr val="tx1"/>
                 </a:solidFill>
                 <a:latin typeface="Arial" panose="020B0604020202020204" pitchFamily="34" charset="0"/>
                 <a:cs typeface="Arial" panose="020B0604020202020204" pitchFamily="34" charset="0"/>
@@ -4561,7 +4303,7 @@
             <a:r>
               <a:rPr lang="en-US" altLang="zh-CN" sz="1100" dirty="0">
                 <a:solidFill>
-                  <a:schemeClr val="bg1"/>
+                  <a:schemeClr val="tx1"/>
                 </a:solidFill>
                 <a:latin typeface="Arial" panose="020B0604020202020204" pitchFamily="34" charset="0"/>
                 <a:cs typeface="Arial" panose="020B0604020202020204" pitchFamily="34" charset="0"/>
@@ -4571,7 +4313,7 @@
             <a:r>
               <a:rPr lang="en-US" sz="1100" dirty="0">
                 <a:solidFill>
-                  <a:schemeClr val="bg1"/>
+                  <a:schemeClr val="tx1"/>
                 </a:solidFill>
                 <a:latin typeface="Arial" panose="020B0604020202020204" pitchFamily="34" charset="0"/>
                 <a:cs typeface="Arial" panose="020B0604020202020204" pitchFamily="34" charset="0"/>
@@ -4581,7 +4323,7 @@
             <a:r>
               <a:rPr lang="en-US" sz="1100" dirty="0" err="1">
                 <a:solidFill>
-                  <a:schemeClr val="bg1"/>
+                  <a:schemeClr val="tx1"/>
                 </a:solidFill>
                 <a:latin typeface="Arial" panose="020B0604020202020204" pitchFamily="34" charset="0"/>
                 <a:cs typeface="Arial" panose="020B0604020202020204" pitchFamily="34" charset="0"/>
@@ -4591,7 +4333,7 @@
             <a:r>
               <a:rPr lang="en-US" sz="1100" dirty="0">
                 <a:solidFill>
-                  <a:schemeClr val="bg1"/>
+                  <a:schemeClr val="tx1"/>
                 </a:solidFill>
                 <a:latin typeface="Arial" panose="020B0604020202020204" pitchFamily="34" charset="0"/>
                 <a:cs typeface="Arial" panose="020B0604020202020204" pitchFamily="34" charset="0"/>
@@ -4601,7 +4343,7 @@
             <a:r>
               <a:rPr lang="zh-CN" altLang="en-US" sz="1100" dirty="0">
                 <a:solidFill>
-                  <a:schemeClr val="bg1"/>
+                  <a:schemeClr val="tx1"/>
                 </a:solidFill>
                 <a:latin typeface="Arial" panose="020B0604020202020204" pitchFamily="34" charset="0"/>
                 <a:cs typeface="Arial" panose="020B0604020202020204" pitchFamily="34" charset="0"/>
@@ -4610,57 +4352,7 @@
             </a:r>
             <a:endParaRPr lang="en-US" altLang="zh-CN" sz="1100" dirty="0">
               <a:solidFill>
-                <a:schemeClr val="bg1"/>
-              </a:solidFill>
-              <a:latin typeface="Arial" panose="020B0604020202020204" pitchFamily="34" charset="0"/>
-              <a:cs typeface="Arial" panose="020B0604020202020204" pitchFamily="34" charset="0"/>
-            </a:endParaRPr>
-          </a:p>
-          <a:p>
-            <a:pPr algn="ctr"/>
-            <a:r>
-              <a:rPr lang="en-US" altLang="zh-CN" sz="1100" dirty="0">
-                <a:solidFill>
-                  <a:schemeClr val="bg1"/>
-                </a:solidFill>
-                <a:latin typeface="Arial" panose="020B0604020202020204" pitchFamily="34" charset="0"/>
-                <a:cs typeface="Arial" panose="020B0604020202020204" pitchFamily="34" charset="0"/>
-              </a:rPr>
-              <a:t>(Script: </a:t>
-            </a:r>
-            <a:r>
-              <a:rPr lang="en-US" sz="1100" dirty="0">
-                <a:solidFill>
-                  <a:schemeClr val="bg1"/>
-                </a:solidFill>
-                <a:latin typeface="Arial" panose="020B0604020202020204" pitchFamily="34" charset="0"/>
-                <a:cs typeface="Arial" panose="020B0604020202020204" pitchFamily="34" charset="0"/>
-              </a:rPr>
-              <a:t>zowe-setup-</a:t>
-            </a:r>
-            <a:r>
-              <a:rPr lang="en-US" sz="1100" dirty="0" err="1">
-                <a:solidFill>
-                  <a:schemeClr val="bg1"/>
-                </a:solidFill>
-                <a:latin typeface="Arial" panose="020B0604020202020204" pitchFamily="34" charset="0"/>
-                <a:cs typeface="Arial" panose="020B0604020202020204" pitchFamily="34" charset="0"/>
-              </a:rPr>
-              <a:t>certificates.sh</a:t>
-            </a:r>
-            <a:r>
-              <a:rPr lang="en-US" altLang="zh-CN" sz="1100" dirty="0">
-                <a:solidFill>
-                  <a:schemeClr val="bg1"/>
-                </a:solidFill>
-                <a:latin typeface="Arial" panose="020B0604020202020204" pitchFamily="34" charset="0"/>
-                <a:cs typeface="Arial" panose="020B0604020202020204" pitchFamily="34" charset="0"/>
-              </a:rPr>
-              <a:t>)</a:t>
-            </a:r>
-            <a:endParaRPr lang="en-US" sz="1100" dirty="0">
-              <a:solidFill>
-                <a:schemeClr val="bg1"/>
+                <a:schemeClr val="tx1"/>
               </a:solidFill>
               <a:latin typeface="Arial" panose="020B0604020202020204" pitchFamily="34" charset="0"/>
               <a:cs typeface="Arial" panose="020B0604020202020204" pitchFamily="34" charset="0"/>
@@ -4684,16 +4376,17 @@
         </p:nvCxnSpPr>
         <p:spPr>
           <a:xfrm>
-            <a:off x="4607892" y="7711516"/>
-            <a:ext cx="0" cy="212985"/>
+            <a:off x="5100719" y="8375868"/>
+            <a:ext cx="0" cy="340330"/>
           </a:xfrm>
           <a:prstGeom prst="straightConnector1">
             <a:avLst/>
           </a:prstGeom>
           <a:ln>
             <a:solidFill>
-              <a:schemeClr val="bg2">
-                <a:lumMod val="25000"/>
+              <a:schemeClr val="tx1">
+                <a:lumMod val="50000"/>
+                <a:lumOff val="50000"/>
               </a:schemeClr>
             </a:solidFill>
             <a:tailEnd type="triangle"/>
@@ -4728,18 +4421,24 @@
         </p:nvSpPr>
         <p:spPr>
           <a:xfrm>
-            <a:off x="6516484" y="8740065"/>
-            <a:ext cx="1047242" cy="628174"/>
+            <a:off x="7447734" y="10282485"/>
+            <a:ext cx="1047242" cy="920904"/>
           </a:xfrm>
           <a:prstGeom prst="rect">
             <a:avLst/>
           </a:prstGeom>
           <a:solidFill>
-            <a:srgbClr val="4270C3"/>
+            <a:schemeClr val="bg1">
+              <a:lumMod val="95000"/>
+              <a:alpha val="74000"/>
+            </a:schemeClr>
           </a:solidFill>
           <a:ln>
             <a:solidFill>
-              <a:schemeClr val="bg1"/>
+              <a:schemeClr val="accent3">
+                <a:lumMod val="60000"/>
+                <a:lumOff val="40000"/>
+              </a:schemeClr>
             </a:solidFill>
           </a:ln>
         </p:spPr>
@@ -4772,7 +4471,7 @@
             <a:r>
               <a:rPr lang="en-US" sz="1100" dirty="0">
                 <a:solidFill>
-                  <a:schemeClr val="bg1"/>
+                  <a:schemeClr val="tx1"/>
                 </a:solidFill>
                 <a:latin typeface="Arial" panose="020B0604020202020204" pitchFamily="34" charset="0"/>
                 <a:cs typeface="Arial" panose="020B0604020202020204" pitchFamily="34" charset="0"/>
@@ -4782,7 +4481,7 @@
             <a:r>
               <a:rPr lang="zh-CN" altLang="en-US" sz="1100" dirty="0">
                 <a:solidFill>
-                  <a:schemeClr val="bg1"/>
+                  <a:schemeClr val="tx1"/>
                 </a:solidFill>
                 <a:latin typeface="Arial" panose="020B0604020202020204" pitchFamily="34" charset="0"/>
                 <a:cs typeface="Arial" panose="020B0604020202020204" pitchFamily="34" charset="0"/>
@@ -4792,7 +4491,7 @@
             <a:r>
               <a:rPr lang="en-US" altLang="zh-CN" sz="1100" dirty="0">
                 <a:solidFill>
-                  <a:schemeClr val="bg1"/>
+                  <a:schemeClr val="tx1"/>
                 </a:solidFill>
                 <a:latin typeface="Arial" panose="020B0604020202020204" pitchFamily="34" charset="0"/>
                 <a:cs typeface="Arial" panose="020B0604020202020204" pitchFamily="34" charset="0"/>
@@ -4802,7 +4501,7 @@
             <a:r>
               <a:rPr lang="en-US" sz="1100" dirty="0">
                 <a:solidFill>
-                  <a:schemeClr val="bg1"/>
+                  <a:schemeClr val="tx1"/>
                 </a:solidFill>
                 <a:latin typeface="Arial" panose="020B0604020202020204" pitchFamily="34" charset="0"/>
                 <a:cs typeface="Arial" panose="020B0604020202020204" pitchFamily="34" charset="0"/>
@@ -4826,18 +4525,24 @@
         </p:nvSpPr>
         <p:spPr>
           <a:xfrm>
-            <a:off x="2491786" y="8854021"/>
-            <a:ext cx="4245613" cy="628174"/>
+            <a:off x="2491786" y="10156109"/>
+            <a:ext cx="5178545" cy="920905"/>
           </a:xfrm>
           <a:prstGeom prst="rect">
             <a:avLst/>
           </a:prstGeom>
           <a:solidFill>
-            <a:srgbClr val="4270C3"/>
+            <a:schemeClr val="bg1">
+              <a:lumMod val="95000"/>
+              <a:alpha val="74000"/>
+            </a:schemeClr>
           </a:solidFill>
           <a:ln>
             <a:solidFill>
-              <a:schemeClr val="bg1"/>
+              <a:schemeClr val="accent3">
+                <a:lumMod val="60000"/>
+                <a:lumOff val="40000"/>
+              </a:schemeClr>
             </a:solidFill>
           </a:ln>
         </p:spPr>
@@ -4858,7 +4563,7 @@
           </a:fontRef>
         </p:style>
         <p:txBody>
-          <a:bodyPr rot="0" spcFirstLastPara="0" vertOverflow="overflow" horzOverflow="overflow" vert="horz" wrap="square" lIns="91440" tIns="45720" rIns="91440" bIns="45720" numCol="1" spcCol="0" rtlCol="0" fromWordArt="0" anchor="ctr" anchorCtr="0" forceAA="0" compatLnSpc="1">
+          <a:bodyPr rot="0" spcFirstLastPara="0" vertOverflow="overflow" horzOverflow="overflow" vert="horz" wrap="square" lIns="91440" tIns="45720" rIns="91440" bIns="45720" numCol="1" spcCol="0" rtlCol="0" fromWordArt="0" anchor="t" anchorCtr="0" forceAA="0" compatLnSpc="1">
             <a:prstTxWarp prst="textNoShape">
               <a:avLst/>
             </a:prstTxWarp>
@@ -4870,7 +4575,7 @@
             <a:r>
               <a:rPr lang="en-US" altLang="zh-CN" sz="1100" dirty="0">
                 <a:solidFill>
-                  <a:schemeClr val="bg1"/>
+                  <a:schemeClr val="tx1"/>
                 </a:solidFill>
                 <a:latin typeface="Arial" panose="020B0604020202020204" pitchFamily="34" charset="0"/>
                 <a:cs typeface="Arial" panose="020B0604020202020204" pitchFamily="34" charset="0"/>
@@ -4880,7 +4585,7 @@
             <a:r>
               <a:rPr lang="zh-CN" altLang="en-US" sz="1100" dirty="0">
                 <a:solidFill>
-                  <a:schemeClr val="bg1"/>
+                  <a:schemeClr val="tx1"/>
                 </a:solidFill>
                 <a:latin typeface="Arial" panose="020B0604020202020204" pitchFamily="34" charset="0"/>
                 <a:cs typeface="Arial" panose="020B0604020202020204" pitchFamily="34" charset="0"/>
@@ -4890,7 +4595,7 @@
             <a:r>
               <a:rPr lang="en-US" altLang="zh-CN" sz="1100" dirty="0">
                 <a:solidFill>
-                  <a:schemeClr val="bg1"/>
+                  <a:schemeClr val="tx1"/>
                 </a:solidFill>
                 <a:latin typeface="Arial" panose="020B0604020202020204" pitchFamily="34" charset="0"/>
                 <a:cs typeface="Arial" panose="020B0604020202020204" pitchFamily="34" charset="0"/>
@@ -4900,7 +4605,7 @@
             <a:r>
               <a:rPr lang="zh-CN" altLang="en-US" sz="1100" dirty="0">
                 <a:solidFill>
-                  <a:schemeClr val="bg1"/>
+                  <a:schemeClr val="tx1"/>
                 </a:solidFill>
                 <a:latin typeface="Arial" panose="020B0604020202020204" pitchFamily="34" charset="0"/>
                 <a:cs typeface="Arial" panose="020B0604020202020204" pitchFamily="34" charset="0"/>
@@ -4910,7 +4615,7 @@
             <a:r>
               <a:rPr lang="en-US" altLang="zh-CN" sz="1100" dirty="0">
                 <a:solidFill>
-                  <a:schemeClr val="bg1"/>
+                  <a:schemeClr val="tx1"/>
                 </a:solidFill>
                 <a:latin typeface="Arial" panose="020B0604020202020204" pitchFamily="34" charset="0"/>
                 <a:cs typeface="Arial" panose="020B0604020202020204" pitchFamily="34" charset="0"/>
@@ -4920,7 +4625,7 @@
             <a:r>
               <a:rPr lang="en-US" sz="1100" dirty="0">
                 <a:solidFill>
-                  <a:schemeClr val="bg1"/>
+                  <a:schemeClr val="tx1"/>
                 </a:solidFill>
                 <a:latin typeface="Arial" panose="020B0604020202020204" pitchFamily="34" charset="0"/>
                 <a:cs typeface="Arial" panose="020B0604020202020204" pitchFamily="34" charset="0"/>
@@ -4929,67 +4634,7 @@
             </a:r>
             <a:endParaRPr lang="en-US" altLang="zh-CN" sz="1100" dirty="0">
               <a:solidFill>
-                <a:schemeClr val="bg1"/>
-              </a:solidFill>
-              <a:latin typeface="Arial" panose="020B0604020202020204" pitchFamily="34" charset="0"/>
-              <a:cs typeface="Arial" panose="020B0604020202020204" pitchFamily="34" charset="0"/>
-            </a:endParaRPr>
-          </a:p>
-          <a:p>
-            <a:pPr algn="ctr"/>
-            <a:r>
-              <a:rPr lang="en-US" altLang="zh-CN" sz="1100" dirty="0">
-                <a:solidFill>
-                  <a:schemeClr val="bg1"/>
-                </a:solidFill>
-                <a:latin typeface="Arial" panose="020B0604020202020204" pitchFamily="34" charset="0"/>
-                <a:cs typeface="Arial" panose="020B0604020202020204" pitchFamily="34" charset="0"/>
-              </a:rPr>
-              <a:t>(Script: </a:t>
-            </a:r>
-            <a:r>
-              <a:rPr lang="en-US" sz="1100" dirty="0">
-                <a:solidFill>
-                  <a:schemeClr val="bg1"/>
-                </a:solidFill>
-                <a:latin typeface="Arial" panose="020B0604020202020204" pitchFamily="34" charset="0"/>
-                <a:cs typeface="Arial" panose="020B0604020202020204" pitchFamily="34" charset="0"/>
-              </a:rPr>
-              <a:t>zowe-configure-</a:t>
-            </a:r>
-            <a:r>
-              <a:rPr lang="en-US" sz="1100" dirty="0" err="1">
-                <a:solidFill>
-                  <a:schemeClr val="bg1"/>
-                </a:solidFill>
-                <a:latin typeface="Arial" panose="020B0604020202020204" pitchFamily="34" charset="0"/>
-                <a:cs typeface="Arial" panose="020B0604020202020204" pitchFamily="34" charset="0"/>
-              </a:rPr>
-              <a:t>instance.s</a:t>
-            </a:r>
-            <a:r>
-              <a:rPr lang="en-US" altLang="zh-CN" sz="1100" dirty="0" err="1">
-                <a:solidFill>
-                  <a:schemeClr val="bg1"/>
-                </a:solidFill>
-                <a:latin typeface="Arial" panose="020B0604020202020204" pitchFamily="34" charset="0"/>
-                <a:cs typeface="Arial" panose="020B0604020202020204" pitchFamily="34" charset="0"/>
-              </a:rPr>
-              <a:t>h</a:t>
-            </a:r>
-            <a:r>
-              <a:rPr lang="en-US" altLang="zh-CN" sz="1100" dirty="0">
-                <a:solidFill>
-                  <a:schemeClr val="bg1"/>
-                </a:solidFill>
-                <a:latin typeface="Arial" panose="020B0604020202020204" pitchFamily="34" charset="0"/>
-                <a:cs typeface="Arial" panose="020B0604020202020204" pitchFamily="34" charset="0"/>
-              </a:rPr>
-              <a:t>)</a:t>
-            </a:r>
-            <a:endParaRPr lang="en-US" sz="1100" dirty="0">
-              <a:solidFill>
-                <a:schemeClr val="bg1"/>
+                <a:schemeClr val="tx1"/>
               </a:solidFill>
               <a:latin typeface="Arial" panose="020B0604020202020204" pitchFamily="34" charset="0"/>
               <a:cs typeface="Arial" panose="020B0604020202020204" pitchFamily="34" charset="0"/>
@@ -5011,17 +4656,25 @@
         </p:nvSpPr>
         <p:spPr>
           <a:xfrm>
-            <a:off x="2505124" y="10705280"/>
-            <a:ext cx="4232259" cy="558971"/>
+            <a:off x="2505125" y="12491831"/>
+            <a:ext cx="5158421" cy="558971"/>
           </a:xfrm>
           <a:prstGeom prst="rect">
             <a:avLst/>
           </a:prstGeom>
           <a:solidFill>
-            <a:srgbClr val="4270C3"/>
+            <a:schemeClr val="bg1">
+              <a:lumMod val="95000"/>
+              <a:alpha val="74000"/>
+            </a:schemeClr>
           </a:solidFill>
           <a:ln>
-            <a:noFill/>
+            <a:solidFill>
+              <a:schemeClr val="accent3">
+                <a:lumMod val="60000"/>
+                <a:lumOff val="40000"/>
+              </a:schemeClr>
+            </a:solidFill>
           </a:ln>
         </p:spPr>
         <p:style>
@@ -5053,7 +4706,7 @@
             <a:r>
               <a:rPr lang="en-US" altLang="zh-CN" sz="1100" dirty="0">
                 <a:solidFill>
-                  <a:schemeClr val="bg1"/>
+                  <a:schemeClr val="tx1"/>
                 </a:solidFill>
                 <a:latin typeface="Arial" panose="020B0604020202020204" pitchFamily="34" charset="0"/>
                 <a:cs typeface="Arial" panose="020B0604020202020204" pitchFamily="34" charset="0"/>
@@ -5063,7 +4716,7 @@
             <a:r>
               <a:rPr lang="zh-CN" altLang="en-US" sz="1100" dirty="0">
                 <a:solidFill>
-                  <a:schemeClr val="bg1"/>
+                  <a:schemeClr val="tx1"/>
                 </a:solidFill>
                 <a:latin typeface="Arial" panose="020B0604020202020204" pitchFamily="34" charset="0"/>
                 <a:cs typeface="Arial" panose="020B0604020202020204" pitchFamily="34" charset="0"/>
@@ -5073,7 +4726,7 @@
             <a:r>
               <a:rPr lang="en-US" altLang="zh-CN" sz="1100" dirty="0">
                 <a:solidFill>
-                  <a:schemeClr val="bg1"/>
+                  <a:schemeClr val="tx1"/>
                 </a:solidFill>
                 <a:latin typeface="Arial" panose="020B0604020202020204" pitchFamily="34" charset="0"/>
                 <a:cs typeface="Arial" panose="020B0604020202020204" pitchFamily="34" charset="0"/>
@@ -5083,7 +4736,7 @@
             <a:r>
               <a:rPr lang="zh-CN" altLang="en-US" sz="1100" dirty="0">
                 <a:solidFill>
-                  <a:schemeClr val="bg1"/>
+                  <a:schemeClr val="tx1"/>
                 </a:solidFill>
                 <a:latin typeface="Arial" panose="020B0604020202020204" pitchFamily="34" charset="0"/>
                 <a:cs typeface="Arial" panose="020B0604020202020204" pitchFamily="34" charset="0"/>
@@ -5093,7 +4746,7 @@
             <a:r>
               <a:rPr lang="en-US" altLang="zh-CN" sz="1100" dirty="0" err="1">
                 <a:solidFill>
-                  <a:schemeClr val="bg1"/>
+                  <a:schemeClr val="tx1"/>
                 </a:solidFill>
                 <a:latin typeface="Arial" panose="020B0604020202020204" pitchFamily="34" charset="0"/>
                 <a:cs typeface="Arial" panose="020B0604020202020204" pitchFamily="34" charset="0"/>
@@ -5103,7 +4756,7 @@
             <a:r>
               <a:rPr lang="zh-CN" altLang="en-US" sz="1100" dirty="0">
                 <a:solidFill>
-                  <a:schemeClr val="bg1"/>
+                  <a:schemeClr val="tx1"/>
                 </a:solidFill>
                 <a:latin typeface="Arial" panose="020B0604020202020204" pitchFamily="34" charset="0"/>
                 <a:cs typeface="Arial" panose="020B0604020202020204" pitchFamily="34" charset="0"/>
@@ -5113,7 +4766,7 @@
             <a:r>
               <a:rPr lang="en-US" altLang="zh-CN" sz="1100" dirty="0">
                 <a:solidFill>
-                  <a:schemeClr val="bg1"/>
+                  <a:schemeClr val="tx1"/>
                 </a:solidFill>
                 <a:latin typeface="Arial" panose="020B0604020202020204" pitchFamily="34" charset="0"/>
                 <a:cs typeface="Arial" panose="020B0604020202020204" pitchFamily="34" charset="0"/>
@@ -5123,7 +4776,7 @@
             <a:r>
               <a:rPr lang="zh-CN" altLang="en-US" sz="1100" dirty="0">
                 <a:solidFill>
-                  <a:schemeClr val="bg1"/>
+                  <a:schemeClr val="tx1"/>
                 </a:solidFill>
                 <a:latin typeface="Arial" panose="020B0604020202020204" pitchFamily="34" charset="0"/>
                 <a:cs typeface="Arial" panose="020B0604020202020204" pitchFamily="34" charset="0"/>
@@ -5133,7 +4786,7 @@
             <a:r>
               <a:rPr lang="en-US" altLang="zh-CN" sz="1100" dirty="0">
                 <a:solidFill>
-                  <a:schemeClr val="bg1"/>
+                  <a:schemeClr val="tx1"/>
                 </a:solidFill>
                 <a:latin typeface="Arial" panose="020B0604020202020204" pitchFamily="34" charset="0"/>
                 <a:cs typeface="Arial" panose="020B0604020202020204" pitchFamily="34" charset="0"/>
@@ -5146,7 +4799,7 @@
             <a:r>
               <a:rPr lang="en-US" altLang="zh-CN" sz="1100" dirty="0">
                 <a:solidFill>
-                  <a:schemeClr val="bg1"/>
+                  <a:srgbClr val="0070C0"/>
                 </a:solidFill>
                 <a:latin typeface="Arial" panose="020B0604020202020204" pitchFamily="34" charset="0"/>
                 <a:cs typeface="Arial" panose="020B0604020202020204" pitchFamily="34" charset="0"/>
@@ -5156,7 +4809,7 @@
             <a:r>
               <a:rPr lang="zh-CN" altLang="en-US" sz="1100" dirty="0">
                 <a:solidFill>
-                  <a:schemeClr val="bg1"/>
+                  <a:srgbClr val="0070C0"/>
                 </a:solidFill>
                 <a:latin typeface="Arial" panose="020B0604020202020204" pitchFamily="34" charset="0"/>
                 <a:cs typeface="Arial" panose="020B0604020202020204" pitchFamily="34" charset="0"/>
@@ -5166,7 +4819,7 @@
             <a:r>
               <a:rPr lang="en-US" altLang="zh-CN" sz="1100" dirty="0" err="1">
                 <a:solidFill>
-                  <a:schemeClr val="bg1"/>
+                  <a:srgbClr val="0070C0"/>
                 </a:solidFill>
                 <a:latin typeface="Arial" panose="020B0604020202020204" pitchFamily="34" charset="0"/>
                 <a:cs typeface="Arial" panose="020B0604020202020204" pitchFamily="34" charset="0"/>
@@ -5176,7 +4829,7 @@
             <a:r>
               <a:rPr lang="en-US" altLang="zh-CN" sz="1100" dirty="0">
                 <a:solidFill>
-                  <a:schemeClr val="bg1"/>
+                  <a:srgbClr val="0070C0"/>
                 </a:solidFill>
                 <a:latin typeface="Arial" panose="020B0604020202020204" pitchFamily="34" charset="0"/>
                 <a:cs typeface="Arial" panose="020B0604020202020204" pitchFamily="34" charset="0"/>
@@ -5186,7 +4839,7 @@
             <a:r>
               <a:rPr lang="en-US" altLang="zh-CN" sz="1100" dirty="0" err="1">
                 <a:solidFill>
-                  <a:schemeClr val="bg1"/>
+                  <a:srgbClr val="0070C0"/>
                 </a:solidFill>
                 <a:latin typeface="Arial" panose="020B0604020202020204" pitchFamily="34" charset="0"/>
                 <a:cs typeface="Arial" panose="020B0604020202020204" pitchFamily="34" charset="0"/>
@@ -5196,7 +4849,7 @@
             <a:r>
               <a:rPr lang="en-US" altLang="zh-CN" sz="1100" dirty="0">
                 <a:solidFill>
-                  <a:schemeClr val="bg1"/>
+                  <a:srgbClr val="0070C0"/>
                 </a:solidFill>
                 <a:latin typeface="Arial" panose="020B0604020202020204" pitchFamily="34" charset="0"/>
                 <a:cs typeface="Arial" panose="020B0604020202020204" pitchFamily="34" charset="0"/>
@@ -5206,98 +4859,6 @@
           </a:p>
         </p:txBody>
       </p:sp>
-      <p:cxnSp>
-        <p:nvCxnSpPr>
-          <p:cNvPr id="47" name="Straight Arrow Connector 46">
-            <a:extLst>
-              <a:ext uri="{FF2B5EF4-FFF2-40B4-BE49-F238E27FC236}">
-                <a16:creationId xmlns:a16="http://schemas.microsoft.com/office/drawing/2014/main" id="{178E77DD-87C1-834F-86C4-4B8AFF4CDD43}"/>
-              </a:ext>
-            </a:extLst>
-          </p:cNvPr>
-          <p:cNvCxnSpPr>
-            <a:cxnSpLocks/>
-          </p:cNvCxnSpPr>
-          <p:nvPr/>
-        </p:nvCxnSpPr>
-        <p:spPr>
-          <a:xfrm>
-            <a:off x="4607892" y="8589741"/>
-            <a:ext cx="0" cy="212985"/>
-          </a:xfrm>
-          <a:prstGeom prst="straightConnector1">
-            <a:avLst/>
-          </a:prstGeom>
-          <a:ln>
-            <a:solidFill>
-              <a:schemeClr val="bg2">
-                <a:lumMod val="25000"/>
-              </a:schemeClr>
-            </a:solidFill>
-            <a:tailEnd type="triangle"/>
-          </a:ln>
-        </p:spPr>
-        <p:style>
-          <a:lnRef idx="1">
-            <a:schemeClr val="accent1"/>
-          </a:lnRef>
-          <a:fillRef idx="0">
-            <a:schemeClr val="accent1"/>
-          </a:fillRef>
-          <a:effectRef idx="0">
-            <a:schemeClr val="accent1"/>
-          </a:effectRef>
-          <a:fontRef idx="minor">
-            <a:schemeClr val="tx1"/>
-          </a:fontRef>
-        </p:style>
-      </p:cxnSp>
-      <p:cxnSp>
-        <p:nvCxnSpPr>
-          <p:cNvPr id="48" name="Straight Arrow Connector 47">
-            <a:extLst>
-              <a:ext uri="{FF2B5EF4-FFF2-40B4-BE49-F238E27FC236}">
-                <a16:creationId xmlns:a16="http://schemas.microsoft.com/office/drawing/2014/main" id="{8DADF49F-B169-8649-BE32-7A34A720EC2C}"/>
-              </a:ext>
-            </a:extLst>
-          </p:cNvPr>
-          <p:cNvCxnSpPr>
-            <a:cxnSpLocks/>
-          </p:cNvCxnSpPr>
-          <p:nvPr/>
-        </p:nvCxnSpPr>
-        <p:spPr>
-          <a:xfrm>
-            <a:off x="4607892" y="9508752"/>
-            <a:ext cx="0" cy="212985"/>
-          </a:xfrm>
-          <a:prstGeom prst="straightConnector1">
-            <a:avLst/>
-          </a:prstGeom>
-          <a:ln>
-            <a:solidFill>
-              <a:schemeClr val="bg2">
-                <a:lumMod val="25000"/>
-              </a:schemeClr>
-            </a:solidFill>
-            <a:tailEnd type="triangle"/>
-          </a:ln>
-        </p:spPr>
-        <p:style>
-          <a:lnRef idx="1">
-            <a:schemeClr val="accent1"/>
-          </a:lnRef>
-          <a:fillRef idx="0">
-            <a:schemeClr val="accent1"/>
-          </a:fillRef>
-          <a:effectRef idx="0">
-            <a:schemeClr val="accent1"/>
-          </a:effectRef>
-          <a:fontRef idx="minor">
-            <a:schemeClr val="tx1"/>
-          </a:fontRef>
-        </p:style>
-      </p:cxnSp>
       <p:sp>
         <p:nvSpPr>
           <p:cNvPr id="49" name="Rectangle 48">
@@ -5312,17 +4873,25 @@
         </p:nvSpPr>
         <p:spPr>
           <a:xfrm>
-            <a:off x="2498331" y="9756583"/>
-            <a:ext cx="4239055" cy="641821"/>
+            <a:off x="2498332" y="11484142"/>
+            <a:ext cx="5171999" cy="641821"/>
           </a:xfrm>
           <a:prstGeom prst="rect">
             <a:avLst/>
           </a:prstGeom>
           <a:solidFill>
-            <a:srgbClr val="4270C3"/>
+            <a:schemeClr val="bg1">
+              <a:lumMod val="95000"/>
+              <a:alpha val="74000"/>
+            </a:schemeClr>
           </a:solidFill>
           <a:ln>
-            <a:noFill/>
+            <a:solidFill>
+              <a:schemeClr val="accent3">
+                <a:lumMod val="60000"/>
+                <a:lumOff val="40000"/>
+              </a:schemeClr>
+            </a:solidFill>
           </a:ln>
         </p:spPr>
         <p:style>
@@ -5354,7 +4923,7 @@
             <a:r>
               <a:rPr lang="en-US" altLang="zh-CN" sz="1100" dirty="0">
                 <a:solidFill>
-                  <a:schemeClr val="bg1"/>
+                  <a:schemeClr val="tx1"/>
                 </a:solidFill>
                 <a:latin typeface="Arial" panose="020B0604020202020204" pitchFamily="34" charset="0"/>
                 <a:cs typeface="Arial" panose="020B0604020202020204" pitchFamily="34" charset="0"/>
@@ -5364,7 +4933,7 @@
             <a:r>
               <a:rPr lang="en-US" altLang="zh-CN" sz="1100" dirty="0" err="1">
                 <a:solidFill>
-                  <a:schemeClr val="bg1"/>
+                  <a:schemeClr val="tx1"/>
                 </a:solidFill>
                 <a:latin typeface="Arial" panose="020B0604020202020204" pitchFamily="34" charset="0"/>
                 <a:cs typeface="Arial" panose="020B0604020202020204" pitchFamily="34" charset="0"/>
@@ -5374,7 +4943,7 @@
             <a:r>
               <a:rPr lang="en-US" altLang="zh-CN" sz="1100" dirty="0">
                 <a:solidFill>
-                  <a:schemeClr val="bg1"/>
+                  <a:schemeClr val="tx1"/>
                 </a:solidFill>
                 <a:latin typeface="Arial" panose="020B0604020202020204" pitchFamily="34" charset="0"/>
                 <a:cs typeface="Arial" panose="020B0604020202020204" pitchFamily="34" charset="0"/>
@@ -5387,7 +4956,7 @@
             <a:r>
               <a:rPr lang="en-US" altLang="zh-CN" sz="1100" dirty="0">
                 <a:solidFill>
-                  <a:schemeClr val="bg1"/>
+                  <a:schemeClr val="tx1"/>
                 </a:solidFill>
                 <a:latin typeface="Arial" panose="020B0604020202020204" pitchFamily="34" charset="0"/>
                 <a:cs typeface="Arial" panose="020B0604020202020204" pitchFamily="34" charset="0"/>
@@ -5397,7 +4966,7 @@
             <a:r>
               <a:rPr lang="zh-CN" altLang="en-US" sz="1100" dirty="0">
                 <a:solidFill>
-                  <a:schemeClr val="bg1"/>
+                  <a:schemeClr val="tx1"/>
                 </a:solidFill>
                 <a:latin typeface="Arial" panose="020B0604020202020204" pitchFamily="34" charset="0"/>
                 <a:cs typeface="Arial" panose="020B0604020202020204" pitchFamily="34" charset="0"/>
@@ -5407,7 +4976,7 @@
             <a:r>
               <a:rPr lang="en-US" altLang="zh-CN" sz="1100" dirty="0">
                 <a:solidFill>
-                  <a:schemeClr val="bg1"/>
+                  <a:schemeClr val="tx1"/>
                 </a:solidFill>
                 <a:latin typeface="Arial" panose="020B0604020202020204" pitchFamily="34" charset="0"/>
                 <a:cs typeface="Arial" panose="020B0604020202020204" pitchFamily="34" charset="0"/>
@@ -5417,7 +4986,7 @@
             <a:r>
               <a:rPr lang="zh-CN" altLang="en-US" sz="1100" dirty="0">
                 <a:solidFill>
-                  <a:schemeClr val="bg1"/>
+                  <a:schemeClr val="tx1"/>
                 </a:solidFill>
                 <a:latin typeface="Arial" panose="020B0604020202020204" pitchFamily="34" charset="0"/>
                 <a:cs typeface="Arial" panose="020B0604020202020204" pitchFamily="34" charset="0"/>
@@ -5427,7 +4996,7 @@
             <a:r>
               <a:rPr lang="en-US" altLang="zh-CN" sz="1100" dirty="0">
                 <a:solidFill>
-                  <a:schemeClr val="bg1"/>
+                  <a:schemeClr val="tx1"/>
                 </a:solidFill>
                 <a:latin typeface="Arial" panose="020B0604020202020204" pitchFamily="34" charset="0"/>
                 <a:cs typeface="Arial" panose="020B0604020202020204" pitchFamily="34" charset="0"/>
@@ -5437,7 +5006,7 @@
             <a:r>
               <a:rPr lang="zh-CN" altLang="en-US" sz="1100" dirty="0">
                 <a:solidFill>
-                  <a:schemeClr val="bg1"/>
+                  <a:schemeClr val="tx1"/>
                 </a:solidFill>
                 <a:latin typeface="Arial" panose="020B0604020202020204" pitchFamily="34" charset="0"/>
                 <a:cs typeface="Arial" panose="020B0604020202020204" pitchFamily="34" charset="0"/>
@@ -5447,7 +5016,7 @@
             <a:r>
               <a:rPr lang="en-US" altLang="zh-CN" sz="1100" dirty="0">
                 <a:solidFill>
-                  <a:schemeClr val="bg1"/>
+                  <a:schemeClr val="tx1"/>
                 </a:solidFill>
                 <a:latin typeface="Arial" panose="020B0604020202020204" pitchFamily="34" charset="0"/>
                 <a:cs typeface="Arial" panose="020B0604020202020204" pitchFamily="34" charset="0"/>
@@ -5457,7 +5026,7 @@
             <a:r>
               <a:rPr lang="zh-CN" altLang="en-US" sz="1100" dirty="0">
                 <a:solidFill>
-                  <a:schemeClr val="bg1"/>
+                  <a:schemeClr val="tx1"/>
                 </a:solidFill>
                 <a:latin typeface="Arial" panose="020B0604020202020204" pitchFamily="34" charset="0"/>
                 <a:cs typeface="Arial" panose="020B0604020202020204" pitchFamily="34" charset="0"/>
@@ -5467,7 +5036,7 @@
             <a:r>
               <a:rPr lang="en-US" altLang="zh-CN" sz="1100" dirty="0" err="1">
                 <a:solidFill>
-                  <a:schemeClr val="bg1"/>
+                  <a:schemeClr val="tx1"/>
                 </a:solidFill>
                 <a:latin typeface="Arial" panose="020B0604020202020204" pitchFamily="34" charset="0"/>
                 <a:cs typeface="Arial" panose="020B0604020202020204" pitchFamily="34" charset="0"/>
@@ -5477,7 +5046,7 @@
             <a:r>
               <a:rPr lang="zh-CN" altLang="en-US" sz="1100" dirty="0">
                 <a:solidFill>
-                  <a:schemeClr val="bg1"/>
+                  <a:schemeClr val="tx1"/>
                 </a:solidFill>
                 <a:latin typeface="Arial" panose="020B0604020202020204" pitchFamily="34" charset="0"/>
                 <a:cs typeface="Arial" panose="020B0604020202020204" pitchFamily="34" charset="0"/>
@@ -5487,7 +5056,7 @@
             <a:r>
               <a:rPr lang="en-US" altLang="zh-CN" sz="1100" dirty="0">
                 <a:solidFill>
-                  <a:schemeClr val="bg1"/>
+                  <a:schemeClr val="tx1"/>
                 </a:solidFill>
                 <a:latin typeface="Arial" panose="020B0604020202020204" pitchFamily="34" charset="0"/>
                 <a:cs typeface="Arial" panose="020B0604020202020204" pitchFamily="34" charset="0"/>
@@ -5497,7 +5066,7 @@
             <a:r>
               <a:rPr lang="zh-CN" altLang="en-US" sz="1100" dirty="0">
                 <a:solidFill>
-                  <a:schemeClr val="bg1"/>
+                  <a:schemeClr val="tx1"/>
                 </a:solidFill>
                 <a:latin typeface="Arial" panose="020B0604020202020204" pitchFamily="34" charset="0"/>
                 <a:cs typeface="Arial" panose="020B0604020202020204" pitchFamily="34" charset="0"/>
@@ -5507,7 +5076,7 @@
             <a:r>
               <a:rPr lang="en-US" altLang="zh-CN" sz="1100" dirty="0">
                 <a:solidFill>
-                  <a:schemeClr val="bg1"/>
+                  <a:schemeClr val="tx1"/>
                 </a:solidFill>
                 <a:latin typeface="Arial" panose="020B0604020202020204" pitchFamily="34" charset="0"/>
                 <a:cs typeface="Arial" panose="020B0604020202020204" pitchFamily="34" charset="0"/>
@@ -5517,7 +5086,7 @@
             <a:r>
               <a:rPr lang="zh-CN" altLang="en-US" sz="1100" dirty="0">
                 <a:solidFill>
-                  <a:schemeClr val="bg1"/>
+                  <a:schemeClr val="tx1"/>
                 </a:solidFill>
                 <a:latin typeface="Arial" panose="020B0604020202020204" pitchFamily="34" charset="0"/>
                 <a:cs typeface="Arial" panose="020B0604020202020204" pitchFamily="34" charset="0"/>
@@ -5527,7 +5096,7 @@
             <a:r>
               <a:rPr lang="en-US" altLang="zh-CN" sz="1100" dirty="0">
                 <a:solidFill>
-                  <a:schemeClr val="bg1"/>
+                  <a:schemeClr val="tx1"/>
                 </a:solidFill>
                 <a:latin typeface="Arial" panose="020B0604020202020204" pitchFamily="34" charset="0"/>
                 <a:cs typeface="Arial" panose="020B0604020202020204" pitchFamily="34" charset="0"/>
@@ -5540,7 +5109,7 @@
             <a:r>
               <a:rPr lang="en-US" altLang="zh-CN" sz="1100" dirty="0">
                 <a:solidFill>
-                  <a:schemeClr val="bg1"/>
+                  <a:srgbClr val="0070C0"/>
                 </a:solidFill>
                 <a:latin typeface="Arial" panose="020B0604020202020204" pitchFamily="34" charset="0"/>
                 <a:cs typeface="Arial" panose="020B0604020202020204" pitchFamily="34" charset="0"/>
@@ -5550,7 +5119,7 @@
             <a:r>
               <a:rPr lang="en-US" sz="1100" dirty="0" err="1">
                 <a:solidFill>
-                  <a:schemeClr val="bg1"/>
+                  <a:srgbClr val="0070C0"/>
                 </a:solidFill>
                 <a:latin typeface="Arial" panose="020B0604020202020204" pitchFamily="34" charset="0"/>
                 <a:cs typeface="Arial" panose="020B0604020202020204" pitchFamily="34" charset="0"/>
@@ -5560,7 +5129,7 @@
             <a:r>
               <a:rPr lang="en-US" sz="1100" dirty="0">
                 <a:solidFill>
-                  <a:schemeClr val="bg1"/>
+                  <a:srgbClr val="0070C0"/>
                 </a:solidFill>
                 <a:latin typeface="Arial" panose="020B0604020202020204" pitchFamily="34" charset="0"/>
                 <a:cs typeface="Arial" panose="020B0604020202020204" pitchFamily="34" charset="0"/>
@@ -5570,7 +5139,7 @@
             <a:r>
               <a:rPr lang="en-US" altLang="zh-CN" sz="1100" dirty="0">
                 <a:solidFill>
-                  <a:schemeClr val="bg1"/>
+                  <a:srgbClr val="0070C0"/>
                 </a:solidFill>
                 <a:latin typeface="Arial" panose="020B0604020202020204" pitchFamily="34" charset="0"/>
                 <a:cs typeface="Arial" panose="020B0604020202020204" pitchFamily="34" charset="0"/>
@@ -5580,7 +5149,7 @@
             <a:r>
               <a:rPr lang="en-US" altLang="zh-CN" sz="1100" dirty="0" err="1">
                 <a:solidFill>
-                  <a:schemeClr val="bg1"/>
+                  <a:srgbClr val="0070C0"/>
                 </a:solidFill>
                 <a:latin typeface="Arial" panose="020B0604020202020204" pitchFamily="34" charset="0"/>
                 <a:cs typeface="Arial" panose="020B0604020202020204" pitchFamily="34" charset="0"/>
@@ -5590,7 +5159,7 @@
             <a:r>
               <a:rPr lang="en-US" sz="1100" dirty="0" err="1">
                 <a:solidFill>
-                  <a:schemeClr val="bg1"/>
+                  <a:srgbClr val="0070C0"/>
                 </a:solidFill>
                 <a:latin typeface="Arial" panose="020B0604020202020204" pitchFamily="34" charset="0"/>
                 <a:cs typeface="Arial" panose="020B0604020202020204" pitchFamily="34" charset="0"/>
@@ -5600,7 +5169,7 @@
             <a:r>
               <a:rPr lang="en-US" altLang="zh-CN" sz="1100" dirty="0" err="1">
                 <a:solidFill>
-                  <a:schemeClr val="bg1"/>
+                  <a:srgbClr val="0070C0"/>
                 </a:solidFill>
                 <a:latin typeface="Arial" panose="020B0604020202020204" pitchFamily="34" charset="0"/>
                 <a:cs typeface="Arial" panose="020B0604020202020204" pitchFamily="34" charset="0"/>
@@ -5610,7 +5179,7 @@
             <a:r>
               <a:rPr lang="en-US" altLang="zh-CN" sz="1100" dirty="0">
                 <a:solidFill>
-                  <a:schemeClr val="bg1"/>
+                  <a:srgbClr val="0070C0"/>
                 </a:solidFill>
                 <a:latin typeface="Arial" panose="020B0604020202020204" pitchFamily="34" charset="0"/>
                 <a:cs typeface="Arial" panose="020B0604020202020204" pitchFamily="34" charset="0"/>
@@ -5619,7 +5188,7 @@
             </a:r>
             <a:endParaRPr lang="en-US" sz="1100" dirty="0">
               <a:solidFill>
-                <a:schemeClr val="bg1"/>
+                <a:srgbClr val="0070C0"/>
               </a:solidFill>
               <a:latin typeface="Arial" panose="020B0604020202020204" pitchFamily="34" charset="0"/>
               <a:cs typeface="Arial" panose="020B0604020202020204" pitchFamily="34" charset="0"/>
@@ -5627,52 +5196,6 @@
           </a:p>
         </p:txBody>
       </p:sp>
-      <p:cxnSp>
-        <p:nvCxnSpPr>
-          <p:cNvPr id="50" name="Straight Arrow Connector 49">
-            <a:extLst>
-              <a:ext uri="{FF2B5EF4-FFF2-40B4-BE49-F238E27FC236}">
-                <a16:creationId xmlns:a16="http://schemas.microsoft.com/office/drawing/2014/main" id="{4945AA63-82D1-0D46-9A09-6454D3D4EF25}"/>
-              </a:ext>
-            </a:extLst>
-          </p:cNvPr>
-          <p:cNvCxnSpPr>
-            <a:cxnSpLocks/>
-          </p:cNvCxnSpPr>
-          <p:nvPr/>
-        </p:nvCxnSpPr>
-        <p:spPr>
-          <a:xfrm>
-            <a:off x="4607892" y="10435331"/>
-            <a:ext cx="0" cy="212985"/>
-          </a:xfrm>
-          <a:prstGeom prst="straightConnector1">
-            <a:avLst/>
-          </a:prstGeom>
-          <a:ln>
-            <a:solidFill>
-              <a:schemeClr val="bg2">
-                <a:lumMod val="25000"/>
-              </a:schemeClr>
-            </a:solidFill>
-            <a:tailEnd type="triangle"/>
-          </a:ln>
-        </p:spPr>
-        <p:style>
-          <a:lnRef idx="1">
-            <a:schemeClr val="accent1"/>
-          </a:lnRef>
-          <a:fillRef idx="0">
-            <a:schemeClr val="accent1"/>
-          </a:fillRef>
-          <a:effectRef idx="0">
-            <a:schemeClr val="accent1"/>
-          </a:effectRef>
-          <a:fontRef idx="minor">
-            <a:schemeClr val="tx1"/>
-          </a:fontRef>
-        </p:style>
-      </p:cxnSp>
       <p:cxnSp>
         <p:nvCxnSpPr>
           <p:cNvPr id="52" name="Straight Connector 51">
@@ -5689,16 +5212,16 @@
         </p:nvCxnSpPr>
         <p:spPr>
           <a:xfrm>
-            <a:off x="624113" y="6783119"/>
-            <a:ext cx="6113290" cy="0"/>
+            <a:off x="624113" y="6866602"/>
+            <a:ext cx="8072213" cy="0"/>
           </a:xfrm>
           <a:prstGeom prst="line">
             <a:avLst/>
           </a:prstGeom>
           <a:ln>
             <a:solidFill>
-              <a:schemeClr val="bg2">
-                <a:lumMod val="75000"/>
+              <a:schemeClr val="bg1">
+                <a:lumMod val="50000"/>
               </a:schemeClr>
             </a:solidFill>
             <a:prstDash val="dash"/>
@@ -5735,8 +5258,8 @@
         </p:nvCxnSpPr>
         <p:spPr>
           <a:xfrm>
-            <a:off x="624113" y="1471008"/>
-            <a:ext cx="5740480" cy="0"/>
+            <a:off x="624113" y="1583066"/>
+            <a:ext cx="7982472" cy="0"/>
           </a:xfrm>
           <a:prstGeom prst="line">
             <a:avLst/>
@@ -5781,7 +5304,7 @@
         </p:nvCxnSpPr>
         <p:spPr>
           <a:xfrm>
-            <a:off x="4254230" y="1788214"/>
+            <a:off x="4381820" y="1900273"/>
             <a:ext cx="0" cy="258831"/>
           </a:xfrm>
           <a:prstGeom prst="straightConnector1">
@@ -5789,8 +5312,9 @@
           </a:prstGeom>
           <a:ln>
             <a:solidFill>
-              <a:schemeClr val="bg2">
-                <a:lumMod val="25000"/>
+              <a:schemeClr val="tx1">
+                <a:lumMod val="50000"/>
+                <a:lumOff val="50000"/>
               </a:schemeClr>
             </a:solidFill>
             <a:tailEnd type="triangle"/>
@@ -5825,18 +5349,16 @@
         </p:nvSpPr>
         <p:spPr>
           <a:xfrm>
-            <a:off x="3334918" y="615090"/>
+            <a:off x="3462508" y="727149"/>
             <a:ext cx="1958008" cy="558971"/>
           </a:xfrm>
           <a:prstGeom prst="rect">
             <a:avLst/>
           </a:prstGeom>
           <a:solidFill>
-            <a:schemeClr val="accent2">
-              <a:lumMod val="75000"/>
-            </a:schemeClr>
+            <a:srgbClr val="B4D7EE"/>
           </a:solidFill>
-          <a:ln>
+          <a:ln cap="flat">
             <a:noFill/>
           </a:ln>
         </p:spPr>
@@ -5869,7 +5391,7 @@
             <a:r>
               <a:rPr lang="en-US" altLang="zh-CN" sz="1100" dirty="0">
                 <a:solidFill>
-                  <a:schemeClr val="bg1"/>
+                  <a:schemeClr val="tx1"/>
                 </a:solidFill>
                 <a:latin typeface="Arial" panose="020B0604020202020204" pitchFamily="34" charset="0"/>
                 <a:cs typeface="Arial" panose="020B0604020202020204" pitchFamily="34" charset="0"/>
@@ -5879,7 +5401,7 @@
             <a:r>
               <a:rPr lang="zh-CN" altLang="en-US" sz="1100" dirty="0">
                 <a:solidFill>
-                  <a:schemeClr val="bg1"/>
+                  <a:schemeClr val="tx1"/>
                 </a:solidFill>
                 <a:latin typeface="Arial" panose="020B0604020202020204" pitchFamily="34" charset="0"/>
                 <a:cs typeface="Arial" panose="020B0604020202020204" pitchFamily="34" charset="0"/>
@@ -5889,7 +5411,7 @@
             <a:r>
               <a:rPr lang="en-US" altLang="zh-CN" sz="1100" dirty="0">
                 <a:solidFill>
-                  <a:schemeClr val="bg1"/>
+                  <a:schemeClr val="tx1"/>
                 </a:solidFill>
                 <a:latin typeface="Arial" panose="020B0604020202020204" pitchFamily="34" charset="0"/>
                 <a:cs typeface="Arial" panose="020B0604020202020204" pitchFamily="34" charset="0"/>
@@ -5899,7 +5421,7 @@
             <a:r>
               <a:rPr lang="zh-CN" altLang="en-US" sz="1100" dirty="0">
                 <a:solidFill>
-                  <a:schemeClr val="bg1"/>
+                  <a:schemeClr val="tx1"/>
                 </a:solidFill>
                 <a:latin typeface="Arial" panose="020B0604020202020204" pitchFamily="34" charset="0"/>
                 <a:cs typeface="Arial" panose="020B0604020202020204" pitchFamily="34" charset="0"/>
@@ -5909,7 +5431,7 @@
             <a:r>
               <a:rPr lang="en-US" altLang="zh-CN" sz="1100" dirty="0">
                 <a:solidFill>
-                  <a:schemeClr val="bg1"/>
+                  <a:schemeClr val="tx1"/>
                 </a:solidFill>
                 <a:latin typeface="Arial" panose="020B0604020202020204" pitchFamily="34" charset="0"/>
                 <a:cs typeface="Arial" panose="020B0604020202020204" pitchFamily="34" charset="0"/>
@@ -5919,7 +5441,7 @@
             <a:r>
               <a:rPr lang="zh-CN" altLang="en-US" sz="1100" dirty="0">
                 <a:solidFill>
-                  <a:schemeClr val="bg1"/>
+                  <a:schemeClr val="tx1"/>
                 </a:solidFill>
                 <a:latin typeface="Arial" panose="020B0604020202020204" pitchFamily="34" charset="0"/>
                 <a:cs typeface="Arial" panose="020B0604020202020204" pitchFamily="34" charset="0"/>
@@ -5929,7 +5451,7 @@
             <a:r>
               <a:rPr lang="en-US" altLang="zh-CN" sz="1100" dirty="0">
                 <a:solidFill>
-                  <a:schemeClr val="bg1"/>
+                  <a:schemeClr val="tx1"/>
                 </a:solidFill>
                 <a:latin typeface="Arial" panose="020B0604020202020204" pitchFamily="34" charset="0"/>
                 <a:cs typeface="Arial" panose="020B0604020202020204" pitchFamily="34" charset="0"/>
@@ -5939,7 +5461,7 @@
             <a:r>
               <a:rPr lang="zh-CN" altLang="en-US" sz="1100" dirty="0">
                 <a:solidFill>
-                  <a:schemeClr val="bg1"/>
+                  <a:schemeClr val="tx1"/>
                 </a:solidFill>
                 <a:latin typeface="Arial" panose="020B0604020202020204" pitchFamily="34" charset="0"/>
                 <a:cs typeface="Arial" panose="020B0604020202020204" pitchFamily="34" charset="0"/>
@@ -5949,7 +5471,7 @@
             <a:r>
               <a:rPr lang="en-US" altLang="zh-CN" sz="1100" dirty="0">
                 <a:solidFill>
-                  <a:schemeClr val="bg1"/>
+                  <a:schemeClr val="tx1"/>
                 </a:solidFill>
                 <a:latin typeface="Arial" panose="020B0604020202020204" pitchFamily="34" charset="0"/>
                 <a:cs typeface="Arial" panose="020B0604020202020204" pitchFamily="34" charset="0"/>
@@ -5959,7 +5481,7 @@
             <a:r>
               <a:rPr lang="zh-CN" altLang="en-US" sz="1100" dirty="0">
                 <a:solidFill>
-                  <a:schemeClr val="bg1"/>
+                  <a:schemeClr val="tx1"/>
                 </a:solidFill>
                 <a:latin typeface="Arial" panose="020B0604020202020204" pitchFamily="34" charset="0"/>
                 <a:cs typeface="Arial" panose="020B0604020202020204" pitchFamily="34" charset="0"/>
@@ -5969,7 +5491,7 @@
             <a:r>
               <a:rPr lang="en-US" altLang="zh-CN" sz="1100" dirty="0">
                 <a:solidFill>
-                  <a:schemeClr val="bg1"/>
+                  <a:schemeClr val="tx1"/>
                 </a:solidFill>
                 <a:latin typeface="Arial" panose="020B0604020202020204" pitchFamily="34" charset="0"/>
                 <a:cs typeface="Arial" panose="020B0604020202020204" pitchFamily="34" charset="0"/>
@@ -5978,7 +5500,7 @@
             </a:r>
             <a:endParaRPr lang="en-US" sz="1100" dirty="0">
               <a:solidFill>
-                <a:schemeClr val="bg1"/>
+                <a:schemeClr val="tx1"/>
               </a:solidFill>
               <a:latin typeface="Arial" panose="020B0604020202020204" pitchFamily="34" charset="0"/>
               <a:cs typeface="Arial" panose="020B0604020202020204" pitchFamily="34" charset="0"/>
@@ -6002,7 +5524,7 @@
         </p:nvCxnSpPr>
         <p:spPr>
           <a:xfrm>
-            <a:off x="4254230" y="1221503"/>
+            <a:off x="4381820" y="1333562"/>
             <a:ext cx="0" cy="212985"/>
           </a:xfrm>
           <a:prstGeom prst="straightConnector1">
@@ -6010,8 +5532,9 @@
           </a:prstGeom>
           <a:ln>
             <a:solidFill>
-              <a:schemeClr val="bg2">
-                <a:lumMod val="25000"/>
+              <a:schemeClr val="tx1">
+                <a:lumMod val="50000"/>
+                <a:lumOff val="50000"/>
               </a:schemeClr>
             </a:solidFill>
             <a:tailEnd type="triangle"/>
@@ -6046,7 +5569,7 @@
         </p:nvSpPr>
         <p:spPr>
           <a:xfrm>
-            <a:off x="606186" y="263775"/>
+            <a:off x="534468" y="375834"/>
             <a:ext cx="2322161" cy="276999"/>
           </a:xfrm>
           <a:prstGeom prst="rect">
@@ -6144,7 +5667,7 @@
         </p:nvSpPr>
         <p:spPr>
           <a:xfrm>
-            <a:off x="624115" y="1538925"/>
+            <a:off x="534468" y="1650984"/>
             <a:ext cx="2566915" cy="276999"/>
           </a:xfrm>
           <a:prstGeom prst="rect">
@@ -6242,8 +5765,8 @@
         </p:nvSpPr>
         <p:spPr>
           <a:xfrm>
-            <a:off x="624114" y="6804740"/>
-            <a:ext cx="1626096" cy="461665"/>
+            <a:off x="534468" y="6916799"/>
+            <a:ext cx="1881011" cy="646331"/>
           </a:xfrm>
           <a:prstGeom prst="rect">
             <a:avLst/>
@@ -6284,6 +5807,12 @@
               </a:rPr>
               <a:t> </a:t>
             </a:r>
+            <a:endParaRPr lang="en-US" altLang="zh-CN" sz="1200" b="1" dirty="0">
+              <a:latin typeface="Arial" panose="020B0604020202020204" pitchFamily="34" charset="0"/>
+              <a:cs typeface="Arial" panose="020B0604020202020204" pitchFamily="34" charset="0"/>
+            </a:endParaRPr>
+          </a:p>
+          <a:p>
             <a:r>
               <a:rPr lang="en-US" altLang="zh-CN" sz="1200" b="1" dirty="0">
                 <a:latin typeface="Arial" panose="020B0604020202020204" pitchFamily="34" charset="0"/>
@@ -6313,25 +5842,67 @@
               <a:t> </a:t>
             </a:r>
             <a:r>
+              <a:rPr lang="en-US" altLang="zh-CN" sz="1200" b="1" dirty="0" err="1">
+                <a:latin typeface="Arial" panose="020B0604020202020204" pitchFamily="34" charset="0"/>
+                <a:cs typeface="Arial" panose="020B0604020202020204" pitchFamily="34" charset="0"/>
+              </a:rPr>
+              <a:t>Zowe</a:t>
+            </a:r>
+            <a:r>
+              <a:rPr lang="zh-CN" altLang="en-US" sz="1200" b="1" dirty="0">
+                <a:latin typeface="Arial" panose="020B0604020202020204" pitchFamily="34" charset="0"/>
+                <a:cs typeface="Arial" panose="020B0604020202020204" pitchFamily="34" charset="0"/>
+              </a:rPr>
+              <a:t> </a:t>
+            </a:r>
+            <a:r>
               <a:rPr lang="en-US" altLang="zh-CN" sz="1200" b="1" dirty="0">
                 <a:latin typeface="Arial" panose="020B0604020202020204" pitchFamily="34" charset="0"/>
                 <a:cs typeface="Arial" panose="020B0604020202020204" pitchFamily="34" charset="0"/>
               </a:rPr>
+              <a:t>runtime</a:t>
+            </a:r>
+            <a:r>
+              <a:rPr lang="zh-CN" altLang="en-US" sz="1200" b="1" dirty="0">
+                <a:latin typeface="Arial" panose="020B0604020202020204" pitchFamily="34" charset="0"/>
+                <a:cs typeface="Arial" panose="020B0604020202020204" pitchFamily="34" charset="0"/>
+              </a:rPr>
+              <a:t> </a:t>
+            </a:r>
+            <a:r>
+              <a:rPr lang="en-US" altLang="zh-CN" sz="1200" b="1" dirty="0">
+                <a:latin typeface="Arial" panose="020B0604020202020204" pitchFamily="34" charset="0"/>
+                <a:cs typeface="Arial" panose="020B0604020202020204" pitchFamily="34" charset="0"/>
+              </a:rPr>
+              <a:t>and</a:t>
+            </a:r>
+            <a:r>
+              <a:rPr lang="zh-CN" altLang="en-US" sz="1200" b="1" dirty="0">
+                <a:latin typeface="Arial" panose="020B0604020202020204" pitchFamily="34" charset="0"/>
+                <a:cs typeface="Arial" panose="020B0604020202020204" pitchFamily="34" charset="0"/>
+              </a:rPr>
+              <a:t> </a:t>
+            </a:r>
+            <a:r>
+              <a:rPr lang="en-US" altLang="zh-CN" sz="1200" b="1" dirty="0">
+                <a:latin typeface="Arial" panose="020B0604020202020204" pitchFamily="34" charset="0"/>
+                <a:cs typeface="Arial" panose="020B0604020202020204" pitchFamily="34" charset="0"/>
+              </a:rPr>
+              <a:t>start</a:t>
+            </a:r>
+            <a:r>
+              <a:rPr lang="zh-CN" altLang="en-US" sz="1200" b="1" dirty="0">
+                <a:latin typeface="Arial" panose="020B0604020202020204" pitchFamily="34" charset="0"/>
+                <a:cs typeface="Arial" panose="020B0604020202020204" pitchFamily="34" charset="0"/>
+              </a:rPr>
+              <a:t> </a:t>
+            </a:r>
+            <a:r>
+              <a:rPr lang="en-US" altLang="zh-CN" sz="1200" b="1" dirty="0" err="1">
+                <a:latin typeface="Arial" panose="020B0604020202020204" pitchFamily="34" charset="0"/>
+                <a:cs typeface="Arial" panose="020B0604020202020204" pitchFamily="34" charset="0"/>
+              </a:rPr>
               <a:t>Zowe</a:t>
-            </a:r>
-            <a:r>
-              <a:rPr lang="zh-CN" altLang="en-US" sz="1200" b="1" dirty="0">
-                <a:latin typeface="Arial" panose="020B0604020202020204" pitchFamily="34" charset="0"/>
-                <a:cs typeface="Arial" panose="020B0604020202020204" pitchFamily="34" charset="0"/>
-              </a:rPr>
-              <a:t> </a:t>
-            </a:r>
-            <a:r>
-              <a:rPr lang="en-US" altLang="zh-CN" sz="1200" b="1" dirty="0">
-                <a:latin typeface="Arial" panose="020B0604020202020204" pitchFamily="34" charset="0"/>
-                <a:cs typeface="Arial" panose="020B0604020202020204" pitchFamily="34" charset="0"/>
-              </a:rPr>
-              <a:t>runtime</a:t>
             </a:r>
             <a:endParaRPr lang="en-US" sz="1200" b="1" dirty="0">
               <a:latin typeface="Arial" panose="020B0604020202020204" pitchFamily="34" charset="0"/>
@@ -6356,8 +5927,8 @@
         </p:nvCxnSpPr>
         <p:spPr>
           <a:xfrm>
-            <a:off x="624113" y="11479810"/>
-            <a:ext cx="6113290" cy="0"/>
+            <a:off x="624113" y="13266360"/>
+            <a:ext cx="8072213" cy="0"/>
           </a:xfrm>
           <a:prstGeom prst="line">
             <a:avLst/>
@@ -6386,52 +5957,6 @@
           </a:fontRef>
         </p:style>
       </p:cxnSp>
-      <p:cxnSp>
-        <p:nvCxnSpPr>
-          <p:cNvPr id="66" name="Straight Arrow Connector 65">
-            <a:extLst>
-              <a:ext uri="{FF2B5EF4-FFF2-40B4-BE49-F238E27FC236}">
-                <a16:creationId xmlns:a16="http://schemas.microsoft.com/office/drawing/2014/main" id="{BF74C147-42B7-F64D-B40B-214ED12D1CFD}"/>
-              </a:ext>
-            </a:extLst>
-          </p:cNvPr>
-          <p:cNvCxnSpPr>
-            <a:cxnSpLocks/>
-          </p:cNvCxnSpPr>
-          <p:nvPr/>
-        </p:nvCxnSpPr>
-        <p:spPr>
-          <a:xfrm>
-            <a:off x="4607892" y="11303000"/>
-            <a:ext cx="0" cy="411363"/>
-          </a:xfrm>
-          <a:prstGeom prst="straightConnector1">
-            <a:avLst/>
-          </a:prstGeom>
-          <a:ln>
-            <a:solidFill>
-              <a:schemeClr val="bg2">
-                <a:lumMod val="25000"/>
-              </a:schemeClr>
-            </a:solidFill>
-            <a:tailEnd type="triangle"/>
-          </a:ln>
-        </p:spPr>
-        <p:style>
-          <a:lnRef idx="1">
-            <a:schemeClr val="accent1"/>
-          </a:lnRef>
-          <a:fillRef idx="0">
-            <a:schemeClr val="accent1"/>
-          </a:fillRef>
-          <a:effectRef idx="0">
-            <a:schemeClr val="accent1"/>
-          </a:effectRef>
-          <a:fontRef idx="minor">
-            <a:schemeClr val="tx1"/>
-          </a:fontRef>
-        </p:style>
-      </p:cxnSp>
       <p:sp>
         <p:nvSpPr>
           <p:cNvPr id="67" name="Rectangle 66">
@@ -6446,16 +5971,14 @@
         </p:nvSpPr>
         <p:spPr>
           <a:xfrm>
-            <a:off x="2498331" y="11783451"/>
-            <a:ext cx="4239039" cy="558971"/>
+            <a:off x="2498332" y="13570002"/>
+            <a:ext cx="5171997" cy="558971"/>
           </a:xfrm>
           <a:prstGeom prst="rect">
             <a:avLst/>
           </a:prstGeom>
           <a:solidFill>
-            <a:schemeClr val="accent1">
-              <a:lumMod val="50000"/>
-            </a:schemeClr>
+            <a:srgbClr val="B4D7EE"/>
           </a:solidFill>
           <a:ln>
             <a:noFill/>
@@ -6490,7 +6013,7 @@
             <a:r>
               <a:rPr lang="en-US" altLang="zh-CN" sz="1100" dirty="0">
                 <a:solidFill>
-                  <a:schemeClr val="bg1"/>
+                  <a:schemeClr val="tx1"/>
                 </a:solidFill>
                 <a:latin typeface="Arial" panose="020B0604020202020204" pitchFamily="34" charset="0"/>
                 <a:cs typeface="Arial" panose="020B0604020202020204" pitchFamily="34" charset="0"/>
@@ -6500,7 +6023,7 @@
             <a:r>
               <a:rPr lang="zh-CN" altLang="en-US" sz="1100" dirty="0">
                 <a:solidFill>
-                  <a:schemeClr val="bg1"/>
+                  <a:schemeClr val="tx1"/>
                 </a:solidFill>
                 <a:latin typeface="Arial" panose="020B0604020202020204" pitchFamily="34" charset="0"/>
                 <a:cs typeface="Arial" panose="020B0604020202020204" pitchFamily="34" charset="0"/>
@@ -6510,7 +6033,7 @@
             <a:r>
               <a:rPr lang="en-US" altLang="zh-CN" sz="1100" dirty="0">
                 <a:solidFill>
-                  <a:schemeClr val="bg1"/>
+                  <a:schemeClr val="tx1"/>
                 </a:solidFill>
                 <a:latin typeface="Arial" panose="020B0604020202020204" pitchFamily="34" charset="0"/>
                 <a:cs typeface="Arial" panose="020B0604020202020204" pitchFamily="34" charset="0"/>
@@ -6520,7 +6043,7 @@
             <a:r>
               <a:rPr lang="zh-CN" altLang="en-US" sz="1100" dirty="0">
                 <a:solidFill>
-                  <a:schemeClr val="bg1"/>
+                  <a:schemeClr val="tx1"/>
                 </a:solidFill>
                 <a:latin typeface="Arial" panose="020B0604020202020204" pitchFamily="34" charset="0"/>
                 <a:cs typeface="Arial" panose="020B0604020202020204" pitchFamily="34" charset="0"/>
@@ -6530,7 +6053,7 @@
             <a:r>
               <a:rPr lang="en-US" altLang="zh-CN" sz="1100" dirty="0">
                 <a:solidFill>
-                  <a:schemeClr val="bg1"/>
+                  <a:schemeClr val="tx1"/>
                 </a:solidFill>
                 <a:latin typeface="Arial" panose="020B0604020202020204" pitchFamily="34" charset="0"/>
                 <a:cs typeface="Arial" panose="020B0604020202020204" pitchFamily="34" charset="0"/>
@@ -6540,7 +6063,7 @@
             <a:r>
               <a:rPr lang="zh-CN" altLang="en-US" sz="1100" dirty="0">
                 <a:solidFill>
-                  <a:schemeClr val="bg1"/>
+                  <a:schemeClr val="tx1"/>
                 </a:solidFill>
                 <a:latin typeface="Arial" panose="020B0604020202020204" pitchFamily="34" charset="0"/>
                 <a:cs typeface="Arial" panose="020B0604020202020204" pitchFamily="34" charset="0"/>
@@ -6550,7 +6073,7 @@
             <a:r>
               <a:rPr lang="en-US" altLang="zh-CN" sz="1100" dirty="0">
                 <a:solidFill>
-                  <a:schemeClr val="bg1"/>
+                  <a:schemeClr val="tx1"/>
                 </a:solidFill>
                 <a:latin typeface="Arial" panose="020B0604020202020204" pitchFamily="34" charset="0"/>
                 <a:cs typeface="Arial" panose="020B0604020202020204" pitchFamily="34" charset="0"/>
@@ -6560,7 +6083,7 @@
             <a:r>
               <a:rPr lang="zh-CN" altLang="en-US" sz="1100" dirty="0">
                 <a:solidFill>
-                  <a:schemeClr val="bg1"/>
+                  <a:schemeClr val="tx1"/>
                 </a:solidFill>
                 <a:latin typeface="Arial" panose="020B0604020202020204" pitchFamily="34" charset="0"/>
                 <a:cs typeface="Arial" panose="020B0604020202020204" pitchFamily="34" charset="0"/>
@@ -6570,7 +6093,7 @@
             <a:r>
               <a:rPr lang="en-US" altLang="zh-CN" sz="1100" dirty="0">
                 <a:solidFill>
-                  <a:schemeClr val="bg1"/>
+                  <a:schemeClr val="tx1"/>
                 </a:solidFill>
                 <a:latin typeface="Arial" panose="020B0604020202020204" pitchFamily="34" charset="0"/>
                 <a:cs typeface="Arial" panose="020B0604020202020204" pitchFamily="34" charset="0"/>
@@ -6580,7 +6103,7 @@
             <a:r>
               <a:rPr lang="zh-CN" altLang="en-US" sz="1100" dirty="0">
                 <a:solidFill>
-                  <a:schemeClr val="bg1"/>
+                  <a:schemeClr val="tx1"/>
                 </a:solidFill>
                 <a:latin typeface="Arial" panose="020B0604020202020204" pitchFamily="34" charset="0"/>
                 <a:cs typeface="Arial" panose="020B0604020202020204" pitchFamily="34" charset="0"/>
@@ -6590,7 +6113,7 @@
             <a:r>
               <a:rPr lang="en-US" altLang="zh-CN" sz="1100" dirty="0">
                 <a:solidFill>
-                  <a:schemeClr val="bg1"/>
+                  <a:schemeClr val="tx1"/>
                 </a:solidFill>
                 <a:latin typeface="Arial" panose="020B0604020202020204" pitchFamily="34" charset="0"/>
                 <a:cs typeface="Arial" panose="020B0604020202020204" pitchFamily="34" charset="0"/>
@@ -6600,7 +6123,7 @@
             <a:r>
               <a:rPr lang="zh-CN" altLang="en-US" sz="1100" dirty="0">
                 <a:solidFill>
-                  <a:schemeClr val="bg1"/>
+                  <a:schemeClr val="tx1"/>
                 </a:solidFill>
                 <a:latin typeface="Arial" panose="020B0604020202020204" pitchFamily="34" charset="0"/>
                 <a:cs typeface="Arial" panose="020B0604020202020204" pitchFamily="34" charset="0"/>
@@ -6610,7 +6133,7 @@
             <a:r>
               <a:rPr lang="en-US" altLang="zh-CN" sz="1100" dirty="0">
                 <a:solidFill>
-                  <a:schemeClr val="bg1"/>
+                  <a:schemeClr val="tx1"/>
                 </a:solidFill>
                 <a:latin typeface="Arial" panose="020B0604020202020204" pitchFamily="34" charset="0"/>
                 <a:cs typeface="Arial" panose="020B0604020202020204" pitchFamily="34" charset="0"/>
@@ -6620,7 +6143,7 @@
             <a:r>
               <a:rPr lang="zh-CN" altLang="en-US" sz="1100" dirty="0">
                 <a:solidFill>
-                  <a:schemeClr val="bg1"/>
+                  <a:schemeClr val="tx1"/>
                 </a:solidFill>
                 <a:latin typeface="Arial" panose="020B0604020202020204" pitchFamily="34" charset="0"/>
                 <a:cs typeface="Arial" panose="020B0604020202020204" pitchFamily="34" charset="0"/>
@@ -6630,7 +6153,7 @@
             <a:r>
               <a:rPr lang="en-US" altLang="zh-CN" sz="1100" dirty="0">
                 <a:solidFill>
-                  <a:schemeClr val="bg1"/>
+                  <a:schemeClr val="tx1"/>
                 </a:solidFill>
                 <a:latin typeface="Arial" panose="020B0604020202020204" pitchFamily="34" charset="0"/>
                 <a:cs typeface="Arial" panose="020B0604020202020204" pitchFamily="34" charset="0"/>
@@ -6654,7 +6177,7 @@
         </p:nvSpPr>
         <p:spPr>
           <a:xfrm>
-            <a:off x="624115" y="11496735"/>
+            <a:off x="534468" y="13283286"/>
             <a:ext cx="2566919" cy="276999"/>
           </a:xfrm>
           <a:prstGeom prst="rect">
@@ -6752,7 +6275,7 @@
         </p:nvSpPr>
         <p:spPr>
           <a:xfrm>
-            <a:off x="3376399" y="3361944"/>
+            <a:off x="3503990" y="3273978"/>
             <a:ext cx="1724319" cy="430887"/>
           </a:xfrm>
           <a:prstGeom prst="rect">
@@ -6792,8 +6315,8 @@
         </p:nvCxnSpPr>
         <p:spPr>
           <a:xfrm>
-            <a:off x="624113" y="263775"/>
-            <a:ext cx="5740480" cy="0"/>
+            <a:off x="624113" y="375833"/>
+            <a:ext cx="7982472" cy="0"/>
           </a:xfrm>
           <a:prstGeom prst="line">
             <a:avLst/>
@@ -6822,10 +6345,939 @@
           </a:fontRef>
         </p:style>
       </p:cxnSp>
+      <p:sp>
+        <p:nvSpPr>
+          <p:cNvPr id="51" name="Rectangle 50">
+            <a:extLst>
+              <a:ext uri="{FF2B5EF4-FFF2-40B4-BE49-F238E27FC236}">
+                <a16:creationId xmlns:a16="http://schemas.microsoft.com/office/drawing/2014/main" id="{0E337C55-5CEA-7D45-A843-ED3785889B04}"/>
+              </a:ext>
+            </a:extLst>
+          </p:cNvPr>
+          <p:cNvSpPr/>
+          <p:nvPr/>
+        </p:nvSpPr>
+        <p:spPr>
+          <a:xfrm>
+            <a:off x="6416473" y="5850038"/>
+            <a:ext cx="2317702" cy="503314"/>
+          </a:xfrm>
+          <a:prstGeom prst="rect">
+            <a:avLst/>
+          </a:prstGeom>
+          <a:solidFill>
+            <a:schemeClr val="accent4">
+              <a:lumMod val="20000"/>
+              <a:lumOff val="80000"/>
+            </a:schemeClr>
+          </a:solidFill>
+          <a:ln>
+            <a:solidFill>
+              <a:schemeClr val="accent4">
+                <a:lumMod val="60000"/>
+                <a:lumOff val="40000"/>
+              </a:schemeClr>
+            </a:solidFill>
+            <a:prstDash val="dash"/>
+          </a:ln>
+        </p:spPr>
+        <p:style>
+          <a:lnRef idx="2">
+            <a:schemeClr val="accent1">
+              <a:shade val="50000"/>
+            </a:schemeClr>
+          </a:lnRef>
+          <a:fillRef idx="1">
+            <a:schemeClr val="accent1"/>
+          </a:fillRef>
+          <a:effectRef idx="0">
+            <a:schemeClr val="accent1"/>
+          </a:effectRef>
+          <a:fontRef idx="minor">
+            <a:schemeClr val="lt1"/>
+          </a:fontRef>
+        </p:style>
+        <p:txBody>
+          <a:bodyPr rot="0" spcFirstLastPara="0" vertOverflow="overflow" horzOverflow="overflow" vert="horz" wrap="square" lIns="91440" tIns="45720" rIns="91440" bIns="45720" numCol="1" spcCol="0" rtlCol="0" fromWordArt="0" anchor="ctr" anchorCtr="0" forceAA="0" compatLnSpc="1">
+            <a:prstTxWarp prst="textNoShape">
+              <a:avLst/>
+            </a:prstTxWarp>
+            <a:noAutofit/>
+          </a:bodyPr>
+          <a:lstStyle/>
+          <a:p>
+            <a:r>
+              <a:rPr lang="en-US" sz="1100" dirty="0">
+                <a:solidFill>
+                  <a:schemeClr val="tx1"/>
+                </a:solidFill>
+                <a:latin typeface="Arial" panose="020B0604020202020204" pitchFamily="34" charset="0"/>
+                <a:cs typeface="Arial" panose="020B0604020202020204" pitchFamily="34" charset="0"/>
+              </a:rPr>
+              <a:t>Method 1: Use shell script </a:t>
+            </a:r>
+          </a:p>
+          <a:p>
+            <a:r>
+              <a:rPr lang="en-US" sz="1100" dirty="0">
+                <a:solidFill>
+                  <a:schemeClr val="accent1"/>
+                </a:solidFill>
+                <a:latin typeface="Arial" panose="020B0604020202020204" pitchFamily="34" charset="0"/>
+                <a:cs typeface="Arial" panose="020B0604020202020204" pitchFamily="34" charset="0"/>
+              </a:rPr>
+              <a:t>(Script: </a:t>
+            </a:r>
+            <a:r>
+              <a:rPr lang="en-US" sz="1100" dirty="0" err="1">
+                <a:solidFill>
+                  <a:schemeClr val="accent1"/>
+                </a:solidFill>
+                <a:latin typeface="Arial" panose="020B0604020202020204" pitchFamily="34" charset="0"/>
+                <a:cs typeface="Arial" panose="020B0604020202020204" pitchFamily="34" charset="0"/>
+              </a:rPr>
+              <a:t>zowe-install.sh</a:t>
+            </a:r>
+            <a:r>
+              <a:rPr lang="en-US" sz="1100" dirty="0">
+                <a:solidFill>
+                  <a:schemeClr val="accent1"/>
+                </a:solidFill>
+                <a:latin typeface="Arial" panose="020B0604020202020204" pitchFamily="34" charset="0"/>
+                <a:cs typeface="Arial" panose="020B0604020202020204" pitchFamily="34" charset="0"/>
+              </a:rPr>
+              <a:t>)</a:t>
+            </a:r>
+          </a:p>
+        </p:txBody>
+      </p:sp>
+      <p:sp>
+        <p:nvSpPr>
+          <p:cNvPr id="53" name="Rectangle 52">
+            <a:extLst>
+              <a:ext uri="{FF2B5EF4-FFF2-40B4-BE49-F238E27FC236}">
+                <a16:creationId xmlns:a16="http://schemas.microsoft.com/office/drawing/2014/main" id="{20D00F0E-D4CD-F545-8E1F-63A049D7B467}"/>
+              </a:ext>
+            </a:extLst>
+          </p:cNvPr>
+          <p:cNvSpPr/>
+          <p:nvPr/>
+        </p:nvSpPr>
+        <p:spPr>
+          <a:xfrm>
+            <a:off x="6416473" y="6398686"/>
+            <a:ext cx="2317702" cy="307777"/>
+          </a:xfrm>
+          <a:prstGeom prst="rect">
+            <a:avLst/>
+          </a:prstGeom>
+          <a:solidFill>
+            <a:schemeClr val="accent4">
+              <a:lumMod val="20000"/>
+              <a:lumOff val="80000"/>
+            </a:schemeClr>
+          </a:solidFill>
+          <a:ln>
+            <a:solidFill>
+              <a:schemeClr val="accent4">
+                <a:lumMod val="60000"/>
+                <a:lumOff val="40000"/>
+              </a:schemeClr>
+            </a:solidFill>
+            <a:prstDash val="dash"/>
+          </a:ln>
+        </p:spPr>
+        <p:style>
+          <a:lnRef idx="2">
+            <a:schemeClr val="accent1">
+              <a:shade val="50000"/>
+            </a:schemeClr>
+          </a:lnRef>
+          <a:fillRef idx="1">
+            <a:schemeClr val="accent1"/>
+          </a:fillRef>
+          <a:effectRef idx="0">
+            <a:schemeClr val="accent1"/>
+          </a:effectRef>
+          <a:fontRef idx="minor">
+            <a:schemeClr val="lt1"/>
+          </a:fontRef>
+        </p:style>
+        <p:txBody>
+          <a:bodyPr rot="0" spcFirstLastPara="0" vertOverflow="overflow" horzOverflow="overflow" vert="horz" wrap="square" lIns="91440" tIns="45720" rIns="91440" bIns="45720" numCol="1" spcCol="0" rtlCol="0" fromWordArt="0" anchor="ctr" anchorCtr="0" forceAA="0" compatLnSpc="1">
+            <a:prstTxWarp prst="textNoShape">
+              <a:avLst/>
+            </a:prstTxWarp>
+            <a:noAutofit/>
+          </a:bodyPr>
+          <a:lstStyle/>
+          <a:p>
+            <a:r>
+              <a:rPr lang="en-US" sz="1100" dirty="0">
+                <a:solidFill>
+                  <a:schemeClr val="tx1"/>
+                </a:solidFill>
+                <a:latin typeface="Arial" panose="020B0604020202020204" pitchFamily="34" charset="0"/>
+                <a:cs typeface="Arial" panose="020B0604020202020204" pitchFamily="34" charset="0"/>
+              </a:rPr>
+              <a:t>Method 2: Use z/</a:t>
+            </a:r>
+            <a:r>
+              <a:rPr lang="en-US" sz="1100">
+                <a:solidFill>
+                  <a:schemeClr val="tx1"/>
+                </a:solidFill>
+                <a:latin typeface="Arial" panose="020B0604020202020204" pitchFamily="34" charset="0"/>
+                <a:cs typeface="Arial" panose="020B0604020202020204" pitchFamily="34" charset="0"/>
+              </a:rPr>
+              <a:t>OSMF Workflow</a:t>
+            </a:r>
+            <a:endParaRPr lang="en-US" sz="1100" dirty="0">
+              <a:solidFill>
+                <a:schemeClr val="tx1"/>
+              </a:solidFill>
+              <a:latin typeface="Arial" panose="020B0604020202020204" pitchFamily="34" charset="0"/>
+              <a:cs typeface="Arial" panose="020B0604020202020204" pitchFamily="34" charset="0"/>
+            </a:endParaRPr>
+          </a:p>
+        </p:txBody>
+      </p:sp>
+      <p:sp>
+        <p:nvSpPr>
+          <p:cNvPr id="68" name="Rectangle 67">
+            <a:extLst>
+              <a:ext uri="{FF2B5EF4-FFF2-40B4-BE49-F238E27FC236}">
+                <a16:creationId xmlns:a16="http://schemas.microsoft.com/office/drawing/2014/main" id="{D669B208-6833-D847-9550-91D3FC0D2ACA}"/>
+              </a:ext>
+            </a:extLst>
+          </p:cNvPr>
+          <p:cNvSpPr/>
+          <p:nvPr/>
+        </p:nvSpPr>
+        <p:spPr>
+          <a:xfrm>
+            <a:off x="2606340" y="9190501"/>
+            <a:ext cx="2474599" cy="503314"/>
+          </a:xfrm>
+          <a:prstGeom prst="rect">
+            <a:avLst/>
+          </a:prstGeom>
+          <a:solidFill>
+            <a:srgbClr val="DEECF8"/>
+          </a:solidFill>
+          <a:ln>
+            <a:solidFill>
+              <a:schemeClr val="accent5">
+                <a:lumMod val="60000"/>
+                <a:lumOff val="40000"/>
+              </a:schemeClr>
+            </a:solidFill>
+            <a:prstDash val="dash"/>
+          </a:ln>
+        </p:spPr>
+        <p:style>
+          <a:lnRef idx="2">
+            <a:schemeClr val="accent1">
+              <a:shade val="50000"/>
+            </a:schemeClr>
+          </a:lnRef>
+          <a:fillRef idx="1">
+            <a:schemeClr val="accent1"/>
+          </a:fillRef>
+          <a:effectRef idx="0">
+            <a:schemeClr val="accent1"/>
+          </a:effectRef>
+          <a:fontRef idx="minor">
+            <a:schemeClr val="lt1"/>
+          </a:fontRef>
+        </p:style>
+        <p:txBody>
+          <a:bodyPr rot="0" spcFirstLastPara="0" vertOverflow="overflow" horzOverflow="overflow" vert="horz" wrap="square" lIns="91440" tIns="45720" rIns="91440" bIns="45720" numCol="1" spcCol="0" rtlCol="0" fromWordArt="0" anchor="ctr" anchorCtr="0" forceAA="0" compatLnSpc="1">
+            <a:prstTxWarp prst="textNoShape">
+              <a:avLst/>
+            </a:prstTxWarp>
+            <a:noAutofit/>
+          </a:bodyPr>
+          <a:lstStyle/>
+          <a:p>
+            <a:r>
+              <a:rPr lang="en-US" sz="1100" dirty="0">
+                <a:solidFill>
+                  <a:schemeClr val="tx1"/>
+                </a:solidFill>
+                <a:latin typeface="Arial" panose="020B0604020202020204" pitchFamily="34" charset="0"/>
+                <a:cs typeface="Arial" panose="020B0604020202020204" pitchFamily="34" charset="0"/>
+              </a:rPr>
+              <a:t>Method 1: Use shell script </a:t>
+            </a:r>
+          </a:p>
+          <a:p>
+            <a:r>
+              <a:rPr lang="en-US" sz="1100" dirty="0">
+                <a:solidFill>
+                  <a:schemeClr val="accent1"/>
+                </a:solidFill>
+                <a:latin typeface="Arial" panose="020B0604020202020204" pitchFamily="34" charset="0"/>
+                <a:cs typeface="Arial" panose="020B0604020202020204" pitchFamily="34" charset="0"/>
+              </a:rPr>
+              <a:t>(Script: </a:t>
+            </a:r>
+            <a:r>
+              <a:rPr lang="en-US" sz="1100" dirty="0" err="1">
+                <a:solidFill>
+                  <a:schemeClr val="accent1"/>
+                </a:solidFill>
+                <a:latin typeface="Arial" panose="020B0604020202020204" pitchFamily="34" charset="0"/>
+                <a:cs typeface="Arial" panose="020B0604020202020204" pitchFamily="34" charset="0"/>
+              </a:rPr>
+              <a:t>zowe</a:t>
+            </a:r>
+            <a:r>
+              <a:rPr lang="en-US" sz="1100" dirty="0">
+                <a:solidFill>
+                  <a:schemeClr val="accent1"/>
+                </a:solidFill>
+                <a:latin typeface="Arial" panose="020B0604020202020204" pitchFamily="34" charset="0"/>
+                <a:cs typeface="Arial" panose="020B0604020202020204" pitchFamily="34" charset="0"/>
+              </a:rPr>
+              <a:t>-setup-</a:t>
+            </a:r>
+            <a:r>
+              <a:rPr lang="en-US" sz="1100" dirty="0" err="1">
+                <a:solidFill>
+                  <a:schemeClr val="accent1"/>
+                </a:solidFill>
+                <a:latin typeface="Arial" panose="020B0604020202020204" pitchFamily="34" charset="0"/>
+                <a:cs typeface="Arial" panose="020B0604020202020204" pitchFamily="34" charset="0"/>
+              </a:rPr>
+              <a:t>certificates.sh</a:t>
+            </a:r>
+            <a:r>
+              <a:rPr lang="en-US" sz="1100" dirty="0">
+                <a:solidFill>
+                  <a:schemeClr val="accent1"/>
+                </a:solidFill>
+                <a:latin typeface="Arial" panose="020B0604020202020204" pitchFamily="34" charset="0"/>
+                <a:cs typeface="Arial" panose="020B0604020202020204" pitchFamily="34" charset="0"/>
+              </a:rPr>
+              <a:t>)</a:t>
+            </a:r>
+          </a:p>
+        </p:txBody>
+      </p:sp>
+      <p:sp>
+        <p:nvSpPr>
+          <p:cNvPr id="69" name="Rectangle 68">
+            <a:extLst>
+              <a:ext uri="{FF2B5EF4-FFF2-40B4-BE49-F238E27FC236}">
+                <a16:creationId xmlns:a16="http://schemas.microsoft.com/office/drawing/2014/main" id="{58EED663-37F9-F245-802C-26BFB766AD91}"/>
+              </a:ext>
+            </a:extLst>
+          </p:cNvPr>
+          <p:cNvSpPr/>
+          <p:nvPr/>
+        </p:nvSpPr>
+        <p:spPr>
+          <a:xfrm>
+            <a:off x="5198304" y="9190431"/>
+            <a:ext cx="2361039" cy="499558"/>
+          </a:xfrm>
+          <a:prstGeom prst="rect">
+            <a:avLst/>
+          </a:prstGeom>
+          <a:solidFill>
+            <a:srgbClr val="DEECF8"/>
+          </a:solidFill>
+          <a:ln>
+            <a:solidFill>
+              <a:schemeClr val="accent5">
+                <a:lumMod val="60000"/>
+                <a:lumOff val="40000"/>
+              </a:schemeClr>
+            </a:solidFill>
+            <a:prstDash val="dash"/>
+          </a:ln>
+        </p:spPr>
+        <p:style>
+          <a:lnRef idx="2">
+            <a:schemeClr val="accent1">
+              <a:shade val="50000"/>
+            </a:schemeClr>
+          </a:lnRef>
+          <a:fillRef idx="1">
+            <a:schemeClr val="accent1"/>
+          </a:fillRef>
+          <a:effectRef idx="0">
+            <a:schemeClr val="accent1"/>
+          </a:effectRef>
+          <a:fontRef idx="minor">
+            <a:schemeClr val="lt1"/>
+          </a:fontRef>
+        </p:style>
+        <p:txBody>
+          <a:bodyPr rot="0" spcFirstLastPara="0" vertOverflow="overflow" horzOverflow="overflow" vert="horz" wrap="square" lIns="91440" tIns="45720" rIns="91440" bIns="45720" numCol="1" spcCol="0" rtlCol="0" fromWordArt="0" anchor="ctr" anchorCtr="0" forceAA="0" compatLnSpc="1">
+            <a:prstTxWarp prst="textNoShape">
+              <a:avLst/>
+            </a:prstTxWarp>
+            <a:noAutofit/>
+          </a:bodyPr>
+          <a:lstStyle/>
+          <a:p>
+            <a:r>
+              <a:rPr lang="en-US" sz="1100" dirty="0">
+                <a:solidFill>
+                  <a:schemeClr val="tx1"/>
+                </a:solidFill>
+                <a:latin typeface="Arial" panose="020B0604020202020204" pitchFamily="34" charset="0"/>
+                <a:cs typeface="Arial" panose="020B0604020202020204" pitchFamily="34" charset="0"/>
+              </a:rPr>
+              <a:t>Method 2: Use z/OSMF Workflow</a:t>
+            </a:r>
+          </a:p>
+        </p:txBody>
+      </p:sp>
+      <p:sp>
+        <p:nvSpPr>
+          <p:cNvPr id="73" name="Rectangle 72">
+            <a:extLst>
+              <a:ext uri="{FF2B5EF4-FFF2-40B4-BE49-F238E27FC236}">
+                <a16:creationId xmlns:a16="http://schemas.microsoft.com/office/drawing/2014/main" id="{0DD4F608-E798-6F4B-8A90-39D3F7736AB6}"/>
+              </a:ext>
+            </a:extLst>
+          </p:cNvPr>
+          <p:cNvSpPr/>
+          <p:nvPr/>
+        </p:nvSpPr>
+        <p:spPr>
+          <a:xfrm>
+            <a:off x="2580953" y="7729030"/>
+            <a:ext cx="2474599" cy="503314"/>
+          </a:xfrm>
+          <a:prstGeom prst="rect">
+            <a:avLst/>
+          </a:prstGeom>
+          <a:solidFill>
+            <a:srgbClr val="DEECF8"/>
+          </a:solidFill>
+          <a:ln>
+            <a:solidFill>
+              <a:schemeClr val="accent5">
+                <a:lumMod val="60000"/>
+                <a:lumOff val="40000"/>
+              </a:schemeClr>
+            </a:solidFill>
+            <a:prstDash val="dash"/>
+          </a:ln>
+        </p:spPr>
+        <p:style>
+          <a:lnRef idx="2">
+            <a:schemeClr val="accent1">
+              <a:shade val="50000"/>
+            </a:schemeClr>
+          </a:lnRef>
+          <a:fillRef idx="1">
+            <a:schemeClr val="accent1"/>
+          </a:fillRef>
+          <a:effectRef idx="0">
+            <a:schemeClr val="accent1"/>
+          </a:effectRef>
+          <a:fontRef idx="minor">
+            <a:schemeClr val="lt1"/>
+          </a:fontRef>
+        </p:style>
+        <p:txBody>
+          <a:bodyPr rot="0" spcFirstLastPara="0" vertOverflow="overflow" horzOverflow="overflow" vert="horz" wrap="square" lIns="91440" tIns="45720" rIns="91440" bIns="45720" numCol="1" spcCol="0" rtlCol="0" fromWordArt="0" anchor="ctr" anchorCtr="0" forceAA="0" compatLnSpc="1">
+            <a:prstTxWarp prst="textNoShape">
+              <a:avLst/>
+            </a:prstTxWarp>
+            <a:noAutofit/>
+          </a:bodyPr>
+          <a:lstStyle/>
+          <a:p>
+            <a:pPr algn="ctr"/>
+            <a:r>
+              <a:rPr lang="en-US" sz="1100" dirty="0">
+                <a:solidFill>
+                  <a:schemeClr val="tx1"/>
+                </a:solidFill>
+                <a:latin typeface="Arial" panose="020B0604020202020204" pitchFamily="34" charset="0"/>
+                <a:cs typeface="Arial" panose="020B0604020202020204" pitchFamily="34" charset="0"/>
+              </a:rPr>
+              <a:t>Method 1: Use JCL</a:t>
+            </a:r>
+          </a:p>
+          <a:p>
+            <a:pPr algn="ctr"/>
+            <a:r>
+              <a:rPr lang="en-US" sz="1100" dirty="0">
+                <a:solidFill>
+                  <a:schemeClr val="accent1"/>
+                </a:solidFill>
+                <a:latin typeface="Arial" panose="020B0604020202020204" pitchFamily="34" charset="0"/>
+                <a:cs typeface="Arial" panose="020B0604020202020204" pitchFamily="34" charset="0"/>
+              </a:rPr>
+              <a:t>(JCL: ZWESECUR)</a:t>
+            </a:r>
+          </a:p>
+        </p:txBody>
+      </p:sp>
+      <p:sp>
+        <p:nvSpPr>
+          <p:cNvPr id="74" name="Rectangle 73">
+            <a:extLst>
+              <a:ext uri="{FF2B5EF4-FFF2-40B4-BE49-F238E27FC236}">
+                <a16:creationId xmlns:a16="http://schemas.microsoft.com/office/drawing/2014/main" id="{7E0FAF8F-3D46-0F4E-9992-07F484E98B22}"/>
+              </a:ext>
+            </a:extLst>
+          </p:cNvPr>
+          <p:cNvSpPr/>
+          <p:nvPr/>
+        </p:nvSpPr>
+        <p:spPr>
+          <a:xfrm>
+            <a:off x="5157766" y="7719511"/>
+            <a:ext cx="2401577" cy="509885"/>
+          </a:xfrm>
+          <a:prstGeom prst="rect">
+            <a:avLst/>
+          </a:prstGeom>
+          <a:solidFill>
+            <a:srgbClr val="DEECF8"/>
+          </a:solidFill>
+          <a:ln>
+            <a:solidFill>
+              <a:schemeClr val="accent5">
+                <a:lumMod val="60000"/>
+                <a:lumOff val="40000"/>
+              </a:schemeClr>
+            </a:solidFill>
+            <a:prstDash val="dash"/>
+          </a:ln>
+        </p:spPr>
+        <p:style>
+          <a:lnRef idx="2">
+            <a:schemeClr val="accent1">
+              <a:shade val="50000"/>
+            </a:schemeClr>
+          </a:lnRef>
+          <a:fillRef idx="1">
+            <a:schemeClr val="accent1"/>
+          </a:fillRef>
+          <a:effectRef idx="0">
+            <a:schemeClr val="accent1"/>
+          </a:effectRef>
+          <a:fontRef idx="minor">
+            <a:schemeClr val="lt1"/>
+          </a:fontRef>
+        </p:style>
+        <p:txBody>
+          <a:bodyPr rot="0" spcFirstLastPara="0" vertOverflow="overflow" horzOverflow="overflow" vert="horz" wrap="square" lIns="91440" tIns="45720" rIns="91440" bIns="45720" numCol="1" spcCol="0" rtlCol="0" fromWordArt="0" anchor="ctr" anchorCtr="0" forceAA="0" compatLnSpc="1">
+            <a:prstTxWarp prst="textNoShape">
+              <a:avLst/>
+            </a:prstTxWarp>
+            <a:noAutofit/>
+          </a:bodyPr>
+          <a:lstStyle/>
+          <a:p>
+            <a:r>
+              <a:rPr lang="en-US" sz="1100" dirty="0">
+                <a:solidFill>
+                  <a:schemeClr val="tx1"/>
+                </a:solidFill>
+                <a:latin typeface="Arial" panose="020B0604020202020204" pitchFamily="34" charset="0"/>
+                <a:cs typeface="Arial" panose="020B0604020202020204" pitchFamily="34" charset="0"/>
+              </a:rPr>
+              <a:t>Method 2: Use z/OSMF Workflow</a:t>
+            </a:r>
+          </a:p>
+        </p:txBody>
+      </p:sp>
+      <p:sp>
+        <p:nvSpPr>
+          <p:cNvPr id="76" name="Rectangle 75">
+            <a:extLst>
+              <a:ext uri="{FF2B5EF4-FFF2-40B4-BE49-F238E27FC236}">
+                <a16:creationId xmlns:a16="http://schemas.microsoft.com/office/drawing/2014/main" id="{EE3CF47B-5654-8745-9DF1-4AB8E56948E3}"/>
+              </a:ext>
+            </a:extLst>
+          </p:cNvPr>
+          <p:cNvSpPr/>
+          <p:nvPr/>
+        </p:nvSpPr>
+        <p:spPr>
+          <a:xfrm>
+            <a:off x="2626120" y="10471949"/>
+            <a:ext cx="2474599" cy="503314"/>
+          </a:xfrm>
+          <a:prstGeom prst="rect">
+            <a:avLst/>
+          </a:prstGeom>
+          <a:solidFill>
+            <a:srgbClr val="DEECF8"/>
+          </a:solidFill>
+          <a:ln>
+            <a:solidFill>
+              <a:schemeClr val="accent5">
+                <a:lumMod val="60000"/>
+                <a:lumOff val="40000"/>
+              </a:schemeClr>
+            </a:solidFill>
+            <a:prstDash val="dash"/>
+          </a:ln>
+        </p:spPr>
+        <p:style>
+          <a:lnRef idx="2">
+            <a:schemeClr val="accent1">
+              <a:shade val="50000"/>
+            </a:schemeClr>
+          </a:lnRef>
+          <a:fillRef idx="1">
+            <a:schemeClr val="accent1"/>
+          </a:fillRef>
+          <a:effectRef idx="0">
+            <a:schemeClr val="accent1"/>
+          </a:effectRef>
+          <a:fontRef idx="minor">
+            <a:schemeClr val="lt1"/>
+          </a:fontRef>
+        </p:style>
+        <p:txBody>
+          <a:bodyPr rot="0" spcFirstLastPara="0" vertOverflow="overflow" horzOverflow="overflow" vert="horz" wrap="square" lIns="91440" tIns="45720" rIns="91440" bIns="45720" numCol="1" spcCol="0" rtlCol="0" fromWordArt="0" anchor="ctr" anchorCtr="0" forceAA="0" compatLnSpc="1">
+            <a:prstTxWarp prst="textNoShape">
+              <a:avLst/>
+            </a:prstTxWarp>
+            <a:noAutofit/>
+          </a:bodyPr>
+          <a:lstStyle/>
+          <a:p>
+            <a:r>
+              <a:rPr lang="en-US" sz="1100" dirty="0">
+                <a:solidFill>
+                  <a:schemeClr val="tx1"/>
+                </a:solidFill>
+                <a:latin typeface="Arial" panose="020B0604020202020204" pitchFamily="34" charset="0"/>
+                <a:cs typeface="Arial" panose="020B0604020202020204" pitchFamily="34" charset="0"/>
+              </a:rPr>
+              <a:t>Method 1: Use shell script </a:t>
+            </a:r>
+          </a:p>
+          <a:p>
+            <a:r>
+              <a:rPr lang="en-US" sz="1100" dirty="0">
+                <a:solidFill>
+                  <a:schemeClr val="accent1"/>
+                </a:solidFill>
+                <a:latin typeface="Arial" panose="020B0604020202020204" pitchFamily="34" charset="0"/>
+                <a:cs typeface="Arial" panose="020B0604020202020204" pitchFamily="34" charset="0"/>
+              </a:rPr>
+              <a:t>(Script: </a:t>
+            </a:r>
+            <a:r>
+              <a:rPr lang="en-US" sz="1100" dirty="0" err="1">
+                <a:solidFill>
+                  <a:schemeClr val="accent1"/>
+                </a:solidFill>
+                <a:latin typeface="Arial" panose="020B0604020202020204" pitchFamily="34" charset="0"/>
+                <a:cs typeface="Arial" panose="020B0604020202020204" pitchFamily="34" charset="0"/>
+              </a:rPr>
+              <a:t>zowe</a:t>
+            </a:r>
+            <a:r>
+              <a:rPr lang="en-US" sz="1100" dirty="0">
+                <a:solidFill>
+                  <a:schemeClr val="accent1"/>
+                </a:solidFill>
+                <a:latin typeface="Arial" panose="020B0604020202020204" pitchFamily="34" charset="0"/>
+                <a:cs typeface="Arial" panose="020B0604020202020204" pitchFamily="34" charset="0"/>
+              </a:rPr>
+              <a:t>-configure-</a:t>
+            </a:r>
+            <a:r>
+              <a:rPr lang="en-US" sz="1100" dirty="0" err="1">
+                <a:solidFill>
+                  <a:schemeClr val="accent1"/>
+                </a:solidFill>
+                <a:latin typeface="Arial" panose="020B0604020202020204" pitchFamily="34" charset="0"/>
+                <a:cs typeface="Arial" panose="020B0604020202020204" pitchFamily="34" charset="0"/>
+              </a:rPr>
+              <a:t>instance.sh</a:t>
+            </a:r>
+            <a:r>
+              <a:rPr lang="en-US" sz="1100" dirty="0">
+                <a:solidFill>
+                  <a:schemeClr val="accent1"/>
+                </a:solidFill>
+                <a:latin typeface="Arial" panose="020B0604020202020204" pitchFamily="34" charset="0"/>
+                <a:cs typeface="Arial" panose="020B0604020202020204" pitchFamily="34" charset="0"/>
+              </a:rPr>
+              <a:t>)</a:t>
+            </a:r>
+          </a:p>
+        </p:txBody>
+      </p:sp>
+      <p:sp>
+        <p:nvSpPr>
+          <p:cNvPr id="77" name="Rectangle 76">
+            <a:extLst>
+              <a:ext uri="{FF2B5EF4-FFF2-40B4-BE49-F238E27FC236}">
+                <a16:creationId xmlns:a16="http://schemas.microsoft.com/office/drawing/2014/main" id="{72BA429A-185B-6542-80B5-60AC80328BC4}"/>
+              </a:ext>
+            </a:extLst>
+          </p:cNvPr>
+          <p:cNvSpPr/>
+          <p:nvPr/>
+        </p:nvSpPr>
+        <p:spPr>
+          <a:xfrm>
+            <a:off x="5220394" y="10469144"/>
+            <a:ext cx="2338949" cy="515061"/>
+          </a:xfrm>
+          <a:prstGeom prst="rect">
+            <a:avLst/>
+          </a:prstGeom>
+          <a:solidFill>
+            <a:srgbClr val="DEECF8"/>
+          </a:solidFill>
+          <a:ln>
+            <a:solidFill>
+              <a:schemeClr val="accent5">
+                <a:lumMod val="60000"/>
+                <a:lumOff val="40000"/>
+              </a:schemeClr>
+            </a:solidFill>
+            <a:prstDash val="dash"/>
+          </a:ln>
+        </p:spPr>
+        <p:style>
+          <a:lnRef idx="2">
+            <a:schemeClr val="accent1">
+              <a:shade val="50000"/>
+            </a:schemeClr>
+          </a:lnRef>
+          <a:fillRef idx="1">
+            <a:schemeClr val="accent1"/>
+          </a:fillRef>
+          <a:effectRef idx="0">
+            <a:schemeClr val="accent1"/>
+          </a:effectRef>
+          <a:fontRef idx="minor">
+            <a:schemeClr val="lt1"/>
+          </a:fontRef>
+        </p:style>
+        <p:txBody>
+          <a:bodyPr rot="0" spcFirstLastPara="0" vertOverflow="overflow" horzOverflow="overflow" vert="horz" wrap="square" lIns="91440" tIns="45720" rIns="91440" bIns="45720" numCol="1" spcCol="0" rtlCol="0" fromWordArt="0" anchor="ctr" anchorCtr="0" forceAA="0" compatLnSpc="1">
+            <a:prstTxWarp prst="textNoShape">
+              <a:avLst/>
+            </a:prstTxWarp>
+            <a:noAutofit/>
+          </a:bodyPr>
+          <a:lstStyle/>
+          <a:p>
+            <a:r>
+              <a:rPr lang="en-US" sz="1100" dirty="0">
+                <a:solidFill>
+                  <a:schemeClr val="tx1"/>
+                </a:solidFill>
+                <a:latin typeface="Arial" panose="020B0604020202020204" pitchFamily="34" charset="0"/>
+                <a:cs typeface="Arial" panose="020B0604020202020204" pitchFamily="34" charset="0"/>
+              </a:rPr>
+              <a:t>Method 2: Use z/OSMF Workflow</a:t>
+            </a:r>
+          </a:p>
+        </p:txBody>
+      </p:sp>
+      <p:cxnSp>
+        <p:nvCxnSpPr>
+          <p:cNvPr id="60" name="Straight Arrow Connector 59">
+            <a:extLst>
+              <a:ext uri="{FF2B5EF4-FFF2-40B4-BE49-F238E27FC236}">
+                <a16:creationId xmlns:a16="http://schemas.microsoft.com/office/drawing/2014/main" id="{80584741-C0CA-8844-A96F-8DFB5F6261FA}"/>
+              </a:ext>
+            </a:extLst>
+          </p:cNvPr>
+          <p:cNvCxnSpPr>
+            <a:cxnSpLocks/>
+          </p:cNvCxnSpPr>
+          <p:nvPr/>
+        </p:nvCxnSpPr>
+        <p:spPr>
+          <a:xfrm>
+            <a:off x="5084556" y="9829410"/>
+            <a:ext cx="0" cy="340330"/>
+          </a:xfrm>
+          <a:prstGeom prst="straightConnector1">
+            <a:avLst/>
+          </a:prstGeom>
+          <a:ln>
+            <a:solidFill>
+              <a:schemeClr val="tx1">
+                <a:lumMod val="50000"/>
+                <a:lumOff val="50000"/>
+              </a:schemeClr>
+            </a:solidFill>
+            <a:tailEnd type="triangle"/>
+          </a:ln>
+        </p:spPr>
+        <p:style>
+          <a:lnRef idx="1">
+            <a:schemeClr val="accent1"/>
+          </a:lnRef>
+          <a:fillRef idx="0">
+            <a:schemeClr val="accent1"/>
+          </a:fillRef>
+          <a:effectRef idx="0">
+            <a:schemeClr val="accent1"/>
+          </a:effectRef>
+          <a:fontRef idx="minor">
+            <a:schemeClr val="tx1"/>
+          </a:fontRef>
+        </p:style>
+      </p:cxnSp>
+      <p:cxnSp>
+        <p:nvCxnSpPr>
+          <p:cNvPr id="61" name="Straight Arrow Connector 60">
+            <a:extLst>
+              <a:ext uri="{FF2B5EF4-FFF2-40B4-BE49-F238E27FC236}">
+                <a16:creationId xmlns:a16="http://schemas.microsoft.com/office/drawing/2014/main" id="{1428AE51-8321-614B-9F78-E711328B7082}"/>
+              </a:ext>
+            </a:extLst>
+          </p:cNvPr>
+          <p:cNvCxnSpPr>
+            <a:cxnSpLocks/>
+          </p:cNvCxnSpPr>
+          <p:nvPr/>
+        </p:nvCxnSpPr>
+        <p:spPr>
+          <a:xfrm>
+            <a:off x="5056339" y="11077014"/>
+            <a:ext cx="0" cy="340330"/>
+          </a:xfrm>
+          <a:prstGeom prst="straightConnector1">
+            <a:avLst/>
+          </a:prstGeom>
+          <a:ln>
+            <a:solidFill>
+              <a:schemeClr val="tx1">
+                <a:lumMod val="50000"/>
+                <a:lumOff val="50000"/>
+              </a:schemeClr>
+            </a:solidFill>
+            <a:tailEnd type="triangle"/>
+          </a:ln>
+        </p:spPr>
+        <p:style>
+          <a:lnRef idx="1">
+            <a:schemeClr val="accent1"/>
+          </a:lnRef>
+          <a:fillRef idx="0">
+            <a:schemeClr val="accent1"/>
+          </a:fillRef>
+          <a:effectRef idx="0">
+            <a:schemeClr val="accent1"/>
+          </a:effectRef>
+          <a:fontRef idx="minor">
+            <a:schemeClr val="tx1"/>
+          </a:fontRef>
+        </p:style>
+      </p:cxnSp>
+      <p:cxnSp>
+        <p:nvCxnSpPr>
+          <p:cNvPr id="79" name="Straight Arrow Connector 78">
+            <a:extLst>
+              <a:ext uri="{FF2B5EF4-FFF2-40B4-BE49-F238E27FC236}">
+                <a16:creationId xmlns:a16="http://schemas.microsoft.com/office/drawing/2014/main" id="{90624AB8-1AEC-0B4E-9CB1-79D29B4301AE}"/>
+              </a:ext>
+            </a:extLst>
+          </p:cNvPr>
+          <p:cNvCxnSpPr>
+            <a:cxnSpLocks/>
+          </p:cNvCxnSpPr>
+          <p:nvPr/>
+        </p:nvCxnSpPr>
+        <p:spPr>
+          <a:xfrm>
+            <a:off x="5040312" y="12125963"/>
+            <a:ext cx="0" cy="340330"/>
+          </a:xfrm>
+          <a:prstGeom prst="straightConnector1">
+            <a:avLst/>
+          </a:prstGeom>
+          <a:ln>
+            <a:solidFill>
+              <a:schemeClr val="tx1">
+                <a:lumMod val="50000"/>
+                <a:lumOff val="50000"/>
+              </a:schemeClr>
+            </a:solidFill>
+            <a:tailEnd type="triangle"/>
+          </a:ln>
+        </p:spPr>
+        <p:style>
+          <a:lnRef idx="1">
+            <a:schemeClr val="accent1"/>
+          </a:lnRef>
+          <a:fillRef idx="0">
+            <a:schemeClr val="accent1"/>
+          </a:fillRef>
+          <a:effectRef idx="0">
+            <a:schemeClr val="accent1"/>
+          </a:effectRef>
+          <a:fontRef idx="minor">
+            <a:schemeClr val="tx1"/>
+          </a:fontRef>
+        </p:style>
+      </p:cxnSp>
+      <p:cxnSp>
+        <p:nvCxnSpPr>
+          <p:cNvPr id="80" name="Straight Arrow Connector 79">
+            <a:extLst>
+              <a:ext uri="{FF2B5EF4-FFF2-40B4-BE49-F238E27FC236}">
+                <a16:creationId xmlns:a16="http://schemas.microsoft.com/office/drawing/2014/main" id="{30184696-6146-BE47-B491-F25D60E7D167}"/>
+              </a:ext>
+            </a:extLst>
+          </p:cNvPr>
+          <p:cNvCxnSpPr>
+            <a:cxnSpLocks/>
+          </p:cNvCxnSpPr>
+          <p:nvPr/>
+        </p:nvCxnSpPr>
+        <p:spPr>
+          <a:xfrm>
+            <a:off x="5026843" y="13096195"/>
+            <a:ext cx="0" cy="464090"/>
+          </a:xfrm>
+          <a:prstGeom prst="straightConnector1">
+            <a:avLst/>
+          </a:prstGeom>
+          <a:ln>
+            <a:solidFill>
+              <a:schemeClr val="tx1">
+                <a:lumMod val="50000"/>
+                <a:lumOff val="50000"/>
+              </a:schemeClr>
+            </a:solidFill>
+            <a:tailEnd type="triangle"/>
+          </a:ln>
+        </p:spPr>
+        <p:style>
+          <a:lnRef idx="1">
+            <a:schemeClr val="accent1"/>
+          </a:lnRef>
+          <a:fillRef idx="0">
+            <a:schemeClr val="accent1"/>
+          </a:fillRef>
+          <a:effectRef idx="0">
+            <a:schemeClr val="accent1"/>
+          </a:effectRef>
+          <a:fontRef idx="minor">
+            <a:schemeClr val="tx1"/>
+          </a:fontRef>
+        </p:style>
+      </p:cxnSp>
     </p:spTree>
     <p:extLst>
       <p:ext uri="{BB962C8B-B14F-4D97-AF65-F5344CB8AC3E}">
-        <p14:creationId xmlns:p14="http://schemas.microsoft.com/office/powerpoint/2010/main" val="2407308635"/>
+        <p14:creationId xmlns:p14="http://schemas.microsoft.com/office/powerpoint/2010/main" val="960402841"/>
       </p:ext>
     </p:extLst>
   </p:cSld>

</xml_diff>

<commit_message>
Update wording in diagram
Signed-off-by: nannanli <nannanli@cn.ibm.com>
</commit_message>
<xml_diff>
--- a/docs/images/common/zowe-zos-install-diagram.pptx
+++ b/docs/images/common/zowe-zos-install-diagram.pptx
@@ -10038,6 +10038,39 @@
               <a:t>Configure cross memory server</a:t>
             </a:r>
           </a:p>
+          <a:p>
+            <a:pPr algn="ctr"/>
+            <a:r>
+              <a:rPr lang="en-US" sz="1100" dirty="0">
+                <a:solidFill>
+                  <a:schemeClr val="tx1"/>
+                </a:solidFill>
+                <a:latin typeface="Arial" panose="020B0604020202020204" pitchFamily="34" charset="0"/>
+                <a:cs typeface="Arial" panose="020B0604020202020204" pitchFamily="34" charset="0"/>
+              </a:rPr>
+              <a:t>(</a:t>
+            </a:r>
+            <a:r>
+              <a:rPr lang="en-US" sz="1100" b="1" dirty="0">
+                <a:solidFill>
+                  <a:schemeClr val="tx1"/>
+                </a:solidFill>
+                <a:latin typeface="Arial" panose="020B0604020202020204" pitchFamily="34" charset="0"/>
+                <a:cs typeface="Arial" panose="020B0604020202020204" pitchFamily="34" charset="0"/>
+              </a:rPr>
+              <a:t>Workflow in progress, use script instead</a:t>
+            </a:r>
+            <a:r>
+              <a:rPr lang="en-US" sz="1100" dirty="0">
+                <a:solidFill>
+                  <a:schemeClr val="tx1"/>
+                </a:solidFill>
+                <a:latin typeface="Arial" panose="020B0604020202020204" pitchFamily="34" charset="0"/>
+                <a:cs typeface="Arial" panose="020B0604020202020204" pitchFamily="34" charset="0"/>
+              </a:rPr>
+              <a:t>)</a:t>
+            </a:r>
+          </a:p>
         </p:txBody>
       </p:sp>
       <p:sp>

</xml_diff>

<commit_message>
Update presentation to fix alignment
Signed-off-by: stevenhorsman <steven@uk.ibm.com>
</commit_message>
<xml_diff>
--- a/docs/images/common/zowe-zos-install-diagram.pptx
+++ b/docs/images/common/zowe-zos-install-diagram.pptx
@@ -244,7 +244,7 @@
           <a:p>
             <a:fld id="{C4A90A56-7146-D847-92E1-256101539D4D}" type="datetimeFigureOut">
               <a:rPr lang="en-US" smtClean="0"/>
-              <a:t>5/28/20</a:t>
+              <a:t>6/1/20</a:t>
             </a:fld>
             <a:endParaRPr lang="en-US"/>
           </a:p>
@@ -414,7 +414,7 @@
           <a:p>
             <a:fld id="{C4A90A56-7146-D847-92E1-256101539D4D}" type="datetimeFigureOut">
               <a:rPr lang="en-US" smtClean="0"/>
-              <a:t>5/28/20</a:t>
+              <a:t>6/1/20</a:t>
             </a:fld>
             <a:endParaRPr lang="en-US"/>
           </a:p>
@@ -594,7 +594,7 @@
           <a:p>
             <a:fld id="{C4A90A56-7146-D847-92E1-256101539D4D}" type="datetimeFigureOut">
               <a:rPr lang="en-US" smtClean="0"/>
-              <a:t>5/28/20</a:t>
+              <a:t>6/1/20</a:t>
             </a:fld>
             <a:endParaRPr lang="en-US"/>
           </a:p>
@@ -764,7 +764,7 @@
           <a:p>
             <a:fld id="{C4A90A56-7146-D847-92E1-256101539D4D}" type="datetimeFigureOut">
               <a:rPr lang="en-US" smtClean="0"/>
-              <a:t>5/28/20</a:t>
+              <a:t>6/1/20</a:t>
             </a:fld>
             <a:endParaRPr lang="en-US"/>
           </a:p>
@@ -1008,7 +1008,7 @@
           <a:p>
             <a:fld id="{C4A90A56-7146-D847-92E1-256101539D4D}" type="datetimeFigureOut">
               <a:rPr lang="en-US" smtClean="0"/>
-              <a:t>5/28/20</a:t>
+              <a:t>6/1/20</a:t>
             </a:fld>
             <a:endParaRPr lang="en-US"/>
           </a:p>
@@ -1240,7 +1240,7 @@
           <a:p>
             <a:fld id="{C4A90A56-7146-D847-92E1-256101539D4D}" type="datetimeFigureOut">
               <a:rPr lang="en-US" smtClean="0"/>
-              <a:t>5/28/20</a:t>
+              <a:t>6/1/20</a:t>
             </a:fld>
             <a:endParaRPr lang="en-US"/>
           </a:p>
@@ -1607,7 +1607,7 @@
           <a:p>
             <a:fld id="{C4A90A56-7146-D847-92E1-256101539D4D}" type="datetimeFigureOut">
               <a:rPr lang="en-US" smtClean="0"/>
-              <a:t>5/28/20</a:t>
+              <a:t>6/1/20</a:t>
             </a:fld>
             <a:endParaRPr lang="en-US"/>
           </a:p>
@@ -1725,7 +1725,7 @@
           <a:p>
             <a:fld id="{C4A90A56-7146-D847-92E1-256101539D4D}" type="datetimeFigureOut">
               <a:rPr lang="en-US" smtClean="0"/>
-              <a:t>5/28/20</a:t>
+              <a:t>6/1/20</a:t>
             </a:fld>
             <a:endParaRPr lang="en-US"/>
           </a:p>
@@ -1820,7 +1820,7 @@
           <a:p>
             <a:fld id="{C4A90A56-7146-D847-92E1-256101539D4D}" type="datetimeFigureOut">
               <a:rPr lang="en-US" smtClean="0"/>
-              <a:t>5/28/20</a:t>
+              <a:t>6/1/20</a:t>
             </a:fld>
             <a:endParaRPr lang="en-US"/>
           </a:p>
@@ -2097,7 +2097,7 @@
           <a:p>
             <a:fld id="{C4A90A56-7146-D847-92E1-256101539D4D}" type="datetimeFigureOut">
               <a:rPr lang="en-US" smtClean="0"/>
-              <a:t>5/28/20</a:t>
+              <a:t>6/1/20</a:t>
             </a:fld>
             <a:endParaRPr lang="en-US"/>
           </a:p>
@@ -2354,7 +2354,7 @@
           <a:p>
             <a:fld id="{C4A90A56-7146-D847-92E1-256101539D4D}" type="datetimeFigureOut">
               <a:rPr lang="en-US" smtClean="0"/>
-              <a:t>5/28/20</a:t>
+              <a:t>6/1/20</a:t>
             </a:fld>
             <a:endParaRPr lang="en-US"/>
           </a:p>
@@ -2567,7 +2567,7 @@
           <a:p>
             <a:fld id="{C4A90A56-7146-D847-92E1-256101539D4D}" type="datetimeFigureOut">
               <a:rPr lang="en-US" smtClean="0"/>
-              <a:t>5/28/20</a:t>
+              <a:t>6/1/20</a:t>
             </a:fld>
             <a:endParaRPr lang="en-US"/>
           </a:p>
@@ -7405,7 +7405,7 @@
         </p:nvSpPr>
         <p:spPr>
           <a:xfrm>
-            <a:off x="5058540" y="2003074"/>
+            <a:off x="5058540" y="1903058"/>
             <a:ext cx="180000" cy="180000"/>
           </a:xfrm>
           <a:prstGeom prst="ellipse">
@@ -7465,7 +7465,7 @@
         </p:nvSpPr>
         <p:spPr>
           <a:xfrm>
-            <a:off x="5193732" y="1951488"/>
+            <a:off x="5193732" y="1851472"/>
             <a:ext cx="2219327" cy="307777"/>
           </a:xfrm>
           <a:prstGeom prst="rect">
@@ -7503,7 +7503,7 @@
         </p:nvSpPr>
         <p:spPr>
           <a:xfrm>
-            <a:off x="4167217" y="2399616"/>
+            <a:off x="4167217" y="2299600"/>
             <a:ext cx="1958008" cy="558971"/>
           </a:xfrm>
           <a:prstGeom prst="rect">
@@ -7574,7 +7574,7 @@
         </p:nvSpPr>
         <p:spPr>
           <a:xfrm>
-            <a:off x="3895114" y="3249168"/>
+            <a:off x="3895114" y="3149152"/>
             <a:ext cx="2559738" cy="809368"/>
           </a:xfrm>
           <a:prstGeom prst="diamond">
@@ -7639,7 +7639,7 @@
         </p:nvSpPr>
         <p:spPr>
           <a:xfrm>
-            <a:off x="6913585" y="3947972"/>
+            <a:off x="6913585" y="3847956"/>
             <a:ext cx="2243289" cy="558971"/>
           </a:xfrm>
           <a:prstGeom prst="rect">
@@ -7710,7 +7710,7 @@
         </p:nvSpPr>
         <p:spPr>
           <a:xfrm>
-            <a:off x="1752228" y="4058265"/>
+            <a:off x="1790098" y="3843937"/>
             <a:ext cx="2250655" cy="558971"/>
           </a:xfrm>
           <a:prstGeom prst="rect">
@@ -7781,7 +7781,7 @@
         </p:nvSpPr>
         <p:spPr>
           <a:xfrm>
-            <a:off x="6913585" y="4833676"/>
+            <a:off x="6913585" y="4676508"/>
             <a:ext cx="2243285" cy="558971"/>
           </a:xfrm>
           <a:prstGeom prst="rect">
@@ -7852,7 +7852,7 @@
         </p:nvSpPr>
         <p:spPr>
           <a:xfrm>
-            <a:off x="5878264" y="6550342"/>
+            <a:off x="5878264" y="6393174"/>
             <a:ext cx="1680319" cy="738730"/>
           </a:xfrm>
           <a:prstGeom prst="rect">
@@ -7943,7 +7943,7 @@
         </p:nvSpPr>
         <p:spPr>
           <a:xfrm>
-            <a:off x="726470" y="6531503"/>
+            <a:off x="726470" y="6374335"/>
             <a:ext cx="1750668" cy="757568"/>
           </a:xfrm>
           <a:prstGeom prst="rect">
@@ -8016,7 +8016,7 @@
         </p:nvCxnSpPr>
         <p:spPr>
           <a:xfrm>
-            <a:off x="5147734" y="2958584"/>
+            <a:off x="5147734" y="2858568"/>
             <a:ext cx="0" cy="262924"/>
           </a:xfrm>
           <a:prstGeom prst="straightConnector1">
@@ -8061,7 +8061,7 @@
         </p:nvSpPr>
         <p:spPr>
           <a:xfrm>
-            <a:off x="2848839" y="3385472"/>
+            <a:off x="2848839" y="3285456"/>
             <a:ext cx="1365668" cy="261610"/>
           </a:xfrm>
           <a:prstGeom prst="rect">
@@ -8139,7 +8139,7 @@
         </p:nvSpPr>
         <p:spPr>
           <a:xfrm>
-            <a:off x="6545505" y="3385472"/>
+            <a:off x="6545505" y="3285456"/>
             <a:ext cx="1682987" cy="261610"/>
           </a:xfrm>
           <a:prstGeom prst="rect">
@@ -8217,8 +8217,8 @@
         </p:nvSpPr>
         <p:spPr>
           <a:xfrm>
-            <a:off x="1605873" y="10919218"/>
-            <a:ext cx="3994790" cy="706829"/>
+            <a:off x="729127" y="10890000"/>
+            <a:ext cx="4651138" cy="637200"/>
           </a:xfrm>
           <a:prstGeom prst="rect">
             <a:avLst/>
@@ -8451,7 +8451,7 @@
         </p:nvSpPr>
         <p:spPr>
           <a:xfrm>
-            <a:off x="5352768" y="11782362"/>
+            <a:off x="5122752" y="12677866"/>
             <a:ext cx="1047242" cy="660202"/>
           </a:xfrm>
           <a:prstGeom prst="rect">
@@ -8552,8 +8552,8 @@
         </p:nvSpPr>
         <p:spPr>
           <a:xfrm>
-            <a:off x="1605874" y="11969292"/>
-            <a:ext cx="3994789" cy="555226"/>
+            <a:off x="735231" y="12870000"/>
+            <a:ext cx="4651139" cy="555226"/>
           </a:xfrm>
           <a:prstGeom prst="rect">
             <a:avLst/>
@@ -8756,8 +8756,8 @@
         </p:nvSpPr>
         <p:spPr>
           <a:xfrm>
-            <a:off x="1605874" y="13994393"/>
-            <a:ext cx="3994788" cy="660202"/>
+            <a:off x="729127" y="13765789"/>
+            <a:ext cx="4663349" cy="637200"/>
           </a:xfrm>
           <a:prstGeom prst="rect">
             <a:avLst/>
@@ -8808,7 +8808,7 @@
                 <a:latin typeface="Arial" panose="020B0604020202020204" pitchFamily="34" charset="0"/>
                 <a:cs typeface="Arial" panose="020B0604020202020204" pitchFamily="34" charset="0"/>
               </a:rPr>
-              <a:t>Install</a:t>
+              <a:t>Install and start</a:t>
             </a:r>
             <a:r>
               <a:rPr lang="zh-CN" altLang="en-US" sz="1100" dirty="0">
@@ -8888,7 +8888,7 @@
                 <a:latin typeface="Arial" panose="020B0604020202020204" pitchFamily="34" charset="0"/>
                 <a:cs typeface="Arial" panose="020B0604020202020204" pitchFamily="34" charset="0"/>
               </a:rPr>
-              <a:t>task ZWESVSTC</a:t>
+              <a:t>task, ZWESVSTC</a:t>
             </a:r>
           </a:p>
           <a:p>
@@ -8980,8 +8980,8 @@
         </p:nvSpPr>
         <p:spPr>
           <a:xfrm>
-            <a:off x="1605874" y="12815197"/>
-            <a:ext cx="3994789" cy="864184"/>
+            <a:off x="735231" y="11880000"/>
+            <a:ext cx="4651142" cy="637200"/>
           </a:xfrm>
           <a:prstGeom prst="rect">
             <a:avLst/>
@@ -9065,7 +9065,7 @@
                 <a:latin typeface="Arial" panose="020B0604020202020204" pitchFamily="34" charset="0"/>
                 <a:cs typeface="Arial" panose="020B0604020202020204" pitchFamily="34" charset="0"/>
               </a:rPr>
-              <a:t>Install</a:t>
+              <a:t>Install, configure and start</a:t>
             </a:r>
             <a:r>
               <a:rPr lang="zh-CN" altLang="en-US" sz="1100" dirty="0">
@@ -9085,7 +9085,7 @@
                 <a:latin typeface="Arial" panose="020B0604020202020204" pitchFamily="34" charset="0"/>
                 <a:cs typeface="Arial" panose="020B0604020202020204" pitchFamily="34" charset="0"/>
               </a:rPr>
-              <a:t>and</a:t>
+              <a:t>the</a:t>
             </a:r>
             <a:r>
               <a:rPr lang="zh-CN" altLang="en-US" sz="1100" dirty="0">
@@ -9098,6 +9098,26 @@
               <a:t> </a:t>
             </a:r>
             <a:r>
+              <a:rPr lang="en-US" altLang="zh-CN" sz="1100" dirty="0" err="1">
+                <a:solidFill>
+                  <a:schemeClr val="tx1"/>
+                </a:solidFill>
+                <a:latin typeface="Arial" panose="020B0604020202020204" pitchFamily="34" charset="0"/>
+                <a:cs typeface="Arial" panose="020B0604020202020204" pitchFamily="34" charset="0"/>
+              </a:rPr>
+              <a:t>Zowe</a:t>
+            </a:r>
+            <a:r>
+              <a:rPr lang="zh-CN" altLang="en-US" sz="1100" dirty="0">
+                <a:solidFill>
+                  <a:schemeClr val="tx1"/>
+                </a:solidFill>
+                <a:latin typeface="Arial" panose="020B0604020202020204" pitchFamily="34" charset="0"/>
+                <a:cs typeface="Arial" panose="020B0604020202020204" pitchFamily="34" charset="0"/>
+              </a:rPr>
+              <a:t> </a:t>
+            </a:r>
+            <a:r>
               <a:rPr lang="en-US" altLang="zh-CN" sz="1100" dirty="0">
                 <a:solidFill>
                   <a:schemeClr val="tx1"/>
@@ -9105,7 +9125,7 @@
                 <a:latin typeface="Arial" panose="020B0604020202020204" pitchFamily="34" charset="0"/>
                 <a:cs typeface="Arial" panose="020B0604020202020204" pitchFamily="34" charset="0"/>
               </a:rPr>
-              <a:t>configure</a:t>
+              <a:t>cross</a:t>
             </a:r>
             <a:r>
               <a:rPr lang="zh-CN" altLang="en-US" sz="1100" dirty="0">
@@ -9125,7 +9145,7 @@
                 <a:latin typeface="Arial" panose="020B0604020202020204" pitchFamily="34" charset="0"/>
                 <a:cs typeface="Arial" panose="020B0604020202020204" pitchFamily="34" charset="0"/>
               </a:rPr>
-              <a:t>the</a:t>
+              <a:t>memory</a:t>
             </a:r>
             <a:r>
               <a:rPr lang="zh-CN" altLang="en-US" sz="1100" dirty="0">
@@ -9138,26 +9158,6 @@
               <a:t> </a:t>
             </a:r>
             <a:r>
-              <a:rPr lang="en-US" altLang="zh-CN" sz="1100" dirty="0" err="1">
-                <a:solidFill>
-                  <a:schemeClr val="tx1"/>
-                </a:solidFill>
-                <a:latin typeface="Arial" panose="020B0604020202020204" pitchFamily="34" charset="0"/>
-                <a:cs typeface="Arial" panose="020B0604020202020204" pitchFamily="34" charset="0"/>
-              </a:rPr>
-              <a:t>Zowe</a:t>
-            </a:r>
-            <a:r>
-              <a:rPr lang="zh-CN" altLang="en-US" sz="1100" dirty="0">
-                <a:solidFill>
-                  <a:schemeClr val="tx1"/>
-                </a:solidFill>
-                <a:latin typeface="Arial" panose="020B0604020202020204" pitchFamily="34" charset="0"/>
-                <a:cs typeface="Arial" panose="020B0604020202020204" pitchFamily="34" charset="0"/>
-              </a:rPr>
-              <a:t> </a:t>
-            </a:r>
-            <a:r>
               <a:rPr lang="en-US" altLang="zh-CN" sz="1100" dirty="0">
                 <a:solidFill>
                   <a:schemeClr val="tx1"/>
@@ -9165,47 +9165,7 @@
                 <a:latin typeface="Arial" panose="020B0604020202020204" pitchFamily="34" charset="0"/>
                 <a:cs typeface="Arial" panose="020B0604020202020204" pitchFamily="34" charset="0"/>
               </a:rPr>
-              <a:t>cross</a:t>
-            </a:r>
-            <a:r>
-              <a:rPr lang="zh-CN" altLang="en-US" sz="1100" dirty="0">
-                <a:solidFill>
-                  <a:schemeClr val="tx1"/>
-                </a:solidFill>
-                <a:latin typeface="Arial" panose="020B0604020202020204" pitchFamily="34" charset="0"/>
-                <a:cs typeface="Arial" panose="020B0604020202020204" pitchFamily="34" charset="0"/>
-              </a:rPr>
-              <a:t> </a:t>
-            </a:r>
-            <a:r>
-              <a:rPr lang="en-US" altLang="zh-CN" sz="1100" dirty="0">
-                <a:solidFill>
-                  <a:schemeClr val="tx1"/>
-                </a:solidFill>
-                <a:latin typeface="Arial" panose="020B0604020202020204" pitchFamily="34" charset="0"/>
-                <a:cs typeface="Arial" panose="020B0604020202020204" pitchFamily="34" charset="0"/>
-              </a:rPr>
-              <a:t>memory</a:t>
-            </a:r>
-            <a:r>
-              <a:rPr lang="zh-CN" altLang="en-US" sz="1100" dirty="0">
-                <a:solidFill>
-                  <a:schemeClr val="tx1"/>
-                </a:solidFill>
-                <a:latin typeface="Arial" panose="020B0604020202020204" pitchFamily="34" charset="0"/>
-                <a:cs typeface="Arial" panose="020B0604020202020204" pitchFamily="34" charset="0"/>
-              </a:rPr>
-              <a:t> </a:t>
-            </a:r>
-            <a:r>
-              <a:rPr lang="en-US" altLang="zh-CN" sz="1100" dirty="0">
-                <a:solidFill>
-                  <a:schemeClr val="tx1"/>
-                </a:solidFill>
-                <a:latin typeface="Arial" panose="020B0604020202020204" pitchFamily="34" charset="0"/>
-                <a:cs typeface="Arial" panose="020B0604020202020204" pitchFamily="34" charset="0"/>
-              </a:rPr>
-              <a:t>server (ZWESISTC)</a:t>
+              <a:t>server, ZWESISTC</a:t>
             </a:r>
           </a:p>
           <a:p>
@@ -9320,7 +9280,7 @@
         </p:nvCxnSpPr>
         <p:spPr>
           <a:xfrm>
-            <a:off x="5146221" y="2183074"/>
+            <a:off x="5146221" y="2083058"/>
             <a:ext cx="0" cy="216542"/>
           </a:xfrm>
           <a:prstGeom prst="straightConnector1">
@@ -9365,7 +9325,7 @@
         </p:nvSpPr>
         <p:spPr>
           <a:xfrm>
-            <a:off x="4285979" y="828248"/>
+            <a:off x="4285979" y="728232"/>
             <a:ext cx="1958008" cy="558971"/>
           </a:xfrm>
           <a:prstGeom prst="rect">
@@ -9746,7 +9706,7 @@
         </p:nvSpPr>
         <p:spPr>
           <a:xfrm>
-            <a:off x="4358151" y="3476064"/>
+            <a:off x="4358151" y="3376048"/>
             <a:ext cx="1724319" cy="430887"/>
           </a:xfrm>
           <a:prstGeom prst="rect">
@@ -9784,8 +9744,8 @@
         </p:nvSpPr>
         <p:spPr>
           <a:xfrm>
-            <a:off x="6735612" y="10919219"/>
-            <a:ext cx="3209599" cy="704468"/>
+            <a:off x="6592735" y="10890000"/>
+            <a:ext cx="3637107" cy="637200"/>
           </a:xfrm>
           <a:prstGeom prst="rect">
             <a:avLst/>
@@ -9905,8 +9865,8 @@
         </p:nvSpPr>
         <p:spPr>
           <a:xfrm>
-            <a:off x="6735612" y="9963471"/>
-            <a:ext cx="3209599" cy="638427"/>
+            <a:off x="6592735" y="9900000"/>
+            <a:ext cx="3637107" cy="637200"/>
           </a:xfrm>
           <a:prstGeom prst="rect">
             <a:avLst/>
@@ -10039,8 +9999,8 @@
         </p:nvSpPr>
         <p:spPr>
           <a:xfrm>
-            <a:off x="6729508" y="11969292"/>
-            <a:ext cx="3209599" cy="555226"/>
+            <a:off x="6586631" y="11880000"/>
+            <a:ext cx="3637107" cy="637200"/>
           </a:xfrm>
           <a:prstGeom prst="rect">
             <a:avLst/>
@@ -10173,8 +10133,8 @@
         </p:nvSpPr>
         <p:spPr>
           <a:xfrm>
-            <a:off x="1607129" y="9963472"/>
-            <a:ext cx="3994789" cy="638427"/>
+            <a:off x="729127" y="9900000"/>
+            <a:ext cx="4651137" cy="637200"/>
           </a:xfrm>
           <a:prstGeom prst="rect">
             <a:avLst/>
@@ -10367,8 +10327,8 @@
         </p:nvCxnSpPr>
         <p:spPr>
           <a:xfrm rot="10800000" flipV="1">
-            <a:off x="2877557" y="3653852"/>
-            <a:ext cx="1017559" cy="404412"/>
+            <a:off x="2915426" y="3553835"/>
+            <a:ext cx="979688" cy="290101"/>
           </a:xfrm>
           <a:prstGeom prst="bentConnector2">
             <a:avLst/>
@@ -10415,7 +10375,7 @@
         </p:nvCxnSpPr>
         <p:spPr>
           <a:xfrm>
-            <a:off x="6454853" y="3653853"/>
+            <a:off x="6454853" y="3553837"/>
             <a:ext cx="1580377" cy="294119"/>
           </a:xfrm>
           <a:prstGeom prst="bentConnector2">
@@ -10460,7 +10420,7 @@
         </p:nvSpPr>
         <p:spPr>
           <a:xfrm>
-            <a:off x="1807142" y="5649860"/>
+            <a:off x="1807142" y="5492692"/>
             <a:ext cx="2178534" cy="809368"/>
           </a:xfrm>
           <a:prstGeom prst="diamond">
@@ -10525,7 +10485,7 @@
         </p:nvSpPr>
         <p:spPr>
           <a:xfrm>
-            <a:off x="7173271" y="5827289"/>
+            <a:off x="7173271" y="5670121"/>
             <a:ext cx="1724319" cy="430887"/>
           </a:xfrm>
           <a:prstGeom prst="rect">
@@ -10577,7 +10537,7 @@
         </p:nvSpPr>
         <p:spPr>
           <a:xfrm>
-            <a:off x="3247007" y="6550342"/>
+            <a:off x="3247007" y="6393174"/>
             <a:ext cx="1907210" cy="744698"/>
           </a:xfrm>
           <a:prstGeom prst="rect">
@@ -10661,7 +10621,7 @@
         </p:nvSpPr>
         <p:spPr>
           <a:xfrm>
-            <a:off x="6942612" y="5643977"/>
+            <a:off x="6942612" y="5486809"/>
             <a:ext cx="2178534" cy="809368"/>
           </a:xfrm>
           <a:prstGeom prst="diamond">
@@ -10726,7 +10686,7 @@
         </p:nvSpPr>
         <p:spPr>
           <a:xfrm>
-            <a:off x="8495712" y="6542088"/>
+            <a:off x="8495712" y="6384920"/>
             <a:ext cx="1680319" cy="738730"/>
           </a:xfrm>
           <a:prstGeom prst="rect">
@@ -10809,7 +10769,7 @@
         </p:nvSpPr>
         <p:spPr>
           <a:xfrm>
-            <a:off x="2103106" y="5841289"/>
+            <a:off x="2103106" y="5684121"/>
             <a:ext cx="1724319" cy="430887"/>
           </a:xfrm>
           <a:prstGeom prst="rect">
@@ -10851,7 +10811,7 @@
         </p:nvCxnSpPr>
         <p:spPr>
           <a:xfrm rot="10800000" flipV="1">
-            <a:off x="1601804" y="6054544"/>
+            <a:off x="1601804" y="5897376"/>
             <a:ext cx="205338" cy="476959"/>
           </a:xfrm>
           <a:prstGeom prst="bentConnector2">
@@ -10900,7 +10860,7 @@
         </p:nvCxnSpPr>
         <p:spPr>
           <a:xfrm>
-            <a:off x="3985676" y="6054544"/>
+            <a:off x="3985676" y="5897376"/>
             <a:ext cx="214936" cy="495798"/>
           </a:xfrm>
           <a:prstGeom prst="bentConnector2">
@@ -10948,7 +10908,7 @@
         </p:nvCxnSpPr>
         <p:spPr>
           <a:xfrm rot="10800000" flipV="1">
-            <a:off x="6718425" y="6048661"/>
+            <a:off x="6718425" y="5891493"/>
             <a:ext cx="224189" cy="501681"/>
           </a:xfrm>
           <a:prstGeom prst="bentConnector2">
@@ -10996,7 +10956,7 @@
         </p:nvCxnSpPr>
         <p:spPr>
           <a:xfrm>
-            <a:off x="9121147" y="6048662"/>
+            <a:off x="9121147" y="5891494"/>
             <a:ext cx="214725" cy="493427"/>
           </a:xfrm>
           <a:prstGeom prst="bentConnector2">
@@ -11043,9 +11003,9 @@
           <p:nvPr/>
         </p:nvCxnSpPr>
         <p:spPr>
-          <a:xfrm>
-            <a:off x="2877555" y="4617236"/>
-            <a:ext cx="18854" cy="1032625"/>
+          <a:xfrm flipH="1">
+            <a:off x="2896409" y="4402908"/>
+            <a:ext cx="19017" cy="1089784"/>
           </a:xfrm>
           <a:prstGeom prst="straightConnector1">
             <a:avLst/>
@@ -11092,8 +11052,8 @@
         </p:nvCxnSpPr>
         <p:spPr>
           <a:xfrm flipH="1">
-            <a:off x="8035227" y="4506943"/>
-            <a:ext cx="2" cy="326733"/>
+            <a:off x="8035228" y="4406927"/>
+            <a:ext cx="2" cy="269581"/>
           </a:xfrm>
           <a:prstGeom prst="straightConnector1">
             <a:avLst/>
@@ -11140,7 +11100,7 @@
         </p:nvCxnSpPr>
         <p:spPr>
           <a:xfrm flipH="1">
-            <a:off x="8031879" y="5392647"/>
+            <a:off x="8031879" y="5235479"/>
             <a:ext cx="3348" cy="251331"/>
           </a:xfrm>
           <a:prstGeom prst="straightConnector1">
@@ -11185,7 +11145,7 @@
         </p:nvSpPr>
         <p:spPr>
           <a:xfrm>
-            <a:off x="4363443" y="8563416"/>
+            <a:off x="4363443" y="8520552"/>
             <a:ext cx="2178534" cy="809368"/>
           </a:xfrm>
           <a:prstGeom prst="diamond">
@@ -11250,7 +11210,7 @@
         </p:nvSpPr>
         <p:spPr>
           <a:xfrm>
-            <a:off x="4638671" y="8773427"/>
+            <a:off x="4638671" y="8730563"/>
             <a:ext cx="1724319" cy="430887"/>
           </a:xfrm>
           <a:prstGeom prst="rect">
@@ -11303,8 +11263,8 @@
         </p:nvCxnSpPr>
         <p:spPr>
           <a:xfrm rot="10800000" flipV="1">
-            <a:off x="3604523" y="8968100"/>
-            <a:ext cx="758920" cy="995371"/>
+            <a:off x="3054697" y="8925236"/>
+            <a:ext cx="1308747" cy="974764"/>
           </a:xfrm>
           <a:prstGeom prst="bentConnector2">
             <a:avLst/>
@@ -11352,8 +11312,8 @@
         </p:nvCxnSpPr>
         <p:spPr>
           <a:xfrm>
-            <a:off x="6541977" y="8968100"/>
-            <a:ext cx="1798435" cy="995371"/>
+            <a:off x="6541977" y="8925236"/>
+            <a:ext cx="1869312" cy="974764"/>
           </a:xfrm>
           <a:prstGeom prst="bentConnector2">
             <a:avLst/>
@@ -11397,7 +11357,7 @@
         </p:nvSpPr>
         <p:spPr>
           <a:xfrm>
-            <a:off x="2595927" y="9478091"/>
+            <a:off x="2520635" y="9377178"/>
             <a:ext cx="1597807" cy="307777"/>
           </a:xfrm>
           <a:prstGeom prst="rect">
@@ -11413,6 +11373,7 @@
           </a:bodyPr>
           <a:lstStyle/>
           <a:p>
+            <a:pPr algn="ctr"/>
             <a:r>
               <a:rPr lang="en-US" sz="1400" dirty="0">
                 <a:latin typeface="Arial" panose="020B0604020202020204" pitchFamily="34" charset="0"/>
@@ -11437,7 +11398,7 @@
         </p:nvSpPr>
         <p:spPr>
           <a:xfrm>
-            <a:off x="8002822" y="9492644"/>
+            <a:off x="7545615" y="9406916"/>
             <a:ext cx="1653225" cy="307777"/>
           </a:xfrm>
           <a:prstGeom prst="rect">
@@ -11453,6 +11414,7 @@
           </a:bodyPr>
           <a:lstStyle/>
           <a:p>
+            <a:pPr algn="ctr"/>
             <a:r>
               <a:rPr lang="en-US" sz="1400" dirty="0">
                 <a:latin typeface="Arial" panose="020B0604020202020204" pitchFamily="34" charset="0"/>
@@ -11477,7 +11439,7 @@
         </p:nvSpPr>
         <p:spPr>
           <a:xfrm>
-            <a:off x="1112536" y="5792932"/>
+            <a:off x="1112536" y="5635764"/>
             <a:ext cx="1597807" cy="261610"/>
           </a:xfrm>
           <a:prstGeom prst="rect">
@@ -11515,7 +11477,7 @@
         </p:nvSpPr>
         <p:spPr>
           <a:xfrm>
-            <a:off x="3826033" y="5785969"/>
+            <a:off x="3826033" y="5628801"/>
             <a:ext cx="1682987" cy="261610"/>
           </a:xfrm>
           <a:prstGeom prst="rect">
@@ -11557,7 +11519,7 @@
         </p:nvSpPr>
         <p:spPr>
           <a:xfrm>
-            <a:off x="6266122" y="5788562"/>
+            <a:off x="6266122" y="5631394"/>
             <a:ext cx="1597807" cy="261610"/>
           </a:xfrm>
           <a:prstGeom prst="rect">
@@ -11595,7 +11557,7 @@
         </p:nvSpPr>
         <p:spPr>
           <a:xfrm>
-            <a:off x="8968942" y="5781121"/>
+            <a:off x="8968942" y="5623953"/>
             <a:ext cx="1682987" cy="261610"/>
           </a:xfrm>
           <a:prstGeom prst="rect">
@@ -11637,7 +11599,7 @@
         </p:nvSpPr>
         <p:spPr>
           <a:xfrm>
-            <a:off x="726470" y="7793331"/>
+            <a:off x="726470" y="7579011"/>
             <a:ext cx="9449560" cy="509925"/>
           </a:xfrm>
           <a:prstGeom prst="rect">
@@ -11762,8 +11724,8 @@
         </p:nvCxnSpPr>
         <p:spPr>
           <a:xfrm>
-            <a:off x="1601804" y="7289072"/>
-            <a:ext cx="0" cy="502965"/>
+            <a:off x="1601804" y="7131904"/>
+            <a:ext cx="0" cy="432000"/>
           </a:xfrm>
           <a:prstGeom prst="straightConnector1">
             <a:avLst/>
@@ -11809,8 +11771,8 @@
         </p:nvCxnSpPr>
         <p:spPr>
           <a:xfrm flipH="1">
-            <a:off x="4193734" y="7295040"/>
-            <a:ext cx="6879" cy="496996"/>
+            <a:off x="4193734" y="7137872"/>
+            <a:ext cx="6879" cy="432000"/>
           </a:xfrm>
           <a:prstGeom prst="straightConnector1">
             <a:avLst/>
@@ -11857,8 +11819,8 @@
         </p:nvCxnSpPr>
         <p:spPr>
           <a:xfrm>
-            <a:off x="6718423" y="7289072"/>
-            <a:ext cx="0" cy="496996"/>
+            <a:off x="6718423" y="7131904"/>
+            <a:ext cx="0" cy="432000"/>
           </a:xfrm>
           <a:prstGeom prst="straightConnector1">
             <a:avLst/>
@@ -11904,8 +11866,8 @@
         </p:nvCxnSpPr>
         <p:spPr>
           <a:xfrm>
-            <a:off x="9335871" y="7280818"/>
-            <a:ext cx="0" cy="505250"/>
+            <a:off x="9335871" y="7123650"/>
+            <a:ext cx="0" cy="432000"/>
           </a:xfrm>
           <a:prstGeom prst="straightConnector1">
             <a:avLst/>
@@ -11953,8 +11915,8 @@
         </p:nvCxnSpPr>
         <p:spPr>
           <a:xfrm>
-            <a:off x="5451250" y="8303256"/>
-            <a:ext cx="1460" cy="260161"/>
+            <a:off x="5451250" y="8088936"/>
+            <a:ext cx="1460" cy="431616"/>
           </a:xfrm>
           <a:prstGeom prst="straightConnector1">
             <a:avLst/>
@@ -11998,7 +11960,7 @@
         </p:nvSpPr>
         <p:spPr>
           <a:xfrm>
-            <a:off x="9810435" y="12747097"/>
+            <a:off x="9976742" y="12677866"/>
             <a:ext cx="1047242" cy="660202"/>
           </a:xfrm>
           <a:prstGeom prst="rect">
@@ -12038,7 +12000,7 @@
           </a:bodyPr>
           <a:lstStyle/>
           <a:p>
-            <a:pPr algn="ctr"/>
+            <a:pPr algn="r"/>
             <a:r>
               <a:rPr lang="en-US" sz="1100">
                 <a:solidFill>
@@ -12103,8 +12065,8 @@
         </p:nvSpPr>
         <p:spPr>
           <a:xfrm>
-            <a:off x="6729508" y="12815197"/>
-            <a:ext cx="3209597" cy="864184"/>
+            <a:off x="6586631" y="12870000"/>
+            <a:ext cx="3643211" cy="554400"/>
           </a:xfrm>
           <a:prstGeom prst="rect">
             <a:avLst/>
@@ -12240,15 +12202,16 @@
             </a:extLst>
           </p:cNvPr>
           <p:cNvCxnSpPr>
+            <a:cxnSpLocks/>
             <a:stCxn id="20" idx="2"/>
             <a:endCxn id="42" idx="0"/>
           </p:cNvCxnSpPr>
           <p:nvPr/>
         </p:nvCxnSpPr>
         <p:spPr>
-          <a:xfrm flipH="1">
-            <a:off x="3603269" y="10601899"/>
-            <a:ext cx="1255" cy="317319"/>
+          <a:xfrm>
+            <a:off x="3054696" y="10537200"/>
+            <a:ext cx="0" cy="352800"/>
           </a:xfrm>
           <a:prstGeom prst="straightConnector1">
             <a:avLst/>
@@ -12288,15 +12251,16 @@
             </a:extLst>
           </p:cNvPr>
           <p:cNvCxnSpPr>
-            <a:stCxn id="42" idx="2"/>
+            <a:cxnSpLocks/>
+            <a:stCxn id="49" idx="2"/>
             <a:endCxn id="41" idx="0"/>
           </p:cNvCxnSpPr>
           <p:nvPr/>
         </p:nvCxnSpPr>
         <p:spPr>
-          <a:xfrm>
-            <a:off x="3603268" y="11626046"/>
-            <a:ext cx="0" cy="343246"/>
+          <a:xfrm flipH="1">
+            <a:off x="3060801" y="12517200"/>
+            <a:ext cx="1" cy="352800"/>
           </a:xfrm>
           <a:prstGeom prst="straightConnector1">
             <a:avLst/>
@@ -12336,15 +12300,16 @@
             </a:extLst>
           </p:cNvPr>
           <p:cNvCxnSpPr>
-            <a:stCxn id="41" idx="2"/>
+            <a:cxnSpLocks/>
+            <a:stCxn id="42" idx="2"/>
             <a:endCxn id="49" idx="0"/>
           </p:cNvCxnSpPr>
           <p:nvPr/>
         </p:nvCxnSpPr>
         <p:spPr>
           <a:xfrm>
-            <a:off x="3603268" y="12524519"/>
-            <a:ext cx="0" cy="290679"/>
+            <a:off x="3054696" y="11527200"/>
+            <a:ext cx="6106" cy="352800"/>
           </a:xfrm>
           <a:prstGeom prst="straightConnector1">
             <a:avLst/>
@@ -12384,15 +12349,16 @@
             </a:extLst>
           </p:cNvPr>
           <p:cNvCxnSpPr>
-            <a:stCxn id="49" idx="2"/>
+            <a:cxnSpLocks/>
+            <a:stCxn id="41" idx="2"/>
             <a:endCxn id="46" idx="0"/>
           </p:cNvCxnSpPr>
           <p:nvPr/>
         </p:nvCxnSpPr>
         <p:spPr>
           <a:xfrm>
-            <a:off x="3603268" y="13679381"/>
-            <a:ext cx="0" cy="315012"/>
+            <a:off x="3060801" y="13425226"/>
+            <a:ext cx="1" cy="340563"/>
           </a:xfrm>
           <a:prstGeom prst="straightConnector1">
             <a:avLst/>
@@ -12440,8 +12406,8 @@
         </p:nvCxnSpPr>
         <p:spPr>
           <a:xfrm>
-            <a:off x="8340412" y="10601898"/>
-            <a:ext cx="0" cy="317321"/>
+            <a:off x="8411289" y="10537200"/>
+            <a:ext cx="0" cy="352800"/>
           </a:xfrm>
           <a:prstGeom prst="straightConnector1">
             <a:avLst/>
@@ -12489,8 +12455,8 @@
         </p:nvCxnSpPr>
         <p:spPr>
           <a:xfrm flipH="1">
-            <a:off x="8334308" y="11623687"/>
-            <a:ext cx="6104" cy="345605"/>
+            <a:off x="8405185" y="11527200"/>
+            <a:ext cx="6104" cy="352800"/>
           </a:xfrm>
           <a:prstGeom prst="straightConnector1">
             <a:avLst/>
@@ -12537,9 +12503,9 @@
           <p:nvPr/>
         </p:nvCxnSpPr>
         <p:spPr>
-          <a:xfrm flipH="1">
-            <a:off x="8334307" y="12524518"/>
-            <a:ext cx="1" cy="290679"/>
+          <a:xfrm>
+            <a:off x="8405185" y="12517200"/>
+            <a:ext cx="3052" cy="352800"/>
           </a:xfrm>
           <a:prstGeom prst="straightConnector1">
             <a:avLst/>
@@ -12579,6 +12545,7 @@
             </a:extLst>
           </p:cNvPr>
           <p:cNvCxnSpPr>
+            <a:cxnSpLocks/>
             <a:stCxn id="46" idx="2"/>
             <a:endCxn id="67" idx="0"/>
           </p:cNvCxnSpPr>
@@ -12586,12 +12553,12 @@
         </p:nvCxnSpPr>
         <p:spPr>
           <a:xfrm rot="16200000" flipH="1">
-            <a:off x="4286068" y="13971795"/>
-            <a:ext cx="540153" cy="1905752"/>
+            <a:off x="3889032" y="13574759"/>
+            <a:ext cx="791759" cy="2448218"/>
           </a:xfrm>
           <a:prstGeom prst="bentConnector3">
             <a:avLst>
-              <a:gd name="adj1" fmla="val 37205"/>
+              <a:gd name="adj1" fmla="val 50000"/>
             </a:avLst>
           </a:prstGeom>
           <a:ln>
@@ -12633,7 +12600,7 @@
         </p:nvSpPr>
         <p:spPr>
           <a:xfrm>
-            <a:off x="726470" y="274769"/>
+            <a:off x="726470" y="174753"/>
             <a:ext cx="9449560" cy="509925"/>
           </a:xfrm>
           <a:prstGeom prst="rect">
@@ -12719,7 +12686,7 @@
         </p:nvSpPr>
         <p:spPr>
           <a:xfrm>
-            <a:off x="726470" y="1464498"/>
+            <a:off x="726470" y="1364482"/>
             <a:ext cx="9449560" cy="509925"/>
           </a:xfrm>
           <a:prstGeom prst="rect">
@@ -12828,7 +12795,7 @@
         </p:nvCxnSpPr>
         <p:spPr>
           <a:xfrm>
-            <a:off x="5139350" y="1387218"/>
+            <a:off x="5139350" y="1287202"/>
             <a:ext cx="9191" cy="615856"/>
           </a:xfrm>
           <a:prstGeom prst="straightConnector1">
@@ -12877,8 +12844,8 @@
         </p:nvCxnSpPr>
         <p:spPr>
           <a:xfrm flipH="1">
-            <a:off x="5600663" y="12246905"/>
-            <a:ext cx="1128845" cy="1000384"/>
+            <a:off x="5386373" y="12198600"/>
+            <a:ext cx="1200258" cy="0"/>
           </a:xfrm>
           <a:prstGeom prst="straightConnector1">
             <a:avLst/>
@@ -12903,162 +12870,55 @@
           </a:fontRef>
         </p:style>
       </p:cxnSp>
-      <p:grpSp>
-        <p:nvGrpSpPr>
-          <p:cNvPr id="287" name="Group 286">
+      <p:cxnSp>
+        <p:nvCxnSpPr>
+          <p:cNvPr id="130" name="Elbow Connector 129">
             <a:extLst>
               <a:ext uri="{FF2B5EF4-FFF2-40B4-BE49-F238E27FC236}">
-                <a16:creationId xmlns:a16="http://schemas.microsoft.com/office/drawing/2014/main" id="{7CD72A42-C0AF-0745-AF8F-11F040D5D33C}"/>
+                <a16:creationId xmlns:a16="http://schemas.microsoft.com/office/drawing/2014/main" id="{E71C4AA7-F70C-1C42-88BD-E7CE736EEF46}"/>
               </a:ext>
             </a:extLst>
           </p:cNvPr>
-          <p:cNvGrpSpPr/>
+          <p:cNvCxnSpPr>
+            <a:cxnSpLocks/>
+          </p:cNvCxnSpPr>
           <p:nvPr/>
-        </p:nvGrpSpPr>
-        <p:grpSpPr>
-          <a:xfrm>
-            <a:off x="5736492" y="13679381"/>
-            <a:ext cx="2597815" cy="1515367"/>
-            <a:chOff x="5736492" y="13679381"/>
-            <a:chExt cx="2597815" cy="1515367"/>
-          </a:xfrm>
-        </p:grpSpPr>
-        <p:cxnSp>
-          <p:nvCxnSpPr>
-            <p:cNvPr id="279" name="Straight Connector 278">
-              <a:extLst>
-                <a:ext uri="{FF2B5EF4-FFF2-40B4-BE49-F238E27FC236}">
-                  <a16:creationId xmlns:a16="http://schemas.microsoft.com/office/drawing/2014/main" id="{8551A391-800D-B14C-9E39-6D6A64D57429}"/>
-                </a:ext>
-              </a:extLst>
-            </p:cNvPr>
-            <p:cNvCxnSpPr>
-              <a:stCxn id="56" idx="2"/>
-            </p:cNvCxnSpPr>
-            <p:nvPr/>
-          </p:nvCxnSpPr>
-          <p:spPr>
-            <a:xfrm>
-              <a:off x="8334307" y="13679381"/>
-              <a:ext cx="0" cy="1179619"/>
-            </a:xfrm>
-            <a:prstGeom prst="line">
-              <a:avLst/>
-            </a:prstGeom>
-            <a:ln>
-              <a:solidFill>
-                <a:schemeClr val="tx1">
-                  <a:lumMod val="75000"/>
-                  <a:lumOff val="25000"/>
-                </a:schemeClr>
-              </a:solidFill>
-            </a:ln>
-          </p:spPr>
-          <p:style>
-            <a:lnRef idx="1">
-              <a:schemeClr val="accent1"/>
-            </a:lnRef>
-            <a:fillRef idx="0">
-              <a:schemeClr val="accent1"/>
-            </a:fillRef>
-            <a:effectRef idx="0">
-              <a:schemeClr val="accent1"/>
-            </a:effectRef>
-            <a:fontRef idx="minor">
-              <a:schemeClr val="tx1"/>
-            </a:fontRef>
-          </p:style>
-        </p:cxnSp>
-        <p:cxnSp>
-          <p:nvCxnSpPr>
-            <p:cNvPr id="283" name="Straight Arrow Connector 282">
-              <a:extLst>
-                <a:ext uri="{FF2B5EF4-FFF2-40B4-BE49-F238E27FC236}">
-                  <a16:creationId xmlns:a16="http://schemas.microsoft.com/office/drawing/2014/main" id="{88F02C1D-8B35-9149-A91B-D6973CB5DF80}"/>
-                </a:ext>
-              </a:extLst>
-            </p:cNvPr>
-            <p:cNvCxnSpPr/>
-            <p:nvPr/>
-          </p:nvCxnSpPr>
-          <p:spPr>
-            <a:xfrm>
-              <a:off x="5736492" y="14859000"/>
-              <a:ext cx="0" cy="335748"/>
-            </a:xfrm>
-            <a:prstGeom prst="straightConnector1">
-              <a:avLst/>
-            </a:prstGeom>
-            <a:ln>
-              <a:solidFill>
-                <a:schemeClr val="tx1">
-                  <a:lumMod val="75000"/>
-                  <a:lumOff val="25000"/>
-                </a:schemeClr>
-              </a:solidFill>
-              <a:tailEnd type="triangle"/>
-            </a:ln>
-          </p:spPr>
-          <p:style>
-            <a:lnRef idx="1">
-              <a:schemeClr val="accent1"/>
-            </a:lnRef>
-            <a:fillRef idx="0">
-              <a:schemeClr val="accent1"/>
-            </a:fillRef>
-            <a:effectRef idx="0">
-              <a:schemeClr val="accent1"/>
-            </a:effectRef>
-            <a:fontRef idx="minor">
-              <a:schemeClr val="tx1"/>
-            </a:fontRef>
-          </p:style>
-        </p:cxnSp>
-        <p:cxnSp>
-          <p:nvCxnSpPr>
-            <p:cNvPr id="285" name="Straight Connector 284">
-              <a:extLst>
-                <a:ext uri="{FF2B5EF4-FFF2-40B4-BE49-F238E27FC236}">
-                  <a16:creationId xmlns:a16="http://schemas.microsoft.com/office/drawing/2014/main" id="{4B3226FD-7EE9-1949-8EC5-ABA14E896806}"/>
-                </a:ext>
-              </a:extLst>
-            </p:cNvPr>
-            <p:cNvCxnSpPr/>
-            <p:nvPr/>
-          </p:nvCxnSpPr>
-          <p:spPr>
-            <a:xfrm>
-              <a:off x="5736492" y="14859000"/>
-              <a:ext cx="2597815" cy="0"/>
-            </a:xfrm>
-            <a:prstGeom prst="line">
-              <a:avLst/>
-            </a:prstGeom>
-            <a:ln>
-              <a:solidFill>
-                <a:schemeClr val="tx1">
-                  <a:lumMod val="75000"/>
-                  <a:lumOff val="25000"/>
-                </a:schemeClr>
-              </a:solidFill>
-            </a:ln>
-          </p:spPr>
-          <p:style>
-            <a:lnRef idx="1">
-              <a:schemeClr val="accent1"/>
-            </a:lnRef>
-            <a:fillRef idx="0">
-              <a:schemeClr val="accent1"/>
-            </a:fillRef>
-            <a:effectRef idx="0">
-              <a:schemeClr val="accent1"/>
-            </a:effectRef>
-            <a:fontRef idx="minor">
-              <a:schemeClr val="tx1"/>
-            </a:fontRef>
-          </p:style>
-        </p:cxnSp>
-      </p:grpSp>
+        </p:nvCxnSpPr>
+        <p:spPr>
+          <a:xfrm rot="5400000">
+            <a:off x="6253200" y="13041000"/>
+            <a:ext cx="1771200" cy="2538000"/>
+          </a:xfrm>
+          <a:prstGeom prst="bentConnector3">
+            <a:avLst>
+              <a:gd name="adj1" fmla="val 50000"/>
+            </a:avLst>
+          </a:prstGeom>
+          <a:ln>
+            <a:solidFill>
+              <a:schemeClr val="tx1">
+                <a:lumMod val="75000"/>
+                <a:lumOff val="25000"/>
+              </a:schemeClr>
+            </a:solidFill>
+            <a:tailEnd type="triangle"/>
+          </a:ln>
+        </p:spPr>
+        <p:style>
+          <a:lnRef idx="1">
+            <a:schemeClr val="accent1"/>
+          </a:lnRef>
+          <a:fillRef idx="0">
+            <a:schemeClr val="accent1"/>
+          </a:fillRef>
+          <a:effectRef idx="0">
+            <a:schemeClr val="accent1"/>
+          </a:effectRef>
+          <a:fontRef idx="minor">
+            <a:schemeClr val="tx1"/>
+          </a:fontRef>
+        </p:style>
+      </p:cxnSp>
     </p:spTree>
     <p:extLst>
       <p:ext uri="{BB962C8B-B14F-4D97-AF65-F5344CB8AC3E}">

</xml_diff>

<commit_message>
Update presentation to fix alignment (#1241)
* Update presentation to fix alignment

Signed-off-by: stevenhorsman <steven@uk.ibm.com>

* Update to reflect re-order

Signed-off-by: stevenhorsman <steven@uk.ibm.com>

* Edits to toc

Signed-off-by: nannanli <nannanli@cn.ibm.com>

Co-authored-by: nannanli <nannanli@cn.ibm.com>
</commit_message>
<xml_diff>
--- a/docs/images/common/zowe-zos-install-diagram.pptx
+++ b/docs/images/common/zowe-zos-install-diagram.pptx
@@ -244,7 +244,7 @@
           <a:p>
             <a:fld id="{C4A90A56-7146-D847-92E1-256101539D4D}" type="datetimeFigureOut">
               <a:rPr lang="en-US" smtClean="0"/>
-              <a:t>5/28/20</a:t>
+              <a:t>6/2/20</a:t>
             </a:fld>
             <a:endParaRPr lang="en-US"/>
           </a:p>
@@ -414,7 +414,7 @@
           <a:p>
             <a:fld id="{C4A90A56-7146-D847-92E1-256101539D4D}" type="datetimeFigureOut">
               <a:rPr lang="en-US" smtClean="0"/>
-              <a:t>5/28/20</a:t>
+              <a:t>6/2/20</a:t>
             </a:fld>
             <a:endParaRPr lang="en-US"/>
           </a:p>
@@ -594,7 +594,7 @@
           <a:p>
             <a:fld id="{C4A90A56-7146-D847-92E1-256101539D4D}" type="datetimeFigureOut">
               <a:rPr lang="en-US" smtClean="0"/>
-              <a:t>5/28/20</a:t>
+              <a:t>6/2/20</a:t>
             </a:fld>
             <a:endParaRPr lang="en-US"/>
           </a:p>
@@ -764,7 +764,7 @@
           <a:p>
             <a:fld id="{C4A90A56-7146-D847-92E1-256101539D4D}" type="datetimeFigureOut">
               <a:rPr lang="en-US" smtClean="0"/>
-              <a:t>5/28/20</a:t>
+              <a:t>6/2/20</a:t>
             </a:fld>
             <a:endParaRPr lang="en-US"/>
           </a:p>
@@ -1008,7 +1008,7 @@
           <a:p>
             <a:fld id="{C4A90A56-7146-D847-92E1-256101539D4D}" type="datetimeFigureOut">
               <a:rPr lang="en-US" smtClean="0"/>
-              <a:t>5/28/20</a:t>
+              <a:t>6/2/20</a:t>
             </a:fld>
             <a:endParaRPr lang="en-US"/>
           </a:p>
@@ -1240,7 +1240,7 @@
           <a:p>
             <a:fld id="{C4A90A56-7146-D847-92E1-256101539D4D}" type="datetimeFigureOut">
               <a:rPr lang="en-US" smtClean="0"/>
-              <a:t>5/28/20</a:t>
+              <a:t>6/2/20</a:t>
             </a:fld>
             <a:endParaRPr lang="en-US"/>
           </a:p>
@@ -1607,7 +1607,7 @@
           <a:p>
             <a:fld id="{C4A90A56-7146-D847-92E1-256101539D4D}" type="datetimeFigureOut">
               <a:rPr lang="en-US" smtClean="0"/>
-              <a:t>5/28/20</a:t>
+              <a:t>6/2/20</a:t>
             </a:fld>
             <a:endParaRPr lang="en-US"/>
           </a:p>
@@ -1725,7 +1725,7 @@
           <a:p>
             <a:fld id="{C4A90A56-7146-D847-92E1-256101539D4D}" type="datetimeFigureOut">
               <a:rPr lang="en-US" smtClean="0"/>
-              <a:t>5/28/20</a:t>
+              <a:t>6/2/20</a:t>
             </a:fld>
             <a:endParaRPr lang="en-US"/>
           </a:p>
@@ -1820,7 +1820,7 @@
           <a:p>
             <a:fld id="{C4A90A56-7146-D847-92E1-256101539D4D}" type="datetimeFigureOut">
               <a:rPr lang="en-US" smtClean="0"/>
-              <a:t>5/28/20</a:t>
+              <a:t>6/2/20</a:t>
             </a:fld>
             <a:endParaRPr lang="en-US"/>
           </a:p>
@@ -2097,7 +2097,7 @@
           <a:p>
             <a:fld id="{C4A90A56-7146-D847-92E1-256101539D4D}" type="datetimeFigureOut">
               <a:rPr lang="en-US" smtClean="0"/>
-              <a:t>5/28/20</a:t>
+              <a:t>6/2/20</a:t>
             </a:fld>
             <a:endParaRPr lang="en-US"/>
           </a:p>
@@ -2354,7 +2354,7 @@
           <a:p>
             <a:fld id="{C4A90A56-7146-D847-92E1-256101539D4D}" type="datetimeFigureOut">
               <a:rPr lang="en-US" smtClean="0"/>
-              <a:t>5/28/20</a:t>
+              <a:t>6/2/20</a:t>
             </a:fld>
             <a:endParaRPr lang="en-US"/>
           </a:p>
@@ -2567,7 +2567,7 @@
           <a:p>
             <a:fld id="{C4A90A56-7146-D847-92E1-256101539D4D}" type="datetimeFigureOut">
               <a:rPr lang="en-US" smtClean="0"/>
-              <a:t>5/28/20</a:t>
+              <a:t>6/2/20</a:t>
             </a:fld>
             <a:endParaRPr lang="en-US"/>
           </a:p>
@@ -7320,7 +7320,7 @@
         <p:spPr>
           <a:xfrm>
             <a:off x="711719" y="15168496"/>
-            <a:ext cx="3329034" cy="585223"/>
+            <a:ext cx="2137120" cy="585223"/>
           </a:xfrm>
           <a:prstGeom prst="rect">
             <a:avLst/>
@@ -7405,7 +7405,7 @@
         </p:nvSpPr>
         <p:spPr>
           <a:xfrm>
-            <a:off x="5058540" y="2003074"/>
+            <a:off x="5058540" y="1903058"/>
             <a:ext cx="180000" cy="180000"/>
           </a:xfrm>
           <a:prstGeom prst="ellipse">
@@ -7465,7 +7465,7 @@
         </p:nvSpPr>
         <p:spPr>
           <a:xfrm>
-            <a:off x="5193732" y="1951488"/>
+            <a:off x="5193732" y="1851472"/>
             <a:ext cx="2219327" cy="307777"/>
           </a:xfrm>
           <a:prstGeom prst="rect">
@@ -7503,7 +7503,7 @@
         </p:nvSpPr>
         <p:spPr>
           <a:xfrm>
-            <a:off x="4167217" y="2399616"/>
+            <a:off x="4167217" y="2299600"/>
             <a:ext cx="1958008" cy="558971"/>
           </a:xfrm>
           <a:prstGeom prst="rect">
@@ -7574,7 +7574,7 @@
         </p:nvSpPr>
         <p:spPr>
           <a:xfrm>
-            <a:off x="3895114" y="3249168"/>
+            <a:off x="3895114" y="3149152"/>
             <a:ext cx="2559738" cy="809368"/>
           </a:xfrm>
           <a:prstGeom prst="diamond">
@@ -7639,7 +7639,7 @@
         </p:nvSpPr>
         <p:spPr>
           <a:xfrm>
-            <a:off x="6913585" y="3947972"/>
+            <a:off x="6913585" y="3847956"/>
             <a:ext cx="2243289" cy="558971"/>
           </a:xfrm>
           <a:prstGeom prst="rect">
@@ -7710,7 +7710,7 @@
         </p:nvSpPr>
         <p:spPr>
           <a:xfrm>
-            <a:off x="1752228" y="4058265"/>
+            <a:off x="1790098" y="3843937"/>
             <a:ext cx="2250655" cy="558971"/>
           </a:xfrm>
           <a:prstGeom prst="rect">
@@ -7781,7 +7781,7 @@
         </p:nvSpPr>
         <p:spPr>
           <a:xfrm>
-            <a:off x="6913585" y="4833676"/>
+            <a:off x="6913585" y="4676508"/>
             <a:ext cx="2243285" cy="558971"/>
           </a:xfrm>
           <a:prstGeom prst="rect">
@@ -7852,7 +7852,7 @@
         </p:nvSpPr>
         <p:spPr>
           <a:xfrm>
-            <a:off x="5878264" y="6550342"/>
+            <a:off x="5878264" y="6393174"/>
             <a:ext cx="1680319" cy="738730"/>
           </a:xfrm>
           <a:prstGeom prst="rect">
@@ -7943,7 +7943,7 @@
         </p:nvSpPr>
         <p:spPr>
           <a:xfrm>
-            <a:off x="726470" y="6531503"/>
+            <a:off x="726470" y="6374335"/>
             <a:ext cx="1750668" cy="757568"/>
           </a:xfrm>
           <a:prstGeom prst="rect">
@@ -8016,7 +8016,7 @@
         </p:nvCxnSpPr>
         <p:spPr>
           <a:xfrm>
-            <a:off x="5147734" y="2958584"/>
+            <a:off x="5147734" y="2858568"/>
             <a:ext cx="0" cy="262924"/>
           </a:xfrm>
           <a:prstGeom prst="straightConnector1">
@@ -8061,7 +8061,7 @@
         </p:nvSpPr>
         <p:spPr>
           <a:xfrm>
-            <a:off x="2848839" y="3385472"/>
+            <a:off x="2848839" y="3285456"/>
             <a:ext cx="1365668" cy="261610"/>
           </a:xfrm>
           <a:prstGeom prst="rect">
@@ -8139,7 +8139,7 @@
         </p:nvSpPr>
         <p:spPr>
           <a:xfrm>
-            <a:off x="6545505" y="3385472"/>
+            <a:off x="6545505" y="3285456"/>
             <a:ext cx="1682987" cy="261610"/>
           </a:xfrm>
           <a:prstGeom prst="rect">
@@ -8217,8 +8217,8 @@
         </p:nvSpPr>
         <p:spPr>
           <a:xfrm>
-            <a:off x="1605873" y="10919218"/>
-            <a:ext cx="3994790" cy="706829"/>
+            <a:off x="729127" y="10890000"/>
+            <a:ext cx="4651138" cy="637200"/>
           </a:xfrm>
           <a:prstGeom prst="rect">
             <a:avLst/>
@@ -8451,7 +8451,7 @@
         </p:nvSpPr>
         <p:spPr>
           <a:xfrm>
-            <a:off x="5352768" y="11782362"/>
+            <a:off x="5122752" y="12677866"/>
             <a:ext cx="1047242" cy="660202"/>
           </a:xfrm>
           <a:prstGeom prst="rect">
@@ -8552,8 +8552,8 @@
         </p:nvSpPr>
         <p:spPr>
           <a:xfrm>
-            <a:off x="1605874" y="11969292"/>
-            <a:ext cx="3994789" cy="555226"/>
+            <a:off x="735231" y="12870000"/>
+            <a:ext cx="4651139" cy="555226"/>
           </a:xfrm>
           <a:prstGeom prst="rect">
             <a:avLst/>
@@ -8756,8 +8756,8 @@
         </p:nvSpPr>
         <p:spPr>
           <a:xfrm>
-            <a:off x="1605874" y="13994393"/>
-            <a:ext cx="3994788" cy="660202"/>
+            <a:off x="729127" y="13765789"/>
+            <a:ext cx="4663349" cy="637200"/>
           </a:xfrm>
           <a:prstGeom prst="rect">
             <a:avLst/>
@@ -8808,7 +8808,7 @@
                 <a:latin typeface="Arial" panose="020B0604020202020204" pitchFamily="34" charset="0"/>
                 <a:cs typeface="Arial" panose="020B0604020202020204" pitchFamily="34" charset="0"/>
               </a:rPr>
-              <a:t>Install</a:t>
+              <a:t>Install and start</a:t>
             </a:r>
             <a:r>
               <a:rPr lang="zh-CN" altLang="en-US" sz="1100" dirty="0">
@@ -8888,7 +8888,7 @@
                 <a:latin typeface="Arial" panose="020B0604020202020204" pitchFamily="34" charset="0"/>
                 <a:cs typeface="Arial" panose="020B0604020202020204" pitchFamily="34" charset="0"/>
               </a:rPr>
-              <a:t>task ZWESVSTC</a:t>
+              <a:t>task, ZWESVSTC</a:t>
             </a:r>
           </a:p>
           <a:p>
@@ -8980,8 +8980,8 @@
         </p:nvSpPr>
         <p:spPr>
           <a:xfrm>
-            <a:off x="1605874" y="12815197"/>
-            <a:ext cx="3994789" cy="864184"/>
+            <a:off x="735231" y="11880000"/>
+            <a:ext cx="4651142" cy="637200"/>
           </a:xfrm>
           <a:prstGeom prst="rect">
             <a:avLst/>
@@ -9065,7 +9065,7 @@
                 <a:latin typeface="Arial" panose="020B0604020202020204" pitchFamily="34" charset="0"/>
                 <a:cs typeface="Arial" panose="020B0604020202020204" pitchFamily="34" charset="0"/>
               </a:rPr>
-              <a:t>Install</a:t>
+              <a:t>Install, configure and start</a:t>
             </a:r>
             <a:r>
               <a:rPr lang="zh-CN" altLang="en-US" sz="1100" dirty="0">
@@ -9085,7 +9085,7 @@
                 <a:latin typeface="Arial" panose="020B0604020202020204" pitchFamily="34" charset="0"/>
                 <a:cs typeface="Arial" panose="020B0604020202020204" pitchFamily="34" charset="0"/>
               </a:rPr>
-              <a:t>and</a:t>
+              <a:t>the</a:t>
             </a:r>
             <a:r>
               <a:rPr lang="zh-CN" altLang="en-US" sz="1100" dirty="0">
@@ -9098,6 +9098,26 @@
               <a:t> </a:t>
             </a:r>
             <a:r>
+              <a:rPr lang="en-US" altLang="zh-CN" sz="1100" dirty="0" err="1">
+                <a:solidFill>
+                  <a:schemeClr val="tx1"/>
+                </a:solidFill>
+                <a:latin typeface="Arial" panose="020B0604020202020204" pitchFamily="34" charset="0"/>
+                <a:cs typeface="Arial" panose="020B0604020202020204" pitchFamily="34" charset="0"/>
+              </a:rPr>
+              <a:t>Zowe</a:t>
+            </a:r>
+            <a:r>
+              <a:rPr lang="zh-CN" altLang="en-US" sz="1100" dirty="0">
+                <a:solidFill>
+                  <a:schemeClr val="tx1"/>
+                </a:solidFill>
+                <a:latin typeface="Arial" panose="020B0604020202020204" pitchFamily="34" charset="0"/>
+                <a:cs typeface="Arial" panose="020B0604020202020204" pitchFamily="34" charset="0"/>
+              </a:rPr>
+              <a:t> </a:t>
+            </a:r>
+            <a:r>
               <a:rPr lang="en-US" altLang="zh-CN" sz="1100" dirty="0">
                 <a:solidFill>
                   <a:schemeClr val="tx1"/>
@@ -9105,7 +9125,7 @@
                 <a:latin typeface="Arial" panose="020B0604020202020204" pitchFamily="34" charset="0"/>
                 <a:cs typeface="Arial" panose="020B0604020202020204" pitchFamily="34" charset="0"/>
               </a:rPr>
-              <a:t>configure</a:t>
+              <a:t>cross</a:t>
             </a:r>
             <a:r>
               <a:rPr lang="zh-CN" altLang="en-US" sz="1100" dirty="0">
@@ -9125,7 +9145,7 @@
                 <a:latin typeface="Arial" panose="020B0604020202020204" pitchFamily="34" charset="0"/>
                 <a:cs typeface="Arial" panose="020B0604020202020204" pitchFamily="34" charset="0"/>
               </a:rPr>
-              <a:t>the</a:t>
+              <a:t>memory</a:t>
             </a:r>
             <a:r>
               <a:rPr lang="zh-CN" altLang="en-US" sz="1100" dirty="0">
@@ -9138,26 +9158,6 @@
               <a:t> </a:t>
             </a:r>
             <a:r>
-              <a:rPr lang="en-US" altLang="zh-CN" sz="1100" dirty="0" err="1">
-                <a:solidFill>
-                  <a:schemeClr val="tx1"/>
-                </a:solidFill>
-                <a:latin typeface="Arial" panose="020B0604020202020204" pitchFamily="34" charset="0"/>
-                <a:cs typeface="Arial" panose="020B0604020202020204" pitchFamily="34" charset="0"/>
-              </a:rPr>
-              <a:t>Zowe</a:t>
-            </a:r>
-            <a:r>
-              <a:rPr lang="zh-CN" altLang="en-US" sz="1100" dirty="0">
-                <a:solidFill>
-                  <a:schemeClr val="tx1"/>
-                </a:solidFill>
-                <a:latin typeface="Arial" panose="020B0604020202020204" pitchFamily="34" charset="0"/>
-                <a:cs typeface="Arial" panose="020B0604020202020204" pitchFamily="34" charset="0"/>
-              </a:rPr>
-              <a:t> </a:t>
-            </a:r>
-            <a:r>
               <a:rPr lang="en-US" altLang="zh-CN" sz="1100" dirty="0">
                 <a:solidFill>
                   <a:schemeClr val="tx1"/>
@@ -9165,47 +9165,7 @@
                 <a:latin typeface="Arial" panose="020B0604020202020204" pitchFamily="34" charset="0"/>
                 <a:cs typeface="Arial" panose="020B0604020202020204" pitchFamily="34" charset="0"/>
               </a:rPr>
-              <a:t>cross</a:t>
-            </a:r>
-            <a:r>
-              <a:rPr lang="zh-CN" altLang="en-US" sz="1100" dirty="0">
-                <a:solidFill>
-                  <a:schemeClr val="tx1"/>
-                </a:solidFill>
-                <a:latin typeface="Arial" panose="020B0604020202020204" pitchFamily="34" charset="0"/>
-                <a:cs typeface="Arial" panose="020B0604020202020204" pitchFamily="34" charset="0"/>
-              </a:rPr>
-              <a:t> </a:t>
-            </a:r>
-            <a:r>
-              <a:rPr lang="en-US" altLang="zh-CN" sz="1100" dirty="0">
-                <a:solidFill>
-                  <a:schemeClr val="tx1"/>
-                </a:solidFill>
-                <a:latin typeface="Arial" panose="020B0604020202020204" pitchFamily="34" charset="0"/>
-                <a:cs typeface="Arial" panose="020B0604020202020204" pitchFamily="34" charset="0"/>
-              </a:rPr>
-              <a:t>memory</a:t>
-            </a:r>
-            <a:r>
-              <a:rPr lang="zh-CN" altLang="en-US" sz="1100" dirty="0">
-                <a:solidFill>
-                  <a:schemeClr val="tx1"/>
-                </a:solidFill>
-                <a:latin typeface="Arial" panose="020B0604020202020204" pitchFamily="34" charset="0"/>
-                <a:cs typeface="Arial" panose="020B0604020202020204" pitchFamily="34" charset="0"/>
-              </a:rPr>
-              <a:t> </a:t>
-            </a:r>
-            <a:r>
-              <a:rPr lang="en-US" altLang="zh-CN" sz="1100" dirty="0">
-                <a:solidFill>
-                  <a:schemeClr val="tx1"/>
-                </a:solidFill>
-                <a:latin typeface="Arial" panose="020B0604020202020204" pitchFamily="34" charset="0"/>
-                <a:cs typeface="Arial" panose="020B0604020202020204" pitchFamily="34" charset="0"/>
-              </a:rPr>
-              <a:t>server (ZWESISTC)</a:t>
+              <a:t>server, ZWESISTC</a:t>
             </a:r>
           </a:p>
           <a:p>
@@ -9320,7 +9280,7 @@
         </p:nvCxnSpPr>
         <p:spPr>
           <a:xfrm>
-            <a:off x="5146221" y="2183074"/>
+            <a:off x="5146221" y="2083058"/>
             <a:ext cx="0" cy="216542"/>
           </a:xfrm>
           <a:prstGeom prst="straightConnector1">
@@ -9365,7 +9325,7 @@
         </p:nvSpPr>
         <p:spPr>
           <a:xfrm>
-            <a:off x="4285979" y="828248"/>
+            <a:off x="4285979" y="728232"/>
             <a:ext cx="1958008" cy="558971"/>
           </a:xfrm>
           <a:prstGeom prst="rect">
@@ -9746,7 +9706,7 @@
         </p:nvSpPr>
         <p:spPr>
           <a:xfrm>
-            <a:off x="4358151" y="3476064"/>
+            <a:off x="4358151" y="3376048"/>
             <a:ext cx="1724319" cy="430887"/>
           </a:xfrm>
           <a:prstGeom prst="rect">
@@ -9784,8 +9744,8 @@
         </p:nvSpPr>
         <p:spPr>
           <a:xfrm>
-            <a:off x="6735612" y="10919219"/>
-            <a:ext cx="3209599" cy="704468"/>
+            <a:off x="6592735" y="10890000"/>
+            <a:ext cx="3637107" cy="637200"/>
           </a:xfrm>
           <a:prstGeom prst="rect">
             <a:avLst/>
@@ -9905,8 +9865,8 @@
         </p:nvSpPr>
         <p:spPr>
           <a:xfrm>
-            <a:off x="6735612" y="9963471"/>
-            <a:ext cx="3209599" cy="638427"/>
+            <a:off x="6592735" y="9900000"/>
+            <a:ext cx="3637107" cy="637200"/>
           </a:xfrm>
           <a:prstGeom prst="rect">
             <a:avLst/>
@@ -10039,8 +9999,8 @@
         </p:nvSpPr>
         <p:spPr>
           <a:xfrm>
-            <a:off x="6729508" y="11969292"/>
-            <a:ext cx="3209599" cy="555226"/>
+            <a:off x="6586631" y="11880000"/>
+            <a:ext cx="3637107" cy="637200"/>
           </a:xfrm>
           <a:prstGeom prst="rect">
             <a:avLst/>
@@ -10173,8 +10133,8 @@
         </p:nvSpPr>
         <p:spPr>
           <a:xfrm>
-            <a:off x="1607129" y="9963472"/>
-            <a:ext cx="3994789" cy="638427"/>
+            <a:off x="729127" y="9900000"/>
+            <a:ext cx="4651137" cy="637200"/>
           </a:xfrm>
           <a:prstGeom prst="rect">
             <a:avLst/>
@@ -10367,8 +10327,8 @@
         </p:nvCxnSpPr>
         <p:spPr>
           <a:xfrm rot="10800000" flipV="1">
-            <a:off x="2877557" y="3653852"/>
-            <a:ext cx="1017559" cy="404412"/>
+            <a:off x="2915426" y="3553835"/>
+            <a:ext cx="979688" cy="290101"/>
           </a:xfrm>
           <a:prstGeom prst="bentConnector2">
             <a:avLst/>
@@ -10415,7 +10375,7 @@
         </p:nvCxnSpPr>
         <p:spPr>
           <a:xfrm>
-            <a:off x="6454853" y="3653853"/>
+            <a:off x="6454853" y="3553837"/>
             <a:ext cx="1580377" cy="294119"/>
           </a:xfrm>
           <a:prstGeom prst="bentConnector2">
@@ -10460,7 +10420,7 @@
         </p:nvSpPr>
         <p:spPr>
           <a:xfrm>
-            <a:off x="1807142" y="5649860"/>
+            <a:off x="1807142" y="5492692"/>
             <a:ext cx="2178534" cy="809368"/>
           </a:xfrm>
           <a:prstGeom prst="diamond">
@@ -10525,7 +10485,7 @@
         </p:nvSpPr>
         <p:spPr>
           <a:xfrm>
-            <a:off x="7173271" y="5827289"/>
+            <a:off x="7173271" y="5670121"/>
             <a:ext cx="1724319" cy="430887"/>
           </a:xfrm>
           <a:prstGeom prst="rect">
@@ -10577,7 +10537,7 @@
         </p:nvSpPr>
         <p:spPr>
           <a:xfrm>
-            <a:off x="3247007" y="6550342"/>
+            <a:off x="3247007" y="6393174"/>
             <a:ext cx="1907210" cy="744698"/>
           </a:xfrm>
           <a:prstGeom prst="rect">
@@ -10661,7 +10621,7 @@
         </p:nvSpPr>
         <p:spPr>
           <a:xfrm>
-            <a:off x="6942612" y="5643977"/>
+            <a:off x="6942612" y="5486809"/>
             <a:ext cx="2178534" cy="809368"/>
           </a:xfrm>
           <a:prstGeom prst="diamond">
@@ -10726,7 +10686,7 @@
         </p:nvSpPr>
         <p:spPr>
           <a:xfrm>
-            <a:off x="8495712" y="6542088"/>
+            <a:off x="8495712" y="6384920"/>
             <a:ext cx="1680319" cy="738730"/>
           </a:xfrm>
           <a:prstGeom prst="rect">
@@ -10809,7 +10769,7 @@
         </p:nvSpPr>
         <p:spPr>
           <a:xfrm>
-            <a:off x="2103106" y="5841289"/>
+            <a:off x="2103106" y="5684121"/>
             <a:ext cx="1724319" cy="430887"/>
           </a:xfrm>
           <a:prstGeom prst="rect">
@@ -10851,7 +10811,7 @@
         </p:nvCxnSpPr>
         <p:spPr>
           <a:xfrm rot="10800000" flipV="1">
-            <a:off x="1601804" y="6054544"/>
+            <a:off x="1601804" y="5897376"/>
             <a:ext cx="205338" cy="476959"/>
           </a:xfrm>
           <a:prstGeom prst="bentConnector2">
@@ -10900,7 +10860,7 @@
         </p:nvCxnSpPr>
         <p:spPr>
           <a:xfrm>
-            <a:off x="3985676" y="6054544"/>
+            <a:off x="3985676" y="5897376"/>
             <a:ext cx="214936" cy="495798"/>
           </a:xfrm>
           <a:prstGeom prst="bentConnector2">
@@ -10948,7 +10908,7 @@
         </p:nvCxnSpPr>
         <p:spPr>
           <a:xfrm rot="10800000" flipV="1">
-            <a:off x="6718425" y="6048661"/>
+            <a:off x="6718425" y="5891493"/>
             <a:ext cx="224189" cy="501681"/>
           </a:xfrm>
           <a:prstGeom prst="bentConnector2">
@@ -10996,7 +10956,7 @@
         </p:nvCxnSpPr>
         <p:spPr>
           <a:xfrm>
-            <a:off x="9121147" y="6048662"/>
+            <a:off x="9121147" y="5891494"/>
             <a:ext cx="214725" cy="493427"/>
           </a:xfrm>
           <a:prstGeom prst="bentConnector2">
@@ -11043,9 +11003,9 @@
           <p:nvPr/>
         </p:nvCxnSpPr>
         <p:spPr>
-          <a:xfrm>
-            <a:off x="2877555" y="4617236"/>
-            <a:ext cx="18854" cy="1032625"/>
+          <a:xfrm flipH="1">
+            <a:off x="2896409" y="4402908"/>
+            <a:ext cx="19017" cy="1089784"/>
           </a:xfrm>
           <a:prstGeom prst="straightConnector1">
             <a:avLst/>
@@ -11092,8 +11052,8 @@
         </p:nvCxnSpPr>
         <p:spPr>
           <a:xfrm flipH="1">
-            <a:off x="8035227" y="4506943"/>
-            <a:ext cx="2" cy="326733"/>
+            <a:off x="8035228" y="4406927"/>
+            <a:ext cx="2" cy="269581"/>
           </a:xfrm>
           <a:prstGeom prst="straightConnector1">
             <a:avLst/>
@@ -11140,7 +11100,7 @@
         </p:nvCxnSpPr>
         <p:spPr>
           <a:xfrm flipH="1">
-            <a:off x="8031879" y="5392647"/>
+            <a:off x="8031879" y="5235479"/>
             <a:ext cx="3348" cy="251331"/>
           </a:xfrm>
           <a:prstGeom prst="straightConnector1">
@@ -11185,7 +11145,7 @@
         </p:nvSpPr>
         <p:spPr>
           <a:xfrm>
-            <a:off x="4363443" y="8563416"/>
+            <a:off x="4363443" y="8520552"/>
             <a:ext cx="2178534" cy="809368"/>
           </a:xfrm>
           <a:prstGeom prst="diamond">
@@ -11250,7 +11210,7 @@
         </p:nvSpPr>
         <p:spPr>
           <a:xfrm>
-            <a:off x="4638671" y="8773427"/>
+            <a:off x="4638671" y="8730563"/>
             <a:ext cx="1724319" cy="430887"/>
           </a:xfrm>
           <a:prstGeom prst="rect">
@@ -11303,8 +11263,8 @@
         </p:nvCxnSpPr>
         <p:spPr>
           <a:xfrm rot="10800000" flipV="1">
-            <a:off x="3604523" y="8968100"/>
-            <a:ext cx="758920" cy="995371"/>
+            <a:off x="3054697" y="8925236"/>
+            <a:ext cx="1308747" cy="974764"/>
           </a:xfrm>
           <a:prstGeom prst="bentConnector2">
             <a:avLst/>
@@ -11352,8 +11312,8 @@
         </p:nvCxnSpPr>
         <p:spPr>
           <a:xfrm>
-            <a:off x="6541977" y="8968100"/>
-            <a:ext cx="1798435" cy="995371"/>
+            <a:off x="6541977" y="8925236"/>
+            <a:ext cx="1869312" cy="974764"/>
           </a:xfrm>
           <a:prstGeom prst="bentConnector2">
             <a:avLst/>
@@ -11397,7 +11357,7 @@
         </p:nvSpPr>
         <p:spPr>
           <a:xfrm>
-            <a:off x="2595927" y="9478091"/>
+            <a:off x="2520635" y="9377178"/>
             <a:ext cx="1597807" cy="307777"/>
           </a:xfrm>
           <a:prstGeom prst="rect">
@@ -11413,6 +11373,7 @@
           </a:bodyPr>
           <a:lstStyle/>
           <a:p>
+            <a:pPr algn="ctr"/>
             <a:r>
               <a:rPr lang="en-US" sz="1400" dirty="0">
                 <a:latin typeface="Arial" panose="020B0604020202020204" pitchFamily="34" charset="0"/>
@@ -11437,7 +11398,7 @@
         </p:nvSpPr>
         <p:spPr>
           <a:xfrm>
-            <a:off x="8002822" y="9492644"/>
+            <a:off x="7545615" y="9406916"/>
             <a:ext cx="1653225" cy="307777"/>
           </a:xfrm>
           <a:prstGeom prst="rect">
@@ -11453,6 +11414,7 @@
           </a:bodyPr>
           <a:lstStyle/>
           <a:p>
+            <a:pPr algn="ctr"/>
             <a:r>
               <a:rPr lang="en-US" sz="1400" dirty="0">
                 <a:latin typeface="Arial" panose="020B0604020202020204" pitchFamily="34" charset="0"/>
@@ -11477,7 +11439,7 @@
         </p:nvSpPr>
         <p:spPr>
           <a:xfrm>
-            <a:off x="1112536" y="5792932"/>
+            <a:off x="1112536" y="5635764"/>
             <a:ext cx="1597807" cy="261610"/>
           </a:xfrm>
           <a:prstGeom prst="rect">
@@ -11515,7 +11477,7 @@
         </p:nvSpPr>
         <p:spPr>
           <a:xfrm>
-            <a:off x="3826033" y="5785969"/>
+            <a:off x="3826033" y="5628801"/>
             <a:ext cx="1682987" cy="261610"/>
           </a:xfrm>
           <a:prstGeom prst="rect">
@@ -11557,7 +11519,7 @@
         </p:nvSpPr>
         <p:spPr>
           <a:xfrm>
-            <a:off x="6266122" y="5788562"/>
+            <a:off x="6266122" y="5631394"/>
             <a:ext cx="1597807" cy="261610"/>
           </a:xfrm>
           <a:prstGeom prst="rect">
@@ -11595,7 +11557,7 @@
         </p:nvSpPr>
         <p:spPr>
           <a:xfrm>
-            <a:off x="8968942" y="5781121"/>
+            <a:off x="8968942" y="5623953"/>
             <a:ext cx="1682987" cy="261610"/>
           </a:xfrm>
           <a:prstGeom prst="rect">
@@ -11637,7 +11599,7 @@
         </p:nvSpPr>
         <p:spPr>
           <a:xfrm>
-            <a:off x="726470" y="7793331"/>
+            <a:off x="726470" y="7579011"/>
             <a:ext cx="9449560" cy="509925"/>
           </a:xfrm>
           <a:prstGeom prst="rect">
@@ -11762,8 +11724,8 @@
         </p:nvCxnSpPr>
         <p:spPr>
           <a:xfrm>
-            <a:off x="1601804" y="7289072"/>
-            <a:ext cx="0" cy="502965"/>
+            <a:off x="1601804" y="7131904"/>
+            <a:ext cx="0" cy="432000"/>
           </a:xfrm>
           <a:prstGeom prst="straightConnector1">
             <a:avLst/>
@@ -11809,8 +11771,8 @@
         </p:nvCxnSpPr>
         <p:spPr>
           <a:xfrm flipH="1">
-            <a:off x="4193734" y="7295040"/>
-            <a:ext cx="6879" cy="496996"/>
+            <a:off x="4193734" y="7137872"/>
+            <a:ext cx="6879" cy="432000"/>
           </a:xfrm>
           <a:prstGeom prst="straightConnector1">
             <a:avLst/>
@@ -11857,8 +11819,8 @@
         </p:nvCxnSpPr>
         <p:spPr>
           <a:xfrm>
-            <a:off x="6718423" y="7289072"/>
-            <a:ext cx="0" cy="496996"/>
+            <a:off x="6718423" y="7131904"/>
+            <a:ext cx="0" cy="432000"/>
           </a:xfrm>
           <a:prstGeom prst="straightConnector1">
             <a:avLst/>
@@ -11904,8 +11866,8 @@
         </p:nvCxnSpPr>
         <p:spPr>
           <a:xfrm>
-            <a:off x="9335871" y="7280818"/>
-            <a:ext cx="0" cy="505250"/>
+            <a:off x="9335871" y="7123650"/>
+            <a:ext cx="0" cy="432000"/>
           </a:xfrm>
           <a:prstGeom prst="straightConnector1">
             <a:avLst/>
@@ -11953,8 +11915,8 @@
         </p:nvCxnSpPr>
         <p:spPr>
           <a:xfrm>
-            <a:off x="5451250" y="8303256"/>
-            <a:ext cx="1460" cy="260161"/>
+            <a:off x="5451250" y="8088936"/>
+            <a:ext cx="1460" cy="431616"/>
           </a:xfrm>
           <a:prstGeom prst="straightConnector1">
             <a:avLst/>
@@ -11998,7 +11960,7 @@
         </p:nvSpPr>
         <p:spPr>
           <a:xfrm>
-            <a:off x="9810435" y="12747097"/>
+            <a:off x="9976742" y="12677866"/>
             <a:ext cx="1047242" cy="660202"/>
           </a:xfrm>
           <a:prstGeom prst="rect">
@@ -12038,7 +12000,7 @@
           </a:bodyPr>
           <a:lstStyle/>
           <a:p>
-            <a:pPr algn="ctr"/>
+            <a:pPr algn="r"/>
             <a:r>
               <a:rPr lang="en-US" sz="1100">
                 <a:solidFill>
@@ -12103,8 +12065,8 @@
         </p:nvSpPr>
         <p:spPr>
           <a:xfrm>
-            <a:off x="6729508" y="12815197"/>
-            <a:ext cx="3209597" cy="864184"/>
+            <a:off x="6586631" y="12870000"/>
+            <a:ext cx="3643211" cy="554400"/>
           </a:xfrm>
           <a:prstGeom prst="rect">
             <a:avLst/>
@@ -12240,15 +12202,16 @@
             </a:extLst>
           </p:cNvPr>
           <p:cNvCxnSpPr>
+            <a:cxnSpLocks/>
             <a:stCxn id="20" idx="2"/>
             <a:endCxn id="42" idx="0"/>
           </p:cNvCxnSpPr>
           <p:nvPr/>
         </p:nvCxnSpPr>
         <p:spPr>
-          <a:xfrm flipH="1">
-            <a:off x="3603269" y="10601899"/>
-            <a:ext cx="1255" cy="317319"/>
+          <a:xfrm>
+            <a:off x="3054696" y="10537200"/>
+            <a:ext cx="0" cy="352800"/>
           </a:xfrm>
           <a:prstGeom prst="straightConnector1">
             <a:avLst/>
@@ -12288,15 +12251,16 @@
             </a:extLst>
           </p:cNvPr>
           <p:cNvCxnSpPr>
-            <a:stCxn id="42" idx="2"/>
+            <a:cxnSpLocks/>
+            <a:stCxn id="49" idx="2"/>
             <a:endCxn id="41" idx="0"/>
           </p:cNvCxnSpPr>
           <p:nvPr/>
         </p:nvCxnSpPr>
         <p:spPr>
-          <a:xfrm>
-            <a:off x="3603268" y="11626046"/>
-            <a:ext cx="0" cy="343246"/>
+          <a:xfrm flipH="1">
+            <a:off x="3060801" y="12517200"/>
+            <a:ext cx="1" cy="352800"/>
           </a:xfrm>
           <a:prstGeom prst="straightConnector1">
             <a:avLst/>
@@ -12336,15 +12300,16 @@
             </a:extLst>
           </p:cNvPr>
           <p:cNvCxnSpPr>
-            <a:stCxn id="41" idx="2"/>
+            <a:cxnSpLocks/>
+            <a:stCxn id="42" idx="2"/>
             <a:endCxn id="49" idx="0"/>
           </p:cNvCxnSpPr>
           <p:nvPr/>
         </p:nvCxnSpPr>
         <p:spPr>
           <a:xfrm>
-            <a:off x="3603268" y="12524519"/>
-            <a:ext cx="0" cy="290679"/>
+            <a:off x="3054696" y="11527200"/>
+            <a:ext cx="6106" cy="352800"/>
           </a:xfrm>
           <a:prstGeom prst="straightConnector1">
             <a:avLst/>
@@ -12384,15 +12349,16 @@
             </a:extLst>
           </p:cNvPr>
           <p:cNvCxnSpPr>
-            <a:stCxn id="49" idx="2"/>
+            <a:cxnSpLocks/>
+            <a:stCxn id="41" idx="2"/>
             <a:endCxn id="46" idx="0"/>
           </p:cNvCxnSpPr>
           <p:nvPr/>
         </p:nvCxnSpPr>
         <p:spPr>
           <a:xfrm>
-            <a:off x="3603268" y="13679381"/>
-            <a:ext cx="0" cy="315012"/>
+            <a:off x="3060801" y="13425226"/>
+            <a:ext cx="1" cy="340563"/>
           </a:xfrm>
           <a:prstGeom prst="straightConnector1">
             <a:avLst/>
@@ -12440,8 +12406,8 @@
         </p:nvCxnSpPr>
         <p:spPr>
           <a:xfrm>
-            <a:off x="8340412" y="10601898"/>
-            <a:ext cx="0" cy="317321"/>
+            <a:off x="8411289" y="10537200"/>
+            <a:ext cx="0" cy="352800"/>
           </a:xfrm>
           <a:prstGeom prst="straightConnector1">
             <a:avLst/>
@@ -12489,8 +12455,8 @@
         </p:nvCxnSpPr>
         <p:spPr>
           <a:xfrm flipH="1">
-            <a:off x="8334308" y="11623687"/>
-            <a:ext cx="6104" cy="345605"/>
+            <a:off x="8405185" y="11527200"/>
+            <a:ext cx="6104" cy="352800"/>
           </a:xfrm>
           <a:prstGeom prst="straightConnector1">
             <a:avLst/>
@@ -12537,9 +12503,9 @@
           <p:nvPr/>
         </p:nvCxnSpPr>
         <p:spPr>
-          <a:xfrm flipH="1">
-            <a:off x="8334307" y="12524518"/>
-            <a:ext cx="1" cy="290679"/>
+          <a:xfrm>
+            <a:off x="8405185" y="12517200"/>
+            <a:ext cx="3052" cy="352800"/>
           </a:xfrm>
           <a:prstGeom prst="straightConnector1">
             <a:avLst/>
@@ -12579,6 +12545,7 @@
             </a:extLst>
           </p:cNvPr>
           <p:cNvCxnSpPr>
+            <a:cxnSpLocks/>
             <a:stCxn id="46" idx="2"/>
             <a:endCxn id="67" idx="0"/>
           </p:cNvCxnSpPr>
@@ -12586,12 +12553,12 @@
         </p:nvCxnSpPr>
         <p:spPr>
           <a:xfrm rot="16200000" flipH="1">
-            <a:off x="4286068" y="13971795"/>
-            <a:ext cx="540153" cy="1905752"/>
+            <a:off x="3889032" y="13574759"/>
+            <a:ext cx="791759" cy="2448218"/>
           </a:xfrm>
           <a:prstGeom prst="bentConnector3">
             <a:avLst>
-              <a:gd name="adj1" fmla="val 37205"/>
+              <a:gd name="adj1" fmla="val 50000"/>
             </a:avLst>
           </a:prstGeom>
           <a:ln>
@@ -12633,7 +12600,7 @@
         </p:nvSpPr>
         <p:spPr>
           <a:xfrm>
-            <a:off x="726470" y="274769"/>
+            <a:off x="726470" y="174753"/>
             <a:ext cx="9449560" cy="509925"/>
           </a:xfrm>
           <a:prstGeom prst="rect">
@@ -12719,7 +12686,7 @@
         </p:nvSpPr>
         <p:spPr>
           <a:xfrm>
-            <a:off x="726470" y="1464498"/>
+            <a:off x="726470" y="1364482"/>
             <a:ext cx="9449560" cy="509925"/>
           </a:xfrm>
           <a:prstGeom prst="rect">
@@ -12828,7 +12795,7 @@
         </p:nvCxnSpPr>
         <p:spPr>
           <a:xfrm>
-            <a:off x="5139350" y="1387218"/>
+            <a:off x="5139350" y="1287202"/>
             <a:ext cx="9191" cy="615856"/>
           </a:xfrm>
           <a:prstGeom prst="straightConnector1">
@@ -12877,8 +12844,8 @@
         </p:nvCxnSpPr>
         <p:spPr>
           <a:xfrm flipH="1">
-            <a:off x="5600663" y="12246905"/>
-            <a:ext cx="1128845" cy="1000384"/>
+            <a:off x="5386373" y="12198600"/>
+            <a:ext cx="1200258" cy="0"/>
           </a:xfrm>
           <a:prstGeom prst="straightConnector1">
             <a:avLst/>
@@ -12903,162 +12870,55 @@
           </a:fontRef>
         </p:style>
       </p:cxnSp>
-      <p:grpSp>
-        <p:nvGrpSpPr>
-          <p:cNvPr id="287" name="Group 286">
+      <p:cxnSp>
+        <p:nvCxnSpPr>
+          <p:cNvPr id="130" name="Elbow Connector 129">
             <a:extLst>
               <a:ext uri="{FF2B5EF4-FFF2-40B4-BE49-F238E27FC236}">
-                <a16:creationId xmlns:a16="http://schemas.microsoft.com/office/drawing/2014/main" id="{7CD72A42-C0AF-0745-AF8F-11F040D5D33C}"/>
+                <a16:creationId xmlns:a16="http://schemas.microsoft.com/office/drawing/2014/main" id="{E71C4AA7-F70C-1C42-88BD-E7CE736EEF46}"/>
               </a:ext>
             </a:extLst>
           </p:cNvPr>
-          <p:cNvGrpSpPr/>
+          <p:cNvCxnSpPr>
+            <a:cxnSpLocks/>
+          </p:cNvCxnSpPr>
           <p:nvPr/>
-        </p:nvGrpSpPr>
-        <p:grpSpPr>
-          <a:xfrm>
-            <a:off x="5736492" y="13679381"/>
-            <a:ext cx="2597815" cy="1515367"/>
-            <a:chOff x="5736492" y="13679381"/>
-            <a:chExt cx="2597815" cy="1515367"/>
-          </a:xfrm>
-        </p:grpSpPr>
-        <p:cxnSp>
-          <p:nvCxnSpPr>
-            <p:cNvPr id="279" name="Straight Connector 278">
-              <a:extLst>
-                <a:ext uri="{FF2B5EF4-FFF2-40B4-BE49-F238E27FC236}">
-                  <a16:creationId xmlns:a16="http://schemas.microsoft.com/office/drawing/2014/main" id="{8551A391-800D-B14C-9E39-6D6A64D57429}"/>
-                </a:ext>
-              </a:extLst>
-            </p:cNvPr>
-            <p:cNvCxnSpPr>
-              <a:stCxn id="56" idx="2"/>
-            </p:cNvCxnSpPr>
-            <p:nvPr/>
-          </p:nvCxnSpPr>
-          <p:spPr>
-            <a:xfrm>
-              <a:off x="8334307" y="13679381"/>
-              <a:ext cx="0" cy="1179619"/>
-            </a:xfrm>
-            <a:prstGeom prst="line">
-              <a:avLst/>
-            </a:prstGeom>
-            <a:ln>
-              <a:solidFill>
-                <a:schemeClr val="tx1">
-                  <a:lumMod val="75000"/>
-                  <a:lumOff val="25000"/>
-                </a:schemeClr>
-              </a:solidFill>
-            </a:ln>
-          </p:spPr>
-          <p:style>
-            <a:lnRef idx="1">
-              <a:schemeClr val="accent1"/>
-            </a:lnRef>
-            <a:fillRef idx="0">
-              <a:schemeClr val="accent1"/>
-            </a:fillRef>
-            <a:effectRef idx="0">
-              <a:schemeClr val="accent1"/>
-            </a:effectRef>
-            <a:fontRef idx="minor">
-              <a:schemeClr val="tx1"/>
-            </a:fontRef>
-          </p:style>
-        </p:cxnSp>
-        <p:cxnSp>
-          <p:nvCxnSpPr>
-            <p:cNvPr id="283" name="Straight Arrow Connector 282">
-              <a:extLst>
-                <a:ext uri="{FF2B5EF4-FFF2-40B4-BE49-F238E27FC236}">
-                  <a16:creationId xmlns:a16="http://schemas.microsoft.com/office/drawing/2014/main" id="{88F02C1D-8B35-9149-A91B-D6973CB5DF80}"/>
-                </a:ext>
-              </a:extLst>
-            </p:cNvPr>
-            <p:cNvCxnSpPr/>
-            <p:nvPr/>
-          </p:nvCxnSpPr>
-          <p:spPr>
-            <a:xfrm>
-              <a:off x="5736492" y="14859000"/>
-              <a:ext cx="0" cy="335748"/>
-            </a:xfrm>
-            <a:prstGeom prst="straightConnector1">
-              <a:avLst/>
-            </a:prstGeom>
-            <a:ln>
-              <a:solidFill>
-                <a:schemeClr val="tx1">
-                  <a:lumMod val="75000"/>
-                  <a:lumOff val="25000"/>
-                </a:schemeClr>
-              </a:solidFill>
-              <a:tailEnd type="triangle"/>
-            </a:ln>
-          </p:spPr>
-          <p:style>
-            <a:lnRef idx="1">
-              <a:schemeClr val="accent1"/>
-            </a:lnRef>
-            <a:fillRef idx="0">
-              <a:schemeClr val="accent1"/>
-            </a:fillRef>
-            <a:effectRef idx="0">
-              <a:schemeClr val="accent1"/>
-            </a:effectRef>
-            <a:fontRef idx="minor">
-              <a:schemeClr val="tx1"/>
-            </a:fontRef>
-          </p:style>
-        </p:cxnSp>
-        <p:cxnSp>
-          <p:nvCxnSpPr>
-            <p:cNvPr id="285" name="Straight Connector 284">
-              <a:extLst>
-                <a:ext uri="{FF2B5EF4-FFF2-40B4-BE49-F238E27FC236}">
-                  <a16:creationId xmlns:a16="http://schemas.microsoft.com/office/drawing/2014/main" id="{4B3226FD-7EE9-1949-8EC5-ABA14E896806}"/>
-                </a:ext>
-              </a:extLst>
-            </p:cNvPr>
-            <p:cNvCxnSpPr/>
-            <p:nvPr/>
-          </p:nvCxnSpPr>
-          <p:spPr>
-            <a:xfrm>
-              <a:off x="5736492" y="14859000"/>
-              <a:ext cx="2597815" cy="0"/>
-            </a:xfrm>
-            <a:prstGeom prst="line">
-              <a:avLst/>
-            </a:prstGeom>
-            <a:ln>
-              <a:solidFill>
-                <a:schemeClr val="tx1">
-                  <a:lumMod val="75000"/>
-                  <a:lumOff val="25000"/>
-                </a:schemeClr>
-              </a:solidFill>
-            </a:ln>
-          </p:spPr>
-          <p:style>
-            <a:lnRef idx="1">
-              <a:schemeClr val="accent1"/>
-            </a:lnRef>
-            <a:fillRef idx="0">
-              <a:schemeClr val="accent1"/>
-            </a:fillRef>
-            <a:effectRef idx="0">
-              <a:schemeClr val="accent1"/>
-            </a:effectRef>
-            <a:fontRef idx="minor">
-              <a:schemeClr val="tx1"/>
-            </a:fontRef>
-          </p:style>
-        </p:cxnSp>
-      </p:grpSp>
+        </p:nvCxnSpPr>
+        <p:spPr>
+          <a:xfrm rot="5400000">
+            <a:off x="6253200" y="13041000"/>
+            <a:ext cx="1771200" cy="2538000"/>
+          </a:xfrm>
+          <a:prstGeom prst="bentConnector3">
+            <a:avLst>
+              <a:gd name="adj1" fmla="val 50000"/>
+            </a:avLst>
+          </a:prstGeom>
+          <a:ln>
+            <a:solidFill>
+              <a:schemeClr val="tx1">
+                <a:lumMod val="75000"/>
+                <a:lumOff val="25000"/>
+              </a:schemeClr>
+            </a:solidFill>
+            <a:tailEnd type="triangle"/>
+          </a:ln>
+        </p:spPr>
+        <p:style>
+          <a:lnRef idx="1">
+            <a:schemeClr val="accent1"/>
+          </a:lnRef>
+          <a:fillRef idx="0">
+            <a:schemeClr val="accent1"/>
+          </a:fillRef>
+          <a:effectRef idx="0">
+            <a:schemeClr val="accent1"/>
+          </a:effectRef>
+          <a:fontRef idx="minor">
+            <a:schemeClr val="tx1"/>
+          </a:fontRef>
+        </p:style>
+      </p:cxnSp>
     </p:spTree>
     <p:extLst>
       <p:ext uri="{BB962C8B-B14F-4D97-AF65-F5344CB8AC3E}">

</xml_diff>

<commit_message>
Add new z/OSMF workflow
Signed-off-by: nannanli <nannanli@cn.ibm.com>
</commit_message>
<xml_diff>
--- a/docs/images/common/zowe-zos-install-diagram.pptx
+++ b/docs/images/common/zowe-zos-install-diagram.pptx
@@ -244,7 +244,7 @@
           <a:p>
             <a:fld id="{C4A90A56-7146-D847-92E1-256101539D4D}" type="datetimeFigureOut">
               <a:rPr lang="en-US" smtClean="0"/>
-              <a:t>6/2/20</a:t>
+              <a:t>11/4/20</a:t>
             </a:fld>
             <a:endParaRPr lang="en-US"/>
           </a:p>
@@ -414,7 +414,7 @@
           <a:p>
             <a:fld id="{C4A90A56-7146-D847-92E1-256101539D4D}" type="datetimeFigureOut">
               <a:rPr lang="en-US" smtClean="0"/>
-              <a:t>6/2/20</a:t>
+              <a:t>11/4/20</a:t>
             </a:fld>
             <a:endParaRPr lang="en-US"/>
           </a:p>
@@ -594,7 +594,7 @@
           <a:p>
             <a:fld id="{C4A90A56-7146-D847-92E1-256101539D4D}" type="datetimeFigureOut">
               <a:rPr lang="en-US" smtClean="0"/>
-              <a:t>6/2/20</a:t>
+              <a:t>11/4/20</a:t>
             </a:fld>
             <a:endParaRPr lang="en-US"/>
           </a:p>
@@ -764,7 +764,7 @@
           <a:p>
             <a:fld id="{C4A90A56-7146-D847-92E1-256101539D4D}" type="datetimeFigureOut">
               <a:rPr lang="en-US" smtClean="0"/>
-              <a:t>6/2/20</a:t>
+              <a:t>11/4/20</a:t>
             </a:fld>
             <a:endParaRPr lang="en-US"/>
           </a:p>
@@ -1008,7 +1008,7 @@
           <a:p>
             <a:fld id="{C4A90A56-7146-D847-92E1-256101539D4D}" type="datetimeFigureOut">
               <a:rPr lang="en-US" smtClean="0"/>
-              <a:t>6/2/20</a:t>
+              <a:t>11/4/20</a:t>
             </a:fld>
             <a:endParaRPr lang="en-US"/>
           </a:p>
@@ -1240,7 +1240,7 @@
           <a:p>
             <a:fld id="{C4A90A56-7146-D847-92E1-256101539D4D}" type="datetimeFigureOut">
               <a:rPr lang="en-US" smtClean="0"/>
-              <a:t>6/2/20</a:t>
+              <a:t>11/4/20</a:t>
             </a:fld>
             <a:endParaRPr lang="en-US"/>
           </a:p>
@@ -1607,7 +1607,7 @@
           <a:p>
             <a:fld id="{C4A90A56-7146-D847-92E1-256101539D4D}" type="datetimeFigureOut">
               <a:rPr lang="en-US" smtClean="0"/>
-              <a:t>6/2/20</a:t>
+              <a:t>11/4/20</a:t>
             </a:fld>
             <a:endParaRPr lang="en-US"/>
           </a:p>
@@ -1725,7 +1725,7 @@
           <a:p>
             <a:fld id="{C4A90A56-7146-D847-92E1-256101539D4D}" type="datetimeFigureOut">
               <a:rPr lang="en-US" smtClean="0"/>
-              <a:t>6/2/20</a:t>
+              <a:t>11/4/20</a:t>
             </a:fld>
             <a:endParaRPr lang="en-US"/>
           </a:p>
@@ -1820,7 +1820,7 @@
           <a:p>
             <a:fld id="{C4A90A56-7146-D847-92E1-256101539D4D}" type="datetimeFigureOut">
               <a:rPr lang="en-US" smtClean="0"/>
-              <a:t>6/2/20</a:t>
+              <a:t>11/4/20</a:t>
             </a:fld>
             <a:endParaRPr lang="en-US"/>
           </a:p>
@@ -2097,7 +2097,7 @@
           <a:p>
             <a:fld id="{C4A90A56-7146-D847-92E1-256101539D4D}" type="datetimeFigureOut">
               <a:rPr lang="en-US" smtClean="0"/>
-              <a:t>6/2/20</a:t>
+              <a:t>11/4/20</a:t>
             </a:fld>
             <a:endParaRPr lang="en-US"/>
           </a:p>
@@ -2354,7 +2354,7 @@
           <a:p>
             <a:fld id="{C4A90A56-7146-D847-92E1-256101539D4D}" type="datetimeFigureOut">
               <a:rPr lang="en-US" smtClean="0"/>
-              <a:t>6/2/20</a:t>
+              <a:t>11/4/20</a:t>
             </a:fld>
             <a:endParaRPr lang="en-US"/>
           </a:p>
@@ -2567,7 +2567,7 @@
           <a:p>
             <a:fld id="{C4A90A56-7146-D847-92E1-256101539D4D}" type="datetimeFigureOut">
               <a:rPr lang="en-US" smtClean="0"/>
-              <a:t>6/2/20</a:t>
+              <a:t>11/4/20</a:t>
             </a:fld>
             <a:endParaRPr lang="en-US"/>
           </a:p>
@@ -10104,7 +10104,27 @@
                 <a:latin typeface="Arial" panose="020B0604020202020204" pitchFamily="34" charset="0"/>
                 <a:cs typeface="Arial" panose="020B0604020202020204" pitchFamily="34" charset="0"/>
               </a:rPr>
-              <a:t>Workflow in progress, use script instead</a:t>
+              <a:t>ZWEWRF0</a:t>
+            </a:r>
+            <a:r>
+              <a:rPr lang="en-US" altLang="zh-CN" sz="1100" b="1" dirty="0">
+                <a:solidFill>
+                  <a:schemeClr val="tx1"/>
+                </a:solidFill>
+                <a:latin typeface="Arial" panose="020B0604020202020204" pitchFamily="34" charset="0"/>
+                <a:cs typeface="Arial" panose="020B0604020202020204" pitchFamily="34" charset="0"/>
+              </a:rPr>
+              <a:t>6</a:t>
+            </a:r>
+            <a:r>
+              <a:rPr lang="en-US" sz="1100" b="1" dirty="0">
+                <a:solidFill>
+                  <a:schemeClr val="tx1"/>
+                </a:solidFill>
+                <a:latin typeface="Arial" panose="020B0604020202020204" pitchFamily="34" charset="0"/>
+                <a:cs typeface="Arial" panose="020B0604020202020204" pitchFamily="34" charset="0"/>
+              </a:rPr>
+              <a:t>.xml</a:t>
             </a:r>
             <a:r>
               <a:rPr lang="en-US" sz="1100" dirty="0">
@@ -12808,50 +12828,6 @@
                 <a:lumOff val="25000"/>
               </a:schemeClr>
             </a:solidFill>
-            <a:tailEnd type="triangle"/>
-          </a:ln>
-        </p:spPr>
-        <p:style>
-          <a:lnRef idx="1">
-            <a:schemeClr val="accent1"/>
-          </a:lnRef>
-          <a:fillRef idx="0">
-            <a:schemeClr val="accent1"/>
-          </a:fillRef>
-          <a:effectRef idx="0">
-            <a:schemeClr val="accent1"/>
-          </a:effectRef>
-          <a:fontRef idx="minor">
-            <a:schemeClr val="tx1"/>
-          </a:fontRef>
-        </p:style>
-      </p:cxnSp>
-      <p:cxnSp>
-        <p:nvCxnSpPr>
-          <p:cNvPr id="253" name="Straight Arrow Connector 252">
-            <a:extLst>
-              <a:ext uri="{FF2B5EF4-FFF2-40B4-BE49-F238E27FC236}">
-                <a16:creationId xmlns:a16="http://schemas.microsoft.com/office/drawing/2014/main" id="{A65513EA-C2E7-F842-88B8-79D7D4791BDF}"/>
-              </a:ext>
-            </a:extLst>
-          </p:cNvPr>
-          <p:cNvCxnSpPr>
-            <a:cxnSpLocks/>
-            <a:stCxn id="77" idx="1"/>
-            <a:endCxn id="49" idx="3"/>
-          </p:cNvCxnSpPr>
-          <p:nvPr/>
-        </p:nvCxnSpPr>
-        <p:spPr>
-          <a:xfrm flipH="1">
-            <a:off x="5386373" y="12198600"/>
-            <a:ext cx="1200258" cy="0"/>
-          </a:xfrm>
-          <a:prstGeom prst="straightConnector1">
-            <a:avLst/>
-          </a:prstGeom>
-          <a:ln>
-            <a:prstDash val="dash"/>
             <a:tailEnd type="triangle"/>
           </a:ln>
         </p:spPr>

</xml_diff>

<commit_message>
WIP: Zowe HA Installation Roadmap
Signed-off-by: Nayer Najafi <nayer.najafi@ibm.com>
</commit_message>
<xml_diff>
--- a/docs/images/common/zowe-zos-install-diagram.pptx
+++ b/docs/images/common/zowe-zos-install-diagram.pptx
@@ -17164,7 +17164,27 @@
                 <a:latin typeface="Arial" panose="020B0604020202020204" pitchFamily="34" charset="0"/>
                 <a:cs typeface="Arial" panose="020B0604020202020204" pitchFamily="34" charset="0"/>
               </a:rPr>
-              <a:t>(One-time setup per z/OS environment) </a:t>
+              <a:t>(One-time setup per </a:t>
+            </a:r>
+            <a:r>
+              <a:rPr lang="en-US" altLang="zh-CN" sz="1100">
+                <a:solidFill>
+                  <a:schemeClr val="tx1"/>
+                </a:solidFill>
+                <a:latin typeface="Arial" panose="020B0604020202020204" pitchFamily="34" charset="0"/>
+                <a:cs typeface="Arial" panose="020B0604020202020204" pitchFamily="34" charset="0"/>
+              </a:rPr>
+              <a:t>Sysplex </a:t>
+            </a:r>
+            <a:r>
+              <a:rPr lang="en-US" altLang="zh-CN" sz="1100" dirty="0">
+                <a:solidFill>
+                  <a:schemeClr val="tx1"/>
+                </a:solidFill>
+                <a:latin typeface="Arial" panose="020B0604020202020204" pitchFamily="34" charset="0"/>
+                <a:cs typeface="Arial" panose="020B0604020202020204" pitchFamily="34" charset="0"/>
+              </a:rPr>
+              <a:t>environment) </a:t>
             </a:r>
             <a:endParaRPr lang="en-US" sz="1100" dirty="0">
               <a:solidFill>

</xml_diff>

<commit_message>
changes to HA installation roadmap, Zowe started task
Signed-off-by: Nayer Najafi <nayer.najafi@ibm.com>
</commit_message>
<xml_diff>
--- a/docs/images/common/zowe-zos-install-diagram.pptx
+++ b/docs/images/common/zowe-zos-install-diagram.pptx
@@ -245,7 +245,7 @@
           <a:p>
             <a:fld id="{C4A90A56-7146-D847-92E1-256101539D4D}" type="datetimeFigureOut">
               <a:rPr lang="en-US" smtClean="0"/>
-              <a:t>6/1/2021</a:t>
+              <a:t>6/7/2021</a:t>
             </a:fld>
             <a:endParaRPr lang="en-US"/>
           </a:p>
@@ -415,7 +415,7 @@
           <a:p>
             <a:fld id="{C4A90A56-7146-D847-92E1-256101539D4D}" type="datetimeFigureOut">
               <a:rPr lang="en-US" smtClean="0"/>
-              <a:t>6/1/2021</a:t>
+              <a:t>6/7/2021</a:t>
             </a:fld>
             <a:endParaRPr lang="en-US"/>
           </a:p>
@@ -595,7 +595,7 @@
           <a:p>
             <a:fld id="{C4A90A56-7146-D847-92E1-256101539D4D}" type="datetimeFigureOut">
               <a:rPr lang="en-US" smtClean="0"/>
-              <a:t>6/1/2021</a:t>
+              <a:t>6/7/2021</a:t>
             </a:fld>
             <a:endParaRPr lang="en-US"/>
           </a:p>
@@ -765,7 +765,7 @@
           <a:p>
             <a:fld id="{C4A90A56-7146-D847-92E1-256101539D4D}" type="datetimeFigureOut">
               <a:rPr lang="en-US" smtClean="0"/>
-              <a:t>6/1/2021</a:t>
+              <a:t>6/7/2021</a:t>
             </a:fld>
             <a:endParaRPr lang="en-US"/>
           </a:p>
@@ -1009,7 +1009,7 @@
           <a:p>
             <a:fld id="{C4A90A56-7146-D847-92E1-256101539D4D}" type="datetimeFigureOut">
               <a:rPr lang="en-US" smtClean="0"/>
-              <a:t>6/1/2021</a:t>
+              <a:t>6/7/2021</a:t>
             </a:fld>
             <a:endParaRPr lang="en-US"/>
           </a:p>
@@ -1241,7 +1241,7 @@
           <a:p>
             <a:fld id="{C4A90A56-7146-D847-92E1-256101539D4D}" type="datetimeFigureOut">
               <a:rPr lang="en-US" smtClean="0"/>
-              <a:t>6/1/2021</a:t>
+              <a:t>6/7/2021</a:t>
             </a:fld>
             <a:endParaRPr lang="en-US"/>
           </a:p>
@@ -1608,7 +1608,7 @@
           <a:p>
             <a:fld id="{C4A90A56-7146-D847-92E1-256101539D4D}" type="datetimeFigureOut">
               <a:rPr lang="en-US" smtClean="0"/>
-              <a:t>6/1/2021</a:t>
+              <a:t>6/7/2021</a:t>
             </a:fld>
             <a:endParaRPr lang="en-US"/>
           </a:p>
@@ -1726,7 +1726,7 @@
           <a:p>
             <a:fld id="{C4A90A56-7146-D847-92E1-256101539D4D}" type="datetimeFigureOut">
               <a:rPr lang="en-US" smtClean="0"/>
-              <a:t>6/1/2021</a:t>
+              <a:t>6/7/2021</a:t>
             </a:fld>
             <a:endParaRPr lang="en-US"/>
           </a:p>
@@ -1821,7 +1821,7 @@
           <a:p>
             <a:fld id="{C4A90A56-7146-D847-92E1-256101539D4D}" type="datetimeFigureOut">
               <a:rPr lang="en-US" smtClean="0"/>
-              <a:t>6/1/2021</a:t>
+              <a:t>6/7/2021</a:t>
             </a:fld>
             <a:endParaRPr lang="en-US"/>
           </a:p>
@@ -2098,7 +2098,7 @@
           <a:p>
             <a:fld id="{C4A90A56-7146-D847-92E1-256101539D4D}" type="datetimeFigureOut">
               <a:rPr lang="en-US" smtClean="0"/>
-              <a:t>6/1/2021</a:t>
+              <a:t>6/7/2021</a:t>
             </a:fld>
             <a:endParaRPr lang="en-US"/>
           </a:p>
@@ -2355,7 +2355,7 @@
           <a:p>
             <a:fld id="{C4A90A56-7146-D847-92E1-256101539D4D}" type="datetimeFigureOut">
               <a:rPr lang="en-US" smtClean="0"/>
-              <a:t>6/1/2021</a:t>
+              <a:t>6/7/2021</a:t>
             </a:fld>
             <a:endParaRPr lang="en-US"/>
           </a:p>
@@ -2568,7 +2568,7 @@
           <a:p>
             <a:fld id="{C4A90A56-7146-D847-92E1-256101539D4D}" type="datetimeFigureOut">
               <a:rPr lang="en-US" smtClean="0"/>
-              <a:t>6/1/2021</a:t>
+              <a:t>6/7/2021</a:t>
             </a:fld>
             <a:endParaRPr lang="en-US"/>
           </a:p>
@@ -14311,7 +14311,7 @@
               <a:t> </a:t>
             </a:r>
             <a:r>
-              <a:rPr lang="en-US" altLang="zh-CN" sz="1100" dirty="0" err="1">
+              <a:rPr lang="en-US" altLang="zh-CN" sz="1100" dirty="0">
                 <a:solidFill>
                   <a:schemeClr val="tx1"/>
                 </a:solidFill>
@@ -14331,7 +14331,17 @@
               <a:t> </a:t>
             </a:r>
             <a:r>
-              <a:rPr lang="en-US" altLang="zh-CN" sz="1100" dirty="0">
+              <a:rPr lang="en-CA" altLang="zh-CN" sz="1100">
+                <a:solidFill>
+                  <a:schemeClr val="tx1"/>
+                </a:solidFill>
+                <a:latin typeface="Arial" panose="020B0604020202020204" pitchFamily="34" charset="0"/>
+                <a:cs typeface="Arial" panose="020B0604020202020204" pitchFamily="34" charset="0"/>
+              </a:rPr>
+              <a:t>high availability </a:t>
+            </a:r>
+            <a:r>
+              <a:rPr lang="en-US" altLang="zh-CN" sz="1100">
                 <a:solidFill>
                   <a:schemeClr val="tx1"/>
                 </a:solidFill>
@@ -17700,27 +17710,7 @@
                 <a:latin typeface="Arial" panose="020B0604020202020204" pitchFamily="34" charset="0"/>
                 <a:cs typeface="Arial" panose="020B0604020202020204" pitchFamily="34" charset="0"/>
               </a:rPr>
-              <a:t>Convert </a:t>
-            </a:r>
-            <a:r>
-              <a:rPr lang="en-CA" altLang="zh-CN" sz="1100" dirty="0" err="1">
-                <a:solidFill>
-                  <a:schemeClr val="tx1"/>
-                </a:solidFill>
-                <a:latin typeface="Arial" panose="020B0604020202020204" pitchFamily="34" charset="0"/>
-                <a:cs typeface="Arial" panose="020B0604020202020204" pitchFamily="34" charset="0"/>
-              </a:rPr>
-              <a:t>instance.env</a:t>
-            </a:r>
-            <a:r>
-              <a:rPr lang="en-CA" altLang="zh-CN" sz="1100" dirty="0">
-                <a:solidFill>
-                  <a:schemeClr val="tx1"/>
-                </a:solidFill>
-                <a:latin typeface="Arial" panose="020B0604020202020204" pitchFamily="34" charset="0"/>
-                <a:cs typeface="Arial" panose="020B0604020202020204" pitchFamily="34" charset="0"/>
-              </a:rPr>
-              <a:t> to </a:t>
+              <a:t>Create and customize </a:t>
             </a:r>
             <a:r>
               <a:rPr lang="en-US" sz="1100" dirty="0" err="1">
@@ -17740,7 +17730,7 @@
                 <a:latin typeface="Arial" panose="020B0604020202020204" pitchFamily="34" charset="0"/>
                 <a:cs typeface="Arial" panose="020B0604020202020204" pitchFamily="34" charset="0"/>
               </a:rPr>
-              <a:t> format</a:t>
+              <a:t> configuration file</a:t>
             </a:r>
           </a:p>
           <a:p>

</xml_diff>

<commit_message>
Update ZE RNs Update the zos install rdmap diagram
Signed-off-by: ik673626 <igor.kazmyr@broadcom.com>
</commit_message>
<xml_diff>
--- a/docs/images/common/zowe-zos-install-diagram.pptx
+++ b/docs/images/common/zowe-zos-install-diagram.pptx
@@ -245,7 +245,7 @@
           <a:p>
             <a:fld id="{C4A90A56-7146-D847-92E1-256101539D4D}" type="datetimeFigureOut">
               <a:rPr lang="en-US" smtClean="0"/>
-              <a:t>6/7/2021</a:t>
+              <a:t>12/2/2021</a:t>
             </a:fld>
             <a:endParaRPr lang="en-US"/>
           </a:p>
@@ -415,7 +415,7 @@
           <a:p>
             <a:fld id="{C4A90A56-7146-D847-92E1-256101539D4D}" type="datetimeFigureOut">
               <a:rPr lang="en-US" smtClean="0"/>
-              <a:t>6/7/2021</a:t>
+              <a:t>12/2/2021</a:t>
             </a:fld>
             <a:endParaRPr lang="en-US"/>
           </a:p>
@@ -595,7 +595,7 @@
           <a:p>
             <a:fld id="{C4A90A56-7146-D847-92E1-256101539D4D}" type="datetimeFigureOut">
               <a:rPr lang="en-US" smtClean="0"/>
-              <a:t>6/7/2021</a:t>
+              <a:t>12/2/2021</a:t>
             </a:fld>
             <a:endParaRPr lang="en-US"/>
           </a:p>
@@ -765,7 +765,7 @@
           <a:p>
             <a:fld id="{C4A90A56-7146-D847-92E1-256101539D4D}" type="datetimeFigureOut">
               <a:rPr lang="en-US" smtClean="0"/>
-              <a:t>6/7/2021</a:t>
+              <a:t>12/2/2021</a:t>
             </a:fld>
             <a:endParaRPr lang="en-US"/>
           </a:p>
@@ -1009,7 +1009,7 @@
           <a:p>
             <a:fld id="{C4A90A56-7146-D847-92E1-256101539D4D}" type="datetimeFigureOut">
               <a:rPr lang="en-US" smtClean="0"/>
-              <a:t>6/7/2021</a:t>
+              <a:t>12/2/2021</a:t>
             </a:fld>
             <a:endParaRPr lang="en-US"/>
           </a:p>
@@ -1241,7 +1241,7 @@
           <a:p>
             <a:fld id="{C4A90A56-7146-D847-92E1-256101539D4D}" type="datetimeFigureOut">
               <a:rPr lang="en-US" smtClean="0"/>
-              <a:t>6/7/2021</a:t>
+              <a:t>12/2/2021</a:t>
             </a:fld>
             <a:endParaRPr lang="en-US"/>
           </a:p>
@@ -1608,7 +1608,7 @@
           <a:p>
             <a:fld id="{C4A90A56-7146-D847-92E1-256101539D4D}" type="datetimeFigureOut">
               <a:rPr lang="en-US" smtClean="0"/>
-              <a:t>6/7/2021</a:t>
+              <a:t>12/2/2021</a:t>
             </a:fld>
             <a:endParaRPr lang="en-US"/>
           </a:p>
@@ -1726,7 +1726,7 @@
           <a:p>
             <a:fld id="{C4A90A56-7146-D847-92E1-256101539D4D}" type="datetimeFigureOut">
               <a:rPr lang="en-US" smtClean="0"/>
-              <a:t>6/7/2021</a:t>
+              <a:t>12/2/2021</a:t>
             </a:fld>
             <a:endParaRPr lang="en-US"/>
           </a:p>
@@ -1821,7 +1821,7 @@
           <a:p>
             <a:fld id="{C4A90A56-7146-D847-92E1-256101539D4D}" type="datetimeFigureOut">
               <a:rPr lang="en-US" smtClean="0"/>
-              <a:t>6/7/2021</a:t>
+              <a:t>12/2/2021</a:t>
             </a:fld>
             <a:endParaRPr lang="en-US"/>
           </a:p>
@@ -2098,7 +2098,7 @@
           <a:p>
             <a:fld id="{C4A90A56-7146-D847-92E1-256101539D4D}" type="datetimeFigureOut">
               <a:rPr lang="en-US" smtClean="0"/>
-              <a:t>6/7/2021</a:t>
+              <a:t>12/2/2021</a:t>
             </a:fld>
             <a:endParaRPr lang="en-US"/>
           </a:p>
@@ -2355,7 +2355,7 @@
           <a:p>
             <a:fld id="{C4A90A56-7146-D847-92E1-256101539D4D}" type="datetimeFigureOut">
               <a:rPr lang="en-US" smtClean="0"/>
-              <a:t>6/7/2021</a:t>
+              <a:t>12/2/2021</a:t>
             </a:fld>
             <a:endParaRPr lang="en-US"/>
           </a:p>
@@ -2568,7 +2568,7 @@
           <a:p>
             <a:fld id="{C4A90A56-7146-D847-92E1-256101539D4D}" type="datetimeFigureOut">
               <a:rPr lang="en-US" smtClean="0"/>
-              <a:t>6/7/2021</a:t>
+              <a:t>12/2/2021</a:t>
             </a:fld>
             <a:endParaRPr lang="en-US"/>
           </a:p>
@@ -7286,6 +7286,14 @@
   <p:clrMapOvr>
     <a:masterClrMapping/>
   </p:clrMapOvr>
+  <mc:AlternateContent xmlns:mc="http://schemas.openxmlformats.org/markup-compatibility/2006">
+    <mc:Choice xmlns:p14="http://schemas.microsoft.com/office/powerpoint/2010/main" Requires="p14">
+      <p:transition spd="slow" p14:dur="2000"/>
+    </mc:Choice>
+    <mc:Fallback>
+      <p:transition spd="slow"/>
+    </mc:Fallback>
+  </mc:AlternateContent>
 </p:sld>
 </file>
 
@@ -7640,7 +7648,7 @@
         </p:nvSpPr>
         <p:spPr>
           <a:xfrm>
-            <a:off x="6913585" y="3847956"/>
+            <a:off x="4053337" y="4146586"/>
             <a:ext cx="2243289" cy="558971"/>
           </a:xfrm>
           <a:prstGeom prst="rect">
@@ -7711,7 +7719,7 @@
         </p:nvSpPr>
         <p:spPr>
           <a:xfrm>
-            <a:off x="1790098" y="3843937"/>
+            <a:off x="1068883" y="3767003"/>
             <a:ext cx="2250655" cy="558971"/>
           </a:xfrm>
           <a:prstGeom prst="rect">
@@ -7782,7 +7790,7 @@
         </p:nvSpPr>
         <p:spPr>
           <a:xfrm>
-            <a:off x="6913585" y="4676508"/>
+            <a:off x="4053341" y="4857687"/>
             <a:ext cx="2243285" cy="558971"/>
           </a:xfrm>
           <a:prstGeom prst="rect">
@@ -7853,7 +7861,7 @@
         </p:nvSpPr>
         <p:spPr>
           <a:xfrm>
-            <a:off x="5878264" y="6393174"/>
+            <a:off x="2727644" y="6424169"/>
             <a:ext cx="1680319" cy="738730"/>
           </a:xfrm>
           <a:prstGeom prst="rect">
@@ -7944,7 +7952,7 @@
         </p:nvSpPr>
         <p:spPr>
           <a:xfrm>
-            <a:off x="726470" y="6374335"/>
+            <a:off x="1318877" y="4468926"/>
             <a:ext cx="1750668" cy="757568"/>
           </a:xfrm>
           <a:prstGeom prst="rect">
@@ -8140,7 +8148,7 @@
         </p:nvSpPr>
         <p:spPr>
           <a:xfrm>
-            <a:off x="6545505" y="3285456"/>
+            <a:off x="5145216" y="3894670"/>
             <a:ext cx="1682987" cy="261610"/>
           </a:xfrm>
           <a:prstGeom prst="rect">
@@ -10348,8 +10356,8 @@
         </p:nvCxnSpPr>
         <p:spPr>
           <a:xfrm rot="10800000" flipV="1">
-            <a:off x="2915426" y="3553835"/>
-            <a:ext cx="979688" cy="290101"/>
+            <a:off x="2194212" y="3553835"/>
+            <a:ext cx="1700903" cy="213167"/>
           </a:xfrm>
           <a:prstGeom prst="bentConnector2">
             <a:avLst/>
@@ -10389,18 +10397,20 @@
             </a:extLst>
           </p:cNvPr>
           <p:cNvCxnSpPr>
-            <a:stCxn id="10" idx="3"/>
+            <a:stCxn id="10" idx="2"/>
             <a:endCxn id="14" idx="0"/>
           </p:cNvCxnSpPr>
           <p:nvPr/>
         </p:nvCxnSpPr>
         <p:spPr>
-          <a:xfrm>
-            <a:off x="6454853" y="3553837"/>
-            <a:ext cx="1580377" cy="294119"/>
-          </a:xfrm>
-          <a:prstGeom prst="bentConnector2">
-            <a:avLst/>
+          <a:xfrm rot="5400000">
+            <a:off x="5080950" y="4052553"/>
+            <a:ext cx="188066" cy="1"/>
+          </a:xfrm>
+          <a:prstGeom prst="bentConnector3">
+            <a:avLst>
+              <a:gd name="adj1" fmla="val 50000"/>
+            </a:avLst>
           </a:prstGeom>
           <a:ln>
             <a:solidFill>
@@ -10429,10 +10439,10 @@
       </p:cxnSp>
       <p:sp>
         <p:nvSpPr>
-          <p:cNvPr id="79" name="Diamond 78">
-            <a:extLst>
-              <a:ext uri="{FF2B5EF4-FFF2-40B4-BE49-F238E27FC236}">
-                <a16:creationId xmlns:a16="http://schemas.microsoft.com/office/drawing/2014/main" id="{2CF7BA5B-051A-824D-BB4E-19BCE3D5E01C}"/>
+          <p:cNvPr id="81" name="Rectangle 80">
+            <a:extLst>
+              <a:ext uri="{FF2B5EF4-FFF2-40B4-BE49-F238E27FC236}">
+                <a16:creationId xmlns:a16="http://schemas.microsoft.com/office/drawing/2014/main" id="{A15D5C73-9738-BC4F-876C-19B0559D4357}"/>
               </a:ext>
             </a:extLst>
           </p:cNvPr>
@@ -10441,7 +10451,59 @@
         </p:nvSpPr>
         <p:spPr>
           <a:xfrm>
-            <a:off x="1807142" y="5492692"/>
+            <a:off x="4302729" y="5745730"/>
+            <a:ext cx="1724319" cy="430887"/>
+          </a:xfrm>
+          <a:prstGeom prst="rect">
+            <a:avLst/>
+          </a:prstGeom>
+        </p:spPr>
+        <p:txBody>
+          <a:bodyPr wrap="square">
+            <a:spAutoFit/>
+          </a:bodyPr>
+          <a:lstStyle/>
+          <a:p>
+            <a:pPr lvl="0" algn="ctr"/>
+            <a:r>
+              <a:rPr lang="en-US" sz="1100" i="1" dirty="0">
+                <a:latin typeface="Arial" panose="020B0604020202020204" pitchFamily="34" charset="0"/>
+                <a:cs typeface="Arial" panose="020B0604020202020204" pitchFamily="34" charset="0"/>
+              </a:rPr>
+              <a:t>Choose a method to install the </a:t>
+            </a:r>
+            <a:r>
+              <a:rPr lang="en-US" sz="1100" i="1" dirty="0" err="1">
+                <a:latin typeface="Arial" panose="020B0604020202020204" pitchFamily="34" charset="0"/>
+                <a:cs typeface="Arial" panose="020B0604020202020204" pitchFamily="34" charset="0"/>
+              </a:rPr>
+              <a:t>Zowe</a:t>
+            </a:r>
+            <a:r>
+              <a:rPr lang="en-US" sz="1100" i="1" dirty="0">
+                <a:latin typeface="Arial" panose="020B0604020202020204" pitchFamily="34" charset="0"/>
+                <a:cs typeface="Arial" panose="020B0604020202020204" pitchFamily="34" charset="0"/>
+              </a:rPr>
+              <a:t> runtime</a:t>
+            </a:r>
+          </a:p>
+        </p:txBody>
+      </p:sp>
+      <p:sp>
+        <p:nvSpPr>
+          <p:cNvPr id="84" name="Diamond 83">
+            <a:extLst>
+              <a:ext uri="{FF2B5EF4-FFF2-40B4-BE49-F238E27FC236}">
+                <a16:creationId xmlns:a16="http://schemas.microsoft.com/office/drawing/2014/main" id="{AD776B14-126D-7047-B7B8-7DF57F57A2B0}"/>
+              </a:ext>
+            </a:extLst>
+          </p:cNvPr>
+          <p:cNvSpPr/>
+          <p:nvPr/>
+        </p:nvSpPr>
+        <p:spPr>
+          <a:xfrm>
+            <a:off x="4085714" y="5571630"/>
             <a:ext cx="2178534" cy="809368"/>
           </a:xfrm>
           <a:prstGeom prst="diamond">
@@ -10494,10 +10556,10 @@
       </p:sp>
       <p:sp>
         <p:nvSpPr>
-          <p:cNvPr id="81" name="Rectangle 80">
-            <a:extLst>
-              <a:ext uri="{FF2B5EF4-FFF2-40B4-BE49-F238E27FC236}">
-                <a16:creationId xmlns:a16="http://schemas.microsoft.com/office/drawing/2014/main" id="{A15D5C73-9738-BC4F-876C-19B0559D4357}"/>
+          <p:cNvPr id="85" name="Rectangle 84">
+            <a:extLst>
+              <a:ext uri="{FF2B5EF4-FFF2-40B4-BE49-F238E27FC236}">
+                <a16:creationId xmlns:a16="http://schemas.microsoft.com/office/drawing/2014/main" id="{4634A333-C297-D248-9A50-E6DB6AE558D4}"/>
               </a:ext>
             </a:extLst>
           </p:cNvPr>
@@ -10506,60 +10568,8 @@
         </p:nvSpPr>
         <p:spPr>
           <a:xfrm>
-            <a:off x="7173271" y="5670121"/>
-            <a:ext cx="1724319" cy="430887"/>
-          </a:xfrm>
-          <a:prstGeom prst="rect">
-            <a:avLst/>
-          </a:prstGeom>
-        </p:spPr>
-        <p:txBody>
-          <a:bodyPr wrap="square">
-            <a:spAutoFit/>
-          </a:bodyPr>
-          <a:lstStyle/>
-          <a:p>
-            <a:pPr lvl="0" algn="ctr"/>
-            <a:r>
-              <a:rPr lang="en-US" sz="1100" i="1" dirty="0">
-                <a:latin typeface="Arial" panose="020B0604020202020204" pitchFamily="34" charset="0"/>
-                <a:cs typeface="Arial" panose="020B0604020202020204" pitchFamily="34" charset="0"/>
-              </a:rPr>
-              <a:t>Choose a method to install the </a:t>
-            </a:r>
-            <a:r>
-              <a:rPr lang="en-US" sz="1100" i="1" dirty="0" err="1">
-                <a:latin typeface="Arial" panose="020B0604020202020204" pitchFamily="34" charset="0"/>
-                <a:cs typeface="Arial" panose="020B0604020202020204" pitchFamily="34" charset="0"/>
-              </a:rPr>
-              <a:t>Zowe</a:t>
-            </a:r>
-            <a:r>
-              <a:rPr lang="en-US" sz="1100" i="1" dirty="0">
-                <a:latin typeface="Arial" panose="020B0604020202020204" pitchFamily="34" charset="0"/>
-                <a:cs typeface="Arial" panose="020B0604020202020204" pitchFamily="34" charset="0"/>
-              </a:rPr>
-              <a:t> runtime</a:t>
-            </a:r>
-          </a:p>
-        </p:txBody>
-      </p:sp>
-      <p:sp>
-        <p:nvSpPr>
-          <p:cNvPr id="82" name="Rectangle 81">
-            <a:extLst>
-              <a:ext uri="{FF2B5EF4-FFF2-40B4-BE49-F238E27FC236}">
-                <a16:creationId xmlns:a16="http://schemas.microsoft.com/office/drawing/2014/main" id="{E028B6AA-A814-3240-9CAD-40F79DFDC115}"/>
-              </a:ext>
-            </a:extLst>
-          </p:cNvPr>
-          <p:cNvSpPr/>
-          <p:nvPr/>
-        </p:nvSpPr>
-        <p:spPr>
-          <a:xfrm>
-            <a:off x="3247007" y="6393174"/>
-            <a:ext cx="1907210" cy="744698"/>
+            <a:off x="5869800" y="6384920"/>
+            <a:ext cx="1680319" cy="738730"/>
           </a:xfrm>
           <a:prstGeom prst="rect">
             <a:avLst/>
@@ -10601,21 +10611,20 @@
           </a:bodyPr>
           <a:lstStyle/>
           <a:p>
+            <a:r>
+              <a:rPr lang="en-US" sz="1100" dirty="0">
+                <a:solidFill>
+                  <a:schemeClr val="tx1"/>
+                </a:solidFill>
+                <a:latin typeface="Arial" panose="020B0604020202020204" pitchFamily="34" charset="0"/>
+                <a:cs typeface="Arial" panose="020B0604020202020204" pitchFamily="34" charset="0"/>
+              </a:rPr>
+              <a:t>Run z/OSMF workflow</a:t>
+            </a:r>
+          </a:p>
+          <a:p>
             <a:pPr algn="ctr"/>
             <a:r>
-              <a:rPr lang="en-US" sz="1100" dirty="0">
-                <a:solidFill>
-                  <a:schemeClr val="tx1"/>
-                </a:solidFill>
-                <a:latin typeface="Arial" panose="020B0604020202020204" pitchFamily="34" charset="0"/>
-                <a:cs typeface="Arial" panose="020B0604020202020204" pitchFamily="34" charset="0"/>
-              </a:rPr>
-              <a:t>Install the Zowe SMP/E build with z/OSMF workflow</a:t>
-            </a:r>
-          </a:p>
-          <a:p>
-            <a:pPr algn="ctr"/>
-            <a:r>
               <a:rPr lang="en-US" sz="1100" b="1" dirty="0">
                 <a:solidFill>
                   <a:schemeClr val="tx1"/>
@@ -10623,17 +10632,257 @@
                 <a:latin typeface="Arial" panose="020B0604020202020204" pitchFamily="34" charset="0"/>
                 <a:cs typeface="Arial" panose="020B0604020202020204" pitchFamily="34" charset="0"/>
               </a:rPr>
-              <a:t>ZWEWRF01</a:t>
+              <a:t>ZWEWRF04.xml</a:t>
             </a:r>
           </a:p>
         </p:txBody>
       </p:sp>
+      <p:cxnSp>
+        <p:nvCxnSpPr>
+          <p:cNvPr id="38" name="Elbow Connector 37">
+            <a:extLst>
+              <a:ext uri="{FF2B5EF4-FFF2-40B4-BE49-F238E27FC236}">
+                <a16:creationId xmlns:a16="http://schemas.microsoft.com/office/drawing/2014/main" id="{E1DF86E3-ACE7-304F-95AB-C64775DB249C}"/>
+              </a:ext>
+            </a:extLst>
+          </p:cNvPr>
+          <p:cNvCxnSpPr>
+            <a:stCxn id="84" idx="1"/>
+            <a:endCxn id="18" idx="0"/>
+          </p:cNvCxnSpPr>
+          <p:nvPr/>
+        </p:nvCxnSpPr>
+        <p:spPr>
+          <a:xfrm rot="10800000" flipV="1">
+            <a:off x="3567804" y="5976313"/>
+            <a:ext cx="517910" cy="447855"/>
+          </a:xfrm>
+          <a:prstGeom prst="bentConnector2">
+            <a:avLst/>
+          </a:prstGeom>
+          <a:ln>
+            <a:solidFill>
+              <a:schemeClr val="tx1">
+                <a:lumMod val="75000"/>
+                <a:lumOff val="25000"/>
+              </a:schemeClr>
+            </a:solidFill>
+            <a:tailEnd type="triangle"/>
+          </a:ln>
+        </p:spPr>
+        <p:style>
+          <a:lnRef idx="1">
+            <a:schemeClr val="accent1"/>
+          </a:lnRef>
+          <a:fillRef idx="0">
+            <a:schemeClr val="accent1"/>
+          </a:fillRef>
+          <a:effectRef idx="0">
+            <a:schemeClr val="accent1"/>
+          </a:effectRef>
+          <a:fontRef idx="minor">
+            <a:schemeClr val="tx1"/>
+          </a:fontRef>
+        </p:style>
+      </p:cxnSp>
+      <p:cxnSp>
+        <p:nvCxnSpPr>
+          <p:cNvPr id="40" name="Elbow Connector 39">
+            <a:extLst>
+              <a:ext uri="{FF2B5EF4-FFF2-40B4-BE49-F238E27FC236}">
+                <a16:creationId xmlns:a16="http://schemas.microsoft.com/office/drawing/2014/main" id="{F63FEF37-383B-D242-988A-D39044383A28}"/>
+              </a:ext>
+            </a:extLst>
+          </p:cNvPr>
+          <p:cNvCxnSpPr>
+            <a:stCxn id="84" idx="3"/>
+            <a:endCxn id="85" idx="0"/>
+          </p:cNvCxnSpPr>
+          <p:nvPr/>
+        </p:nvCxnSpPr>
+        <p:spPr>
+          <a:xfrm>
+            <a:off x="6264248" y="5976314"/>
+            <a:ext cx="445712" cy="408606"/>
+          </a:xfrm>
+          <a:prstGeom prst="bentConnector2">
+            <a:avLst/>
+          </a:prstGeom>
+          <a:ln>
+            <a:solidFill>
+              <a:schemeClr val="tx1">
+                <a:lumMod val="75000"/>
+                <a:lumOff val="25000"/>
+              </a:schemeClr>
+            </a:solidFill>
+            <a:tailEnd type="triangle"/>
+          </a:ln>
+        </p:spPr>
+        <p:style>
+          <a:lnRef idx="1">
+            <a:schemeClr val="accent1"/>
+          </a:lnRef>
+          <a:fillRef idx="0">
+            <a:schemeClr val="accent1"/>
+          </a:fillRef>
+          <a:effectRef idx="0">
+            <a:schemeClr val="accent1"/>
+          </a:effectRef>
+          <a:fontRef idx="minor">
+            <a:schemeClr val="tx1"/>
+          </a:fontRef>
+        </p:style>
+      </p:cxnSp>
+      <p:cxnSp>
+        <p:nvCxnSpPr>
+          <p:cNvPr id="50" name="Straight Arrow Connector 49">
+            <a:extLst>
+              <a:ext uri="{FF2B5EF4-FFF2-40B4-BE49-F238E27FC236}">
+                <a16:creationId xmlns:a16="http://schemas.microsoft.com/office/drawing/2014/main" id="{DDF04680-F811-8E42-A77F-85675B742563}"/>
+              </a:ext>
+            </a:extLst>
+          </p:cNvPr>
+          <p:cNvCxnSpPr>
+            <a:stCxn id="15" idx="2"/>
+            <a:endCxn id="19" idx="0"/>
+          </p:cNvCxnSpPr>
+          <p:nvPr/>
+        </p:nvCxnSpPr>
+        <p:spPr>
+          <a:xfrm>
+            <a:off x="2194211" y="4325974"/>
+            <a:ext cx="0" cy="142952"/>
+          </a:xfrm>
+          <a:prstGeom prst="straightConnector1">
+            <a:avLst/>
+          </a:prstGeom>
+          <a:ln>
+            <a:solidFill>
+              <a:schemeClr val="tx1">
+                <a:lumMod val="75000"/>
+                <a:lumOff val="25000"/>
+              </a:schemeClr>
+            </a:solidFill>
+            <a:tailEnd type="triangle"/>
+          </a:ln>
+        </p:spPr>
+        <p:style>
+          <a:lnRef idx="1">
+            <a:schemeClr val="accent1"/>
+          </a:lnRef>
+          <a:fillRef idx="0">
+            <a:schemeClr val="accent1"/>
+          </a:fillRef>
+          <a:effectRef idx="0">
+            <a:schemeClr val="accent1"/>
+          </a:effectRef>
+          <a:fontRef idx="minor">
+            <a:schemeClr val="tx1"/>
+          </a:fontRef>
+        </p:style>
+      </p:cxnSp>
+      <p:cxnSp>
+        <p:nvCxnSpPr>
+          <p:cNvPr id="88" name="Straight Arrow Connector 87">
+            <a:extLst>
+              <a:ext uri="{FF2B5EF4-FFF2-40B4-BE49-F238E27FC236}">
+                <a16:creationId xmlns:a16="http://schemas.microsoft.com/office/drawing/2014/main" id="{FFA5420E-5B30-BB4D-8699-10BA8C90F354}"/>
+              </a:ext>
+            </a:extLst>
+          </p:cNvPr>
+          <p:cNvCxnSpPr>
+            <a:stCxn id="14" idx="2"/>
+            <a:endCxn id="17" idx="0"/>
+          </p:cNvCxnSpPr>
+          <p:nvPr/>
+        </p:nvCxnSpPr>
+        <p:spPr>
+          <a:xfrm>
+            <a:off x="5174982" y="4705557"/>
+            <a:ext cx="2" cy="152130"/>
+          </a:xfrm>
+          <a:prstGeom prst="straightConnector1">
+            <a:avLst/>
+          </a:prstGeom>
+          <a:ln>
+            <a:solidFill>
+              <a:schemeClr val="tx1">
+                <a:lumMod val="75000"/>
+                <a:lumOff val="25000"/>
+              </a:schemeClr>
+            </a:solidFill>
+            <a:tailEnd type="triangle"/>
+          </a:ln>
+        </p:spPr>
+        <p:style>
+          <a:lnRef idx="1">
+            <a:schemeClr val="accent1"/>
+          </a:lnRef>
+          <a:fillRef idx="0">
+            <a:schemeClr val="accent1"/>
+          </a:fillRef>
+          <a:effectRef idx="0">
+            <a:schemeClr val="accent1"/>
+          </a:effectRef>
+          <a:fontRef idx="minor">
+            <a:schemeClr val="tx1"/>
+          </a:fontRef>
+        </p:style>
+      </p:cxnSp>
+      <p:cxnSp>
+        <p:nvCxnSpPr>
+          <p:cNvPr id="90" name="Straight Arrow Connector 89">
+            <a:extLst>
+              <a:ext uri="{FF2B5EF4-FFF2-40B4-BE49-F238E27FC236}">
+                <a16:creationId xmlns:a16="http://schemas.microsoft.com/office/drawing/2014/main" id="{98E00474-B9DE-B543-8056-2ADDF1E7E3DE}"/>
+              </a:ext>
+            </a:extLst>
+          </p:cNvPr>
+          <p:cNvCxnSpPr>
+            <a:stCxn id="17" idx="2"/>
+            <a:endCxn id="84" idx="0"/>
+          </p:cNvCxnSpPr>
+          <p:nvPr/>
+        </p:nvCxnSpPr>
+        <p:spPr>
+          <a:xfrm flipH="1">
+            <a:off x="5174981" y="5416658"/>
+            <a:ext cx="3" cy="154972"/>
+          </a:xfrm>
+          <a:prstGeom prst="straightConnector1">
+            <a:avLst/>
+          </a:prstGeom>
+          <a:ln>
+            <a:solidFill>
+              <a:schemeClr val="tx1">
+                <a:lumMod val="75000"/>
+                <a:lumOff val="25000"/>
+              </a:schemeClr>
+            </a:solidFill>
+            <a:tailEnd type="triangle"/>
+          </a:ln>
+        </p:spPr>
+        <p:style>
+          <a:lnRef idx="1">
+            <a:schemeClr val="accent1"/>
+          </a:lnRef>
+          <a:fillRef idx="0">
+            <a:schemeClr val="accent1"/>
+          </a:fillRef>
+          <a:effectRef idx="0">
+            <a:schemeClr val="accent1"/>
+          </a:effectRef>
+          <a:fontRef idx="minor">
+            <a:schemeClr val="tx1"/>
+          </a:fontRef>
+        </p:style>
+      </p:cxnSp>
       <p:sp>
         <p:nvSpPr>
-          <p:cNvPr id="84" name="Diamond 83">
-            <a:extLst>
-              <a:ext uri="{FF2B5EF4-FFF2-40B4-BE49-F238E27FC236}">
-                <a16:creationId xmlns:a16="http://schemas.microsoft.com/office/drawing/2014/main" id="{AD776B14-126D-7047-B7B8-7DF57F57A2B0}"/>
+          <p:cNvPr id="99" name="Diamond 98">
+            <a:extLst>
+              <a:ext uri="{FF2B5EF4-FFF2-40B4-BE49-F238E27FC236}">
+                <a16:creationId xmlns:a16="http://schemas.microsoft.com/office/drawing/2014/main" id="{0A9D3F2E-7268-9A46-84ED-8299D1132B97}"/>
               </a:ext>
             </a:extLst>
           </p:cNvPr>
@@ -10642,7 +10891,7 @@
         </p:nvSpPr>
         <p:spPr>
           <a:xfrm>
-            <a:off x="6942612" y="5486809"/>
+            <a:off x="4363443" y="8520552"/>
             <a:ext cx="2178534" cy="809368"/>
           </a:xfrm>
           <a:prstGeom prst="diamond">
@@ -10651,7 +10900,7 @@
           <a:noFill/>
           <a:ln>
             <a:solidFill>
-              <a:schemeClr val="bg2">
+              <a:schemeClr val="accent5">
                 <a:lumMod val="50000"/>
               </a:schemeClr>
             </a:solidFill>
@@ -10695,10 +10944,10 @@
       </p:sp>
       <p:sp>
         <p:nvSpPr>
-          <p:cNvPr id="85" name="Rectangle 84">
-            <a:extLst>
-              <a:ext uri="{FF2B5EF4-FFF2-40B4-BE49-F238E27FC236}">
-                <a16:creationId xmlns:a16="http://schemas.microsoft.com/office/drawing/2014/main" id="{4634A333-C297-D248-9A50-E6DB6AE558D4}"/>
+          <p:cNvPr id="100" name="Rectangle 99">
+            <a:extLst>
+              <a:ext uri="{FF2B5EF4-FFF2-40B4-BE49-F238E27FC236}">
+                <a16:creationId xmlns:a16="http://schemas.microsoft.com/office/drawing/2014/main" id="{BCE9E408-40CD-CB49-A578-D2F95011FA86}"/>
               </a:ext>
             </a:extLst>
           </p:cNvPr>
@@ -10707,90 +10956,7 @@
         </p:nvSpPr>
         <p:spPr>
           <a:xfrm>
-            <a:off x="8495712" y="6384920"/>
-            <a:ext cx="1680319" cy="738730"/>
-          </a:xfrm>
-          <a:prstGeom prst="rect">
-            <a:avLst/>
-          </a:prstGeom>
-          <a:solidFill>
-            <a:schemeClr val="accent6">
-              <a:lumMod val="40000"/>
-              <a:lumOff val="60000"/>
-            </a:schemeClr>
-          </a:solidFill>
-          <a:ln>
-            <a:solidFill>
-              <a:schemeClr val="bg2"/>
-            </a:solidFill>
-          </a:ln>
-        </p:spPr>
-        <p:style>
-          <a:lnRef idx="2">
-            <a:schemeClr val="accent1">
-              <a:shade val="50000"/>
-            </a:schemeClr>
-          </a:lnRef>
-          <a:fillRef idx="1">
-            <a:schemeClr val="accent1"/>
-          </a:fillRef>
-          <a:effectRef idx="0">
-            <a:schemeClr val="accent1"/>
-          </a:effectRef>
-          <a:fontRef idx="minor">
-            <a:schemeClr val="lt1"/>
-          </a:fontRef>
-        </p:style>
-        <p:txBody>
-          <a:bodyPr rot="0" spcFirstLastPara="0" vertOverflow="overflow" horzOverflow="overflow" vert="horz" wrap="square" lIns="91440" tIns="45720" rIns="91440" bIns="45720" numCol="1" spcCol="0" rtlCol="0" fromWordArt="0" anchor="ctr" anchorCtr="0" forceAA="0" compatLnSpc="1">
-            <a:prstTxWarp prst="textNoShape">
-              <a:avLst/>
-            </a:prstTxWarp>
-            <a:noAutofit/>
-          </a:bodyPr>
-          <a:lstStyle/>
-          <a:p>
-            <a:r>
-              <a:rPr lang="en-US" sz="1100" dirty="0">
-                <a:solidFill>
-                  <a:schemeClr val="tx1"/>
-                </a:solidFill>
-                <a:latin typeface="Arial" panose="020B0604020202020204" pitchFamily="34" charset="0"/>
-                <a:cs typeface="Arial" panose="020B0604020202020204" pitchFamily="34" charset="0"/>
-              </a:rPr>
-              <a:t>Run z/OSMF workflow</a:t>
-            </a:r>
-          </a:p>
-          <a:p>
-            <a:pPr algn="ctr"/>
-            <a:r>
-              <a:rPr lang="en-US" sz="1100" b="1" dirty="0">
-                <a:solidFill>
-                  <a:schemeClr val="tx1"/>
-                </a:solidFill>
-                <a:latin typeface="Arial" panose="020B0604020202020204" pitchFamily="34" charset="0"/>
-                <a:cs typeface="Arial" panose="020B0604020202020204" pitchFamily="34" charset="0"/>
-              </a:rPr>
-              <a:t>ZWEWRF04.xml</a:t>
-            </a:r>
-          </a:p>
-        </p:txBody>
-      </p:sp>
-      <p:sp>
-        <p:nvSpPr>
-          <p:cNvPr id="86" name="Rectangle 85">
-            <a:extLst>
-              <a:ext uri="{FF2B5EF4-FFF2-40B4-BE49-F238E27FC236}">
-                <a16:creationId xmlns:a16="http://schemas.microsoft.com/office/drawing/2014/main" id="{D29F056E-E573-E349-88BB-CABBAB2E3D9C}"/>
-              </a:ext>
-            </a:extLst>
-          </p:cNvPr>
-          <p:cNvSpPr/>
-          <p:nvPr/>
-        </p:nvSpPr>
-        <p:spPr>
-          <a:xfrm>
-            <a:off x="2103106" y="5684121"/>
+            <a:off x="4638671" y="8730563"/>
             <a:ext cx="1724319" cy="430887"/>
           </a:xfrm>
           <a:prstGeom prst="rect">
@@ -10809,31 +10975,42 @@
                 <a:latin typeface="Arial" panose="020B0604020202020204" pitchFamily="34" charset="0"/>
                 <a:cs typeface="Arial" panose="020B0604020202020204" pitchFamily="34" charset="0"/>
               </a:rPr>
-              <a:t>Choose a method to install the SMP/E build</a:t>
-            </a:r>
+              <a:t>Choose a method to configure </a:t>
+            </a:r>
+            <a:r>
+              <a:rPr lang="en-US" sz="1100" i="1" dirty="0" err="1">
+                <a:latin typeface="Arial" panose="020B0604020202020204" pitchFamily="34" charset="0"/>
+                <a:cs typeface="Arial" panose="020B0604020202020204" pitchFamily="34" charset="0"/>
+              </a:rPr>
+              <a:t>Zowe</a:t>
+            </a:r>
+            <a:endParaRPr lang="en-US" sz="1100" i="1" dirty="0">
+              <a:latin typeface="Arial" panose="020B0604020202020204" pitchFamily="34" charset="0"/>
+              <a:cs typeface="Arial" panose="020B0604020202020204" pitchFamily="34" charset="0"/>
+            </a:endParaRPr>
           </a:p>
         </p:txBody>
       </p:sp>
       <p:cxnSp>
         <p:nvCxnSpPr>
-          <p:cNvPr id="29" name="Elbow Connector 28">
-            <a:extLst>
-              <a:ext uri="{FF2B5EF4-FFF2-40B4-BE49-F238E27FC236}">
-                <a16:creationId xmlns:a16="http://schemas.microsoft.com/office/drawing/2014/main" id="{06F0973C-0F2A-584F-B77D-6BCFA7AE2C66}"/>
+          <p:cNvPr id="102" name="Elbow Connector 101">
+            <a:extLst>
+              <a:ext uri="{FF2B5EF4-FFF2-40B4-BE49-F238E27FC236}">
+                <a16:creationId xmlns:a16="http://schemas.microsoft.com/office/drawing/2014/main" id="{C8932823-E29C-E84C-9336-0E30B84C237C}"/>
               </a:ext>
             </a:extLst>
           </p:cNvPr>
           <p:cNvCxnSpPr>
             <a:cxnSpLocks/>
-            <a:stCxn id="79" idx="1"/>
-            <a:endCxn id="19" idx="0"/>
+            <a:stCxn id="99" idx="1"/>
+            <a:endCxn id="20" idx="0"/>
           </p:cNvCxnSpPr>
           <p:nvPr/>
         </p:nvCxnSpPr>
         <p:spPr>
           <a:xfrm rot="10800000" flipV="1">
-            <a:off x="1601804" y="5897376"/>
-            <a:ext cx="205338" cy="476959"/>
+            <a:off x="3054697" y="8925236"/>
+            <a:ext cx="1308747" cy="974764"/>
           </a:xfrm>
           <a:prstGeom prst="bentConnector2">
             <a:avLst/>
@@ -10865,24 +11042,24 @@
       </p:cxnSp>
       <p:cxnSp>
         <p:nvCxnSpPr>
-          <p:cNvPr id="32" name="Elbow Connector 31">
-            <a:extLst>
-              <a:ext uri="{FF2B5EF4-FFF2-40B4-BE49-F238E27FC236}">
-                <a16:creationId xmlns:a16="http://schemas.microsoft.com/office/drawing/2014/main" id="{99BDC92B-233A-564E-BF93-1992A827EC9E}"/>
+          <p:cNvPr id="104" name="Elbow Connector 103">
+            <a:extLst>
+              <a:ext uri="{FF2B5EF4-FFF2-40B4-BE49-F238E27FC236}">
+                <a16:creationId xmlns:a16="http://schemas.microsoft.com/office/drawing/2014/main" id="{8101655C-4562-5343-A60D-8EDB7CEDBAAD}"/>
               </a:ext>
             </a:extLst>
           </p:cNvPr>
           <p:cNvCxnSpPr>
             <a:cxnSpLocks/>
-            <a:stCxn id="79" idx="3"/>
-            <a:endCxn id="82" idx="0"/>
+            <a:stCxn id="99" idx="3"/>
+            <a:endCxn id="74" idx="0"/>
           </p:cNvCxnSpPr>
           <p:nvPr/>
         </p:nvCxnSpPr>
         <p:spPr>
           <a:xfrm>
-            <a:off x="3985676" y="5897376"/>
-            <a:ext cx="214936" cy="495798"/>
+            <a:off x="6541977" y="8925236"/>
+            <a:ext cx="1869312" cy="974764"/>
           </a:xfrm>
           <a:prstGeom prst="bentConnector2">
             <a:avLst/>
@@ -10912,252 +11089,12 @@
           </a:fontRef>
         </p:style>
       </p:cxnSp>
-      <p:cxnSp>
-        <p:nvCxnSpPr>
-          <p:cNvPr id="38" name="Elbow Connector 37">
-            <a:extLst>
-              <a:ext uri="{FF2B5EF4-FFF2-40B4-BE49-F238E27FC236}">
-                <a16:creationId xmlns:a16="http://schemas.microsoft.com/office/drawing/2014/main" id="{E1DF86E3-ACE7-304F-95AB-C64775DB249C}"/>
-              </a:ext>
-            </a:extLst>
-          </p:cNvPr>
-          <p:cNvCxnSpPr>
-            <a:stCxn id="84" idx="1"/>
-            <a:endCxn id="18" idx="0"/>
-          </p:cNvCxnSpPr>
-          <p:nvPr/>
-        </p:nvCxnSpPr>
-        <p:spPr>
-          <a:xfrm rot="10800000" flipV="1">
-            <a:off x="6718425" y="5891493"/>
-            <a:ext cx="224189" cy="501681"/>
-          </a:xfrm>
-          <a:prstGeom prst="bentConnector2">
-            <a:avLst/>
-          </a:prstGeom>
-          <a:ln>
-            <a:solidFill>
-              <a:schemeClr val="tx1">
-                <a:lumMod val="75000"/>
-                <a:lumOff val="25000"/>
-              </a:schemeClr>
-            </a:solidFill>
-            <a:tailEnd type="triangle"/>
-          </a:ln>
-        </p:spPr>
-        <p:style>
-          <a:lnRef idx="1">
-            <a:schemeClr val="accent1"/>
-          </a:lnRef>
-          <a:fillRef idx="0">
-            <a:schemeClr val="accent1"/>
-          </a:fillRef>
-          <a:effectRef idx="0">
-            <a:schemeClr val="accent1"/>
-          </a:effectRef>
-          <a:fontRef idx="minor">
-            <a:schemeClr val="tx1"/>
-          </a:fontRef>
-        </p:style>
-      </p:cxnSp>
-      <p:cxnSp>
-        <p:nvCxnSpPr>
-          <p:cNvPr id="40" name="Elbow Connector 39">
-            <a:extLst>
-              <a:ext uri="{FF2B5EF4-FFF2-40B4-BE49-F238E27FC236}">
-                <a16:creationId xmlns:a16="http://schemas.microsoft.com/office/drawing/2014/main" id="{F63FEF37-383B-D242-988A-D39044383A28}"/>
-              </a:ext>
-            </a:extLst>
-          </p:cNvPr>
-          <p:cNvCxnSpPr>
-            <a:stCxn id="84" idx="3"/>
-            <a:endCxn id="85" idx="0"/>
-          </p:cNvCxnSpPr>
-          <p:nvPr/>
-        </p:nvCxnSpPr>
-        <p:spPr>
-          <a:xfrm>
-            <a:off x="9121147" y="5891494"/>
-            <a:ext cx="214725" cy="493427"/>
-          </a:xfrm>
-          <a:prstGeom prst="bentConnector2">
-            <a:avLst/>
-          </a:prstGeom>
-          <a:ln>
-            <a:solidFill>
-              <a:schemeClr val="tx1">
-                <a:lumMod val="75000"/>
-                <a:lumOff val="25000"/>
-              </a:schemeClr>
-            </a:solidFill>
-            <a:tailEnd type="triangle"/>
-          </a:ln>
-        </p:spPr>
-        <p:style>
-          <a:lnRef idx="1">
-            <a:schemeClr val="accent1"/>
-          </a:lnRef>
-          <a:fillRef idx="0">
-            <a:schemeClr val="accent1"/>
-          </a:fillRef>
-          <a:effectRef idx="0">
-            <a:schemeClr val="accent1"/>
-          </a:effectRef>
-          <a:fontRef idx="minor">
-            <a:schemeClr val="tx1"/>
-          </a:fontRef>
-        </p:style>
-      </p:cxnSp>
-      <p:cxnSp>
-        <p:nvCxnSpPr>
-          <p:cNvPr id="50" name="Straight Arrow Connector 49">
-            <a:extLst>
-              <a:ext uri="{FF2B5EF4-FFF2-40B4-BE49-F238E27FC236}">
-                <a16:creationId xmlns:a16="http://schemas.microsoft.com/office/drawing/2014/main" id="{DDF04680-F811-8E42-A77F-85675B742563}"/>
-              </a:ext>
-            </a:extLst>
-          </p:cNvPr>
-          <p:cNvCxnSpPr>
-            <a:stCxn id="15" idx="2"/>
-            <a:endCxn id="79" idx="0"/>
-          </p:cNvCxnSpPr>
-          <p:nvPr/>
-        </p:nvCxnSpPr>
-        <p:spPr>
-          <a:xfrm flipH="1">
-            <a:off x="2896409" y="4402908"/>
-            <a:ext cx="19017" cy="1089784"/>
-          </a:xfrm>
-          <a:prstGeom prst="straightConnector1">
-            <a:avLst/>
-          </a:prstGeom>
-          <a:ln>
-            <a:solidFill>
-              <a:schemeClr val="tx1">
-                <a:lumMod val="75000"/>
-                <a:lumOff val="25000"/>
-              </a:schemeClr>
-            </a:solidFill>
-            <a:tailEnd type="triangle"/>
-          </a:ln>
-        </p:spPr>
-        <p:style>
-          <a:lnRef idx="1">
-            <a:schemeClr val="accent1"/>
-          </a:lnRef>
-          <a:fillRef idx="0">
-            <a:schemeClr val="accent1"/>
-          </a:fillRef>
-          <a:effectRef idx="0">
-            <a:schemeClr val="accent1"/>
-          </a:effectRef>
-          <a:fontRef idx="minor">
-            <a:schemeClr val="tx1"/>
-          </a:fontRef>
-        </p:style>
-      </p:cxnSp>
-      <p:cxnSp>
-        <p:nvCxnSpPr>
-          <p:cNvPr id="88" name="Straight Arrow Connector 87">
-            <a:extLst>
-              <a:ext uri="{FF2B5EF4-FFF2-40B4-BE49-F238E27FC236}">
-                <a16:creationId xmlns:a16="http://schemas.microsoft.com/office/drawing/2014/main" id="{FFA5420E-5B30-BB4D-8699-10BA8C90F354}"/>
-              </a:ext>
-            </a:extLst>
-          </p:cNvPr>
-          <p:cNvCxnSpPr>
-            <a:stCxn id="14" idx="2"/>
-            <a:endCxn id="17" idx="0"/>
-          </p:cNvCxnSpPr>
-          <p:nvPr/>
-        </p:nvCxnSpPr>
-        <p:spPr>
-          <a:xfrm flipH="1">
-            <a:off x="8035228" y="4406927"/>
-            <a:ext cx="2" cy="269581"/>
-          </a:xfrm>
-          <a:prstGeom prst="straightConnector1">
-            <a:avLst/>
-          </a:prstGeom>
-          <a:ln>
-            <a:solidFill>
-              <a:schemeClr val="tx1">
-                <a:lumMod val="75000"/>
-                <a:lumOff val="25000"/>
-              </a:schemeClr>
-            </a:solidFill>
-            <a:tailEnd type="triangle"/>
-          </a:ln>
-        </p:spPr>
-        <p:style>
-          <a:lnRef idx="1">
-            <a:schemeClr val="accent1"/>
-          </a:lnRef>
-          <a:fillRef idx="0">
-            <a:schemeClr val="accent1"/>
-          </a:fillRef>
-          <a:effectRef idx="0">
-            <a:schemeClr val="accent1"/>
-          </a:effectRef>
-          <a:fontRef idx="minor">
-            <a:schemeClr val="tx1"/>
-          </a:fontRef>
-        </p:style>
-      </p:cxnSp>
-      <p:cxnSp>
-        <p:nvCxnSpPr>
-          <p:cNvPr id="90" name="Straight Arrow Connector 89">
-            <a:extLst>
-              <a:ext uri="{FF2B5EF4-FFF2-40B4-BE49-F238E27FC236}">
-                <a16:creationId xmlns:a16="http://schemas.microsoft.com/office/drawing/2014/main" id="{98E00474-B9DE-B543-8056-2ADDF1E7E3DE}"/>
-              </a:ext>
-            </a:extLst>
-          </p:cNvPr>
-          <p:cNvCxnSpPr>
-            <a:stCxn id="17" idx="2"/>
-            <a:endCxn id="84" idx="0"/>
-          </p:cNvCxnSpPr>
-          <p:nvPr/>
-        </p:nvCxnSpPr>
-        <p:spPr>
-          <a:xfrm flipH="1">
-            <a:off x="8031879" y="5235479"/>
-            <a:ext cx="3348" cy="251331"/>
-          </a:xfrm>
-          <a:prstGeom prst="straightConnector1">
-            <a:avLst/>
-          </a:prstGeom>
-          <a:ln>
-            <a:solidFill>
-              <a:schemeClr val="tx1">
-                <a:lumMod val="75000"/>
-                <a:lumOff val="25000"/>
-              </a:schemeClr>
-            </a:solidFill>
-            <a:tailEnd type="triangle"/>
-          </a:ln>
-        </p:spPr>
-        <p:style>
-          <a:lnRef idx="1">
-            <a:schemeClr val="accent1"/>
-          </a:lnRef>
-          <a:fillRef idx="0">
-            <a:schemeClr val="accent1"/>
-          </a:fillRef>
-          <a:effectRef idx="0">
-            <a:schemeClr val="accent1"/>
-          </a:effectRef>
-          <a:fontRef idx="minor">
-            <a:schemeClr val="tx1"/>
-          </a:fontRef>
-        </p:style>
-      </p:cxnSp>
       <p:sp>
         <p:nvSpPr>
-          <p:cNvPr id="99" name="Diamond 98">
-            <a:extLst>
-              <a:ext uri="{FF2B5EF4-FFF2-40B4-BE49-F238E27FC236}">
-                <a16:creationId xmlns:a16="http://schemas.microsoft.com/office/drawing/2014/main" id="{0A9D3F2E-7268-9A46-84ED-8299D1132B97}"/>
+          <p:cNvPr id="106" name="Rectangle 105">
+            <a:extLst>
+              <a:ext uri="{FF2B5EF4-FFF2-40B4-BE49-F238E27FC236}">
+                <a16:creationId xmlns:a16="http://schemas.microsoft.com/office/drawing/2014/main" id="{124859CB-AFBD-0749-ABF1-D9B209EBB4B4}"/>
               </a:ext>
             </a:extLst>
           </p:cNvPr>
@@ -11166,77 +11103,15 @@
         </p:nvSpPr>
         <p:spPr>
           <a:xfrm>
-            <a:off x="4363443" y="8520552"/>
-            <a:ext cx="2178534" cy="809368"/>
-          </a:xfrm>
-          <a:prstGeom prst="diamond">
-            <a:avLst/>
-          </a:prstGeom>
-          <a:noFill/>
-          <a:ln>
-            <a:solidFill>
-              <a:schemeClr val="accent5">
-                <a:lumMod val="50000"/>
-              </a:schemeClr>
-            </a:solidFill>
-          </a:ln>
-        </p:spPr>
-        <p:style>
-          <a:lnRef idx="2">
-            <a:schemeClr val="accent1">
-              <a:shade val="50000"/>
-            </a:schemeClr>
-          </a:lnRef>
-          <a:fillRef idx="1">
-            <a:schemeClr val="accent1"/>
-          </a:fillRef>
-          <a:effectRef idx="0">
-            <a:schemeClr val="accent1"/>
-          </a:effectRef>
-          <a:fontRef idx="minor">
-            <a:schemeClr val="lt1"/>
-          </a:fontRef>
-        </p:style>
-        <p:txBody>
-          <a:bodyPr rot="0" spcFirstLastPara="0" vertOverflow="overflow" horzOverflow="overflow" vert="horz" wrap="square" lIns="91440" tIns="45720" rIns="91440" bIns="45720" numCol="1" spcCol="0" rtlCol="0" fromWordArt="0" anchor="ctr" anchorCtr="0" forceAA="0" compatLnSpc="1">
-            <a:prstTxWarp prst="textNoShape">
-              <a:avLst/>
-            </a:prstTxWarp>
-            <a:noAutofit/>
-          </a:bodyPr>
-          <a:lstStyle/>
-          <a:p>
-            <a:pPr algn="ctr"/>
-            <a:endParaRPr lang="en-US" sz="1100" dirty="0">
-              <a:solidFill>
-                <a:schemeClr val="bg1"/>
-              </a:solidFill>
-              <a:latin typeface="Arial" panose="020B0604020202020204" pitchFamily="34" charset="0"/>
-              <a:cs typeface="Arial" panose="020B0604020202020204" pitchFamily="34" charset="0"/>
-            </a:endParaRPr>
-          </a:p>
-        </p:txBody>
-      </p:sp>
-      <p:sp>
-        <p:nvSpPr>
-          <p:cNvPr id="100" name="Rectangle 99">
-            <a:extLst>
-              <a:ext uri="{FF2B5EF4-FFF2-40B4-BE49-F238E27FC236}">
-                <a16:creationId xmlns:a16="http://schemas.microsoft.com/office/drawing/2014/main" id="{BCE9E408-40CD-CB49-A578-D2F95011FA86}"/>
-              </a:ext>
-            </a:extLst>
-          </p:cNvPr>
-          <p:cNvSpPr/>
-          <p:nvPr/>
-        </p:nvSpPr>
-        <p:spPr>
-          <a:xfrm>
-            <a:off x="4638671" y="8730563"/>
-            <a:ext cx="1724319" cy="430887"/>
+            <a:off x="2704922" y="8584673"/>
+            <a:ext cx="1597807" cy="307777"/>
           </a:xfrm>
           <a:prstGeom prst="rect">
             <a:avLst/>
           </a:prstGeom>
+          <a:solidFill>
+            <a:schemeClr val="bg1"/>
+          </a:solidFill>
         </p:spPr>
         <p:txBody>
           <a:bodyPr wrap="square">
@@ -11244,132 +11119,23 @@
           </a:bodyPr>
           <a:lstStyle/>
           <a:p>
-            <a:pPr lvl="0" algn="ctr"/>
-            <a:r>
-              <a:rPr lang="en-US" sz="1100" i="1" dirty="0">
-                <a:latin typeface="Arial" panose="020B0604020202020204" pitchFamily="34" charset="0"/>
-                <a:cs typeface="Arial" panose="020B0604020202020204" pitchFamily="34" charset="0"/>
-              </a:rPr>
-              <a:t>Choose a method to configure </a:t>
-            </a:r>
-            <a:r>
-              <a:rPr lang="en-US" sz="1100" i="1" dirty="0" err="1">
-                <a:latin typeface="Arial" panose="020B0604020202020204" pitchFamily="34" charset="0"/>
-                <a:cs typeface="Arial" panose="020B0604020202020204" pitchFamily="34" charset="0"/>
-              </a:rPr>
-              <a:t>Zowe</a:t>
-            </a:r>
-            <a:endParaRPr lang="en-US" sz="1100" i="1" dirty="0">
-              <a:latin typeface="Arial" panose="020B0604020202020204" pitchFamily="34" charset="0"/>
-              <a:cs typeface="Arial" panose="020B0604020202020204" pitchFamily="34" charset="0"/>
-            </a:endParaRPr>
+            <a:pPr algn="ctr"/>
+            <a:r>
+              <a:rPr lang="en-US" sz="1400" dirty="0">
+                <a:latin typeface="Arial" panose="020B0604020202020204" pitchFamily="34" charset="0"/>
+                <a:cs typeface="Arial" panose="020B0604020202020204" pitchFamily="34" charset="0"/>
+              </a:rPr>
+              <a:t>JCL, Shell scripts</a:t>
+            </a:r>
           </a:p>
         </p:txBody>
       </p:sp>
-      <p:cxnSp>
-        <p:nvCxnSpPr>
-          <p:cNvPr id="102" name="Elbow Connector 101">
-            <a:extLst>
-              <a:ext uri="{FF2B5EF4-FFF2-40B4-BE49-F238E27FC236}">
-                <a16:creationId xmlns:a16="http://schemas.microsoft.com/office/drawing/2014/main" id="{C8932823-E29C-E84C-9336-0E30B84C237C}"/>
-              </a:ext>
-            </a:extLst>
-          </p:cNvPr>
-          <p:cNvCxnSpPr>
-            <a:cxnSpLocks/>
-            <a:stCxn id="99" idx="1"/>
-            <a:endCxn id="20" idx="0"/>
-          </p:cNvCxnSpPr>
-          <p:nvPr/>
-        </p:nvCxnSpPr>
-        <p:spPr>
-          <a:xfrm rot="10800000" flipV="1">
-            <a:off x="3054697" y="8925236"/>
-            <a:ext cx="1308747" cy="974764"/>
-          </a:xfrm>
-          <a:prstGeom prst="bentConnector2">
-            <a:avLst/>
-          </a:prstGeom>
-          <a:ln>
-            <a:solidFill>
-              <a:schemeClr val="tx1">
-                <a:lumMod val="75000"/>
-                <a:lumOff val="25000"/>
-              </a:schemeClr>
-            </a:solidFill>
-            <a:tailEnd type="triangle"/>
-          </a:ln>
-        </p:spPr>
-        <p:style>
-          <a:lnRef idx="1">
-            <a:schemeClr val="accent1"/>
-          </a:lnRef>
-          <a:fillRef idx="0">
-            <a:schemeClr val="accent1"/>
-          </a:fillRef>
-          <a:effectRef idx="0">
-            <a:schemeClr val="accent1"/>
-          </a:effectRef>
-          <a:fontRef idx="minor">
-            <a:schemeClr val="tx1"/>
-          </a:fontRef>
-        </p:style>
-      </p:cxnSp>
-      <p:cxnSp>
-        <p:nvCxnSpPr>
-          <p:cNvPr id="104" name="Elbow Connector 103">
-            <a:extLst>
-              <a:ext uri="{FF2B5EF4-FFF2-40B4-BE49-F238E27FC236}">
-                <a16:creationId xmlns:a16="http://schemas.microsoft.com/office/drawing/2014/main" id="{8101655C-4562-5343-A60D-8EDB7CEDBAAD}"/>
-              </a:ext>
-            </a:extLst>
-          </p:cNvPr>
-          <p:cNvCxnSpPr>
-            <a:cxnSpLocks/>
-            <a:stCxn id="99" idx="3"/>
-            <a:endCxn id="74" idx="0"/>
-          </p:cNvCxnSpPr>
-          <p:nvPr/>
-        </p:nvCxnSpPr>
-        <p:spPr>
-          <a:xfrm>
-            <a:off x="6541977" y="8925236"/>
-            <a:ext cx="1869312" cy="974764"/>
-          </a:xfrm>
-          <a:prstGeom prst="bentConnector2">
-            <a:avLst/>
-          </a:prstGeom>
-          <a:ln>
-            <a:solidFill>
-              <a:schemeClr val="tx1">
-                <a:lumMod val="75000"/>
-                <a:lumOff val="25000"/>
-              </a:schemeClr>
-            </a:solidFill>
-            <a:tailEnd type="triangle"/>
-          </a:ln>
-        </p:spPr>
-        <p:style>
-          <a:lnRef idx="1">
-            <a:schemeClr val="accent1"/>
-          </a:lnRef>
-          <a:fillRef idx="0">
-            <a:schemeClr val="accent1"/>
-          </a:fillRef>
-          <a:effectRef idx="0">
-            <a:schemeClr val="accent1"/>
-          </a:effectRef>
-          <a:fontRef idx="minor">
-            <a:schemeClr val="tx1"/>
-          </a:fontRef>
-        </p:style>
-      </p:cxnSp>
       <p:sp>
         <p:nvSpPr>
-          <p:cNvPr id="106" name="Rectangle 105">
-            <a:extLst>
-              <a:ext uri="{FF2B5EF4-FFF2-40B4-BE49-F238E27FC236}">
-                <a16:creationId xmlns:a16="http://schemas.microsoft.com/office/drawing/2014/main" id="{124859CB-AFBD-0749-ABF1-D9B209EBB4B4}"/>
+          <p:cNvPr id="107" name="Rectangle 106">
+            <a:extLst>
+              <a:ext uri="{FF2B5EF4-FFF2-40B4-BE49-F238E27FC236}">
+                <a16:creationId xmlns:a16="http://schemas.microsoft.com/office/drawing/2014/main" id="{C2A5217F-4A1C-6E4C-AE36-24FB98960ACD}"/>
               </a:ext>
             </a:extLst>
           </p:cNvPr>
@@ -11378,8 +11144,8 @@
         </p:nvSpPr>
         <p:spPr>
           <a:xfrm>
-            <a:off x="2520635" y="9377178"/>
-            <a:ext cx="1597807" cy="307777"/>
+            <a:off x="6658020" y="8576674"/>
+            <a:ext cx="1653225" cy="307777"/>
           </a:xfrm>
           <a:prstGeom prst="rect">
             <a:avLst/>
@@ -11400,17 +11166,17 @@
                 <a:latin typeface="Arial" panose="020B0604020202020204" pitchFamily="34" charset="0"/>
                 <a:cs typeface="Arial" panose="020B0604020202020204" pitchFamily="34" charset="0"/>
               </a:rPr>
-              <a:t>JCL, Shell scripts</a:t>
+              <a:t>z/OSMF workflow</a:t>
             </a:r>
           </a:p>
         </p:txBody>
       </p:sp>
       <p:sp>
         <p:nvSpPr>
-          <p:cNvPr id="107" name="Rectangle 106">
-            <a:extLst>
-              <a:ext uri="{FF2B5EF4-FFF2-40B4-BE49-F238E27FC236}">
-                <a16:creationId xmlns:a16="http://schemas.microsoft.com/office/drawing/2014/main" id="{C2A5217F-4A1C-6E4C-AE36-24FB98960ACD}"/>
+          <p:cNvPr id="188" name="Rectangle 187">
+            <a:extLst>
+              <a:ext uri="{FF2B5EF4-FFF2-40B4-BE49-F238E27FC236}">
+                <a16:creationId xmlns:a16="http://schemas.microsoft.com/office/drawing/2014/main" id="{24BAA942-B59A-294B-AD09-4B735D8DF81F}"/>
               </a:ext>
             </a:extLst>
           </p:cNvPr>
@@ -11419,15 +11185,13 @@
         </p:nvSpPr>
         <p:spPr>
           <a:xfrm>
-            <a:off x="7545615" y="9406916"/>
-            <a:ext cx="1653225" cy="307777"/>
+            <a:off x="3310605" y="5723247"/>
+            <a:ext cx="1597807" cy="261610"/>
           </a:xfrm>
           <a:prstGeom prst="rect">
             <a:avLst/>
           </a:prstGeom>
-          <a:solidFill>
-            <a:schemeClr val="bg1"/>
-          </a:solidFill>
+          <a:noFill/>
         </p:spPr>
         <p:txBody>
           <a:bodyPr wrap="square">
@@ -11435,23 +11199,22 @@
           </a:bodyPr>
           <a:lstStyle/>
           <a:p>
-            <a:pPr algn="ctr"/>
-            <a:r>
-              <a:rPr lang="en-US" sz="1400" dirty="0">
-                <a:latin typeface="Arial" panose="020B0604020202020204" pitchFamily="34" charset="0"/>
-                <a:cs typeface="Arial" panose="020B0604020202020204" pitchFamily="34" charset="0"/>
-              </a:rPr>
-              <a:t>z/OSMF workflow</a:t>
+            <a:r>
+              <a:rPr lang="en-US" sz="1100" dirty="0">
+                <a:latin typeface="Arial" panose="020B0604020202020204" pitchFamily="34" charset="0"/>
+                <a:cs typeface="Arial" panose="020B0604020202020204" pitchFamily="34" charset="0"/>
+              </a:rPr>
+              <a:t>Shell script</a:t>
             </a:r>
           </a:p>
         </p:txBody>
       </p:sp>
       <p:sp>
         <p:nvSpPr>
-          <p:cNvPr id="186" name="Rectangle 185">
-            <a:extLst>
-              <a:ext uri="{FF2B5EF4-FFF2-40B4-BE49-F238E27FC236}">
-                <a16:creationId xmlns:a16="http://schemas.microsoft.com/office/drawing/2014/main" id="{A69634B0-9C23-6D4C-8CEB-A645BC10BC90}"/>
+          <p:cNvPr id="189" name="Rectangle 188">
+            <a:extLst>
+              <a:ext uri="{FF2B5EF4-FFF2-40B4-BE49-F238E27FC236}">
+                <a16:creationId xmlns:a16="http://schemas.microsoft.com/office/drawing/2014/main" id="{5EB36C5E-49E1-9F4C-981F-009A0E0594C3}"/>
               </a:ext>
             </a:extLst>
           </p:cNvPr>
@@ -11460,8 +11223,8 @@
         </p:nvSpPr>
         <p:spPr>
           <a:xfrm>
-            <a:off x="1112536" y="5635764"/>
-            <a:ext cx="1597807" cy="261610"/>
+            <a:off x="6027048" y="5700761"/>
+            <a:ext cx="1682987" cy="261610"/>
           </a:xfrm>
           <a:prstGeom prst="rect">
             <a:avLst/>
@@ -11475,124 +11238,6 @@
           <a:lstStyle/>
           <a:p>
             <a:r>
-              <a:rPr lang="en-US" sz="1100" dirty="0">
-                <a:latin typeface="Arial" panose="020B0604020202020204" pitchFamily="34" charset="0"/>
-                <a:cs typeface="Arial" panose="020B0604020202020204" pitchFamily="34" charset="0"/>
-              </a:rPr>
-              <a:t>Shell script</a:t>
-            </a:r>
-          </a:p>
-        </p:txBody>
-      </p:sp>
-      <p:sp>
-        <p:nvSpPr>
-          <p:cNvPr id="187" name="Rectangle 186">
-            <a:extLst>
-              <a:ext uri="{FF2B5EF4-FFF2-40B4-BE49-F238E27FC236}">
-                <a16:creationId xmlns:a16="http://schemas.microsoft.com/office/drawing/2014/main" id="{9DD4FFEE-862E-D540-AEB6-6B74B36ADBA9}"/>
-              </a:ext>
-            </a:extLst>
-          </p:cNvPr>
-          <p:cNvSpPr/>
-          <p:nvPr/>
-        </p:nvSpPr>
-        <p:spPr>
-          <a:xfrm>
-            <a:off x="3826033" y="5628801"/>
-            <a:ext cx="1682987" cy="261610"/>
-          </a:xfrm>
-          <a:prstGeom prst="rect">
-            <a:avLst/>
-          </a:prstGeom>
-          <a:noFill/>
-        </p:spPr>
-        <p:txBody>
-          <a:bodyPr wrap="square">
-            <a:spAutoFit/>
-          </a:bodyPr>
-          <a:lstStyle/>
-          <a:p>
-            <a:r>
-              <a:rPr lang="en-US" altLang="zh-CN" sz="1100" dirty="0">
-                <a:latin typeface="Arial" panose="020B0604020202020204" pitchFamily="34" charset="0"/>
-                <a:cs typeface="Arial" panose="020B0604020202020204" pitchFamily="34" charset="0"/>
-              </a:rPr>
-              <a:t>z/OSMF workflow</a:t>
-            </a:r>
-            <a:endParaRPr lang="en-US" sz="1100" dirty="0">
-              <a:latin typeface="Arial" panose="020B0604020202020204" pitchFamily="34" charset="0"/>
-              <a:cs typeface="Arial" panose="020B0604020202020204" pitchFamily="34" charset="0"/>
-            </a:endParaRPr>
-          </a:p>
-        </p:txBody>
-      </p:sp>
-      <p:sp>
-        <p:nvSpPr>
-          <p:cNvPr id="188" name="Rectangle 187">
-            <a:extLst>
-              <a:ext uri="{FF2B5EF4-FFF2-40B4-BE49-F238E27FC236}">
-                <a16:creationId xmlns:a16="http://schemas.microsoft.com/office/drawing/2014/main" id="{24BAA942-B59A-294B-AD09-4B735D8DF81F}"/>
-              </a:ext>
-            </a:extLst>
-          </p:cNvPr>
-          <p:cNvSpPr/>
-          <p:nvPr/>
-        </p:nvSpPr>
-        <p:spPr>
-          <a:xfrm>
-            <a:off x="6266122" y="5631394"/>
-            <a:ext cx="1597807" cy="261610"/>
-          </a:xfrm>
-          <a:prstGeom prst="rect">
-            <a:avLst/>
-          </a:prstGeom>
-          <a:noFill/>
-        </p:spPr>
-        <p:txBody>
-          <a:bodyPr wrap="square">
-            <a:spAutoFit/>
-          </a:bodyPr>
-          <a:lstStyle/>
-          <a:p>
-            <a:r>
-              <a:rPr lang="en-US" sz="1100" dirty="0">
-                <a:latin typeface="Arial" panose="020B0604020202020204" pitchFamily="34" charset="0"/>
-                <a:cs typeface="Arial" panose="020B0604020202020204" pitchFamily="34" charset="0"/>
-              </a:rPr>
-              <a:t>Shell script</a:t>
-            </a:r>
-          </a:p>
-        </p:txBody>
-      </p:sp>
-      <p:sp>
-        <p:nvSpPr>
-          <p:cNvPr id="189" name="Rectangle 188">
-            <a:extLst>
-              <a:ext uri="{FF2B5EF4-FFF2-40B4-BE49-F238E27FC236}">
-                <a16:creationId xmlns:a16="http://schemas.microsoft.com/office/drawing/2014/main" id="{5EB36C5E-49E1-9F4C-981F-009A0E0594C3}"/>
-              </a:ext>
-            </a:extLst>
-          </p:cNvPr>
-          <p:cNvSpPr/>
-          <p:nvPr/>
-        </p:nvSpPr>
-        <p:spPr>
-          <a:xfrm>
-            <a:off x="8968942" y="5623953"/>
-            <a:ext cx="1682987" cy="261610"/>
-          </a:xfrm>
-          <a:prstGeom prst="rect">
-            <a:avLst/>
-          </a:prstGeom>
-          <a:noFill/>
-        </p:spPr>
-        <p:txBody>
-          <a:bodyPr wrap="square">
-            <a:spAutoFit/>
-          </a:bodyPr>
-          <a:lstStyle/>
-          <a:p>
-            <a:r>
               <a:rPr lang="en-US" altLang="zh-CN" sz="1100" dirty="0">
                 <a:latin typeface="Arial" panose="020B0604020202020204" pitchFamily="34" charset="0"/>
                 <a:cs typeface="Arial" panose="020B0604020202020204" pitchFamily="34" charset="0"/>
@@ -11621,7 +11266,7 @@
         <p:spPr>
           <a:xfrm>
             <a:off x="726470" y="7579011"/>
-            <a:ext cx="9449560" cy="509925"/>
+            <a:ext cx="7098423" cy="509925"/>
           </a:xfrm>
           <a:prstGeom prst="rect">
             <a:avLst/>
@@ -11731,10 +11376,10 @@
       </p:sp>
       <p:cxnSp>
         <p:nvCxnSpPr>
-          <p:cNvPr id="202" name="Straight Arrow Connector 201">
-            <a:extLst>
-              <a:ext uri="{FF2B5EF4-FFF2-40B4-BE49-F238E27FC236}">
-                <a16:creationId xmlns:a16="http://schemas.microsoft.com/office/drawing/2014/main" id="{246A2A00-E342-094B-8312-BFF58079122D}"/>
+          <p:cNvPr id="204" name="Straight Arrow Connector 203">
+            <a:extLst>
+              <a:ext uri="{FF2B5EF4-FFF2-40B4-BE49-F238E27FC236}">
+                <a16:creationId xmlns:a16="http://schemas.microsoft.com/office/drawing/2014/main" id="{C34C710E-752B-3E43-B637-E8C40BCA1946}"/>
               </a:ext>
             </a:extLst>
           </p:cNvPr>
@@ -11745,8 +11390,8 @@
         </p:nvCxnSpPr>
         <p:spPr>
           <a:xfrm>
-            <a:off x="1601804" y="7131904"/>
-            <a:ext cx="0" cy="432000"/>
+            <a:off x="2194211" y="5226494"/>
+            <a:ext cx="9507" cy="2396002"/>
           </a:xfrm>
           <a:prstGeom prst="straightConnector1">
             <a:avLst/>
@@ -11778,22 +11423,23 @@
       </p:cxnSp>
       <p:cxnSp>
         <p:nvCxnSpPr>
-          <p:cNvPr id="204" name="Straight Arrow Connector 203">
-            <a:extLst>
-              <a:ext uri="{FF2B5EF4-FFF2-40B4-BE49-F238E27FC236}">
-                <a16:creationId xmlns:a16="http://schemas.microsoft.com/office/drawing/2014/main" id="{C34C710E-752B-3E43-B637-E8C40BCA1946}"/>
+          <p:cNvPr id="206" name="Straight Arrow Connector 205">
+            <a:extLst>
+              <a:ext uri="{FF2B5EF4-FFF2-40B4-BE49-F238E27FC236}">
+                <a16:creationId xmlns:a16="http://schemas.microsoft.com/office/drawing/2014/main" id="{C0035DBC-2F0D-F04D-8D33-F97C78EFB557}"/>
               </a:ext>
             </a:extLst>
           </p:cNvPr>
           <p:cNvCxnSpPr>
-            <a:stCxn id="82" idx="2"/>
+            <a:cxnSpLocks/>
+            <a:stCxn id="18" idx="2"/>
           </p:cNvCxnSpPr>
           <p:nvPr/>
         </p:nvCxnSpPr>
         <p:spPr>
-          <a:xfrm flipH="1">
-            <a:off x="4193734" y="7137872"/>
-            <a:ext cx="6879" cy="432000"/>
+          <a:xfrm>
+            <a:off x="3567803" y="7162899"/>
+            <a:ext cx="0" cy="432000"/>
           </a:xfrm>
           <a:prstGeom prst="straightConnector1">
             <a:avLst/>
@@ -11825,22 +11471,21 @@
       </p:cxnSp>
       <p:cxnSp>
         <p:nvCxnSpPr>
-          <p:cNvPr id="206" name="Straight Arrow Connector 205">
-            <a:extLst>
-              <a:ext uri="{FF2B5EF4-FFF2-40B4-BE49-F238E27FC236}">
-                <a16:creationId xmlns:a16="http://schemas.microsoft.com/office/drawing/2014/main" id="{C0035DBC-2F0D-F04D-8D33-F97C78EFB557}"/>
+          <p:cNvPr id="208" name="Straight Arrow Connector 207">
+            <a:extLst>
+              <a:ext uri="{FF2B5EF4-FFF2-40B4-BE49-F238E27FC236}">
+                <a16:creationId xmlns:a16="http://schemas.microsoft.com/office/drawing/2014/main" id="{9AFD042D-A750-7141-A300-38B5037254D9}"/>
               </a:ext>
             </a:extLst>
           </p:cNvPr>
           <p:cNvCxnSpPr>
-            <a:cxnSpLocks/>
-            <a:stCxn id="18" idx="2"/>
+            <a:stCxn id="85" idx="2"/>
           </p:cNvCxnSpPr>
           <p:nvPr/>
         </p:nvCxnSpPr>
         <p:spPr>
           <a:xfrm>
-            <a:off x="6718423" y="7131904"/>
+            <a:off x="6709959" y="7123650"/>
             <a:ext cx="0" cy="432000"/>
           </a:xfrm>
           <a:prstGeom prst="straightConnector1">
@@ -11873,53 +11518,6 @@
       </p:cxnSp>
       <p:cxnSp>
         <p:nvCxnSpPr>
-          <p:cNvPr id="208" name="Straight Arrow Connector 207">
-            <a:extLst>
-              <a:ext uri="{FF2B5EF4-FFF2-40B4-BE49-F238E27FC236}">
-                <a16:creationId xmlns:a16="http://schemas.microsoft.com/office/drawing/2014/main" id="{9AFD042D-A750-7141-A300-38B5037254D9}"/>
-              </a:ext>
-            </a:extLst>
-          </p:cNvPr>
-          <p:cNvCxnSpPr>
-            <a:stCxn id="85" idx="2"/>
-          </p:cNvCxnSpPr>
-          <p:nvPr/>
-        </p:nvCxnSpPr>
-        <p:spPr>
-          <a:xfrm>
-            <a:off x="9335871" y="7123650"/>
-            <a:ext cx="0" cy="432000"/>
-          </a:xfrm>
-          <a:prstGeom prst="straightConnector1">
-            <a:avLst/>
-          </a:prstGeom>
-          <a:ln>
-            <a:solidFill>
-              <a:schemeClr val="tx1">
-                <a:lumMod val="75000"/>
-                <a:lumOff val="25000"/>
-              </a:schemeClr>
-            </a:solidFill>
-            <a:tailEnd type="triangle"/>
-          </a:ln>
-        </p:spPr>
-        <p:style>
-          <a:lnRef idx="1">
-            <a:schemeClr val="accent1"/>
-          </a:lnRef>
-          <a:fillRef idx="0">
-            <a:schemeClr val="accent1"/>
-          </a:fillRef>
-          <a:effectRef idx="0">
-            <a:schemeClr val="accent1"/>
-          </a:effectRef>
-          <a:fontRef idx="minor">
-            <a:schemeClr val="tx1"/>
-          </a:fontRef>
-        </p:style>
-      </p:cxnSp>
-      <p:cxnSp>
-        <p:nvCxnSpPr>
           <p:cNvPr id="213" name="Straight Arrow Connector 212">
             <a:extLst>
               <a:ext uri="{FF2B5EF4-FFF2-40B4-BE49-F238E27FC236}">
@@ -11929,15 +11527,14 @@
           </p:cNvPr>
           <p:cNvCxnSpPr>
             <a:cxnSpLocks/>
-            <a:stCxn id="199" idx="2"/>
             <a:endCxn id="99" idx="0"/>
           </p:cNvCxnSpPr>
           <p:nvPr/>
         </p:nvCxnSpPr>
         <p:spPr>
           <a:xfrm>
-            <a:off x="5451250" y="8088936"/>
-            <a:ext cx="1460" cy="431616"/>
+            <a:off x="5452710" y="8083052"/>
+            <a:ext cx="0" cy="437500"/>
           </a:xfrm>
           <a:prstGeom prst="straightConnector1">
             <a:avLst/>
@@ -12876,6 +12473,694 @@
               <a:schemeClr val="tx1">
                 <a:lumMod val="75000"/>
                 <a:lumOff val="25000"/>
+              </a:schemeClr>
+            </a:solidFill>
+            <a:tailEnd type="triangle"/>
+          </a:ln>
+        </p:spPr>
+        <p:style>
+          <a:lnRef idx="1">
+            <a:schemeClr val="accent1"/>
+          </a:lnRef>
+          <a:fillRef idx="0">
+            <a:schemeClr val="accent1"/>
+          </a:fillRef>
+          <a:effectRef idx="0">
+            <a:schemeClr val="accent1"/>
+          </a:effectRef>
+          <a:fontRef idx="minor">
+            <a:schemeClr val="tx1"/>
+          </a:fontRef>
+        </p:style>
+      </p:cxnSp>
+      <p:sp>
+        <p:nvSpPr>
+          <p:cNvPr id="101" name="Rectangle 100">
+            <a:extLst>
+              <a:ext uri="{FF2B5EF4-FFF2-40B4-BE49-F238E27FC236}">
+                <a16:creationId xmlns:a16="http://schemas.microsoft.com/office/drawing/2014/main" id="{9470741F-AC7B-ED4A-B138-C8CDB2FC22FC}"/>
+              </a:ext>
+            </a:extLst>
+          </p:cNvPr>
+          <p:cNvSpPr/>
+          <p:nvPr/>
+        </p:nvSpPr>
+        <p:spPr>
+          <a:xfrm>
+            <a:off x="7824893" y="3767003"/>
+            <a:ext cx="2243289" cy="558971"/>
+          </a:xfrm>
+          <a:prstGeom prst="rect">
+            <a:avLst/>
+          </a:prstGeom>
+          <a:solidFill>
+            <a:schemeClr val="accent6">
+              <a:lumMod val="40000"/>
+              <a:lumOff val="60000"/>
+            </a:schemeClr>
+          </a:solidFill>
+          <a:ln>
+            <a:solidFill>
+              <a:schemeClr val="bg2"/>
+            </a:solidFill>
+          </a:ln>
+        </p:spPr>
+        <p:style>
+          <a:lnRef idx="2">
+            <a:schemeClr val="accent1">
+              <a:shade val="50000"/>
+            </a:schemeClr>
+          </a:lnRef>
+          <a:fillRef idx="1">
+            <a:schemeClr val="accent1"/>
+          </a:fillRef>
+          <a:effectRef idx="0">
+            <a:schemeClr val="accent1"/>
+          </a:effectRef>
+          <a:fontRef idx="minor">
+            <a:schemeClr val="lt1"/>
+          </a:fontRef>
+        </p:style>
+        <p:txBody>
+          <a:bodyPr rot="0" spcFirstLastPara="0" vertOverflow="overflow" horzOverflow="overflow" vert="horz" wrap="square" lIns="91440" tIns="45720" rIns="91440" bIns="45720" numCol="1" spcCol="0" rtlCol="0" fromWordArt="0" anchor="ctr" anchorCtr="0" forceAA="0" compatLnSpc="1">
+            <a:prstTxWarp prst="textNoShape">
+              <a:avLst/>
+            </a:prstTxWarp>
+            <a:noAutofit/>
+          </a:bodyPr>
+          <a:lstStyle/>
+          <a:p>
+            <a:pPr algn="ctr"/>
+            <a:r>
+              <a:rPr lang="en-US" sz="1100" dirty="0">
+                <a:solidFill>
+                  <a:schemeClr val="tx1"/>
+                </a:solidFill>
+                <a:latin typeface="Arial" panose="020B0604020202020204" pitchFamily="34" charset="0"/>
+                <a:cs typeface="Arial" panose="020B0604020202020204" pitchFamily="34" charset="0"/>
+              </a:rPr>
+              <a:t>Download the </a:t>
+            </a:r>
+            <a:r>
+              <a:rPr lang="en-US" sz="1100" dirty="0" smtClean="0">
+                <a:solidFill>
+                  <a:schemeClr val="tx1"/>
+                </a:solidFill>
+                <a:latin typeface="Arial" panose="020B0604020202020204" pitchFamily="34" charset="0"/>
+                <a:cs typeface="Arial" panose="020B0604020202020204" pitchFamily="34" charset="0"/>
+              </a:rPr>
+              <a:t>PSWI </a:t>
+            </a:r>
+            <a:r>
+              <a:rPr lang="en-US" sz="1100" dirty="0">
+                <a:solidFill>
+                  <a:schemeClr val="tx1"/>
+                </a:solidFill>
+                <a:latin typeface="Arial" panose="020B0604020202020204" pitchFamily="34" charset="0"/>
+                <a:cs typeface="Arial" panose="020B0604020202020204" pitchFamily="34" charset="0"/>
+              </a:rPr>
+              <a:t>build</a:t>
+            </a:r>
+          </a:p>
+        </p:txBody>
+      </p:sp>
+      <p:cxnSp>
+        <p:nvCxnSpPr>
+          <p:cNvPr id="103" name="Elbow Connector 102">
+            <a:extLst>
+              <a:ext uri="{FF2B5EF4-FFF2-40B4-BE49-F238E27FC236}">
+                <a16:creationId xmlns:a16="http://schemas.microsoft.com/office/drawing/2014/main" id="{51CC1DD3-FEF0-E245-8145-A63C4C3D2D03}"/>
+              </a:ext>
+            </a:extLst>
+          </p:cNvPr>
+          <p:cNvCxnSpPr>
+            <a:stCxn id="10" idx="3"/>
+            <a:endCxn id="101" idx="0"/>
+          </p:cNvCxnSpPr>
+          <p:nvPr/>
+        </p:nvCxnSpPr>
+        <p:spPr>
+          <a:xfrm>
+            <a:off x="6454852" y="3553836"/>
+            <a:ext cx="2491686" cy="213167"/>
+          </a:xfrm>
+          <a:prstGeom prst="bentConnector2">
+            <a:avLst/>
+          </a:prstGeom>
+          <a:ln>
+            <a:solidFill>
+              <a:schemeClr val="tx1">
+                <a:lumMod val="75000"/>
+                <a:lumOff val="25000"/>
+              </a:schemeClr>
+            </a:solidFill>
+            <a:tailEnd type="triangle"/>
+          </a:ln>
+        </p:spPr>
+        <p:style>
+          <a:lnRef idx="1">
+            <a:schemeClr val="accent1"/>
+          </a:lnRef>
+          <a:fillRef idx="0">
+            <a:schemeClr val="accent1"/>
+          </a:fillRef>
+          <a:effectRef idx="0">
+            <a:schemeClr val="accent1"/>
+          </a:effectRef>
+          <a:fontRef idx="minor">
+            <a:schemeClr val="tx1"/>
+          </a:fontRef>
+        </p:style>
+      </p:cxnSp>
+      <p:sp>
+        <p:nvSpPr>
+          <p:cNvPr id="108" name="Rectangle 107">
+            <a:extLst>
+              <a:ext uri="{FF2B5EF4-FFF2-40B4-BE49-F238E27FC236}">
+                <a16:creationId xmlns:a16="http://schemas.microsoft.com/office/drawing/2014/main" id="{48584CFC-8AA5-A24C-AA2A-281FBC765270}"/>
+              </a:ext>
+            </a:extLst>
+          </p:cNvPr>
+          <p:cNvSpPr/>
+          <p:nvPr/>
+        </p:nvSpPr>
+        <p:spPr>
+          <a:xfrm>
+            <a:off x="6621514" y="3285456"/>
+            <a:ext cx="2476765" cy="261610"/>
+          </a:xfrm>
+          <a:prstGeom prst="rect">
+            <a:avLst/>
+          </a:prstGeom>
+        </p:spPr>
+        <p:txBody>
+          <a:bodyPr wrap="square">
+            <a:spAutoFit/>
+          </a:bodyPr>
+          <a:lstStyle/>
+          <a:p>
+            <a:r>
+              <a:rPr lang="en-US" sz="1100" dirty="0" smtClean="0">
+                <a:solidFill>
+                  <a:schemeClr val="accent2">
+                    <a:lumMod val="75000"/>
+                  </a:schemeClr>
+                </a:solidFill>
+                <a:latin typeface="Arial" panose="020B0604020202020204" pitchFamily="34" charset="0"/>
+                <a:cs typeface="Arial" panose="020B0604020202020204" pitchFamily="34" charset="0"/>
+              </a:rPr>
+              <a:t>Portable software instance (PSWI)</a:t>
+            </a:r>
+            <a:endParaRPr lang="en-US" sz="1100" dirty="0">
+              <a:solidFill>
+                <a:schemeClr val="accent2">
+                  <a:lumMod val="75000"/>
+                </a:schemeClr>
+              </a:solidFill>
+              <a:latin typeface="Arial" panose="020B0604020202020204" pitchFamily="34" charset="0"/>
+              <a:cs typeface="Arial" panose="020B0604020202020204" pitchFamily="34" charset="0"/>
+            </a:endParaRPr>
+          </a:p>
+        </p:txBody>
+      </p:sp>
+      <p:sp>
+        <p:nvSpPr>
+          <p:cNvPr id="109" name="Rectangle 108">
+            <a:extLst>
+              <a:ext uri="{FF2B5EF4-FFF2-40B4-BE49-F238E27FC236}">
+                <a16:creationId xmlns:a16="http://schemas.microsoft.com/office/drawing/2014/main" id="{CCF7887F-10F2-9740-9DDE-6472EBCD2690}"/>
+              </a:ext>
+            </a:extLst>
+          </p:cNvPr>
+          <p:cNvSpPr/>
+          <p:nvPr/>
+        </p:nvSpPr>
+        <p:spPr>
+          <a:xfrm>
+            <a:off x="7824897" y="4468926"/>
+            <a:ext cx="2243285" cy="558971"/>
+          </a:xfrm>
+          <a:prstGeom prst="rect">
+            <a:avLst/>
+          </a:prstGeom>
+          <a:solidFill>
+            <a:schemeClr val="accent6">
+              <a:lumMod val="40000"/>
+              <a:lumOff val="60000"/>
+            </a:schemeClr>
+          </a:solidFill>
+          <a:ln>
+            <a:solidFill>
+              <a:schemeClr val="bg2"/>
+            </a:solidFill>
+          </a:ln>
+        </p:spPr>
+        <p:style>
+          <a:lnRef idx="2">
+            <a:schemeClr val="accent1">
+              <a:shade val="50000"/>
+            </a:schemeClr>
+          </a:lnRef>
+          <a:fillRef idx="1">
+            <a:schemeClr val="accent1"/>
+          </a:fillRef>
+          <a:effectRef idx="0">
+            <a:schemeClr val="accent1"/>
+          </a:effectRef>
+          <a:fontRef idx="minor">
+            <a:schemeClr val="lt1"/>
+          </a:fontRef>
+        </p:style>
+        <p:txBody>
+          <a:bodyPr rot="0" spcFirstLastPara="0" vertOverflow="overflow" horzOverflow="overflow" vert="horz" wrap="square" lIns="91440" tIns="45720" rIns="91440" bIns="45720" numCol="1" spcCol="0" rtlCol="0" fromWordArt="0" anchor="ctr" anchorCtr="0" forceAA="0" compatLnSpc="1">
+            <a:prstTxWarp prst="textNoShape">
+              <a:avLst/>
+            </a:prstTxWarp>
+            <a:noAutofit/>
+          </a:bodyPr>
+          <a:lstStyle/>
+          <a:p>
+            <a:pPr algn="ctr"/>
+            <a:r>
+              <a:rPr lang="en-US" sz="1100" dirty="0">
+                <a:solidFill>
+                  <a:schemeClr val="tx1"/>
+                </a:solidFill>
+                <a:latin typeface="Arial" panose="020B0604020202020204" pitchFamily="34" charset="0"/>
+                <a:cs typeface="Arial" panose="020B0604020202020204" pitchFamily="34" charset="0"/>
+              </a:rPr>
+              <a:t>Verify, transfer, and expand the PAX file on z/OS</a:t>
+            </a:r>
+          </a:p>
+        </p:txBody>
+      </p:sp>
+      <p:cxnSp>
+        <p:nvCxnSpPr>
+          <p:cNvPr id="110" name="Straight Arrow Connector 109">
+            <a:extLst>
+              <a:ext uri="{FF2B5EF4-FFF2-40B4-BE49-F238E27FC236}">
+                <a16:creationId xmlns:a16="http://schemas.microsoft.com/office/drawing/2014/main" id="{FFA5420E-5B30-BB4D-8699-10BA8C90F354}"/>
+              </a:ext>
+            </a:extLst>
+          </p:cNvPr>
+          <p:cNvCxnSpPr>
+            <a:endCxn id="109" idx="0"/>
+          </p:cNvCxnSpPr>
+          <p:nvPr/>
+        </p:nvCxnSpPr>
+        <p:spPr>
+          <a:xfrm>
+            <a:off x="8946538" y="4316796"/>
+            <a:ext cx="2" cy="152130"/>
+          </a:xfrm>
+          <a:prstGeom prst="straightConnector1">
+            <a:avLst/>
+          </a:prstGeom>
+          <a:ln>
+            <a:solidFill>
+              <a:schemeClr val="tx1">
+                <a:lumMod val="75000"/>
+                <a:lumOff val="25000"/>
+              </a:schemeClr>
+            </a:solidFill>
+            <a:tailEnd type="triangle"/>
+          </a:ln>
+        </p:spPr>
+        <p:style>
+          <a:lnRef idx="1">
+            <a:schemeClr val="accent1"/>
+          </a:lnRef>
+          <a:fillRef idx="0">
+            <a:schemeClr val="accent1"/>
+          </a:fillRef>
+          <a:effectRef idx="0">
+            <a:schemeClr val="accent1"/>
+          </a:effectRef>
+          <a:fontRef idx="minor">
+            <a:schemeClr val="tx1"/>
+          </a:fontRef>
+        </p:style>
+      </p:cxnSp>
+      <p:sp>
+        <p:nvSpPr>
+          <p:cNvPr id="111" name="Rectangle 110">
+            <a:extLst>
+              <a:ext uri="{FF2B5EF4-FFF2-40B4-BE49-F238E27FC236}">
+                <a16:creationId xmlns:a16="http://schemas.microsoft.com/office/drawing/2014/main" id="{CCF7887F-10F2-9740-9DDE-6472EBCD2690}"/>
+              </a:ext>
+            </a:extLst>
+          </p:cNvPr>
+          <p:cNvSpPr/>
+          <p:nvPr/>
+        </p:nvSpPr>
+        <p:spPr>
+          <a:xfrm>
+            <a:off x="7824897" y="5184379"/>
+            <a:ext cx="2243285" cy="558971"/>
+          </a:xfrm>
+          <a:prstGeom prst="rect">
+            <a:avLst/>
+          </a:prstGeom>
+          <a:solidFill>
+            <a:schemeClr val="accent6">
+              <a:lumMod val="40000"/>
+              <a:lumOff val="60000"/>
+            </a:schemeClr>
+          </a:solidFill>
+          <a:ln>
+            <a:solidFill>
+              <a:schemeClr val="bg2"/>
+            </a:solidFill>
+          </a:ln>
+        </p:spPr>
+        <p:style>
+          <a:lnRef idx="2">
+            <a:schemeClr val="accent1">
+              <a:shade val="50000"/>
+            </a:schemeClr>
+          </a:lnRef>
+          <a:fillRef idx="1">
+            <a:schemeClr val="accent1"/>
+          </a:fillRef>
+          <a:effectRef idx="0">
+            <a:schemeClr val="accent1"/>
+          </a:effectRef>
+          <a:fontRef idx="minor">
+            <a:schemeClr val="lt1"/>
+          </a:fontRef>
+        </p:style>
+        <p:txBody>
+          <a:bodyPr rot="0" spcFirstLastPara="0" vertOverflow="overflow" horzOverflow="overflow" vert="horz" wrap="square" lIns="91440" tIns="45720" rIns="91440" bIns="45720" numCol="1" spcCol="0" rtlCol="0" fromWordArt="0" anchor="ctr" anchorCtr="0" forceAA="0" compatLnSpc="1">
+            <a:prstTxWarp prst="textNoShape">
+              <a:avLst/>
+            </a:prstTxWarp>
+            <a:noAutofit/>
+          </a:bodyPr>
+          <a:lstStyle/>
+          <a:p>
+            <a:pPr algn="ctr"/>
+            <a:r>
+              <a:rPr lang="en-US" sz="1100" dirty="0" smtClean="0">
+                <a:solidFill>
+                  <a:schemeClr val="tx1"/>
+                </a:solidFill>
+                <a:latin typeface="Arial" panose="020B0604020202020204" pitchFamily="34" charset="0"/>
+                <a:cs typeface="Arial" panose="020B0604020202020204" pitchFamily="34" charset="0"/>
+              </a:rPr>
+              <a:t>Install the </a:t>
+            </a:r>
+            <a:r>
+              <a:rPr lang="en-US" sz="1100" dirty="0" err="1" smtClean="0">
+                <a:solidFill>
+                  <a:schemeClr val="tx1"/>
+                </a:solidFill>
+                <a:latin typeface="Arial" panose="020B0604020202020204" pitchFamily="34" charset="0"/>
+                <a:cs typeface="Arial" panose="020B0604020202020204" pitchFamily="34" charset="0"/>
+              </a:rPr>
+              <a:t>Zowe</a:t>
+            </a:r>
+            <a:r>
+              <a:rPr lang="en-US" sz="1100" dirty="0" smtClean="0">
+                <a:solidFill>
+                  <a:schemeClr val="tx1"/>
+                </a:solidFill>
+                <a:latin typeface="Arial" panose="020B0604020202020204" pitchFamily="34" charset="0"/>
+                <a:cs typeface="Arial" panose="020B0604020202020204" pitchFamily="34" charset="0"/>
+              </a:rPr>
+              <a:t> SMP/E using PSWI</a:t>
+            </a:r>
+            <a:endParaRPr lang="en-US" sz="1100" dirty="0">
+              <a:solidFill>
+                <a:schemeClr val="tx1"/>
+              </a:solidFill>
+              <a:latin typeface="Arial" panose="020B0604020202020204" pitchFamily="34" charset="0"/>
+              <a:cs typeface="Arial" panose="020B0604020202020204" pitchFamily="34" charset="0"/>
+            </a:endParaRPr>
+          </a:p>
+        </p:txBody>
+      </p:sp>
+      <p:cxnSp>
+        <p:nvCxnSpPr>
+          <p:cNvPr id="112" name="Straight Arrow Connector 111">
+            <a:extLst>
+              <a:ext uri="{FF2B5EF4-FFF2-40B4-BE49-F238E27FC236}">
+                <a16:creationId xmlns:a16="http://schemas.microsoft.com/office/drawing/2014/main" id="{FFA5420E-5B30-BB4D-8699-10BA8C90F354}"/>
+              </a:ext>
+            </a:extLst>
+          </p:cNvPr>
+          <p:cNvCxnSpPr>
+            <a:endCxn id="111" idx="0"/>
+          </p:cNvCxnSpPr>
+          <p:nvPr/>
+        </p:nvCxnSpPr>
+        <p:spPr>
+          <a:xfrm>
+            <a:off x="8946538" y="5032249"/>
+            <a:ext cx="2" cy="152130"/>
+          </a:xfrm>
+          <a:prstGeom prst="straightConnector1">
+            <a:avLst/>
+          </a:prstGeom>
+          <a:ln>
+            <a:solidFill>
+              <a:schemeClr val="tx1">
+                <a:lumMod val="75000"/>
+                <a:lumOff val="25000"/>
+              </a:schemeClr>
+            </a:solidFill>
+            <a:tailEnd type="triangle"/>
+          </a:ln>
+        </p:spPr>
+        <p:style>
+          <a:lnRef idx="1">
+            <a:schemeClr val="accent1"/>
+          </a:lnRef>
+          <a:fillRef idx="0">
+            <a:schemeClr val="accent1"/>
+          </a:fillRef>
+          <a:effectRef idx="0">
+            <a:schemeClr val="accent1"/>
+          </a:effectRef>
+          <a:fontRef idx="minor">
+            <a:schemeClr val="tx1"/>
+          </a:fontRef>
+        </p:style>
+      </p:cxnSp>
+      <p:sp>
+        <p:nvSpPr>
+          <p:cNvPr id="113" name="Rectangle 112">
+            <a:extLst>
+              <a:ext uri="{FF2B5EF4-FFF2-40B4-BE49-F238E27FC236}">
+                <a16:creationId xmlns:a16="http://schemas.microsoft.com/office/drawing/2014/main" id="{CCF7887F-10F2-9740-9DDE-6472EBCD2690}"/>
+              </a:ext>
+            </a:extLst>
+          </p:cNvPr>
+          <p:cNvSpPr/>
+          <p:nvPr/>
+        </p:nvSpPr>
+        <p:spPr>
+          <a:xfrm>
+            <a:off x="7824897" y="5894462"/>
+            <a:ext cx="2243285" cy="558971"/>
+          </a:xfrm>
+          <a:prstGeom prst="rect">
+            <a:avLst/>
+          </a:prstGeom>
+          <a:solidFill>
+            <a:schemeClr val="accent6">
+              <a:lumMod val="40000"/>
+              <a:lumOff val="60000"/>
+            </a:schemeClr>
+          </a:solidFill>
+          <a:ln>
+            <a:solidFill>
+              <a:schemeClr val="bg2"/>
+            </a:solidFill>
+          </a:ln>
+        </p:spPr>
+        <p:style>
+          <a:lnRef idx="2">
+            <a:schemeClr val="accent1">
+              <a:shade val="50000"/>
+            </a:schemeClr>
+          </a:lnRef>
+          <a:fillRef idx="1">
+            <a:schemeClr val="accent1"/>
+          </a:fillRef>
+          <a:effectRef idx="0">
+            <a:schemeClr val="accent1"/>
+          </a:effectRef>
+          <a:fontRef idx="minor">
+            <a:schemeClr val="lt1"/>
+          </a:fontRef>
+        </p:style>
+        <p:txBody>
+          <a:bodyPr rot="0" spcFirstLastPara="0" vertOverflow="overflow" horzOverflow="overflow" vert="horz" wrap="square" lIns="91440" tIns="45720" rIns="91440" bIns="45720" numCol="1" spcCol="0" rtlCol="0" fromWordArt="0" anchor="ctr" anchorCtr="0" forceAA="0" compatLnSpc="1">
+            <a:prstTxWarp prst="textNoShape">
+              <a:avLst/>
+            </a:prstTxWarp>
+            <a:noAutofit/>
+          </a:bodyPr>
+          <a:lstStyle/>
+          <a:p>
+            <a:pPr algn="ctr"/>
+            <a:r>
+              <a:rPr lang="en-US" sz="1100" dirty="0" smtClean="0">
+                <a:solidFill>
+                  <a:schemeClr val="tx1"/>
+                </a:solidFill>
+                <a:latin typeface="Arial" panose="020B0604020202020204" pitchFamily="34" charset="0"/>
+                <a:cs typeface="Arial" panose="020B0604020202020204" pitchFamily="34" charset="0"/>
+              </a:rPr>
+              <a:t>Mount </a:t>
+            </a:r>
+            <a:r>
+              <a:rPr lang="en-US" sz="1100" dirty="0" err="1" smtClean="0">
+                <a:solidFill>
+                  <a:schemeClr val="tx1"/>
+                </a:solidFill>
+                <a:latin typeface="Arial" panose="020B0604020202020204" pitchFamily="34" charset="0"/>
+                <a:cs typeface="Arial" panose="020B0604020202020204" pitchFamily="34" charset="0"/>
+              </a:rPr>
+              <a:t>Zowe</a:t>
+            </a:r>
+            <a:r>
+              <a:rPr lang="en-US" sz="1100" dirty="0" smtClean="0">
+                <a:solidFill>
+                  <a:schemeClr val="tx1"/>
+                </a:solidFill>
+                <a:latin typeface="Arial" panose="020B0604020202020204" pitchFamily="34" charset="0"/>
+                <a:cs typeface="Arial" panose="020B0604020202020204" pitchFamily="34" charset="0"/>
+              </a:rPr>
+              <a:t> </a:t>
+            </a:r>
+            <a:r>
+              <a:rPr lang="en-US" sz="1100" dirty="0" err="1" smtClean="0">
+                <a:solidFill>
+                  <a:schemeClr val="tx1"/>
+                </a:solidFill>
+                <a:latin typeface="Arial" panose="020B0604020202020204" pitchFamily="34" charset="0"/>
+                <a:cs typeface="Arial" panose="020B0604020202020204" pitchFamily="34" charset="0"/>
+              </a:rPr>
+              <a:t>zFS</a:t>
+            </a:r>
+            <a:r>
+              <a:rPr lang="en-US" sz="1100" dirty="0" smtClean="0">
+                <a:solidFill>
+                  <a:schemeClr val="tx1"/>
+                </a:solidFill>
+                <a:latin typeface="Arial" panose="020B0604020202020204" pitchFamily="34" charset="0"/>
+                <a:cs typeface="Arial" panose="020B0604020202020204" pitchFamily="34" charset="0"/>
+              </a:rPr>
+              <a:t> workflow</a:t>
+            </a:r>
+            <a:r>
+              <a:rPr lang="en-US" sz="1100" b="1" dirty="0" smtClean="0">
+                <a:solidFill>
+                  <a:schemeClr val="tx1"/>
+                </a:solidFill>
+                <a:latin typeface="Arial" panose="020B0604020202020204" pitchFamily="34" charset="0"/>
+                <a:cs typeface="Arial" panose="020B0604020202020204" pitchFamily="34" charset="0"/>
+              </a:rPr>
+              <a:t/>
+            </a:r>
+            <a:br>
+              <a:rPr lang="en-US" sz="1100" b="1" dirty="0" smtClean="0">
+                <a:solidFill>
+                  <a:schemeClr val="tx1"/>
+                </a:solidFill>
+                <a:latin typeface="Arial" panose="020B0604020202020204" pitchFamily="34" charset="0"/>
+                <a:cs typeface="Arial" panose="020B0604020202020204" pitchFamily="34" charset="0"/>
+              </a:rPr>
+            </a:br>
+            <a:r>
+              <a:rPr lang="en-US" sz="1100" b="1" dirty="0" smtClean="0">
+                <a:solidFill>
+                  <a:schemeClr val="tx1"/>
+                </a:solidFill>
+                <a:latin typeface="Arial" panose="020B0604020202020204" pitchFamily="34" charset="0"/>
+                <a:cs typeface="Arial" panose="020B0604020202020204" pitchFamily="34" charset="0"/>
+              </a:rPr>
+              <a:t>ZWE9MNT</a:t>
+            </a:r>
+            <a:endParaRPr lang="en-US" sz="1100" b="1" dirty="0">
+              <a:solidFill>
+                <a:schemeClr val="tx1"/>
+              </a:solidFill>
+              <a:latin typeface="Arial" panose="020B0604020202020204" pitchFamily="34" charset="0"/>
+              <a:cs typeface="Arial" panose="020B0604020202020204" pitchFamily="34" charset="0"/>
+            </a:endParaRPr>
+          </a:p>
+        </p:txBody>
+      </p:sp>
+      <p:cxnSp>
+        <p:nvCxnSpPr>
+          <p:cNvPr id="114" name="Straight Arrow Connector 113">
+            <a:extLst>
+              <a:ext uri="{FF2B5EF4-FFF2-40B4-BE49-F238E27FC236}">
+                <a16:creationId xmlns:a16="http://schemas.microsoft.com/office/drawing/2014/main" id="{FFA5420E-5B30-BB4D-8699-10BA8C90F354}"/>
+              </a:ext>
+            </a:extLst>
+          </p:cNvPr>
+          <p:cNvCxnSpPr>
+            <a:endCxn id="113" idx="0"/>
+          </p:cNvCxnSpPr>
+          <p:nvPr/>
+        </p:nvCxnSpPr>
+        <p:spPr>
+          <a:xfrm>
+            <a:off x="8946538" y="5742332"/>
+            <a:ext cx="2" cy="152130"/>
+          </a:xfrm>
+          <a:prstGeom prst="straightConnector1">
+            <a:avLst/>
+          </a:prstGeom>
+          <a:ln>
+            <a:solidFill>
+              <a:schemeClr val="tx1">
+                <a:lumMod val="75000"/>
+                <a:lumOff val="25000"/>
+              </a:schemeClr>
+            </a:solidFill>
+            <a:tailEnd type="triangle"/>
+          </a:ln>
+        </p:spPr>
+        <p:style>
+          <a:lnRef idx="1">
+            <a:schemeClr val="accent1"/>
+          </a:lnRef>
+          <a:fillRef idx="0">
+            <a:schemeClr val="accent1"/>
+          </a:fillRef>
+          <a:effectRef idx="0">
+            <a:schemeClr val="accent1"/>
+          </a:effectRef>
+          <a:fontRef idx="minor">
+            <a:schemeClr val="tx1"/>
+          </a:fontRef>
+        </p:style>
+      </p:cxnSp>
+      <p:cxnSp>
+        <p:nvCxnSpPr>
+          <p:cNvPr id="254" name="Elbow Connector 253"/>
+          <p:cNvCxnSpPr>
+            <a:endCxn id="74" idx="0"/>
+          </p:cNvCxnSpPr>
+          <p:nvPr/>
+        </p:nvCxnSpPr>
+        <p:spPr>
+          <a:xfrm rot="5400000">
+            <a:off x="6959011" y="7906675"/>
+            <a:ext cx="3445603" cy="541046"/>
+          </a:xfrm>
+          <a:prstGeom prst="bentConnector3">
+            <a:avLst/>
+          </a:prstGeom>
+          <a:ln>
+            <a:solidFill>
+              <a:schemeClr val="tx1">
+                <a:lumMod val="85000"/>
+                <a:lumOff val="15000"/>
               </a:schemeClr>
             </a:solidFill>
             <a:tailEnd type="triangle"/>
@@ -12906,6 +13191,13 @@
   <p:clrMapOvr>
     <a:masterClrMapping/>
   </p:clrMapOvr>
+  <p:timing>
+    <p:tnLst>
+      <p:par>
+        <p:cTn id="1" dur="indefinite" restart="never" nodeType="tmRoot"/>
+      </p:par>
+    </p:tnLst>
+  </p:timing>
 </p:sld>
 </file>
 

</xml_diff>

<commit_message>
Update ZE RNs Update the zos install rdmap diagram (#1925)
Signed-off-by: ik673626 <igor.kazmyr@broadcom.com>

Co-authored-by: nannanli <nannanli@cn.ibm.com>
</commit_message>
<xml_diff>
--- a/docs/images/common/zowe-zos-install-diagram.pptx
+++ b/docs/images/common/zowe-zos-install-diagram.pptx
@@ -245,7 +245,7 @@
           <a:p>
             <a:fld id="{C4A90A56-7146-D847-92E1-256101539D4D}" type="datetimeFigureOut">
               <a:rPr lang="en-US" smtClean="0"/>
-              <a:t>6/7/2021</a:t>
+              <a:t>12/2/2021</a:t>
             </a:fld>
             <a:endParaRPr lang="en-US"/>
           </a:p>
@@ -415,7 +415,7 @@
           <a:p>
             <a:fld id="{C4A90A56-7146-D847-92E1-256101539D4D}" type="datetimeFigureOut">
               <a:rPr lang="en-US" smtClean="0"/>
-              <a:t>6/7/2021</a:t>
+              <a:t>12/2/2021</a:t>
             </a:fld>
             <a:endParaRPr lang="en-US"/>
           </a:p>
@@ -595,7 +595,7 @@
           <a:p>
             <a:fld id="{C4A90A56-7146-D847-92E1-256101539D4D}" type="datetimeFigureOut">
               <a:rPr lang="en-US" smtClean="0"/>
-              <a:t>6/7/2021</a:t>
+              <a:t>12/2/2021</a:t>
             </a:fld>
             <a:endParaRPr lang="en-US"/>
           </a:p>
@@ -765,7 +765,7 @@
           <a:p>
             <a:fld id="{C4A90A56-7146-D847-92E1-256101539D4D}" type="datetimeFigureOut">
               <a:rPr lang="en-US" smtClean="0"/>
-              <a:t>6/7/2021</a:t>
+              <a:t>12/2/2021</a:t>
             </a:fld>
             <a:endParaRPr lang="en-US"/>
           </a:p>
@@ -1009,7 +1009,7 @@
           <a:p>
             <a:fld id="{C4A90A56-7146-D847-92E1-256101539D4D}" type="datetimeFigureOut">
               <a:rPr lang="en-US" smtClean="0"/>
-              <a:t>6/7/2021</a:t>
+              <a:t>12/2/2021</a:t>
             </a:fld>
             <a:endParaRPr lang="en-US"/>
           </a:p>
@@ -1241,7 +1241,7 @@
           <a:p>
             <a:fld id="{C4A90A56-7146-D847-92E1-256101539D4D}" type="datetimeFigureOut">
               <a:rPr lang="en-US" smtClean="0"/>
-              <a:t>6/7/2021</a:t>
+              <a:t>12/2/2021</a:t>
             </a:fld>
             <a:endParaRPr lang="en-US"/>
           </a:p>
@@ -1608,7 +1608,7 @@
           <a:p>
             <a:fld id="{C4A90A56-7146-D847-92E1-256101539D4D}" type="datetimeFigureOut">
               <a:rPr lang="en-US" smtClean="0"/>
-              <a:t>6/7/2021</a:t>
+              <a:t>12/2/2021</a:t>
             </a:fld>
             <a:endParaRPr lang="en-US"/>
           </a:p>
@@ -1726,7 +1726,7 @@
           <a:p>
             <a:fld id="{C4A90A56-7146-D847-92E1-256101539D4D}" type="datetimeFigureOut">
               <a:rPr lang="en-US" smtClean="0"/>
-              <a:t>6/7/2021</a:t>
+              <a:t>12/2/2021</a:t>
             </a:fld>
             <a:endParaRPr lang="en-US"/>
           </a:p>
@@ -1821,7 +1821,7 @@
           <a:p>
             <a:fld id="{C4A90A56-7146-D847-92E1-256101539D4D}" type="datetimeFigureOut">
               <a:rPr lang="en-US" smtClean="0"/>
-              <a:t>6/7/2021</a:t>
+              <a:t>12/2/2021</a:t>
             </a:fld>
             <a:endParaRPr lang="en-US"/>
           </a:p>
@@ -2098,7 +2098,7 @@
           <a:p>
             <a:fld id="{C4A90A56-7146-D847-92E1-256101539D4D}" type="datetimeFigureOut">
               <a:rPr lang="en-US" smtClean="0"/>
-              <a:t>6/7/2021</a:t>
+              <a:t>12/2/2021</a:t>
             </a:fld>
             <a:endParaRPr lang="en-US"/>
           </a:p>
@@ -2355,7 +2355,7 @@
           <a:p>
             <a:fld id="{C4A90A56-7146-D847-92E1-256101539D4D}" type="datetimeFigureOut">
               <a:rPr lang="en-US" smtClean="0"/>
-              <a:t>6/7/2021</a:t>
+              <a:t>12/2/2021</a:t>
             </a:fld>
             <a:endParaRPr lang="en-US"/>
           </a:p>
@@ -2568,7 +2568,7 @@
           <a:p>
             <a:fld id="{C4A90A56-7146-D847-92E1-256101539D4D}" type="datetimeFigureOut">
               <a:rPr lang="en-US" smtClean="0"/>
-              <a:t>6/7/2021</a:t>
+              <a:t>12/2/2021</a:t>
             </a:fld>
             <a:endParaRPr lang="en-US"/>
           </a:p>
@@ -7286,6 +7286,14 @@
   <p:clrMapOvr>
     <a:masterClrMapping/>
   </p:clrMapOvr>
+  <mc:AlternateContent xmlns:mc="http://schemas.openxmlformats.org/markup-compatibility/2006">
+    <mc:Choice xmlns:p14="http://schemas.microsoft.com/office/powerpoint/2010/main" Requires="p14">
+      <p:transition spd="slow" p14:dur="2000"/>
+    </mc:Choice>
+    <mc:Fallback>
+      <p:transition spd="slow"/>
+    </mc:Fallback>
+  </mc:AlternateContent>
 </p:sld>
 </file>
 
@@ -7640,7 +7648,7 @@
         </p:nvSpPr>
         <p:spPr>
           <a:xfrm>
-            <a:off x="6913585" y="3847956"/>
+            <a:off x="4053337" y="4146586"/>
             <a:ext cx="2243289" cy="558971"/>
           </a:xfrm>
           <a:prstGeom prst="rect">
@@ -7711,7 +7719,7 @@
         </p:nvSpPr>
         <p:spPr>
           <a:xfrm>
-            <a:off x="1790098" y="3843937"/>
+            <a:off x="1068883" y="3767003"/>
             <a:ext cx="2250655" cy="558971"/>
           </a:xfrm>
           <a:prstGeom prst="rect">
@@ -7782,7 +7790,7 @@
         </p:nvSpPr>
         <p:spPr>
           <a:xfrm>
-            <a:off x="6913585" y="4676508"/>
+            <a:off x="4053341" y="4857687"/>
             <a:ext cx="2243285" cy="558971"/>
           </a:xfrm>
           <a:prstGeom prst="rect">
@@ -7853,7 +7861,7 @@
         </p:nvSpPr>
         <p:spPr>
           <a:xfrm>
-            <a:off x="5878264" y="6393174"/>
+            <a:off x="2727644" y="6424169"/>
             <a:ext cx="1680319" cy="738730"/>
           </a:xfrm>
           <a:prstGeom prst="rect">
@@ -7944,7 +7952,7 @@
         </p:nvSpPr>
         <p:spPr>
           <a:xfrm>
-            <a:off x="726470" y="6374335"/>
+            <a:off x="1318877" y="4468926"/>
             <a:ext cx="1750668" cy="757568"/>
           </a:xfrm>
           <a:prstGeom prst="rect">
@@ -8140,7 +8148,7 @@
         </p:nvSpPr>
         <p:spPr>
           <a:xfrm>
-            <a:off x="6545505" y="3285456"/>
+            <a:off x="5145216" y="3894670"/>
             <a:ext cx="1682987" cy="261610"/>
           </a:xfrm>
           <a:prstGeom prst="rect">
@@ -10348,8 +10356,8 @@
         </p:nvCxnSpPr>
         <p:spPr>
           <a:xfrm rot="10800000" flipV="1">
-            <a:off x="2915426" y="3553835"/>
-            <a:ext cx="979688" cy="290101"/>
+            <a:off x="2194212" y="3553835"/>
+            <a:ext cx="1700903" cy="213167"/>
           </a:xfrm>
           <a:prstGeom prst="bentConnector2">
             <a:avLst/>
@@ -10389,18 +10397,20 @@
             </a:extLst>
           </p:cNvPr>
           <p:cNvCxnSpPr>
-            <a:stCxn id="10" idx="3"/>
+            <a:stCxn id="10" idx="2"/>
             <a:endCxn id="14" idx="0"/>
           </p:cNvCxnSpPr>
           <p:nvPr/>
         </p:nvCxnSpPr>
         <p:spPr>
-          <a:xfrm>
-            <a:off x="6454853" y="3553837"/>
-            <a:ext cx="1580377" cy="294119"/>
-          </a:xfrm>
-          <a:prstGeom prst="bentConnector2">
-            <a:avLst/>
+          <a:xfrm rot="5400000">
+            <a:off x="5080950" y="4052553"/>
+            <a:ext cx="188066" cy="1"/>
+          </a:xfrm>
+          <a:prstGeom prst="bentConnector3">
+            <a:avLst>
+              <a:gd name="adj1" fmla="val 50000"/>
+            </a:avLst>
           </a:prstGeom>
           <a:ln>
             <a:solidFill>
@@ -10429,10 +10439,10 @@
       </p:cxnSp>
       <p:sp>
         <p:nvSpPr>
-          <p:cNvPr id="79" name="Diamond 78">
-            <a:extLst>
-              <a:ext uri="{FF2B5EF4-FFF2-40B4-BE49-F238E27FC236}">
-                <a16:creationId xmlns:a16="http://schemas.microsoft.com/office/drawing/2014/main" id="{2CF7BA5B-051A-824D-BB4E-19BCE3D5E01C}"/>
+          <p:cNvPr id="81" name="Rectangle 80">
+            <a:extLst>
+              <a:ext uri="{FF2B5EF4-FFF2-40B4-BE49-F238E27FC236}">
+                <a16:creationId xmlns:a16="http://schemas.microsoft.com/office/drawing/2014/main" id="{A15D5C73-9738-BC4F-876C-19B0559D4357}"/>
               </a:ext>
             </a:extLst>
           </p:cNvPr>
@@ -10441,7 +10451,59 @@
         </p:nvSpPr>
         <p:spPr>
           <a:xfrm>
-            <a:off x="1807142" y="5492692"/>
+            <a:off x="4302729" y="5745730"/>
+            <a:ext cx="1724319" cy="430887"/>
+          </a:xfrm>
+          <a:prstGeom prst="rect">
+            <a:avLst/>
+          </a:prstGeom>
+        </p:spPr>
+        <p:txBody>
+          <a:bodyPr wrap="square">
+            <a:spAutoFit/>
+          </a:bodyPr>
+          <a:lstStyle/>
+          <a:p>
+            <a:pPr lvl="0" algn="ctr"/>
+            <a:r>
+              <a:rPr lang="en-US" sz="1100" i="1" dirty="0">
+                <a:latin typeface="Arial" panose="020B0604020202020204" pitchFamily="34" charset="0"/>
+                <a:cs typeface="Arial" panose="020B0604020202020204" pitchFamily="34" charset="0"/>
+              </a:rPr>
+              <a:t>Choose a method to install the </a:t>
+            </a:r>
+            <a:r>
+              <a:rPr lang="en-US" sz="1100" i="1" dirty="0" err="1">
+                <a:latin typeface="Arial" panose="020B0604020202020204" pitchFamily="34" charset="0"/>
+                <a:cs typeface="Arial" panose="020B0604020202020204" pitchFamily="34" charset="0"/>
+              </a:rPr>
+              <a:t>Zowe</a:t>
+            </a:r>
+            <a:r>
+              <a:rPr lang="en-US" sz="1100" i="1" dirty="0">
+                <a:latin typeface="Arial" panose="020B0604020202020204" pitchFamily="34" charset="0"/>
+                <a:cs typeface="Arial" panose="020B0604020202020204" pitchFamily="34" charset="0"/>
+              </a:rPr>
+              <a:t> runtime</a:t>
+            </a:r>
+          </a:p>
+        </p:txBody>
+      </p:sp>
+      <p:sp>
+        <p:nvSpPr>
+          <p:cNvPr id="84" name="Diamond 83">
+            <a:extLst>
+              <a:ext uri="{FF2B5EF4-FFF2-40B4-BE49-F238E27FC236}">
+                <a16:creationId xmlns:a16="http://schemas.microsoft.com/office/drawing/2014/main" id="{AD776B14-126D-7047-B7B8-7DF57F57A2B0}"/>
+              </a:ext>
+            </a:extLst>
+          </p:cNvPr>
+          <p:cNvSpPr/>
+          <p:nvPr/>
+        </p:nvSpPr>
+        <p:spPr>
+          <a:xfrm>
+            <a:off x="4085714" y="5571630"/>
             <a:ext cx="2178534" cy="809368"/>
           </a:xfrm>
           <a:prstGeom prst="diamond">
@@ -10494,10 +10556,10 @@
       </p:sp>
       <p:sp>
         <p:nvSpPr>
-          <p:cNvPr id="81" name="Rectangle 80">
-            <a:extLst>
-              <a:ext uri="{FF2B5EF4-FFF2-40B4-BE49-F238E27FC236}">
-                <a16:creationId xmlns:a16="http://schemas.microsoft.com/office/drawing/2014/main" id="{A15D5C73-9738-BC4F-876C-19B0559D4357}"/>
+          <p:cNvPr id="85" name="Rectangle 84">
+            <a:extLst>
+              <a:ext uri="{FF2B5EF4-FFF2-40B4-BE49-F238E27FC236}">
+                <a16:creationId xmlns:a16="http://schemas.microsoft.com/office/drawing/2014/main" id="{4634A333-C297-D248-9A50-E6DB6AE558D4}"/>
               </a:ext>
             </a:extLst>
           </p:cNvPr>
@@ -10506,60 +10568,8 @@
         </p:nvSpPr>
         <p:spPr>
           <a:xfrm>
-            <a:off x="7173271" y="5670121"/>
-            <a:ext cx="1724319" cy="430887"/>
-          </a:xfrm>
-          <a:prstGeom prst="rect">
-            <a:avLst/>
-          </a:prstGeom>
-        </p:spPr>
-        <p:txBody>
-          <a:bodyPr wrap="square">
-            <a:spAutoFit/>
-          </a:bodyPr>
-          <a:lstStyle/>
-          <a:p>
-            <a:pPr lvl="0" algn="ctr"/>
-            <a:r>
-              <a:rPr lang="en-US" sz="1100" i="1" dirty="0">
-                <a:latin typeface="Arial" panose="020B0604020202020204" pitchFamily="34" charset="0"/>
-                <a:cs typeface="Arial" panose="020B0604020202020204" pitchFamily="34" charset="0"/>
-              </a:rPr>
-              <a:t>Choose a method to install the </a:t>
-            </a:r>
-            <a:r>
-              <a:rPr lang="en-US" sz="1100" i="1" dirty="0" err="1">
-                <a:latin typeface="Arial" panose="020B0604020202020204" pitchFamily="34" charset="0"/>
-                <a:cs typeface="Arial" panose="020B0604020202020204" pitchFamily="34" charset="0"/>
-              </a:rPr>
-              <a:t>Zowe</a:t>
-            </a:r>
-            <a:r>
-              <a:rPr lang="en-US" sz="1100" i="1" dirty="0">
-                <a:latin typeface="Arial" panose="020B0604020202020204" pitchFamily="34" charset="0"/>
-                <a:cs typeface="Arial" panose="020B0604020202020204" pitchFamily="34" charset="0"/>
-              </a:rPr>
-              <a:t> runtime</a:t>
-            </a:r>
-          </a:p>
-        </p:txBody>
-      </p:sp>
-      <p:sp>
-        <p:nvSpPr>
-          <p:cNvPr id="82" name="Rectangle 81">
-            <a:extLst>
-              <a:ext uri="{FF2B5EF4-FFF2-40B4-BE49-F238E27FC236}">
-                <a16:creationId xmlns:a16="http://schemas.microsoft.com/office/drawing/2014/main" id="{E028B6AA-A814-3240-9CAD-40F79DFDC115}"/>
-              </a:ext>
-            </a:extLst>
-          </p:cNvPr>
-          <p:cNvSpPr/>
-          <p:nvPr/>
-        </p:nvSpPr>
-        <p:spPr>
-          <a:xfrm>
-            <a:off x="3247007" y="6393174"/>
-            <a:ext cx="1907210" cy="744698"/>
+            <a:off x="5869800" y="6384920"/>
+            <a:ext cx="1680319" cy="738730"/>
           </a:xfrm>
           <a:prstGeom prst="rect">
             <a:avLst/>
@@ -10601,21 +10611,20 @@
           </a:bodyPr>
           <a:lstStyle/>
           <a:p>
+            <a:r>
+              <a:rPr lang="en-US" sz="1100" dirty="0">
+                <a:solidFill>
+                  <a:schemeClr val="tx1"/>
+                </a:solidFill>
+                <a:latin typeface="Arial" panose="020B0604020202020204" pitchFamily="34" charset="0"/>
+                <a:cs typeface="Arial" panose="020B0604020202020204" pitchFamily="34" charset="0"/>
+              </a:rPr>
+              <a:t>Run z/OSMF workflow</a:t>
+            </a:r>
+          </a:p>
+          <a:p>
             <a:pPr algn="ctr"/>
             <a:r>
-              <a:rPr lang="en-US" sz="1100" dirty="0">
-                <a:solidFill>
-                  <a:schemeClr val="tx1"/>
-                </a:solidFill>
-                <a:latin typeface="Arial" panose="020B0604020202020204" pitchFamily="34" charset="0"/>
-                <a:cs typeface="Arial" panose="020B0604020202020204" pitchFamily="34" charset="0"/>
-              </a:rPr>
-              <a:t>Install the Zowe SMP/E build with z/OSMF workflow</a:t>
-            </a:r>
-          </a:p>
-          <a:p>
-            <a:pPr algn="ctr"/>
-            <a:r>
               <a:rPr lang="en-US" sz="1100" b="1" dirty="0">
                 <a:solidFill>
                   <a:schemeClr val="tx1"/>
@@ -10623,17 +10632,257 @@
                 <a:latin typeface="Arial" panose="020B0604020202020204" pitchFamily="34" charset="0"/>
                 <a:cs typeface="Arial" panose="020B0604020202020204" pitchFamily="34" charset="0"/>
               </a:rPr>
-              <a:t>ZWEWRF01</a:t>
+              <a:t>ZWEWRF04.xml</a:t>
             </a:r>
           </a:p>
         </p:txBody>
       </p:sp>
+      <p:cxnSp>
+        <p:nvCxnSpPr>
+          <p:cNvPr id="38" name="Elbow Connector 37">
+            <a:extLst>
+              <a:ext uri="{FF2B5EF4-FFF2-40B4-BE49-F238E27FC236}">
+                <a16:creationId xmlns:a16="http://schemas.microsoft.com/office/drawing/2014/main" id="{E1DF86E3-ACE7-304F-95AB-C64775DB249C}"/>
+              </a:ext>
+            </a:extLst>
+          </p:cNvPr>
+          <p:cNvCxnSpPr>
+            <a:stCxn id="84" idx="1"/>
+            <a:endCxn id="18" idx="0"/>
+          </p:cNvCxnSpPr>
+          <p:nvPr/>
+        </p:nvCxnSpPr>
+        <p:spPr>
+          <a:xfrm rot="10800000" flipV="1">
+            <a:off x="3567804" y="5976313"/>
+            <a:ext cx="517910" cy="447855"/>
+          </a:xfrm>
+          <a:prstGeom prst="bentConnector2">
+            <a:avLst/>
+          </a:prstGeom>
+          <a:ln>
+            <a:solidFill>
+              <a:schemeClr val="tx1">
+                <a:lumMod val="75000"/>
+                <a:lumOff val="25000"/>
+              </a:schemeClr>
+            </a:solidFill>
+            <a:tailEnd type="triangle"/>
+          </a:ln>
+        </p:spPr>
+        <p:style>
+          <a:lnRef idx="1">
+            <a:schemeClr val="accent1"/>
+          </a:lnRef>
+          <a:fillRef idx="0">
+            <a:schemeClr val="accent1"/>
+          </a:fillRef>
+          <a:effectRef idx="0">
+            <a:schemeClr val="accent1"/>
+          </a:effectRef>
+          <a:fontRef idx="minor">
+            <a:schemeClr val="tx1"/>
+          </a:fontRef>
+        </p:style>
+      </p:cxnSp>
+      <p:cxnSp>
+        <p:nvCxnSpPr>
+          <p:cNvPr id="40" name="Elbow Connector 39">
+            <a:extLst>
+              <a:ext uri="{FF2B5EF4-FFF2-40B4-BE49-F238E27FC236}">
+                <a16:creationId xmlns:a16="http://schemas.microsoft.com/office/drawing/2014/main" id="{F63FEF37-383B-D242-988A-D39044383A28}"/>
+              </a:ext>
+            </a:extLst>
+          </p:cNvPr>
+          <p:cNvCxnSpPr>
+            <a:stCxn id="84" idx="3"/>
+            <a:endCxn id="85" idx="0"/>
+          </p:cNvCxnSpPr>
+          <p:nvPr/>
+        </p:nvCxnSpPr>
+        <p:spPr>
+          <a:xfrm>
+            <a:off x="6264248" y="5976314"/>
+            <a:ext cx="445712" cy="408606"/>
+          </a:xfrm>
+          <a:prstGeom prst="bentConnector2">
+            <a:avLst/>
+          </a:prstGeom>
+          <a:ln>
+            <a:solidFill>
+              <a:schemeClr val="tx1">
+                <a:lumMod val="75000"/>
+                <a:lumOff val="25000"/>
+              </a:schemeClr>
+            </a:solidFill>
+            <a:tailEnd type="triangle"/>
+          </a:ln>
+        </p:spPr>
+        <p:style>
+          <a:lnRef idx="1">
+            <a:schemeClr val="accent1"/>
+          </a:lnRef>
+          <a:fillRef idx="0">
+            <a:schemeClr val="accent1"/>
+          </a:fillRef>
+          <a:effectRef idx="0">
+            <a:schemeClr val="accent1"/>
+          </a:effectRef>
+          <a:fontRef idx="minor">
+            <a:schemeClr val="tx1"/>
+          </a:fontRef>
+        </p:style>
+      </p:cxnSp>
+      <p:cxnSp>
+        <p:nvCxnSpPr>
+          <p:cNvPr id="50" name="Straight Arrow Connector 49">
+            <a:extLst>
+              <a:ext uri="{FF2B5EF4-FFF2-40B4-BE49-F238E27FC236}">
+                <a16:creationId xmlns:a16="http://schemas.microsoft.com/office/drawing/2014/main" id="{DDF04680-F811-8E42-A77F-85675B742563}"/>
+              </a:ext>
+            </a:extLst>
+          </p:cNvPr>
+          <p:cNvCxnSpPr>
+            <a:stCxn id="15" idx="2"/>
+            <a:endCxn id="19" idx="0"/>
+          </p:cNvCxnSpPr>
+          <p:nvPr/>
+        </p:nvCxnSpPr>
+        <p:spPr>
+          <a:xfrm>
+            <a:off x="2194211" y="4325974"/>
+            <a:ext cx="0" cy="142952"/>
+          </a:xfrm>
+          <a:prstGeom prst="straightConnector1">
+            <a:avLst/>
+          </a:prstGeom>
+          <a:ln>
+            <a:solidFill>
+              <a:schemeClr val="tx1">
+                <a:lumMod val="75000"/>
+                <a:lumOff val="25000"/>
+              </a:schemeClr>
+            </a:solidFill>
+            <a:tailEnd type="triangle"/>
+          </a:ln>
+        </p:spPr>
+        <p:style>
+          <a:lnRef idx="1">
+            <a:schemeClr val="accent1"/>
+          </a:lnRef>
+          <a:fillRef idx="0">
+            <a:schemeClr val="accent1"/>
+          </a:fillRef>
+          <a:effectRef idx="0">
+            <a:schemeClr val="accent1"/>
+          </a:effectRef>
+          <a:fontRef idx="minor">
+            <a:schemeClr val="tx1"/>
+          </a:fontRef>
+        </p:style>
+      </p:cxnSp>
+      <p:cxnSp>
+        <p:nvCxnSpPr>
+          <p:cNvPr id="88" name="Straight Arrow Connector 87">
+            <a:extLst>
+              <a:ext uri="{FF2B5EF4-FFF2-40B4-BE49-F238E27FC236}">
+                <a16:creationId xmlns:a16="http://schemas.microsoft.com/office/drawing/2014/main" id="{FFA5420E-5B30-BB4D-8699-10BA8C90F354}"/>
+              </a:ext>
+            </a:extLst>
+          </p:cNvPr>
+          <p:cNvCxnSpPr>
+            <a:stCxn id="14" idx="2"/>
+            <a:endCxn id="17" idx="0"/>
+          </p:cNvCxnSpPr>
+          <p:nvPr/>
+        </p:nvCxnSpPr>
+        <p:spPr>
+          <a:xfrm>
+            <a:off x="5174982" y="4705557"/>
+            <a:ext cx="2" cy="152130"/>
+          </a:xfrm>
+          <a:prstGeom prst="straightConnector1">
+            <a:avLst/>
+          </a:prstGeom>
+          <a:ln>
+            <a:solidFill>
+              <a:schemeClr val="tx1">
+                <a:lumMod val="75000"/>
+                <a:lumOff val="25000"/>
+              </a:schemeClr>
+            </a:solidFill>
+            <a:tailEnd type="triangle"/>
+          </a:ln>
+        </p:spPr>
+        <p:style>
+          <a:lnRef idx="1">
+            <a:schemeClr val="accent1"/>
+          </a:lnRef>
+          <a:fillRef idx="0">
+            <a:schemeClr val="accent1"/>
+          </a:fillRef>
+          <a:effectRef idx="0">
+            <a:schemeClr val="accent1"/>
+          </a:effectRef>
+          <a:fontRef idx="minor">
+            <a:schemeClr val="tx1"/>
+          </a:fontRef>
+        </p:style>
+      </p:cxnSp>
+      <p:cxnSp>
+        <p:nvCxnSpPr>
+          <p:cNvPr id="90" name="Straight Arrow Connector 89">
+            <a:extLst>
+              <a:ext uri="{FF2B5EF4-FFF2-40B4-BE49-F238E27FC236}">
+                <a16:creationId xmlns:a16="http://schemas.microsoft.com/office/drawing/2014/main" id="{98E00474-B9DE-B543-8056-2ADDF1E7E3DE}"/>
+              </a:ext>
+            </a:extLst>
+          </p:cNvPr>
+          <p:cNvCxnSpPr>
+            <a:stCxn id="17" idx="2"/>
+            <a:endCxn id="84" idx="0"/>
+          </p:cNvCxnSpPr>
+          <p:nvPr/>
+        </p:nvCxnSpPr>
+        <p:spPr>
+          <a:xfrm flipH="1">
+            <a:off x="5174981" y="5416658"/>
+            <a:ext cx="3" cy="154972"/>
+          </a:xfrm>
+          <a:prstGeom prst="straightConnector1">
+            <a:avLst/>
+          </a:prstGeom>
+          <a:ln>
+            <a:solidFill>
+              <a:schemeClr val="tx1">
+                <a:lumMod val="75000"/>
+                <a:lumOff val="25000"/>
+              </a:schemeClr>
+            </a:solidFill>
+            <a:tailEnd type="triangle"/>
+          </a:ln>
+        </p:spPr>
+        <p:style>
+          <a:lnRef idx="1">
+            <a:schemeClr val="accent1"/>
+          </a:lnRef>
+          <a:fillRef idx="0">
+            <a:schemeClr val="accent1"/>
+          </a:fillRef>
+          <a:effectRef idx="0">
+            <a:schemeClr val="accent1"/>
+          </a:effectRef>
+          <a:fontRef idx="minor">
+            <a:schemeClr val="tx1"/>
+          </a:fontRef>
+        </p:style>
+      </p:cxnSp>
       <p:sp>
         <p:nvSpPr>
-          <p:cNvPr id="84" name="Diamond 83">
-            <a:extLst>
-              <a:ext uri="{FF2B5EF4-FFF2-40B4-BE49-F238E27FC236}">
-                <a16:creationId xmlns:a16="http://schemas.microsoft.com/office/drawing/2014/main" id="{AD776B14-126D-7047-B7B8-7DF57F57A2B0}"/>
+          <p:cNvPr id="99" name="Diamond 98">
+            <a:extLst>
+              <a:ext uri="{FF2B5EF4-FFF2-40B4-BE49-F238E27FC236}">
+                <a16:creationId xmlns:a16="http://schemas.microsoft.com/office/drawing/2014/main" id="{0A9D3F2E-7268-9A46-84ED-8299D1132B97}"/>
               </a:ext>
             </a:extLst>
           </p:cNvPr>
@@ -10642,7 +10891,7 @@
         </p:nvSpPr>
         <p:spPr>
           <a:xfrm>
-            <a:off x="6942612" y="5486809"/>
+            <a:off x="4363443" y="8520552"/>
             <a:ext cx="2178534" cy="809368"/>
           </a:xfrm>
           <a:prstGeom prst="diamond">
@@ -10651,7 +10900,7 @@
           <a:noFill/>
           <a:ln>
             <a:solidFill>
-              <a:schemeClr val="bg2">
+              <a:schemeClr val="accent5">
                 <a:lumMod val="50000"/>
               </a:schemeClr>
             </a:solidFill>
@@ -10695,10 +10944,10 @@
       </p:sp>
       <p:sp>
         <p:nvSpPr>
-          <p:cNvPr id="85" name="Rectangle 84">
-            <a:extLst>
-              <a:ext uri="{FF2B5EF4-FFF2-40B4-BE49-F238E27FC236}">
-                <a16:creationId xmlns:a16="http://schemas.microsoft.com/office/drawing/2014/main" id="{4634A333-C297-D248-9A50-E6DB6AE558D4}"/>
+          <p:cNvPr id="100" name="Rectangle 99">
+            <a:extLst>
+              <a:ext uri="{FF2B5EF4-FFF2-40B4-BE49-F238E27FC236}">
+                <a16:creationId xmlns:a16="http://schemas.microsoft.com/office/drawing/2014/main" id="{BCE9E408-40CD-CB49-A578-D2F95011FA86}"/>
               </a:ext>
             </a:extLst>
           </p:cNvPr>
@@ -10707,90 +10956,7 @@
         </p:nvSpPr>
         <p:spPr>
           <a:xfrm>
-            <a:off x="8495712" y="6384920"/>
-            <a:ext cx="1680319" cy="738730"/>
-          </a:xfrm>
-          <a:prstGeom prst="rect">
-            <a:avLst/>
-          </a:prstGeom>
-          <a:solidFill>
-            <a:schemeClr val="accent6">
-              <a:lumMod val="40000"/>
-              <a:lumOff val="60000"/>
-            </a:schemeClr>
-          </a:solidFill>
-          <a:ln>
-            <a:solidFill>
-              <a:schemeClr val="bg2"/>
-            </a:solidFill>
-          </a:ln>
-        </p:spPr>
-        <p:style>
-          <a:lnRef idx="2">
-            <a:schemeClr val="accent1">
-              <a:shade val="50000"/>
-            </a:schemeClr>
-          </a:lnRef>
-          <a:fillRef idx="1">
-            <a:schemeClr val="accent1"/>
-          </a:fillRef>
-          <a:effectRef idx="0">
-            <a:schemeClr val="accent1"/>
-          </a:effectRef>
-          <a:fontRef idx="minor">
-            <a:schemeClr val="lt1"/>
-          </a:fontRef>
-        </p:style>
-        <p:txBody>
-          <a:bodyPr rot="0" spcFirstLastPara="0" vertOverflow="overflow" horzOverflow="overflow" vert="horz" wrap="square" lIns="91440" tIns="45720" rIns="91440" bIns="45720" numCol="1" spcCol="0" rtlCol="0" fromWordArt="0" anchor="ctr" anchorCtr="0" forceAA="0" compatLnSpc="1">
-            <a:prstTxWarp prst="textNoShape">
-              <a:avLst/>
-            </a:prstTxWarp>
-            <a:noAutofit/>
-          </a:bodyPr>
-          <a:lstStyle/>
-          <a:p>
-            <a:r>
-              <a:rPr lang="en-US" sz="1100" dirty="0">
-                <a:solidFill>
-                  <a:schemeClr val="tx1"/>
-                </a:solidFill>
-                <a:latin typeface="Arial" panose="020B0604020202020204" pitchFamily="34" charset="0"/>
-                <a:cs typeface="Arial" panose="020B0604020202020204" pitchFamily="34" charset="0"/>
-              </a:rPr>
-              <a:t>Run z/OSMF workflow</a:t>
-            </a:r>
-          </a:p>
-          <a:p>
-            <a:pPr algn="ctr"/>
-            <a:r>
-              <a:rPr lang="en-US" sz="1100" b="1" dirty="0">
-                <a:solidFill>
-                  <a:schemeClr val="tx1"/>
-                </a:solidFill>
-                <a:latin typeface="Arial" panose="020B0604020202020204" pitchFamily="34" charset="0"/>
-                <a:cs typeface="Arial" panose="020B0604020202020204" pitchFamily="34" charset="0"/>
-              </a:rPr>
-              <a:t>ZWEWRF04.xml</a:t>
-            </a:r>
-          </a:p>
-        </p:txBody>
-      </p:sp>
-      <p:sp>
-        <p:nvSpPr>
-          <p:cNvPr id="86" name="Rectangle 85">
-            <a:extLst>
-              <a:ext uri="{FF2B5EF4-FFF2-40B4-BE49-F238E27FC236}">
-                <a16:creationId xmlns:a16="http://schemas.microsoft.com/office/drawing/2014/main" id="{D29F056E-E573-E349-88BB-CABBAB2E3D9C}"/>
-              </a:ext>
-            </a:extLst>
-          </p:cNvPr>
-          <p:cNvSpPr/>
-          <p:nvPr/>
-        </p:nvSpPr>
-        <p:spPr>
-          <a:xfrm>
-            <a:off x="2103106" y="5684121"/>
+            <a:off x="4638671" y="8730563"/>
             <a:ext cx="1724319" cy="430887"/>
           </a:xfrm>
           <a:prstGeom prst="rect">
@@ -10809,31 +10975,42 @@
                 <a:latin typeface="Arial" panose="020B0604020202020204" pitchFamily="34" charset="0"/>
                 <a:cs typeface="Arial" panose="020B0604020202020204" pitchFamily="34" charset="0"/>
               </a:rPr>
-              <a:t>Choose a method to install the SMP/E build</a:t>
-            </a:r>
+              <a:t>Choose a method to configure </a:t>
+            </a:r>
+            <a:r>
+              <a:rPr lang="en-US" sz="1100" i="1" dirty="0" err="1">
+                <a:latin typeface="Arial" panose="020B0604020202020204" pitchFamily="34" charset="0"/>
+                <a:cs typeface="Arial" panose="020B0604020202020204" pitchFamily="34" charset="0"/>
+              </a:rPr>
+              <a:t>Zowe</a:t>
+            </a:r>
+            <a:endParaRPr lang="en-US" sz="1100" i="1" dirty="0">
+              <a:latin typeface="Arial" panose="020B0604020202020204" pitchFamily="34" charset="0"/>
+              <a:cs typeface="Arial" panose="020B0604020202020204" pitchFamily="34" charset="0"/>
+            </a:endParaRPr>
           </a:p>
         </p:txBody>
       </p:sp>
       <p:cxnSp>
         <p:nvCxnSpPr>
-          <p:cNvPr id="29" name="Elbow Connector 28">
-            <a:extLst>
-              <a:ext uri="{FF2B5EF4-FFF2-40B4-BE49-F238E27FC236}">
-                <a16:creationId xmlns:a16="http://schemas.microsoft.com/office/drawing/2014/main" id="{06F0973C-0F2A-584F-B77D-6BCFA7AE2C66}"/>
+          <p:cNvPr id="102" name="Elbow Connector 101">
+            <a:extLst>
+              <a:ext uri="{FF2B5EF4-FFF2-40B4-BE49-F238E27FC236}">
+                <a16:creationId xmlns:a16="http://schemas.microsoft.com/office/drawing/2014/main" id="{C8932823-E29C-E84C-9336-0E30B84C237C}"/>
               </a:ext>
             </a:extLst>
           </p:cNvPr>
           <p:cNvCxnSpPr>
             <a:cxnSpLocks/>
-            <a:stCxn id="79" idx="1"/>
-            <a:endCxn id="19" idx="0"/>
+            <a:stCxn id="99" idx="1"/>
+            <a:endCxn id="20" idx="0"/>
           </p:cNvCxnSpPr>
           <p:nvPr/>
         </p:nvCxnSpPr>
         <p:spPr>
           <a:xfrm rot="10800000" flipV="1">
-            <a:off x="1601804" y="5897376"/>
-            <a:ext cx="205338" cy="476959"/>
+            <a:off x="3054697" y="8925236"/>
+            <a:ext cx="1308747" cy="974764"/>
           </a:xfrm>
           <a:prstGeom prst="bentConnector2">
             <a:avLst/>
@@ -10865,24 +11042,24 @@
       </p:cxnSp>
       <p:cxnSp>
         <p:nvCxnSpPr>
-          <p:cNvPr id="32" name="Elbow Connector 31">
-            <a:extLst>
-              <a:ext uri="{FF2B5EF4-FFF2-40B4-BE49-F238E27FC236}">
-                <a16:creationId xmlns:a16="http://schemas.microsoft.com/office/drawing/2014/main" id="{99BDC92B-233A-564E-BF93-1992A827EC9E}"/>
+          <p:cNvPr id="104" name="Elbow Connector 103">
+            <a:extLst>
+              <a:ext uri="{FF2B5EF4-FFF2-40B4-BE49-F238E27FC236}">
+                <a16:creationId xmlns:a16="http://schemas.microsoft.com/office/drawing/2014/main" id="{8101655C-4562-5343-A60D-8EDB7CEDBAAD}"/>
               </a:ext>
             </a:extLst>
           </p:cNvPr>
           <p:cNvCxnSpPr>
             <a:cxnSpLocks/>
-            <a:stCxn id="79" idx="3"/>
-            <a:endCxn id="82" idx="0"/>
+            <a:stCxn id="99" idx="3"/>
+            <a:endCxn id="74" idx="0"/>
           </p:cNvCxnSpPr>
           <p:nvPr/>
         </p:nvCxnSpPr>
         <p:spPr>
           <a:xfrm>
-            <a:off x="3985676" y="5897376"/>
-            <a:ext cx="214936" cy="495798"/>
+            <a:off x="6541977" y="8925236"/>
+            <a:ext cx="1869312" cy="974764"/>
           </a:xfrm>
           <a:prstGeom prst="bentConnector2">
             <a:avLst/>
@@ -10912,252 +11089,12 @@
           </a:fontRef>
         </p:style>
       </p:cxnSp>
-      <p:cxnSp>
-        <p:nvCxnSpPr>
-          <p:cNvPr id="38" name="Elbow Connector 37">
-            <a:extLst>
-              <a:ext uri="{FF2B5EF4-FFF2-40B4-BE49-F238E27FC236}">
-                <a16:creationId xmlns:a16="http://schemas.microsoft.com/office/drawing/2014/main" id="{E1DF86E3-ACE7-304F-95AB-C64775DB249C}"/>
-              </a:ext>
-            </a:extLst>
-          </p:cNvPr>
-          <p:cNvCxnSpPr>
-            <a:stCxn id="84" idx="1"/>
-            <a:endCxn id="18" idx="0"/>
-          </p:cNvCxnSpPr>
-          <p:nvPr/>
-        </p:nvCxnSpPr>
-        <p:spPr>
-          <a:xfrm rot="10800000" flipV="1">
-            <a:off x="6718425" y="5891493"/>
-            <a:ext cx="224189" cy="501681"/>
-          </a:xfrm>
-          <a:prstGeom prst="bentConnector2">
-            <a:avLst/>
-          </a:prstGeom>
-          <a:ln>
-            <a:solidFill>
-              <a:schemeClr val="tx1">
-                <a:lumMod val="75000"/>
-                <a:lumOff val="25000"/>
-              </a:schemeClr>
-            </a:solidFill>
-            <a:tailEnd type="triangle"/>
-          </a:ln>
-        </p:spPr>
-        <p:style>
-          <a:lnRef idx="1">
-            <a:schemeClr val="accent1"/>
-          </a:lnRef>
-          <a:fillRef idx="0">
-            <a:schemeClr val="accent1"/>
-          </a:fillRef>
-          <a:effectRef idx="0">
-            <a:schemeClr val="accent1"/>
-          </a:effectRef>
-          <a:fontRef idx="minor">
-            <a:schemeClr val="tx1"/>
-          </a:fontRef>
-        </p:style>
-      </p:cxnSp>
-      <p:cxnSp>
-        <p:nvCxnSpPr>
-          <p:cNvPr id="40" name="Elbow Connector 39">
-            <a:extLst>
-              <a:ext uri="{FF2B5EF4-FFF2-40B4-BE49-F238E27FC236}">
-                <a16:creationId xmlns:a16="http://schemas.microsoft.com/office/drawing/2014/main" id="{F63FEF37-383B-D242-988A-D39044383A28}"/>
-              </a:ext>
-            </a:extLst>
-          </p:cNvPr>
-          <p:cNvCxnSpPr>
-            <a:stCxn id="84" idx="3"/>
-            <a:endCxn id="85" idx="0"/>
-          </p:cNvCxnSpPr>
-          <p:nvPr/>
-        </p:nvCxnSpPr>
-        <p:spPr>
-          <a:xfrm>
-            <a:off x="9121147" y="5891494"/>
-            <a:ext cx="214725" cy="493427"/>
-          </a:xfrm>
-          <a:prstGeom prst="bentConnector2">
-            <a:avLst/>
-          </a:prstGeom>
-          <a:ln>
-            <a:solidFill>
-              <a:schemeClr val="tx1">
-                <a:lumMod val="75000"/>
-                <a:lumOff val="25000"/>
-              </a:schemeClr>
-            </a:solidFill>
-            <a:tailEnd type="triangle"/>
-          </a:ln>
-        </p:spPr>
-        <p:style>
-          <a:lnRef idx="1">
-            <a:schemeClr val="accent1"/>
-          </a:lnRef>
-          <a:fillRef idx="0">
-            <a:schemeClr val="accent1"/>
-          </a:fillRef>
-          <a:effectRef idx="0">
-            <a:schemeClr val="accent1"/>
-          </a:effectRef>
-          <a:fontRef idx="minor">
-            <a:schemeClr val="tx1"/>
-          </a:fontRef>
-        </p:style>
-      </p:cxnSp>
-      <p:cxnSp>
-        <p:nvCxnSpPr>
-          <p:cNvPr id="50" name="Straight Arrow Connector 49">
-            <a:extLst>
-              <a:ext uri="{FF2B5EF4-FFF2-40B4-BE49-F238E27FC236}">
-                <a16:creationId xmlns:a16="http://schemas.microsoft.com/office/drawing/2014/main" id="{DDF04680-F811-8E42-A77F-85675B742563}"/>
-              </a:ext>
-            </a:extLst>
-          </p:cNvPr>
-          <p:cNvCxnSpPr>
-            <a:stCxn id="15" idx="2"/>
-            <a:endCxn id="79" idx="0"/>
-          </p:cNvCxnSpPr>
-          <p:nvPr/>
-        </p:nvCxnSpPr>
-        <p:spPr>
-          <a:xfrm flipH="1">
-            <a:off x="2896409" y="4402908"/>
-            <a:ext cx="19017" cy="1089784"/>
-          </a:xfrm>
-          <a:prstGeom prst="straightConnector1">
-            <a:avLst/>
-          </a:prstGeom>
-          <a:ln>
-            <a:solidFill>
-              <a:schemeClr val="tx1">
-                <a:lumMod val="75000"/>
-                <a:lumOff val="25000"/>
-              </a:schemeClr>
-            </a:solidFill>
-            <a:tailEnd type="triangle"/>
-          </a:ln>
-        </p:spPr>
-        <p:style>
-          <a:lnRef idx="1">
-            <a:schemeClr val="accent1"/>
-          </a:lnRef>
-          <a:fillRef idx="0">
-            <a:schemeClr val="accent1"/>
-          </a:fillRef>
-          <a:effectRef idx="0">
-            <a:schemeClr val="accent1"/>
-          </a:effectRef>
-          <a:fontRef idx="minor">
-            <a:schemeClr val="tx1"/>
-          </a:fontRef>
-        </p:style>
-      </p:cxnSp>
-      <p:cxnSp>
-        <p:nvCxnSpPr>
-          <p:cNvPr id="88" name="Straight Arrow Connector 87">
-            <a:extLst>
-              <a:ext uri="{FF2B5EF4-FFF2-40B4-BE49-F238E27FC236}">
-                <a16:creationId xmlns:a16="http://schemas.microsoft.com/office/drawing/2014/main" id="{FFA5420E-5B30-BB4D-8699-10BA8C90F354}"/>
-              </a:ext>
-            </a:extLst>
-          </p:cNvPr>
-          <p:cNvCxnSpPr>
-            <a:stCxn id="14" idx="2"/>
-            <a:endCxn id="17" idx="0"/>
-          </p:cNvCxnSpPr>
-          <p:nvPr/>
-        </p:nvCxnSpPr>
-        <p:spPr>
-          <a:xfrm flipH="1">
-            <a:off x="8035228" y="4406927"/>
-            <a:ext cx="2" cy="269581"/>
-          </a:xfrm>
-          <a:prstGeom prst="straightConnector1">
-            <a:avLst/>
-          </a:prstGeom>
-          <a:ln>
-            <a:solidFill>
-              <a:schemeClr val="tx1">
-                <a:lumMod val="75000"/>
-                <a:lumOff val="25000"/>
-              </a:schemeClr>
-            </a:solidFill>
-            <a:tailEnd type="triangle"/>
-          </a:ln>
-        </p:spPr>
-        <p:style>
-          <a:lnRef idx="1">
-            <a:schemeClr val="accent1"/>
-          </a:lnRef>
-          <a:fillRef idx="0">
-            <a:schemeClr val="accent1"/>
-          </a:fillRef>
-          <a:effectRef idx="0">
-            <a:schemeClr val="accent1"/>
-          </a:effectRef>
-          <a:fontRef idx="minor">
-            <a:schemeClr val="tx1"/>
-          </a:fontRef>
-        </p:style>
-      </p:cxnSp>
-      <p:cxnSp>
-        <p:nvCxnSpPr>
-          <p:cNvPr id="90" name="Straight Arrow Connector 89">
-            <a:extLst>
-              <a:ext uri="{FF2B5EF4-FFF2-40B4-BE49-F238E27FC236}">
-                <a16:creationId xmlns:a16="http://schemas.microsoft.com/office/drawing/2014/main" id="{98E00474-B9DE-B543-8056-2ADDF1E7E3DE}"/>
-              </a:ext>
-            </a:extLst>
-          </p:cNvPr>
-          <p:cNvCxnSpPr>
-            <a:stCxn id="17" idx="2"/>
-            <a:endCxn id="84" idx="0"/>
-          </p:cNvCxnSpPr>
-          <p:nvPr/>
-        </p:nvCxnSpPr>
-        <p:spPr>
-          <a:xfrm flipH="1">
-            <a:off x="8031879" y="5235479"/>
-            <a:ext cx="3348" cy="251331"/>
-          </a:xfrm>
-          <a:prstGeom prst="straightConnector1">
-            <a:avLst/>
-          </a:prstGeom>
-          <a:ln>
-            <a:solidFill>
-              <a:schemeClr val="tx1">
-                <a:lumMod val="75000"/>
-                <a:lumOff val="25000"/>
-              </a:schemeClr>
-            </a:solidFill>
-            <a:tailEnd type="triangle"/>
-          </a:ln>
-        </p:spPr>
-        <p:style>
-          <a:lnRef idx="1">
-            <a:schemeClr val="accent1"/>
-          </a:lnRef>
-          <a:fillRef idx="0">
-            <a:schemeClr val="accent1"/>
-          </a:fillRef>
-          <a:effectRef idx="0">
-            <a:schemeClr val="accent1"/>
-          </a:effectRef>
-          <a:fontRef idx="minor">
-            <a:schemeClr val="tx1"/>
-          </a:fontRef>
-        </p:style>
-      </p:cxnSp>
       <p:sp>
         <p:nvSpPr>
-          <p:cNvPr id="99" name="Diamond 98">
-            <a:extLst>
-              <a:ext uri="{FF2B5EF4-FFF2-40B4-BE49-F238E27FC236}">
-                <a16:creationId xmlns:a16="http://schemas.microsoft.com/office/drawing/2014/main" id="{0A9D3F2E-7268-9A46-84ED-8299D1132B97}"/>
+          <p:cNvPr id="106" name="Rectangle 105">
+            <a:extLst>
+              <a:ext uri="{FF2B5EF4-FFF2-40B4-BE49-F238E27FC236}">
+                <a16:creationId xmlns:a16="http://schemas.microsoft.com/office/drawing/2014/main" id="{124859CB-AFBD-0749-ABF1-D9B209EBB4B4}"/>
               </a:ext>
             </a:extLst>
           </p:cNvPr>
@@ -11166,77 +11103,15 @@
         </p:nvSpPr>
         <p:spPr>
           <a:xfrm>
-            <a:off x="4363443" y="8520552"/>
-            <a:ext cx="2178534" cy="809368"/>
-          </a:xfrm>
-          <a:prstGeom prst="diamond">
-            <a:avLst/>
-          </a:prstGeom>
-          <a:noFill/>
-          <a:ln>
-            <a:solidFill>
-              <a:schemeClr val="accent5">
-                <a:lumMod val="50000"/>
-              </a:schemeClr>
-            </a:solidFill>
-          </a:ln>
-        </p:spPr>
-        <p:style>
-          <a:lnRef idx="2">
-            <a:schemeClr val="accent1">
-              <a:shade val="50000"/>
-            </a:schemeClr>
-          </a:lnRef>
-          <a:fillRef idx="1">
-            <a:schemeClr val="accent1"/>
-          </a:fillRef>
-          <a:effectRef idx="0">
-            <a:schemeClr val="accent1"/>
-          </a:effectRef>
-          <a:fontRef idx="minor">
-            <a:schemeClr val="lt1"/>
-          </a:fontRef>
-        </p:style>
-        <p:txBody>
-          <a:bodyPr rot="0" spcFirstLastPara="0" vertOverflow="overflow" horzOverflow="overflow" vert="horz" wrap="square" lIns="91440" tIns="45720" rIns="91440" bIns="45720" numCol="1" spcCol="0" rtlCol="0" fromWordArt="0" anchor="ctr" anchorCtr="0" forceAA="0" compatLnSpc="1">
-            <a:prstTxWarp prst="textNoShape">
-              <a:avLst/>
-            </a:prstTxWarp>
-            <a:noAutofit/>
-          </a:bodyPr>
-          <a:lstStyle/>
-          <a:p>
-            <a:pPr algn="ctr"/>
-            <a:endParaRPr lang="en-US" sz="1100" dirty="0">
-              <a:solidFill>
-                <a:schemeClr val="bg1"/>
-              </a:solidFill>
-              <a:latin typeface="Arial" panose="020B0604020202020204" pitchFamily="34" charset="0"/>
-              <a:cs typeface="Arial" panose="020B0604020202020204" pitchFamily="34" charset="0"/>
-            </a:endParaRPr>
-          </a:p>
-        </p:txBody>
-      </p:sp>
-      <p:sp>
-        <p:nvSpPr>
-          <p:cNvPr id="100" name="Rectangle 99">
-            <a:extLst>
-              <a:ext uri="{FF2B5EF4-FFF2-40B4-BE49-F238E27FC236}">
-                <a16:creationId xmlns:a16="http://schemas.microsoft.com/office/drawing/2014/main" id="{BCE9E408-40CD-CB49-A578-D2F95011FA86}"/>
-              </a:ext>
-            </a:extLst>
-          </p:cNvPr>
-          <p:cNvSpPr/>
-          <p:nvPr/>
-        </p:nvSpPr>
-        <p:spPr>
-          <a:xfrm>
-            <a:off x="4638671" y="8730563"/>
-            <a:ext cx="1724319" cy="430887"/>
+            <a:off x="2704922" y="8584673"/>
+            <a:ext cx="1597807" cy="307777"/>
           </a:xfrm>
           <a:prstGeom prst="rect">
             <a:avLst/>
           </a:prstGeom>
+          <a:solidFill>
+            <a:schemeClr val="bg1"/>
+          </a:solidFill>
         </p:spPr>
         <p:txBody>
           <a:bodyPr wrap="square">
@@ -11244,132 +11119,23 @@
           </a:bodyPr>
           <a:lstStyle/>
           <a:p>
-            <a:pPr lvl="0" algn="ctr"/>
-            <a:r>
-              <a:rPr lang="en-US" sz="1100" i="1" dirty="0">
-                <a:latin typeface="Arial" panose="020B0604020202020204" pitchFamily="34" charset="0"/>
-                <a:cs typeface="Arial" panose="020B0604020202020204" pitchFamily="34" charset="0"/>
-              </a:rPr>
-              <a:t>Choose a method to configure </a:t>
-            </a:r>
-            <a:r>
-              <a:rPr lang="en-US" sz="1100" i="1" dirty="0" err="1">
-                <a:latin typeface="Arial" panose="020B0604020202020204" pitchFamily="34" charset="0"/>
-                <a:cs typeface="Arial" panose="020B0604020202020204" pitchFamily="34" charset="0"/>
-              </a:rPr>
-              <a:t>Zowe</a:t>
-            </a:r>
-            <a:endParaRPr lang="en-US" sz="1100" i="1" dirty="0">
-              <a:latin typeface="Arial" panose="020B0604020202020204" pitchFamily="34" charset="0"/>
-              <a:cs typeface="Arial" panose="020B0604020202020204" pitchFamily="34" charset="0"/>
-            </a:endParaRPr>
+            <a:pPr algn="ctr"/>
+            <a:r>
+              <a:rPr lang="en-US" sz="1400" dirty="0">
+                <a:latin typeface="Arial" panose="020B0604020202020204" pitchFamily="34" charset="0"/>
+                <a:cs typeface="Arial" panose="020B0604020202020204" pitchFamily="34" charset="0"/>
+              </a:rPr>
+              <a:t>JCL, Shell scripts</a:t>
+            </a:r>
           </a:p>
         </p:txBody>
       </p:sp>
-      <p:cxnSp>
-        <p:nvCxnSpPr>
-          <p:cNvPr id="102" name="Elbow Connector 101">
-            <a:extLst>
-              <a:ext uri="{FF2B5EF4-FFF2-40B4-BE49-F238E27FC236}">
-                <a16:creationId xmlns:a16="http://schemas.microsoft.com/office/drawing/2014/main" id="{C8932823-E29C-E84C-9336-0E30B84C237C}"/>
-              </a:ext>
-            </a:extLst>
-          </p:cNvPr>
-          <p:cNvCxnSpPr>
-            <a:cxnSpLocks/>
-            <a:stCxn id="99" idx="1"/>
-            <a:endCxn id="20" idx="0"/>
-          </p:cNvCxnSpPr>
-          <p:nvPr/>
-        </p:nvCxnSpPr>
-        <p:spPr>
-          <a:xfrm rot="10800000" flipV="1">
-            <a:off x="3054697" y="8925236"/>
-            <a:ext cx="1308747" cy="974764"/>
-          </a:xfrm>
-          <a:prstGeom prst="bentConnector2">
-            <a:avLst/>
-          </a:prstGeom>
-          <a:ln>
-            <a:solidFill>
-              <a:schemeClr val="tx1">
-                <a:lumMod val="75000"/>
-                <a:lumOff val="25000"/>
-              </a:schemeClr>
-            </a:solidFill>
-            <a:tailEnd type="triangle"/>
-          </a:ln>
-        </p:spPr>
-        <p:style>
-          <a:lnRef idx="1">
-            <a:schemeClr val="accent1"/>
-          </a:lnRef>
-          <a:fillRef idx="0">
-            <a:schemeClr val="accent1"/>
-          </a:fillRef>
-          <a:effectRef idx="0">
-            <a:schemeClr val="accent1"/>
-          </a:effectRef>
-          <a:fontRef idx="minor">
-            <a:schemeClr val="tx1"/>
-          </a:fontRef>
-        </p:style>
-      </p:cxnSp>
-      <p:cxnSp>
-        <p:nvCxnSpPr>
-          <p:cNvPr id="104" name="Elbow Connector 103">
-            <a:extLst>
-              <a:ext uri="{FF2B5EF4-FFF2-40B4-BE49-F238E27FC236}">
-                <a16:creationId xmlns:a16="http://schemas.microsoft.com/office/drawing/2014/main" id="{8101655C-4562-5343-A60D-8EDB7CEDBAAD}"/>
-              </a:ext>
-            </a:extLst>
-          </p:cNvPr>
-          <p:cNvCxnSpPr>
-            <a:cxnSpLocks/>
-            <a:stCxn id="99" idx="3"/>
-            <a:endCxn id="74" idx="0"/>
-          </p:cNvCxnSpPr>
-          <p:nvPr/>
-        </p:nvCxnSpPr>
-        <p:spPr>
-          <a:xfrm>
-            <a:off x="6541977" y="8925236"/>
-            <a:ext cx="1869312" cy="974764"/>
-          </a:xfrm>
-          <a:prstGeom prst="bentConnector2">
-            <a:avLst/>
-          </a:prstGeom>
-          <a:ln>
-            <a:solidFill>
-              <a:schemeClr val="tx1">
-                <a:lumMod val="75000"/>
-                <a:lumOff val="25000"/>
-              </a:schemeClr>
-            </a:solidFill>
-            <a:tailEnd type="triangle"/>
-          </a:ln>
-        </p:spPr>
-        <p:style>
-          <a:lnRef idx="1">
-            <a:schemeClr val="accent1"/>
-          </a:lnRef>
-          <a:fillRef idx="0">
-            <a:schemeClr val="accent1"/>
-          </a:fillRef>
-          <a:effectRef idx="0">
-            <a:schemeClr val="accent1"/>
-          </a:effectRef>
-          <a:fontRef idx="minor">
-            <a:schemeClr val="tx1"/>
-          </a:fontRef>
-        </p:style>
-      </p:cxnSp>
       <p:sp>
         <p:nvSpPr>
-          <p:cNvPr id="106" name="Rectangle 105">
-            <a:extLst>
-              <a:ext uri="{FF2B5EF4-FFF2-40B4-BE49-F238E27FC236}">
-                <a16:creationId xmlns:a16="http://schemas.microsoft.com/office/drawing/2014/main" id="{124859CB-AFBD-0749-ABF1-D9B209EBB4B4}"/>
+          <p:cNvPr id="107" name="Rectangle 106">
+            <a:extLst>
+              <a:ext uri="{FF2B5EF4-FFF2-40B4-BE49-F238E27FC236}">
+                <a16:creationId xmlns:a16="http://schemas.microsoft.com/office/drawing/2014/main" id="{C2A5217F-4A1C-6E4C-AE36-24FB98960ACD}"/>
               </a:ext>
             </a:extLst>
           </p:cNvPr>
@@ -11378,8 +11144,8 @@
         </p:nvSpPr>
         <p:spPr>
           <a:xfrm>
-            <a:off x="2520635" y="9377178"/>
-            <a:ext cx="1597807" cy="307777"/>
+            <a:off x="6658020" y="8576674"/>
+            <a:ext cx="1653225" cy="307777"/>
           </a:xfrm>
           <a:prstGeom prst="rect">
             <a:avLst/>
@@ -11400,17 +11166,17 @@
                 <a:latin typeface="Arial" panose="020B0604020202020204" pitchFamily="34" charset="0"/>
                 <a:cs typeface="Arial" panose="020B0604020202020204" pitchFamily="34" charset="0"/>
               </a:rPr>
-              <a:t>JCL, Shell scripts</a:t>
+              <a:t>z/OSMF workflow</a:t>
             </a:r>
           </a:p>
         </p:txBody>
       </p:sp>
       <p:sp>
         <p:nvSpPr>
-          <p:cNvPr id="107" name="Rectangle 106">
-            <a:extLst>
-              <a:ext uri="{FF2B5EF4-FFF2-40B4-BE49-F238E27FC236}">
-                <a16:creationId xmlns:a16="http://schemas.microsoft.com/office/drawing/2014/main" id="{C2A5217F-4A1C-6E4C-AE36-24FB98960ACD}"/>
+          <p:cNvPr id="188" name="Rectangle 187">
+            <a:extLst>
+              <a:ext uri="{FF2B5EF4-FFF2-40B4-BE49-F238E27FC236}">
+                <a16:creationId xmlns:a16="http://schemas.microsoft.com/office/drawing/2014/main" id="{24BAA942-B59A-294B-AD09-4B735D8DF81F}"/>
               </a:ext>
             </a:extLst>
           </p:cNvPr>
@@ -11419,15 +11185,13 @@
         </p:nvSpPr>
         <p:spPr>
           <a:xfrm>
-            <a:off x="7545615" y="9406916"/>
-            <a:ext cx="1653225" cy="307777"/>
+            <a:off x="3310605" y="5723247"/>
+            <a:ext cx="1597807" cy="261610"/>
           </a:xfrm>
           <a:prstGeom prst="rect">
             <a:avLst/>
           </a:prstGeom>
-          <a:solidFill>
-            <a:schemeClr val="bg1"/>
-          </a:solidFill>
+          <a:noFill/>
         </p:spPr>
         <p:txBody>
           <a:bodyPr wrap="square">
@@ -11435,23 +11199,22 @@
           </a:bodyPr>
           <a:lstStyle/>
           <a:p>
-            <a:pPr algn="ctr"/>
-            <a:r>
-              <a:rPr lang="en-US" sz="1400" dirty="0">
-                <a:latin typeface="Arial" panose="020B0604020202020204" pitchFamily="34" charset="0"/>
-                <a:cs typeface="Arial" panose="020B0604020202020204" pitchFamily="34" charset="0"/>
-              </a:rPr>
-              <a:t>z/OSMF workflow</a:t>
+            <a:r>
+              <a:rPr lang="en-US" sz="1100" dirty="0">
+                <a:latin typeface="Arial" panose="020B0604020202020204" pitchFamily="34" charset="0"/>
+                <a:cs typeface="Arial" panose="020B0604020202020204" pitchFamily="34" charset="0"/>
+              </a:rPr>
+              <a:t>Shell script</a:t>
             </a:r>
           </a:p>
         </p:txBody>
       </p:sp>
       <p:sp>
         <p:nvSpPr>
-          <p:cNvPr id="186" name="Rectangle 185">
-            <a:extLst>
-              <a:ext uri="{FF2B5EF4-FFF2-40B4-BE49-F238E27FC236}">
-                <a16:creationId xmlns:a16="http://schemas.microsoft.com/office/drawing/2014/main" id="{A69634B0-9C23-6D4C-8CEB-A645BC10BC90}"/>
+          <p:cNvPr id="189" name="Rectangle 188">
+            <a:extLst>
+              <a:ext uri="{FF2B5EF4-FFF2-40B4-BE49-F238E27FC236}">
+                <a16:creationId xmlns:a16="http://schemas.microsoft.com/office/drawing/2014/main" id="{5EB36C5E-49E1-9F4C-981F-009A0E0594C3}"/>
               </a:ext>
             </a:extLst>
           </p:cNvPr>
@@ -11460,8 +11223,8 @@
         </p:nvSpPr>
         <p:spPr>
           <a:xfrm>
-            <a:off x="1112536" y="5635764"/>
-            <a:ext cx="1597807" cy="261610"/>
+            <a:off x="6027048" y="5700761"/>
+            <a:ext cx="1682987" cy="261610"/>
           </a:xfrm>
           <a:prstGeom prst="rect">
             <a:avLst/>
@@ -11475,124 +11238,6 @@
           <a:lstStyle/>
           <a:p>
             <a:r>
-              <a:rPr lang="en-US" sz="1100" dirty="0">
-                <a:latin typeface="Arial" panose="020B0604020202020204" pitchFamily="34" charset="0"/>
-                <a:cs typeface="Arial" panose="020B0604020202020204" pitchFamily="34" charset="0"/>
-              </a:rPr>
-              <a:t>Shell script</a:t>
-            </a:r>
-          </a:p>
-        </p:txBody>
-      </p:sp>
-      <p:sp>
-        <p:nvSpPr>
-          <p:cNvPr id="187" name="Rectangle 186">
-            <a:extLst>
-              <a:ext uri="{FF2B5EF4-FFF2-40B4-BE49-F238E27FC236}">
-                <a16:creationId xmlns:a16="http://schemas.microsoft.com/office/drawing/2014/main" id="{9DD4FFEE-862E-D540-AEB6-6B74B36ADBA9}"/>
-              </a:ext>
-            </a:extLst>
-          </p:cNvPr>
-          <p:cNvSpPr/>
-          <p:nvPr/>
-        </p:nvSpPr>
-        <p:spPr>
-          <a:xfrm>
-            <a:off x="3826033" y="5628801"/>
-            <a:ext cx="1682987" cy="261610"/>
-          </a:xfrm>
-          <a:prstGeom prst="rect">
-            <a:avLst/>
-          </a:prstGeom>
-          <a:noFill/>
-        </p:spPr>
-        <p:txBody>
-          <a:bodyPr wrap="square">
-            <a:spAutoFit/>
-          </a:bodyPr>
-          <a:lstStyle/>
-          <a:p>
-            <a:r>
-              <a:rPr lang="en-US" altLang="zh-CN" sz="1100" dirty="0">
-                <a:latin typeface="Arial" panose="020B0604020202020204" pitchFamily="34" charset="0"/>
-                <a:cs typeface="Arial" panose="020B0604020202020204" pitchFamily="34" charset="0"/>
-              </a:rPr>
-              <a:t>z/OSMF workflow</a:t>
-            </a:r>
-            <a:endParaRPr lang="en-US" sz="1100" dirty="0">
-              <a:latin typeface="Arial" panose="020B0604020202020204" pitchFamily="34" charset="0"/>
-              <a:cs typeface="Arial" panose="020B0604020202020204" pitchFamily="34" charset="0"/>
-            </a:endParaRPr>
-          </a:p>
-        </p:txBody>
-      </p:sp>
-      <p:sp>
-        <p:nvSpPr>
-          <p:cNvPr id="188" name="Rectangle 187">
-            <a:extLst>
-              <a:ext uri="{FF2B5EF4-FFF2-40B4-BE49-F238E27FC236}">
-                <a16:creationId xmlns:a16="http://schemas.microsoft.com/office/drawing/2014/main" id="{24BAA942-B59A-294B-AD09-4B735D8DF81F}"/>
-              </a:ext>
-            </a:extLst>
-          </p:cNvPr>
-          <p:cNvSpPr/>
-          <p:nvPr/>
-        </p:nvSpPr>
-        <p:spPr>
-          <a:xfrm>
-            <a:off x="6266122" y="5631394"/>
-            <a:ext cx="1597807" cy="261610"/>
-          </a:xfrm>
-          <a:prstGeom prst="rect">
-            <a:avLst/>
-          </a:prstGeom>
-          <a:noFill/>
-        </p:spPr>
-        <p:txBody>
-          <a:bodyPr wrap="square">
-            <a:spAutoFit/>
-          </a:bodyPr>
-          <a:lstStyle/>
-          <a:p>
-            <a:r>
-              <a:rPr lang="en-US" sz="1100" dirty="0">
-                <a:latin typeface="Arial" panose="020B0604020202020204" pitchFamily="34" charset="0"/>
-                <a:cs typeface="Arial" panose="020B0604020202020204" pitchFamily="34" charset="0"/>
-              </a:rPr>
-              <a:t>Shell script</a:t>
-            </a:r>
-          </a:p>
-        </p:txBody>
-      </p:sp>
-      <p:sp>
-        <p:nvSpPr>
-          <p:cNvPr id="189" name="Rectangle 188">
-            <a:extLst>
-              <a:ext uri="{FF2B5EF4-FFF2-40B4-BE49-F238E27FC236}">
-                <a16:creationId xmlns:a16="http://schemas.microsoft.com/office/drawing/2014/main" id="{5EB36C5E-49E1-9F4C-981F-009A0E0594C3}"/>
-              </a:ext>
-            </a:extLst>
-          </p:cNvPr>
-          <p:cNvSpPr/>
-          <p:nvPr/>
-        </p:nvSpPr>
-        <p:spPr>
-          <a:xfrm>
-            <a:off x="8968942" y="5623953"/>
-            <a:ext cx="1682987" cy="261610"/>
-          </a:xfrm>
-          <a:prstGeom prst="rect">
-            <a:avLst/>
-          </a:prstGeom>
-          <a:noFill/>
-        </p:spPr>
-        <p:txBody>
-          <a:bodyPr wrap="square">
-            <a:spAutoFit/>
-          </a:bodyPr>
-          <a:lstStyle/>
-          <a:p>
-            <a:r>
               <a:rPr lang="en-US" altLang="zh-CN" sz="1100" dirty="0">
                 <a:latin typeface="Arial" panose="020B0604020202020204" pitchFamily="34" charset="0"/>
                 <a:cs typeface="Arial" panose="020B0604020202020204" pitchFamily="34" charset="0"/>
@@ -11621,7 +11266,7 @@
         <p:spPr>
           <a:xfrm>
             <a:off x="726470" y="7579011"/>
-            <a:ext cx="9449560" cy="509925"/>
+            <a:ext cx="7098423" cy="509925"/>
           </a:xfrm>
           <a:prstGeom prst="rect">
             <a:avLst/>
@@ -11731,10 +11376,10 @@
       </p:sp>
       <p:cxnSp>
         <p:nvCxnSpPr>
-          <p:cNvPr id="202" name="Straight Arrow Connector 201">
-            <a:extLst>
-              <a:ext uri="{FF2B5EF4-FFF2-40B4-BE49-F238E27FC236}">
-                <a16:creationId xmlns:a16="http://schemas.microsoft.com/office/drawing/2014/main" id="{246A2A00-E342-094B-8312-BFF58079122D}"/>
+          <p:cNvPr id="204" name="Straight Arrow Connector 203">
+            <a:extLst>
+              <a:ext uri="{FF2B5EF4-FFF2-40B4-BE49-F238E27FC236}">
+                <a16:creationId xmlns:a16="http://schemas.microsoft.com/office/drawing/2014/main" id="{C34C710E-752B-3E43-B637-E8C40BCA1946}"/>
               </a:ext>
             </a:extLst>
           </p:cNvPr>
@@ -11745,8 +11390,8 @@
         </p:nvCxnSpPr>
         <p:spPr>
           <a:xfrm>
-            <a:off x="1601804" y="7131904"/>
-            <a:ext cx="0" cy="432000"/>
+            <a:off x="2194211" y="5226494"/>
+            <a:ext cx="9507" cy="2396002"/>
           </a:xfrm>
           <a:prstGeom prst="straightConnector1">
             <a:avLst/>
@@ -11778,22 +11423,23 @@
       </p:cxnSp>
       <p:cxnSp>
         <p:nvCxnSpPr>
-          <p:cNvPr id="204" name="Straight Arrow Connector 203">
-            <a:extLst>
-              <a:ext uri="{FF2B5EF4-FFF2-40B4-BE49-F238E27FC236}">
-                <a16:creationId xmlns:a16="http://schemas.microsoft.com/office/drawing/2014/main" id="{C34C710E-752B-3E43-B637-E8C40BCA1946}"/>
+          <p:cNvPr id="206" name="Straight Arrow Connector 205">
+            <a:extLst>
+              <a:ext uri="{FF2B5EF4-FFF2-40B4-BE49-F238E27FC236}">
+                <a16:creationId xmlns:a16="http://schemas.microsoft.com/office/drawing/2014/main" id="{C0035DBC-2F0D-F04D-8D33-F97C78EFB557}"/>
               </a:ext>
             </a:extLst>
           </p:cNvPr>
           <p:cNvCxnSpPr>
-            <a:stCxn id="82" idx="2"/>
+            <a:cxnSpLocks/>
+            <a:stCxn id="18" idx="2"/>
           </p:cNvCxnSpPr>
           <p:nvPr/>
         </p:nvCxnSpPr>
         <p:spPr>
-          <a:xfrm flipH="1">
-            <a:off x="4193734" y="7137872"/>
-            <a:ext cx="6879" cy="432000"/>
+          <a:xfrm>
+            <a:off x="3567803" y="7162899"/>
+            <a:ext cx="0" cy="432000"/>
           </a:xfrm>
           <a:prstGeom prst="straightConnector1">
             <a:avLst/>
@@ -11825,22 +11471,21 @@
       </p:cxnSp>
       <p:cxnSp>
         <p:nvCxnSpPr>
-          <p:cNvPr id="206" name="Straight Arrow Connector 205">
-            <a:extLst>
-              <a:ext uri="{FF2B5EF4-FFF2-40B4-BE49-F238E27FC236}">
-                <a16:creationId xmlns:a16="http://schemas.microsoft.com/office/drawing/2014/main" id="{C0035DBC-2F0D-F04D-8D33-F97C78EFB557}"/>
+          <p:cNvPr id="208" name="Straight Arrow Connector 207">
+            <a:extLst>
+              <a:ext uri="{FF2B5EF4-FFF2-40B4-BE49-F238E27FC236}">
+                <a16:creationId xmlns:a16="http://schemas.microsoft.com/office/drawing/2014/main" id="{9AFD042D-A750-7141-A300-38B5037254D9}"/>
               </a:ext>
             </a:extLst>
           </p:cNvPr>
           <p:cNvCxnSpPr>
-            <a:cxnSpLocks/>
-            <a:stCxn id="18" idx="2"/>
+            <a:stCxn id="85" idx="2"/>
           </p:cNvCxnSpPr>
           <p:nvPr/>
         </p:nvCxnSpPr>
         <p:spPr>
           <a:xfrm>
-            <a:off x="6718423" y="7131904"/>
+            <a:off x="6709959" y="7123650"/>
             <a:ext cx="0" cy="432000"/>
           </a:xfrm>
           <a:prstGeom prst="straightConnector1">
@@ -11873,53 +11518,6 @@
       </p:cxnSp>
       <p:cxnSp>
         <p:nvCxnSpPr>
-          <p:cNvPr id="208" name="Straight Arrow Connector 207">
-            <a:extLst>
-              <a:ext uri="{FF2B5EF4-FFF2-40B4-BE49-F238E27FC236}">
-                <a16:creationId xmlns:a16="http://schemas.microsoft.com/office/drawing/2014/main" id="{9AFD042D-A750-7141-A300-38B5037254D9}"/>
-              </a:ext>
-            </a:extLst>
-          </p:cNvPr>
-          <p:cNvCxnSpPr>
-            <a:stCxn id="85" idx="2"/>
-          </p:cNvCxnSpPr>
-          <p:nvPr/>
-        </p:nvCxnSpPr>
-        <p:spPr>
-          <a:xfrm>
-            <a:off x="9335871" y="7123650"/>
-            <a:ext cx="0" cy="432000"/>
-          </a:xfrm>
-          <a:prstGeom prst="straightConnector1">
-            <a:avLst/>
-          </a:prstGeom>
-          <a:ln>
-            <a:solidFill>
-              <a:schemeClr val="tx1">
-                <a:lumMod val="75000"/>
-                <a:lumOff val="25000"/>
-              </a:schemeClr>
-            </a:solidFill>
-            <a:tailEnd type="triangle"/>
-          </a:ln>
-        </p:spPr>
-        <p:style>
-          <a:lnRef idx="1">
-            <a:schemeClr val="accent1"/>
-          </a:lnRef>
-          <a:fillRef idx="0">
-            <a:schemeClr val="accent1"/>
-          </a:fillRef>
-          <a:effectRef idx="0">
-            <a:schemeClr val="accent1"/>
-          </a:effectRef>
-          <a:fontRef idx="minor">
-            <a:schemeClr val="tx1"/>
-          </a:fontRef>
-        </p:style>
-      </p:cxnSp>
-      <p:cxnSp>
-        <p:nvCxnSpPr>
           <p:cNvPr id="213" name="Straight Arrow Connector 212">
             <a:extLst>
               <a:ext uri="{FF2B5EF4-FFF2-40B4-BE49-F238E27FC236}">
@@ -11929,15 +11527,14 @@
           </p:cNvPr>
           <p:cNvCxnSpPr>
             <a:cxnSpLocks/>
-            <a:stCxn id="199" idx="2"/>
             <a:endCxn id="99" idx="0"/>
           </p:cNvCxnSpPr>
           <p:nvPr/>
         </p:nvCxnSpPr>
         <p:spPr>
           <a:xfrm>
-            <a:off x="5451250" y="8088936"/>
-            <a:ext cx="1460" cy="431616"/>
+            <a:off x="5452710" y="8083052"/>
+            <a:ext cx="0" cy="437500"/>
           </a:xfrm>
           <a:prstGeom prst="straightConnector1">
             <a:avLst/>
@@ -12876,6 +12473,694 @@
               <a:schemeClr val="tx1">
                 <a:lumMod val="75000"/>
                 <a:lumOff val="25000"/>
+              </a:schemeClr>
+            </a:solidFill>
+            <a:tailEnd type="triangle"/>
+          </a:ln>
+        </p:spPr>
+        <p:style>
+          <a:lnRef idx="1">
+            <a:schemeClr val="accent1"/>
+          </a:lnRef>
+          <a:fillRef idx="0">
+            <a:schemeClr val="accent1"/>
+          </a:fillRef>
+          <a:effectRef idx="0">
+            <a:schemeClr val="accent1"/>
+          </a:effectRef>
+          <a:fontRef idx="minor">
+            <a:schemeClr val="tx1"/>
+          </a:fontRef>
+        </p:style>
+      </p:cxnSp>
+      <p:sp>
+        <p:nvSpPr>
+          <p:cNvPr id="101" name="Rectangle 100">
+            <a:extLst>
+              <a:ext uri="{FF2B5EF4-FFF2-40B4-BE49-F238E27FC236}">
+                <a16:creationId xmlns:a16="http://schemas.microsoft.com/office/drawing/2014/main" id="{9470741F-AC7B-ED4A-B138-C8CDB2FC22FC}"/>
+              </a:ext>
+            </a:extLst>
+          </p:cNvPr>
+          <p:cNvSpPr/>
+          <p:nvPr/>
+        </p:nvSpPr>
+        <p:spPr>
+          <a:xfrm>
+            <a:off x="7824893" y="3767003"/>
+            <a:ext cx="2243289" cy="558971"/>
+          </a:xfrm>
+          <a:prstGeom prst="rect">
+            <a:avLst/>
+          </a:prstGeom>
+          <a:solidFill>
+            <a:schemeClr val="accent6">
+              <a:lumMod val="40000"/>
+              <a:lumOff val="60000"/>
+            </a:schemeClr>
+          </a:solidFill>
+          <a:ln>
+            <a:solidFill>
+              <a:schemeClr val="bg2"/>
+            </a:solidFill>
+          </a:ln>
+        </p:spPr>
+        <p:style>
+          <a:lnRef idx="2">
+            <a:schemeClr val="accent1">
+              <a:shade val="50000"/>
+            </a:schemeClr>
+          </a:lnRef>
+          <a:fillRef idx="1">
+            <a:schemeClr val="accent1"/>
+          </a:fillRef>
+          <a:effectRef idx="0">
+            <a:schemeClr val="accent1"/>
+          </a:effectRef>
+          <a:fontRef idx="minor">
+            <a:schemeClr val="lt1"/>
+          </a:fontRef>
+        </p:style>
+        <p:txBody>
+          <a:bodyPr rot="0" spcFirstLastPara="0" vertOverflow="overflow" horzOverflow="overflow" vert="horz" wrap="square" lIns="91440" tIns="45720" rIns="91440" bIns="45720" numCol="1" spcCol="0" rtlCol="0" fromWordArt="0" anchor="ctr" anchorCtr="0" forceAA="0" compatLnSpc="1">
+            <a:prstTxWarp prst="textNoShape">
+              <a:avLst/>
+            </a:prstTxWarp>
+            <a:noAutofit/>
+          </a:bodyPr>
+          <a:lstStyle/>
+          <a:p>
+            <a:pPr algn="ctr"/>
+            <a:r>
+              <a:rPr lang="en-US" sz="1100" dirty="0">
+                <a:solidFill>
+                  <a:schemeClr val="tx1"/>
+                </a:solidFill>
+                <a:latin typeface="Arial" panose="020B0604020202020204" pitchFamily="34" charset="0"/>
+                <a:cs typeface="Arial" panose="020B0604020202020204" pitchFamily="34" charset="0"/>
+              </a:rPr>
+              <a:t>Download the </a:t>
+            </a:r>
+            <a:r>
+              <a:rPr lang="en-US" sz="1100" dirty="0" smtClean="0">
+                <a:solidFill>
+                  <a:schemeClr val="tx1"/>
+                </a:solidFill>
+                <a:latin typeface="Arial" panose="020B0604020202020204" pitchFamily="34" charset="0"/>
+                <a:cs typeface="Arial" panose="020B0604020202020204" pitchFamily="34" charset="0"/>
+              </a:rPr>
+              <a:t>PSWI </a:t>
+            </a:r>
+            <a:r>
+              <a:rPr lang="en-US" sz="1100" dirty="0">
+                <a:solidFill>
+                  <a:schemeClr val="tx1"/>
+                </a:solidFill>
+                <a:latin typeface="Arial" panose="020B0604020202020204" pitchFamily="34" charset="0"/>
+                <a:cs typeface="Arial" panose="020B0604020202020204" pitchFamily="34" charset="0"/>
+              </a:rPr>
+              <a:t>build</a:t>
+            </a:r>
+          </a:p>
+        </p:txBody>
+      </p:sp>
+      <p:cxnSp>
+        <p:nvCxnSpPr>
+          <p:cNvPr id="103" name="Elbow Connector 102">
+            <a:extLst>
+              <a:ext uri="{FF2B5EF4-FFF2-40B4-BE49-F238E27FC236}">
+                <a16:creationId xmlns:a16="http://schemas.microsoft.com/office/drawing/2014/main" id="{51CC1DD3-FEF0-E245-8145-A63C4C3D2D03}"/>
+              </a:ext>
+            </a:extLst>
+          </p:cNvPr>
+          <p:cNvCxnSpPr>
+            <a:stCxn id="10" idx="3"/>
+            <a:endCxn id="101" idx="0"/>
+          </p:cNvCxnSpPr>
+          <p:nvPr/>
+        </p:nvCxnSpPr>
+        <p:spPr>
+          <a:xfrm>
+            <a:off x="6454852" y="3553836"/>
+            <a:ext cx="2491686" cy="213167"/>
+          </a:xfrm>
+          <a:prstGeom prst="bentConnector2">
+            <a:avLst/>
+          </a:prstGeom>
+          <a:ln>
+            <a:solidFill>
+              <a:schemeClr val="tx1">
+                <a:lumMod val="75000"/>
+                <a:lumOff val="25000"/>
+              </a:schemeClr>
+            </a:solidFill>
+            <a:tailEnd type="triangle"/>
+          </a:ln>
+        </p:spPr>
+        <p:style>
+          <a:lnRef idx="1">
+            <a:schemeClr val="accent1"/>
+          </a:lnRef>
+          <a:fillRef idx="0">
+            <a:schemeClr val="accent1"/>
+          </a:fillRef>
+          <a:effectRef idx="0">
+            <a:schemeClr val="accent1"/>
+          </a:effectRef>
+          <a:fontRef idx="minor">
+            <a:schemeClr val="tx1"/>
+          </a:fontRef>
+        </p:style>
+      </p:cxnSp>
+      <p:sp>
+        <p:nvSpPr>
+          <p:cNvPr id="108" name="Rectangle 107">
+            <a:extLst>
+              <a:ext uri="{FF2B5EF4-FFF2-40B4-BE49-F238E27FC236}">
+                <a16:creationId xmlns:a16="http://schemas.microsoft.com/office/drawing/2014/main" id="{48584CFC-8AA5-A24C-AA2A-281FBC765270}"/>
+              </a:ext>
+            </a:extLst>
+          </p:cNvPr>
+          <p:cNvSpPr/>
+          <p:nvPr/>
+        </p:nvSpPr>
+        <p:spPr>
+          <a:xfrm>
+            <a:off x="6621514" y="3285456"/>
+            <a:ext cx="2476765" cy="261610"/>
+          </a:xfrm>
+          <a:prstGeom prst="rect">
+            <a:avLst/>
+          </a:prstGeom>
+        </p:spPr>
+        <p:txBody>
+          <a:bodyPr wrap="square">
+            <a:spAutoFit/>
+          </a:bodyPr>
+          <a:lstStyle/>
+          <a:p>
+            <a:r>
+              <a:rPr lang="en-US" sz="1100" dirty="0" smtClean="0">
+                <a:solidFill>
+                  <a:schemeClr val="accent2">
+                    <a:lumMod val="75000"/>
+                  </a:schemeClr>
+                </a:solidFill>
+                <a:latin typeface="Arial" panose="020B0604020202020204" pitchFamily="34" charset="0"/>
+                <a:cs typeface="Arial" panose="020B0604020202020204" pitchFamily="34" charset="0"/>
+              </a:rPr>
+              <a:t>Portable software instance (PSWI)</a:t>
+            </a:r>
+            <a:endParaRPr lang="en-US" sz="1100" dirty="0">
+              <a:solidFill>
+                <a:schemeClr val="accent2">
+                  <a:lumMod val="75000"/>
+                </a:schemeClr>
+              </a:solidFill>
+              <a:latin typeface="Arial" panose="020B0604020202020204" pitchFamily="34" charset="0"/>
+              <a:cs typeface="Arial" panose="020B0604020202020204" pitchFamily="34" charset="0"/>
+            </a:endParaRPr>
+          </a:p>
+        </p:txBody>
+      </p:sp>
+      <p:sp>
+        <p:nvSpPr>
+          <p:cNvPr id="109" name="Rectangle 108">
+            <a:extLst>
+              <a:ext uri="{FF2B5EF4-FFF2-40B4-BE49-F238E27FC236}">
+                <a16:creationId xmlns:a16="http://schemas.microsoft.com/office/drawing/2014/main" id="{CCF7887F-10F2-9740-9DDE-6472EBCD2690}"/>
+              </a:ext>
+            </a:extLst>
+          </p:cNvPr>
+          <p:cNvSpPr/>
+          <p:nvPr/>
+        </p:nvSpPr>
+        <p:spPr>
+          <a:xfrm>
+            <a:off x="7824897" y="4468926"/>
+            <a:ext cx="2243285" cy="558971"/>
+          </a:xfrm>
+          <a:prstGeom prst="rect">
+            <a:avLst/>
+          </a:prstGeom>
+          <a:solidFill>
+            <a:schemeClr val="accent6">
+              <a:lumMod val="40000"/>
+              <a:lumOff val="60000"/>
+            </a:schemeClr>
+          </a:solidFill>
+          <a:ln>
+            <a:solidFill>
+              <a:schemeClr val="bg2"/>
+            </a:solidFill>
+          </a:ln>
+        </p:spPr>
+        <p:style>
+          <a:lnRef idx="2">
+            <a:schemeClr val="accent1">
+              <a:shade val="50000"/>
+            </a:schemeClr>
+          </a:lnRef>
+          <a:fillRef idx="1">
+            <a:schemeClr val="accent1"/>
+          </a:fillRef>
+          <a:effectRef idx="0">
+            <a:schemeClr val="accent1"/>
+          </a:effectRef>
+          <a:fontRef idx="minor">
+            <a:schemeClr val="lt1"/>
+          </a:fontRef>
+        </p:style>
+        <p:txBody>
+          <a:bodyPr rot="0" spcFirstLastPara="0" vertOverflow="overflow" horzOverflow="overflow" vert="horz" wrap="square" lIns="91440" tIns="45720" rIns="91440" bIns="45720" numCol="1" spcCol="0" rtlCol="0" fromWordArt="0" anchor="ctr" anchorCtr="0" forceAA="0" compatLnSpc="1">
+            <a:prstTxWarp prst="textNoShape">
+              <a:avLst/>
+            </a:prstTxWarp>
+            <a:noAutofit/>
+          </a:bodyPr>
+          <a:lstStyle/>
+          <a:p>
+            <a:pPr algn="ctr"/>
+            <a:r>
+              <a:rPr lang="en-US" sz="1100" dirty="0">
+                <a:solidFill>
+                  <a:schemeClr val="tx1"/>
+                </a:solidFill>
+                <a:latin typeface="Arial" panose="020B0604020202020204" pitchFamily="34" charset="0"/>
+                <a:cs typeface="Arial" panose="020B0604020202020204" pitchFamily="34" charset="0"/>
+              </a:rPr>
+              <a:t>Verify, transfer, and expand the PAX file on z/OS</a:t>
+            </a:r>
+          </a:p>
+        </p:txBody>
+      </p:sp>
+      <p:cxnSp>
+        <p:nvCxnSpPr>
+          <p:cNvPr id="110" name="Straight Arrow Connector 109">
+            <a:extLst>
+              <a:ext uri="{FF2B5EF4-FFF2-40B4-BE49-F238E27FC236}">
+                <a16:creationId xmlns:a16="http://schemas.microsoft.com/office/drawing/2014/main" id="{FFA5420E-5B30-BB4D-8699-10BA8C90F354}"/>
+              </a:ext>
+            </a:extLst>
+          </p:cNvPr>
+          <p:cNvCxnSpPr>
+            <a:endCxn id="109" idx="0"/>
+          </p:cNvCxnSpPr>
+          <p:nvPr/>
+        </p:nvCxnSpPr>
+        <p:spPr>
+          <a:xfrm>
+            <a:off x="8946538" y="4316796"/>
+            <a:ext cx="2" cy="152130"/>
+          </a:xfrm>
+          <a:prstGeom prst="straightConnector1">
+            <a:avLst/>
+          </a:prstGeom>
+          <a:ln>
+            <a:solidFill>
+              <a:schemeClr val="tx1">
+                <a:lumMod val="75000"/>
+                <a:lumOff val="25000"/>
+              </a:schemeClr>
+            </a:solidFill>
+            <a:tailEnd type="triangle"/>
+          </a:ln>
+        </p:spPr>
+        <p:style>
+          <a:lnRef idx="1">
+            <a:schemeClr val="accent1"/>
+          </a:lnRef>
+          <a:fillRef idx="0">
+            <a:schemeClr val="accent1"/>
+          </a:fillRef>
+          <a:effectRef idx="0">
+            <a:schemeClr val="accent1"/>
+          </a:effectRef>
+          <a:fontRef idx="minor">
+            <a:schemeClr val="tx1"/>
+          </a:fontRef>
+        </p:style>
+      </p:cxnSp>
+      <p:sp>
+        <p:nvSpPr>
+          <p:cNvPr id="111" name="Rectangle 110">
+            <a:extLst>
+              <a:ext uri="{FF2B5EF4-FFF2-40B4-BE49-F238E27FC236}">
+                <a16:creationId xmlns:a16="http://schemas.microsoft.com/office/drawing/2014/main" id="{CCF7887F-10F2-9740-9DDE-6472EBCD2690}"/>
+              </a:ext>
+            </a:extLst>
+          </p:cNvPr>
+          <p:cNvSpPr/>
+          <p:nvPr/>
+        </p:nvSpPr>
+        <p:spPr>
+          <a:xfrm>
+            <a:off x="7824897" y="5184379"/>
+            <a:ext cx="2243285" cy="558971"/>
+          </a:xfrm>
+          <a:prstGeom prst="rect">
+            <a:avLst/>
+          </a:prstGeom>
+          <a:solidFill>
+            <a:schemeClr val="accent6">
+              <a:lumMod val="40000"/>
+              <a:lumOff val="60000"/>
+            </a:schemeClr>
+          </a:solidFill>
+          <a:ln>
+            <a:solidFill>
+              <a:schemeClr val="bg2"/>
+            </a:solidFill>
+          </a:ln>
+        </p:spPr>
+        <p:style>
+          <a:lnRef idx="2">
+            <a:schemeClr val="accent1">
+              <a:shade val="50000"/>
+            </a:schemeClr>
+          </a:lnRef>
+          <a:fillRef idx="1">
+            <a:schemeClr val="accent1"/>
+          </a:fillRef>
+          <a:effectRef idx="0">
+            <a:schemeClr val="accent1"/>
+          </a:effectRef>
+          <a:fontRef idx="minor">
+            <a:schemeClr val="lt1"/>
+          </a:fontRef>
+        </p:style>
+        <p:txBody>
+          <a:bodyPr rot="0" spcFirstLastPara="0" vertOverflow="overflow" horzOverflow="overflow" vert="horz" wrap="square" lIns="91440" tIns="45720" rIns="91440" bIns="45720" numCol="1" spcCol="0" rtlCol="0" fromWordArt="0" anchor="ctr" anchorCtr="0" forceAA="0" compatLnSpc="1">
+            <a:prstTxWarp prst="textNoShape">
+              <a:avLst/>
+            </a:prstTxWarp>
+            <a:noAutofit/>
+          </a:bodyPr>
+          <a:lstStyle/>
+          <a:p>
+            <a:pPr algn="ctr"/>
+            <a:r>
+              <a:rPr lang="en-US" sz="1100" dirty="0" smtClean="0">
+                <a:solidFill>
+                  <a:schemeClr val="tx1"/>
+                </a:solidFill>
+                <a:latin typeface="Arial" panose="020B0604020202020204" pitchFamily="34" charset="0"/>
+                <a:cs typeface="Arial" panose="020B0604020202020204" pitchFamily="34" charset="0"/>
+              </a:rPr>
+              <a:t>Install the </a:t>
+            </a:r>
+            <a:r>
+              <a:rPr lang="en-US" sz="1100" dirty="0" err="1" smtClean="0">
+                <a:solidFill>
+                  <a:schemeClr val="tx1"/>
+                </a:solidFill>
+                <a:latin typeface="Arial" panose="020B0604020202020204" pitchFamily="34" charset="0"/>
+                <a:cs typeface="Arial" panose="020B0604020202020204" pitchFamily="34" charset="0"/>
+              </a:rPr>
+              <a:t>Zowe</a:t>
+            </a:r>
+            <a:r>
+              <a:rPr lang="en-US" sz="1100" dirty="0" smtClean="0">
+                <a:solidFill>
+                  <a:schemeClr val="tx1"/>
+                </a:solidFill>
+                <a:latin typeface="Arial" panose="020B0604020202020204" pitchFamily="34" charset="0"/>
+                <a:cs typeface="Arial" panose="020B0604020202020204" pitchFamily="34" charset="0"/>
+              </a:rPr>
+              <a:t> SMP/E using PSWI</a:t>
+            </a:r>
+            <a:endParaRPr lang="en-US" sz="1100" dirty="0">
+              <a:solidFill>
+                <a:schemeClr val="tx1"/>
+              </a:solidFill>
+              <a:latin typeface="Arial" panose="020B0604020202020204" pitchFamily="34" charset="0"/>
+              <a:cs typeface="Arial" panose="020B0604020202020204" pitchFamily="34" charset="0"/>
+            </a:endParaRPr>
+          </a:p>
+        </p:txBody>
+      </p:sp>
+      <p:cxnSp>
+        <p:nvCxnSpPr>
+          <p:cNvPr id="112" name="Straight Arrow Connector 111">
+            <a:extLst>
+              <a:ext uri="{FF2B5EF4-FFF2-40B4-BE49-F238E27FC236}">
+                <a16:creationId xmlns:a16="http://schemas.microsoft.com/office/drawing/2014/main" id="{FFA5420E-5B30-BB4D-8699-10BA8C90F354}"/>
+              </a:ext>
+            </a:extLst>
+          </p:cNvPr>
+          <p:cNvCxnSpPr>
+            <a:endCxn id="111" idx="0"/>
+          </p:cNvCxnSpPr>
+          <p:nvPr/>
+        </p:nvCxnSpPr>
+        <p:spPr>
+          <a:xfrm>
+            <a:off x="8946538" y="5032249"/>
+            <a:ext cx="2" cy="152130"/>
+          </a:xfrm>
+          <a:prstGeom prst="straightConnector1">
+            <a:avLst/>
+          </a:prstGeom>
+          <a:ln>
+            <a:solidFill>
+              <a:schemeClr val="tx1">
+                <a:lumMod val="75000"/>
+                <a:lumOff val="25000"/>
+              </a:schemeClr>
+            </a:solidFill>
+            <a:tailEnd type="triangle"/>
+          </a:ln>
+        </p:spPr>
+        <p:style>
+          <a:lnRef idx="1">
+            <a:schemeClr val="accent1"/>
+          </a:lnRef>
+          <a:fillRef idx="0">
+            <a:schemeClr val="accent1"/>
+          </a:fillRef>
+          <a:effectRef idx="0">
+            <a:schemeClr val="accent1"/>
+          </a:effectRef>
+          <a:fontRef idx="minor">
+            <a:schemeClr val="tx1"/>
+          </a:fontRef>
+        </p:style>
+      </p:cxnSp>
+      <p:sp>
+        <p:nvSpPr>
+          <p:cNvPr id="113" name="Rectangle 112">
+            <a:extLst>
+              <a:ext uri="{FF2B5EF4-FFF2-40B4-BE49-F238E27FC236}">
+                <a16:creationId xmlns:a16="http://schemas.microsoft.com/office/drawing/2014/main" id="{CCF7887F-10F2-9740-9DDE-6472EBCD2690}"/>
+              </a:ext>
+            </a:extLst>
+          </p:cNvPr>
+          <p:cNvSpPr/>
+          <p:nvPr/>
+        </p:nvSpPr>
+        <p:spPr>
+          <a:xfrm>
+            <a:off x="7824897" y="5894462"/>
+            <a:ext cx="2243285" cy="558971"/>
+          </a:xfrm>
+          <a:prstGeom prst="rect">
+            <a:avLst/>
+          </a:prstGeom>
+          <a:solidFill>
+            <a:schemeClr val="accent6">
+              <a:lumMod val="40000"/>
+              <a:lumOff val="60000"/>
+            </a:schemeClr>
+          </a:solidFill>
+          <a:ln>
+            <a:solidFill>
+              <a:schemeClr val="bg2"/>
+            </a:solidFill>
+          </a:ln>
+        </p:spPr>
+        <p:style>
+          <a:lnRef idx="2">
+            <a:schemeClr val="accent1">
+              <a:shade val="50000"/>
+            </a:schemeClr>
+          </a:lnRef>
+          <a:fillRef idx="1">
+            <a:schemeClr val="accent1"/>
+          </a:fillRef>
+          <a:effectRef idx="0">
+            <a:schemeClr val="accent1"/>
+          </a:effectRef>
+          <a:fontRef idx="minor">
+            <a:schemeClr val="lt1"/>
+          </a:fontRef>
+        </p:style>
+        <p:txBody>
+          <a:bodyPr rot="0" spcFirstLastPara="0" vertOverflow="overflow" horzOverflow="overflow" vert="horz" wrap="square" lIns="91440" tIns="45720" rIns="91440" bIns="45720" numCol="1" spcCol="0" rtlCol="0" fromWordArt="0" anchor="ctr" anchorCtr="0" forceAA="0" compatLnSpc="1">
+            <a:prstTxWarp prst="textNoShape">
+              <a:avLst/>
+            </a:prstTxWarp>
+            <a:noAutofit/>
+          </a:bodyPr>
+          <a:lstStyle/>
+          <a:p>
+            <a:pPr algn="ctr"/>
+            <a:r>
+              <a:rPr lang="en-US" sz="1100" dirty="0" smtClean="0">
+                <a:solidFill>
+                  <a:schemeClr val="tx1"/>
+                </a:solidFill>
+                <a:latin typeface="Arial" panose="020B0604020202020204" pitchFamily="34" charset="0"/>
+                <a:cs typeface="Arial" panose="020B0604020202020204" pitchFamily="34" charset="0"/>
+              </a:rPr>
+              <a:t>Mount </a:t>
+            </a:r>
+            <a:r>
+              <a:rPr lang="en-US" sz="1100" dirty="0" err="1" smtClean="0">
+                <a:solidFill>
+                  <a:schemeClr val="tx1"/>
+                </a:solidFill>
+                <a:latin typeface="Arial" panose="020B0604020202020204" pitchFamily="34" charset="0"/>
+                <a:cs typeface="Arial" panose="020B0604020202020204" pitchFamily="34" charset="0"/>
+              </a:rPr>
+              <a:t>Zowe</a:t>
+            </a:r>
+            <a:r>
+              <a:rPr lang="en-US" sz="1100" dirty="0" smtClean="0">
+                <a:solidFill>
+                  <a:schemeClr val="tx1"/>
+                </a:solidFill>
+                <a:latin typeface="Arial" panose="020B0604020202020204" pitchFamily="34" charset="0"/>
+                <a:cs typeface="Arial" panose="020B0604020202020204" pitchFamily="34" charset="0"/>
+              </a:rPr>
+              <a:t> </a:t>
+            </a:r>
+            <a:r>
+              <a:rPr lang="en-US" sz="1100" dirty="0" err="1" smtClean="0">
+                <a:solidFill>
+                  <a:schemeClr val="tx1"/>
+                </a:solidFill>
+                <a:latin typeface="Arial" panose="020B0604020202020204" pitchFamily="34" charset="0"/>
+                <a:cs typeface="Arial" panose="020B0604020202020204" pitchFamily="34" charset="0"/>
+              </a:rPr>
+              <a:t>zFS</a:t>
+            </a:r>
+            <a:r>
+              <a:rPr lang="en-US" sz="1100" dirty="0" smtClean="0">
+                <a:solidFill>
+                  <a:schemeClr val="tx1"/>
+                </a:solidFill>
+                <a:latin typeface="Arial" panose="020B0604020202020204" pitchFamily="34" charset="0"/>
+                <a:cs typeface="Arial" panose="020B0604020202020204" pitchFamily="34" charset="0"/>
+              </a:rPr>
+              <a:t> workflow</a:t>
+            </a:r>
+            <a:r>
+              <a:rPr lang="en-US" sz="1100" b="1" dirty="0" smtClean="0">
+                <a:solidFill>
+                  <a:schemeClr val="tx1"/>
+                </a:solidFill>
+                <a:latin typeface="Arial" panose="020B0604020202020204" pitchFamily="34" charset="0"/>
+                <a:cs typeface="Arial" panose="020B0604020202020204" pitchFamily="34" charset="0"/>
+              </a:rPr>
+              <a:t/>
+            </a:r>
+            <a:br>
+              <a:rPr lang="en-US" sz="1100" b="1" dirty="0" smtClean="0">
+                <a:solidFill>
+                  <a:schemeClr val="tx1"/>
+                </a:solidFill>
+                <a:latin typeface="Arial" panose="020B0604020202020204" pitchFamily="34" charset="0"/>
+                <a:cs typeface="Arial" panose="020B0604020202020204" pitchFamily="34" charset="0"/>
+              </a:rPr>
+            </a:br>
+            <a:r>
+              <a:rPr lang="en-US" sz="1100" b="1" dirty="0" smtClean="0">
+                <a:solidFill>
+                  <a:schemeClr val="tx1"/>
+                </a:solidFill>
+                <a:latin typeface="Arial" panose="020B0604020202020204" pitchFamily="34" charset="0"/>
+                <a:cs typeface="Arial" panose="020B0604020202020204" pitchFamily="34" charset="0"/>
+              </a:rPr>
+              <a:t>ZWE9MNT</a:t>
+            </a:r>
+            <a:endParaRPr lang="en-US" sz="1100" b="1" dirty="0">
+              <a:solidFill>
+                <a:schemeClr val="tx1"/>
+              </a:solidFill>
+              <a:latin typeface="Arial" panose="020B0604020202020204" pitchFamily="34" charset="0"/>
+              <a:cs typeface="Arial" panose="020B0604020202020204" pitchFamily="34" charset="0"/>
+            </a:endParaRPr>
+          </a:p>
+        </p:txBody>
+      </p:sp>
+      <p:cxnSp>
+        <p:nvCxnSpPr>
+          <p:cNvPr id="114" name="Straight Arrow Connector 113">
+            <a:extLst>
+              <a:ext uri="{FF2B5EF4-FFF2-40B4-BE49-F238E27FC236}">
+                <a16:creationId xmlns:a16="http://schemas.microsoft.com/office/drawing/2014/main" id="{FFA5420E-5B30-BB4D-8699-10BA8C90F354}"/>
+              </a:ext>
+            </a:extLst>
+          </p:cNvPr>
+          <p:cNvCxnSpPr>
+            <a:endCxn id="113" idx="0"/>
+          </p:cNvCxnSpPr>
+          <p:nvPr/>
+        </p:nvCxnSpPr>
+        <p:spPr>
+          <a:xfrm>
+            <a:off x="8946538" y="5742332"/>
+            <a:ext cx="2" cy="152130"/>
+          </a:xfrm>
+          <a:prstGeom prst="straightConnector1">
+            <a:avLst/>
+          </a:prstGeom>
+          <a:ln>
+            <a:solidFill>
+              <a:schemeClr val="tx1">
+                <a:lumMod val="75000"/>
+                <a:lumOff val="25000"/>
+              </a:schemeClr>
+            </a:solidFill>
+            <a:tailEnd type="triangle"/>
+          </a:ln>
+        </p:spPr>
+        <p:style>
+          <a:lnRef idx="1">
+            <a:schemeClr val="accent1"/>
+          </a:lnRef>
+          <a:fillRef idx="0">
+            <a:schemeClr val="accent1"/>
+          </a:fillRef>
+          <a:effectRef idx="0">
+            <a:schemeClr val="accent1"/>
+          </a:effectRef>
+          <a:fontRef idx="minor">
+            <a:schemeClr val="tx1"/>
+          </a:fontRef>
+        </p:style>
+      </p:cxnSp>
+      <p:cxnSp>
+        <p:nvCxnSpPr>
+          <p:cNvPr id="254" name="Elbow Connector 253"/>
+          <p:cNvCxnSpPr>
+            <a:endCxn id="74" idx="0"/>
+          </p:cNvCxnSpPr>
+          <p:nvPr/>
+        </p:nvCxnSpPr>
+        <p:spPr>
+          <a:xfrm rot="5400000">
+            <a:off x="6959011" y="7906675"/>
+            <a:ext cx="3445603" cy="541046"/>
+          </a:xfrm>
+          <a:prstGeom prst="bentConnector3">
+            <a:avLst/>
+          </a:prstGeom>
+          <a:ln>
+            <a:solidFill>
+              <a:schemeClr val="tx1">
+                <a:lumMod val="85000"/>
+                <a:lumOff val="15000"/>
               </a:schemeClr>
             </a:solidFill>
             <a:tailEnd type="triangle"/>
@@ -12906,6 +13191,13 @@
   <p:clrMapOvr>
     <a:masterClrMapping/>
   </p:clrMapOvr>
+  <p:timing>
+    <p:tnLst>
+      <p:par>
+        <p:cTn id="1" dur="indefinite" restart="never" nodeType="tmRoot"/>
+      </p:par>
+    </p:tnLst>
+  </p:timing>
 </p:sld>
 </file>
 

</xml_diff>

<commit_message>
Fix the install roadmap diagram
Signed-off-by: nannanli <nannanli@cn.ibm.com>
</commit_message>
<xml_diff>
--- a/docs/images/common/zowe-zos-install-diagram.pptx
+++ b/docs/images/common/zowe-zos-install-diagram.pptx
@@ -5,9 +5,8 @@
     <p:sldMasterId id="2147483768" r:id="rId1"/>
   </p:sldMasterIdLst>
   <p:sldIdLst>
-    <p:sldId id="257" r:id="rId2"/>
-    <p:sldId id="258" r:id="rId3"/>
-    <p:sldId id="259" r:id="rId4"/>
+    <p:sldId id="258" r:id="rId2"/>
+    <p:sldId id="259" r:id="rId3"/>
   </p:sldIdLst>
   <p:sldSz cx="11160125" cy="16163925"/>
   <p:notesSz cx="6858000" cy="9144000"/>
@@ -245,7 +244,7 @@
           <a:p>
             <a:fld id="{C4A90A56-7146-D847-92E1-256101539D4D}" type="datetimeFigureOut">
               <a:rPr lang="en-US" smtClean="0"/>
-              <a:t>12/2/2021</a:t>
+              <a:t>1/4/22</a:t>
             </a:fld>
             <a:endParaRPr lang="en-US"/>
           </a:p>
@@ -415,7 +414,7 @@
           <a:p>
             <a:fld id="{C4A90A56-7146-D847-92E1-256101539D4D}" type="datetimeFigureOut">
               <a:rPr lang="en-US" smtClean="0"/>
-              <a:t>12/2/2021</a:t>
+              <a:t>1/4/22</a:t>
             </a:fld>
             <a:endParaRPr lang="en-US"/>
           </a:p>
@@ -595,7 +594,7 @@
           <a:p>
             <a:fld id="{C4A90A56-7146-D847-92E1-256101539D4D}" type="datetimeFigureOut">
               <a:rPr lang="en-US" smtClean="0"/>
-              <a:t>12/2/2021</a:t>
+              <a:t>1/4/22</a:t>
             </a:fld>
             <a:endParaRPr lang="en-US"/>
           </a:p>
@@ -765,7 +764,7 @@
           <a:p>
             <a:fld id="{C4A90A56-7146-D847-92E1-256101539D4D}" type="datetimeFigureOut">
               <a:rPr lang="en-US" smtClean="0"/>
-              <a:t>12/2/2021</a:t>
+              <a:t>1/4/22</a:t>
             </a:fld>
             <a:endParaRPr lang="en-US"/>
           </a:p>
@@ -1009,7 +1008,7 @@
           <a:p>
             <a:fld id="{C4A90A56-7146-D847-92E1-256101539D4D}" type="datetimeFigureOut">
               <a:rPr lang="en-US" smtClean="0"/>
-              <a:t>12/2/2021</a:t>
+              <a:t>1/4/22</a:t>
             </a:fld>
             <a:endParaRPr lang="en-US"/>
           </a:p>
@@ -1241,7 +1240,7 @@
           <a:p>
             <a:fld id="{C4A90A56-7146-D847-92E1-256101539D4D}" type="datetimeFigureOut">
               <a:rPr lang="en-US" smtClean="0"/>
-              <a:t>12/2/2021</a:t>
+              <a:t>1/4/22</a:t>
             </a:fld>
             <a:endParaRPr lang="en-US"/>
           </a:p>
@@ -1608,7 +1607,7 @@
           <a:p>
             <a:fld id="{C4A90A56-7146-D847-92E1-256101539D4D}" type="datetimeFigureOut">
               <a:rPr lang="en-US" smtClean="0"/>
-              <a:t>12/2/2021</a:t>
+              <a:t>1/4/22</a:t>
             </a:fld>
             <a:endParaRPr lang="en-US"/>
           </a:p>
@@ -1726,7 +1725,7 @@
           <a:p>
             <a:fld id="{C4A90A56-7146-D847-92E1-256101539D4D}" type="datetimeFigureOut">
               <a:rPr lang="en-US" smtClean="0"/>
-              <a:t>12/2/2021</a:t>
+              <a:t>1/4/22</a:t>
             </a:fld>
             <a:endParaRPr lang="en-US"/>
           </a:p>
@@ -1821,7 +1820,7 @@
           <a:p>
             <a:fld id="{C4A90A56-7146-D847-92E1-256101539D4D}" type="datetimeFigureOut">
               <a:rPr lang="en-US" smtClean="0"/>
-              <a:t>12/2/2021</a:t>
+              <a:t>1/4/22</a:t>
             </a:fld>
             <a:endParaRPr lang="en-US"/>
           </a:p>
@@ -2098,7 +2097,7 @@
           <a:p>
             <a:fld id="{C4A90A56-7146-D847-92E1-256101539D4D}" type="datetimeFigureOut">
               <a:rPr lang="en-US" smtClean="0"/>
-              <a:t>12/2/2021</a:t>
+              <a:t>1/4/22</a:t>
             </a:fld>
             <a:endParaRPr lang="en-US"/>
           </a:p>
@@ -2355,7 +2354,7 @@
           <a:p>
             <a:fld id="{C4A90A56-7146-D847-92E1-256101539D4D}" type="datetimeFigureOut">
               <a:rPr lang="en-US" smtClean="0"/>
-              <a:t>12/2/2021</a:t>
+              <a:t>1/4/22</a:t>
             </a:fld>
             <a:endParaRPr lang="en-US"/>
           </a:p>
@@ -2568,7 +2567,7 @@
           <a:p>
             <a:fld id="{C4A90A56-7146-D847-92E1-256101539D4D}" type="datetimeFigureOut">
               <a:rPr lang="en-US" smtClean="0"/>
-              <a:t>12/2/2021</a:t>
+              <a:t>1/4/22</a:t>
             </a:fld>
             <a:endParaRPr lang="en-US"/>
           </a:p>
@@ -2957,4347 +2956,6 @@
 </file>
 
 <file path=ppt/slides/slide1.xml><?xml version="1.0" encoding="utf-8"?>
-<p:sld xmlns:a="http://schemas.openxmlformats.org/drawingml/2006/main" xmlns:r="http://schemas.openxmlformats.org/officeDocument/2006/relationships" xmlns:p="http://schemas.openxmlformats.org/presentationml/2006/main" show="0">
-  <p:cSld>
-    <p:spTree>
-      <p:nvGrpSpPr>
-        <p:cNvPr id="1" name=""/>
-        <p:cNvGrpSpPr/>
-        <p:nvPr/>
-      </p:nvGrpSpPr>
-      <p:grpSpPr>
-        <a:xfrm>
-          <a:off x="0" y="0"/>
-          <a:ext cx="0" cy="0"/>
-          <a:chOff x="0" y="0"/>
-          <a:chExt cx="0" cy="0"/>
-        </a:xfrm>
-      </p:grpSpPr>
-      <p:sp>
-        <p:nvSpPr>
-          <p:cNvPr id="6" name="Oval 5">
-            <a:extLst>
-              <a:ext uri="{FF2B5EF4-FFF2-40B4-BE49-F238E27FC236}">
-                <a16:creationId xmlns:a16="http://schemas.microsoft.com/office/drawing/2014/main" id="{ED7E982A-146B-B74A-8C01-6554E2F353AD}"/>
-              </a:ext>
-            </a:extLst>
-          </p:cNvPr>
-          <p:cNvSpPr/>
-          <p:nvPr/>
-        </p:nvSpPr>
-        <p:spPr>
-          <a:xfrm>
-            <a:off x="4843145" y="2571249"/>
-            <a:ext cx="180000" cy="180000"/>
-          </a:xfrm>
-          <a:prstGeom prst="ellipse">
-            <a:avLst/>
-          </a:prstGeom>
-          <a:solidFill>
-            <a:schemeClr val="accent1"/>
-          </a:solidFill>
-          <a:ln>
-            <a:noFill/>
-          </a:ln>
-        </p:spPr>
-        <p:style>
-          <a:lnRef idx="2">
-            <a:schemeClr val="accent1">
-              <a:shade val="50000"/>
-            </a:schemeClr>
-          </a:lnRef>
-          <a:fillRef idx="1">
-            <a:schemeClr val="accent1"/>
-          </a:fillRef>
-          <a:effectRef idx="0">
-            <a:schemeClr val="accent1"/>
-          </a:effectRef>
-          <a:fontRef idx="minor">
-            <a:schemeClr val="lt1"/>
-          </a:fontRef>
-        </p:style>
-        <p:txBody>
-          <a:bodyPr rot="0" spcFirstLastPara="0" vertOverflow="overflow" horzOverflow="overflow" vert="horz" wrap="square" lIns="91440" tIns="45720" rIns="91440" bIns="45720" numCol="1" spcCol="0" rtlCol="0" fromWordArt="0" anchor="ctr" anchorCtr="0" forceAA="0" compatLnSpc="1">
-            <a:prstTxWarp prst="textNoShape">
-              <a:avLst/>
-            </a:prstTxWarp>
-            <a:noAutofit/>
-          </a:bodyPr>
-          <a:lstStyle/>
-          <a:p>
-            <a:pPr algn="ctr"/>
-            <a:endParaRPr lang="en-US">
-              <a:latin typeface="Arial" panose="020B0604020202020204" pitchFamily="34" charset="0"/>
-              <a:cs typeface="Arial" panose="020B0604020202020204" pitchFamily="34" charset="0"/>
-            </a:endParaRPr>
-          </a:p>
-        </p:txBody>
-      </p:sp>
-      <p:sp>
-        <p:nvSpPr>
-          <p:cNvPr id="7" name="TextBox 6">
-            <a:extLst>
-              <a:ext uri="{FF2B5EF4-FFF2-40B4-BE49-F238E27FC236}">
-                <a16:creationId xmlns:a16="http://schemas.microsoft.com/office/drawing/2014/main" id="{1E65944C-7423-EA4F-9720-8AE0C58E5142}"/>
-              </a:ext>
-            </a:extLst>
-          </p:cNvPr>
-          <p:cNvSpPr txBox="1"/>
-          <p:nvPr/>
-        </p:nvSpPr>
-        <p:spPr>
-          <a:xfrm>
-            <a:off x="4971294" y="2518531"/>
-            <a:ext cx="2219327" cy="307777"/>
-          </a:xfrm>
-          <a:prstGeom prst="rect">
-            <a:avLst/>
-          </a:prstGeom>
-          <a:noFill/>
-        </p:spPr>
-        <p:txBody>
-          <a:bodyPr wrap="square" rtlCol="0">
-            <a:spAutoFit/>
-          </a:bodyPr>
-          <a:lstStyle/>
-          <a:p>
-            <a:r>
-              <a:rPr lang="en-US" sz="1400" dirty="0">
-                <a:latin typeface="Arial" panose="020B0604020202020204" pitchFamily="34" charset="0"/>
-                <a:cs typeface="Arial" panose="020B0604020202020204" pitchFamily="34" charset="0"/>
-              </a:rPr>
-              <a:t>Start the installation</a:t>
-            </a:r>
-          </a:p>
-        </p:txBody>
-      </p:sp>
-      <p:sp>
-        <p:nvSpPr>
-          <p:cNvPr id="8" name="Rectangle 7">
-            <a:extLst>
-              <a:ext uri="{FF2B5EF4-FFF2-40B4-BE49-F238E27FC236}">
-                <a16:creationId xmlns:a16="http://schemas.microsoft.com/office/drawing/2014/main" id="{702ABCD3-0E98-4F43-88A3-5ACCFBACBCBF}"/>
-              </a:ext>
-            </a:extLst>
-          </p:cNvPr>
-          <p:cNvSpPr/>
-          <p:nvPr/>
-        </p:nvSpPr>
-        <p:spPr>
-          <a:xfrm>
-            <a:off x="3992285" y="3079389"/>
-            <a:ext cx="1958008" cy="558971"/>
-          </a:xfrm>
-          <a:prstGeom prst="rect">
-            <a:avLst/>
-          </a:prstGeom>
-          <a:solidFill>
-            <a:srgbClr val="CEE7E9"/>
-          </a:solidFill>
-          <a:ln>
-            <a:noFill/>
-          </a:ln>
-        </p:spPr>
-        <p:style>
-          <a:lnRef idx="2">
-            <a:schemeClr val="accent1">
-              <a:shade val="50000"/>
-            </a:schemeClr>
-          </a:lnRef>
-          <a:fillRef idx="1">
-            <a:schemeClr val="accent1"/>
-          </a:fillRef>
-          <a:effectRef idx="0">
-            <a:schemeClr val="accent1"/>
-          </a:effectRef>
-          <a:fontRef idx="minor">
-            <a:schemeClr val="lt1"/>
-          </a:fontRef>
-        </p:style>
-        <p:txBody>
-          <a:bodyPr rot="0" spcFirstLastPara="0" vertOverflow="overflow" horzOverflow="overflow" vert="horz" wrap="square" lIns="91440" tIns="45720" rIns="91440" bIns="45720" numCol="1" spcCol="0" rtlCol="0" fromWordArt="0" anchor="ctr" anchorCtr="0" forceAA="0" compatLnSpc="1">
-            <a:prstTxWarp prst="textNoShape">
-              <a:avLst/>
-            </a:prstTxWarp>
-            <a:noAutofit/>
-          </a:bodyPr>
-          <a:lstStyle/>
-          <a:p>
-            <a:pPr algn="ctr"/>
-            <a:r>
-              <a:rPr lang="en-US" sz="1100" dirty="0">
-                <a:solidFill>
-                  <a:schemeClr val="tx1"/>
-                </a:solidFill>
-                <a:latin typeface="Arial" panose="020B0604020202020204" pitchFamily="34" charset="0"/>
-                <a:cs typeface="Arial" panose="020B0604020202020204" pitchFamily="34" charset="0"/>
-              </a:rPr>
-              <a:t>Ensure system requirements are met</a:t>
-            </a:r>
-          </a:p>
-        </p:txBody>
-      </p:sp>
-      <p:sp>
-        <p:nvSpPr>
-          <p:cNvPr id="10" name="Diamond 9">
-            <a:extLst>
-              <a:ext uri="{FF2B5EF4-FFF2-40B4-BE49-F238E27FC236}">
-                <a16:creationId xmlns:a16="http://schemas.microsoft.com/office/drawing/2014/main" id="{D66CB384-E34A-1D45-AD24-B88C7FD5FC40}"/>
-              </a:ext>
-            </a:extLst>
-          </p:cNvPr>
-          <p:cNvSpPr/>
-          <p:nvPr/>
-        </p:nvSpPr>
-        <p:spPr>
-          <a:xfrm>
-            <a:off x="3626030" y="3958662"/>
-            <a:ext cx="2559738" cy="809368"/>
-          </a:xfrm>
-          <a:prstGeom prst="diamond">
-            <a:avLst/>
-          </a:prstGeom>
-          <a:solidFill>
-            <a:srgbClr val="FBD589"/>
-          </a:solidFill>
-          <a:ln>
-            <a:noFill/>
-          </a:ln>
-        </p:spPr>
-        <p:style>
-          <a:lnRef idx="2">
-            <a:schemeClr val="accent1">
-              <a:shade val="50000"/>
-            </a:schemeClr>
-          </a:lnRef>
-          <a:fillRef idx="1">
-            <a:schemeClr val="accent1"/>
-          </a:fillRef>
-          <a:effectRef idx="0">
-            <a:schemeClr val="accent1"/>
-          </a:effectRef>
-          <a:fontRef idx="minor">
-            <a:schemeClr val="lt1"/>
-          </a:fontRef>
-        </p:style>
-        <p:txBody>
-          <a:bodyPr rot="0" spcFirstLastPara="0" vertOverflow="overflow" horzOverflow="overflow" vert="horz" wrap="square" lIns="91440" tIns="45720" rIns="91440" bIns="45720" numCol="1" spcCol="0" rtlCol="0" fromWordArt="0" anchor="ctr" anchorCtr="0" forceAA="0" compatLnSpc="1">
-            <a:prstTxWarp prst="textNoShape">
-              <a:avLst/>
-            </a:prstTxWarp>
-            <a:noAutofit/>
-          </a:bodyPr>
-          <a:lstStyle/>
-          <a:p>
-            <a:pPr algn="ctr"/>
-            <a:endParaRPr lang="en-US" sz="1100" dirty="0">
-              <a:solidFill>
-                <a:schemeClr val="bg1"/>
-              </a:solidFill>
-              <a:latin typeface="Arial" panose="020B0604020202020204" pitchFamily="34" charset="0"/>
-              <a:cs typeface="Arial" panose="020B0604020202020204" pitchFamily="34" charset="0"/>
-            </a:endParaRPr>
-          </a:p>
-        </p:txBody>
-      </p:sp>
-      <p:cxnSp>
-        <p:nvCxnSpPr>
-          <p:cNvPr id="12" name="Straight Arrow Connector 11">
-            <a:extLst>
-              <a:ext uri="{FF2B5EF4-FFF2-40B4-BE49-F238E27FC236}">
-                <a16:creationId xmlns:a16="http://schemas.microsoft.com/office/drawing/2014/main" id="{49933C4D-C0CC-0446-BE43-C41F5DE056AA}"/>
-              </a:ext>
-            </a:extLst>
-          </p:cNvPr>
-          <p:cNvCxnSpPr/>
-          <p:nvPr/>
-        </p:nvCxnSpPr>
-        <p:spPr>
-          <a:xfrm>
-            <a:off x="3681450" y="4492088"/>
-            <a:ext cx="0" cy="635129"/>
-          </a:xfrm>
-          <a:prstGeom prst="straightConnector1">
-            <a:avLst/>
-          </a:prstGeom>
-          <a:ln>
-            <a:solidFill>
-              <a:schemeClr val="tx1">
-                <a:lumMod val="50000"/>
-                <a:lumOff val="50000"/>
-              </a:schemeClr>
-            </a:solidFill>
-            <a:tailEnd type="triangle"/>
-          </a:ln>
-        </p:spPr>
-        <p:style>
-          <a:lnRef idx="1">
-            <a:schemeClr val="accent1"/>
-          </a:lnRef>
-          <a:fillRef idx="0">
-            <a:schemeClr val="accent1"/>
-          </a:fillRef>
-          <a:effectRef idx="0">
-            <a:schemeClr val="accent1"/>
-          </a:effectRef>
-          <a:fontRef idx="minor">
-            <a:schemeClr val="tx1"/>
-          </a:fontRef>
-        </p:style>
-      </p:cxnSp>
-      <p:cxnSp>
-        <p:nvCxnSpPr>
-          <p:cNvPr id="13" name="Straight Arrow Connector 12">
-            <a:extLst>
-              <a:ext uri="{FF2B5EF4-FFF2-40B4-BE49-F238E27FC236}">
-                <a16:creationId xmlns:a16="http://schemas.microsoft.com/office/drawing/2014/main" id="{3A11E806-C07A-6949-8A3A-9C87A40EE2A1}"/>
-              </a:ext>
-            </a:extLst>
-          </p:cNvPr>
-          <p:cNvCxnSpPr/>
-          <p:nvPr/>
-        </p:nvCxnSpPr>
-        <p:spPr>
-          <a:xfrm>
-            <a:off x="6171775" y="4464327"/>
-            <a:ext cx="0" cy="635129"/>
-          </a:xfrm>
-          <a:prstGeom prst="straightConnector1">
-            <a:avLst/>
-          </a:prstGeom>
-          <a:ln>
-            <a:solidFill>
-              <a:schemeClr val="tx1">
-                <a:lumMod val="50000"/>
-                <a:lumOff val="50000"/>
-              </a:schemeClr>
-            </a:solidFill>
-            <a:tailEnd type="triangle"/>
-          </a:ln>
-        </p:spPr>
-        <p:style>
-          <a:lnRef idx="1">
-            <a:schemeClr val="accent1"/>
-          </a:lnRef>
-          <a:fillRef idx="0">
-            <a:schemeClr val="accent1"/>
-          </a:fillRef>
-          <a:effectRef idx="0">
-            <a:schemeClr val="accent1"/>
-          </a:effectRef>
-          <a:fontRef idx="minor">
-            <a:schemeClr val="tx1"/>
-          </a:fontRef>
-        </p:style>
-      </p:cxnSp>
-      <p:sp>
-        <p:nvSpPr>
-          <p:cNvPr id="14" name="Rectangle 13">
-            <a:extLst>
-              <a:ext uri="{FF2B5EF4-FFF2-40B4-BE49-F238E27FC236}">
-                <a16:creationId xmlns:a16="http://schemas.microsoft.com/office/drawing/2014/main" id="{9470741F-AC7B-ED4A-B138-C8CDB2FC22FC}"/>
-              </a:ext>
-            </a:extLst>
-          </p:cNvPr>
-          <p:cNvSpPr/>
-          <p:nvPr/>
-        </p:nvSpPr>
-        <p:spPr>
-          <a:xfrm>
-            <a:off x="5276409" y="5148193"/>
-            <a:ext cx="2243289" cy="558971"/>
-          </a:xfrm>
-          <a:prstGeom prst="rect">
-            <a:avLst/>
-          </a:prstGeom>
-          <a:solidFill>
-            <a:srgbClr val="CEE7E9"/>
-          </a:solidFill>
-          <a:ln>
-            <a:noFill/>
-          </a:ln>
-        </p:spPr>
-        <p:style>
-          <a:lnRef idx="2">
-            <a:schemeClr val="accent1">
-              <a:shade val="50000"/>
-            </a:schemeClr>
-          </a:lnRef>
-          <a:fillRef idx="1">
-            <a:schemeClr val="accent1"/>
-          </a:fillRef>
-          <a:effectRef idx="0">
-            <a:schemeClr val="accent1"/>
-          </a:effectRef>
-          <a:fontRef idx="minor">
-            <a:schemeClr val="lt1"/>
-          </a:fontRef>
-        </p:style>
-        <p:txBody>
-          <a:bodyPr rot="0" spcFirstLastPara="0" vertOverflow="overflow" horzOverflow="overflow" vert="horz" wrap="square" lIns="91440" tIns="45720" rIns="91440" bIns="45720" numCol="1" spcCol="0" rtlCol="0" fromWordArt="0" anchor="ctr" anchorCtr="0" forceAA="0" compatLnSpc="1">
-            <a:prstTxWarp prst="textNoShape">
-              <a:avLst/>
-            </a:prstTxWarp>
-            <a:noAutofit/>
-          </a:bodyPr>
-          <a:lstStyle/>
-          <a:p>
-            <a:pPr algn="ctr"/>
-            <a:r>
-              <a:rPr lang="en-US" sz="1100" dirty="0">
-                <a:solidFill>
-                  <a:schemeClr val="tx1"/>
-                </a:solidFill>
-                <a:latin typeface="Arial" panose="020B0604020202020204" pitchFamily="34" charset="0"/>
-                <a:cs typeface="Arial" panose="020B0604020202020204" pitchFamily="34" charset="0"/>
-              </a:rPr>
-              <a:t>Download the convenience build</a:t>
-            </a:r>
-          </a:p>
-        </p:txBody>
-      </p:sp>
-      <p:sp>
-        <p:nvSpPr>
-          <p:cNvPr id="15" name="Rectangle 14">
-            <a:extLst>
-              <a:ext uri="{FF2B5EF4-FFF2-40B4-BE49-F238E27FC236}">
-                <a16:creationId xmlns:a16="http://schemas.microsoft.com/office/drawing/2014/main" id="{BF3E351B-D31F-994B-8126-62A9E13E5FDC}"/>
-              </a:ext>
-            </a:extLst>
-          </p:cNvPr>
-          <p:cNvSpPr/>
-          <p:nvPr/>
-        </p:nvSpPr>
-        <p:spPr>
-          <a:xfrm>
-            <a:off x="2917556" y="5148193"/>
-            <a:ext cx="2250655" cy="558971"/>
-          </a:xfrm>
-          <a:prstGeom prst="rect">
-            <a:avLst/>
-          </a:prstGeom>
-          <a:solidFill>
-            <a:srgbClr val="CEE7E9"/>
-          </a:solidFill>
-          <a:ln>
-            <a:noFill/>
-          </a:ln>
-        </p:spPr>
-        <p:style>
-          <a:lnRef idx="2">
-            <a:schemeClr val="accent1">
-              <a:shade val="50000"/>
-            </a:schemeClr>
-          </a:lnRef>
-          <a:fillRef idx="1">
-            <a:schemeClr val="accent1"/>
-          </a:fillRef>
-          <a:effectRef idx="0">
-            <a:schemeClr val="accent1"/>
-          </a:effectRef>
-          <a:fontRef idx="minor">
-            <a:schemeClr val="lt1"/>
-          </a:fontRef>
-        </p:style>
-        <p:txBody>
-          <a:bodyPr rot="0" spcFirstLastPara="0" vertOverflow="overflow" horzOverflow="overflow" vert="horz" wrap="square" lIns="91440" tIns="45720" rIns="91440" bIns="45720" numCol="1" spcCol="0" rtlCol="0" fromWordArt="0" anchor="ctr" anchorCtr="0" forceAA="0" compatLnSpc="1">
-            <a:prstTxWarp prst="textNoShape">
-              <a:avLst/>
-            </a:prstTxWarp>
-            <a:noAutofit/>
-          </a:bodyPr>
-          <a:lstStyle/>
-          <a:p>
-            <a:pPr algn="ctr"/>
-            <a:r>
-              <a:rPr lang="en-US" sz="1100" dirty="0">
-                <a:solidFill>
-                  <a:schemeClr val="tx1"/>
-                </a:solidFill>
-                <a:latin typeface="Arial" panose="020B0604020202020204" pitchFamily="34" charset="0"/>
-                <a:cs typeface="Arial" panose="020B0604020202020204" pitchFamily="34" charset="0"/>
-              </a:rPr>
-              <a:t>Download the Zowe SMP/E build</a:t>
-            </a:r>
-          </a:p>
-        </p:txBody>
-      </p:sp>
-      <p:sp>
-        <p:nvSpPr>
-          <p:cNvPr id="17" name="Rectangle 16">
-            <a:extLst>
-              <a:ext uri="{FF2B5EF4-FFF2-40B4-BE49-F238E27FC236}">
-                <a16:creationId xmlns:a16="http://schemas.microsoft.com/office/drawing/2014/main" id="{CCF7887F-10F2-9740-9DDE-6472EBCD2690}"/>
-              </a:ext>
-            </a:extLst>
-          </p:cNvPr>
-          <p:cNvSpPr/>
-          <p:nvPr/>
-        </p:nvSpPr>
-        <p:spPr>
-          <a:xfrm>
-            <a:off x="5275902" y="5936640"/>
-            <a:ext cx="2243285" cy="558971"/>
-          </a:xfrm>
-          <a:prstGeom prst="rect">
-            <a:avLst/>
-          </a:prstGeom>
-          <a:solidFill>
-            <a:srgbClr val="CEE7E9"/>
-          </a:solidFill>
-          <a:ln>
-            <a:noFill/>
-          </a:ln>
-        </p:spPr>
-        <p:style>
-          <a:lnRef idx="2">
-            <a:schemeClr val="accent1">
-              <a:shade val="50000"/>
-            </a:schemeClr>
-          </a:lnRef>
-          <a:fillRef idx="1">
-            <a:schemeClr val="accent1"/>
-          </a:fillRef>
-          <a:effectRef idx="0">
-            <a:schemeClr val="accent1"/>
-          </a:effectRef>
-          <a:fontRef idx="minor">
-            <a:schemeClr val="lt1"/>
-          </a:fontRef>
-        </p:style>
-        <p:txBody>
-          <a:bodyPr rot="0" spcFirstLastPara="0" vertOverflow="overflow" horzOverflow="overflow" vert="horz" wrap="square" lIns="91440" tIns="45720" rIns="91440" bIns="45720" numCol="1" spcCol="0" rtlCol="0" fromWordArt="0" anchor="ctr" anchorCtr="0" forceAA="0" compatLnSpc="1">
-            <a:prstTxWarp prst="textNoShape">
-              <a:avLst/>
-            </a:prstTxWarp>
-            <a:noAutofit/>
-          </a:bodyPr>
-          <a:lstStyle/>
-          <a:p>
-            <a:pPr algn="ctr"/>
-            <a:r>
-              <a:rPr lang="en-US" sz="1100" dirty="0">
-                <a:solidFill>
-                  <a:schemeClr val="tx1"/>
-                </a:solidFill>
-                <a:latin typeface="Arial" panose="020B0604020202020204" pitchFamily="34" charset="0"/>
-                <a:cs typeface="Arial" panose="020B0604020202020204" pitchFamily="34" charset="0"/>
-              </a:rPr>
-              <a:t>Verify, transfer, and expand the PAX file on z/OS</a:t>
-            </a:r>
-          </a:p>
-        </p:txBody>
-      </p:sp>
-      <p:sp>
-        <p:nvSpPr>
-          <p:cNvPr id="18" name="Rectangle 17">
-            <a:extLst>
-              <a:ext uri="{FF2B5EF4-FFF2-40B4-BE49-F238E27FC236}">
-                <a16:creationId xmlns:a16="http://schemas.microsoft.com/office/drawing/2014/main" id="{FDF356A4-F204-B24A-AC96-D723BE38D7A5}"/>
-              </a:ext>
-            </a:extLst>
-          </p:cNvPr>
-          <p:cNvSpPr/>
-          <p:nvPr/>
-        </p:nvSpPr>
-        <p:spPr>
-          <a:xfrm>
-            <a:off x="5275900" y="6698844"/>
-            <a:ext cx="4087766" cy="947863"/>
-          </a:xfrm>
-          <a:prstGeom prst="rect">
-            <a:avLst/>
-          </a:prstGeom>
-          <a:solidFill>
-            <a:srgbClr val="CEE7E9"/>
-          </a:solidFill>
-          <a:ln>
-            <a:noFill/>
-          </a:ln>
-        </p:spPr>
-        <p:style>
-          <a:lnRef idx="2">
-            <a:schemeClr val="accent1">
-              <a:shade val="50000"/>
-            </a:schemeClr>
-          </a:lnRef>
-          <a:fillRef idx="1">
-            <a:schemeClr val="accent1"/>
-          </a:fillRef>
-          <a:effectRef idx="0">
-            <a:schemeClr val="accent1"/>
-          </a:effectRef>
-          <a:fontRef idx="minor">
-            <a:schemeClr val="lt1"/>
-          </a:fontRef>
-        </p:style>
-        <p:txBody>
-          <a:bodyPr rot="0" spcFirstLastPara="0" vertOverflow="overflow" horzOverflow="overflow" vert="horz" wrap="square" lIns="91440" tIns="45720" rIns="91440" bIns="45720" numCol="1" spcCol="0" rtlCol="0" fromWordArt="0" anchor="ctr" anchorCtr="0" forceAA="0" compatLnSpc="1">
-            <a:prstTxWarp prst="textNoShape">
-              <a:avLst/>
-            </a:prstTxWarp>
-            <a:noAutofit/>
-          </a:bodyPr>
-          <a:lstStyle/>
-          <a:p>
-            <a:r>
-              <a:rPr lang="en-US" sz="1100" dirty="0">
-                <a:solidFill>
-                  <a:schemeClr val="tx1"/>
-                </a:solidFill>
-                <a:latin typeface="Arial" panose="020B0604020202020204" pitchFamily="34" charset="0"/>
-                <a:cs typeface="Arial" panose="020B0604020202020204" pitchFamily="34" charset="0"/>
-              </a:rPr>
-              <a:t>Install the </a:t>
-            </a:r>
-            <a:r>
-              <a:rPr lang="en-US" sz="1100" dirty="0" err="1">
-                <a:solidFill>
-                  <a:schemeClr val="tx1"/>
-                </a:solidFill>
-                <a:latin typeface="Arial" panose="020B0604020202020204" pitchFamily="34" charset="0"/>
-                <a:cs typeface="Arial" panose="020B0604020202020204" pitchFamily="34" charset="0"/>
-              </a:rPr>
-              <a:t>Zowe</a:t>
-            </a:r>
-            <a:r>
-              <a:rPr lang="en-US" sz="1100" dirty="0">
-                <a:solidFill>
-                  <a:schemeClr val="tx1"/>
-                </a:solidFill>
-                <a:latin typeface="Arial" panose="020B0604020202020204" pitchFamily="34" charset="0"/>
-                <a:cs typeface="Arial" panose="020B0604020202020204" pitchFamily="34" charset="0"/>
-              </a:rPr>
-              <a:t> runtime</a:t>
-            </a:r>
-          </a:p>
-        </p:txBody>
-      </p:sp>
-      <p:sp>
-        <p:nvSpPr>
-          <p:cNvPr id="19" name="Rectangle 18">
-            <a:extLst>
-              <a:ext uri="{FF2B5EF4-FFF2-40B4-BE49-F238E27FC236}">
-                <a16:creationId xmlns:a16="http://schemas.microsoft.com/office/drawing/2014/main" id="{9575373C-CDBF-9B4B-ADC2-488351559AA7}"/>
-              </a:ext>
-            </a:extLst>
-          </p:cNvPr>
-          <p:cNvSpPr/>
-          <p:nvPr/>
-        </p:nvSpPr>
-        <p:spPr>
-          <a:xfrm>
-            <a:off x="2917556" y="5936640"/>
-            <a:ext cx="2250651" cy="558971"/>
-          </a:xfrm>
-          <a:prstGeom prst="rect">
-            <a:avLst/>
-          </a:prstGeom>
-          <a:solidFill>
-            <a:srgbClr val="CEE7E9"/>
-          </a:solidFill>
-          <a:ln>
-            <a:noFill/>
-          </a:ln>
-        </p:spPr>
-        <p:style>
-          <a:lnRef idx="2">
-            <a:schemeClr val="accent1">
-              <a:shade val="50000"/>
-            </a:schemeClr>
-          </a:lnRef>
-          <a:fillRef idx="1">
-            <a:schemeClr val="accent1"/>
-          </a:fillRef>
-          <a:effectRef idx="0">
-            <a:schemeClr val="accent1"/>
-          </a:effectRef>
-          <a:fontRef idx="minor">
-            <a:schemeClr val="lt1"/>
-          </a:fontRef>
-        </p:style>
-        <p:txBody>
-          <a:bodyPr rot="0" spcFirstLastPara="0" vertOverflow="overflow" horzOverflow="overflow" vert="horz" wrap="square" lIns="91440" tIns="45720" rIns="91440" bIns="45720" numCol="1" spcCol="0" rtlCol="0" fromWordArt="0" anchor="ctr" anchorCtr="0" forceAA="0" compatLnSpc="1">
-            <a:prstTxWarp prst="textNoShape">
-              <a:avLst/>
-            </a:prstTxWarp>
-            <a:noAutofit/>
-          </a:bodyPr>
-          <a:lstStyle/>
-          <a:p>
-            <a:pPr algn="ctr"/>
-            <a:r>
-              <a:rPr lang="en-US" sz="1100" dirty="0">
-                <a:solidFill>
-                  <a:schemeClr val="tx1"/>
-                </a:solidFill>
-                <a:latin typeface="Arial" panose="020B0604020202020204" pitchFamily="34" charset="0"/>
-                <a:cs typeface="Arial" panose="020B0604020202020204" pitchFamily="34" charset="0"/>
-              </a:rPr>
-              <a:t>Install the Zowe SMP/E build</a:t>
-            </a:r>
-          </a:p>
-        </p:txBody>
-      </p:sp>
-      <p:sp>
-        <p:nvSpPr>
-          <p:cNvPr id="20" name="Rectangle 19">
-            <a:extLst>
-              <a:ext uri="{FF2B5EF4-FFF2-40B4-BE49-F238E27FC236}">
-                <a16:creationId xmlns:a16="http://schemas.microsoft.com/office/drawing/2014/main" id="{AEC5C09A-C884-C94D-99A1-280A4CEF119A}"/>
-              </a:ext>
-            </a:extLst>
-          </p:cNvPr>
-          <p:cNvSpPr/>
-          <p:nvPr/>
-        </p:nvSpPr>
-        <p:spPr>
-          <a:xfrm>
-            <a:off x="3038085" y="8096242"/>
-            <a:ext cx="5165215" cy="1161482"/>
-          </a:xfrm>
-          <a:prstGeom prst="rect">
-            <a:avLst/>
-          </a:prstGeom>
-          <a:solidFill>
-            <a:schemeClr val="bg1">
-              <a:lumMod val="95000"/>
-              <a:alpha val="74000"/>
-            </a:schemeClr>
-          </a:solidFill>
-          <a:ln>
-            <a:solidFill>
-              <a:schemeClr val="accent3">
-                <a:lumMod val="60000"/>
-                <a:lumOff val="40000"/>
-              </a:schemeClr>
-            </a:solidFill>
-          </a:ln>
-        </p:spPr>
-        <p:style>
-          <a:lnRef idx="2">
-            <a:schemeClr val="accent1">
-              <a:shade val="50000"/>
-            </a:schemeClr>
-          </a:lnRef>
-          <a:fillRef idx="1">
-            <a:schemeClr val="accent1"/>
-          </a:fillRef>
-          <a:effectRef idx="0">
-            <a:schemeClr val="accent1"/>
-          </a:effectRef>
-          <a:fontRef idx="minor">
-            <a:schemeClr val="lt1"/>
-          </a:fontRef>
-        </p:style>
-        <p:txBody>
-          <a:bodyPr rot="0" spcFirstLastPara="0" vertOverflow="overflow" horzOverflow="overflow" vert="horz" wrap="square" lIns="91440" tIns="45720" rIns="91440" bIns="45720" numCol="1" spcCol="0" rtlCol="0" fromWordArt="0" anchor="t" anchorCtr="0" forceAA="0" compatLnSpc="1">
-            <a:prstTxWarp prst="textNoShape">
-              <a:avLst/>
-            </a:prstTxWarp>
-            <a:noAutofit/>
-          </a:bodyPr>
-          <a:lstStyle/>
-          <a:p>
-            <a:pPr algn="ctr"/>
-            <a:r>
-              <a:rPr lang="en-US" altLang="zh-CN" sz="1100" dirty="0">
-                <a:solidFill>
-                  <a:schemeClr val="tx1"/>
-                </a:solidFill>
-                <a:latin typeface="Arial" panose="020B0604020202020204" pitchFamily="34" charset="0"/>
-                <a:cs typeface="Arial" panose="020B0604020202020204" pitchFamily="34" charset="0"/>
-              </a:rPr>
-              <a:t>(One-time setup per z/OS environment) </a:t>
-            </a:r>
-          </a:p>
-          <a:p>
-            <a:pPr algn="ctr"/>
-            <a:r>
-              <a:rPr lang="en-US" sz="1100" dirty="0">
-                <a:solidFill>
-                  <a:schemeClr val="tx1"/>
-                </a:solidFill>
-                <a:latin typeface="Arial" panose="020B0604020202020204" pitchFamily="34" charset="0"/>
-                <a:cs typeface="Arial" panose="020B0604020202020204" pitchFamily="34" charset="0"/>
-              </a:rPr>
-              <a:t>Configure the z/OS</a:t>
-            </a:r>
-            <a:r>
-              <a:rPr lang="zh-CN" altLang="en-US" sz="1100" dirty="0">
-                <a:solidFill>
-                  <a:schemeClr val="tx1"/>
-                </a:solidFill>
-                <a:latin typeface="Arial" panose="020B0604020202020204" pitchFamily="34" charset="0"/>
-                <a:cs typeface="Arial" panose="020B0604020202020204" pitchFamily="34" charset="0"/>
-              </a:rPr>
-              <a:t> </a:t>
-            </a:r>
-            <a:r>
-              <a:rPr lang="en-US" altLang="zh-CN" sz="1100" dirty="0">
-                <a:solidFill>
-                  <a:schemeClr val="tx1"/>
-                </a:solidFill>
-                <a:latin typeface="Arial" panose="020B0604020202020204" pitchFamily="34" charset="0"/>
-                <a:cs typeface="Arial" panose="020B0604020202020204" pitchFamily="34" charset="0"/>
-              </a:rPr>
-              <a:t>system</a:t>
-            </a:r>
-            <a:r>
-              <a:rPr lang="zh-CN" altLang="en-US" sz="1100" dirty="0">
-                <a:solidFill>
-                  <a:schemeClr val="tx1"/>
-                </a:solidFill>
-                <a:latin typeface="Arial" panose="020B0604020202020204" pitchFamily="34" charset="0"/>
-                <a:cs typeface="Arial" panose="020B0604020202020204" pitchFamily="34" charset="0"/>
-              </a:rPr>
-              <a:t> </a:t>
-            </a:r>
-            <a:r>
-              <a:rPr lang="en-US" altLang="zh-CN" sz="1100" dirty="0">
-                <a:solidFill>
-                  <a:schemeClr val="tx1"/>
-                </a:solidFill>
-                <a:latin typeface="Arial" panose="020B0604020202020204" pitchFamily="34" charset="0"/>
-                <a:cs typeface="Arial" panose="020B0604020202020204" pitchFamily="34" charset="0"/>
-              </a:rPr>
-              <a:t>for</a:t>
-            </a:r>
-            <a:r>
-              <a:rPr lang="zh-CN" altLang="en-US" sz="1100" dirty="0">
-                <a:solidFill>
-                  <a:schemeClr val="tx1"/>
-                </a:solidFill>
-                <a:latin typeface="Arial" panose="020B0604020202020204" pitchFamily="34" charset="0"/>
-                <a:cs typeface="Arial" panose="020B0604020202020204" pitchFamily="34" charset="0"/>
-              </a:rPr>
-              <a:t> </a:t>
-            </a:r>
-            <a:r>
-              <a:rPr lang="en-US" altLang="zh-CN" sz="1100" dirty="0" err="1">
-                <a:solidFill>
-                  <a:schemeClr val="tx1"/>
-                </a:solidFill>
-                <a:latin typeface="Arial" panose="020B0604020202020204" pitchFamily="34" charset="0"/>
-                <a:cs typeface="Arial" panose="020B0604020202020204" pitchFamily="34" charset="0"/>
-              </a:rPr>
-              <a:t>Zowe</a:t>
-            </a:r>
-            <a:endParaRPr lang="en-US" altLang="zh-CN" sz="1100" dirty="0">
-              <a:solidFill>
-                <a:schemeClr val="tx1"/>
-              </a:solidFill>
-              <a:latin typeface="Arial" panose="020B0604020202020204" pitchFamily="34" charset="0"/>
-              <a:cs typeface="Arial" panose="020B0604020202020204" pitchFamily="34" charset="0"/>
-            </a:endParaRPr>
-          </a:p>
-        </p:txBody>
-      </p:sp>
-      <p:cxnSp>
-        <p:nvCxnSpPr>
-          <p:cNvPr id="21" name="Straight Arrow Connector 20">
-            <a:extLst>
-              <a:ext uri="{FF2B5EF4-FFF2-40B4-BE49-F238E27FC236}">
-                <a16:creationId xmlns:a16="http://schemas.microsoft.com/office/drawing/2014/main" id="{517C38BA-2A23-5742-8415-0A5B3E6F60D4}"/>
-              </a:ext>
-            </a:extLst>
-          </p:cNvPr>
-          <p:cNvCxnSpPr>
-            <a:cxnSpLocks/>
-          </p:cNvCxnSpPr>
-          <p:nvPr/>
-        </p:nvCxnSpPr>
-        <p:spPr>
-          <a:xfrm>
-            <a:off x="3681450" y="5723655"/>
-            <a:ext cx="0" cy="212985"/>
-          </a:xfrm>
-          <a:prstGeom prst="straightConnector1">
-            <a:avLst/>
-          </a:prstGeom>
-          <a:ln>
-            <a:solidFill>
-              <a:schemeClr val="tx1">
-                <a:lumMod val="50000"/>
-                <a:lumOff val="50000"/>
-              </a:schemeClr>
-            </a:solidFill>
-            <a:tailEnd type="triangle"/>
-          </a:ln>
-        </p:spPr>
-        <p:style>
-          <a:lnRef idx="1">
-            <a:schemeClr val="accent1"/>
-          </a:lnRef>
-          <a:fillRef idx="0">
-            <a:schemeClr val="accent1"/>
-          </a:fillRef>
-          <a:effectRef idx="0">
-            <a:schemeClr val="accent1"/>
-          </a:effectRef>
-          <a:fontRef idx="minor">
-            <a:schemeClr val="tx1"/>
-          </a:fontRef>
-        </p:style>
-      </p:cxnSp>
-      <p:cxnSp>
-        <p:nvCxnSpPr>
-          <p:cNvPr id="24" name="Straight Arrow Connector 23">
-            <a:extLst>
-              <a:ext uri="{FF2B5EF4-FFF2-40B4-BE49-F238E27FC236}">
-                <a16:creationId xmlns:a16="http://schemas.microsoft.com/office/drawing/2014/main" id="{D5FA7125-12CE-154C-81B5-1873D8D4A67E}"/>
-              </a:ext>
-            </a:extLst>
-          </p:cNvPr>
-          <p:cNvCxnSpPr>
-            <a:cxnSpLocks/>
-          </p:cNvCxnSpPr>
-          <p:nvPr/>
-        </p:nvCxnSpPr>
-        <p:spPr>
-          <a:xfrm>
-            <a:off x="6171775" y="5734466"/>
-            <a:ext cx="0" cy="212985"/>
-          </a:xfrm>
-          <a:prstGeom prst="straightConnector1">
-            <a:avLst/>
-          </a:prstGeom>
-          <a:ln>
-            <a:solidFill>
-              <a:schemeClr val="tx1">
-                <a:lumMod val="50000"/>
-                <a:lumOff val="50000"/>
-              </a:schemeClr>
-            </a:solidFill>
-            <a:tailEnd type="triangle"/>
-          </a:ln>
-        </p:spPr>
-        <p:style>
-          <a:lnRef idx="1">
-            <a:schemeClr val="accent1"/>
-          </a:lnRef>
-          <a:fillRef idx="0">
-            <a:schemeClr val="accent1"/>
-          </a:fillRef>
-          <a:effectRef idx="0">
-            <a:schemeClr val="accent1"/>
-          </a:effectRef>
-          <a:fontRef idx="minor">
-            <a:schemeClr val="tx1"/>
-          </a:fontRef>
-        </p:style>
-      </p:cxnSp>
-      <p:cxnSp>
-        <p:nvCxnSpPr>
-          <p:cNvPr id="25" name="Straight Arrow Connector 24">
-            <a:extLst>
-              <a:ext uri="{FF2B5EF4-FFF2-40B4-BE49-F238E27FC236}">
-                <a16:creationId xmlns:a16="http://schemas.microsoft.com/office/drawing/2014/main" id="{25720A06-FDF6-E643-910A-498C33882DCF}"/>
-              </a:ext>
-            </a:extLst>
-          </p:cNvPr>
-          <p:cNvCxnSpPr>
-            <a:cxnSpLocks/>
-          </p:cNvCxnSpPr>
-          <p:nvPr/>
-        </p:nvCxnSpPr>
-        <p:spPr>
-          <a:xfrm>
-            <a:off x="6171775" y="6485860"/>
-            <a:ext cx="0" cy="212985"/>
-          </a:xfrm>
-          <a:prstGeom prst="straightConnector1">
-            <a:avLst/>
-          </a:prstGeom>
-          <a:ln>
-            <a:solidFill>
-              <a:schemeClr val="tx1">
-                <a:lumMod val="50000"/>
-                <a:lumOff val="50000"/>
-              </a:schemeClr>
-            </a:solidFill>
-            <a:tailEnd type="triangle"/>
-          </a:ln>
-        </p:spPr>
-        <p:style>
-          <a:lnRef idx="1">
-            <a:schemeClr val="accent1"/>
-          </a:lnRef>
-          <a:fillRef idx="0">
-            <a:schemeClr val="accent1"/>
-          </a:fillRef>
-          <a:effectRef idx="0">
-            <a:schemeClr val="accent1"/>
-          </a:effectRef>
-          <a:fontRef idx="minor">
-            <a:schemeClr val="tx1"/>
-          </a:fontRef>
-        </p:style>
-      </p:cxnSp>
-      <p:cxnSp>
-        <p:nvCxnSpPr>
-          <p:cNvPr id="26" name="Straight Arrow Connector 25">
-            <a:extLst>
-              <a:ext uri="{FF2B5EF4-FFF2-40B4-BE49-F238E27FC236}">
-                <a16:creationId xmlns:a16="http://schemas.microsoft.com/office/drawing/2014/main" id="{5630532D-51D3-9442-BA51-7D5C5313663B}"/>
-              </a:ext>
-            </a:extLst>
-          </p:cNvPr>
-          <p:cNvCxnSpPr>
-            <a:cxnSpLocks/>
-          </p:cNvCxnSpPr>
-          <p:nvPr/>
-        </p:nvCxnSpPr>
-        <p:spPr>
-          <a:xfrm>
-            <a:off x="6058178" y="7456814"/>
-            <a:ext cx="0" cy="602224"/>
-          </a:xfrm>
-          <a:prstGeom prst="straightConnector1">
-            <a:avLst/>
-          </a:prstGeom>
-          <a:ln>
-            <a:solidFill>
-              <a:schemeClr val="tx1">
-                <a:lumMod val="50000"/>
-                <a:lumOff val="50000"/>
-              </a:schemeClr>
-            </a:solidFill>
-            <a:tailEnd type="triangle"/>
-          </a:ln>
-        </p:spPr>
-        <p:style>
-          <a:lnRef idx="1">
-            <a:schemeClr val="accent1"/>
-          </a:lnRef>
-          <a:fillRef idx="0">
-            <a:schemeClr val="accent1"/>
-          </a:fillRef>
-          <a:effectRef idx="0">
-            <a:schemeClr val="accent1"/>
-          </a:effectRef>
-          <a:fontRef idx="minor">
-            <a:schemeClr val="tx1"/>
-          </a:fontRef>
-        </p:style>
-      </p:cxnSp>
-      <p:cxnSp>
-        <p:nvCxnSpPr>
-          <p:cNvPr id="27" name="Straight Arrow Connector 26">
-            <a:extLst>
-              <a:ext uri="{FF2B5EF4-FFF2-40B4-BE49-F238E27FC236}">
-                <a16:creationId xmlns:a16="http://schemas.microsoft.com/office/drawing/2014/main" id="{CBEB1666-A39E-DB4F-8013-37F50F902A0C}"/>
-              </a:ext>
-            </a:extLst>
-          </p:cNvPr>
-          <p:cNvCxnSpPr>
-            <a:cxnSpLocks/>
-          </p:cNvCxnSpPr>
-          <p:nvPr/>
-        </p:nvCxnSpPr>
-        <p:spPr>
-          <a:xfrm>
-            <a:off x="3920167" y="6506413"/>
-            <a:ext cx="0" cy="1523074"/>
-          </a:xfrm>
-          <a:prstGeom prst="straightConnector1">
-            <a:avLst/>
-          </a:prstGeom>
-          <a:ln>
-            <a:solidFill>
-              <a:schemeClr val="tx1">
-                <a:lumMod val="50000"/>
-                <a:lumOff val="50000"/>
-              </a:schemeClr>
-            </a:solidFill>
-            <a:tailEnd type="triangle"/>
-          </a:ln>
-        </p:spPr>
-        <p:style>
-          <a:lnRef idx="1">
-            <a:schemeClr val="accent1"/>
-          </a:lnRef>
-          <a:fillRef idx="0">
-            <a:schemeClr val="accent1"/>
-          </a:fillRef>
-          <a:effectRef idx="0">
-            <a:schemeClr val="accent1"/>
-          </a:effectRef>
-          <a:fontRef idx="minor">
-            <a:schemeClr val="tx1"/>
-          </a:fontRef>
-        </p:style>
-      </p:cxnSp>
-      <p:cxnSp>
-        <p:nvCxnSpPr>
-          <p:cNvPr id="33" name="Straight Arrow Connector 32">
-            <a:extLst>
-              <a:ext uri="{FF2B5EF4-FFF2-40B4-BE49-F238E27FC236}">
-                <a16:creationId xmlns:a16="http://schemas.microsoft.com/office/drawing/2014/main" id="{6A18AAB6-40CD-7744-8AB4-98DD9A9F0D1A}"/>
-              </a:ext>
-            </a:extLst>
-          </p:cNvPr>
-          <p:cNvCxnSpPr>
-            <a:cxnSpLocks/>
-          </p:cNvCxnSpPr>
-          <p:nvPr/>
-        </p:nvCxnSpPr>
-        <p:spPr>
-          <a:xfrm>
-            <a:off x="4905896" y="3638357"/>
-            <a:ext cx="0" cy="262924"/>
-          </a:xfrm>
-          <a:prstGeom prst="straightConnector1">
-            <a:avLst/>
-          </a:prstGeom>
-          <a:ln>
-            <a:solidFill>
-              <a:schemeClr val="tx1">
-                <a:lumMod val="50000"/>
-                <a:lumOff val="50000"/>
-              </a:schemeClr>
-            </a:solidFill>
-            <a:tailEnd type="triangle"/>
-          </a:ln>
-        </p:spPr>
-        <p:style>
-          <a:lnRef idx="1">
-            <a:schemeClr val="accent1"/>
-          </a:lnRef>
-          <a:fillRef idx="0">
-            <a:schemeClr val="accent1"/>
-          </a:fillRef>
-          <a:effectRef idx="0">
-            <a:schemeClr val="accent1"/>
-          </a:effectRef>
-          <a:fontRef idx="minor">
-            <a:schemeClr val="tx1"/>
-          </a:fontRef>
-        </p:style>
-      </p:cxnSp>
-      <p:sp>
-        <p:nvSpPr>
-          <p:cNvPr id="35" name="Rectangle 34">
-            <a:extLst>
-              <a:ext uri="{FF2B5EF4-FFF2-40B4-BE49-F238E27FC236}">
-                <a16:creationId xmlns:a16="http://schemas.microsoft.com/office/drawing/2014/main" id="{48584CFC-8AA5-A24C-AA2A-281FBC765270}"/>
-              </a:ext>
-            </a:extLst>
-          </p:cNvPr>
-          <p:cNvSpPr/>
-          <p:nvPr/>
-        </p:nvSpPr>
-        <p:spPr>
-          <a:xfrm>
-            <a:off x="2478218" y="4602290"/>
-            <a:ext cx="1365668" cy="307777"/>
-          </a:xfrm>
-          <a:prstGeom prst="rect">
-            <a:avLst/>
-          </a:prstGeom>
-        </p:spPr>
-        <p:txBody>
-          <a:bodyPr wrap="square">
-            <a:spAutoFit/>
-          </a:bodyPr>
-          <a:lstStyle/>
-          <a:p>
-            <a:r>
-              <a:rPr lang="en-US" sz="1400" dirty="0">
-                <a:latin typeface="Arial" panose="020B0604020202020204" pitchFamily="34" charset="0"/>
-                <a:cs typeface="Arial" panose="020B0604020202020204" pitchFamily="34" charset="0"/>
-              </a:rPr>
-              <a:t>SMP/E</a:t>
-            </a:r>
-            <a:r>
-              <a:rPr lang="zh-CN" altLang="en-US" sz="1400" dirty="0">
-                <a:latin typeface="Arial" panose="020B0604020202020204" pitchFamily="34" charset="0"/>
-                <a:cs typeface="Arial" panose="020B0604020202020204" pitchFamily="34" charset="0"/>
-              </a:rPr>
-              <a:t> </a:t>
-            </a:r>
-            <a:r>
-              <a:rPr lang="en-US" altLang="zh-CN" sz="1400" dirty="0">
-                <a:latin typeface="Arial" panose="020B0604020202020204" pitchFamily="34" charset="0"/>
-                <a:cs typeface="Arial" panose="020B0604020202020204" pitchFamily="34" charset="0"/>
-              </a:rPr>
-              <a:t>build</a:t>
-            </a:r>
-            <a:r>
-              <a:rPr lang="en-US" sz="1400" dirty="0">
-                <a:latin typeface="Arial" panose="020B0604020202020204" pitchFamily="34" charset="0"/>
-                <a:cs typeface="Arial" panose="020B0604020202020204" pitchFamily="34" charset="0"/>
-              </a:rPr>
-              <a:t> </a:t>
-            </a:r>
-          </a:p>
-        </p:txBody>
-      </p:sp>
-      <p:sp>
-        <p:nvSpPr>
-          <p:cNvPr id="36" name="Rectangle 35">
-            <a:extLst>
-              <a:ext uri="{FF2B5EF4-FFF2-40B4-BE49-F238E27FC236}">
-                <a16:creationId xmlns:a16="http://schemas.microsoft.com/office/drawing/2014/main" id="{87236179-D445-7148-9218-51771C4CD928}"/>
-              </a:ext>
-            </a:extLst>
-          </p:cNvPr>
-          <p:cNvSpPr/>
-          <p:nvPr/>
-        </p:nvSpPr>
-        <p:spPr>
-          <a:xfrm>
-            <a:off x="6175591" y="4602290"/>
-            <a:ext cx="1682987" cy="307777"/>
-          </a:xfrm>
-          <a:prstGeom prst="rect">
-            <a:avLst/>
-          </a:prstGeom>
-        </p:spPr>
-        <p:txBody>
-          <a:bodyPr wrap="square">
-            <a:spAutoFit/>
-          </a:bodyPr>
-          <a:lstStyle/>
-          <a:p>
-            <a:r>
-              <a:rPr lang="en-US" altLang="zh-CN" sz="1400" dirty="0">
-                <a:latin typeface="Arial" panose="020B0604020202020204" pitchFamily="34" charset="0"/>
-                <a:cs typeface="Arial" panose="020B0604020202020204" pitchFamily="34" charset="0"/>
-              </a:rPr>
-              <a:t>Convenience</a:t>
-            </a:r>
-            <a:r>
-              <a:rPr lang="zh-CN" altLang="en-US" sz="1400" dirty="0">
-                <a:latin typeface="Arial" panose="020B0604020202020204" pitchFamily="34" charset="0"/>
-                <a:cs typeface="Arial" panose="020B0604020202020204" pitchFamily="34" charset="0"/>
-              </a:rPr>
-              <a:t> </a:t>
-            </a:r>
-            <a:r>
-              <a:rPr lang="en-US" altLang="zh-CN" sz="1400" dirty="0">
-                <a:latin typeface="Arial" panose="020B0604020202020204" pitchFamily="34" charset="0"/>
-                <a:cs typeface="Arial" panose="020B0604020202020204" pitchFamily="34" charset="0"/>
-              </a:rPr>
-              <a:t>build</a:t>
-            </a:r>
-            <a:r>
-              <a:rPr lang="en-US" sz="1400" dirty="0">
-                <a:latin typeface="Arial" panose="020B0604020202020204" pitchFamily="34" charset="0"/>
-                <a:cs typeface="Arial" panose="020B0604020202020204" pitchFamily="34" charset="0"/>
-              </a:rPr>
-              <a:t> </a:t>
-            </a:r>
-          </a:p>
-        </p:txBody>
-      </p:sp>
-      <p:sp>
-        <p:nvSpPr>
-          <p:cNvPr id="42" name="Rectangle 41">
-            <a:extLst>
-              <a:ext uri="{FF2B5EF4-FFF2-40B4-BE49-F238E27FC236}">
-                <a16:creationId xmlns:a16="http://schemas.microsoft.com/office/drawing/2014/main" id="{9F2BA88F-041C-6D4F-A122-4A1BEE26DF71}"/>
-              </a:ext>
-            </a:extLst>
-          </p:cNvPr>
-          <p:cNvSpPr/>
-          <p:nvPr/>
-        </p:nvSpPr>
-        <p:spPr>
-          <a:xfrm>
-            <a:off x="3044878" y="9598057"/>
-            <a:ext cx="5165207" cy="1100583"/>
-          </a:xfrm>
-          <a:prstGeom prst="rect">
-            <a:avLst/>
-          </a:prstGeom>
-          <a:solidFill>
-            <a:schemeClr val="bg1">
-              <a:lumMod val="95000"/>
-              <a:alpha val="74000"/>
-            </a:schemeClr>
-          </a:solidFill>
-          <a:ln>
-            <a:solidFill>
-              <a:schemeClr val="accent3">
-                <a:lumMod val="60000"/>
-                <a:lumOff val="40000"/>
-              </a:schemeClr>
-            </a:solidFill>
-          </a:ln>
-        </p:spPr>
-        <p:style>
-          <a:lnRef idx="2">
-            <a:schemeClr val="accent1">
-              <a:shade val="50000"/>
-            </a:schemeClr>
-          </a:lnRef>
-          <a:fillRef idx="1">
-            <a:schemeClr val="accent1"/>
-          </a:fillRef>
-          <a:effectRef idx="0">
-            <a:schemeClr val="accent1"/>
-          </a:effectRef>
-          <a:fontRef idx="minor">
-            <a:schemeClr val="lt1"/>
-          </a:fontRef>
-        </p:style>
-        <p:txBody>
-          <a:bodyPr rot="0" spcFirstLastPara="0" vertOverflow="overflow" horzOverflow="overflow" vert="horz" wrap="square" lIns="91440" tIns="45720" rIns="91440" bIns="45720" numCol="1" spcCol="0" rtlCol="0" fromWordArt="0" anchor="t" anchorCtr="0" forceAA="0" compatLnSpc="1">
-            <a:prstTxWarp prst="textNoShape">
-              <a:avLst/>
-            </a:prstTxWarp>
-            <a:noAutofit/>
-          </a:bodyPr>
-          <a:lstStyle/>
-          <a:p>
-            <a:pPr algn="ctr"/>
-            <a:r>
-              <a:rPr lang="en-US" altLang="zh-CN" sz="1100" dirty="0">
-                <a:solidFill>
-                  <a:schemeClr val="tx1"/>
-                </a:solidFill>
-                <a:latin typeface="Arial" panose="020B0604020202020204" pitchFamily="34" charset="0"/>
-                <a:cs typeface="Arial" panose="020B0604020202020204" pitchFamily="34" charset="0"/>
-              </a:rPr>
-              <a:t>(One-time setup per z/OS environment) </a:t>
-            </a:r>
-            <a:endParaRPr lang="en-US" sz="1100" dirty="0">
-              <a:solidFill>
-                <a:schemeClr val="tx1"/>
-              </a:solidFill>
-              <a:latin typeface="Arial" panose="020B0604020202020204" pitchFamily="34" charset="0"/>
-              <a:cs typeface="Arial" panose="020B0604020202020204" pitchFamily="34" charset="0"/>
-            </a:endParaRPr>
-          </a:p>
-          <a:p>
-            <a:pPr algn="ctr"/>
-            <a:r>
-              <a:rPr lang="en-US" sz="1100" dirty="0">
-                <a:solidFill>
-                  <a:schemeClr val="tx1"/>
-                </a:solidFill>
-                <a:latin typeface="Arial" panose="020B0604020202020204" pitchFamily="34" charset="0"/>
-                <a:cs typeface="Arial" panose="020B0604020202020204" pitchFamily="34" charset="0"/>
-              </a:rPr>
-              <a:t>C</a:t>
-            </a:r>
-            <a:r>
-              <a:rPr lang="en-US" altLang="zh-CN" sz="1100" dirty="0">
-                <a:solidFill>
-                  <a:schemeClr val="tx1"/>
-                </a:solidFill>
-                <a:latin typeface="Arial" panose="020B0604020202020204" pitchFamily="34" charset="0"/>
-                <a:cs typeface="Arial" panose="020B0604020202020204" pitchFamily="34" charset="0"/>
-              </a:rPr>
-              <a:t>reate</a:t>
-            </a:r>
-            <a:r>
-              <a:rPr lang="zh-CN" altLang="en-US" sz="1100" dirty="0">
-                <a:solidFill>
-                  <a:schemeClr val="tx1"/>
-                </a:solidFill>
-                <a:latin typeface="Arial" panose="020B0604020202020204" pitchFamily="34" charset="0"/>
-                <a:cs typeface="Arial" panose="020B0604020202020204" pitchFamily="34" charset="0"/>
-              </a:rPr>
-              <a:t> </a:t>
-            </a:r>
-            <a:r>
-              <a:rPr lang="en-US" altLang="zh-CN" sz="1100" dirty="0">
-                <a:solidFill>
-                  <a:schemeClr val="tx1"/>
-                </a:solidFill>
-                <a:latin typeface="Arial" panose="020B0604020202020204" pitchFamily="34" charset="0"/>
-                <a:cs typeface="Arial" panose="020B0604020202020204" pitchFamily="34" charset="0"/>
-              </a:rPr>
-              <a:t>the</a:t>
-            </a:r>
-            <a:r>
-              <a:rPr lang="en-US" sz="1100" dirty="0">
-                <a:solidFill>
-                  <a:schemeClr val="tx1"/>
-                </a:solidFill>
-                <a:latin typeface="Arial" panose="020B0604020202020204" pitchFamily="34" charset="0"/>
-                <a:cs typeface="Arial" panose="020B0604020202020204" pitchFamily="34" charset="0"/>
-              </a:rPr>
-              <a:t> Zowe certificates </a:t>
-            </a:r>
-            <a:r>
-              <a:rPr lang="en-US" sz="1100" dirty="0" err="1">
-                <a:solidFill>
-                  <a:schemeClr val="tx1"/>
-                </a:solidFill>
-                <a:latin typeface="Arial" panose="020B0604020202020204" pitchFamily="34" charset="0"/>
-                <a:cs typeface="Arial" panose="020B0604020202020204" pitchFamily="34" charset="0"/>
-              </a:rPr>
-              <a:t>keystore</a:t>
-            </a:r>
-            <a:r>
-              <a:rPr lang="en-US" sz="1100" dirty="0">
-                <a:solidFill>
-                  <a:schemeClr val="tx1"/>
-                </a:solidFill>
-                <a:latin typeface="Arial" panose="020B0604020202020204" pitchFamily="34" charset="0"/>
-                <a:cs typeface="Arial" panose="020B0604020202020204" pitchFamily="34" charset="0"/>
-              </a:rPr>
-              <a:t> directory</a:t>
-            </a:r>
-            <a:r>
-              <a:rPr lang="zh-CN" altLang="en-US" sz="1100" dirty="0">
-                <a:solidFill>
-                  <a:schemeClr val="tx1"/>
-                </a:solidFill>
-                <a:latin typeface="Arial" panose="020B0604020202020204" pitchFamily="34" charset="0"/>
-                <a:cs typeface="Arial" panose="020B0604020202020204" pitchFamily="34" charset="0"/>
-              </a:rPr>
-              <a:t> </a:t>
-            </a:r>
-            <a:endParaRPr lang="en-US" altLang="zh-CN" sz="1100" dirty="0">
-              <a:solidFill>
-                <a:schemeClr val="tx1"/>
-              </a:solidFill>
-              <a:latin typeface="Arial" panose="020B0604020202020204" pitchFamily="34" charset="0"/>
-              <a:cs typeface="Arial" panose="020B0604020202020204" pitchFamily="34" charset="0"/>
-            </a:endParaRPr>
-          </a:p>
-        </p:txBody>
-      </p:sp>
-      <p:cxnSp>
-        <p:nvCxnSpPr>
-          <p:cNvPr id="43" name="Straight Arrow Connector 42">
-            <a:extLst>
-              <a:ext uri="{FF2B5EF4-FFF2-40B4-BE49-F238E27FC236}">
-                <a16:creationId xmlns:a16="http://schemas.microsoft.com/office/drawing/2014/main" id="{9529C900-E8E1-7B4B-810B-D57A3AEC3C3B}"/>
-              </a:ext>
-            </a:extLst>
-          </p:cNvPr>
-          <p:cNvCxnSpPr>
-            <a:cxnSpLocks/>
-          </p:cNvCxnSpPr>
-          <p:nvPr/>
-        </p:nvCxnSpPr>
-        <p:spPr>
-          <a:xfrm>
-            <a:off x="5640469" y="9257724"/>
-            <a:ext cx="0" cy="340330"/>
-          </a:xfrm>
-          <a:prstGeom prst="straightConnector1">
-            <a:avLst/>
-          </a:prstGeom>
-          <a:ln>
-            <a:solidFill>
-              <a:schemeClr val="tx1">
-                <a:lumMod val="50000"/>
-                <a:lumOff val="50000"/>
-              </a:schemeClr>
-            </a:solidFill>
-            <a:tailEnd type="triangle"/>
-          </a:ln>
-        </p:spPr>
-        <p:style>
-          <a:lnRef idx="1">
-            <a:schemeClr val="accent1"/>
-          </a:lnRef>
-          <a:fillRef idx="0">
-            <a:schemeClr val="accent1"/>
-          </a:fillRef>
-          <a:effectRef idx="0">
-            <a:schemeClr val="accent1"/>
-          </a:effectRef>
-          <a:fontRef idx="minor">
-            <a:schemeClr val="tx1"/>
-          </a:fontRef>
-        </p:style>
-      </p:cxnSp>
-      <p:sp>
-        <p:nvSpPr>
-          <p:cNvPr id="44" name="Rectangle 43">
-            <a:extLst>
-              <a:ext uri="{FF2B5EF4-FFF2-40B4-BE49-F238E27FC236}">
-                <a16:creationId xmlns:a16="http://schemas.microsoft.com/office/drawing/2014/main" id="{6AF4CDAB-F979-E143-9711-D9E6931E78F5}"/>
-              </a:ext>
-            </a:extLst>
-          </p:cNvPr>
-          <p:cNvSpPr/>
-          <p:nvPr/>
-        </p:nvSpPr>
-        <p:spPr>
-          <a:xfrm>
-            <a:off x="7987484" y="11164341"/>
-            <a:ext cx="1047242" cy="920904"/>
-          </a:xfrm>
-          <a:prstGeom prst="rect">
-            <a:avLst/>
-          </a:prstGeom>
-          <a:solidFill>
-            <a:schemeClr val="bg1">
-              <a:lumMod val="95000"/>
-              <a:alpha val="74000"/>
-            </a:schemeClr>
-          </a:solidFill>
-          <a:ln>
-            <a:solidFill>
-              <a:schemeClr val="accent3">
-                <a:lumMod val="60000"/>
-                <a:lumOff val="40000"/>
-              </a:schemeClr>
-            </a:solidFill>
-          </a:ln>
-        </p:spPr>
-        <p:style>
-          <a:lnRef idx="2">
-            <a:schemeClr val="accent1">
-              <a:shade val="50000"/>
-            </a:schemeClr>
-          </a:lnRef>
-          <a:fillRef idx="1">
-            <a:schemeClr val="accent1"/>
-          </a:fillRef>
-          <a:effectRef idx="0">
-            <a:schemeClr val="accent1"/>
-          </a:effectRef>
-          <a:fontRef idx="minor">
-            <a:schemeClr val="lt1"/>
-          </a:fontRef>
-        </p:style>
-        <p:txBody>
-          <a:bodyPr rot="0" spcFirstLastPara="0" vertOverflow="overflow" horzOverflow="overflow" vert="horz" wrap="square" lIns="91440" tIns="45720" rIns="91440" bIns="45720" numCol="1" spcCol="0" rtlCol="0" fromWordArt="0" anchor="ctr" anchorCtr="0" forceAA="0" compatLnSpc="1">
-            <a:prstTxWarp prst="textNoShape">
-              <a:avLst/>
-            </a:prstTxWarp>
-            <a:noAutofit/>
-          </a:bodyPr>
-          <a:lstStyle/>
-          <a:p>
-            <a:pPr algn="r"/>
-            <a:r>
-              <a:rPr lang="en-US" sz="1100" dirty="0">
-                <a:solidFill>
-                  <a:schemeClr val="tx1"/>
-                </a:solidFill>
-                <a:latin typeface="Arial" panose="020B0604020202020204" pitchFamily="34" charset="0"/>
-                <a:cs typeface="Arial" panose="020B0604020202020204" pitchFamily="34" charset="0"/>
-              </a:rPr>
-              <a:t>Instance</a:t>
-            </a:r>
-            <a:r>
-              <a:rPr lang="zh-CN" altLang="en-US" sz="1100" dirty="0">
-                <a:solidFill>
-                  <a:schemeClr val="tx1"/>
-                </a:solidFill>
-                <a:latin typeface="Arial" panose="020B0604020202020204" pitchFamily="34" charset="0"/>
-                <a:cs typeface="Arial" panose="020B0604020202020204" pitchFamily="34" charset="0"/>
-              </a:rPr>
-              <a:t> </a:t>
-            </a:r>
-            <a:r>
-              <a:rPr lang="en-US" altLang="zh-CN" sz="1100" dirty="0">
-                <a:solidFill>
-                  <a:schemeClr val="tx1"/>
-                </a:solidFill>
-                <a:latin typeface="Arial" panose="020B0604020202020204" pitchFamily="34" charset="0"/>
-                <a:cs typeface="Arial" panose="020B0604020202020204" pitchFamily="34" charset="0"/>
-              </a:rPr>
-              <a:t>directory</a:t>
-            </a:r>
-            <a:r>
-              <a:rPr lang="en-US" sz="1100" dirty="0">
-                <a:solidFill>
-                  <a:schemeClr val="tx1"/>
-                </a:solidFill>
-                <a:latin typeface="Arial" panose="020B0604020202020204" pitchFamily="34" charset="0"/>
-                <a:cs typeface="Arial" panose="020B0604020202020204" pitchFamily="34" charset="0"/>
-              </a:rPr>
-              <a:t> 2</a:t>
-            </a:r>
-          </a:p>
-        </p:txBody>
-      </p:sp>
-      <p:sp>
-        <p:nvSpPr>
-          <p:cNvPr id="41" name="Rectangle 40">
-            <a:extLst>
-              <a:ext uri="{FF2B5EF4-FFF2-40B4-BE49-F238E27FC236}">
-                <a16:creationId xmlns:a16="http://schemas.microsoft.com/office/drawing/2014/main" id="{D241ABC9-99D2-994E-B685-7D82041E280C}"/>
-              </a:ext>
-            </a:extLst>
-          </p:cNvPr>
-          <p:cNvSpPr/>
-          <p:nvPr/>
-        </p:nvSpPr>
-        <p:spPr>
-          <a:xfrm>
-            <a:off x="3031539" y="11037968"/>
-            <a:ext cx="5178545" cy="920905"/>
-          </a:xfrm>
-          <a:prstGeom prst="rect">
-            <a:avLst/>
-          </a:prstGeom>
-          <a:solidFill>
-            <a:schemeClr val="bg1">
-              <a:lumMod val="95000"/>
-              <a:alpha val="74000"/>
-            </a:schemeClr>
-          </a:solidFill>
-          <a:ln>
-            <a:solidFill>
-              <a:schemeClr val="accent3">
-                <a:lumMod val="60000"/>
-                <a:lumOff val="40000"/>
-              </a:schemeClr>
-            </a:solidFill>
-          </a:ln>
-        </p:spPr>
-        <p:style>
-          <a:lnRef idx="2">
-            <a:schemeClr val="accent1">
-              <a:shade val="50000"/>
-            </a:schemeClr>
-          </a:lnRef>
-          <a:fillRef idx="1">
-            <a:schemeClr val="accent1"/>
-          </a:fillRef>
-          <a:effectRef idx="0">
-            <a:schemeClr val="accent1"/>
-          </a:effectRef>
-          <a:fontRef idx="minor">
-            <a:schemeClr val="lt1"/>
-          </a:fontRef>
-        </p:style>
-        <p:txBody>
-          <a:bodyPr rot="0" spcFirstLastPara="0" vertOverflow="overflow" horzOverflow="overflow" vert="horz" wrap="square" lIns="91440" tIns="45720" rIns="91440" bIns="45720" numCol="1" spcCol="0" rtlCol="0" fromWordArt="0" anchor="t" anchorCtr="0" forceAA="0" compatLnSpc="1">
-            <a:prstTxWarp prst="textNoShape">
-              <a:avLst/>
-            </a:prstTxWarp>
-            <a:noAutofit/>
-          </a:bodyPr>
-          <a:lstStyle/>
-          <a:p>
-            <a:pPr algn="ctr"/>
-            <a:r>
-              <a:rPr lang="en-US" altLang="zh-CN" sz="1100" dirty="0">
-                <a:solidFill>
-                  <a:schemeClr val="tx1"/>
-                </a:solidFill>
-                <a:latin typeface="Arial" panose="020B0604020202020204" pitchFamily="34" charset="0"/>
-                <a:cs typeface="Arial" panose="020B0604020202020204" pitchFamily="34" charset="0"/>
-              </a:rPr>
-              <a:t>Create</a:t>
-            </a:r>
-            <a:r>
-              <a:rPr lang="zh-CN" altLang="en-US" sz="1100" dirty="0">
-                <a:solidFill>
-                  <a:schemeClr val="tx1"/>
-                </a:solidFill>
-                <a:latin typeface="Arial" panose="020B0604020202020204" pitchFamily="34" charset="0"/>
-                <a:cs typeface="Arial" panose="020B0604020202020204" pitchFamily="34" charset="0"/>
-              </a:rPr>
-              <a:t> </a:t>
-            </a:r>
-            <a:r>
-              <a:rPr lang="en-US" altLang="zh-CN" sz="1100" dirty="0">
-                <a:solidFill>
-                  <a:schemeClr val="tx1"/>
-                </a:solidFill>
-                <a:latin typeface="Arial" panose="020B0604020202020204" pitchFamily="34" charset="0"/>
-                <a:cs typeface="Arial" panose="020B0604020202020204" pitchFamily="34" charset="0"/>
-              </a:rPr>
-              <a:t>and</a:t>
-            </a:r>
-            <a:r>
-              <a:rPr lang="zh-CN" altLang="en-US" sz="1100" dirty="0">
-                <a:solidFill>
-                  <a:schemeClr val="tx1"/>
-                </a:solidFill>
-                <a:latin typeface="Arial" panose="020B0604020202020204" pitchFamily="34" charset="0"/>
-                <a:cs typeface="Arial" panose="020B0604020202020204" pitchFamily="34" charset="0"/>
-              </a:rPr>
-              <a:t> </a:t>
-            </a:r>
-            <a:r>
-              <a:rPr lang="en-US" altLang="zh-CN" sz="1100" dirty="0">
-                <a:solidFill>
-                  <a:schemeClr val="tx1"/>
-                </a:solidFill>
-                <a:latin typeface="Arial" panose="020B0604020202020204" pitchFamily="34" charset="0"/>
-                <a:cs typeface="Arial" panose="020B0604020202020204" pitchFamily="34" charset="0"/>
-              </a:rPr>
-              <a:t>c</a:t>
-            </a:r>
-            <a:r>
-              <a:rPr lang="en-US" sz="1100" dirty="0">
-                <a:solidFill>
-                  <a:schemeClr val="tx1"/>
-                </a:solidFill>
-                <a:latin typeface="Arial" panose="020B0604020202020204" pitchFamily="34" charset="0"/>
-                <a:cs typeface="Arial" panose="020B0604020202020204" pitchFamily="34" charset="0"/>
-              </a:rPr>
-              <a:t>onfigure the Zowe instance directory</a:t>
-            </a:r>
-            <a:endParaRPr lang="en-US" altLang="zh-CN" sz="1100" dirty="0">
-              <a:solidFill>
-                <a:schemeClr val="tx1"/>
-              </a:solidFill>
-              <a:latin typeface="Arial" panose="020B0604020202020204" pitchFamily="34" charset="0"/>
-              <a:cs typeface="Arial" panose="020B0604020202020204" pitchFamily="34" charset="0"/>
-            </a:endParaRPr>
-          </a:p>
-        </p:txBody>
-      </p:sp>
-      <p:sp>
-        <p:nvSpPr>
-          <p:cNvPr id="46" name="Rectangle 45">
-            <a:extLst>
-              <a:ext uri="{FF2B5EF4-FFF2-40B4-BE49-F238E27FC236}">
-                <a16:creationId xmlns:a16="http://schemas.microsoft.com/office/drawing/2014/main" id="{1A5DCA99-4FB0-8E44-9832-2707E19F2A44}"/>
-              </a:ext>
-            </a:extLst>
-          </p:cNvPr>
-          <p:cNvSpPr/>
-          <p:nvPr/>
-        </p:nvSpPr>
-        <p:spPr>
-          <a:xfrm>
-            <a:off x="3044878" y="13373690"/>
-            <a:ext cx="5158421" cy="558971"/>
-          </a:xfrm>
-          <a:prstGeom prst="rect">
-            <a:avLst/>
-          </a:prstGeom>
-          <a:solidFill>
-            <a:schemeClr val="bg1">
-              <a:lumMod val="95000"/>
-              <a:alpha val="74000"/>
-            </a:schemeClr>
-          </a:solidFill>
-          <a:ln>
-            <a:solidFill>
-              <a:schemeClr val="accent3">
-                <a:lumMod val="60000"/>
-                <a:lumOff val="40000"/>
-              </a:schemeClr>
-            </a:solidFill>
-          </a:ln>
-        </p:spPr>
-        <p:style>
-          <a:lnRef idx="2">
-            <a:schemeClr val="accent1">
-              <a:shade val="50000"/>
-            </a:schemeClr>
-          </a:lnRef>
-          <a:fillRef idx="1">
-            <a:schemeClr val="accent1"/>
-          </a:fillRef>
-          <a:effectRef idx="0">
-            <a:schemeClr val="accent1"/>
-          </a:effectRef>
-          <a:fontRef idx="minor">
-            <a:schemeClr val="lt1"/>
-          </a:fontRef>
-        </p:style>
-        <p:txBody>
-          <a:bodyPr rot="0" spcFirstLastPara="0" vertOverflow="overflow" horzOverflow="overflow" vert="horz" wrap="square" lIns="91440" tIns="45720" rIns="91440" bIns="45720" numCol="1" spcCol="0" rtlCol="0" fromWordArt="0" anchor="ctr" anchorCtr="0" forceAA="0" compatLnSpc="1">
-            <a:prstTxWarp prst="textNoShape">
-              <a:avLst/>
-            </a:prstTxWarp>
-            <a:noAutofit/>
-          </a:bodyPr>
-          <a:lstStyle/>
-          <a:p>
-            <a:pPr algn="ctr"/>
-            <a:r>
-              <a:rPr lang="en-US" altLang="zh-CN" sz="1100" dirty="0">
-                <a:solidFill>
-                  <a:schemeClr val="tx1"/>
-                </a:solidFill>
-                <a:latin typeface="Arial" panose="020B0604020202020204" pitchFamily="34" charset="0"/>
-                <a:cs typeface="Arial" panose="020B0604020202020204" pitchFamily="34" charset="0"/>
-              </a:rPr>
-              <a:t>Install</a:t>
-            </a:r>
-            <a:r>
-              <a:rPr lang="zh-CN" altLang="en-US" sz="1100" dirty="0">
-                <a:solidFill>
-                  <a:schemeClr val="tx1"/>
-                </a:solidFill>
-                <a:latin typeface="Arial" panose="020B0604020202020204" pitchFamily="34" charset="0"/>
-                <a:cs typeface="Arial" panose="020B0604020202020204" pitchFamily="34" charset="0"/>
-              </a:rPr>
-              <a:t> </a:t>
-            </a:r>
-            <a:r>
-              <a:rPr lang="en-US" altLang="zh-CN" sz="1100" dirty="0">
-                <a:solidFill>
-                  <a:schemeClr val="tx1"/>
-                </a:solidFill>
-                <a:latin typeface="Arial" panose="020B0604020202020204" pitchFamily="34" charset="0"/>
-                <a:cs typeface="Arial" panose="020B0604020202020204" pitchFamily="34" charset="0"/>
-              </a:rPr>
-              <a:t>the</a:t>
-            </a:r>
-            <a:r>
-              <a:rPr lang="zh-CN" altLang="en-US" sz="1100" dirty="0">
-                <a:solidFill>
-                  <a:schemeClr val="tx1"/>
-                </a:solidFill>
-                <a:latin typeface="Arial" panose="020B0604020202020204" pitchFamily="34" charset="0"/>
-                <a:cs typeface="Arial" panose="020B0604020202020204" pitchFamily="34" charset="0"/>
-              </a:rPr>
-              <a:t> </a:t>
-            </a:r>
-            <a:r>
-              <a:rPr lang="en-US" altLang="zh-CN" sz="1100" dirty="0" err="1">
-                <a:solidFill>
-                  <a:schemeClr val="tx1"/>
-                </a:solidFill>
-                <a:latin typeface="Arial" panose="020B0604020202020204" pitchFamily="34" charset="0"/>
-                <a:cs typeface="Arial" panose="020B0604020202020204" pitchFamily="34" charset="0"/>
-              </a:rPr>
-              <a:t>Zowe</a:t>
-            </a:r>
-            <a:r>
-              <a:rPr lang="zh-CN" altLang="en-US" sz="1100" dirty="0">
-                <a:solidFill>
-                  <a:schemeClr val="tx1"/>
-                </a:solidFill>
-                <a:latin typeface="Arial" panose="020B0604020202020204" pitchFamily="34" charset="0"/>
-                <a:cs typeface="Arial" panose="020B0604020202020204" pitchFamily="34" charset="0"/>
-              </a:rPr>
-              <a:t> </a:t>
-            </a:r>
-            <a:r>
-              <a:rPr lang="en-US" altLang="zh-CN" sz="1100" dirty="0">
-                <a:solidFill>
-                  <a:schemeClr val="tx1"/>
-                </a:solidFill>
-                <a:latin typeface="Arial" panose="020B0604020202020204" pitchFamily="34" charset="0"/>
-                <a:cs typeface="Arial" panose="020B0604020202020204" pitchFamily="34" charset="0"/>
-              </a:rPr>
-              <a:t>started</a:t>
-            </a:r>
-            <a:r>
-              <a:rPr lang="zh-CN" altLang="en-US" sz="1100" dirty="0">
-                <a:solidFill>
-                  <a:schemeClr val="tx1"/>
-                </a:solidFill>
-                <a:latin typeface="Arial" panose="020B0604020202020204" pitchFamily="34" charset="0"/>
-                <a:cs typeface="Arial" panose="020B0604020202020204" pitchFamily="34" charset="0"/>
-              </a:rPr>
-              <a:t> </a:t>
-            </a:r>
-            <a:r>
-              <a:rPr lang="en-US" altLang="zh-CN" sz="1100" dirty="0">
-                <a:solidFill>
-                  <a:schemeClr val="tx1"/>
-                </a:solidFill>
-                <a:latin typeface="Arial" panose="020B0604020202020204" pitchFamily="34" charset="0"/>
-                <a:cs typeface="Arial" panose="020B0604020202020204" pitchFamily="34" charset="0"/>
-              </a:rPr>
-              <a:t>task (ZWESVSTC)</a:t>
-            </a:r>
-          </a:p>
-          <a:p>
-            <a:pPr algn="ctr"/>
-            <a:r>
-              <a:rPr lang="en-US" altLang="zh-CN" sz="1100" dirty="0">
-                <a:solidFill>
-                  <a:srgbClr val="0070C0"/>
-                </a:solidFill>
-                <a:latin typeface="Arial" panose="020B0604020202020204" pitchFamily="34" charset="0"/>
-                <a:cs typeface="Arial" panose="020B0604020202020204" pitchFamily="34" charset="0"/>
-              </a:rPr>
-              <a:t>(Script:</a:t>
-            </a:r>
-            <a:r>
-              <a:rPr lang="zh-CN" altLang="en-US" sz="1100" dirty="0">
-                <a:solidFill>
-                  <a:srgbClr val="0070C0"/>
-                </a:solidFill>
-                <a:latin typeface="Arial" panose="020B0604020202020204" pitchFamily="34" charset="0"/>
-                <a:cs typeface="Arial" panose="020B0604020202020204" pitchFamily="34" charset="0"/>
-              </a:rPr>
-              <a:t> </a:t>
-            </a:r>
-            <a:r>
-              <a:rPr lang="en-US" altLang="zh-CN" sz="1100" dirty="0" err="1">
-                <a:solidFill>
-                  <a:srgbClr val="0070C0"/>
-                </a:solidFill>
-                <a:latin typeface="Arial" panose="020B0604020202020204" pitchFamily="34" charset="0"/>
-                <a:cs typeface="Arial" panose="020B0604020202020204" pitchFamily="34" charset="0"/>
-              </a:rPr>
-              <a:t>zowe</a:t>
-            </a:r>
-            <a:r>
-              <a:rPr lang="en-US" altLang="zh-CN" sz="1100" dirty="0">
-                <a:solidFill>
-                  <a:srgbClr val="0070C0"/>
-                </a:solidFill>
-                <a:latin typeface="Arial" panose="020B0604020202020204" pitchFamily="34" charset="0"/>
-                <a:cs typeface="Arial" panose="020B0604020202020204" pitchFamily="34" charset="0"/>
-              </a:rPr>
-              <a:t>-install-</a:t>
-            </a:r>
-            <a:r>
-              <a:rPr lang="en-US" altLang="zh-CN" sz="1100" dirty="0" err="1">
-                <a:solidFill>
-                  <a:srgbClr val="0070C0"/>
-                </a:solidFill>
-                <a:latin typeface="Arial" panose="020B0604020202020204" pitchFamily="34" charset="0"/>
-                <a:cs typeface="Arial" panose="020B0604020202020204" pitchFamily="34" charset="0"/>
-              </a:rPr>
-              <a:t>proc.sh</a:t>
-            </a:r>
-            <a:r>
-              <a:rPr lang="en-US" altLang="zh-CN" sz="1100" dirty="0">
-                <a:solidFill>
-                  <a:srgbClr val="0070C0"/>
-                </a:solidFill>
-                <a:latin typeface="Arial" panose="020B0604020202020204" pitchFamily="34" charset="0"/>
-                <a:cs typeface="Arial" panose="020B0604020202020204" pitchFamily="34" charset="0"/>
-              </a:rPr>
-              <a:t>)</a:t>
-            </a:r>
-          </a:p>
-        </p:txBody>
-      </p:sp>
-      <p:sp>
-        <p:nvSpPr>
-          <p:cNvPr id="49" name="Rectangle 48">
-            <a:extLst>
-              <a:ext uri="{FF2B5EF4-FFF2-40B4-BE49-F238E27FC236}">
-                <a16:creationId xmlns:a16="http://schemas.microsoft.com/office/drawing/2014/main" id="{6D3E3949-016F-F944-9F12-918975BD5D7A}"/>
-              </a:ext>
-            </a:extLst>
-          </p:cNvPr>
-          <p:cNvSpPr/>
-          <p:nvPr/>
-        </p:nvSpPr>
-        <p:spPr>
-          <a:xfrm>
-            <a:off x="3038085" y="12366001"/>
-            <a:ext cx="5171999" cy="641821"/>
-          </a:xfrm>
-          <a:prstGeom prst="rect">
-            <a:avLst/>
-          </a:prstGeom>
-          <a:solidFill>
-            <a:schemeClr val="bg1">
-              <a:lumMod val="95000"/>
-              <a:alpha val="74000"/>
-            </a:schemeClr>
-          </a:solidFill>
-          <a:ln>
-            <a:solidFill>
-              <a:schemeClr val="accent3">
-                <a:lumMod val="60000"/>
-                <a:lumOff val="40000"/>
-              </a:schemeClr>
-            </a:solidFill>
-          </a:ln>
-        </p:spPr>
-        <p:style>
-          <a:lnRef idx="2">
-            <a:schemeClr val="accent1">
-              <a:shade val="50000"/>
-            </a:schemeClr>
-          </a:lnRef>
-          <a:fillRef idx="1">
-            <a:schemeClr val="accent1"/>
-          </a:fillRef>
-          <a:effectRef idx="0">
-            <a:schemeClr val="accent1"/>
-          </a:effectRef>
-          <a:fontRef idx="minor">
-            <a:schemeClr val="lt1"/>
-          </a:fontRef>
-        </p:style>
-        <p:txBody>
-          <a:bodyPr rot="0" spcFirstLastPara="0" vertOverflow="overflow" horzOverflow="overflow" vert="horz" wrap="square" lIns="91440" tIns="45720" rIns="91440" bIns="45720" numCol="1" spcCol="0" rtlCol="0" fromWordArt="0" anchor="ctr" anchorCtr="0" forceAA="0" compatLnSpc="1">
-            <a:prstTxWarp prst="textNoShape">
-              <a:avLst/>
-            </a:prstTxWarp>
-            <a:noAutofit/>
-          </a:bodyPr>
-          <a:lstStyle/>
-          <a:p>
-            <a:pPr algn="ctr"/>
-            <a:r>
-              <a:rPr lang="en-US" altLang="zh-CN" sz="1100" dirty="0">
-                <a:solidFill>
-                  <a:schemeClr val="tx1"/>
-                </a:solidFill>
-                <a:latin typeface="Arial" panose="020B0604020202020204" pitchFamily="34" charset="0"/>
-                <a:cs typeface="Arial" panose="020B0604020202020204" pitchFamily="34" charset="0"/>
-              </a:rPr>
-              <a:t>(Required for </a:t>
-            </a:r>
-            <a:r>
-              <a:rPr lang="en-US" altLang="zh-CN" sz="1100" dirty="0" err="1">
-                <a:solidFill>
-                  <a:schemeClr val="tx1"/>
-                </a:solidFill>
-                <a:latin typeface="Arial" panose="020B0604020202020204" pitchFamily="34" charset="0"/>
-                <a:cs typeface="Arial" panose="020B0604020202020204" pitchFamily="34" charset="0"/>
-              </a:rPr>
-              <a:t>Zowe</a:t>
-            </a:r>
-            <a:r>
-              <a:rPr lang="en-US" altLang="zh-CN" sz="1100" dirty="0">
-                <a:solidFill>
-                  <a:schemeClr val="tx1"/>
-                </a:solidFill>
-                <a:latin typeface="Arial" panose="020B0604020202020204" pitchFamily="34" charset="0"/>
-                <a:cs typeface="Arial" panose="020B0604020202020204" pitchFamily="34" charset="0"/>
-              </a:rPr>
-              <a:t> Desktop) </a:t>
-            </a:r>
-          </a:p>
-          <a:p>
-            <a:pPr algn="ctr"/>
-            <a:r>
-              <a:rPr lang="en-US" altLang="zh-CN" sz="1100" dirty="0">
-                <a:solidFill>
-                  <a:schemeClr val="tx1"/>
-                </a:solidFill>
-                <a:latin typeface="Arial" panose="020B0604020202020204" pitchFamily="34" charset="0"/>
-                <a:cs typeface="Arial" panose="020B0604020202020204" pitchFamily="34" charset="0"/>
-              </a:rPr>
-              <a:t>Install</a:t>
-            </a:r>
-            <a:r>
-              <a:rPr lang="zh-CN" altLang="en-US" sz="1100" dirty="0">
-                <a:solidFill>
-                  <a:schemeClr val="tx1"/>
-                </a:solidFill>
-                <a:latin typeface="Arial" panose="020B0604020202020204" pitchFamily="34" charset="0"/>
-                <a:cs typeface="Arial" panose="020B0604020202020204" pitchFamily="34" charset="0"/>
-              </a:rPr>
-              <a:t> </a:t>
-            </a:r>
-            <a:r>
-              <a:rPr lang="en-US" altLang="zh-CN" sz="1100" dirty="0">
-                <a:solidFill>
-                  <a:schemeClr val="tx1"/>
-                </a:solidFill>
-                <a:latin typeface="Arial" panose="020B0604020202020204" pitchFamily="34" charset="0"/>
-                <a:cs typeface="Arial" panose="020B0604020202020204" pitchFamily="34" charset="0"/>
-              </a:rPr>
-              <a:t>and</a:t>
-            </a:r>
-            <a:r>
-              <a:rPr lang="zh-CN" altLang="en-US" sz="1100" dirty="0">
-                <a:solidFill>
-                  <a:schemeClr val="tx1"/>
-                </a:solidFill>
-                <a:latin typeface="Arial" panose="020B0604020202020204" pitchFamily="34" charset="0"/>
-                <a:cs typeface="Arial" panose="020B0604020202020204" pitchFamily="34" charset="0"/>
-              </a:rPr>
-              <a:t> </a:t>
-            </a:r>
-            <a:r>
-              <a:rPr lang="en-US" altLang="zh-CN" sz="1100" dirty="0">
-                <a:solidFill>
-                  <a:schemeClr val="tx1"/>
-                </a:solidFill>
-                <a:latin typeface="Arial" panose="020B0604020202020204" pitchFamily="34" charset="0"/>
-                <a:cs typeface="Arial" panose="020B0604020202020204" pitchFamily="34" charset="0"/>
-              </a:rPr>
-              <a:t>configure</a:t>
-            </a:r>
-            <a:r>
-              <a:rPr lang="zh-CN" altLang="en-US" sz="1100" dirty="0">
-                <a:solidFill>
-                  <a:schemeClr val="tx1"/>
-                </a:solidFill>
-                <a:latin typeface="Arial" panose="020B0604020202020204" pitchFamily="34" charset="0"/>
-                <a:cs typeface="Arial" panose="020B0604020202020204" pitchFamily="34" charset="0"/>
-              </a:rPr>
-              <a:t> </a:t>
-            </a:r>
-            <a:r>
-              <a:rPr lang="en-US" altLang="zh-CN" sz="1100" dirty="0">
-                <a:solidFill>
-                  <a:schemeClr val="tx1"/>
-                </a:solidFill>
-                <a:latin typeface="Arial" panose="020B0604020202020204" pitchFamily="34" charset="0"/>
-                <a:cs typeface="Arial" panose="020B0604020202020204" pitchFamily="34" charset="0"/>
-              </a:rPr>
-              <a:t>the</a:t>
-            </a:r>
-            <a:r>
-              <a:rPr lang="zh-CN" altLang="en-US" sz="1100" dirty="0">
-                <a:solidFill>
-                  <a:schemeClr val="tx1"/>
-                </a:solidFill>
-                <a:latin typeface="Arial" panose="020B0604020202020204" pitchFamily="34" charset="0"/>
-                <a:cs typeface="Arial" panose="020B0604020202020204" pitchFamily="34" charset="0"/>
-              </a:rPr>
-              <a:t> </a:t>
-            </a:r>
-            <a:r>
-              <a:rPr lang="en-US" altLang="zh-CN" sz="1100" dirty="0" err="1">
-                <a:solidFill>
-                  <a:schemeClr val="tx1"/>
-                </a:solidFill>
-                <a:latin typeface="Arial" panose="020B0604020202020204" pitchFamily="34" charset="0"/>
-                <a:cs typeface="Arial" panose="020B0604020202020204" pitchFamily="34" charset="0"/>
-              </a:rPr>
-              <a:t>Zowe</a:t>
-            </a:r>
-            <a:r>
-              <a:rPr lang="zh-CN" altLang="en-US" sz="1100" dirty="0">
-                <a:solidFill>
-                  <a:schemeClr val="tx1"/>
-                </a:solidFill>
-                <a:latin typeface="Arial" panose="020B0604020202020204" pitchFamily="34" charset="0"/>
-                <a:cs typeface="Arial" panose="020B0604020202020204" pitchFamily="34" charset="0"/>
-              </a:rPr>
-              <a:t> </a:t>
-            </a:r>
-            <a:r>
-              <a:rPr lang="en-US" altLang="zh-CN" sz="1100" dirty="0">
-                <a:solidFill>
-                  <a:schemeClr val="tx1"/>
-                </a:solidFill>
-                <a:latin typeface="Arial" panose="020B0604020202020204" pitchFamily="34" charset="0"/>
-                <a:cs typeface="Arial" panose="020B0604020202020204" pitchFamily="34" charset="0"/>
-              </a:rPr>
-              <a:t>cross</a:t>
-            </a:r>
-            <a:r>
-              <a:rPr lang="zh-CN" altLang="en-US" sz="1100" dirty="0">
-                <a:solidFill>
-                  <a:schemeClr val="tx1"/>
-                </a:solidFill>
-                <a:latin typeface="Arial" panose="020B0604020202020204" pitchFamily="34" charset="0"/>
-                <a:cs typeface="Arial" panose="020B0604020202020204" pitchFamily="34" charset="0"/>
-              </a:rPr>
-              <a:t> </a:t>
-            </a:r>
-            <a:r>
-              <a:rPr lang="en-US" altLang="zh-CN" sz="1100" dirty="0">
-                <a:solidFill>
-                  <a:schemeClr val="tx1"/>
-                </a:solidFill>
-                <a:latin typeface="Arial" panose="020B0604020202020204" pitchFamily="34" charset="0"/>
-                <a:cs typeface="Arial" panose="020B0604020202020204" pitchFamily="34" charset="0"/>
-              </a:rPr>
-              <a:t>memory</a:t>
-            </a:r>
-            <a:r>
-              <a:rPr lang="zh-CN" altLang="en-US" sz="1100" dirty="0">
-                <a:solidFill>
-                  <a:schemeClr val="tx1"/>
-                </a:solidFill>
-                <a:latin typeface="Arial" panose="020B0604020202020204" pitchFamily="34" charset="0"/>
-                <a:cs typeface="Arial" panose="020B0604020202020204" pitchFamily="34" charset="0"/>
-              </a:rPr>
-              <a:t> </a:t>
-            </a:r>
-            <a:r>
-              <a:rPr lang="en-US" altLang="zh-CN" sz="1100" dirty="0">
-                <a:solidFill>
-                  <a:schemeClr val="tx1"/>
-                </a:solidFill>
-                <a:latin typeface="Arial" panose="020B0604020202020204" pitchFamily="34" charset="0"/>
-                <a:cs typeface="Arial" panose="020B0604020202020204" pitchFamily="34" charset="0"/>
-              </a:rPr>
-              <a:t>server (ZWESISTC)</a:t>
-            </a:r>
-          </a:p>
-          <a:p>
-            <a:pPr algn="ctr"/>
-            <a:r>
-              <a:rPr lang="en-US" altLang="zh-CN" sz="1100" dirty="0">
-                <a:solidFill>
-                  <a:srgbClr val="0070C0"/>
-                </a:solidFill>
-                <a:latin typeface="Arial" panose="020B0604020202020204" pitchFamily="34" charset="0"/>
-                <a:cs typeface="Arial" panose="020B0604020202020204" pitchFamily="34" charset="0"/>
-              </a:rPr>
-              <a:t>(Script: </a:t>
-            </a:r>
-            <a:r>
-              <a:rPr lang="en-US" sz="1100" dirty="0" err="1">
-                <a:solidFill>
-                  <a:srgbClr val="0070C0"/>
-                </a:solidFill>
-                <a:latin typeface="Arial" panose="020B0604020202020204" pitchFamily="34" charset="0"/>
-                <a:cs typeface="Arial" panose="020B0604020202020204" pitchFamily="34" charset="0"/>
-              </a:rPr>
-              <a:t>zowe</a:t>
-            </a:r>
-            <a:r>
-              <a:rPr lang="en-US" sz="1100" dirty="0">
-                <a:solidFill>
-                  <a:srgbClr val="0070C0"/>
-                </a:solidFill>
-                <a:latin typeface="Arial" panose="020B0604020202020204" pitchFamily="34" charset="0"/>
-                <a:cs typeface="Arial" panose="020B0604020202020204" pitchFamily="34" charset="0"/>
-              </a:rPr>
-              <a:t>-</a:t>
-            </a:r>
-            <a:r>
-              <a:rPr lang="en-US" altLang="zh-CN" sz="1100" dirty="0">
-                <a:solidFill>
-                  <a:srgbClr val="0070C0"/>
-                </a:solidFill>
-                <a:latin typeface="Arial" panose="020B0604020202020204" pitchFamily="34" charset="0"/>
-                <a:cs typeface="Arial" panose="020B0604020202020204" pitchFamily="34" charset="0"/>
-              </a:rPr>
-              <a:t>install-</a:t>
-            </a:r>
-            <a:r>
-              <a:rPr lang="en-US" altLang="zh-CN" sz="1100" dirty="0" err="1">
-                <a:solidFill>
-                  <a:srgbClr val="0070C0"/>
-                </a:solidFill>
-                <a:latin typeface="Arial" panose="020B0604020202020204" pitchFamily="34" charset="0"/>
-                <a:cs typeface="Arial" panose="020B0604020202020204" pitchFamily="34" charset="0"/>
-              </a:rPr>
-              <a:t>xmem</a:t>
-            </a:r>
-            <a:r>
-              <a:rPr lang="en-US" sz="1100" dirty="0" err="1">
-                <a:solidFill>
-                  <a:srgbClr val="0070C0"/>
-                </a:solidFill>
-                <a:latin typeface="Arial" panose="020B0604020202020204" pitchFamily="34" charset="0"/>
-                <a:cs typeface="Arial" panose="020B0604020202020204" pitchFamily="34" charset="0"/>
-              </a:rPr>
-              <a:t>.s</a:t>
-            </a:r>
-            <a:r>
-              <a:rPr lang="en-US" altLang="zh-CN" sz="1100" dirty="0" err="1">
-                <a:solidFill>
-                  <a:srgbClr val="0070C0"/>
-                </a:solidFill>
-                <a:latin typeface="Arial" panose="020B0604020202020204" pitchFamily="34" charset="0"/>
-                <a:cs typeface="Arial" panose="020B0604020202020204" pitchFamily="34" charset="0"/>
-              </a:rPr>
-              <a:t>h</a:t>
-            </a:r>
-            <a:r>
-              <a:rPr lang="en-US" altLang="zh-CN" sz="1100" dirty="0">
-                <a:solidFill>
-                  <a:srgbClr val="0070C0"/>
-                </a:solidFill>
-                <a:latin typeface="Arial" panose="020B0604020202020204" pitchFamily="34" charset="0"/>
-                <a:cs typeface="Arial" panose="020B0604020202020204" pitchFamily="34" charset="0"/>
-              </a:rPr>
-              <a:t>)</a:t>
-            </a:r>
-            <a:endParaRPr lang="en-US" sz="1100" dirty="0">
-              <a:solidFill>
-                <a:srgbClr val="0070C0"/>
-              </a:solidFill>
-              <a:latin typeface="Arial" panose="020B0604020202020204" pitchFamily="34" charset="0"/>
-              <a:cs typeface="Arial" panose="020B0604020202020204" pitchFamily="34" charset="0"/>
-            </a:endParaRPr>
-          </a:p>
-        </p:txBody>
-      </p:sp>
-      <p:cxnSp>
-        <p:nvCxnSpPr>
-          <p:cNvPr id="52" name="Straight Connector 51">
-            <a:extLst>
-              <a:ext uri="{FF2B5EF4-FFF2-40B4-BE49-F238E27FC236}">
-                <a16:creationId xmlns:a16="http://schemas.microsoft.com/office/drawing/2014/main" id="{F38E6DB5-35D5-7E45-8F84-A2E9A141F584}"/>
-              </a:ext>
-            </a:extLst>
-          </p:cNvPr>
-          <p:cNvCxnSpPr>
-            <a:cxnSpLocks/>
-          </p:cNvCxnSpPr>
-          <p:nvPr/>
-        </p:nvCxnSpPr>
-        <p:spPr>
-          <a:xfrm>
-            <a:off x="1163866" y="7748458"/>
-            <a:ext cx="8072213" cy="0"/>
-          </a:xfrm>
-          <a:prstGeom prst="line">
-            <a:avLst/>
-          </a:prstGeom>
-          <a:ln>
-            <a:solidFill>
-              <a:schemeClr val="bg1">
-                <a:lumMod val="50000"/>
-              </a:schemeClr>
-            </a:solidFill>
-            <a:prstDash val="dash"/>
-          </a:ln>
-        </p:spPr>
-        <p:style>
-          <a:lnRef idx="1">
-            <a:schemeClr val="accent1"/>
-          </a:lnRef>
-          <a:fillRef idx="0">
-            <a:schemeClr val="accent1"/>
-          </a:fillRef>
-          <a:effectRef idx="0">
-            <a:schemeClr val="accent1"/>
-          </a:effectRef>
-          <a:fontRef idx="minor">
-            <a:schemeClr val="tx1"/>
-          </a:fontRef>
-        </p:style>
-      </p:cxnSp>
-      <p:cxnSp>
-        <p:nvCxnSpPr>
-          <p:cNvPr id="54" name="Straight Connector 53">
-            <a:extLst>
-              <a:ext uri="{FF2B5EF4-FFF2-40B4-BE49-F238E27FC236}">
-                <a16:creationId xmlns:a16="http://schemas.microsoft.com/office/drawing/2014/main" id="{2F86BB3D-0E87-2746-97D0-656CDDDD3895}"/>
-              </a:ext>
-            </a:extLst>
-          </p:cNvPr>
-          <p:cNvCxnSpPr>
-            <a:cxnSpLocks/>
-          </p:cNvCxnSpPr>
-          <p:nvPr/>
-        </p:nvCxnSpPr>
-        <p:spPr>
-          <a:xfrm>
-            <a:off x="1163863" y="2464922"/>
-            <a:ext cx="7982472" cy="0"/>
-          </a:xfrm>
-          <a:prstGeom prst="line">
-            <a:avLst/>
-          </a:prstGeom>
-          <a:ln>
-            <a:solidFill>
-              <a:schemeClr val="bg2">
-                <a:lumMod val="75000"/>
-              </a:schemeClr>
-            </a:solidFill>
-            <a:prstDash val="dash"/>
-          </a:ln>
-        </p:spPr>
-        <p:style>
-          <a:lnRef idx="1">
-            <a:schemeClr val="accent1"/>
-          </a:lnRef>
-          <a:fillRef idx="0">
-            <a:schemeClr val="accent1"/>
-          </a:fillRef>
-          <a:effectRef idx="0">
-            <a:schemeClr val="accent1"/>
-          </a:effectRef>
-          <a:fontRef idx="minor">
-            <a:schemeClr val="tx1"/>
-          </a:fontRef>
-        </p:style>
-      </p:cxnSp>
-      <p:cxnSp>
-        <p:nvCxnSpPr>
-          <p:cNvPr id="57" name="Straight Arrow Connector 56">
-            <a:extLst>
-              <a:ext uri="{FF2B5EF4-FFF2-40B4-BE49-F238E27FC236}">
-                <a16:creationId xmlns:a16="http://schemas.microsoft.com/office/drawing/2014/main" id="{AF3BD089-6A01-564F-AB0E-68487DCA5FF5}"/>
-              </a:ext>
-            </a:extLst>
-          </p:cNvPr>
-          <p:cNvCxnSpPr>
-            <a:cxnSpLocks/>
-          </p:cNvCxnSpPr>
-          <p:nvPr/>
-        </p:nvCxnSpPr>
-        <p:spPr>
-          <a:xfrm>
-            <a:off x="4921570" y="2782132"/>
-            <a:ext cx="0" cy="258831"/>
-          </a:xfrm>
-          <a:prstGeom prst="straightConnector1">
-            <a:avLst/>
-          </a:prstGeom>
-          <a:ln>
-            <a:solidFill>
-              <a:schemeClr val="tx1">
-                <a:lumMod val="50000"/>
-                <a:lumOff val="50000"/>
-              </a:schemeClr>
-            </a:solidFill>
-            <a:tailEnd type="triangle"/>
-          </a:ln>
-        </p:spPr>
-        <p:style>
-          <a:lnRef idx="1">
-            <a:schemeClr val="accent1"/>
-          </a:lnRef>
-          <a:fillRef idx="0">
-            <a:schemeClr val="accent1"/>
-          </a:fillRef>
-          <a:effectRef idx="0">
-            <a:schemeClr val="accent1"/>
-          </a:effectRef>
-          <a:fontRef idx="minor">
-            <a:schemeClr val="tx1"/>
-          </a:fontRef>
-        </p:style>
-      </p:cxnSp>
-      <p:sp>
-        <p:nvSpPr>
-          <p:cNvPr id="58" name="Rectangle 57">
-            <a:extLst>
-              <a:ext uri="{FF2B5EF4-FFF2-40B4-BE49-F238E27FC236}">
-                <a16:creationId xmlns:a16="http://schemas.microsoft.com/office/drawing/2014/main" id="{89267795-49D3-F34D-BB43-8018848C3BBA}"/>
-              </a:ext>
-            </a:extLst>
-          </p:cNvPr>
-          <p:cNvSpPr/>
-          <p:nvPr/>
-        </p:nvSpPr>
-        <p:spPr>
-          <a:xfrm>
-            <a:off x="4002258" y="1609008"/>
-            <a:ext cx="1958008" cy="558971"/>
-          </a:xfrm>
-          <a:prstGeom prst="rect">
-            <a:avLst/>
-          </a:prstGeom>
-          <a:solidFill>
-            <a:srgbClr val="B4D7EE"/>
-          </a:solidFill>
-          <a:ln cap="flat">
-            <a:noFill/>
-          </a:ln>
-        </p:spPr>
-        <p:style>
-          <a:lnRef idx="2">
-            <a:schemeClr val="accent1">
-              <a:shade val="50000"/>
-            </a:schemeClr>
-          </a:lnRef>
-          <a:fillRef idx="1">
-            <a:schemeClr val="accent1"/>
-          </a:fillRef>
-          <a:effectRef idx="0">
-            <a:schemeClr val="accent1"/>
-          </a:effectRef>
-          <a:fontRef idx="minor">
-            <a:schemeClr val="lt1"/>
-          </a:fontRef>
-        </p:style>
-        <p:txBody>
-          <a:bodyPr rot="0" spcFirstLastPara="0" vertOverflow="overflow" horzOverflow="overflow" vert="horz" wrap="square" lIns="91440" tIns="45720" rIns="91440" bIns="45720" numCol="1" spcCol="0" rtlCol="0" fromWordArt="0" anchor="ctr" anchorCtr="0" forceAA="0" compatLnSpc="1">
-            <a:prstTxWarp prst="textNoShape">
-              <a:avLst/>
-            </a:prstTxWarp>
-            <a:noAutofit/>
-          </a:bodyPr>
-          <a:lstStyle/>
-          <a:p>
-            <a:pPr algn="ctr"/>
-            <a:r>
-              <a:rPr lang="en-US" altLang="zh-CN" sz="1100" dirty="0">
-                <a:solidFill>
-                  <a:schemeClr val="tx1"/>
-                </a:solidFill>
-                <a:latin typeface="Arial" panose="020B0604020202020204" pitchFamily="34" charset="0"/>
-                <a:cs typeface="Arial" panose="020B0604020202020204" pitchFamily="34" charset="0"/>
-              </a:rPr>
-              <a:t>Plan</a:t>
-            </a:r>
-            <a:r>
-              <a:rPr lang="zh-CN" altLang="en-US" sz="1100" dirty="0">
-                <a:solidFill>
-                  <a:schemeClr val="tx1"/>
-                </a:solidFill>
-                <a:latin typeface="Arial" panose="020B0604020202020204" pitchFamily="34" charset="0"/>
-                <a:cs typeface="Arial" panose="020B0604020202020204" pitchFamily="34" charset="0"/>
-              </a:rPr>
-              <a:t> </a:t>
-            </a:r>
-            <a:r>
-              <a:rPr lang="en-US" altLang="zh-CN" sz="1100" dirty="0">
-                <a:solidFill>
-                  <a:schemeClr val="tx1"/>
-                </a:solidFill>
-                <a:latin typeface="Arial" panose="020B0604020202020204" pitchFamily="34" charset="0"/>
-                <a:cs typeface="Arial" panose="020B0604020202020204" pitchFamily="34" charset="0"/>
-              </a:rPr>
-              <a:t>and</a:t>
-            </a:r>
-            <a:r>
-              <a:rPr lang="zh-CN" altLang="en-US" sz="1100" dirty="0">
-                <a:solidFill>
-                  <a:schemeClr val="tx1"/>
-                </a:solidFill>
-                <a:latin typeface="Arial" panose="020B0604020202020204" pitchFamily="34" charset="0"/>
-                <a:cs typeface="Arial" panose="020B0604020202020204" pitchFamily="34" charset="0"/>
-              </a:rPr>
-              <a:t> </a:t>
-            </a:r>
-            <a:r>
-              <a:rPr lang="en-US" altLang="zh-CN" sz="1100" dirty="0">
-                <a:solidFill>
-                  <a:schemeClr val="tx1"/>
-                </a:solidFill>
-                <a:latin typeface="Arial" panose="020B0604020202020204" pitchFamily="34" charset="0"/>
-                <a:cs typeface="Arial" panose="020B0604020202020204" pitchFamily="34" charset="0"/>
-              </a:rPr>
-              <a:t>prepare</a:t>
-            </a:r>
-            <a:r>
-              <a:rPr lang="zh-CN" altLang="en-US" sz="1100" dirty="0">
-                <a:solidFill>
-                  <a:schemeClr val="tx1"/>
-                </a:solidFill>
-                <a:latin typeface="Arial" panose="020B0604020202020204" pitchFamily="34" charset="0"/>
-                <a:cs typeface="Arial" panose="020B0604020202020204" pitchFamily="34" charset="0"/>
-              </a:rPr>
-              <a:t> </a:t>
-            </a:r>
-            <a:r>
-              <a:rPr lang="en-US" altLang="zh-CN" sz="1100" dirty="0">
-                <a:solidFill>
-                  <a:schemeClr val="tx1"/>
-                </a:solidFill>
-                <a:latin typeface="Arial" panose="020B0604020202020204" pitchFamily="34" charset="0"/>
-                <a:cs typeface="Arial" panose="020B0604020202020204" pitchFamily="34" charset="0"/>
-              </a:rPr>
-              <a:t>for</a:t>
-            </a:r>
-            <a:r>
-              <a:rPr lang="zh-CN" altLang="en-US" sz="1100" dirty="0">
-                <a:solidFill>
-                  <a:schemeClr val="tx1"/>
-                </a:solidFill>
-                <a:latin typeface="Arial" panose="020B0604020202020204" pitchFamily="34" charset="0"/>
-                <a:cs typeface="Arial" panose="020B0604020202020204" pitchFamily="34" charset="0"/>
-              </a:rPr>
-              <a:t> </a:t>
-            </a:r>
-            <a:r>
-              <a:rPr lang="en-US" altLang="zh-CN" sz="1100" dirty="0">
-                <a:solidFill>
-                  <a:schemeClr val="tx1"/>
-                </a:solidFill>
-                <a:latin typeface="Arial" panose="020B0604020202020204" pitchFamily="34" charset="0"/>
-                <a:cs typeface="Arial" panose="020B0604020202020204" pitchFamily="34" charset="0"/>
-              </a:rPr>
-              <a:t>the</a:t>
-            </a:r>
-            <a:r>
-              <a:rPr lang="zh-CN" altLang="en-US" sz="1100" dirty="0">
-                <a:solidFill>
-                  <a:schemeClr val="tx1"/>
-                </a:solidFill>
-                <a:latin typeface="Arial" panose="020B0604020202020204" pitchFamily="34" charset="0"/>
-                <a:cs typeface="Arial" panose="020B0604020202020204" pitchFamily="34" charset="0"/>
-              </a:rPr>
-              <a:t> </a:t>
-            </a:r>
-            <a:r>
-              <a:rPr lang="en-US" altLang="zh-CN" sz="1100" dirty="0">
-                <a:solidFill>
-                  <a:schemeClr val="tx1"/>
-                </a:solidFill>
-                <a:latin typeface="Arial" panose="020B0604020202020204" pitchFamily="34" charset="0"/>
-                <a:cs typeface="Arial" panose="020B0604020202020204" pitchFamily="34" charset="0"/>
-              </a:rPr>
-              <a:t>installation</a:t>
-            </a:r>
-            <a:endParaRPr lang="en-US" sz="1100" dirty="0">
-              <a:solidFill>
-                <a:schemeClr val="tx1"/>
-              </a:solidFill>
-              <a:latin typeface="Arial" panose="020B0604020202020204" pitchFamily="34" charset="0"/>
-              <a:cs typeface="Arial" panose="020B0604020202020204" pitchFamily="34" charset="0"/>
-            </a:endParaRPr>
-          </a:p>
-        </p:txBody>
-      </p:sp>
-      <p:cxnSp>
-        <p:nvCxnSpPr>
-          <p:cNvPr id="59" name="Straight Arrow Connector 58">
-            <a:extLst>
-              <a:ext uri="{FF2B5EF4-FFF2-40B4-BE49-F238E27FC236}">
-                <a16:creationId xmlns:a16="http://schemas.microsoft.com/office/drawing/2014/main" id="{1297970D-9366-794C-A436-2B53BF522F18}"/>
-              </a:ext>
-            </a:extLst>
-          </p:cNvPr>
-          <p:cNvCxnSpPr>
-            <a:cxnSpLocks/>
-          </p:cNvCxnSpPr>
-          <p:nvPr/>
-        </p:nvCxnSpPr>
-        <p:spPr>
-          <a:xfrm>
-            <a:off x="4921570" y="2215421"/>
-            <a:ext cx="0" cy="212985"/>
-          </a:xfrm>
-          <a:prstGeom prst="straightConnector1">
-            <a:avLst/>
-          </a:prstGeom>
-          <a:ln>
-            <a:solidFill>
-              <a:schemeClr val="tx1">
-                <a:lumMod val="50000"/>
-                <a:lumOff val="50000"/>
-              </a:schemeClr>
-            </a:solidFill>
-            <a:tailEnd type="triangle"/>
-          </a:ln>
-        </p:spPr>
-        <p:style>
-          <a:lnRef idx="1">
-            <a:schemeClr val="accent1"/>
-          </a:lnRef>
-          <a:fillRef idx="0">
-            <a:schemeClr val="accent1"/>
-          </a:fillRef>
-          <a:effectRef idx="0">
-            <a:schemeClr val="accent1"/>
-          </a:effectRef>
-          <a:fontRef idx="minor">
-            <a:schemeClr val="tx1"/>
-          </a:fontRef>
-        </p:style>
-      </p:cxnSp>
-      <p:sp>
-        <p:nvSpPr>
-          <p:cNvPr id="62" name="TextBox 61">
-            <a:extLst>
-              <a:ext uri="{FF2B5EF4-FFF2-40B4-BE49-F238E27FC236}">
-                <a16:creationId xmlns:a16="http://schemas.microsoft.com/office/drawing/2014/main" id="{A31FAEAF-90F9-1B41-A341-C94FAA5C9D75}"/>
-              </a:ext>
-            </a:extLst>
-          </p:cNvPr>
-          <p:cNvSpPr txBox="1"/>
-          <p:nvPr/>
-        </p:nvSpPr>
-        <p:spPr>
-          <a:xfrm>
-            <a:off x="1074221" y="1257693"/>
-            <a:ext cx="2322161" cy="276999"/>
-          </a:xfrm>
-          <a:prstGeom prst="rect">
-            <a:avLst/>
-          </a:prstGeom>
-          <a:noFill/>
-        </p:spPr>
-        <p:txBody>
-          <a:bodyPr wrap="square" rtlCol="0">
-            <a:spAutoFit/>
-          </a:bodyPr>
-          <a:lstStyle/>
-          <a:p>
-            <a:r>
-              <a:rPr lang="en-US" altLang="zh-CN" sz="1200" b="1" dirty="0">
-                <a:latin typeface="Arial" panose="020B0604020202020204" pitchFamily="34" charset="0"/>
-                <a:cs typeface="Arial" panose="020B0604020202020204" pitchFamily="34" charset="0"/>
-              </a:rPr>
-              <a:t>Stage</a:t>
-            </a:r>
-            <a:r>
-              <a:rPr lang="zh-CN" altLang="en-US" sz="1200" b="1" dirty="0">
-                <a:latin typeface="Arial" panose="020B0604020202020204" pitchFamily="34" charset="0"/>
-                <a:cs typeface="Arial" panose="020B0604020202020204" pitchFamily="34" charset="0"/>
-              </a:rPr>
-              <a:t> </a:t>
-            </a:r>
-            <a:r>
-              <a:rPr lang="en-US" altLang="zh-CN" sz="1200" b="1" dirty="0">
-                <a:latin typeface="Arial" panose="020B0604020202020204" pitchFamily="34" charset="0"/>
-                <a:cs typeface="Arial" panose="020B0604020202020204" pitchFamily="34" charset="0"/>
-              </a:rPr>
-              <a:t>1:</a:t>
-            </a:r>
-            <a:r>
-              <a:rPr lang="zh-CN" altLang="en-US" sz="1200" b="1" dirty="0">
-                <a:latin typeface="Arial" panose="020B0604020202020204" pitchFamily="34" charset="0"/>
-                <a:cs typeface="Arial" panose="020B0604020202020204" pitchFamily="34" charset="0"/>
-              </a:rPr>
-              <a:t> </a:t>
-            </a:r>
-            <a:r>
-              <a:rPr lang="en-US" altLang="zh-CN" sz="1200" b="1" dirty="0">
-                <a:latin typeface="Arial" panose="020B0604020202020204" pitchFamily="34" charset="0"/>
-                <a:cs typeface="Arial" panose="020B0604020202020204" pitchFamily="34" charset="0"/>
-              </a:rPr>
-              <a:t>Plan</a:t>
-            </a:r>
-            <a:r>
-              <a:rPr lang="zh-CN" altLang="en-US" sz="1200" b="1" dirty="0">
-                <a:latin typeface="Arial" panose="020B0604020202020204" pitchFamily="34" charset="0"/>
-                <a:cs typeface="Arial" panose="020B0604020202020204" pitchFamily="34" charset="0"/>
-              </a:rPr>
-              <a:t> </a:t>
-            </a:r>
-            <a:r>
-              <a:rPr lang="en-US" altLang="zh-CN" sz="1200" b="1" dirty="0">
-                <a:latin typeface="Arial" panose="020B0604020202020204" pitchFamily="34" charset="0"/>
-                <a:cs typeface="Arial" panose="020B0604020202020204" pitchFamily="34" charset="0"/>
-              </a:rPr>
-              <a:t>and</a:t>
-            </a:r>
-            <a:r>
-              <a:rPr lang="zh-CN" altLang="en-US" sz="1200" b="1" dirty="0">
-                <a:latin typeface="Arial" panose="020B0604020202020204" pitchFamily="34" charset="0"/>
-                <a:cs typeface="Arial" panose="020B0604020202020204" pitchFamily="34" charset="0"/>
-              </a:rPr>
-              <a:t> </a:t>
-            </a:r>
-            <a:r>
-              <a:rPr lang="en-US" altLang="zh-CN" sz="1200" b="1" dirty="0">
-                <a:latin typeface="Arial" panose="020B0604020202020204" pitchFamily="34" charset="0"/>
-                <a:cs typeface="Arial" panose="020B0604020202020204" pitchFamily="34" charset="0"/>
-              </a:rPr>
-              <a:t>prepare</a:t>
-            </a:r>
-            <a:endParaRPr lang="en-US" sz="1200" b="1" dirty="0">
-              <a:latin typeface="Arial" panose="020B0604020202020204" pitchFamily="34" charset="0"/>
-              <a:cs typeface="Arial" panose="020B0604020202020204" pitchFamily="34" charset="0"/>
-            </a:endParaRPr>
-          </a:p>
-        </p:txBody>
-      </p:sp>
-      <p:sp>
-        <p:nvSpPr>
-          <p:cNvPr id="63" name="TextBox 62">
-            <a:extLst>
-              <a:ext uri="{FF2B5EF4-FFF2-40B4-BE49-F238E27FC236}">
-                <a16:creationId xmlns:a16="http://schemas.microsoft.com/office/drawing/2014/main" id="{0444C1C0-9E43-8F4F-89F4-AB51432BFBE6}"/>
-              </a:ext>
-            </a:extLst>
-          </p:cNvPr>
-          <p:cNvSpPr txBox="1"/>
-          <p:nvPr/>
-        </p:nvSpPr>
-        <p:spPr>
-          <a:xfrm>
-            <a:off x="1074221" y="2532843"/>
-            <a:ext cx="2566915" cy="276999"/>
-          </a:xfrm>
-          <a:prstGeom prst="rect">
-            <a:avLst/>
-          </a:prstGeom>
-          <a:noFill/>
-        </p:spPr>
-        <p:txBody>
-          <a:bodyPr wrap="square" rtlCol="0">
-            <a:spAutoFit/>
-          </a:bodyPr>
-          <a:lstStyle/>
-          <a:p>
-            <a:r>
-              <a:rPr lang="en-US" altLang="zh-CN" sz="1200" b="1" dirty="0">
-                <a:latin typeface="Arial" panose="020B0604020202020204" pitchFamily="34" charset="0"/>
-                <a:cs typeface="Arial" panose="020B0604020202020204" pitchFamily="34" charset="0"/>
-              </a:rPr>
-              <a:t>Stage</a:t>
-            </a:r>
-            <a:r>
-              <a:rPr lang="zh-CN" altLang="en-US" sz="1200" b="1" dirty="0">
-                <a:latin typeface="Arial" panose="020B0604020202020204" pitchFamily="34" charset="0"/>
-                <a:cs typeface="Arial" panose="020B0604020202020204" pitchFamily="34" charset="0"/>
-              </a:rPr>
-              <a:t> </a:t>
-            </a:r>
-            <a:r>
-              <a:rPr lang="en-US" altLang="zh-CN" sz="1200" b="1" dirty="0">
-                <a:latin typeface="Arial" panose="020B0604020202020204" pitchFamily="34" charset="0"/>
-                <a:cs typeface="Arial" panose="020B0604020202020204" pitchFamily="34" charset="0"/>
-              </a:rPr>
-              <a:t>2:</a:t>
-            </a:r>
-            <a:r>
-              <a:rPr lang="zh-CN" altLang="en-US" sz="1200" b="1" dirty="0">
-                <a:latin typeface="Arial" panose="020B0604020202020204" pitchFamily="34" charset="0"/>
-                <a:cs typeface="Arial" panose="020B0604020202020204" pitchFamily="34" charset="0"/>
-              </a:rPr>
-              <a:t> </a:t>
-            </a:r>
-            <a:r>
-              <a:rPr lang="en-US" altLang="zh-CN" sz="1200" b="1" dirty="0">
-                <a:latin typeface="Arial" panose="020B0604020202020204" pitchFamily="34" charset="0"/>
-                <a:cs typeface="Arial" panose="020B0604020202020204" pitchFamily="34" charset="0"/>
-              </a:rPr>
-              <a:t>Install</a:t>
-            </a:r>
-            <a:r>
-              <a:rPr lang="zh-CN" altLang="en-US" sz="1200" b="1" dirty="0">
-                <a:latin typeface="Arial" panose="020B0604020202020204" pitchFamily="34" charset="0"/>
-                <a:cs typeface="Arial" panose="020B0604020202020204" pitchFamily="34" charset="0"/>
-              </a:rPr>
-              <a:t> </a:t>
-            </a:r>
-            <a:r>
-              <a:rPr lang="en-US" altLang="zh-CN" sz="1200" b="1" dirty="0">
-                <a:latin typeface="Arial" panose="020B0604020202020204" pitchFamily="34" charset="0"/>
-                <a:cs typeface="Arial" panose="020B0604020202020204" pitchFamily="34" charset="0"/>
-              </a:rPr>
-              <a:t>the </a:t>
-            </a:r>
-            <a:r>
-              <a:rPr lang="en-US" altLang="zh-CN" sz="1200" b="1" dirty="0" err="1">
-                <a:latin typeface="Arial" panose="020B0604020202020204" pitchFamily="34" charset="0"/>
-                <a:cs typeface="Arial" panose="020B0604020202020204" pitchFamily="34" charset="0"/>
-              </a:rPr>
-              <a:t>Zowe</a:t>
-            </a:r>
-            <a:r>
-              <a:rPr lang="en-US" altLang="zh-CN" sz="1200" b="1" dirty="0">
-                <a:latin typeface="Arial" panose="020B0604020202020204" pitchFamily="34" charset="0"/>
-                <a:cs typeface="Arial" panose="020B0604020202020204" pitchFamily="34" charset="0"/>
-              </a:rPr>
-              <a:t> runtime</a:t>
-            </a:r>
-            <a:endParaRPr lang="en-US" sz="1200" b="1" dirty="0">
-              <a:latin typeface="Arial" panose="020B0604020202020204" pitchFamily="34" charset="0"/>
-              <a:cs typeface="Arial" panose="020B0604020202020204" pitchFamily="34" charset="0"/>
-            </a:endParaRPr>
-          </a:p>
-        </p:txBody>
-      </p:sp>
-      <p:sp>
-        <p:nvSpPr>
-          <p:cNvPr id="64" name="TextBox 63">
-            <a:extLst>
-              <a:ext uri="{FF2B5EF4-FFF2-40B4-BE49-F238E27FC236}">
-                <a16:creationId xmlns:a16="http://schemas.microsoft.com/office/drawing/2014/main" id="{CA1945F7-16FA-4B4B-95E8-56F90A8038A5}"/>
-              </a:ext>
-            </a:extLst>
-          </p:cNvPr>
-          <p:cNvSpPr txBox="1"/>
-          <p:nvPr/>
-        </p:nvSpPr>
-        <p:spPr>
-          <a:xfrm>
-            <a:off x="1074221" y="7798658"/>
-            <a:ext cx="1881011" cy="646331"/>
-          </a:xfrm>
-          <a:prstGeom prst="rect">
-            <a:avLst/>
-          </a:prstGeom>
-          <a:noFill/>
-        </p:spPr>
-        <p:txBody>
-          <a:bodyPr wrap="square" rtlCol="0">
-            <a:spAutoFit/>
-          </a:bodyPr>
-          <a:lstStyle/>
-          <a:p>
-            <a:r>
-              <a:rPr lang="en-US" altLang="zh-CN" sz="1200" b="1" dirty="0">
-                <a:latin typeface="Arial" panose="020B0604020202020204" pitchFamily="34" charset="0"/>
-                <a:cs typeface="Arial" panose="020B0604020202020204" pitchFamily="34" charset="0"/>
-              </a:rPr>
-              <a:t>Stage</a:t>
-            </a:r>
-            <a:r>
-              <a:rPr lang="zh-CN" altLang="en-US" sz="1200" b="1" dirty="0">
-                <a:latin typeface="Arial" panose="020B0604020202020204" pitchFamily="34" charset="0"/>
-                <a:cs typeface="Arial" panose="020B0604020202020204" pitchFamily="34" charset="0"/>
-              </a:rPr>
-              <a:t> </a:t>
-            </a:r>
-            <a:r>
-              <a:rPr lang="en-US" altLang="zh-CN" sz="1200" b="1" dirty="0">
-                <a:latin typeface="Arial" panose="020B0604020202020204" pitchFamily="34" charset="0"/>
-                <a:cs typeface="Arial" panose="020B0604020202020204" pitchFamily="34" charset="0"/>
-              </a:rPr>
-              <a:t>3:</a:t>
-            </a:r>
-            <a:r>
-              <a:rPr lang="zh-CN" altLang="en-US" sz="1200" b="1" dirty="0">
-                <a:latin typeface="Arial" panose="020B0604020202020204" pitchFamily="34" charset="0"/>
-                <a:cs typeface="Arial" panose="020B0604020202020204" pitchFamily="34" charset="0"/>
-              </a:rPr>
-              <a:t> </a:t>
-            </a:r>
-            <a:endParaRPr lang="en-US" altLang="zh-CN" sz="1200" b="1" dirty="0">
-              <a:latin typeface="Arial" panose="020B0604020202020204" pitchFamily="34" charset="0"/>
-              <a:cs typeface="Arial" panose="020B0604020202020204" pitchFamily="34" charset="0"/>
-            </a:endParaRPr>
-          </a:p>
-          <a:p>
-            <a:r>
-              <a:rPr lang="en-US" altLang="zh-CN" sz="1200" b="1" dirty="0">
-                <a:latin typeface="Arial" panose="020B0604020202020204" pitchFamily="34" charset="0"/>
-                <a:cs typeface="Arial" panose="020B0604020202020204" pitchFamily="34" charset="0"/>
-              </a:rPr>
-              <a:t>Configure</a:t>
-            </a:r>
-            <a:r>
-              <a:rPr lang="zh-CN" altLang="en-US" sz="1200" b="1" dirty="0">
-                <a:latin typeface="Arial" panose="020B0604020202020204" pitchFamily="34" charset="0"/>
-                <a:cs typeface="Arial" panose="020B0604020202020204" pitchFamily="34" charset="0"/>
-              </a:rPr>
-              <a:t> </a:t>
-            </a:r>
-            <a:r>
-              <a:rPr lang="en-US" altLang="zh-CN" sz="1200" b="1" dirty="0">
-                <a:latin typeface="Arial" panose="020B0604020202020204" pitchFamily="34" charset="0"/>
-                <a:cs typeface="Arial" panose="020B0604020202020204" pitchFamily="34" charset="0"/>
-              </a:rPr>
-              <a:t>the</a:t>
-            </a:r>
-            <a:r>
-              <a:rPr lang="zh-CN" altLang="en-US" sz="1200" b="1" dirty="0">
-                <a:latin typeface="Arial" panose="020B0604020202020204" pitchFamily="34" charset="0"/>
-                <a:cs typeface="Arial" panose="020B0604020202020204" pitchFamily="34" charset="0"/>
-              </a:rPr>
-              <a:t> </a:t>
-            </a:r>
-            <a:r>
-              <a:rPr lang="en-US" altLang="zh-CN" sz="1200" b="1" dirty="0" err="1">
-                <a:latin typeface="Arial" panose="020B0604020202020204" pitchFamily="34" charset="0"/>
-                <a:cs typeface="Arial" panose="020B0604020202020204" pitchFamily="34" charset="0"/>
-              </a:rPr>
-              <a:t>Zowe</a:t>
-            </a:r>
-            <a:r>
-              <a:rPr lang="zh-CN" altLang="en-US" sz="1200" b="1" dirty="0">
-                <a:latin typeface="Arial" panose="020B0604020202020204" pitchFamily="34" charset="0"/>
-                <a:cs typeface="Arial" panose="020B0604020202020204" pitchFamily="34" charset="0"/>
-              </a:rPr>
-              <a:t> </a:t>
-            </a:r>
-            <a:r>
-              <a:rPr lang="en-US" altLang="zh-CN" sz="1200" b="1" dirty="0">
-                <a:latin typeface="Arial" panose="020B0604020202020204" pitchFamily="34" charset="0"/>
-                <a:cs typeface="Arial" panose="020B0604020202020204" pitchFamily="34" charset="0"/>
-              </a:rPr>
-              <a:t>runtime</a:t>
-            </a:r>
-            <a:r>
-              <a:rPr lang="zh-CN" altLang="en-US" sz="1200" b="1" dirty="0">
-                <a:latin typeface="Arial" panose="020B0604020202020204" pitchFamily="34" charset="0"/>
-                <a:cs typeface="Arial" panose="020B0604020202020204" pitchFamily="34" charset="0"/>
-              </a:rPr>
-              <a:t> </a:t>
-            </a:r>
-            <a:r>
-              <a:rPr lang="en-US" altLang="zh-CN" sz="1200" b="1" dirty="0">
-                <a:latin typeface="Arial" panose="020B0604020202020204" pitchFamily="34" charset="0"/>
-                <a:cs typeface="Arial" panose="020B0604020202020204" pitchFamily="34" charset="0"/>
-              </a:rPr>
-              <a:t>and</a:t>
-            </a:r>
-            <a:r>
-              <a:rPr lang="zh-CN" altLang="en-US" sz="1200" b="1" dirty="0">
-                <a:latin typeface="Arial" panose="020B0604020202020204" pitchFamily="34" charset="0"/>
-                <a:cs typeface="Arial" panose="020B0604020202020204" pitchFamily="34" charset="0"/>
-              </a:rPr>
-              <a:t> </a:t>
-            </a:r>
-            <a:r>
-              <a:rPr lang="en-US" altLang="zh-CN" sz="1200" b="1" dirty="0">
-                <a:latin typeface="Arial" panose="020B0604020202020204" pitchFamily="34" charset="0"/>
-                <a:cs typeface="Arial" panose="020B0604020202020204" pitchFamily="34" charset="0"/>
-              </a:rPr>
-              <a:t>start</a:t>
-            </a:r>
-            <a:r>
-              <a:rPr lang="zh-CN" altLang="en-US" sz="1200" b="1" dirty="0">
-                <a:latin typeface="Arial" panose="020B0604020202020204" pitchFamily="34" charset="0"/>
-                <a:cs typeface="Arial" panose="020B0604020202020204" pitchFamily="34" charset="0"/>
-              </a:rPr>
-              <a:t> </a:t>
-            </a:r>
-            <a:r>
-              <a:rPr lang="en-US" altLang="zh-CN" sz="1200" b="1" dirty="0" err="1">
-                <a:latin typeface="Arial" panose="020B0604020202020204" pitchFamily="34" charset="0"/>
-                <a:cs typeface="Arial" panose="020B0604020202020204" pitchFamily="34" charset="0"/>
-              </a:rPr>
-              <a:t>Zowe</a:t>
-            </a:r>
-            <a:endParaRPr lang="en-US" sz="1200" b="1" dirty="0">
-              <a:latin typeface="Arial" panose="020B0604020202020204" pitchFamily="34" charset="0"/>
-              <a:cs typeface="Arial" panose="020B0604020202020204" pitchFamily="34" charset="0"/>
-            </a:endParaRPr>
-          </a:p>
-        </p:txBody>
-      </p:sp>
-      <p:cxnSp>
-        <p:nvCxnSpPr>
-          <p:cNvPr id="65" name="Straight Connector 64">
-            <a:extLst>
-              <a:ext uri="{FF2B5EF4-FFF2-40B4-BE49-F238E27FC236}">
-                <a16:creationId xmlns:a16="http://schemas.microsoft.com/office/drawing/2014/main" id="{A8862446-FD02-634A-B538-2CE6A62F15B5}"/>
-              </a:ext>
-            </a:extLst>
-          </p:cNvPr>
-          <p:cNvCxnSpPr>
-            <a:cxnSpLocks/>
-          </p:cNvCxnSpPr>
-          <p:nvPr/>
-        </p:nvCxnSpPr>
-        <p:spPr>
-          <a:xfrm>
-            <a:off x="1163866" y="14148216"/>
-            <a:ext cx="8072213" cy="0"/>
-          </a:xfrm>
-          <a:prstGeom prst="line">
-            <a:avLst/>
-          </a:prstGeom>
-          <a:ln>
-            <a:solidFill>
-              <a:schemeClr val="bg2">
-                <a:lumMod val="75000"/>
-              </a:schemeClr>
-            </a:solidFill>
-            <a:prstDash val="dash"/>
-          </a:ln>
-        </p:spPr>
-        <p:style>
-          <a:lnRef idx="1">
-            <a:schemeClr val="accent1"/>
-          </a:lnRef>
-          <a:fillRef idx="0">
-            <a:schemeClr val="accent1"/>
-          </a:fillRef>
-          <a:effectRef idx="0">
-            <a:schemeClr val="accent1"/>
-          </a:effectRef>
-          <a:fontRef idx="minor">
-            <a:schemeClr val="tx1"/>
-          </a:fontRef>
-        </p:style>
-      </p:cxnSp>
-      <p:sp>
-        <p:nvSpPr>
-          <p:cNvPr id="67" name="Rectangle 66">
-            <a:extLst>
-              <a:ext uri="{FF2B5EF4-FFF2-40B4-BE49-F238E27FC236}">
-                <a16:creationId xmlns:a16="http://schemas.microsoft.com/office/drawing/2014/main" id="{2A2CA57A-4B49-AB42-94DE-2535D3531CB6}"/>
-              </a:ext>
-            </a:extLst>
-          </p:cNvPr>
-          <p:cNvSpPr/>
-          <p:nvPr/>
-        </p:nvSpPr>
-        <p:spPr>
-          <a:xfrm>
-            <a:off x="3038085" y="14451861"/>
-            <a:ext cx="5171997" cy="558971"/>
-          </a:xfrm>
-          <a:prstGeom prst="rect">
-            <a:avLst/>
-          </a:prstGeom>
-          <a:solidFill>
-            <a:srgbClr val="B4D7EE"/>
-          </a:solidFill>
-          <a:ln>
-            <a:noFill/>
-          </a:ln>
-        </p:spPr>
-        <p:style>
-          <a:lnRef idx="2">
-            <a:schemeClr val="accent1">
-              <a:shade val="50000"/>
-            </a:schemeClr>
-          </a:lnRef>
-          <a:fillRef idx="1">
-            <a:schemeClr val="accent1"/>
-          </a:fillRef>
-          <a:effectRef idx="0">
-            <a:schemeClr val="accent1"/>
-          </a:effectRef>
-          <a:fontRef idx="minor">
-            <a:schemeClr val="lt1"/>
-          </a:fontRef>
-        </p:style>
-        <p:txBody>
-          <a:bodyPr rot="0" spcFirstLastPara="0" vertOverflow="overflow" horzOverflow="overflow" vert="horz" wrap="square" lIns="91440" tIns="45720" rIns="91440" bIns="45720" numCol="1" spcCol="0" rtlCol="0" fromWordArt="0" anchor="ctr" anchorCtr="0" forceAA="0" compatLnSpc="1">
-            <a:prstTxWarp prst="textNoShape">
-              <a:avLst/>
-            </a:prstTxWarp>
-            <a:noAutofit/>
-          </a:bodyPr>
-          <a:lstStyle/>
-          <a:p>
-            <a:pPr algn="ctr"/>
-            <a:r>
-              <a:rPr lang="en-US" altLang="zh-CN" sz="1100" dirty="0">
-                <a:solidFill>
-                  <a:schemeClr val="tx1"/>
-                </a:solidFill>
-                <a:latin typeface="Arial" panose="020B0604020202020204" pitchFamily="34" charset="0"/>
-                <a:cs typeface="Arial" panose="020B0604020202020204" pitchFamily="34" charset="0"/>
-              </a:rPr>
-              <a:t>Verify</a:t>
-            </a:r>
-            <a:r>
-              <a:rPr lang="zh-CN" altLang="en-US" sz="1100" dirty="0">
-                <a:solidFill>
-                  <a:schemeClr val="tx1"/>
-                </a:solidFill>
-                <a:latin typeface="Arial" panose="020B0604020202020204" pitchFamily="34" charset="0"/>
-                <a:cs typeface="Arial" panose="020B0604020202020204" pitchFamily="34" charset="0"/>
-              </a:rPr>
-              <a:t> </a:t>
-            </a:r>
-            <a:r>
-              <a:rPr lang="en-US" altLang="zh-CN" sz="1100" dirty="0">
-                <a:solidFill>
-                  <a:schemeClr val="tx1"/>
-                </a:solidFill>
-                <a:latin typeface="Arial" panose="020B0604020202020204" pitchFamily="34" charset="0"/>
-                <a:cs typeface="Arial" panose="020B0604020202020204" pitchFamily="34" charset="0"/>
-              </a:rPr>
-              <a:t>that</a:t>
-            </a:r>
-            <a:r>
-              <a:rPr lang="zh-CN" altLang="en-US" sz="1100" dirty="0">
-                <a:solidFill>
-                  <a:schemeClr val="tx1"/>
-                </a:solidFill>
-                <a:latin typeface="Arial" panose="020B0604020202020204" pitchFamily="34" charset="0"/>
-                <a:cs typeface="Arial" panose="020B0604020202020204" pitchFamily="34" charset="0"/>
-              </a:rPr>
-              <a:t> </a:t>
-            </a:r>
-            <a:r>
-              <a:rPr lang="en-US" altLang="zh-CN" sz="1100" dirty="0">
-                <a:solidFill>
-                  <a:schemeClr val="tx1"/>
-                </a:solidFill>
-                <a:latin typeface="Arial" panose="020B0604020202020204" pitchFamily="34" charset="0"/>
-                <a:cs typeface="Arial" panose="020B0604020202020204" pitchFamily="34" charset="0"/>
-              </a:rPr>
-              <a:t>Zowe</a:t>
-            </a:r>
-            <a:r>
-              <a:rPr lang="zh-CN" altLang="en-US" sz="1100" dirty="0">
-                <a:solidFill>
-                  <a:schemeClr val="tx1"/>
-                </a:solidFill>
-                <a:latin typeface="Arial" panose="020B0604020202020204" pitchFamily="34" charset="0"/>
-                <a:cs typeface="Arial" panose="020B0604020202020204" pitchFamily="34" charset="0"/>
-              </a:rPr>
-              <a:t> </a:t>
-            </a:r>
-            <a:r>
-              <a:rPr lang="en-US" altLang="zh-CN" sz="1100" dirty="0">
-                <a:solidFill>
-                  <a:schemeClr val="tx1"/>
-                </a:solidFill>
-                <a:latin typeface="Arial" panose="020B0604020202020204" pitchFamily="34" charset="0"/>
-                <a:cs typeface="Arial" panose="020B0604020202020204" pitchFamily="34" charset="0"/>
-              </a:rPr>
-              <a:t>is</a:t>
-            </a:r>
-            <a:r>
-              <a:rPr lang="zh-CN" altLang="en-US" sz="1100" dirty="0">
-                <a:solidFill>
-                  <a:schemeClr val="tx1"/>
-                </a:solidFill>
-                <a:latin typeface="Arial" panose="020B0604020202020204" pitchFamily="34" charset="0"/>
-                <a:cs typeface="Arial" panose="020B0604020202020204" pitchFamily="34" charset="0"/>
-              </a:rPr>
-              <a:t> </a:t>
-            </a:r>
-            <a:r>
-              <a:rPr lang="en-US" altLang="zh-CN" sz="1100" dirty="0">
-                <a:solidFill>
-                  <a:schemeClr val="tx1"/>
-                </a:solidFill>
-                <a:latin typeface="Arial" panose="020B0604020202020204" pitchFamily="34" charset="0"/>
-                <a:cs typeface="Arial" panose="020B0604020202020204" pitchFamily="34" charset="0"/>
-              </a:rPr>
-              <a:t>installed</a:t>
-            </a:r>
-            <a:r>
-              <a:rPr lang="zh-CN" altLang="en-US" sz="1100" dirty="0">
-                <a:solidFill>
-                  <a:schemeClr val="tx1"/>
-                </a:solidFill>
-                <a:latin typeface="Arial" panose="020B0604020202020204" pitchFamily="34" charset="0"/>
-                <a:cs typeface="Arial" panose="020B0604020202020204" pitchFamily="34" charset="0"/>
-              </a:rPr>
-              <a:t> </a:t>
-            </a:r>
-            <a:r>
-              <a:rPr lang="en-US" altLang="zh-CN" sz="1100" dirty="0">
-                <a:solidFill>
-                  <a:schemeClr val="tx1"/>
-                </a:solidFill>
-                <a:latin typeface="Arial" panose="020B0604020202020204" pitchFamily="34" charset="0"/>
-                <a:cs typeface="Arial" panose="020B0604020202020204" pitchFamily="34" charset="0"/>
-              </a:rPr>
-              <a:t>and</a:t>
-            </a:r>
-            <a:r>
-              <a:rPr lang="zh-CN" altLang="en-US" sz="1100" dirty="0">
-                <a:solidFill>
-                  <a:schemeClr val="tx1"/>
-                </a:solidFill>
-                <a:latin typeface="Arial" panose="020B0604020202020204" pitchFamily="34" charset="0"/>
-                <a:cs typeface="Arial" panose="020B0604020202020204" pitchFamily="34" charset="0"/>
-              </a:rPr>
-              <a:t> </a:t>
-            </a:r>
-            <a:r>
-              <a:rPr lang="en-US" altLang="zh-CN" sz="1100" dirty="0">
-                <a:solidFill>
-                  <a:schemeClr val="tx1"/>
-                </a:solidFill>
-                <a:latin typeface="Arial" panose="020B0604020202020204" pitchFamily="34" charset="0"/>
-                <a:cs typeface="Arial" panose="020B0604020202020204" pitchFamily="34" charset="0"/>
-              </a:rPr>
-              <a:t>configured</a:t>
-            </a:r>
-            <a:r>
-              <a:rPr lang="zh-CN" altLang="en-US" sz="1100" dirty="0">
-                <a:solidFill>
-                  <a:schemeClr val="tx1"/>
-                </a:solidFill>
-                <a:latin typeface="Arial" panose="020B0604020202020204" pitchFamily="34" charset="0"/>
-                <a:cs typeface="Arial" panose="020B0604020202020204" pitchFamily="34" charset="0"/>
-              </a:rPr>
-              <a:t> </a:t>
-            </a:r>
-            <a:r>
-              <a:rPr lang="en-US" altLang="zh-CN" sz="1100" dirty="0">
-                <a:solidFill>
-                  <a:schemeClr val="tx1"/>
-                </a:solidFill>
-                <a:latin typeface="Arial" panose="020B0604020202020204" pitchFamily="34" charset="0"/>
-                <a:cs typeface="Arial" panose="020B0604020202020204" pitchFamily="34" charset="0"/>
-              </a:rPr>
-              <a:t>correctly</a:t>
-            </a:r>
-          </a:p>
-        </p:txBody>
-      </p:sp>
-      <p:sp>
-        <p:nvSpPr>
-          <p:cNvPr id="70" name="TextBox 69">
-            <a:extLst>
-              <a:ext uri="{FF2B5EF4-FFF2-40B4-BE49-F238E27FC236}">
-                <a16:creationId xmlns:a16="http://schemas.microsoft.com/office/drawing/2014/main" id="{0BC2C662-8125-0E43-AD52-BDB1749D1FAC}"/>
-              </a:ext>
-            </a:extLst>
-          </p:cNvPr>
-          <p:cNvSpPr txBox="1"/>
-          <p:nvPr/>
-        </p:nvSpPr>
-        <p:spPr>
-          <a:xfrm>
-            <a:off x="1074221" y="14165145"/>
-            <a:ext cx="2566919" cy="276999"/>
-          </a:xfrm>
-          <a:prstGeom prst="rect">
-            <a:avLst/>
-          </a:prstGeom>
-          <a:noFill/>
-        </p:spPr>
-        <p:txBody>
-          <a:bodyPr wrap="square" rtlCol="0">
-            <a:spAutoFit/>
-          </a:bodyPr>
-          <a:lstStyle/>
-          <a:p>
-            <a:r>
-              <a:rPr lang="en-US" altLang="zh-CN" sz="1200" b="1" dirty="0">
-                <a:latin typeface="Arial" panose="020B0604020202020204" pitchFamily="34" charset="0"/>
-                <a:cs typeface="Arial" panose="020B0604020202020204" pitchFamily="34" charset="0"/>
-              </a:rPr>
-              <a:t>Stage</a:t>
-            </a:r>
-            <a:r>
-              <a:rPr lang="zh-CN" altLang="en-US" sz="1200" b="1" dirty="0">
-                <a:latin typeface="Arial" panose="020B0604020202020204" pitchFamily="34" charset="0"/>
-                <a:cs typeface="Arial" panose="020B0604020202020204" pitchFamily="34" charset="0"/>
-              </a:rPr>
-              <a:t> </a:t>
-            </a:r>
-            <a:r>
-              <a:rPr lang="en-US" altLang="zh-CN" sz="1200" b="1" dirty="0">
-                <a:latin typeface="Arial" panose="020B0604020202020204" pitchFamily="34" charset="0"/>
-                <a:cs typeface="Arial" panose="020B0604020202020204" pitchFamily="34" charset="0"/>
-              </a:rPr>
-              <a:t>4:</a:t>
-            </a:r>
-            <a:r>
-              <a:rPr lang="zh-CN" altLang="en-US" sz="1200" b="1" dirty="0">
-                <a:latin typeface="Arial" panose="020B0604020202020204" pitchFamily="34" charset="0"/>
-                <a:cs typeface="Arial" panose="020B0604020202020204" pitchFamily="34" charset="0"/>
-              </a:rPr>
-              <a:t> </a:t>
-            </a:r>
-            <a:r>
-              <a:rPr lang="en-US" altLang="zh-CN" sz="1200" b="1" dirty="0">
-                <a:latin typeface="Arial" panose="020B0604020202020204" pitchFamily="34" charset="0"/>
-                <a:cs typeface="Arial" panose="020B0604020202020204" pitchFamily="34" charset="0"/>
-              </a:rPr>
-              <a:t>Verify</a:t>
-            </a:r>
-            <a:r>
-              <a:rPr lang="zh-CN" altLang="en-US" sz="1200" b="1" dirty="0">
-                <a:latin typeface="Arial" panose="020B0604020202020204" pitchFamily="34" charset="0"/>
-                <a:cs typeface="Arial" panose="020B0604020202020204" pitchFamily="34" charset="0"/>
-              </a:rPr>
-              <a:t> </a:t>
-            </a:r>
-            <a:r>
-              <a:rPr lang="en-US" altLang="zh-CN" sz="1200" b="1" dirty="0">
-                <a:latin typeface="Arial" panose="020B0604020202020204" pitchFamily="34" charset="0"/>
-                <a:cs typeface="Arial" panose="020B0604020202020204" pitchFamily="34" charset="0"/>
-              </a:rPr>
-              <a:t>the</a:t>
-            </a:r>
-            <a:r>
-              <a:rPr lang="zh-CN" altLang="en-US" sz="1200" b="1" dirty="0">
-                <a:latin typeface="Arial" panose="020B0604020202020204" pitchFamily="34" charset="0"/>
-                <a:cs typeface="Arial" panose="020B0604020202020204" pitchFamily="34" charset="0"/>
-              </a:rPr>
-              <a:t> </a:t>
-            </a:r>
-            <a:r>
-              <a:rPr lang="en-US" altLang="zh-CN" sz="1200" b="1" dirty="0">
-                <a:latin typeface="Arial" panose="020B0604020202020204" pitchFamily="34" charset="0"/>
-                <a:cs typeface="Arial" panose="020B0604020202020204" pitchFamily="34" charset="0"/>
-              </a:rPr>
-              <a:t>installation</a:t>
-            </a:r>
-            <a:endParaRPr lang="en-US" sz="1200" b="1" dirty="0">
-              <a:latin typeface="Arial" panose="020B0604020202020204" pitchFamily="34" charset="0"/>
-              <a:cs typeface="Arial" panose="020B0604020202020204" pitchFamily="34" charset="0"/>
-            </a:endParaRPr>
-          </a:p>
-        </p:txBody>
-      </p:sp>
-      <p:sp>
-        <p:nvSpPr>
-          <p:cNvPr id="72" name="Rectangle 71">
-            <a:extLst>
-              <a:ext uri="{FF2B5EF4-FFF2-40B4-BE49-F238E27FC236}">
-                <a16:creationId xmlns:a16="http://schemas.microsoft.com/office/drawing/2014/main" id="{840C4586-194D-EB43-BF82-8A163D579E6A}"/>
-              </a:ext>
-            </a:extLst>
-          </p:cNvPr>
-          <p:cNvSpPr/>
-          <p:nvPr/>
-        </p:nvSpPr>
-        <p:spPr>
-          <a:xfrm>
-            <a:off x="4043743" y="4155837"/>
-            <a:ext cx="1724319" cy="430887"/>
-          </a:xfrm>
-          <a:prstGeom prst="rect">
-            <a:avLst/>
-          </a:prstGeom>
-        </p:spPr>
-        <p:txBody>
-          <a:bodyPr wrap="square">
-            <a:spAutoFit/>
-          </a:bodyPr>
-          <a:lstStyle/>
-          <a:p>
-            <a:pPr lvl="0" algn="ctr"/>
-            <a:r>
-              <a:rPr lang="en-US" sz="1100" i="1" dirty="0">
-                <a:latin typeface="Arial" panose="020B0604020202020204" pitchFamily="34" charset="0"/>
-                <a:cs typeface="Arial" panose="020B0604020202020204" pitchFamily="34" charset="0"/>
-              </a:rPr>
-              <a:t>What is your preferred installation method?</a:t>
-            </a:r>
-          </a:p>
-        </p:txBody>
-      </p:sp>
-      <p:cxnSp>
-        <p:nvCxnSpPr>
-          <p:cNvPr id="83" name="Straight Connector 82">
-            <a:extLst>
-              <a:ext uri="{FF2B5EF4-FFF2-40B4-BE49-F238E27FC236}">
-                <a16:creationId xmlns:a16="http://schemas.microsoft.com/office/drawing/2014/main" id="{39EC7DCA-EDFB-CA4D-91AB-7AAC72E33404}"/>
-              </a:ext>
-            </a:extLst>
-          </p:cNvPr>
-          <p:cNvCxnSpPr>
-            <a:cxnSpLocks/>
-          </p:cNvCxnSpPr>
-          <p:nvPr/>
-        </p:nvCxnSpPr>
-        <p:spPr>
-          <a:xfrm>
-            <a:off x="1163863" y="1257689"/>
-            <a:ext cx="7982472" cy="0"/>
-          </a:xfrm>
-          <a:prstGeom prst="line">
-            <a:avLst/>
-          </a:prstGeom>
-          <a:ln>
-            <a:solidFill>
-              <a:schemeClr val="bg2">
-                <a:lumMod val="75000"/>
-              </a:schemeClr>
-            </a:solidFill>
-            <a:prstDash val="dash"/>
-          </a:ln>
-        </p:spPr>
-        <p:style>
-          <a:lnRef idx="1">
-            <a:schemeClr val="accent1"/>
-          </a:lnRef>
-          <a:fillRef idx="0">
-            <a:schemeClr val="accent1"/>
-          </a:fillRef>
-          <a:effectRef idx="0">
-            <a:schemeClr val="accent1"/>
-          </a:effectRef>
-          <a:fontRef idx="minor">
-            <a:schemeClr val="tx1"/>
-          </a:fontRef>
-        </p:style>
-      </p:cxnSp>
-      <p:sp>
-        <p:nvSpPr>
-          <p:cNvPr id="51" name="Rectangle 50">
-            <a:extLst>
-              <a:ext uri="{FF2B5EF4-FFF2-40B4-BE49-F238E27FC236}">
-                <a16:creationId xmlns:a16="http://schemas.microsoft.com/office/drawing/2014/main" id="{0E337C55-5CEA-7D45-A843-ED3785889B04}"/>
-              </a:ext>
-            </a:extLst>
-          </p:cNvPr>
-          <p:cNvSpPr/>
-          <p:nvPr/>
-        </p:nvSpPr>
-        <p:spPr>
-          <a:xfrm>
-            <a:off x="6956223" y="6731894"/>
-            <a:ext cx="2317702" cy="503314"/>
-          </a:xfrm>
-          <a:prstGeom prst="rect">
-            <a:avLst/>
-          </a:prstGeom>
-          <a:solidFill>
-            <a:schemeClr val="accent4">
-              <a:lumMod val="20000"/>
-              <a:lumOff val="80000"/>
-            </a:schemeClr>
-          </a:solidFill>
-          <a:ln>
-            <a:solidFill>
-              <a:schemeClr val="accent4">
-                <a:lumMod val="60000"/>
-                <a:lumOff val="40000"/>
-              </a:schemeClr>
-            </a:solidFill>
-            <a:prstDash val="dash"/>
-          </a:ln>
-        </p:spPr>
-        <p:style>
-          <a:lnRef idx="2">
-            <a:schemeClr val="accent1">
-              <a:shade val="50000"/>
-            </a:schemeClr>
-          </a:lnRef>
-          <a:fillRef idx="1">
-            <a:schemeClr val="accent1"/>
-          </a:fillRef>
-          <a:effectRef idx="0">
-            <a:schemeClr val="accent1"/>
-          </a:effectRef>
-          <a:fontRef idx="minor">
-            <a:schemeClr val="lt1"/>
-          </a:fontRef>
-        </p:style>
-        <p:txBody>
-          <a:bodyPr rot="0" spcFirstLastPara="0" vertOverflow="overflow" horzOverflow="overflow" vert="horz" wrap="square" lIns="91440" tIns="45720" rIns="91440" bIns="45720" numCol="1" spcCol="0" rtlCol="0" fromWordArt="0" anchor="ctr" anchorCtr="0" forceAA="0" compatLnSpc="1">
-            <a:prstTxWarp prst="textNoShape">
-              <a:avLst/>
-            </a:prstTxWarp>
-            <a:noAutofit/>
-          </a:bodyPr>
-          <a:lstStyle/>
-          <a:p>
-            <a:r>
-              <a:rPr lang="en-US" sz="1100" dirty="0">
-                <a:solidFill>
-                  <a:schemeClr val="tx1"/>
-                </a:solidFill>
-                <a:latin typeface="Arial" panose="020B0604020202020204" pitchFamily="34" charset="0"/>
-                <a:cs typeface="Arial" panose="020B0604020202020204" pitchFamily="34" charset="0"/>
-              </a:rPr>
-              <a:t>Method 1: Use shell script </a:t>
-            </a:r>
-          </a:p>
-          <a:p>
-            <a:r>
-              <a:rPr lang="en-US" sz="1100" dirty="0">
-                <a:solidFill>
-                  <a:schemeClr val="accent1"/>
-                </a:solidFill>
-                <a:latin typeface="Arial" panose="020B0604020202020204" pitchFamily="34" charset="0"/>
-                <a:cs typeface="Arial" panose="020B0604020202020204" pitchFamily="34" charset="0"/>
-              </a:rPr>
-              <a:t>(Script: </a:t>
-            </a:r>
-            <a:r>
-              <a:rPr lang="en-US" sz="1100" dirty="0" err="1">
-                <a:solidFill>
-                  <a:schemeClr val="accent1"/>
-                </a:solidFill>
-                <a:latin typeface="Arial" panose="020B0604020202020204" pitchFamily="34" charset="0"/>
-                <a:cs typeface="Arial" panose="020B0604020202020204" pitchFamily="34" charset="0"/>
-              </a:rPr>
-              <a:t>zowe-install.sh</a:t>
-            </a:r>
-            <a:r>
-              <a:rPr lang="en-US" sz="1100" dirty="0">
-                <a:solidFill>
-                  <a:schemeClr val="accent1"/>
-                </a:solidFill>
-                <a:latin typeface="Arial" panose="020B0604020202020204" pitchFamily="34" charset="0"/>
-                <a:cs typeface="Arial" panose="020B0604020202020204" pitchFamily="34" charset="0"/>
-              </a:rPr>
-              <a:t>)</a:t>
-            </a:r>
-          </a:p>
-        </p:txBody>
-      </p:sp>
-      <p:sp>
-        <p:nvSpPr>
-          <p:cNvPr id="53" name="Rectangle 52">
-            <a:extLst>
-              <a:ext uri="{FF2B5EF4-FFF2-40B4-BE49-F238E27FC236}">
-                <a16:creationId xmlns:a16="http://schemas.microsoft.com/office/drawing/2014/main" id="{20D00F0E-D4CD-F545-8E1F-63A049D7B467}"/>
-              </a:ext>
-            </a:extLst>
-          </p:cNvPr>
-          <p:cNvSpPr/>
-          <p:nvPr/>
-        </p:nvSpPr>
-        <p:spPr>
-          <a:xfrm>
-            <a:off x="6956223" y="7280545"/>
-            <a:ext cx="2317702" cy="307777"/>
-          </a:xfrm>
-          <a:prstGeom prst="rect">
-            <a:avLst/>
-          </a:prstGeom>
-          <a:solidFill>
-            <a:schemeClr val="accent4">
-              <a:lumMod val="20000"/>
-              <a:lumOff val="80000"/>
-            </a:schemeClr>
-          </a:solidFill>
-          <a:ln>
-            <a:solidFill>
-              <a:schemeClr val="accent4">
-                <a:lumMod val="60000"/>
-                <a:lumOff val="40000"/>
-              </a:schemeClr>
-            </a:solidFill>
-            <a:prstDash val="dash"/>
-          </a:ln>
-        </p:spPr>
-        <p:style>
-          <a:lnRef idx="2">
-            <a:schemeClr val="accent1">
-              <a:shade val="50000"/>
-            </a:schemeClr>
-          </a:lnRef>
-          <a:fillRef idx="1">
-            <a:schemeClr val="accent1"/>
-          </a:fillRef>
-          <a:effectRef idx="0">
-            <a:schemeClr val="accent1"/>
-          </a:effectRef>
-          <a:fontRef idx="minor">
-            <a:schemeClr val="lt1"/>
-          </a:fontRef>
-        </p:style>
-        <p:txBody>
-          <a:bodyPr rot="0" spcFirstLastPara="0" vertOverflow="overflow" horzOverflow="overflow" vert="horz" wrap="square" lIns="91440" tIns="45720" rIns="91440" bIns="45720" numCol="1" spcCol="0" rtlCol="0" fromWordArt="0" anchor="ctr" anchorCtr="0" forceAA="0" compatLnSpc="1">
-            <a:prstTxWarp prst="textNoShape">
-              <a:avLst/>
-            </a:prstTxWarp>
-            <a:noAutofit/>
-          </a:bodyPr>
-          <a:lstStyle/>
-          <a:p>
-            <a:r>
-              <a:rPr lang="en-US" sz="1100" dirty="0">
-                <a:solidFill>
-                  <a:schemeClr val="tx1"/>
-                </a:solidFill>
-                <a:latin typeface="Arial" panose="020B0604020202020204" pitchFamily="34" charset="0"/>
-                <a:cs typeface="Arial" panose="020B0604020202020204" pitchFamily="34" charset="0"/>
-              </a:rPr>
-              <a:t>Method 2: Use z/</a:t>
-            </a:r>
-            <a:r>
-              <a:rPr lang="en-US" sz="1100">
-                <a:solidFill>
-                  <a:schemeClr val="tx1"/>
-                </a:solidFill>
-                <a:latin typeface="Arial" panose="020B0604020202020204" pitchFamily="34" charset="0"/>
-                <a:cs typeface="Arial" panose="020B0604020202020204" pitchFamily="34" charset="0"/>
-              </a:rPr>
-              <a:t>OSMF Workflow</a:t>
-            </a:r>
-            <a:endParaRPr lang="en-US" sz="1100" dirty="0">
-              <a:solidFill>
-                <a:schemeClr val="tx1"/>
-              </a:solidFill>
-              <a:latin typeface="Arial" panose="020B0604020202020204" pitchFamily="34" charset="0"/>
-              <a:cs typeface="Arial" panose="020B0604020202020204" pitchFamily="34" charset="0"/>
-            </a:endParaRPr>
-          </a:p>
-        </p:txBody>
-      </p:sp>
-      <p:sp>
-        <p:nvSpPr>
-          <p:cNvPr id="68" name="Rectangle 67">
-            <a:extLst>
-              <a:ext uri="{FF2B5EF4-FFF2-40B4-BE49-F238E27FC236}">
-                <a16:creationId xmlns:a16="http://schemas.microsoft.com/office/drawing/2014/main" id="{D669B208-6833-D847-9550-91D3FC0D2ACA}"/>
-              </a:ext>
-            </a:extLst>
-          </p:cNvPr>
-          <p:cNvSpPr/>
-          <p:nvPr/>
-        </p:nvSpPr>
-        <p:spPr>
-          <a:xfrm>
-            <a:off x="3146093" y="10072357"/>
-            <a:ext cx="2474599" cy="503314"/>
-          </a:xfrm>
-          <a:prstGeom prst="rect">
-            <a:avLst/>
-          </a:prstGeom>
-          <a:solidFill>
-            <a:srgbClr val="DEECF8"/>
-          </a:solidFill>
-          <a:ln>
-            <a:solidFill>
-              <a:schemeClr val="accent5">
-                <a:lumMod val="60000"/>
-                <a:lumOff val="40000"/>
-              </a:schemeClr>
-            </a:solidFill>
-            <a:prstDash val="dash"/>
-          </a:ln>
-        </p:spPr>
-        <p:style>
-          <a:lnRef idx="2">
-            <a:schemeClr val="accent1">
-              <a:shade val="50000"/>
-            </a:schemeClr>
-          </a:lnRef>
-          <a:fillRef idx="1">
-            <a:schemeClr val="accent1"/>
-          </a:fillRef>
-          <a:effectRef idx="0">
-            <a:schemeClr val="accent1"/>
-          </a:effectRef>
-          <a:fontRef idx="minor">
-            <a:schemeClr val="lt1"/>
-          </a:fontRef>
-        </p:style>
-        <p:txBody>
-          <a:bodyPr rot="0" spcFirstLastPara="0" vertOverflow="overflow" horzOverflow="overflow" vert="horz" wrap="square" lIns="91440" tIns="45720" rIns="91440" bIns="45720" numCol="1" spcCol="0" rtlCol="0" fromWordArt="0" anchor="ctr" anchorCtr="0" forceAA="0" compatLnSpc="1">
-            <a:prstTxWarp prst="textNoShape">
-              <a:avLst/>
-            </a:prstTxWarp>
-            <a:noAutofit/>
-          </a:bodyPr>
-          <a:lstStyle/>
-          <a:p>
-            <a:r>
-              <a:rPr lang="en-US" sz="1100" dirty="0">
-                <a:solidFill>
-                  <a:schemeClr val="tx1"/>
-                </a:solidFill>
-                <a:latin typeface="Arial" panose="020B0604020202020204" pitchFamily="34" charset="0"/>
-                <a:cs typeface="Arial" panose="020B0604020202020204" pitchFamily="34" charset="0"/>
-              </a:rPr>
-              <a:t>Method 1: Use shell script </a:t>
-            </a:r>
-          </a:p>
-          <a:p>
-            <a:r>
-              <a:rPr lang="en-US" sz="1100" dirty="0">
-                <a:solidFill>
-                  <a:schemeClr val="accent1"/>
-                </a:solidFill>
-                <a:latin typeface="Arial" panose="020B0604020202020204" pitchFamily="34" charset="0"/>
-                <a:cs typeface="Arial" panose="020B0604020202020204" pitchFamily="34" charset="0"/>
-              </a:rPr>
-              <a:t>(Script: </a:t>
-            </a:r>
-            <a:r>
-              <a:rPr lang="en-US" sz="1100" dirty="0" err="1">
-                <a:solidFill>
-                  <a:schemeClr val="accent1"/>
-                </a:solidFill>
-                <a:latin typeface="Arial" panose="020B0604020202020204" pitchFamily="34" charset="0"/>
-                <a:cs typeface="Arial" panose="020B0604020202020204" pitchFamily="34" charset="0"/>
-              </a:rPr>
-              <a:t>zowe</a:t>
-            </a:r>
-            <a:r>
-              <a:rPr lang="en-US" sz="1100" dirty="0">
-                <a:solidFill>
-                  <a:schemeClr val="accent1"/>
-                </a:solidFill>
-                <a:latin typeface="Arial" panose="020B0604020202020204" pitchFamily="34" charset="0"/>
-                <a:cs typeface="Arial" panose="020B0604020202020204" pitchFamily="34" charset="0"/>
-              </a:rPr>
-              <a:t>-setup-</a:t>
-            </a:r>
-            <a:r>
-              <a:rPr lang="en-US" sz="1100" dirty="0" err="1">
-                <a:solidFill>
-                  <a:schemeClr val="accent1"/>
-                </a:solidFill>
-                <a:latin typeface="Arial" panose="020B0604020202020204" pitchFamily="34" charset="0"/>
-                <a:cs typeface="Arial" panose="020B0604020202020204" pitchFamily="34" charset="0"/>
-              </a:rPr>
-              <a:t>certificates.sh</a:t>
-            </a:r>
-            <a:r>
-              <a:rPr lang="en-US" sz="1100" dirty="0">
-                <a:solidFill>
-                  <a:schemeClr val="accent1"/>
-                </a:solidFill>
-                <a:latin typeface="Arial" panose="020B0604020202020204" pitchFamily="34" charset="0"/>
-                <a:cs typeface="Arial" panose="020B0604020202020204" pitchFamily="34" charset="0"/>
-              </a:rPr>
-              <a:t>)</a:t>
-            </a:r>
-          </a:p>
-        </p:txBody>
-      </p:sp>
-      <p:sp>
-        <p:nvSpPr>
-          <p:cNvPr id="69" name="Rectangle 68">
-            <a:extLst>
-              <a:ext uri="{FF2B5EF4-FFF2-40B4-BE49-F238E27FC236}">
-                <a16:creationId xmlns:a16="http://schemas.microsoft.com/office/drawing/2014/main" id="{58EED663-37F9-F245-802C-26BFB766AD91}"/>
-              </a:ext>
-            </a:extLst>
-          </p:cNvPr>
-          <p:cNvSpPr/>
-          <p:nvPr/>
-        </p:nvSpPr>
-        <p:spPr>
-          <a:xfrm>
-            <a:off x="5738057" y="10072287"/>
-            <a:ext cx="2361039" cy="499558"/>
-          </a:xfrm>
-          <a:prstGeom prst="rect">
-            <a:avLst/>
-          </a:prstGeom>
-          <a:solidFill>
-            <a:srgbClr val="DEECF8"/>
-          </a:solidFill>
-          <a:ln>
-            <a:solidFill>
-              <a:schemeClr val="accent5">
-                <a:lumMod val="60000"/>
-                <a:lumOff val="40000"/>
-              </a:schemeClr>
-            </a:solidFill>
-            <a:prstDash val="dash"/>
-          </a:ln>
-        </p:spPr>
-        <p:style>
-          <a:lnRef idx="2">
-            <a:schemeClr val="accent1">
-              <a:shade val="50000"/>
-            </a:schemeClr>
-          </a:lnRef>
-          <a:fillRef idx="1">
-            <a:schemeClr val="accent1"/>
-          </a:fillRef>
-          <a:effectRef idx="0">
-            <a:schemeClr val="accent1"/>
-          </a:effectRef>
-          <a:fontRef idx="minor">
-            <a:schemeClr val="lt1"/>
-          </a:fontRef>
-        </p:style>
-        <p:txBody>
-          <a:bodyPr rot="0" spcFirstLastPara="0" vertOverflow="overflow" horzOverflow="overflow" vert="horz" wrap="square" lIns="91440" tIns="45720" rIns="91440" bIns="45720" numCol="1" spcCol="0" rtlCol="0" fromWordArt="0" anchor="ctr" anchorCtr="0" forceAA="0" compatLnSpc="1">
-            <a:prstTxWarp prst="textNoShape">
-              <a:avLst/>
-            </a:prstTxWarp>
-            <a:noAutofit/>
-          </a:bodyPr>
-          <a:lstStyle/>
-          <a:p>
-            <a:r>
-              <a:rPr lang="en-US" sz="1100" dirty="0">
-                <a:solidFill>
-                  <a:schemeClr val="tx1"/>
-                </a:solidFill>
-                <a:latin typeface="Arial" panose="020B0604020202020204" pitchFamily="34" charset="0"/>
-                <a:cs typeface="Arial" panose="020B0604020202020204" pitchFamily="34" charset="0"/>
-              </a:rPr>
-              <a:t>Method 2: Use z/OSMF Workflow</a:t>
-            </a:r>
-          </a:p>
-        </p:txBody>
-      </p:sp>
-      <p:sp>
-        <p:nvSpPr>
-          <p:cNvPr id="73" name="Rectangle 72">
-            <a:extLst>
-              <a:ext uri="{FF2B5EF4-FFF2-40B4-BE49-F238E27FC236}">
-                <a16:creationId xmlns:a16="http://schemas.microsoft.com/office/drawing/2014/main" id="{0DD4F608-E798-6F4B-8A90-39D3F7736AB6}"/>
-              </a:ext>
-            </a:extLst>
-          </p:cNvPr>
-          <p:cNvSpPr/>
-          <p:nvPr/>
-        </p:nvSpPr>
-        <p:spPr>
-          <a:xfrm>
-            <a:off x="3120706" y="8610886"/>
-            <a:ext cx="2474599" cy="503314"/>
-          </a:xfrm>
-          <a:prstGeom prst="rect">
-            <a:avLst/>
-          </a:prstGeom>
-          <a:solidFill>
-            <a:srgbClr val="DEECF8"/>
-          </a:solidFill>
-          <a:ln>
-            <a:solidFill>
-              <a:schemeClr val="accent5">
-                <a:lumMod val="60000"/>
-                <a:lumOff val="40000"/>
-              </a:schemeClr>
-            </a:solidFill>
-            <a:prstDash val="dash"/>
-          </a:ln>
-        </p:spPr>
-        <p:style>
-          <a:lnRef idx="2">
-            <a:schemeClr val="accent1">
-              <a:shade val="50000"/>
-            </a:schemeClr>
-          </a:lnRef>
-          <a:fillRef idx="1">
-            <a:schemeClr val="accent1"/>
-          </a:fillRef>
-          <a:effectRef idx="0">
-            <a:schemeClr val="accent1"/>
-          </a:effectRef>
-          <a:fontRef idx="minor">
-            <a:schemeClr val="lt1"/>
-          </a:fontRef>
-        </p:style>
-        <p:txBody>
-          <a:bodyPr rot="0" spcFirstLastPara="0" vertOverflow="overflow" horzOverflow="overflow" vert="horz" wrap="square" lIns="91440" tIns="45720" rIns="91440" bIns="45720" numCol="1" spcCol="0" rtlCol="0" fromWordArt="0" anchor="ctr" anchorCtr="0" forceAA="0" compatLnSpc="1">
-            <a:prstTxWarp prst="textNoShape">
-              <a:avLst/>
-            </a:prstTxWarp>
-            <a:noAutofit/>
-          </a:bodyPr>
-          <a:lstStyle/>
-          <a:p>
-            <a:pPr algn="ctr"/>
-            <a:r>
-              <a:rPr lang="en-US" sz="1100" dirty="0">
-                <a:solidFill>
-                  <a:schemeClr val="tx1"/>
-                </a:solidFill>
-                <a:latin typeface="Arial" panose="020B0604020202020204" pitchFamily="34" charset="0"/>
-                <a:cs typeface="Arial" panose="020B0604020202020204" pitchFamily="34" charset="0"/>
-              </a:rPr>
-              <a:t>Method 1: Use JCL</a:t>
-            </a:r>
-          </a:p>
-          <a:p>
-            <a:pPr algn="ctr"/>
-            <a:r>
-              <a:rPr lang="en-US" sz="1100" dirty="0">
-                <a:solidFill>
-                  <a:schemeClr val="accent1"/>
-                </a:solidFill>
-                <a:latin typeface="Arial" panose="020B0604020202020204" pitchFamily="34" charset="0"/>
-                <a:cs typeface="Arial" panose="020B0604020202020204" pitchFamily="34" charset="0"/>
-              </a:rPr>
-              <a:t>(JCL: ZWESECUR)</a:t>
-            </a:r>
-          </a:p>
-        </p:txBody>
-      </p:sp>
-      <p:sp>
-        <p:nvSpPr>
-          <p:cNvPr id="74" name="Rectangle 73">
-            <a:extLst>
-              <a:ext uri="{FF2B5EF4-FFF2-40B4-BE49-F238E27FC236}">
-                <a16:creationId xmlns:a16="http://schemas.microsoft.com/office/drawing/2014/main" id="{7E0FAF8F-3D46-0F4E-9992-07F484E98B22}"/>
-              </a:ext>
-            </a:extLst>
-          </p:cNvPr>
-          <p:cNvSpPr/>
-          <p:nvPr/>
-        </p:nvSpPr>
-        <p:spPr>
-          <a:xfrm>
-            <a:off x="5697519" y="8601370"/>
-            <a:ext cx="2401577" cy="509885"/>
-          </a:xfrm>
-          <a:prstGeom prst="rect">
-            <a:avLst/>
-          </a:prstGeom>
-          <a:solidFill>
-            <a:srgbClr val="DEECF8"/>
-          </a:solidFill>
-          <a:ln>
-            <a:solidFill>
-              <a:schemeClr val="accent5">
-                <a:lumMod val="60000"/>
-                <a:lumOff val="40000"/>
-              </a:schemeClr>
-            </a:solidFill>
-            <a:prstDash val="dash"/>
-          </a:ln>
-        </p:spPr>
-        <p:style>
-          <a:lnRef idx="2">
-            <a:schemeClr val="accent1">
-              <a:shade val="50000"/>
-            </a:schemeClr>
-          </a:lnRef>
-          <a:fillRef idx="1">
-            <a:schemeClr val="accent1"/>
-          </a:fillRef>
-          <a:effectRef idx="0">
-            <a:schemeClr val="accent1"/>
-          </a:effectRef>
-          <a:fontRef idx="minor">
-            <a:schemeClr val="lt1"/>
-          </a:fontRef>
-        </p:style>
-        <p:txBody>
-          <a:bodyPr rot="0" spcFirstLastPara="0" vertOverflow="overflow" horzOverflow="overflow" vert="horz" wrap="square" lIns="91440" tIns="45720" rIns="91440" bIns="45720" numCol="1" spcCol="0" rtlCol="0" fromWordArt="0" anchor="ctr" anchorCtr="0" forceAA="0" compatLnSpc="1">
-            <a:prstTxWarp prst="textNoShape">
-              <a:avLst/>
-            </a:prstTxWarp>
-            <a:noAutofit/>
-          </a:bodyPr>
-          <a:lstStyle/>
-          <a:p>
-            <a:r>
-              <a:rPr lang="en-US" sz="1100" dirty="0">
-                <a:solidFill>
-                  <a:schemeClr val="tx1"/>
-                </a:solidFill>
-                <a:latin typeface="Arial" panose="020B0604020202020204" pitchFamily="34" charset="0"/>
-                <a:cs typeface="Arial" panose="020B0604020202020204" pitchFamily="34" charset="0"/>
-              </a:rPr>
-              <a:t>Method 2: Use z/OSMF Workflow</a:t>
-            </a:r>
-          </a:p>
-        </p:txBody>
-      </p:sp>
-      <p:sp>
-        <p:nvSpPr>
-          <p:cNvPr id="76" name="Rectangle 75">
-            <a:extLst>
-              <a:ext uri="{FF2B5EF4-FFF2-40B4-BE49-F238E27FC236}">
-                <a16:creationId xmlns:a16="http://schemas.microsoft.com/office/drawing/2014/main" id="{EE3CF47B-5654-8745-9DF1-4AB8E56948E3}"/>
-              </a:ext>
-            </a:extLst>
-          </p:cNvPr>
-          <p:cNvSpPr/>
-          <p:nvPr/>
-        </p:nvSpPr>
-        <p:spPr>
-          <a:xfrm>
-            <a:off x="3165873" y="11353805"/>
-            <a:ext cx="2474599" cy="503314"/>
-          </a:xfrm>
-          <a:prstGeom prst="rect">
-            <a:avLst/>
-          </a:prstGeom>
-          <a:solidFill>
-            <a:srgbClr val="DEECF8"/>
-          </a:solidFill>
-          <a:ln>
-            <a:solidFill>
-              <a:schemeClr val="accent5">
-                <a:lumMod val="60000"/>
-                <a:lumOff val="40000"/>
-              </a:schemeClr>
-            </a:solidFill>
-            <a:prstDash val="dash"/>
-          </a:ln>
-        </p:spPr>
-        <p:style>
-          <a:lnRef idx="2">
-            <a:schemeClr val="accent1">
-              <a:shade val="50000"/>
-            </a:schemeClr>
-          </a:lnRef>
-          <a:fillRef idx="1">
-            <a:schemeClr val="accent1"/>
-          </a:fillRef>
-          <a:effectRef idx="0">
-            <a:schemeClr val="accent1"/>
-          </a:effectRef>
-          <a:fontRef idx="minor">
-            <a:schemeClr val="lt1"/>
-          </a:fontRef>
-        </p:style>
-        <p:txBody>
-          <a:bodyPr rot="0" spcFirstLastPara="0" vertOverflow="overflow" horzOverflow="overflow" vert="horz" wrap="square" lIns="91440" tIns="45720" rIns="91440" bIns="45720" numCol="1" spcCol="0" rtlCol="0" fromWordArt="0" anchor="ctr" anchorCtr="0" forceAA="0" compatLnSpc="1">
-            <a:prstTxWarp prst="textNoShape">
-              <a:avLst/>
-            </a:prstTxWarp>
-            <a:noAutofit/>
-          </a:bodyPr>
-          <a:lstStyle/>
-          <a:p>
-            <a:r>
-              <a:rPr lang="en-US" sz="1100" dirty="0">
-                <a:solidFill>
-                  <a:schemeClr val="tx1"/>
-                </a:solidFill>
-                <a:latin typeface="Arial" panose="020B0604020202020204" pitchFamily="34" charset="0"/>
-                <a:cs typeface="Arial" panose="020B0604020202020204" pitchFamily="34" charset="0"/>
-              </a:rPr>
-              <a:t>Method 1: Use shell script </a:t>
-            </a:r>
-          </a:p>
-          <a:p>
-            <a:r>
-              <a:rPr lang="en-US" sz="1100" dirty="0">
-                <a:solidFill>
-                  <a:schemeClr val="accent1"/>
-                </a:solidFill>
-                <a:latin typeface="Arial" panose="020B0604020202020204" pitchFamily="34" charset="0"/>
-                <a:cs typeface="Arial" panose="020B0604020202020204" pitchFamily="34" charset="0"/>
-              </a:rPr>
-              <a:t>(Script: </a:t>
-            </a:r>
-            <a:r>
-              <a:rPr lang="en-US" sz="1100" dirty="0" err="1">
-                <a:solidFill>
-                  <a:schemeClr val="accent1"/>
-                </a:solidFill>
-                <a:latin typeface="Arial" panose="020B0604020202020204" pitchFamily="34" charset="0"/>
-                <a:cs typeface="Arial" panose="020B0604020202020204" pitchFamily="34" charset="0"/>
-              </a:rPr>
-              <a:t>zowe</a:t>
-            </a:r>
-            <a:r>
-              <a:rPr lang="en-US" sz="1100" dirty="0">
-                <a:solidFill>
-                  <a:schemeClr val="accent1"/>
-                </a:solidFill>
-                <a:latin typeface="Arial" panose="020B0604020202020204" pitchFamily="34" charset="0"/>
-                <a:cs typeface="Arial" panose="020B0604020202020204" pitchFamily="34" charset="0"/>
-              </a:rPr>
-              <a:t>-configure-</a:t>
-            </a:r>
-            <a:r>
-              <a:rPr lang="en-US" sz="1100" dirty="0" err="1">
-                <a:solidFill>
-                  <a:schemeClr val="accent1"/>
-                </a:solidFill>
-                <a:latin typeface="Arial" panose="020B0604020202020204" pitchFamily="34" charset="0"/>
-                <a:cs typeface="Arial" panose="020B0604020202020204" pitchFamily="34" charset="0"/>
-              </a:rPr>
-              <a:t>instance.sh</a:t>
-            </a:r>
-            <a:r>
-              <a:rPr lang="en-US" sz="1100" dirty="0">
-                <a:solidFill>
-                  <a:schemeClr val="accent1"/>
-                </a:solidFill>
-                <a:latin typeface="Arial" panose="020B0604020202020204" pitchFamily="34" charset="0"/>
-                <a:cs typeface="Arial" panose="020B0604020202020204" pitchFamily="34" charset="0"/>
-              </a:rPr>
-              <a:t>)</a:t>
-            </a:r>
-          </a:p>
-        </p:txBody>
-      </p:sp>
-      <p:sp>
-        <p:nvSpPr>
-          <p:cNvPr id="77" name="Rectangle 76">
-            <a:extLst>
-              <a:ext uri="{FF2B5EF4-FFF2-40B4-BE49-F238E27FC236}">
-                <a16:creationId xmlns:a16="http://schemas.microsoft.com/office/drawing/2014/main" id="{72BA429A-185B-6542-80B5-60AC80328BC4}"/>
-              </a:ext>
-            </a:extLst>
-          </p:cNvPr>
-          <p:cNvSpPr/>
-          <p:nvPr/>
-        </p:nvSpPr>
-        <p:spPr>
-          <a:xfrm>
-            <a:off x="5760147" y="11351003"/>
-            <a:ext cx="2338949" cy="515061"/>
-          </a:xfrm>
-          <a:prstGeom prst="rect">
-            <a:avLst/>
-          </a:prstGeom>
-          <a:solidFill>
-            <a:srgbClr val="DEECF8"/>
-          </a:solidFill>
-          <a:ln>
-            <a:solidFill>
-              <a:schemeClr val="accent5">
-                <a:lumMod val="60000"/>
-                <a:lumOff val="40000"/>
-              </a:schemeClr>
-            </a:solidFill>
-            <a:prstDash val="dash"/>
-          </a:ln>
-        </p:spPr>
-        <p:style>
-          <a:lnRef idx="2">
-            <a:schemeClr val="accent1">
-              <a:shade val="50000"/>
-            </a:schemeClr>
-          </a:lnRef>
-          <a:fillRef idx="1">
-            <a:schemeClr val="accent1"/>
-          </a:fillRef>
-          <a:effectRef idx="0">
-            <a:schemeClr val="accent1"/>
-          </a:effectRef>
-          <a:fontRef idx="minor">
-            <a:schemeClr val="lt1"/>
-          </a:fontRef>
-        </p:style>
-        <p:txBody>
-          <a:bodyPr rot="0" spcFirstLastPara="0" vertOverflow="overflow" horzOverflow="overflow" vert="horz" wrap="square" lIns="91440" tIns="45720" rIns="91440" bIns="45720" numCol="1" spcCol="0" rtlCol="0" fromWordArt="0" anchor="ctr" anchorCtr="0" forceAA="0" compatLnSpc="1">
-            <a:prstTxWarp prst="textNoShape">
-              <a:avLst/>
-            </a:prstTxWarp>
-            <a:noAutofit/>
-          </a:bodyPr>
-          <a:lstStyle/>
-          <a:p>
-            <a:r>
-              <a:rPr lang="en-US" sz="1100" dirty="0">
-                <a:solidFill>
-                  <a:schemeClr val="tx1"/>
-                </a:solidFill>
-                <a:latin typeface="Arial" panose="020B0604020202020204" pitchFamily="34" charset="0"/>
-                <a:cs typeface="Arial" panose="020B0604020202020204" pitchFamily="34" charset="0"/>
-              </a:rPr>
-              <a:t>Method 2: Use z/OSMF Workflow</a:t>
-            </a:r>
-          </a:p>
-        </p:txBody>
-      </p:sp>
-      <p:cxnSp>
-        <p:nvCxnSpPr>
-          <p:cNvPr id="60" name="Straight Arrow Connector 59">
-            <a:extLst>
-              <a:ext uri="{FF2B5EF4-FFF2-40B4-BE49-F238E27FC236}">
-                <a16:creationId xmlns:a16="http://schemas.microsoft.com/office/drawing/2014/main" id="{80584741-C0CA-8844-A96F-8DFB5F6261FA}"/>
-              </a:ext>
-            </a:extLst>
-          </p:cNvPr>
-          <p:cNvCxnSpPr>
-            <a:cxnSpLocks/>
-          </p:cNvCxnSpPr>
-          <p:nvPr/>
-        </p:nvCxnSpPr>
-        <p:spPr>
-          <a:xfrm>
-            <a:off x="5624306" y="10711266"/>
-            <a:ext cx="0" cy="340330"/>
-          </a:xfrm>
-          <a:prstGeom prst="straightConnector1">
-            <a:avLst/>
-          </a:prstGeom>
-          <a:ln>
-            <a:solidFill>
-              <a:schemeClr val="tx1">
-                <a:lumMod val="50000"/>
-                <a:lumOff val="50000"/>
-              </a:schemeClr>
-            </a:solidFill>
-            <a:tailEnd type="triangle"/>
-          </a:ln>
-        </p:spPr>
-        <p:style>
-          <a:lnRef idx="1">
-            <a:schemeClr val="accent1"/>
-          </a:lnRef>
-          <a:fillRef idx="0">
-            <a:schemeClr val="accent1"/>
-          </a:fillRef>
-          <a:effectRef idx="0">
-            <a:schemeClr val="accent1"/>
-          </a:effectRef>
-          <a:fontRef idx="minor">
-            <a:schemeClr val="tx1"/>
-          </a:fontRef>
-        </p:style>
-      </p:cxnSp>
-      <p:cxnSp>
-        <p:nvCxnSpPr>
-          <p:cNvPr id="61" name="Straight Arrow Connector 60">
-            <a:extLst>
-              <a:ext uri="{FF2B5EF4-FFF2-40B4-BE49-F238E27FC236}">
-                <a16:creationId xmlns:a16="http://schemas.microsoft.com/office/drawing/2014/main" id="{1428AE51-8321-614B-9F78-E711328B7082}"/>
-              </a:ext>
-            </a:extLst>
-          </p:cNvPr>
-          <p:cNvCxnSpPr>
-            <a:cxnSpLocks/>
-          </p:cNvCxnSpPr>
-          <p:nvPr/>
-        </p:nvCxnSpPr>
-        <p:spPr>
-          <a:xfrm>
-            <a:off x="5596089" y="11958870"/>
-            <a:ext cx="0" cy="340330"/>
-          </a:xfrm>
-          <a:prstGeom prst="straightConnector1">
-            <a:avLst/>
-          </a:prstGeom>
-          <a:ln>
-            <a:solidFill>
-              <a:schemeClr val="tx1">
-                <a:lumMod val="50000"/>
-                <a:lumOff val="50000"/>
-              </a:schemeClr>
-            </a:solidFill>
-            <a:tailEnd type="triangle"/>
-          </a:ln>
-        </p:spPr>
-        <p:style>
-          <a:lnRef idx="1">
-            <a:schemeClr val="accent1"/>
-          </a:lnRef>
-          <a:fillRef idx="0">
-            <a:schemeClr val="accent1"/>
-          </a:fillRef>
-          <a:effectRef idx="0">
-            <a:schemeClr val="accent1"/>
-          </a:effectRef>
-          <a:fontRef idx="minor">
-            <a:schemeClr val="tx1"/>
-          </a:fontRef>
-        </p:style>
-      </p:cxnSp>
-      <p:cxnSp>
-        <p:nvCxnSpPr>
-          <p:cNvPr id="79" name="Straight Arrow Connector 78">
-            <a:extLst>
-              <a:ext uri="{FF2B5EF4-FFF2-40B4-BE49-F238E27FC236}">
-                <a16:creationId xmlns:a16="http://schemas.microsoft.com/office/drawing/2014/main" id="{90624AB8-1AEC-0B4E-9CB1-79D29B4301AE}"/>
-              </a:ext>
-            </a:extLst>
-          </p:cNvPr>
-          <p:cNvCxnSpPr>
-            <a:cxnSpLocks/>
-          </p:cNvCxnSpPr>
-          <p:nvPr/>
-        </p:nvCxnSpPr>
-        <p:spPr>
-          <a:xfrm>
-            <a:off x="5580062" y="13007819"/>
-            <a:ext cx="0" cy="340330"/>
-          </a:xfrm>
-          <a:prstGeom prst="straightConnector1">
-            <a:avLst/>
-          </a:prstGeom>
-          <a:ln>
-            <a:solidFill>
-              <a:schemeClr val="tx1">
-                <a:lumMod val="50000"/>
-                <a:lumOff val="50000"/>
-              </a:schemeClr>
-            </a:solidFill>
-            <a:tailEnd type="triangle"/>
-          </a:ln>
-        </p:spPr>
-        <p:style>
-          <a:lnRef idx="1">
-            <a:schemeClr val="accent1"/>
-          </a:lnRef>
-          <a:fillRef idx="0">
-            <a:schemeClr val="accent1"/>
-          </a:fillRef>
-          <a:effectRef idx="0">
-            <a:schemeClr val="accent1"/>
-          </a:effectRef>
-          <a:fontRef idx="minor">
-            <a:schemeClr val="tx1"/>
-          </a:fontRef>
-        </p:style>
-      </p:cxnSp>
-      <p:cxnSp>
-        <p:nvCxnSpPr>
-          <p:cNvPr id="80" name="Straight Arrow Connector 79">
-            <a:extLst>
-              <a:ext uri="{FF2B5EF4-FFF2-40B4-BE49-F238E27FC236}">
-                <a16:creationId xmlns:a16="http://schemas.microsoft.com/office/drawing/2014/main" id="{30184696-6146-BE47-B491-F25D60E7D167}"/>
-              </a:ext>
-            </a:extLst>
-          </p:cNvPr>
-          <p:cNvCxnSpPr>
-            <a:cxnSpLocks/>
-          </p:cNvCxnSpPr>
-          <p:nvPr/>
-        </p:nvCxnSpPr>
-        <p:spPr>
-          <a:xfrm>
-            <a:off x="5566593" y="13978051"/>
-            <a:ext cx="0" cy="464090"/>
-          </a:xfrm>
-          <a:prstGeom prst="straightConnector1">
-            <a:avLst/>
-          </a:prstGeom>
-          <a:ln>
-            <a:solidFill>
-              <a:schemeClr val="tx1">
-                <a:lumMod val="50000"/>
-                <a:lumOff val="50000"/>
-              </a:schemeClr>
-            </a:solidFill>
-            <a:tailEnd type="triangle"/>
-          </a:ln>
-        </p:spPr>
-        <p:style>
-          <a:lnRef idx="1">
-            <a:schemeClr val="accent1"/>
-          </a:lnRef>
-          <a:fillRef idx="0">
-            <a:schemeClr val="accent1"/>
-          </a:fillRef>
-          <a:effectRef idx="0">
-            <a:schemeClr val="accent1"/>
-          </a:effectRef>
-          <a:fontRef idx="minor">
-            <a:schemeClr val="tx1"/>
-          </a:fontRef>
-        </p:style>
-      </p:cxnSp>
-    </p:spTree>
-    <p:extLst>
-      <p:ext uri="{BB962C8B-B14F-4D97-AF65-F5344CB8AC3E}">
-        <p14:creationId xmlns:p14="http://schemas.microsoft.com/office/powerpoint/2010/main" val="960402841"/>
-      </p:ext>
-    </p:extLst>
-  </p:cSld>
-  <p:clrMapOvr>
-    <a:masterClrMapping/>
-  </p:clrMapOvr>
-  <mc:AlternateContent xmlns:mc="http://schemas.openxmlformats.org/markup-compatibility/2006">
-    <mc:Choice xmlns:p14="http://schemas.microsoft.com/office/powerpoint/2010/main" Requires="p14">
-      <p:transition spd="slow" p14:dur="2000"/>
-    </mc:Choice>
-    <mc:Fallback>
-      <p:transition spd="slow"/>
-    </mc:Fallback>
-  </mc:AlternateContent>
-</p:sld>
-</file>
-
-<file path=ppt/slides/slide2.xml><?xml version="1.0" encoding="utf-8"?>
 <p:sld xmlns:a="http://schemas.openxmlformats.org/drawingml/2006/main" xmlns:r="http://schemas.openxmlformats.org/officeDocument/2006/relationships" xmlns:p="http://schemas.openxmlformats.org/presentationml/2006/main">
   <p:cSld>
     <p:spTree>
@@ -7719,7 +3377,7 @@
         </p:nvSpPr>
         <p:spPr>
           <a:xfrm>
-            <a:off x="1068883" y="3767003"/>
+            <a:off x="846812" y="4158891"/>
             <a:ext cx="2250655" cy="558971"/>
           </a:xfrm>
           <a:prstGeom prst="rect">
@@ -7952,7 +3610,7 @@
         </p:nvSpPr>
         <p:spPr>
           <a:xfrm>
-            <a:off x="1318877" y="4468926"/>
+            <a:off x="1096806" y="4991444"/>
             <a:ext cx="1750668" cy="757568"/>
           </a:xfrm>
           <a:prstGeom prst="rect">
@@ -10356,8 +6014,8 @@
         </p:nvCxnSpPr>
         <p:spPr>
           <a:xfrm rot="10800000" flipV="1">
-            <a:off x="2194212" y="3553835"/>
-            <a:ext cx="1700903" cy="213167"/>
+            <a:off x="1972140" y="3553835"/>
+            <a:ext cx="1922974" cy="605055"/>
           </a:xfrm>
           <a:prstGeom prst="bentConnector2">
             <a:avLst/>
@@ -10750,8 +6408,8 @@
         </p:nvCxnSpPr>
         <p:spPr>
           <a:xfrm>
-            <a:off x="2194211" y="4325974"/>
-            <a:ext cx="0" cy="142952"/>
+            <a:off x="1972140" y="4717862"/>
+            <a:ext cx="0" cy="273582"/>
           </a:xfrm>
           <a:prstGeom prst="straightConnector1">
             <a:avLst/>
@@ -11266,7 +6924,7 @@
         <p:spPr>
           <a:xfrm>
             <a:off x="726470" y="7579011"/>
-            <a:ext cx="7098423" cy="509925"/>
+            <a:ext cx="7183701" cy="509925"/>
           </a:xfrm>
           <a:prstGeom prst="rect">
             <a:avLst/>
@@ -11384,14 +7042,15 @@
             </a:extLst>
           </p:cNvPr>
           <p:cNvCxnSpPr>
+            <a:cxnSpLocks/>
             <a:stCxn id="19" idx="2"/>
           </p:cNvCxnSpPr>
           <p:nvPr/>
         </p:nvCxnSpPr>
         <p:spPr>
           <a:xfrm>
-            <a:off x="2194211" y="5226494"/>
-            <a:ext cx="9507" cy="2396002"/>
+            <a:off x="1972140" y="5749012"/>
+            <a:ext cx="0" cy="1806638"/>
           </a:xfrm>
           <a:prstGeom prst="straightConnector1">
             <a:avLst/>
@@ -11438,8 +7097,8 @@
         </p:nvCxnSpPr>
         <p:spPr>
           <a:xfrm>
-            <a:off x="3567803" y="7162899"/>
-            <a:ext cx="0" cy="432000"/>
+            <a:off x="3567804" y="7162899"/>
+            <a:ext cx="0" cy="392751"/>
           </a:xfrm>
           <a:prstGeom prst="straightConnector1">
             <a:avLst/>
@@ -12507,7 +8166,7 @@
         </p:nvSpPr>
         <p:spPr>
           <a:xfrm>
-            <a:off x="7824893" y="3767003"/>
+            <a:off x="7910175" y="4146586"/>
             <a:ext cx="2243289" cy="558971"/>
           </a:xfrm>
           <a:prstGeom prst="rect">
@@ -12559,27 +8218,7 @@
                 <a:latin typeface="Arial" panose="020B0604020202020204" pitchFamily="34" charset="0"/>
                 <a:cs typeface="Arial" panose="020B0604020202020204" pitchFamily="34" charset="0"/>
               </a:rPr>
-              <a:t>Download the </a:t>
-            </a:r>
-            <a:r>
-              <a:rPr lang="en-US" sz="1100" dirty="0" smtClean="0">
-                <a:solidFill>
-                  <a:schemeClr val="tx1"/>
-                </a:solidFill>
-                <a:latin typeface="Arial" panose="020B0604020202020204" pitchFamily="34" charset="0"/>
-                <a:cs typeface="Arial" panose="020B0604020202020204" pitchFamily="34" charset="0"/>
-              </a:rPr>
-              <a:t>PSWI </a:t>
-            </a:r>
-            <a:r>
-              <a:rPr lang="en-US" sz="1100" dirty="0">
-                <a:solidFill>
-                  <a:schemeClr val="tx1"/>
-                </a:solidFill>
-                <a:latin typeface="Arial" panose="020B0604020202020204" pitchFamily="34" charset="0"/>
-                <a:cs typeface="Arial" panose="020B0604020202020204" pitchFamily="34" charset="0"/>
-              </a:rPr>
-              <a:t>build</a:t>
+              <a:t>Download the PSWI build</a:t>
             </a:r>
           </a:p>
         </p:txBody>
@@ -12602,7 +8241,7 @@
         <p:spPr>
           <a:xfrm>
             <a:off x="6454852" y="3553836"/>
-            <a:ext cx="2491686" cy="213167"/>
+            <a:ext cx="2576968" cy="592750"/>
           </a:xfrm>
           <a:prstGeom prst="bentConnector2">
             <a:avLst/>
@@ -12660,7 +8299,7 @@
           <a:lstStyle/>
           <a:p>
             <a:r>
-              <a:rPr lang="en-US" sz="1100" dirty="0" smtClean="0">
+              <a:rPr lang="en-US" sz="1100" dirty="0">
                 <a:solidFill>
                   <a:schemeClr val="accent2">
                     <a:lumMod val="75000"/>
@@ -12671,15 +8310,6 @@
               </a:rPr>
               <a:t>Portable software instance (PSWI)</a:t>
             </a:r>
-            <a:endParaRPr lang="en-US" sz="1100" dirty="0">
-              <a:solidFill>
-                <a:schemeClr val="accent2">
-                  <a:lumMod val="75000"/>
-                </a:schemeClr>
-              </a:solidFill>
-              <a:latin typeface="Arial" panose="020B0604020202020204" pitchFamily="34" charset="0"/>
-              <a:cs typeface="Arial" panose="020B0604020202020204" pitchFamily="34" charset="0"/>
-            </a:endParaRPr>
           </a:p>
         </p:txBody>
       </p:sp>
@@ -12697,7 +8327,7 @@
         </p:nvSpPr>
         <p:spPr>
           <a:xfrm>
-            <a:off x="7824897" y="4468926"/>
+            <a:off x="7910177" y="4938472"/>
             <a:ext cx="2243285" cy="558971"/>
           </a:xfrm>
           <a:prstGeom prst="rect">
@@ -12764,14 +8394,15 @@
             </a:extLst>
           </p:cNvPr>
           <p:cNvCxnSpPr>
-            <a:endCxn id="109" idx="0"/>
+            <a:cxnSpLocks/>
+            <a:stCxn id="101" idx="2"/>
           </p:cNvCxnSpPr>
           <p:nvPr/>
         </p:nvCxnSpPr>
         <p:spPr>
-          <a:xfrm>
-            <a:off x="8946538" y="4316796"/>
-            <a:ext cx="2" cy="152130"/>
+          <a:xfrm flipH="1">
+            <a:off x="9031818" y="4705557"/>
+            <a:ext cx="2" cy="199054"/>
           </a:xfrm>
           <a:prstGeom prst="straightConnector1">
             <a:avLst/>
@@ -12815,7 +8446,7 @@
         </p:nvSpPr>
         <p:spPr>
           <a:xfrm>
-            <a:off x="7824897" y="5184379"/>
+            <a:off x="7910177" y="5743421"/>
             <a:ext cx="2243285" cy="558971"/>
           </a:xfrm>
           <a:prstGeom prst="rect">
@@ -12860,7 +8491,7 @@
           <a:p>
             <a:pPr algn="ctr"/>
             <a:r>
-              <a:rPr lang="en-US" sz="1100" dirty="0" smtClean="0">
+              <a:rPr lang="en-US" sz="1100" dirty="0">
                 <a:solidFill>
                   <a:schemeClr val="tx1"/>
                 </a:solidFill>
@@ -12870,7 +8501,7 @@
               <a:t>Install the </a:t>
             </a:r>
             <a:r>
-              <a:rPr lang="en-US" sz="1100" dirty="0" err="1" smtClean="0">
+              <a:rPr lang="en-US" sz="1100" dirty="0" err="1">
                 <a:solidFill>
                   <a:schemeClr val="tx1"/>
                 </a:solidFill>
@@ -12880,7 +8511,7 @@
               <a:t>Zowe</a:t>
             </a:r>
             <a:r>
-              <a:rPr lang="en-US" sz="1100" dirty="0" smtClean="0">
+              <a:rPr lang="en-US" sz="1100" dirty="0">
                 <a:solidFill>
                   <a:schemeClr val="tx1"/>
                 </a:solidFill>
@@ -12889,13 +8520,6 @@
               </a:rPr>
               <a:t> SMP/E using PSWI</a:t>
             </a:r>
-            <a:endParaRPr lang="en-US" sz="1100" dirty="0">
-              <a:solidFill>
-                <a:schemeClr val="tx1"/>
-              </a:solidFill>
-              <a:latin typeface="Arial" panose="020B0604020202020204" pitchFamily="34" charset="0"/>
-              <a:cs typeface="Arial" panose="020B0604020202020204" pitchFamily="34" charset="0"/>
-            </a:endParaRPr>
           </a:p>
         </p:txBody>
       </p:sp>
@@ -12909,14 +8533,15 @@
             </a:extLst>
           </p:cNvPr>
           <p:cNvCxnSpPr>
-            <a:endCxn id="111" idx="0"/>
+            <a:cxnSpLocks/>
+            <a:stCxn id="109" idx="2"/>
           </p:cNvCxnSpPr>
           <p:nvPr/>
         </p:nvCxnSpPr>
         <p:spPr>
-          <a:xfrm>
-            <a:off x="8946538" y="5032249"/>
-            <a:ext cx="2" cy="152130"/>
+          <a:xfrm flipH="1">
+            <a:off x="9031818" y="5497443"/>
+            <a:ext cx="2" cy="199054"/>
           </a:xfrm>
           <a:prstGeom prst="straightConnector1">
             <a:avLst/>
@@ -12960,7 +8585,7 @@
         </p:nvSpPr>
         <p:spPr>
           <a:xfrm>
-            <a:off x="7824897" y="5894462"/>
+            <a:off x="7910177" y="6535305"/>
             <a:ext cx="2243285" cy="558971"/>
           </a:xfrm>
           <a:prstGeom prst="rect">
@@ -13005,7 +8630,7 @@
           <a:p>
             <a:pPr algn="ctr"/>
             <a:r>
-              <a:rPr lang="en-US" sz="1100" dirty="0" smtClean="0">
+              <a:rPr lang="en-US" sz="1100" dirty="0">
                 <a:solidFill>
                   <a:schemeClr val="tx1"/>
                 </a:solidFill>
@@ -13015,7 +8640,7 @@
               <a:t>Mount </a:t>
             </a:r>
             <a:r>
-              <a:rPr lang="en-US" sz="1100" dirty="0" err="1" smtClean="0">
+              <a:rPr lang="en-US" sz="1100" dirty="0" err="1">
                 <a:solidFill>
                   <a:schemeClr val="tx1"/>
                 </a:solidFill>
@@ -13025,7 +8650,7 @@
               <a:t>Zowe</a:t>
             </a:r>
             <a:r>
-              <a:rPr lang="en-US" sz="1100" dirty="0" smtClean="0">
+              <a:rPr lang="en-US" sz="1100" dirty="0">
                 <a:solidFill>
                   <a:schemeClr val="tx1"/>
                 </a:solidFill>
@@ -13035,7 +8660,7 @@
               <a:t> </a:t>
             </a:r>
             <a:r>
-              <a:rPr lang="en-US" sz="1100" dirty="0" err="1" smtClean="0">
+              <a:rPr lang="en-US" sz="1100" dirty="0" err="1">
                 <a:solidFill>
                   <a:schemeClr val="tx1"/>
                 </a:solidFill>
@@ -13045,7 +8670,7 @@
               <a:t>zFS</a:t>
             </a:r>
             <a:r>
-              <a:rPr lang="en-US" sz="1100" dirty="0" smtClean="0">
+              <a:rPr lang="en-US" sz="1100" dirty="0">
                 <a:solidFill>
                   <a:schemeClr val="tx1"/>
                 </a:solidFill>
@@ -13054,18 +8679,8 @@
               </a:rPr>
               <a:t> workflow</a:t>
             </a:r>
-            <a:r>
-              <a:rPr lang="en-US" sz="1100" b="1" dirty="0" smtClean="0">
-                <a:solidFill>
-                  <a:schemeClr val="tx1"/>
-                </a:solidFill>
-                <a:latin typeface="Arial" panose="020B0604020202020204" pitchFamily="34" charset="0"/>
-                <a:cs typeface="Arial" panose="020B0604020202020204" pitchFamily="34" charset="0"/>
-              </a:rPr>
-              <a:t/>
-            </a:r>
             <a:br>
-              <a:rPr lang="en-US" sz="1100" b="1" dirty="0" smtClean="0">
+              <a:rPr lang="en-US" sz="1100" b="1" dirty="0">
                 <a:solidFill>
                   <a:schemeClr val="tx1"/>
                 </a:solidFill>
@@ -13074,7 +8689,7 @@
               </a:rPr>
             </a:br>
             <a:r>
-              <a:rPr lang="en-US" sz="1100" b="1" dirty="0" smtClean="0">
+              <a:rPr lang="en-US" sz="1100" b="1" dirty="0">
                 <a:solidFill>
                   <a:schemeClr val="tx1"/>
                 </a:solidFill>
@@ -13083,13 +8698,6 @@
               </a:rPr>
               <a:t>ZWE9MNT</a:t>
             </a:r>
-            <a:endParaRPr lang="en-US" sz="1100" b="1" dirty="0">
-              <a:solidFill>
-                <a:schemeClr val="tx1"/>
-              </a:solidFill>
-              <a:latin typeface="Arial" panose="020B0604020202020204" pitchFamily="34" charset="0"/>
-              <a:cs typeface="Arial" panose="020B0604020202020204" pitchFamily="34" charset="0"/>
-            </a:endParaRPr>
           </a:p>
         </p:txBody>
       </p:sp>
@@ -13103,14 +8711,15 @@
             </a:extLst>
           </p:cNvPr>
           <p:cNvCxnSpPr>
-            <a:endCxn id="113" idx="0"/>
+            <a:cxnSpLocks/>
+            <a:stCxn id="111" idx="2"/>
           </p:cNvCxnSpPr>
           <p:nvPr/>
         </p:nvCxnSpPr>
         <p:spPr>
-          <a:xfrm>
-            <a:off x="8946538" y="5742332"/>
-            <a:ext cx="2" cy="152130"/>
+          <a:xfrm flipH="1">
+            <a:off x="9031818" y="6302392"/>
+            <a:ext cx="2" cy="199054"/>
           </a:xfrm>
           <a:prstGeom prst="straightConnector1">
             <a:avLst/>
@@ -13144,14 +8753,16 @@
         <p:nvCxnSpPr>
           <p:cNvPr id="254" name="Elbow Connector 253"/>
           <p:cNvCxnSpPr>
+            <a:cxnSpLocks/>
+            <a:stCxn id="113" idx="2"/>
             <a:endCxn id="74" idx="0"/>
           </p:cNvCxnSpPr>
           <p:nvPr/>
         </p:nvCxnSpPr>
         <p:spPr>
           <a:xfrm rot="5400000">
-            <a:off x="6959011" y="7906675"/>
-            <a:ext cx="3445603" cy="541046"/>
+            <a:off x="7318693" y="8186873"/>
+            <a:ext cx="2805724" cy="620531"/>
           </a:xfrm>
           <a:prstGeom prst="bentConnector3">
             <a:avLst/>
@@ -13191,17 +8802,10 @@
   <p:clrMapOvr>
     <a:masterClrMapping/>
   </p:clrMapOvr>
-  <p:timing>
-    <p:tnLst>
-      <p:par>
-        <p:cTn id="1" dur="indefinite" restart="never" nodeType="tmRoot"/>
-      </p:par>
-    </p:tnLst>
-  </p:timing>
 </p:sld>
 </file>
 
-<file path=ppt/slides/slide3.xml><?xml version="1.0" encoding="utf-8"?>
+<file path=ppt/slides/slide2.xml><?xml version="1.0" encoding="utf-8"?>
 <p:sld xmlns:a="http://schemas.openxmlformats.org/drawingml/2006/main" xmlns:r="http://schemas.openxmlformats.org/officeDocument/2006/relationships" xmlns:p="http://schemas.openxmlformats.org/presentationml/2006/main">
   <p:cSld>
     <p:spTree>

</xml_diff>

<commit_message>
Fix the install roadmap diagram (#1950)
Signed-off-by: nannanli <nannanli@cn.ibm.com>
</commit_message>
<xml_diff>
--- a/docs/images/common/zowe-zos-install-diagram.pptx
+++ b/docs/images/common/zowe-zos-install-diagram.pptx
@@ -5,9 +5,8 @@
     <p:sldMasterId id="2147483768" r:id="rId1"/>
   </p:sldMasterIdLst>
   <p:sldIdLst>
-    <p:sldId id="257" r:id="rId2"/>
-    <p:sldId id="258" r:id="rId3"/>
-    <p:sldId id="259" r:id="rId4"/>
+    <p:sldId id="258" r:id="rId2"/>
+    <p:sldId id="259" r:id="rId3"/>
   </p:sldIdLst>
   <p:sldSz cx="11160125" cy="16163925"/>
   <p:notesSz cx="6858000" cy="9144000"/>
@@ -245,7 +244,7 @@
           <a:p>
             <a:fld id="{C4A90A56-7146-D847-92E1-256101539D4D}" type="datetimeFigureOut">
               <a:rPr lang="en-US" smtClean="0"/>
-              <a:t>12/2/2021</a:t>
+              <a:t>1/4/22</a:t>
             </a:fld>
             <a:endParaRPr lang="en-US"/>
           </a:p>
@@ -415,7 +414,7 @@
           <a:p>
             <a:fld id="{C4A90A56-7146-D847-92E1-256101539D4D}" type="datetimeFigureOut">
               <a:rPr lang="en-US" smtClean="0"/>
-              <a:t>12/2/2021</a:t>
+              <a:t>1/4/22</a:t>
             </a:fld>
             <a:endParaRPr lang="en-US"/>
           </a:p>
@@ -595,7 +594,7 @@
           <a:p>
             <a:fld id="{C4A90A56-7146-D847-92E1-256101539D4D}" type="datetimeFigureOut">
               <a:rPr lang="en-US" smtClean="0"/>
-              <a:t>12/2/2021</a:t>
+              <a:t>1/4/22</a:t>
             </a:fld>
             <a:endParaRPr lang="en-US"/>
           </a:p>
@@ -765,7 +764,7 @@
           <a:p>
             <a:fld id="{C4A90A56-7146-D847-92E1-256101539D4D}" type="datetimeFigureOut">
               <a:rPr lang="en-US" smtClean="0"/>
-              <a:t>12/2/2021</a:t>
+              <a:t>1/4/22</a:t>
             </a:fld>
             <a:endParaRPr lang="en-US"/>
           </a:p>
@@ -1009,7 +1008,7 @@
           <a:p>
             <a:fld id="{C4A90A56-7146-D847-92E1-256101539D4D}" type="datetimeFigureOut">
               <a:rPr lang="en-US" smtClean="0"/>
-              <a:t>12/2/2021</a:t>
+              <a:t>1/4/22</a:t>
             </a:fld>
             <a:endParaRPr lang="en-US"/>
           </a:p>
@@ -1241,7 +1240,7 @@
           <a:p>
             <a:fld id="{C4A90A56-7146-D847-92E1-256101539D4D}" type="datetimeFigureOut">
               <a:rPr lang="en-US" smtClean="0"/>
-              <a:t>12/2/2021</a:t>
+              <a:t>1/4/22</a:t>
             </a:fld>
             <a:endParaRPr lang="en-US"/>
           </a:p>
@@ -1608,7 +1607,7 @@
           <a:p>
             <a:fld id="{C4A90A56-7146-D847-92E1-256101539D4D}" type="datetimeFigureOut">
               <a:rPr lang="en-US" smtClean="0"/>
-              <a:t>12/2/2021</a:t>
+              <a:t>1/4/22</a:t>
             </a:fld>
             <a:endParaRPr lang="en-US"/>
           </a:p>
@@ -1726,7 +1725,7 @@
           <a:p>
             <a:fld id="{C4A90A56-7146-D847-92E1-256101539D4D}" type="datetimeFigureOut">
               <a:rPr lang="en-US" smtClean="0"/>
-              <a:t>12/2/2021</a:t>
+              <a:t>1/4/22</a:t>
             </a:fld>
             <a:endParaRPr lang="en-US"/>
           </a:p>
@@ -1821,7 +1820,7 @@
           <a:p>
             <a:fld id="{C4A90A56-7146-D847-92E1-256101539D4D}" type="datetimeFigureOut">
               <a:rPr lang="en-US" smtClean="0"/>
-              <a:t>12/2/2021</a:t>
+              <a:t>1/4/22</a:t>
             </a:fld>
             <a:endParaRPr lang="en-US"/>
           </a:p>
@@ -2098,7 +2097,7 @@
           <a:p>
             <a:fld id="{C4A90A56-7146-D847-92E1-256101539D4D}" type="datetimeFigureOut">
               <a:rPr lang="en-US" smtClean="0"/>
-              <a:t>12/2/2021</a:t>
+              <a:t>1/4/22</a:t>
             </a:fld>
             <a:endParaRPr lang="en-US"/>
           </a:p>
@@ -2355,7 +2354,7 @@
           <a:p>
             <a:fld id="{C4A90A56-7146-D847-92E1-256101539D4D}" type="datetimeFigureOut">
               <a:rPr lang="en-US" smtClean="0"/>
-              <a:t>12/2/2021</a:t>
+              <a:t>1/4/22</a:t>
             </a:fld>
             <a:endParaRPr lang="en-US"/>
           </a:p>
@@ -2568,7 +2567,7 @@
           <a:p>
             <a:fld id="{C4A90A56-7146-D847-92E1-256101539D4D}" type="datetimeFigureOut">
               <a:rPr lang="en-US" smtClean="0"/>
-              <a:t>12/2/2021</a:t>
+              <a:t>1/4/22</a:t>
             </a:fld>
             <a:endParaRPr lang="en-US"/>
           </a:p>
@@ -2957,4347 +2956,6 @@
 </file>
 
 <file path=ppt/slides/slide1.xml><?xml version="1.0" encoding="utf-8"?>
-<p:sld xmlns:a="http://schemas.openxmlformats.org/drawingml/2006/main" xmlns:r="http://schemas.openxmlformats.org/officeDocument/2006/relationships" xmlns:p="http://schemas.openxmlformats.org/presentationml/2006/main" show="0">
-  <p:cSld>
-    <p:spTree>
-      <p:nvGrpSpPr>
-        <p:cNvPr id="1" name=""/>
-        <p:cNvGrpSpPr/>
-        <p:nvPr/>
-      </p:nvGrpSpPr>
-      <p:grpSpPr>
-        <a:xfrm>
-          <a:off x="0" y="0"/>
-          <a:ext cx="0" cy="0"/>
-          <a:chOff x="0" y="0"/>
-          <a:chExt cx="0" cy="0"/>
-        </a:xfrm>
-      </p:grpSpPr>
-      <p:sp>
-        <p:nvSpPr>
-          <p:cNvPr id="6" name="Oval 5">
-            <a:extLst>
-              <a:ext uri="{FF2B5EF4-FFF2-40B4-BE49-F238E27FC236}">
-                <a16:creationId xmlns:a16="http://schemas.microsoft.com/office/drawing/2014/main" id="{ED7E982A-146B-B74A-8C01-6554E2F353AD}"/>
-              </a:ext>
-            </a:extLst>
-          </p:cNvPr>
-          <p:cNvSpPr/>
-          <p:nvPr/>
-        </p:nvSpPr>
-        <p:spPr>
-          <a:xfrm>
-            <a:off x="4843145" y="2571249"/>
-            <a:ext cx="180000" cy="180000"/>
-          </a:xfrm>
-          <a:prstGeom prst="ellipse">
-            <a:avLst/>
-          </a:prstGeom>
-          <a:solidFill>
-            <a:schemeClr val="accent1"/>
-          </a:solidFill>
-          <a:ln>
-            <a:noFill/>
-          </a:ln>
-        </p:spPr>
-        <p:style>
-          <a:lnRef idx="2">
-            <a:schemeClr val="accent1">
-              <a:shade val="50000"/>
-            </a:schemeClr>
-          </a:lnRef>
-          <a:fillRef idx="1">
-            <a:schemeClr val="accent1"/>
-          </a:fillRef>
-          <a:effectRef idx="0">
-            <a:schemeClr val="accent1"/>
-          </a:effectRef>
-          <a:fontRef idx="minor">
-            <a:schemeClr val="lt1"/>
-          </a:fontRef>
-        </p:style>
-        <p:txBody>
-          <a:bodyPr rot="0" spcFirstLastPara="0" vertOverflow="overflow" horzOverflow="overflow" vert="horz" wrap="square" lIns="91440" tIns="45720" rIns="91440" bIns="45720" numCol="1" spcCol="0" rtlCol="0" fromWordArt="0" anchor="ctr" anchorCtr="0" forceAA="0" compatLnSpc="1">
-            <a:prstTxWarp prst="textNoShape">
-              <a:avLst/>
-            </a:prstTxWarp>
-            <a:noAutofit/>
-          </a:bodyPr>
-          <a:lstStyle/>
-          <a:p>
-            <a:pPr algn="ctr"/>
-            <a:endParaRPr lang="en-US">
-              <a:latin typeface="Arial" panose="020B0604020202020204" pitchFamily="34" charset="0"/>
-              <a:cs typeface="Arial" panose="020B0604020202020204" pitchFamily="34" charset="0"/>
-            </a:endParaRPr>
-          </a:p>
-        </p:txBody>
-      </p:sp>
-      <p:sp>
-        <p:nvSpPr>
-          <p:cNvPr id="7" name="TextBox 6">
-            <a:extLst>
-              <a:ext uri="{FF2B5EF4-FFF2-40B4-BE49-F238E27FC236}">
-                <a16:creationId xmlns:a16="http://schemas.microsoft.com/office/drawing/2014/main" id="{1E65944C-7423-EA4F-9720-8AE0C58E5142}"/>
-              </a:ext>
-            </a:extLst>
-          </p:cNvPr>
-          <p:cNvSpPr txBox="1"/>
-          <p:nvPr/>
-        </p:nvSpPr>
-        <p:spPr>
-          <a:xfrm>
-            <a:off x="4971294" y="2518531"/>
-            <a:ext cx="2219327" cy="307777"/>
-          </a:xfrm>
-          <a:prstGeom prst="rect">
-            <a:avLst/>
-          </a:prstGeom>
-          <a:noFill/>
-        </p:spPr>
-        <p:txBody>
-          <a:bodyPr wrap="square" rtlCol="0">
-            <a:spAutoFit/>
-          </a:bodyPr>
-          <a:lstStyle/>
-          <a:p>
-            <a:r>
-              <a:rPr lang="en-US" sz="1400" dirty="0">
-                <a:latin typeface="Arial" panose="020B0604020202020204" pitchFamily="34" charset="0"/>
-                <a:cs typeface="Arial" panose="020B0604020202020204" pitchFamily="34" charset="0"/>
-              </a:rPr>
-              <a:t>Start the installation</a:t>
-            </a:r>
-          </a:p>
-        </p:txBody>
-      </p:sp>
-      <p:sp>
-        <p:nvSpPr>
-          <p:cNvPr id="8" name="Rectangle 7">
-            <a:extLst>
-              <a:ext uri="{FF2B5EF4-FFF2-40B4-BE49-F238E27FC236}">
-                <a16:creationId xmlns:a16="http://schemas.microsoft.com/office/drawing/2014/main" id="{702ABCD3-0E98-4F43-88A3-5ACCFBACBCBF}"/>
-              </a:ext>
-            </a:extLst>
-          </p:cNvPr>
-          <p:cNvSpPr/>
-          <p:nvPr/>
-        </p:nvSpPr>
-        <p:spPr>
-          <a:xfrm>
-            <a:off x="3992285" y="3079389"/>
-            <a:ext cx="1958008" cy="558971"/>
-          </a:xfrm>
-          <a:prstGeom prst="rect">
-            <a:avLst/>
-          </a:prstGeom>
-          <a:solidFill>
-            <a:srgbClr val="CEE7E9"/>
-          </a:solidFill>
-          <a:ln>
-            <a:noFill/>
-          </a:ln>
-        </p:spPr>
-        <p:style>
-          <a:lnRef idx="2">
-            <a:schemeClr val="accent1">
-              <a:shade val="50000"/>
-            </a:schemeClr>
-          </a:lnRef>
-          <a:fillRef idx="1">
-            <a:schemeClr val="accent1"/>
-          </a:fillRef>
-          <a:effectRef idx="0">
-            <a:schemeClr val="accent1"/>
-          </a:effectRef>
-          <a:fontRef idx="minor">
-            <a:schemeClr val="lt1"/>
-          </a:fontRef>
-        </p:style>
-        <p:txBody>
-          <a:bodyPr rot="0" spcFirstLastPara="0" vertOverflow="overflow" horzOverflow="overflow" vert="horz" wrap="square" lIns="91440" tIns="45720" rIns="91440" bIns="45720" numCol="1" spcCol="0" rtlCol="0" fromWordArt="0" anchor="ctr" anchorCtr="0" forceAA="0" compatLnSpc="1">
-            <a:prstTxWarp prst="textNoShape">
-              <a:avLst/>
-            </a:prstTxWarp>
-            <a:noAutofit/>
-          </a:bodyPr>
-          <a:lstStyle/>
-          <a:p>
-            <a:pPr algn="ctr"/>
-            <a:r>
-              <a:rPr lang="en-US" sz="1100" dirty="0">
-                <a:solidFill>
-                  <a:schemeClr val="tx1"/>
-                </a:solidFill>
-                <a:latin typeface="Arial" panose="020B0604020202020204" pitchFamily="34" charset="0"/>
-                <a:cs typeface="Arial" panose="020B0604020202020204" pitchFamily="34" charset="0"/>
-              </a:rPr>
-              <a:t>Ensure system requirements are met</a:t>
-            </a:r>
-          </a:p>
-        </p:txBody>
-      </p:sp>
-      <p:sp>
-        <p:nvSpPr>
-          <p:cNvPr id="10" name="Diamond 9">
-            <a:extLst>
-              <a:ext uri="{FF2B5EF4-FFF2-40B4-BE49-F238E27FC236}">
-                <a16:creationId xmlns:a16="http://schemas.microsoft.com/office/drawing/2014/main" id="{D66CB384-E34A-1D45-AD24-B88C7FD5FC40}"/>
-              </a:ext>
-            </a:extLst>
-          </p:cNvPr>
-          <p:cNvSpPr/>
-          <p:nvPr/>
-        </p:nvSpPr>
-        <p:spPr>
-          <a:xfrm>
-            <a:off x="3626030" y="3958662"/>
-            <a:ext cx="2559738" cy="809368"/>
-          </a:xfrm>
-          <a:prstGeom prst="diamond">
-            <a:avLst/>
-          </a:prstGeom>
-          <a:solidFill>
-            <a:srgbClr val="FBD589"/>
-          </a:solidFill>
-          <a:ln>
-            <a:noFill/>
-          </a:ln>
-        </p:spPr>
-        <p:style>
-          <a:lnRef idx="2">
-            <a:schemeClr val="accent1">
-              <a:shade val="50000"/>
-            </a:schemeClr>
-          </a:lnRef>
-          <a:fillRef idx="1">
-            <a:schemeClr val="accent1"/>
-          </a:fillRef>
-          <a:effectRef idx="0">
-            <a:schemeClr val="accent1"/>
-          </a:effectRef>
-          <a:fontRef idx="minor">
-            <a:schemeClr val="lt1"/>
-          </a:fontRef>
-        </p:style>
-        <p:txBody>
-          <a:bodyPr rot="0" spcFirstLastPara="0" vertOverflow="overflow" horzOverflow="overflow" vert="horz" wrap="square" lIns="91440" tIns="45720" rIns="91440" bIns="45720" numCol="1" spcCol="0" rtlCol="0" fromWordArt="0" anchor="ctr" anchorCtr="0" forceAA="0" compatLnSpc="1">
-            <a:prstTxWarp prst="textNoShape">
-              <a:avLst/>
-            </a:prstTxWarp>
-            <a:noAutofit/>
-          </a:bodyPr>
-          <a:lstStyle/>
-          <a:p>
-            <a:pPr algn="ctr"/>
-            <a:endParaRPr lang="en-US" sz="1100" dirty="0">
-              <a:solidFill>
-                <a:schemeClr val="bg1"/>
-              </a:solidFill>
-              <a:latin typeface="Arial" panose="020B0604020202020204" pitchFamily="34" charset="0"/>
-              <a:cs typeface="Arial" panose="020B0604020202020204" pitchFamily="34" charset="0"/>
-            </a:endParaRPr>
-          </a:p>
-        </p:txBody>
-      </p:sp>
-      <p:cxnSp>
-        <p:nvCxnSpPr>
-          <p:cNvPr id="12" name="Straight Arrow Connector 11">
-            <a:extLst>
-              <a:ext uri="{FF2B5EF4-FFF2-40B4-BE49-F238E27FC236}">
-                <a16:creationId xmlns:a16="http://schemas.microsoft.com/office/drawing/2014/main" id="{49933C4D-C0CC-0446-BE43-C41F5DE056AA}"/>
-              </a:ext>
-            </a:extLst>
-          </p:cNvPr>
-          <p:cNvCxnSpPr/>
-          <p:nvPr/>
-        </p:nvCxnSpPr>
-        <p:spPr>
-          <a:xfrm>
-            <a:off x="3681450" y="4492088"/>
-            <a:ext cx="0" cy="635129"/>
-          </a:xfrm>
-          <a:prstGeom prst="straightConnector1">
-            <a:avLst/>
-          </a:prstGeom>
-          <a:ln>
-            <a:solidFill>
-              <a:schemeClr val="tx1">
-                <a:lumMod val="50000"/>
-                <a:lumOff val="50000"/>
-              </a:schemeClr>
-            </a:solidFill>
-            <a:tailEnd type="triangle"/>
-          </a:ln>
-        </p:spPr>
-        <p:style>
-          <a:lnRef idx="1">
-            <a:schemeClr val="accent1"/>
-          </a:lnRef>
-          <a:fillRef idx="0">
-            <a:schemeClr val="accent1"/>
-          </a:fillRef>
-          <a:effectRef idx="0">
-            <a:schemeClr val="accent1"/>
-          </a:effectRef>
-          <a:fontRef idx="minor">
-            <a:schemeClr val="tx1"/>
-          </a:fontRef>
-        </p:style>
-      </p:cxnSp>
-      <p:cxnSp>
-        <p:nvCxnSpPr>
-          <p:cNvPr id="13" name="Straight Arrow Connector 12">
-            <a:extLst>
-              <a:ext uri="{FF2B5EF4-FFF2-40B4-BE49-F238E27FC236}">
-                <a16:creationId xmlns:a16="http://schemas.microsoft.com/office/drawing/2014/main" id="{3A11E806-C07A-6949-8A3A-9C87A40EE2A1}"/>
-              </a:ext>
-            </a:extLst>
-          </p:cNvPr>
-          <p:cNvCxnSpPr/>
-          <p:nvPr/>
-        </p:nvCxnSpPr>
-        <p:spPr>
-          <a:xfrm>
-            <a:off x="6171775" y="4464327"/>
-            <a:ext cx="0" cy="635129"/>
-          </a:xfrm>
-          <a:prstGeom prst="straightConnector1">
-            <a:avLst/>
-          </a:prstGeom>
-          <a:ln>
-            <a:solidFill>
-              <a:schemeClr val="tx1">
-                <a:lumMod val="50000"/>
-                <a:lumOff val="50000"/>
-              </a:schemeClr>
-            </a:solidFill>
-            <a:tailEnd type="triangle"/>
-          </a:ln>
-        </p:spPr>
-        <p:style>
-          <a:lnRef idx="1">
-            <a:schemeClr val="accent1"/>
-          </a:lnRef>
-          <a:fillRef idx="0">
-            <a:schemeClr val="accent1"/>
-          </a:fillRef>
-          <a:effectRef idx="0">
-            <a:schemeClr val="accent1"/>
-          </a:effectRef>
-          <a:fontRef idx="minor">
-            <a:schemeClr val="tx1"/>
-          </a:fontRef>
-        </p:style>
-      </p:cxnSp>
-      <p:sp>
-        <p:nvSpPr>
-          <p:cNvPr id="14" name="Rectangle 13">
-            <a:extLst>
-              <a:ext uri="{FF2B5EF4-FFF2-40B4-BE49-F238E27FC236}">
-                <a16:creationId xmlns:a16="http://schemas.microsoft.com/office/drawing/2014/main" id="{9470741F-AC7B-ED4A-B138-C8CDB2FC22FC}"/>
-              </a:ext>
-            </a:extLst>
-          </p:cNvPr>
-          <p:cNvSpPr/>
-          <p:nvPr/>
-        </p:nvSpPr>
-        <p:spPr>
-          <a:xfrm>
-            <a:off x="5276409" y="5148193"/>
-            <a:ext cx="2243289" cy="558971"/>
-          </a:xfrm>
-          <a:prstGeom prst="rect">
-            <a:avLst/>
-          </a:prstGeom>
-          <a:solidFill>
-            <a:srgbClr val="CEE7E9"/>
-          </a:solidFill>
-          <a:ln>
-            <a:noFill/>
-          </a:ln>
-        </p:spPr>
-        <p:style>
-          <a:lnRef idx="2">
-            <a:schemeClr val="accent1">
-              <a:shade val="50000"/>
-            </a:schemeClr>
-          </a:lnRef>
-          <a:fillRef idx="1">
-            <a:schemeClr val="accent1"/>
-          </a:fillRef>
-          <a:effectRef idx="0">
-            <a:schemeClr val="accent1"/>
-          </a:effectRef>
-          <a:fontRef idx="minor">
-            <a:schemeClr val="lt1"/>
-          </a:fontRef>
-        </p:style>
-        <p:txBody>
-          <a:bodyPr rot="0" spcFirstLastPara="0" vertOverflow="overflow" horzOverflow="overflow" vert="horz" wrap="square" lIns="91440" tIns="45720" rIns="91440" bIns="45720" numCol="1" spcCol="0" rtlCol="0" fromWordArt="0" anchor="ctr" anchorCtr="0" forceAA="0" compatLnSpc="1">
-            <a:prstTxWarp prst="textNoShape">
-              <a:avLst/>
-            </a:prstTxWarp>
-            <a:noAutofit/>
-          </a:bodyPr>
-          <a:lstStyle/>
-          <a:p>
-            <a:pPr algn="ctr"/>
-            <a:r>
-              <a:rPr lang="en-US" sz="1100" dirty="0">
-                <a:solidFill>
-                  <a:schemeClr val="tx1"/>
-                </a:solidFill>
-                <a:latin typeface="Arial" panose="020B0604020202020204" pitchFamily="34" charset="0"/>
-                <a:cs typeface="Arial" panose="020B0604020202020204" pitchFamily="34" charset="0"/>
-              </a:rPr>
-              <a:t>Download the convenience build</a:t>
-            </a:r>
-          </a:p>
-        </p:txBody>
-      </p:sp>
-      <p:sp>
-        <p:nvSpPr>
-          <p:cNvPr id="15" name="Rectangle 14">
-            <a:extLst>
-              <a:ext uri="{FF2B5EF4-FFF2-40B4-BE49-F238E27FC236}">
-                <a16:creationId xmlns:a16="http://schemas.microsoft.com/office/drawing/2014/main" id="{BF3E351B-D31F-994B-8126-62A9E13E5FDC}"/>
-              </a:ext>
-            </a:extLst>
-          </p:cNvPr>
-          <p:cNvSpPr/>
-          <p:nvPr/>
-        </p:nvSpPr>
-        <p:spPr>
-          <a:xfrm>
-            <a:off x="2917556" y="5148193"/>
-            <a:ext cx="2250655" cy="558971"/>
-          </a:xfrm>
-          <a:prstGeom prst="rect">
-            <a:avLst/>
-          </a:prstGeom>
-          <a:solidFill>
-            <a:srgbClr val="CEE7E9"/>
-          </a:solidFill>
-          <a:ln>
-            <a:noFill/>
-          </a:ln>
-        </p:spPr>
-        <p:style>
-          <a:lnRef idx="2">
-            <a:schemeClr val="accent1">
-              <a:shade val="50000"/>
-            </a:schemeClr>
-          </a:lnRef>
-          <a:fillRef idx="1">
-            <a:schemeClr val="accent1"/>
-          </a:fillRef>
-          <a:effectRef idx="0">
-            <a:schemeClr val="accent1"/>
-          </a:effectRef>
-          <a:fontRef idx="minor">
-            <a:schemeClr val="lt1"/>
-          </a:fontRef>
-        </p:style>
-        <p:txBody>
-          <a:bodyPr rot="0" spcFirstLastPara="0" vertOverflow="overflow" horzOverflow="overflow" vert="horz" wrap="square" lIns="91440" tIns="45720" rIns="91440" bIns="45720" numCol="1" spcCol="0" rtlCol="0" fromWordArt="0" anchor="ctr" anchorCtr="0" forceAA="0" compatLnSpc="1">
-            <a:prstTxWarp prst="textNoShape">
-              <a:avLst/>
-            </a:prstTxWarp>
-            <a:noAutofit/>
-          </a:bodyPr>
-          <a:lstStyle/>
-          <a:p>
-            <a:pPr algn="ctr"/>
-            <a:r>
-              <a:rPr lang="en-US" sz="1100" dirty="0">
-                <a:solidFill>
-                  <a:schemeClr val="tx1"/>
-                </a:solidFill>
-                <a:latin typeface="Arial" panose="020B0604020202020204" pitchFamily="34" charset="0"/>
-                <a:cs typeface="Arial" panose="020B0604020202020204" pitchFamily="34" charset="0"/>
-              </a:rPr>
-              <a:t>Download the Zowe SMP/E build</a:t>
-            </a:r>
-          </a:p>
-        </p:txBody>
-      </p:sp>
-      <p:sp>
-        <p:nvSpPr>
-          <p:cNvPr id="17" name="Rectangle 16">
-            <a:extLst>
-              <a:ext uri="{FF2B5EF4-FFF2-40B4-BE49-F238E27FC236}">
-                <a16:creationId xmlns:a16="http://schemas.microsoft.com/office/drawing/2014/main" id="{CCF7887F-10F2-9740-9DDE-6472EBCD2690}"/>
-              </a:ext>
-            </a:extLst>
-          </p:cNvPr>
-          <p:cNvSpPr/>
-          <p:nvPr/>
-        </p:nvSpPr>
-        <p:spPr>
-          <a:xfrm>
-            <a:off x="5275902" y="5936640"/>
-            <a:ext cx="2243285" cy="558971"/>
-          </a:xfrm>
-          <a:prstGeom prst="rect">
-            <a:avLst/>
-          </a:prstGeom>
-          <a:solidFill>
-            <a:srgbClr val="CEE7E9"/>
-          </a:solidFill>
-          <a:ln>
-            <a:noFill/>
-          </a:ln>
-        </p:spPr>
-        <p:style>
-          <a:lnRef idx="2">
-            <a:schemeClr val="accent1">
-              <a:shade val="50000"/>
-            </a:schemeClr>
-          </a:lnRef>
-          <a:fillRef idx="1">
-            <a:schemeClr val="accent1"/>
-          </a:fillRef>
-          <a:effectRef idx="0">
-            <a:schemeClr val="accent1"/>
-          </a:effectRef>
-          <a:fontRef idx="minor">
-            <a:schemeClr val="lt1"/>
-          </a:fontRef>
-        </p:style>
-        <p:txBody>
-          <a:bodyPr rot="0" spcFirstLastPara="0" vertOverflow="overflow" horzOverflow="overflow" vert="horz" wrap="square" lIns="91440" tIns="45720" rIns="91440" bIns="45720" numCol="1" spcCol="0" rtlCol="0" fromWordArt="0" anchor="ctr" anchorCtr="0" forceAA="0" compatLnSpc="1">
-            <a:prstTxWarp prst="textNoShape">
-              <a:avLst/>
-            </a:prstTxWarp>
-            <a:noAutofit/>
-          </a:bodyPr>
-          <a:lstStyle/>
-          <a:p>
-            <a:pPr algn="ctr"/>
-            <a:r>
-              <a:rPr lang="en-US" sz="1100" dirty="0">
-                <a:solidFill>
-                  <a:schemeClr val="tx1"/>
-                </a:solidFill>
-                <a:latin typeface="Arial" panose="020B0604020202020204" pitchFamily="34" charset="0"/>
-                <a:cs typeface="Arial" panose="020B0604020202020204" pitchFamily="34" charset="0"/>
-              </a:rPr>
-              <a:t>Verify, transfer, and expand the PAX file on z/OS</a:t>
-            </a:r>
-          </a:p>
-        </p:txBody>
-      </p:sp>
-      <p:sp>
-        <p:nvSpPr>
-          <p:cNvPr id="18" name="Rectangle 17">
-            <a:extLst>
-              <a:ext uri="{FF2B5EF4-FFF2-40B4-BE49-F238E27FC236}">
-                <a16:creationId xmlns:a16="http://schemas.microsoft.com/office/drawing/2014/main" id="{FDF356A4-F204-B24A-AC96-D723BE38D7A5}"/>
-              </a:ext>
-            </a:extLst>
-          </p:cNvPr>
-          <p:cNvSpPr/>
-          <p:nvPr/>
-        </p:nvSpPr>
-        <p:spPr>
-          <a:xfrm>
-            <a:off x="5275900" y="6698844"/>
-            <a:ext cx="4087766" cy="947863"/>
-          </a:xfrm>
-          <a:prstGeom prst="rect">
-            <a:avLst/>
-          </a:prstGeom>
-          <a:solidFill>
-            <a:srgbClr val="CEE7E9"/>
-          </a:solidFill>
-          <a:ln>
-            <a:noFill/>
-          </a:ln>
-        </p:spPr>
-        <p:style>
-          <a:lnRef idx="2">
-            <a:schemeClr val="accent1">
-              <a:shade val="50000"/>
-            </a:schemeClr>
-          </a:lnRef>
-          <a:fillRef idx="1">
-            <a:schemeClr val="accent1"/>
-          </a:fillRef>
-          <a:effectRef idx="0">
-            <a:schemeClr val="accent1"/>
-          </a:effectRef>
-          <a:fontRef idx="minor">
-            <a:schemeClr val="lt1"/>
-          </a:fontRef>
-        </p:style>
-        <p:txBody>
-          <a:bodyPr rot="0" spcFirstLastPara="0" vertOverflow="overflow" horzOverflow="overflow" vert="horz" wrap="square" lIns="91440" tIns="45720" rIns="91440" bIns="45720" numCol="1" spcCol="0" rtlCol="0" fromWordArt="0" anchor="ctr" anchorCtr="0" forceAA="0" compatLnSpc="1">
-            <a:prstTxWarp prst="textNoShape">
-              <a:avLst/>
-            </a:prstTxWarp>
-            <a:noAutofit/>
-          </a:bodyPr>
-          <a:lstStyle/>
-          <a:p>
-            <a:r>
-              <a:rPr lang="en-US" sz="1100" dirty="0">
-                <a:solidFill>
-                  <a:schemeClr val="tx1"/>
-                </a:solidFill>
-                <a:latin typeface="Arial" panose="020B0604020202020204" pitchFamily="34" charset="0"/>
-                <a:cs typeface="Arial" panose="020B0604020202020204" pitchFamily="34" charset="0"/>
-              </a:rPr>
-              <a:t>Install the </a:t>
-            </a:r>
-            <a:r>
-              <a:rPr lang="en-US" sz="1100" dirty="0" err="1">
-                <a:solidFill>
-                  <a:schemeClr val="tx1"/>
-                </a:solidFill>
-                <a:latin typeface="Arial" panose="020B0604020202020204" pitchFamily="34" charset="0"/>
-                <a:cs typeface="Arial" panose="020B0604020202020204" pitchFamily="34" charset="0"/>
-              </a:rPr>
-              <a:t>Zowe</a:t>
-            </a:r>
-            <a:r>
-              <a:rPr lang="en-US" sz="1100" dirty="0">
-                <a:solidFill>
-                  <a:schemeClr val="tx1"/>
-                </a:solidFill>
-                <a:latin typeface="Arial" panose="020B0604020202020204" pitchFamily="34" charset="0"/>
-                <a:cs typeface="Arial" panose="020B0604020202020204" pitchFamily="34" charset="0"/>
-              </a:rPr>
-              <a:t> runtime</a:t>
-            </a:r>
-          </a:p>
-        </p:txBody>
-      </p:sp>
-      <p:sp>
-        <p:nvSpPr>
-          <p:cNvPr id="19" name="Rectangle 18">
-            <a:extLst>
-              <a:ext uri="{FF2B5EF4-FFF2-40B4-BE49-F238E27FC236}">
-                <a16:creationId xmlns:a16="http://schemas.microsoft.com/office/drawing/2014/main" id="{9575373C-CDBF-9B4B-ADC2-488351559AA7}"/>
-              </a:ext>
-            </a:extLst>
-          </p:cNvPr>
-          <p:cNvSpPr/>
-          <p:nvPr/>
-        </p:nvSpPr>
-        <p:spPr>
-          <a:xfrm>
-            <a:off x="2917556" y="5936640"/>
-            <a:ext cx="2250651" cy="558971"/>
-          </a:xfrm>
-          <a:prstGeom prst="rect">
-            <a:avLst/>
-          </a:prstGeom>
-          <a:solidFill>
-            <a:srgbClr val="CEE7E9"/>
-          </a:solidFill>
-          <a:ln>
-            <a:noFill/>
-          </a:ln>
-        </p:spPr>
-        <p:style>
-          <a:lnRef idx="2">
-            <a:schemeClr val="accent1">
-              <a:shade val="50000"/>
-            </a:schemeClr>
-          </a:lnRef>
-          <a:fillRef idx="1">
-            <a:schemeClr val="accent1"/>
-          </a:fillRef>
-          <a:effectRef idx="0">
-            <a:schemeClr val="accent1"/>
-          </a:effectRef>
-          <a:fontRef idx="minor">
-            <a:schemeClr val="lt1"/>
-          </a:fontRef>
-        </p:style>
-        <p:txBody>
-          <a:bodyPr rot="0" spcFirstLastPara="0" vertOverflow="overflow" horzOverflow="overflow" vert="horz" wrap="square" lIns="91440" tIns="45720" rIns="91440" bIns="45720" numCol="1" spcCol="0" rtlCol="0" fromWordArt="0" anchor="ctr" anchorCtr="0" forceAA="0" compatLnSpc="1">
-            <a:prstTxWarp prst="textNoShape">
-              <a:avLst/>
-            </a:prstTxWarp>
-            <a:noAutofit/>
-          </a:bodyPr>
-          <a:lstStyle/>
-          <a:p>
-            <a:pPr algn="ctr"/>
-            <a:r>
-              <a:rPr lang="en-US" sz="1100" dirty="0">
-                <a:solidFill>
-                  <a:schemeClr val="tx1"/>
-                </a:solidFill>
-                <a:latin typeface="Arial" panose="020B0604020202020204" pitchFamily="34" charset="0"/>
-                <a:cs typeface="Arial" panose="020B0604020202020204" pitchFamily="34" charset="0"/>
-              </a:rPr>
-              <a:t>Install the Zowe SMP/E build</a:t>
-            </a:r>
-          </a:p>
-        </p:txBody>
-      </p:sp>
-      <p:sp>
-        <p:nvSpPr>
-          <p:cNvPr id="20" name="Rectangle 19">
-            <a:extLst>
-              <a:ext uri="{FF2B5EF4-FFF2-40B4-BE49-F238E27FC236}">
-                <a16:creationId xmlns:a16="http://schemas.microsoft.com/office/drawing/2014/main" id="{AEC5C09A-C884-C94D-99A1-280A4CEF119A}"/>
-              </a:ext>
-            </a:extLst>
-          </p:cNvPr>
-          <p:cNvSpPr/>
-          <p:nvPr/>
-        </p:nvSpPr>
-        <p:spPr>
-          <a:xfrm>
-            <a:off x="3038085" y="8096242"/>
-            <a:ext cx="5165215" cy="1161482"/>
-          </a:xfrm>
-          <a:prstGeom prst="rect">
-            <a:avLst/>
-          </a:prstGeom>
-          <a:solidFill>
-            <a:schemeClr val="bg1">
-              <a:lumMod val="95000"/>
-              <a:alpha val="74000"/>
-            </a:schemeClr>
-          </a:solidFill>
-          <a:ln>
-            <a:solidFill>
-              <a:schemeClr val="accent3">
-                <a:lumMod val="60000"/>
-                <a:lumOff val="40000"/>
-              </a:schemeClr>
-            </a:solidFill>
-          </a:ln>
-        </p:spPr>
-        <p:style>
-          <a:lnRef idx="2">
-            <a:schemeClr val="accent1">
-              <a:shade val="50000"/>
-            </a:schemeClr>
-          </a:lnRef>
-          <a:fillRef idx="1">
-            <a:schemeClr val="accent1"/>
-          </a:fillRef>
-          <a:effectRef idx="0">
-            <a:schemeClr val="accent1"/>
-          </a:effectRef>
-          <a:fontRef idx="minor">
-            <a:schemeClr val="lt1"/>
-          </a:fontRef>
-        </p:style>
-        <p:txBody>
-          <a:bodyPr rot="0" spcFirstLastPara="0" vertOverflow="overflow" horzOverflow="overflow" vert="horz" wrap="square" lIns="91440" tIns="45720" rIns="91440" bIns="45720" numCol="1" spcCol="0" rtlCol="0" fromWordArt="0" anchor="t" anchorCtr="0" forceAA="0" compatLnSpc="1">
-            <a:prstTxWarp prst="textNoShape">
-              <a:avLst/>
-            </a:prstTxWarp>
-            <a:noAutofit/>
-          </a:bodyPr>
-          <a:lstStyle/>
-          <a:p>
-            <a:pPr algn="ctr"/>
-            <a:r>
-              <a:rPr lang="en-US" altLang="zh-CN" sz="1100" dirty="0">
-                <a:solidFill>
-                  <a:schemeClr val="tx1"/>
-                </a:solidFill>
-                <a:latin typeface="Arial" panose="020B0604020202020204" pitchFamily="34" charset="0"/>
-                <a:cs typeface="Arial" panose="020B0604020202020204" pitchFamily="34" charset="0"/>
-              </a:rPr>
-              <a:t>(One-time setup per z/OS environment) </a:t>
-            </a:r>
-          </a:p>
-          <a:p>
-            <a:pPr algn="ctr"/>
-            <a:r>
-              <a:rPr lang="en-US" sz="1100" dirty="0">
-                <a:solidFill>
-                  <a:schemeClr val="tx1"/>
-                </a:solidFill>
-                <a:latin typeface="Arial" panose="020B0604020202020204" pitchFamily="34" charset="0"/>
-                <a:cs typeface="Arial" panose="020B0604020202020204" pitchFamily="34" charset="0"/>
-              </a:rPr>
-              <a:t>Configure the z/OS</a:t>
-            </a:r>
-            <a:r>
-              <a:rPr lang="zh-CN" altLang="en-US" sz="1100" dirty="0">
-                <a:solidFill>
-                  <a:schemeClr val="tx1"/>
-                </a:solidFill>
-                <a:latin typeface="Arial" panose="020B0604020202020204" pitchFamily="34" charset="0"/>
-                <a:cs typeface="Arial" panose="020B0604020202020204" pitchFamily="34" charset="0"/>
-              </a:rPr>
-              <a:t> </a:t>
-            </a:r>
-            <a:r>
-              <a:rPr lang="en-US" altLang="zh-CN" sz="1100" dirty="0">
-                <a:solidFill>
-                  <a:schemeClr val="tx1"/>
-                </a:solidFill>
-                <a:latin typeface="Arial" panose="020B0604020202020204" pitchFamily="34" charset="0"/>
-                <a:cs typeface="Arial" panose="020B0604020202020204" pitchFamily="34" charset="0"/>
-              </a:rPr>
-              <a:t>system</a:t>
-            </a:r>
-            <a:r>
-              <a:rPr lang="zh-CN" altLang="en-US" sz="1100" dirty="0">
-                <a:solidFill>
-                  <a:schemeClr val="tx1"/>
-                </a:solidFill>
-                <a:latin typeface="Arial" panose="020B0604020202020204" pitchFamily="34" charset="0"/>
-                <a:cs typeface="Arial" panose="020B0604020202020204" pitchFamily="34" charset="0"/>
-              </a:rPr>
-              <a:t> </a:t>
-            </a:r>
-            <a:r>
-              <a:rPr lang="en-US" altLang="zh-CN" sz="1100" dirty="0">
-                <a:solidFill>
-                  <a:schemeClr val="tx1"/>
-                </a:solidFill>
-                <a:latin typeface="Arial" panose="020B0604020202020204" pitchFamily="34" charset="0"/>
-                <a:cs typeface="Arial" panose="020B0604020202020204" pitchFamily="34" charset="0"/>
-              </a:rPr>
-              <a:t>for</a:t>
-            </a:r>
-            <a:r>
-              <a:rPr lang="zh-CN" altLang="en-US" sz="1100" dirty="0">
-                <a:solidFill>
-                  <a:schemeClr val="tx1"/>
-                </a:solidFill>
-                <a:latin typeface="Arial" panose="020B0604020202020204" pitchFamily="34" charset="0"/>
-                <a:cs typeface="Arial" panose="020B0604020202020204" pitchFamily="34" charset="0"/>
-              </a:rPr>
-              <a:t> </a:t>
-            </a:r>
-            <a:r>
-              <a:rPr lang="en-US" altLang="zh-CN" sz="1100" dirty="0" err="1">
-                <a:solidFill>
-                  <a:schemeClr val="tx1"/>
-                </a:solidFill>
-                <a:latin typeface="Arial" panose="020B0604020202020204" pitchFamily="34" charset="0"/>
-                <a:cs typeface="Arial" panose="020B0604020202020204" pitchFamily="34" charset="0"/>
-              </a:rPr>
-              <a:t>Zowe</a:t>
-            </a:r>
-            <a:endParaRPr lang="en-US" altLang="zh-CN" sz="1100" dirty="0">
-              <a:solidFill>
-                <a:schemeClr val="tx1"/>
-              </a:solidFill>
-              <a:latin typeface="Arial" panose="020B0604020202020204" pitchFamily="34" charset="0"/>
-              <a:cs typeface="Arial" panose="020B0604020202020204" pitchFamily="34" charset="0"/>
-            </a:endParaRPr>
-          </a:p>
-        </p:txBody>
-      </p:sp>
-      <p:cxnSp>
-        <p:nvCxnSpPr>
-          <p:cNvPr id="21" name="Straight Arrow Connector 20">
-            <a:extLst>
-              <a:ext uri="{FF2B5EF4-FFF2-40B4-BE49-F238E27FC236}">
-                <a16:creationId xmlns:a16="http://schemas.microsoft.com/office/drawing/2014/main" id="{517C38BA-2A23-5742-8415-0A5B3E6F60D4}"/>
-              </a:ext>
-            </a:extLst>
-          </p:cNvPr>
-          <p:cNvCxnSpPr>
-            <a:cxnSpLocks/>
-          </p:cNvCxnSpPr>
-          <p:nvPr/>
-        </p:nvCxnSpPr>
-        <p:spPr>
-          <a:xfrm>
-            <a:off x="3681450" y="5723655"/>
-            <a:ext cx="0" cy="212985"/>
-          </a:xfrm>
-          <a:prstGeom prst="straightConnector1">
-            <a:avLst/>
-          </a:prstGeom>
-          <a:ln>
-            <a:solidFill>
-              <a:schemeClr val="tx1">
-                <a:lumMod val="50000"/>
-                <a:lumOff val="50000"/>
-              </a:schemeClr>
-            </a:solidFill>
-            <a:tailEnd type="triangle"/>
-          </a:ln>
-        </p:spPr>
-        <p:style>
-          <a:lnRef idx="1">
-            <a:schemeClr val="accent1"/>
-          </a:lnRef>
-          <a:fillRef idx="0">
-            <a:schemeClr val="accent1"/>
-          </a:fillRef>
-          <a:effectRef idx="0">
-            <a:schemeClr val="accent1"/>
-          </a:effectRef>
-          <a:fontRef idx="minor">
-            <a:schemeClr val="tx1"/>
-          </a:fontRef>
-        </p:style>
-      </p:cxnSp>
-      <p:cxnSp>
-        <p:nvCxnSpPr>
-          <p:cNvPr id="24" name="Straight Arrow Connector 23">
-            <a:extLst>
-              <a:ext uri="{FF2B5EF4-FFF2-40B4-BE49-F238E27FC236}">
-                <a16:creationId xmlns:a16="http://schemas.microsoft.com/office/drawing/2014/main" id="{D5FA7125-12CE-154C-81B5-1873D8D4A67E}"/>
-              </a:ext>
-            </a:extLst>
-          </p:cNvPr>
-          <p:cNvCxnSpPr>
-            <a:cxnSpLocks/>
-          </p:cNvCxnSpPr>
-          <p:nvPr/>
-        </p:nvCxnSpPr>
-        <p:spPr>
-          <a:xfrm>
-            <a:off x="6171775" y="5734466"/>
-            <a:ext cx="0" cy="212985"/>
-          </a:xfrm>
-          <a:prstGeom prst="straightConnector1">
-            <a:avLst/>
-          </a:prstGeom>
-          <a:ln>
-            <a:solidFill>
-              <a:schemeClr val="tx1">
-                <a:lumMod val="50000"/>
-                <a:lumOff val="50000"/>
-              </a:schemeClr>
-            </a:solidFill>
-            <a:tailEnd type="triangle"/>
-          </a:ln>
-        </p:spPr>
-        <p:style>
-          <a:lnRef idx="1">
-            <a:schemeClr val="accent1"/>
-          </a:lnRef>
-          <a:fillRef idx="0">
-            <a:schemeClr val="accent1"/>
-          </a:fillRef>
-          <a:effectRef idx="0">
-            <a:schemeClr val="accent1"/>
-          </a:effectRef>
-          <a:fontRef idx="minor">
-            <a:schemeClr val="tx1"/>
-          </a:fontRef>
-        </p:style>
-      </p:cxnSp>
-      <p:cxnSp>
-        <p:nvCxnSpPr>
-          <p:cNvPr id="25" name="Straight Arrow Connector 24">
-            <a:extLst>
-              <a:ext uri="{FF2B5EF4-FFF2-40B4-BE49-F238E27FC236}">
-                <a16:creationId xmlns:a16="http://schemas.microsoft.com/office/drawing/2014/main" id="{25720A06-FDF6-E643-910A-498C33882DCF}"/>
-              </a:ext>
-            </a:extLst>
-          </p:cNvPr>
-          <p:cNvCxnSpPr>
-            <a:cxnSpLocks/>
-          </p:cNvCxnSpPr>
-          <p:nvPr/>
-        </p:nvCxnSpPr>
-        <p:spPr>
-          <a:xfrm>
-            <a:off x="6171775" y="6485860"/>
-            <a:ext cx="0" cy="212985"/>
-          </a:xfrm>
-          <a:prstGeom prst="straightConnector1">
-            <a:avLst/>
-          </a:prstGeom>
-          <a:ln>
-            <a:solidFill>
-              <a:schemeClr val="tx1">
-                <a:lumMod val="50000"/>
-                <a:lumOff val="50000"/>
-              </a:schemeClr>
-            </a:solidFill>
-            <a:tailEnd type="triangle"/>
-          </a:ln>
-        </p:spPr>
-        <p:style>
-          <a:lnRef idx="1">
-            <a:schemeClr val="accent1"/>
-          </a:lnRef>
-          <a:fillRef idx="0">
-            <a:schemeClr val="accent1"/>
-          </a:fillRef>
-          <a:effectRef idx="0">
-            <a:schemeClr val="accent1"/>
-          </a:effectRef>
-          <a:fontRef idx="minor">
-            <a:schemeClr val="tx1"/>
-          </a:fontRef>
-        </p:style>
-      </p:cxnSp>
-      <p:cxnSp>
-        <p:nvCxnSpPr>
-          <p:cNvPr id="26" name="Straight Arrow Connector 25">
-            <a:extLst>
-              <a:ext uri="{FF2B5EF4-FFF2-40B4-BE49-F238E27FC236}">
-                <a16:creationId xmlns:a16="http://schemas.microsoft.com/office/drawing/2014/main" id="{5630532D-51D3-9442-BA51-7D5C5313663B}"/>
-              </a:ext>
-            </a:extLst>
-          </p:cNvPr>
-          <p:cNvCxnSpPr>
-            <a:cxnSpLocks/>
-          </p:cNvCxnSpPr>
-          <p:nvPr/>
-        </p:nvCxnSpPr>
-        <p:spPr>
-          <a:xfrm>
-            <a:off x="6058178" y="7456814"/>
-            <a:ext cx="0" cy="602224"/>
-          </a:xfrm>
-          <a:prstGeom prst="straightConnector1">
-            <a:avLst/>
-          </a:prstGeom>
-          <a:ln>
-            <a:solidFill>
-              <a:schemeClr val="tx1">
-                <a:lumMod val="50000"/>
-                <a:lumOff val="50000"/>
-              </a:schemeClr>
-            </a:solidFill>
-            <a:tailEnd type="triangle"/>
-          </a:ln>
-        </p:spPr>
-        <p:style>
-          <a:lnRef idx="1">
-            <a:schemeClr val="accent1"/>
-          </a:lnRef>
-          <a:fillRef idx="0">
-            <a:schemeClr val="accent1"/>
-          </a:fillRef>
-          <a:effectRef idx="0">
-            <a:schemeClr val="accent1"/>
-          </a:effectRef>
-          <a:fontRef idx="minor">
-            <a:schemeClr val="tx1"/>
-          </a:fontRef>
-        </p:style>
-      </p:cxnSp>
-      <p:cxnSp>
-        <p:nvCxnSpPr>
-          <p:cNvPr id="27" name="Straight Arrow Connector 26">
-            <a:extLst>
-              <a:ext uri="{FF2B5EF4-FFF2-40B4-BE49-F238E27FC236}">
-                <a16:creationId xmlns:a16="http://schemas.microsoft.com/office/drawing/2014/main" id="{CBEB1666-A39E-DB4F-8013-37F50F902A0C}"/>
-              </a:ext>
-            </a:extLst>
-          </p:cNvPr>
-          <p:cNvCxnSpPr>
-            <a:cxnSpLocks/>
-          </p:cNvCxnSpPr>
-          <p:nvPr/>
-        </p:nvCxnSpPr>
-        <p:spPr>
-          <a:xfrm>
-            <a:off x="3920167" y="6506413"/>
-            <a:ext cx="0" cy="1523074"/>
-          </a:xfrm>
-          <a:prstGeom prst="straightConnector1">
-            <a:avLst/>
-          </a:prstGeom>
-          <a:ln>
-            <a:solidFill>
-              <a:schemeClr val="tx1">
-                <a:lumMod val="50000"/>
-                <a:lumOff val="50000"/>
-              </a:schemeClr>
-            </a:solidFill>
-            <a:tailEnd type="triangle"/>
-          </a:ln>
-        </p:spPr>
-        <p:style>
-          <a:lnRef idx="1">
-            <a:schemeClr val="accent1"/>
-          </a:lnRef>
-          <a:fillRef idx="0">
-            <a:schemeClr val="accent1"/>
-          </a:fillRef>
-          <a:effectRef idx="0">
-            <a:schemeClr val="accent1"/>
-          </a:effectRef>
-          <a:fontRef idx="minor">
-            <a:schemeClr val="tx1"/>
-          </a:fontRef>
-        </p:style>
-      </p:cxnSp>
-      <p:cxnSp>
-        <p:nvCxnSpPr>
-          <p:cNvPr id="33" name="Straight Arrow Connector 32">
-            <a:extLst>
-              <a:ext uri="{FF2B5EF4-FFF2-40B4-BE49-F238E27FC236}">
-                <a16:creationId xmlns:a16="http://schemas.microsoft.com/office/drawing/2014/main" id="{6A18AAB6-40CD-7744-8AB4-98DD9A9F0D1A}"/>
-              </a:ext>
-            </a:extLst>
-          </p:cNvPr>
-          <p:cNvCxnSpPr>
-            <a:cxnSpLocks/>
-          </p:cNvCxnSpPr>
-          <p:nvPr/>
-        </p:nvCxnSpPr>
-        <p:spPr>
-          <a:xfrm>
-            <a:off x="4905896" y="3638357"/>
-            <a:ext cx="0" cy="262924"/>
-          </a:xfrm>
-          <a:prstGeom prst="straightConnector1">
-            <a:avLst/>
-          </a:prstGeom>
-          <a:ln>
-            <a:solidFill>
-              <a:schemeClr val="tx1">
-                <a:lumMod val="50000"/>
-                <a:lumOff val="50000"/>
-              </a:schemeClr>
-            </a:solidFill>
-            <a:tailEnd type="triangle"/>
-          </a:ln>
-        </p:spPr>
-        <p:style>
-          <a:lnRef idx="1">
-            <a:schemeClr val="accent1"/>
-          </a:lnRef>
-          <a:fillRef idx="0">
-            <a:schemeClr val="accent1"/>
-          </a:fillRef>
-          <a:effectRef idx="0">
-            <a:schemeClr val="accent1"/>
-          </a:effectRef>
-          <a:fontRef idx="minor">
-            <a:schemeClr val="tx1"/>
-          </a:fontRef>
-        </p:style>
-      </p:cxnSp>
-      <p:sp>
-        <p:nvSpPr>
-          <p:cNvPr id="35" name="Rectangle 34">
-            <a:extLst>
-              <a:ext uri="{FF2B5EF4-FFF2-40B4-BE49-F238E27FC236}">
-                <a16:creationId xmlns:a16="http://schemas.microsoft.com/office/drawing/2014/main" id="{48584CFC-8AA5-A24C-AA2A-281FBC765270}"/>
-              </a:ext>
-            </a:extLst>
-          </p:cNvPr>
-          <p:cNvSpPr/>
-          <p:nvPr/>
-        </p:nvSpPr>
-        <p:spPr>
-          <a:xfrm>
-            <a:off x="2478218" y="4602290"/>
-            <a:ext cx="1365668" cy="307777"/>
-          </a:xfrm>
-          <a:prstGeom prst="rect">
-            <a:avLst/>
-          </a:prstGeom>
-        </p:spPr>
-        <p:txBody>
-          <a:bodyPr wrap="square">
-            <a:spAutoFit/>
-          </a:bodyPr>
-          <a:lstStyle/>
-          <a:p>
-            <a:r>
-              <a:rPr lang="en-US" sz="1400" dirty="0">
-                <a:latin typeface="Arial" panose="020B0604020202020204" pitchFamily="34" charset="0"/>
-                <a:cs typeface="Arial" panose="020B0604020202020204" pitchFamily="34" charset="0"/>
-              </a:rPr>
-              <a:t>SMP/E</a:t>
-            </a:r>
-            <a:r>
-              <a:rPr lang="zh-CN" altLang="en-US" sz="1400" dirty="0">
-                <a:latin typeface="Arial" panose="020B0604020202020204" pitchFamily="34" charset="0"/>
-                <a:cs typeface="Arial" panose="020B0604020202020204" pitchFamily="34" charset="0"/>
-              </a:rPr>
-              <a:t> </a:t>
-            </a:r>
-            <a:r>
-              <a:rPr lang="en-US" altLang="zh-CN" sz="1400" dirty="0">
-                <a:latin typeface="Arial" panose="020B0604020202020204" pitchFamily="34" charset="0"/>
-                <a:cs typeface="Arial" panose="020B0604020202020204" pitchFamily="34" charset="0"/>
-              </a:rPr>
-              <a:t>build</a:t>
-            </a:r>
-            <a:r>
-              <a:rPr lang="en-US" sz="1400" dirty="0">
-                <a:latin typeface="Arial" panose="020B0604020202020204" pitchFamily="34" charset="0"/>
-                <a:cs typeface="Arial" panose="020B0604020202020204" pitchFamily="34" charset="0"/>
-              </a:rPr>
-              <a:t> </a:t>
-            </a:r>
-          </a:p>
-        </p:txBody>
-      </p:sp>
-      <p:sp>
-        <p:nvSpPr>
-          <p:cNvPr id="36" name="Rectangle 35">
-            <a:extLst>
-              <a:ext uri="{FF2B5EF4-FFF2-40B4-BE49-F238E27FC236}">
-                <a16:creationId xmlns:a16="http://schemas.microsoft.com/office/drawing/2014/main" id="{87236179-D445-7148-9218-51771C4CD928}"/>
-              </a:ext>
-            </a:extLst>
-          </p:cNvPr>
-          <p:cNvSpPr/>
-          <p:nvPr/>
-        </p:nvSpPr>
-        <p:spPr>
-          <a:xfrm>
-            <a:off x="6175591" y="4602290"/>
-            <a:ext cx="1682987" cy="307777"/>
-          </a:xfrm>
-          <a:prstGeom prst="rect">
-            <a:avLst/>
-          </a:prstGeom>
-        </p:spPr>
-        <p:txBody>
-          <a:bodyPr wrap="square">
-            <a:spAutoFit/>
-          </a:bodyPr>
-          <a:lstStyle/>
-          <a:p>
-            <a:r>
-              <a:rPr lang="en-US" altLang="zh-CN" sz="1400" dirty="0">
-                <a:latin typeface="Arial" panose="020B0604020202020204" pitchFamily="34" charset="0"/>
-                <a:cs typeface="Arial" panose="020B0604020202020204" pitchFamily="34" charset="0"/>
-              </a:rPr>
-              <a:t>Convenience</a:t>
-            </a:r>
-            <a:r>
-              <a:rPr lang="zh-CN" altLang="en-US" sz="1400" dirty="0">
-                <a:latin typeface="Arial" panose="020B0604020202020204" pitchFamily="34" charset="0"/>
-                <a:cs typeface="Arial" panose="020B0604020202020204" pitchFamily="34" charset="0"/>
-              </a:rPr>
-              <a:t> </a:t>
-            </a:r>
-            <a:r>
-              <a:rPr lang="en-US" altLang="zh-CN" sz="1400" dirty="0">
-                <a:latin typeface="Arial" panose="020B0604020202020204" pitchFamily="34" charset="0"/>
-                <a:cs typeface="Arial" panose="020B0604020202020204" pitchFamily="34" charset="0"/>
-              </a:rPr>
-              <a:t>build</a:t>
-            </a:r>
-            <a:r>
-              <a:rPr lang="en-US" sz="1400" dirty="0">
-                <a:latin typeface="Arial" panose="020B0604020202020204" pitchFamily="34" charset="0"/>
-                <a:cs typeface="Arial" panose="020B0604020202020204" pitchFamily="34" charset="0"/>
-              </a:rPr>
-              <a:t> </a:t>
-            </a:r>
-          </a:p>
-        </p:txBody>
-      </p:sp>
-      <p:sp>
-        <p:nvSpPr>
-          <p:cNvPr id="42" name="Rectangle 41">
-            <a:extLst>
-              <a:ext uri="{FF2B5EF4-FFF2-40B4-BE49-F238E27FC236}">
-                <a16:creationId xmlns:a16="http://schemas.microsoft.com/office/drawing/2014/main" id="{9F2BA88F-041C-6D4F-A122-4A1BEE26DF71}"/>
-              </a:ext>
-            </a:extLst>
-          </p:cNvPr>
-          <p:cNvSpPr/>
-          <p:nvPr/>
-        </p:nvSpPr>
-        <p:spPr>
-          <a:xfrm>
-            <a:off x="3044878" y="9598057"/>
-            <a:ext cx="5165207" cy="1100583"/>
-          </a:xfrm>
-          <a:prstGeom prst="rect">
-            <a:avLst/>
-          </a:prstGeom>
-          <a:solidFill>
-            <a:schemeClr val="bg1">
-              <a:lumMod val="95000"/>
-              <a:alpha val="74000"/>
-            </a:schemeClr>
-          </a:solidFill>
-          <a:ln>
-            <a:solidFill>
-              <a:schemeClr val="accent3">
-                <a:lumMod val="60000"/>
-                <a:lumOff val="40000"/>
-              </a:schemeClr>
-            </a:solidFill>
-          </a:ln>
-        </p:spPr>
-        <p:style>
-          <a:lnRef idx="2">
-            <a:schemeClr val="accent1">
-              <a:shade val="50000"/>
-            </a:schemeClr>
-          </a:lnRef>
-          <a:fillRef idx="1">
-            <a:schemeClr val="accent1"/>
-          </a:fillRef>
-          <a:effectRef idx="0">
-            <a:schemeClr val="accent1"/>
-          </a:effectRef>
-          <a:fontRef idx="minor">
-            <a:schemeClr val="lt1"/>
-          </a:fontRef>
-        </p:style>
-        <p:txBody>
-          <a:bodyPr rot="0" spcFirstLastPara="0" vertOverflow="overflow" horzOverflow="overflow" vert="horz" wrap="square" lIns="91440" tIns="45720" rIns="91440" bIns="45720" numCol="1" spcCol="0" rtlCol="0" fromWordArt="0" anchor="t" anchorCtr="0" forceAA="0" compatLnSpc="1">
-            <a:prstTxWarp prst="textNoShape">
-              <a:avLst/>
-            </a:prstTxWarp>
-            <a:noAutofit/>
-          </a:bodyPr>
-          <a:lstStyle/>
-          <a:p>
-            <a:pPr algn="ctr"/>
-            <a:r>
-              <a:rPr lang="en-US" altLang="zh-CN" sz="1100" dirty="0">
-                <a:solidFill>
-                  <a:schemeClr val="tx1"/>
-                </a:solidFill>
-                <a:latin typeface="Arial" panose="020B0604020202020204" pitchFamily="34" charset="0"/>
-                <a:cs typeface="Arial" panose="020B0604020202020204" pitchFamily="34" charset="0"/>
-              </a:rPr>
-              <a:t>(One-time setup per z/OS environment) </a:t>
-            </a:r>
-            <a:endParaRPr lang="en-US" sz="1100" dirty="0">
-              <a:solidFill>
-                <a:schemeClr val="tx1"/>
-              </a:solidFill>
-              <a:latin typeface="Arial" panose="020B0604020202020204" pitchFamily="34" charset="0"/>
-              <a:cs typeface="Arial" panose="020B0604020202020204" pitchFamily="34" charset="0"/>
-            </a:endParaRPr>
-          </a:p>
-          <a:p>
-            <a:pPr algn="ctr"/>
-            <a:r>
-              <a:rPr lang="en-US" sz="1100" dirty="0">
-                <a:solidFill>
-                  <a:schemeClr val="tx1"/>
-                </a:solidFill>
-                <a:latin typeface="Arial" panose="020B0604020202020204" pitchFamily="34" charset="0"/>
-                <a:cs typeface="Arial" panose="020B0604020202020204" pitchFamily="34" charset="0"/>
-              </a:rPr>
-              <a:t>C</a:t>
-            </a:r>
-            <a:r>
-              <a:rPr lang="en-US" altLang="zh-CN" sz="1100" dirty="0">
-                <a:solidFill>
-                  <a:schemeClr val="tx1"/>
-                </a:solidFill>
-                <a:latin typeface="Arial" panose="020B0604020202020204" pitchFamily="34" charset="0"/>
-                <a:cs typeface="Arial" panose="020B0604020202020204" pitchFamily="34" charset="0"/>
-              </a:rPr>
-              <a:t>reate</a:t>
-            </a:r>
-            <a:r>
-              <a:rPr lang="zh-CN" altLang="en-US" sz="1100" dirty="0">
-                <a:solidFill>
-                  <a:schemeClr val="tx1"/>
-                </a:solidFill>
-                <a:latin typeface="Arial" panose="020B0604020202020204" pitchFamily="34" charset="0"/>
-                <a:cs typeface="Arial" panose="020B0604020202020204" pitchFamily="34" charset="0"/>
-              </a:rPr>
-              <a:t> </a:t>
-            </a:r>
-            <a:r>
-              <a:rPr lang="en-US" altLang="zh-CN" sz="1100" dirty="0">
-                <a:solidFill>
-                  <a:schemeClr val="tx1"/>
-                </a:solidFill>
-                <a:latin typeface="Arial" panose="020B0604020202020204" pitchFamily="34" charset="0"/>
-                <a:cs typeface="Arial" panose="020B0604020202020204" pitchFamily="34" charset="0"/>
-              </a:rPr>
-              <a:t>the</a:t>
-            </a:r>
-            <a:r>
-              <a:rPr lang="en-US" sz="1100" dirty="0">
-                <a:solidFill>
-                  <a:schemeClr val="tx1"/>
-                </a:solidFill>
-                <a:latin typeface="Arial" panose="020B0604020202020204" pitchFamily="34" charset="0"/>
-                <a:cs typeface="Arial" panose="020B0604020202020204" pitchFamily="34" charset="0"/>
-              </a:rPr>
-              <a:t> Zowe certificates </a:t>
-            </a:r>
-            <a:r>
-              <a:rPr lang="en-US" sz="1100" dirty="0" err="1">
-                <a:solidFill>
-                  <a:schemeClr val="tx1"/>
-                </a:solidFill>
-                <a:latin typeface="Arial" panose="020B0604020202020204" pitchFamily="34" charset="0"/>
-                <a:cs typeface="Arial" panose="020B0604020202020204" pitchFamily="34" charset="0"/>
-              </a:rPr>
-              <a:t>keystore</a:t>
-            </a:r>
-            <a:r>
-              <a:rPr lang="en-US" sz="1100" dirty="0">
-                <a:solidFill>
-                  <a:schemeClr val="tx1"/>
-                </a:solidFill>
-                <a:latin typeface="Arial" panose="020B0604020202020204" pitchFamily="34" charset="0"/>
-                <a:cs typeface="Arial" panose="020B0604020202020204" pitchFamily="34" charset="0"/>
-              </a:rPr>
-              <a:t> directory</a:t>
-            </a:r>
-            <a:r>
-              <a:rPr lang="zh-CN" altLang="en-US" sz="1100" dirty="0">
-                <a:solidFill>
-                  <a:schemeClr val="tx1"/>
-                </a:solidFill>
-                <a:latin typeface="Arial" panose="020B0604020202020204" pitchFamily="34" charset="0"/>
-                <a:cs typeface="Arial" panose="020B0604020202020204" pitchFamily="34" charset="0"/>
-              </a:rPr>
-              <a:t> </a:t>
-            </a:r>
-            <a:endParaRPr lang="en-US" altLang="zh-CN" sz="1100" dirty="0">
-              <a:solidFill>
-                <a:schemeClr val="tx1"/>
-              </a:solidFill>
-              <a:latin typeface="Arial" panose="020B0604020202020204" pitchFamily="34" charset="0"/>
-              <a:cs typeface="Arial" panose="020B0604020202020204" pitchFamily="34" charset="0"/>
-            </a:endParaRPr>
-          </a:p>
-        </p:txBody>
-      </p:sp>
-      <p:cxnSp>
-        <p:nvCxnSpPr>
-          <p:cNvPr id="43" name="Straight Arrow Connector 42">
-            <a:extLst>
-              <a:ext uri="{FF2B5EF4-FFF2-40B4-BE49-F238E27FC236}">
-                <a16:creationId xmlns:a16="http://schemas.microsoft.com/office/drawing/2014/main" id="{9529C900-E8E1-7B4B-810B-D57A3AEC3C3B}"/>
-              </a:ext>
-            </a:extLst>
-          </p:cNvPr>
-          <p:cNvCxnSpPr>
-            <a:cxnSpLocks/>
-          </p:cNvCxnSpPr>
-          <p:nvPr/>
-        </p:nvCxnSpPr>
-        <p:spPr>
-          <a:xfrm>
-            <a:off x="5640469" y="9257724"/>
-            <a:ext cx="0" cy="340330"/>
-          </a:xfrm>
-          <a:prstGeom prst="straightConnector1">
-            <a:avLst/>
-          </a:prstGeom>
-          <a:ln>
-            <a:solidFill>
-              <a:schemeClr val="tx1">
-                <a:lumMod val="50000"/>
-                <a:lumOff val="50000"/>
-              </a:schemeClr>
-            </a:solidFill>
-            <a:tailEnd type="triangle"/>
-          </a:ln>
-        </p:spPr>
-        <p:style>
-          <a:lnRef idx="1">
-            <a:schemeClr val="accent1"/>
-          </a:lnRef>
-          <a:fillRef idx="0">
-            <a:schemeClr val="accent1"/>
-          </a:fillRef>
-          <a:effectRef idx="0">
-            <a:schemeClr val="accent1"/>
-          </a:effectRef>
-          <a:fontRef idx="minor">
-            <a:schemeClr val="tx1"/>
-          </a:fontRef>
-        </p:style>
-      </p:cxnSp>
-      <p:sp>
-        <p:nvSpPr>
-          <p:cNvPr id="44" name="Rectangle 43">
-            <a:extLst>
-              <a:ext uri="{FF2B5EF4-FFF2-40B4-BE49-F238E27FC236}">
-                <a16:creationId xmlns:a16="http://schemas.microsoft.com/office/drawing/2014/main" id="{6AF4CDAB-F979-E143-9711-D9E6931E78F5}"/>
-              </a:ext>
-            </a:extLst>
-          </p:cNvPr>
-          <p:cNvSpPr/>
-          <p:nvPr/>
-        </p:nvSpPr>
-        <p:spPr>
-          <a:xfrm>
-            <a:off x="7987484" y="11164341"/>
-            <a:ext cx="1047242" cy="920904"/>
-          </a:xfrm>
-          <a:prstGeom prst="rect">
-            <a:avLst/>
-          </a:prstGeom>
-          <a:solidFill>
-            <a:schemeClr val="bg1">
-              <a:lumMod val="95000"/>
-              <a:alpha val="74000"/>
-            </a:schemeClr>
-          </a:solidFill>
-          <a:ln>
-            <a:solidFill>
-              <a:schemeClr val="accent3">
-                <a:lumMod val="60000"/>
-                <a:lumOff val="40000"/>
-              </a:schemeClr>
-            </a:solidFill>
-          </a:ln>
-        </p:spPr>
-        <p:style>
-          <a:lnRef idx="2">
-            <a:schemeClr val="accent1">
-              <a:shade val="50000"/>
-            </a:schemeClr>
-          </a:lnRef>
-          <a:fillRef idx="1">
-            <a:schemeClr val="accent1"/>
-          </a:fillRef>
-          <a:effectRef idx="0">
-            <a:schemeClr val="accent1"/>
-          </a:effectRef>
-          <a:fontRef idx="minor">
-            <a:schemeClr val="lt1"/>
-          </a:fontRef>
-        </p:style>
-        <p:txBody>
-          <a:bodyPr rot="0" spcFirstLastPara="0" vertOverflow="overflow" horzOverflow="overflow" vert="horz" wrap="square" lIns="91440" tIns="45720" rIns="91440" bIns="45720" numCol="1" spcCol="0" rtlCol="0" fromWordArt="0" anchor="ctr" anchorCtr="0" forceAA="0" compatLnSpc="1">
-            <a:prstTxWarp prst="textNoShape">
-              <a:avLst/>
-            </a:prstTxWarp>
-            <a:noAutofit/>
-          </a:bodyPr>
-          <a:lstStyle/>
-          <a:p>
-            <a:pPr algn="r"/>
-            <a:r>
-              <a:rPr lang="en-US" sz="1100" dirty="0">
-                <a:solidFill>
-                  <a:schemeClr val="tx1"/>
-                </a:solidFill>
-                <a:latin typeface="Arial" panose="020B0604020202020204" pitchFamily="34" charset="0"/>
-                <a:cs typeface="Arial" panose="020B0604020202020204" pitchFamily="34" charset="0"/>
-              </a:rPr>
-              <a:t>Instance</a:t>
-            </a:r>
-            <a:r>
-              <a:rPr lang="zh-CN" altLang="en-US" sz="1100" dirty="0">
-                <a:solidFill>
-                  <a:schemeClr val="tx1"/>
-                </a:solidFill>
-                <a:latin typeface="Arial" panose="020B0604020202020204" pitchFamily="34" charset="0"/>
-                <a:cs typeface="Arial" panose="020B0604020202020204" pitchFamily="34" charset="0"/>
-              </a:rPr>
-              <a:t> </a:t>
-            </a:r>
-            <a:r>
-              <a:rPr lang="en-US" altLang="zh-CN" sz="1100" dirty="0">
-                <a:solidFill>
-                  <a:schemeClr val="tx1"/>
-                </a:solidFill>
-                <a:latin typeface="Arial" panose="020B0604020202020204" pitchFamily="34" charset="0"/>
-                <a:cs typeface="Arial" panose="020B0604020202020204" pitchFamily="34" charset="0"/>
-              </a:rPr>
-              <a:t>directory</a:t>
-            </a:r>
-            <a:r>
-              <a:rPr lang="en-US" sz="1100" dirty="0">
-                <a:solidFill>
-                  <a:schemeClr val="tx1"/>
-                </a:solidFill>
-                <a:latin typeface="Arial" panose="020B0604020202020204" pitchFamily="34" charset="0"/>
-                <a:cs typeface="Arial" panose="020B0604020202020204" pitchFamily="34" charset="0"/>
-              </a:rPr>
-              <a:t> 2</a:t>
-            </a:r>
-          </a:p>
-        </p:txBody>
-      </p:sp>
-      <p:sp>
-        <p:nvSpPr>
-          <p:cNvPr id="41" name="Rectangle 40">
-            <a:extLst>
-              <a:ext uri="{FF2B5EF4-FFF2-40B4-BE49-F238E27FC236}">
-                <a16:creationId xmlns:a16="http://schemas.microsoft.com/office/drawing/2014/main" id="{D241ABC9-99D2-994E-B685-7D82041E280C}"/>
-              </a:ext>
-            </a:extLst>
-          </p:cNvPr>
-          <p:cNvSpPr/>
-          <p:nvPr/>
-        </p:nvSpPr>
-        <p:spPr>
-          <a:xfrm>
-            <a:off x="3031539" y="11037968"/>
-            <a:ext cx="5178545" cy="920905"/>
-          </a:xfrm>
-          <a:prstGeom prst="rect">
-            <a:avLst/>
-          </a:prstGeom>
-          <a:solidFill>
-            <a:schemeClr val="bg1">
-              <a:lumMod val="95000"/>
-              <a:alpha val="74000"/>
-            </a:schemeClr>
-          </a:solidFill>
-          <a:ln>
-            <a:solidFill>
-              <a:schemeClr val="accent3">
-                <a:lumMod val="60000"/>
-                <a:lumOff val="40000"/>
-              </a:schemeClr>
-            </a:solidFill>
-          </a:ln>
-        </p:spPr>
-        <p:style>
-          <a:lnRef idx="2">
-            <a:schemeClr val="accent1">
-              <a:shade val="50000"/>
-            </a:schemeClr>
-          </a:lnRef>
-          <a:fillRef idx="1">
-            <a:schemeClr val="accent1"/>
-          </a:fillRef>
-          <a:effectRef idx="0">
-            <a:schemeClr val="accent1"/>
-          </a:effectRef>
-          <a:fontRef idx="minor">
-            <a:schemeClr val="lt1"/>
-          </a:fontRef>
-        </p:style>
-        <p:txBody>
-          <a:bodyPr rot="0" spcFirstLastPara="0" vertOverflow="overflow" horzOverflow="overflow" vert="horz" wrap="square" lIns="91440" tIns="45720" rIns="91440" bIns="45720" numCol="1" spcCol="0" rtlCol="0" fromWordArt="0" anchor="t" anchorCtr="0" forceAA="0" compatLnSpc="1">
-            <a:prstTxWarp prst="textNoShape">
-              <a:avLst/>
-            </a:prstTxWarp>
-            <a:noAutofit/>
-          </a:bodyPr>
-          <a:lstStyle/>
-          <a:p>
-            <a:pPr algn="ctr"/>
-            <a:r>
-              <a:rPr lang="en-US" altLang="zh-CN" sz="1100" dirty="0">
-                <a:solidFill>
-                  <a:schemeClr val="tx1"/>
-                </a:solidFill>
-                <a:latin typeface="Arial" panose="020B0604020202020204" pitchFamily="34" charset="0"/>
-                <a:cs typeface="Arial" panose="020B0604020202020204" pitchFamily="34" charset="0"/>
-              </a:rPr>
-              <a:t>Create</a:t>
-            </a:r>
-            <a:r>
-              <a:rPr lang="zh-CN" altLang="en-US" sz="1100" dirty="0">
-                <a:solidFill>
-                  <a:schemeClr val="tx1"/>
-                </a:solidFill>
-                <a:latin typeface="Arial" panose="020B0604020202020204" pitchFamily="34" charset="0"/>
-                <a:cs typeface="Arial" panose="020B0604020202020204" pitchFamily="34" charset="0"/>
-              </a:rPr>
-              <a:t> </a:t>
-            </a:r>
-            <a:r>
-              <a:rPr lang="en-US" altLang="zh-CN" sz="1100" dirty="0">
-                <a:solidFill>
-                  <a:schemeClr val="tx1"/>
-                </a:solidFill>
-                <a:latin typeface="Arial" panose="020B0604020202020204" pitchFamily="34" charset="0"/>
-                <a:cs typeface="Arial" panose="020B0604020202020204" pitchFamily="34" charset="0"/>
-              </a:rPr>
-              <a:t>and</a:t>
-            </a:r>
-            <a:r>
-              <a:rPr lang="zh-CN" altLang="en-US" sz="1100" dirty="0">
-                <a:solidFill>
-                  <a:schemeClr val="tx1"/>
-                </a:solidFill>
-                <a:latin typeface="Arial" panose="020B0604020202020204" pitchFamily="34" charset="0"/>
-                <a:cs typeface="Arial" panose="020B0604020202020204" pitchFamily="34" charset="0"/>
-              </a:rPr>
-              <a:t> </a:t>
-            </a:r>
-            <a:r>
-              <a:rPr lang="en-US" altLang="zh-CN" sz="1100" dirty="0">
-                <a:solidFill>
-                  <a:schemeClr val="tx1"/>
-                </a:solidFill>
-                <a:latin typeface="Arial" panose="020B0604020202020204" pitchFamily="34" charset="0"/>
-                <a:cs typeface="Arial" panose="020B0604020202020204" pitchFamily="34" charset="0"/>
-              </a:rPr>
-              <a:t>c</a:t>
-            </a:r>
-            <a:r>
-              <a:rPr lang="en-US" sz="1100" dirty="0">
-                <a:solidFill>
-                  <a:schemeClr val="tx1"/>
-                </a:solidFill>
-                <a:latin typeface="Arial" panose="020B0604020202020204" pitchFamily="34" charset="0"/>
-                <a:cs typeface="Arial" panose="020B0604020202020204" pitchFamily="34" charset="0"/>
-              </a:rPr>
-              <a:t>onfigure the Zowe instance directory</a:t>
-            </a:r>
-            <a:endParaRPr lang="en-US" altLang="zh-CN" sz="1100" dirty="0">
-              <a:solidFill>
-                <a:schemeClr val="tx1"/>
-              </a:solidFill>
-              <a:latin typeface="Arial" panose="020B0604020202020204" pitchFamily="34" charset="0"/>
-              <a:cs typeface="Arial" panose="020B0604020202020204" pitchFamily="34" charset="0"/>
-            </a:endParaRPr>
-          </a:p>
-        </p:txBody>
-      </p:sp>
-      <p:sp>
-        <p:nvSpPr>
-          <p:cNvPr id="46" name="Rectangle 45">
-            <a:extLst>
-              <a:ext uri="{FF2B5EF4-FFF2-40B4-BE49-F238E27FC236}">
-                <a16:creationId xmlns:a16="http://schemas.microsoft.com/office/drawing/2014/main" id="{1A5DCA99-4FB0-8E44-9832-2707E19F2A44}"/>
-              </a:ext>
-            </a:extLst>
-          </p:cNvPr>
-          <p:cNvSpPr/>
-          <p:nvPr/>
-        </p:nvSpPr>
-        <p:spPr>
-          <a:xfrm>
-            <a:off x="3044878" y="13373690"/>
-            <a:ext cx="5158421" cy="558971"/>
-          </a:xfrm>
-          <a:prstGeom prst="rect">
-            <a:avLst/>
-          </a:prstGeom>
-          <a:solidFill>
-            <a:schemeClr val="bg1">
-              <a:lumMod val="95000"/>
-              <a:alpha val="74000"/>
-            </a:schemeClr>
-          </a:solidFill>
-          <a:ln>
-            <a:solidFill>
-              <a:schemeClr val="accent3">
-                <a:lumMod val="60000"/>
-                <a:lumOff val="40000"/>
-              </a:schemeClr>
-            </a:solidFill>
-          </a:ln>
-        </p:spPr>
-        <p:style>
-          <a:lnRef idx="2">
-            <a:schemeClr val="accent1">
-              <a:shade val="50000"/>
-            </a:schemeClr>
-          </a:lnRef>
-          <a:fillRef idx="1">
-            <a:schemeClr val="accent1"/>
-          </a:fillRef>
-          <a:effectRef idx="0">
-            <a:schemeClr val="accent1"/>
-          </a:effectRef>
-          <a:fontRef idx="minor">
-            <a:schemeClr val="lt1"/>
-          </a:fontRef>
-        </p:style>
-        <p:txBody>
-          <a:bodyPr rot="0" spcFirstLastPara="0" vertOverflow="overflow" horzOverflow="overflow" vert="horz" wrap="square" lIns="91440" tIns="45720" rIns="91440" bIns="45720" numCol="1" spcCol="0" rtlCol="0" fromWordArt="0" anchor="ctr" anchorCtr="0" forceAA="0" compatLnSpc="1">
-            <a:prstTxWarp prst="textNoShape">
-              <a:avLst/>
-            </a:prstTxWarp>
-            <a:noAutofit/>
-          </a:bodyPr>
-          <a:lstStyle/>
-          <a:p>
-            <a:pPr algn="ctr"/>
-            <a:r>
-              <a:rPr lang="en-US" altLang="zh-CN" sz="1100" dirty="0">
-                <a:solidFill>
-                  <a:schemeClr val="tx1"/>
-                </a:solidFill>
-                <a:latin typeface="Arial" panose="020B0604020202020204" pitchFamily="34" charset="0"/>
-                <a:cs typeface="Arial" panose="020B0604020202020204" pitchFamily="34" charset="0"/>
-              </a:rPr>
-              <a:t>Install</a:t>
-            </a:r>
-            <a:r>
-              <a:rPr lang="zh-CN" altLang="en-US" sz="1100" dirty="0">
-                <a:solidFill>
-                  <a:schemeClr val="tx1"/>
-                </a:solidFill>
-                <a:latin typeface="Arial" panose="020B0604020202020204" pitchFamily="34" charset="0"/>
-                <a:cs typeface="Arial" panose="020B0604020202020204" pitchFamily="34" charset="0"/>
-              </a:rPr>
-              <a:t> </a:t>
-            </a:r>
-            <a:r>
-              <a:rPr lang="en-US" altLang="zh-CN" sz="1100" dirty="0">
-                <a:solidFill>
-                  <a:schemeClr val="tx1"/>
-                </a:solidFill>
-                <a:latin typeface="Arial" panose="020B0604020202020204" pitchFamily="34" charset="0"/>
-                <a:cs typeface="Arial" panose="020B0604020202020204" pitchFamily="34" charset="0"/>
-              </a:rPr>
-              <a:t>the</a:t>
-            </a:r>
-            <a:r>
-              <a:rPr lang="zh-CN" altLang="en-US" sz="1100" dirty="0">
-                <a:solidFill>
-                  <a:schemeClr val="tx1"/>
-                </a:solidFill>
-                <a:latin typeface="Arial" panose="020B0604020202020204" pitchFamily="34" charset="0"/>
-                <a:cs typeface="Arial" panose="020B0604020202020204" pitchFamily="34" charset="0"/>
-              </a:rPr>
-              <a:t> </a:t>
-            </a:r>
-            <a:r>
-              <a:rPr lang="en-US" altLang="zh-CN" sz="1100" dirty="0" err="1">
-                <a:solidFill>
-                  <a:schemeClr val="tx1"/>
-                </a:solidFill>
-                <a:latin typeface="Arial" panose="020B0604020202020204" pitchFamily="34" charset="0"/>
-                <a:cs typeface="Arial" panose="020B0604020202020204" pitchFamily="34" charset="0"/>
-              </a:rPr>
-              <a:t>Zowe</a:t>
-            </a:r>
-            <a:r>
-              <a:rPr lang="zh-CN" altLang="en-US" sz="1100" dirty="0">
-                <a:solidFill>
-                  <a:schemeClr val="tx1"/>
-                </a:solidFill>
-                <a:latin typeface="Arial" panose="020B0604020202020204" pitchFamily="34" charset="0"/>
-                <a:cs typeface="Arial" panose="020B0604020202020204" pitchFamily="34" charset="0"/>
-              </a:rPr>
-              <a:t> </a:t>
-            </a:r>
-            <a:r>
-              <a:rPr lang="en-US" altLang="zh-CN" sz="1100" dirty="0">
-                <a:solidFill>
-                  <a:schemeClr val="tx1"/>
-                </a:solidFill>
-                <a:latin typeface="Arial" panose="020B0604020202020204" pitchFamily="34" charset="0"/>
-                <a:cs typeface="Arial" panose="020B0604020202020204" pitchFamily="34" charset="0"/>
-              </a:rPr>
-              <a:t>started</a:t>
-            </a:r>
-            <a:r>
-              <a:rPr lang="zh-CN" altLang="en-US" sz="1100" dirty="0">
-                <a:solidFill>
-                  <a:schemeClr val="tx1"/>
-                </a:solidFill>
-                <a:latin typeface="Arial" panose="020B0604020202020204" pitchFamily="34" charset="0"/>
-                <a:cs typeface="Arial" panose="020B0604020202020204" pitchFamily="34" charset="0"/>
-              </a:rPr>
-              <a:t> </a:t>
-            </a:r>
-            <a:r>
-              <a:rPr lang="en-US" altLang="zh-CN" sz="1100" dirty="0">
-                <a:solidFill>
-                  <a:schemeClr val="tx1"/>
-                </a:solidFill>
-                <a:latin typeface="Arial" panose="020B0604020202020204" pitchFamily="34" charset="0"/>
-                <a:cs typeface="Arial" panose="020B0604020202020204" pitchFamily="34" charset="0"/>
-              </a:rPr>
-              <a:t>task (ZWESVSTC)</a:t>
-            </a:r>
-          </a:p>
-          <a:p>
-            <a:pPr algn="ctr"/>
-            <a:r>
-              <a:rPr lang="en-US" altLang="zh-CN" sz="1100" dirty="0">
-                <a:solidFill>
-                  <a:srgbClr val="0070C0"/>
-                </a:solidFill>
-                <a:latin typeface="Arial" panose="020B0604020202020204" pitchFamily="34" charset="0"/>
-                <a:cs typeface="Arial" panose="020B0604020202020204" pitchFamily="34" charset="0"/>
-              </a:rPr>
-              <a:t>(Script:</a:t>
-            </a:r>
-            <a:r>
-              <a:rPr lang="zh-CN" altLang="en-US" sz="1100" dirty="0">
-                <a:solidFill>
-                  <a:srgbClr val="0070C0"/>
-                </a:solidFill>
-                <a:latin typeface="Arial" panose="020B0604020202020204" pitchFamily="34" charset="0"/>
-                <a:cs typeface="Arial" panose="020B0604020202020204" pitchFamily="34" charset="0"/>
-              </a:rPr>
-              <a:t> </a:t>
-            </a:r>
-            <a:r>
-              <a:rPr lang="en-US" altLang="zh-CN" sz="1100" dirty="0" err="1">
-                <a:solidFill>
-                  <a:srgbClr val="0070C0"/>
-                </a:solidFill>
-                <a:latin typeface="Arial" panose="020B0604020202020204" pitchFamily="34" charset="0"/>
-                <a:cs typeface="Arial" panose="020B0604020202020204" pitchFamily="34" charset="0"/>
-              </a:rPr>
-              <a:t>zowe</a:t>
-            </a:r>
-            <a:r>
-              <a:rPr lang="en-US" altLang="zh-CN" sz="1100" dirty="0">
-                <a:solidFill>
-                  <a:srgbClr val="0070C0"/>
-                </a:solidFill>
-                <a:latin typeface="Arial" panose="020B0604020202020204" pitchFamily="34" charset="0"/>
-                <a:cs typeface="Arial" panose="020B0604020202020204" pitchFamily="34" charset="0"/>
-              </a:rPr>
-              <a:t>-install-</a:t>
-            </a:r>
-            <a:r>
-              <a:rPr lang="en-US" altLang="zh-CN" sz="1100" dirty="0" err="1">
-                <a:solidFill>
-                  <a:srgbClr val="0070C0"/>
-                </a:solidFill>
-                <a:latin typeface="Arial" panose="020B0604020202020204" pitchFamily="34" charset="0"/>
-                <a:cs typeface="Arial" panose="020B0604020202020204" pitchFamily="34" charset="0"/>
-              </a:rPr>
-              <a:t>proc.sh</a:t>
-            </a:r>
-            <a:r>
-              <a:rPr lang="en-US" altLang="zh-CN" sz="1100" dirty="0">
-                <a:solidFill>
-                  <a:srgbClr val="0070C0"/>
-                </a:solidFill>
-                <a:latin typeface="Arial" panose="020B0604020202020204" pitchFamily="34" charset="0"/>
-                <a:cs typeface="Arial" panose="020B0604020202020204" pitchFamily="34" charset="0"/>
-              </a:rPr>
-              <a:t>)</a:t>
-            </a:r>
-          </a:p>
-        </p:txBody>
-      </p:sp>
-      <p:sp>
-        <p:nvSpPr>
-          <p:cNvPr id="49" name="Rectangle 48">
-            <a:extLst>
-              <a:ext uri="{FF2B5EF4-FFF2-40B4-BE49-F238E27FC236}">
-                <a16:creationId xmlns:a16="http://schemas.microsoft.com/office/drawing/2014/main" id="{6D3E3949-016F-F944-9F12-918975BD5D7A}"/>
-              </a:ext>
-            </a:extLst>
-          </p:cNvPr>
-          <p:cNvSpPr/>
-          <p:nvPr/>
-        </p:nvSpPr>
-        <p:spPr>
-          <a:xfrm>
-            <a:off x="3038085" y="12366001"/>
-            <a:ext cx="5171999" cy="641821"/>
-          </a:xfrm>
-          <a:prstGeom prst="rect">
-            <a:avLst/>
-          </a:prstGeom>
-          <a:solidFill>
-            <a:schemeClr val="bg1">
-              <a:lumMod val="95000"/>
-              <a:alpha val="74000"/>
-            </a:schemeClr>
-          </a:solidFill>
-          <a:ln>
-            <a:solidFill>
-              <a:schemeClr val="accent3">
-                <a:lumMod val="60000"/>
-                <a:lumOff val="40000"/>
-              </a:schemeClr>
-            </a:solidFill>
-          </a:ln>
-        </p:spPr>
-        <p:style>
-          <a:lnRef idx="2">
-            <a:schemeClr val="accent1">
-              <a:shade val="50000"/>
-            </a:schemeClr>
-          </a:lnRef>
-          <a:fillRef idx="1">
-            <a:schemeClr val="accent1"/>
-          </a:fillRef>
-          <a:effectRef idx="0">
-            <a:schemeClr val="accent1"/>
-          </a:effectRef>
-          <a:fontRef idx="minor">
-            <a:schemeClr val="lt1"/>
-          </a:fontRef>
-        </p:style>
-        <p:txBody>
-          <a:bodyPr rot="0" spcFirstLastPara="0" vertOverflow="overflow" horzOverflow="overflow" vert="horz" wrap="square" lIns="91440" tIns="45720" rIns="91440" bIns="45720" numCol="1" spcCol="0" rtlCol="0" fromWordArt="0" anchor="ctr" anchorCtr="0" forceAA="0" compatLnSpc="1">
-            <a:prstTxWarp prst="textNoShape">
-              <a:avLst/>
-            </a:prstTxWarp>
-            <a:noAutofit/>
-          </a:bodyPr>
-          <a:lstStyle/>
-          <a:p>
-            <a:pPr algn="ctr"/>
-            <a:r>
-              <a:rPr lang="en-US" altLang="zh-CN" sz="1100" dirty="0">
-                <a:solidFill>
-                  <a:schemeClr val="tx1"/>
-                </a:solidFill>
-                <a:latin typeface="Arial" panose="020B0604020202020204" pitchFamily="34" charset="0"/>
-                <a:cs typeface="Arial" panose="020B0604020202020204" pitchFamily="34" charset="0"/>
-              </a:rPr>
-              <a:t>(Required for </a:t>
-            </a:r>
-            <a:r>
-              <a:rPr lang="en-US" altLang="zh-CN" sz="1100" dirty="0" err="1">
-                <a:solidFill>
-                  <a:schemeClr val="tx1"/>
-                </a:solidFill>
-                <a:latin typeface="Arial" panose="020B0604020202020204" pitchFamily="34" charset="0"/>
-                <a:cs typeface="Arial" panose="020B0604020202020204" pitchFamily="34" charset="0"/>
-              </a:rPr>
-              <a:t>Zowe</a:t>
-            </a:r>
-            <a:r>
-              <a:rPr lang="en-US" altLang="zh-CN" sz="1100" dirty="0">
-                <a:solidFill>
-                  <a:schemeClr val="tx1"/>
-                </a:solidFill>
-                <a:latin typeface="Arial" panose="020B0604020202020204" pitchFamily="34" charset="0"/>
-                <a:cs typeface="Arial" panose="020B0604020202020204" pitchFamily="34" charset="0"/>
-              </a:rPr>
-              <a:t> Desktop) </a:t>
-            </a:r>
-          </a:p>
-          <a:p>
-            <a:pPr algn="ctr"/>
-            <a:r>
-              <a:rPr lang="en-US" altLang="zh-CN" sz="1100" dirty="0">
-                <a:solidFill>
-                  <a:schemeClr val="tx1"/>
-                </a:solidFill>
-                <a:latin typeface="Arial" panose="020B0604020202020204" pitchFamily="34" charset="0"/>
-                <a:cs typeface="Arial" panose="020B0604020202020204" pitchFamily="34" charset="0"/>
-              </a:rPr>
-              <a:t>Install</a:t>
-            </a:r>
-            <a:r>
-              <a:rPr lang="zh-CN" altLang="en-US" sz="1100" dirty="0">
-                <a:solidFill>
-                  <a:schemeClr val="tx1"/>
-                </a:solidFill>
-                <a:latin typeface="Arial" panose="020B0604020202020204" pitchFamily="34" charset="0"/>
-                <a:cs typeface="Arial" panose="020B0604020202020204" pitchFamily="34" charset="0"/>
-              </a:rPr>
-              <a:t> </a:t>
-            </a:r>
-            <a:r>
-              <a:rPr lang="en-US" altLang="zh-CN" sz="1100" dirty="0">
-                <a:solidFill>
-                  <a:schemeClr val="tx1"/>
-                </a:solidFill>
-                <a:latin typeface="Arial" panose="020B0604020202020204" pitchFamily="34" charset="0"/>
-                <a:cs typeface="Arial" panose="020B0604020202020204" pitchFamily="34" charset="0"/>
-              </a:rPr>
-              <a:t>and</a:t>
-            </a:r>
-            <a:r>
-              <a:rPr lang="zh-CN" altLang="en-US" sz="1100" dirty="0">
-                <a:solidFill>
-                  <a:schemeClr val="tx1"/>
-                </a:solidFill>
-                <a:latin typeface="Arial" panose="020B0604020202020204" pitchFamily="34" charset="0"/>
-                <a:cs typeface="Arial" panose="020B0604020202020204" pitchFamily="34" charset="0"/>
-              </a:rPr>
-              <a:t> </a:t>
-            </a:r>
-            <a:r>
-              <a:rPr lang="en-US" altLang="zh-CN" sz="1100" dirty="0">
-                <a:solidFill>
-                  <a:schemeClr val="tx1"/>
-                </a:solidFill>
-                <a:latin typeface="Arial" panose="020B0604020202020204" pitchFamily="34" charset="0"/>
-                <a:cs typeface="Arial" panose="020B0604020202020204" pitchFamily="34" charset="0"/>
-              </a:rPr>
-              <a:t>configure</a:t>
-            </a:r>
-            <a:r>
-              <a:rPr lang="zh-CN" altLang="en-US" sz="1100" dirty="0">
-                <a:solidFill>
-                  <a:schemeClr val="tx1"/>
-                </a:solidFill>
-                <a:latin typeface="Arial" panose="020B0604020202020204" pitchFamily="34" charset="0"/>
-                <a:cs typeface="Arial" panose="020B0604020202020204" pitchFamily="34" charset="0"/>
-              </a:rPr>
-              <a:t> </a:t>
-            </a:r>
-            <a:r>
-              <a:rPr lang="en-US" altLang="zh-CN" sz="1100" dirty="0">
-                <a:solidFill>
-                  <a:schemeClr val="tx1"/>
-                </a:solidFill>
-                <a:latin typeface="Arial" panose="020B0604020202020204" pitchFamily="34" charset="0"/>
-                <a:cs typeface="Arial" panose="020B0604020202020204" pitchFamily="34" charset="0"/>
-              </a:rPr>
-              <a:t>the</a:t>
-            </a:r>
-            <a:r>
-              <a:rPr lang="zh-CN" altLang="en-US" sz="1100" dirty="0">
-                <a:solidFill>
-                  <a:schemeClr val="tx1"/>
-                </a:solidFill>
-                <a:latin typeface="Arial" panose="020B0604020202020204" pitchFamily="34" charset="0"/>
-                <a:cs typeface="Arial" panose="020B0604020202020204" pitchFamily="34" charset="0"/>
-              </a:rPr>
-              <a:t> </a:t>
-            </a:r>
-            <a:r>
-              <a:rPr lang="en-US" altLang="zh-CN" sz="1100" dirty="0" err="1">
-                <a:solidFill>
-                  <a:schemeClr val="tx1"/>
-                </a:solidFill>
-                <a:latin typeface="Arial" panose="020B0604020202020204" pitchFamily="34" charset="0"/>
-                <a:cs typeface="Arial" panose="020B0604020202020204" pitchFamily="34" charset="0"/>
-              </a:rPr>
-              <a:t>Zowe</a:t>
-            </a:r>
-            <a:r>
-              <a:rPr lang="zh-CN" altLang="en-US" sz="1100" dirty="0">
-                <a:solidFill>
-                  <a:schemeClr val="tx1"/>
-                </a:solidFill>
-                <a:latin typeface="Arial" panose="020B0604020202020204" pitchFamily="34" charset="0"/>
-                <a:cs typeface="Arial" panose="020B0604020202020204" pitchFamily="34" charset="0"/>
-              </a:rPr>
-              <a:t> </a:t>
-            </a:r>
-            <a:r>
-              <a:rPr lang="en-US" altLang="zh-CN" sz="1100" dirty="0">
-                <a:solidFill>
-                  <a:schemeClr val="tx1"/>
-                </a:solidFill>
-                <a:latin typeface="Arial" panose="020B0604020202020204" pitchFamily="34" charset="0"/>
-                <a:cs typeface="Arial" panose="020B0604020202020204" pitchFamily="34" charset="0"/>
-              </a:rPr>
-              <a:t>cross</a:t>
-            </a:r>
-            <a:r>
-              <a:rPr lang="zh-CN" altLang="en-US" sz="1100" dirty="0">
-                <a:solidFill>
-                  <a:schemeClr val="tx1"/>
-                </a:solidFill>
-                <a:latin typeface="Arial" panose="020B0604020202020204" pitchFamily="34" charset="0"/>
-                <a:cs typeface="Arial" panose="020B0604020202020204" pitchFamily="34" charset="0"/>
-              </a:rPr>
-              <a:t> </a:t>
-            </a:r>
-            <a:r>
-              <a:rPr lang="en-US" altLang="zh-CN" sz="1100" dirty="0">
-                <a:solidFill>
-                  <a:schemeClr val="tx1"/>
-                </a:solidFill>
-                <a:latin typeface="Arial" panose="020B0604020202020204" pitchFamily="34" charset="0"/>
-                <a:cs typeface="Arial" panose="020B0604020202020204" pitchFamily="34" charset="0"/>
-              </a:rPr>
-              <a:t>memory</a:t>
-            </a:r>
-            <a:r>
-              <a:rPr lang="zh-CN" altLang="en-US" sz="1100" dirty="0">
-                <a:solidFill>
-                  <a:schemeClr val="tx1"/>
-                </a:solidFill>
-                <a:latin typeface="Arial" panose="020B0604020202020204" pitchFamily="34" charset="0"/>
-                <a:cs typeface="Arial" panose="020B0604020202020204" pitchFamily="34" charset="0"/>
-              </a:rPr>
-              <a:t> </a:t>
-            </a:r>
-            <a:r>
-              <a:rPr lang="en-US" altLang="zh-CN" sz="1100" dirty="0">
-                <a:solidFill>
-                  <a:schemeClr val="tx1"/>
-                </a:solidFill>
-                <a:latin typeface="Arial" panose="020B0604020202020204" pitchFamily="34" charset="0"/>
-                <a:cs typeface="Arial" panose="020B0604020202020204" pitchFamily="34" charset="0"/>
-              </a:rPr>
-              <a:t>server (ZWESISTC)</a:t>
-            </a:r>
-          </a:p>
-          <a:p>
-            <a:pPr algn="ctr"/>
-            <a:r>
-              <a:rPr lang="en-US" altLang="zh-CN" sz="1100" dirty="0">
-                <a:solidFill>
-                  <a:srgbClr val="0070C0"/>
-                </a:solidFill>
-                <a:latin typeface="Arial" panose="020B0604020202020204" pitchFamily="34" charset="0"/>
-                <a:cs typeface="Arial" panose="020B0604020202020204" pitchFamily="34" charset="0"/>
-              </a:rPr>
-              <a:t>(Script: </a:t>
-            </a:r>
-            <a:r>
-              <a:rPr lang="en-US" sz="1100" dirty="0" err="1">
-                <a:solidFill>
-                  <a:srgbClr val="0070C0"/>
-                </a:solidFill>
-                <a:latin typeface="Arial" panose="020B0604020202020204" pitchFamily="34" charset="0"/>
-                <a:cs typeface="Arial" panose="020B0604020202020204" pitchFamily="34" charset="0"/>
-              </a:rPr>
-              <a:t>zowe</a:t>
-            </a:r>
-            <a:r>
-              <a:rPr lang="en-US" sz="1100" dirty="0">
-                <a:solidFill>
-                  <a:srgbClr val="0070C0"/>
-                </a:solidFill>
-                <a:latin typeface="Arial" panose="020B0604020202020204" pitchFamily="34" charset="0"/>
-                <a:cs typeface="Arial" panose="020B0604020202020204" pitchFamily="34" charset="0"/>
-              </a:rPr>
-              <a:t>-</a:t>
-            </a:r>
-            <a:r>
-              <a:rPr lang="en-US" altLang="zh-CN" sz="1100" dirty="0">
-                <a:solidFill>
-                  <a:srgbClr val="0070C0"/>
-                </a:solidFill>
-                <a:latin typeface="Arial" panose="020B0604020202020204" pitchFamily="34" charset="0"/>
-                <a:cs typeface="Arial" panose="020B0604020202020204" pitchFamily="34" charset="0"/>
-              </a:rPr>
-              <a:t>install-</a:t>
-            </a:r>
-            <a:r>
-              <a:rPr lang="en-US" altLang="zh-CN" sz="1100" dirty="0" err="1">
-                <a:solidFill>
-                  <a:srgbClr val="0070C0"/>
-                </a:solidFill>
-                <a:latin typeface="Arial" panose="020B0604020202020204" pitchFamily="34" charset="0"/>
-                <a:cs typeface="Arial" panose="020B0604020202020204" pitchFamily="34" charset="0"/>
-              </a:rPr>
-              <a:t>xmem</a:t>
-            </a:r>
-            <a:r>
-              <a:rPr lang="en-US" sz="1100" dirty="0" err="1">
-                <a:solidFill>
-                  <a:srgbClr val="0070C0"/>
-                </a:solidFill>
-                <a:latin typeface="Arial" panose="020B0604020202020204" pitchFamily="34" charset="0"/>
-                <a:cs typeface="Arial" panose="020B0604020202020204" pitchFamily="34" charset="0"/>
-              </a:rPr>
-              <a:t>.s</a:t>
-            </a:r>
-            <a:r>
-              <a:rPr lang="en-US" altLang="zh-CN" sz="1100" dirty="0" err="1">
-                <a:solidFill>
-                  <a:srgbClr val="0070C0"/>
-                </a:solidFill>
-                <a:latin typeface="Arial" panose="020B0604020202020204" pitchFamily="34" charset="0"/>
-                <a:cs typeface="Arial" panose="020B0604020202020204" pitchFamily="34" charset="0"/>
-              </a:rPr>
-              <a:t>h</a:t>
-            </a:r>
-            <a:r>
-              <a:rPr lang="en-US" altLang="zh-CN" sz="1100" dirty="0">
-                <a:solidFill>
-                  <a:srgbClr val="0070C0"/>
-                </a:solidFill>
-                <a:latin typeface="Arial" panose="020B0604020202020204" pitchFamily="34" charset="0"/>
-                <a:cs typeface="Arial" panose="020B0604020202020204" pitchFamily="34" charset="0"/>
-              </a:rPr>
-              <a:t>)</a:t>
-            </a:r>
-            <a:endParaRPr lang="en-US" sz="1100" dirty="0">
-              <a:solidFill>
-                <a:srgbClr val="0070C0"/>
-              </a:solidFill>
-              <a:latin typeface="Arial" panose="020B0604020202020204" pitchFamily="34" charset="0"/>
-              <a:cs typeface="Arial" panose="020B0604020202020204" pitchFamily="34" charset="0"/>
-            </a:endParaRPr>
-          </a:p>
-        </p:txBody>
-      </p:sp>
-      <p:cxnSp>
-        <p:nvCxnSpPr>
-          <p:cNvPr id="52" name="Straight Connector 51">
-            <a:extLst>
-              <a:ext uri="{FF2B5EF4-FFF2-40B4-BE49-F238E27FC236}">
-                <a16:creationId xmlns:a16="http://schemas.microsoft.com/office/drawing/2014/main" id="{F38E6DB5-35D5-7E45-8F84-A2E9A141F584}"/>
-              </a:ext>
-            </a:extLst>
-          </p:cNvPr>
-          <p:cNvCxnSpPr>
-            <a:cxnSpLocks/>
-          </p:cNvCxnSpPr>
-          <p:nvPr/>
-        </p:nvCxnSpPr>
-        <p:spPr>
-          <a:xfrm>
-            <a:off x="1163866" y="7748458"/>
-            <a:ext cx="8072213" cy="0"/>
-          </a:xfrm>
-          <a:prstGeom prst="line">
-            <a:avLst/>
-          </a:prstGeom>
-          <a:ln>
-            <a:solidFill>
-              <a:schemeClr val="bg1">
-                <a:lumMod val="50000"/>
-              </a:schemeClr>
-            </a:solidFill>
-            <a:prstDash val="dash"/>
-          </a:ln>
-        </p:spPr>
-        <p:style>
-          <a:lnRef idx="1">
-            <a:schemeClr val="accent1"/>
-          </a:lnRef>
-          <a:fillRef idx="0">
-            <a:schemeClr val="accent1"/>
-          </a:fillRef>
-          <a:effectRef idx="0">
-            <a:schemeClr val="accent1"/>
-          </a:effectRef>
-          <a:fontRef idx="minor">
-            <a:schemeClr val="tx1"/>
-          </a:fontRef>
-        </p:style>
-      </p:cxnSp>
-      <p:cxnSp>
-        <p:nvCxnSpPr>
-          <p:cNvPr id="54" name="Straight Connector 53">
-            <a:extLst>
-              <a:ext uri="{FF2B5EF4-FFF2-40B4-BE49-F238E27FC236}">
-                <a16:creationId xmlns:a16="http://schemas.microsoft.com/office/drawing/2014/main" id="{2F86BB3D-0E87-2746-97D0-656CDDDD3895}"/>
-              </a:ext>
-            </a:extLst>
-          </p:cNvPr>
-          <p:cNvCxnSpPr>
-            <a:cxnSpLocks/>
-          </p:cNvCxnSpPr>
-          <p:nvPr/>
-        </p:nvCxnSpPr>
-        <p:spPr>
-          <a:xfrm>
-            <a:off x="1163863" y="2464922"/>
-            <a:ext cx="7982472" cy="0"/>
-          </a:xfrm>
-          <a:prstGeom prst="line">
-            <a:avLst/>
-          </a:prstGeom>
-          <a:ln>
-            <a:solidFill>
-              <a:schemeClr val="bg2">
-                <a:lumMod val="75000"/>
-              </a:schemeClr>
-            </a:solidFill>
-            <a:prstDash val="dash"/>
-          </a:ln>
-        </p:spPr>
-        <p:style>
-          <a:lnRef idx="1">
-            <a:schemeClr val="accent1"/>
-          </a:lnRef>
-          <a:fillRef idx="0">
-            <a:schemeClr val="accent1"/>
-          </a:fillRef>
-          <a:effectRef idx="0">
-            <a:schemeClr val="accent1"/>
-          </a:effectRef>
-          <a:fontRef idx="minor">
-            <a:schemeClr val="tx1"/>
-          </a:fontRef>
-        </p:style>
-      </p:cxnSp>
-      <p:cxnSp>
-        <p:nvCxnSpPr>
-          <p:cNvPr id="57" name="Straight Arrow Connector 56">
-            <a:extLst>
-              <a:ext uri="{FF2B5EF4-FFF2-40B4-BE49-F238E27FC236}">
-                <a16:creationId xmlns:a16="http://schemas.microsoft.com/office/drawing/2014/main" id="{AF3BD089-6A01-564F-AB0E-68487DCA5FF5}"/>
-              </a:ext>
-            </a:extLst>
-          </p:cNvPr>
-          <p:cNvCxnSpPr>
-            <a:cxnSpLocks/>
-          </p:cNvCxnSpPr>
-          <p:nvPr/>
-        </p:nvCxnSpPr>
-        <p:spPr>
-          <a:xfrm>
-            <a:off x="4921570" y="2782132"/>
-            <a:ext cx="0" cy="258831"/>
-          </a:xfrm>
-          <a:prstGeom prst="straightConnector1">
-            <a:avLst/>
-          </a:prstGeom>
-          <a:ln>
-            <a:solidFill>
-              <a:schemeClr val="tx1">
-                <a:lumMod val="50000"/>
-                <a:lumOff val="50000"/>
-              </a:schemeClr>
-            </a:solidFill>
-            <a:tailEnd type="triangle"/>
-          </a:ln>
-        </p:spPr>
-        <p:style>
-          <a:lnRef idx="1">
-            <a:schemeClr val="accent1"/>
-          </a:lnRef>
-          <a:fillRef idx="0">
-            <a:schemeClr val="accent1"/>
-          </a:fillRef>
-          <a:effectRef idx="0">
-            <a:schemeClr val="accent1"/>
-          </a:effectRef>
-          <a:fontRef idx="minor">
-            <a:schemeClr val="tx1"/>
-          </a:fontRef>
-        </p:style>
-      </p:cxnSp>
-      <p:sp>
-        <p:nvSpPr>
-          <p:cNvPr id="58" name="Rectangle 57">
-            <a:extLst>
-              <a:ext uri="{FF2B5EF4-FFF2-40B4-BE49-F238E27FC236}">
-                <a16:creationId xmlns:a16="http://schemas.microsoft.com/office/drawing/2014/main" id="{89267795-49D3-F34D-BB43-8018848C3BBA}"/>
-              </a:ext>
-            </a:extLst>
-          </p:cNvPr>
-          <p:cNvSpPr/>
-          <p:nvPr/>
-        </p:nvSpPr>
-        <p:spPr>
-          <a:xfrm>
-            <a:off x="4002258" y="1609008"/>
-            <a:ext cx="1958008" cy="558971"/>
-          </a:xfrm>
-          <a:prstGeom prst="rect">
-            <a:avLst/>
-          </a:prstGeom>
-          <a:solidFill>
-            <a:srgbClr val="B4D7EE"/>
-          </a:solidFill>
-          <a:ln cap="flat">
-            <a:noFill/>
-          </a:ln>
-        </p:spPr>
-        <p:style>
-          <a:lnRef idx="2">
-            <a:schemeClr val="accent1">
-              <a:shade val="50000"/>
-            </a:schemeClr>
-          </a:lnRef>
-          <a:fillRef idx="1">
-            <a:schemeClr val="accent1"/>
-          </a:fillRef>
-          <a:effectRef idx="0">
-            <a:schemeClr val="accent1"/>
-          </a:effectRef>
-          <a:fontRef idx="minor">
-            <a:schemeClr val="lt1"/>
-          </a:fontRef>
-        </p:style>
-        <p:txBody>
-          <a:bodyPr rot="0" spcFirstLastPara="0" vertOverflow="overflow" horzOverflow="overflow" vert="horz" wrap="square" lIns="91440" tIns="45720" rIns="91440" bIns="45720" numCol="1" spcCol="0" rtlCol="0" fromWordArt="0" anchor="ctr" anchorCtr="0" forceAA="0" compatLnSpc="1">
-            <a:prstTxWarp prst="textNoShape">
-              <a:avLst/>
-            </a:prstTxWarp>
-            <a:noAutofit/>
-          </a:bodyPr>
-          <a:lstStyle/>
-          <a:p>
-            <a:pPr algn="ctr"/>
-            <a:r>
-              <a:rPr lang="en-US" altLang="zh-CN" sz="1100" dirty="0">
-                <a:solidFill>
-                  <a:schemeClr val="tx1"/>
-                </a:solidFill>
-                <a:latin typeface="Arial" panose="020B0604020202020204" pitchFamily="34" charset="0"/>
-                <a:cs typeface="Arial" panose="020B0604020202020204" pitchFamily="34" charset="0"/>
-              </a:rPr>
-              <a:t>Plan</a:t>
-            </a:r>
-            <a:r>
-              <a:rPr lang="zh-CN" altLang="en-US" sz="1100" dirty="0">
-                <a:solidFill>
-                  <a:schemeClr val="tx1"/>
-                </a:solidFill>
-                <a:latin typeface="Arial" panose="020B0604020202020204" pitchFamily="34" charset="0"/>
-                <a:cs typeface="Arial" panose="020B0604020202020204" pitchFamily="34" charset="0"/>
-              </a:rPr>
-              <a:t> </a:t>
-            </a:r>
-            <a:r>
-              <a:rPr lang="en-US" altLang="zh-CN" sz="1100" dirty="0">
-                <a:solidFill>
-                  <a:schemeClr val="tx1"/>
-                </a:solidFill>
-                <a:latin typeface="Arial" panose="020B0604020202020204" pitchFamily="34" charset="0"/>
-                <a:cs typeface="Arial" panose="020B0604020202020204" pitchFamily="34" charset="0"/>
-              </a:rPr>
-              <a:t>and</a:t>
-            </a:r>
-            <a:r>
-              <a:rPr lang="zh-CN" altLang="en-US" sz="1100" dirty="0">
-                <a:solidFill>
-                  <a:schemeClr val="tx1"/>
-                </a:solidFill>
-                <a:latin typeface="Arial" panose="020B0604020202020204" pitchFamily="34" charset="0"/>
-                <a:cs typeface="Arial" panose="020B0604020202020204" pitchFamily="34" charset="0"/>
-              </a:rPr>
-              <a:t> </a:t>
-            </a:r>
-            <a:r>
-              <a:rPr lang="en-US" altLang="zh-CN" sz="1100" dirty="0">
-                <a:solidFill>
-                  <a:schemeClr val="tx1"/>
-                </a:solidFill>
-                <a:latin typeface="Arial" panose="020B0604020202020204" pitchFamily="34" charset="0"/>
-                <a:cs typeface="Arial" panose="020B0604020202020204" pitchFamily="34" charset="0"/>
-              </a:rPr>
-              <a:t>prepare</a:t>
-            </a:r>
-            <a:r>
-              <a:rPr lang="zh-CN" altLang="en-US" sz="1100" dirty="0">
-                <a:solidFill>
-                  <a:schemeClr val="tx1"/>
-                </a:solidFill>
-                <a:latin typeface="Arial" panose="020B0604020202020204" pitchFamily="34" charset="0"/>
-                <a:cs typeface="Arial" panose="020B0604020202020204" pitchFamily="34" charset="0"/>
-              </a:rPr>
-              <a:t> </a:t>
-            </a:r>
-            <a:r>
-              <a:rPr lang="en-US" altLang="zh-CN" sz="1100" dirty="0">
-                <a:solidFill>
-                  <a:schemeClr val="tx1"/>
-                </a:solidFill>
-                <a:latin typeface="Arial" panose="020B0604020202020204" pitchFamily="34" charset="0"/>
-                <a:cs typeface="Arial" panose="020B0604020202020204" pitchFamily="34" charset="0"/>
-              </a:rPr>
-              <a:t>for</a:t>
-            </a:r>
-            <a:r>
-              <a:rPr lang="zh-CN" altLang="en-US" sz="1100" dirty="0">
-                <a:solidFill>
-                  <a:schemeClr val="tx1"/>
-                </a:solidFill>
-                <a:latin typeface="Arial" panose="020B0604020202020204" pitchFamily="34" charset="0"/>
-                <a:cs typeface="Arial" panose="020B0604020202020204" pitchFamily="34" charset="0"/>
-              </a:rPr>
-              <a:t> </a:t>
-            </a:r>
-            <a:r>
-              <a:rPr lang="en-US" altLang="zh-CN" sz="1100" dirty="0">
-                <a:solidFill>
-                  <a:schemeClr val="tx1"/>
-                </a:solidFill>
-                <a:latin typeface="Arial" panose="020B0604020202020204" pitchFamily="34" charset="0"/>
-                <a:cs typeface="Arial" panose="020B0604020202020204" pitchFamily="34" charset="0"/>
-              </a:rPr>
-              <a:t>the</a:t>
-            </a:r>
-            <a:r>
-              <a:rPr lang="zh-CN" altLang="en-US" sz="1100" dirty="0">
-                <a:solidFill>
-                  <a:schemeClr val="tx1"/>
-                </a:solidFill>
-                <a:latin typeface="Arial" panose="020B0604020202020204" pitchFamily="34" charset="0"/>
-                <a:cs typeface="Arial" panose="020B0604020202020204" pitchFamily="34" charset="0"/>
-              </a:rPr>
-              <a:t> </a:t>
-            </a:r>
-            <a:r>
-              <a:rPr lang="en-US" altLang="zh-CN" sz="1100" dirty="0">
-                <a:solidFill>
-                  <a:schemeClr val="tx1"/>
-                </a:solidFill>
-                <a:latin typeface="Arial" panose="020B0604020202020204" pitchFamily="34" charset="0"/>
-                <a:cs typeface="Arial" panose="020B0604020202020204" pitchFamily="34" charset="0"/>
-              </a:rPr>
-              <a:t>installation</a:t>
-            </a:r>
-            <a:endParaRPr lang="en-US" sz="1100" dirty="0">
-              <a:solidFill>
-                <a:schemeClr val="tx1"/>
-              </a:solidFill>
-              <a:latin typeface="Arial" panose="020B0604020202020204" pitchFamily="34" charset="0"/>
-              <a:cs typeface="Arial" panose="020B0604020202020204" pitchFamily="34" charset="0"/>
-            </a:endParaRPr>
-          </a:p>
-        </p:txBody>
-      </p:sp>
-      <p:cxnSp>
-        <p:nvCxnSpPr>
-          <p:cNvPr id="59" name="Straight Arrow Connector 58">
-            <a:extLst>
-              <a:ext uri="{FF2B5EF4-FFF2-40B4-BE49-F238E27FC236}">
-                <a16:creationId xmlns:a16="http://schemas.microsoft.com/office/drawing/2014/main" id="{1297970D-9366-794C-A436-2B53BF522F18}"/>
-              </a:ext>
-            </a:extLst>
-          </p:cNvPr>
-          <p:cNvCxnSpPr>
-            <a:cxnSpLocks/>
-          </p:cNvCxnSpPr>
-          <p:nvPr/>
-        </p:nvCxnSpPr>
-        <p:spPr>
-          <a:xfrm>
-            <a:off x="4921570" y="2215421"/>
-            <a:ext cx="0" cy="212985"/>
-          </a:xfrm>
-          <a:prstGeom prst="straightConnector1">
-            <a:avLst/>
-          </a:prstGeom>
-          <a:ln>
-            <a:solidFill>
-              <a:schemeClr val="tx1">
-                <a:lumMod val="50000"/>
-                <a:lumOff val="50000"/>
-              </a:schemeClr>
-            </a:solidFill>
-            <a:tailEnd type="triangle"/>
-          </a:ln>
-        </p:spPr>
-        <p:style>
-          <a:lnRef idx="1">
-            <a:schemeClr val="accent1"/>
-          </a:lnRef>
-          <a:fillRef idx="0">
-            <a:schemeClr val="accent1"/>
-          </a:fillRef>
-          <a:effectRef idx="0">
-            <a:schemeClr val="accent1"/>
-          </a:effectRef>
-          <a:fontRef idx="minor">
-            <a:schemeClr val="tx1"/>
-          </a:fontRef>
-        </p:style>
-      </p:cxnSp>
-      <p:sp>
-        <p:nvSpPr>
-          <p:cNvPr id="62" name="TextBox 61">
-            <a:extLst>
-              <a:ext uri="{FF2B5EF4-FFF2-40B4-BE49-F238E27FC236}">
-                <a16:creationId xmlns:a16="http://schemas.microsoft.com/office/drawing/2014/main" id="{A31FAEAF-90F9-1B41-A341-C94FAA5C9D75}"/>
-              </a:ext>
-            </a:extLst>
-          </p:cNvPr>
-          <p:cNvSpPr txBox="1"/>
-          <p:nvPr/>
-        </p:nvSpPr>
-        <p:spPr>
-          <a:xfrm>
-            <a:off x="1074221" y="1257693"/>
-            <a:ext cx="2322161" cy="276999"/>
-          </a:xfrm>
-          <a:prstGeom prst="rect">
-            <a:avLst/>
-          </a:prstGeom>
-          <a:noFill/>
-        </p:spPr>
-        <p:txBody>
-          <a:bodyPr wrap="square" rtlCol="0">
-            <a:spAutoFit/>
-          </a:bodyPr>
-          <a:lstStyle/>
-          <a:p>
-            <a:r>
-              <a:rPr lang="en-US" altLang="zh-CN" sz="1200" b="1" dirty="0">
-                <a:latin typeface="Arial" panose="020B0604020202020204" pitchFamily="34" charset="0"/>
-                <a:cs typeface="Arial" panose="020B0604020202020204" pitchFamily="34" charset="0"/>
-              </a:rPr>
-              <a:t>Stage</a:t>
-            </a:r>
-            <a:r>
-              <a:rPr lang="zh-CN" altLang="en-US" sz="1200" b="1" dirty="0">
-                <a:latin typeface="Arial" panose="020B0604020202020204" pitchFamily="34" charset="0"/>
-                <a:cs typeface="Arial" panose="020B0604020202020204" pitchFamily="34" charset="0"/>
-              </a:rPr>
-              <a:t> </a:t>
-            </a:r>
-            <a:r>
-              <a:rPr lang="en-US" altLang="zh-CN" sz="1200" b="1" dirty="0">
-                <a:latin typeface="Arial" panose="020B0604020202020204" pitchFamily="34" charset="0"/>
-                <a:cs typeface="Arial" panose="020B0604020202020204" pitchFamily="34" charset="0"/>
-              </a:rPr>
-              <a:t>1:</a:t>
-            </a:r>
-            <a:r>
-              <a:rPr lang="zh-CN" altLang="en-US" sz="1200" b="1" dirty="0">
-                <a:latin typeface="Arial" panose="020B0604020202020204" pitchFamily="34" charset="0"/>
-                <a:cs typeface="Arial" panose="020B0604020202020204" pitchFamily="34" charset="0"/>
-              </a:rPr>
-              <a:t> </a:t>
-            </a:r>
-            <a:r>
-              <a:rPr lang="en-US" altLang="zh-CN" sz="1200" b="1" dirty="0">
-                <a:latin typeface="Arial" panose="020B0604020202020204" pitchFamily="34" charset="0"/>
-                <a:cs typeface="Arial" panose="020B0604020202020204" pitchFamily="34" charset="0"/>
-              </a:rPr>
-              <a:t>Plan</a:t>
-            </a:r>
-            <a:r>
-              <a:rPr lang="zh-CN" altLang="en-US" sz="1200" b="1" dirty="0">
-                <a:latin typeface="Arial" panose="020B0604020202020204" pitchFamily="34" charset="0"/>
-                <a:cs typeface="Arial" panose="020B0604020202020204" pitchFamily="34" charset="0"/>
-              </a:rPr>
-              <a:t> </a:t>
-            </a:r>
-            <a:r>
-              <a:rPr lang="en-US" altLang="zh-CN" sz="1200" b="1" dirty="0">
-                <a:latin typeface="Arial" panose="020B0604020202020204" pitchFamily="34" charset="0"/>
-                <a:cs typeface="Arial" panose="020B0604020202020204" pitchFamily="34" charset="0"/>
-              </a:rPr>
-              <a:t>and</a:t>
-            </a:r>
-            <a:r>
-              <a:rPr lang="zh-CN" altLang="en-US" sz="1200" b="1" dirty="0">
-                <a:latin typeface="Arial" panose="020B0604020202020204" pitchFamily="34" charset="0"/>
-                <a:cs typeface="Arial" panose="020B0604020202020204" pitchFamily="34" charset="0"/>
-              </a:rPr>
-              <a:t> </a:t>
-            </a:r>
-            <a:r>
-              <a:rPr lang="en-US" altLang="zh-CN" sz="1200" b="1" dirty="0">
-                <a:latin typeface="Arial" panose="020B0604020202020204" pitchFamily="34" charset="0"/>
-                <a:cs typeface="Arial" panose="020B0604020202020204" pitchFamily="34" charset="0"/>
-              </a:rPr>
-              <a:t>prepare</a:t>
-            </a:r>
-            <a:endParaRPr lang="en-US" sz="1200" b="1" dirty="0">
-              <a:latin typeface="Arial" panose="020B0604020202020204" pitchFamily="34" charset="0"/>
-              <a:cs typeface="Arial" panose="020B0604020202020204" pitchFamily="34" charset="0"/>
-            </a:endParaRPr>
-          </a:p>
-        </p:txBody>
-      </p:sp>
-      <p:sp>
-        <p:nvSpPr>
-          <p:cNvPr id="63" name="TextBox 62">
-            <a:extLst>
-              <a:ext uri="{FF2B5EF4-FFF2-40B4-BE49-F238E27FC236}">
-                <a16:creationId xmlns:a16="http://schemas.microsoft.com/office/drawing/2014/main" id="{0444C1C0-9E43-8F4F-89F4-AB51432BFBE6}"/>
-              </a:ext>
-            </a:extLst>
-          </p:cNvPr>
-          <p:cNvSpPr txBox="1"/>
-          <p:nvPr/>
-        </p:nvSpPr>
-        <p:spPr>
-          <a:xfrm>
-            <a:off x="1074221" y="2532843"/>
-            <a:ext cx="2566915" cy="276999"/>
-          </a:xfrm>
-          <a:prstGeom prst="rect">
-            <a:avLst/>
-          </a:prstGeom>
-          <a:noFill/>
-        </p:spPr>
-        <p:txBody>
-          <a:bodyPr wrap="square" rtlCol="0">
-            <a:spAutoFit/>
-          </a:bodyPr>
-          <a:lstStyle/>
-          <a:p>
-            <a:r>
-              <a:rPr lang="en-US" altLang="zh-CN" sz="1200" b="1" dirty="0">
-                <a:latin typeface="Arial" panose="020B0604020202020204" pitchFamily="34" charset="0"/>
-                <a:cs typeface="Arial" panose="020B0604020202020204" pitchFamily="34" charset="0"/>
-              </a:rPr>
-              <a:t>Stage</a:t>
-            </a:r>
-            <a:r>
-              <a:rPr lang="zh-CN" altLang="en-US" sz="1200" b="1" dirty="0">
-                <a:latin typeface="Arial" panose="020B0604020202020204" pitchFamily="34" charset="0"/>
-                <a:cs typeface="Arial" panose="020B0604020202020204" pitchFamily="34" charset="0"/>
-              </a:rPr>
-              <a:t> </a:t>
-            </a:r>
-            <a:r>
-              <a:rPr lang="en-US" altLang="zh-CN" sz="1200" b="1" dirty="0">
-                <a:latin typeface="Arial" panose="020B0604020202020204" pitchFamily="34" charset="0"/>
-                <a:cs typeface="Arial" panose="020B0604020202020204" pitchFamily="34" charset="0"/>
-              </a:rPr>
-              <a:t>2:</a:t>
-            </a:r>
-            <a:r>
-              <a:rPr lang="zh-CN" altLang="en-US" sz="1200" b="1" dirty="0">
-                <a:latin typeface="Arial" panose="020B0604020202020204" pitchFamily="34" charset="0"/>
-                <a:cs typeface="Arial" panose="020B0604020202020204" pitchFamily="34" charset="0"/>
-              </a:rPr>
-              <a:t> </a:t>
-            </a:r>
-            <a:r>
-              <a:rPr lang="en-US" altLang="zh-CN" sz="1200" b="1" dirty="0">
-                <a:latin typeface="Arial" panose="020B0604020202020204" pitchFamily="34" charset="0"/>
-                <a:cs typeface="Arial" panose="020B0604020202020204" pitchFamily="34" charset="0"/>
-              </a:rPr>
-              <a:t>Install</a:t>
-            </a:r>
-            <a:r>
-              <a:rPr lang="zh-CN" altLang="en-US" sz="1200" b="1" dirty="0">
-                <a:latin typeface="Arial" panose="020B0604020202020204" pitchFamily="34" charset="0"/>
-                <a:cs typeface="Arial" panose="020B0604020202020204" pitchFamily="34" charset="0"/>
-              </a:rPr>
-              <a:t> </a:t>
-            </a:r>
-            <a:r>
-              <a:rPr lang="en-US" altLang="zh-CN" sz="1200" b="1" dirty="0">
-                <a:latin typeface="Arial" panose="020B0604020202020204" pitchFamily="34" charset="0"/>
-                <a:cs typeface="Arial" panose="020B0604020202020204" pitchFamily="34" charset="0"/>
-              </a:rPr>
-              <a:t>the </a:t>
-            </a:r>
-            <a:r>
-              <a:rPr lang="en-US" altLang="zh-CN" sz="1200" b="1" dirty="0" err="1">
-                <a:latin typeface="Arial" panose="020B0604020202020204" pitchFamily="34" charset="0"/>
-                <a:cs typeface="Arial" panose="020B0604020202020204" pitchFamily="34" charset="0"/>
-              </a:rPr>
-              <a:t>Zowe</a:t>
-            </a:r>
-            <a:r>
-              <a:rPr lang="en-US" altLang="zh-CN" sz="1200" b="1" dirty="0">
-                <a:latin typeface="Arial" panose="020B0604020202020204" pitchFamily="34" charset="0"/>
-                <a:cs typeface="Arial" panose="020B0604020202020204" pitchFamily="34" charset="0"/>
-              </a:rPr>
-              <a:t> runtime</a:t>
-            </a:r>
-            <a:endParaRPr lang="en-US" sz="1200" b="1" dirty="0">
-              <a:latin typeface="Arial" panose="020B0604020202020204" pitchFamily="34" charset="0"/>
-              <a:cs typeface="Arial" panose="020B0604020202020204" pitchFamily="34" charset="0"/>
-            </a:endParaRPr>
-          </a:p>
-        </p:txBody>
-      </p:sp>
-      <p:sp>
-        <p:nvSpPr>
-          <p:cNvPr id="64" name="TextBox 63">
-            <a:extLst>
-              <a:ext uri="{FF2B5EF4-FFF2-40B4-BE49-F238E27FC236}">
-                <a16:creationId xmlns:a16="http://schemas.microsoft.com/office/drawing/2014/main" id="{CA1945F7-16FA-4B4B-95E8-56F90A8038A5}"/>
-              </a:ext>
-            </a:extLst>
-          </p:cNvPr>
-          <p:cNvSpPr txBox="1"/>
-          <p:nvPr/>
-        </p:nvSpPr>
-        <p:spPr>
-          <a:xfrm>
-            <a:off x="1074221" y="7798658"/>
-            <a:ext cx="1881011" cy="646331"/>
-          </a:xfrm>
-          <a:prstGeom prst="rect">
-            <a:avLst/>
-          </a:prstGeom>
-          <a:noFill/>
-        </p:spPr>
-        <p:txBody>
-          <a:bodyPr wrap="square" rtlCol="0">
-            <a:spAutoFit/>
-          </a:bodyPr>
-          <a:lstStyle/>
-          <a:p>
-            <a:r>
-              <a:rPr lang="en-US" altLang="zh-CN" sz="1200" b="1" dirty="0">
-                <a:latin typeface="Arial" panose="020B0604020202020204" pitchFamily="34" charset="0"/>
-                <a:cs typeface="Arial" panose="020B0604020202020204" pitchFamily="34" charset="0"/>
-              </a:rPr>
-              <a:t>Stage</a:t>
-            </a:r>
-            <a:r>
-              <a:rPr lang="zh-CN" altLang="en-US" sz="1200" b="1" dirty="0">
-                <a:latin typeface="Arial" panose="020B0604020202020204" pitchFamily="34" charset="0"/>
-                <a:cs typeface="Arial" panose="020B0604020202020204" pitchFamily="34" charset="0"/>
-              </a:rPr>
-              <a:t> </a:t>
-            </a:r>
-            <a:r>
-              <a:rPr lang="en-US" altLang="zh-CN" sz="1200" b="1" dirty="0">
-                <a:latin typeface="Arial" panose="020B0604020202020204" pitchFamily="34" charset="0"/>
-                <a:cs typeface="Arial" panose="020B0604020202020204" pitchFamily="34" charset="0"/>
-              </a:rPr>
-              <a:t>3:</a:t>
-            </a:r>
-            <a:r>
-              <a:rPr lang="zh-CN" altLang="en-US" sz="1200" b="1" dirty="0">
-                <a:latin typeface="Arial" panose="020B0604020202020204" pitchFamily="34" charset="0"/>
-                <a:cs typeface="Arial" panose="020B0604020202020204" pitchFamily="34" charset="0"/>
-              </a:rPr>
-              <a:t> </a:t>
-            </a:r>
-            <a:endParaRPr lang="en-US" altLang="zh-CN" sz="1200" b="1" dirty="0">
-              <a:latin typeface="Arial" panose="020B0604020202020204" pitchFamily="34" charset="0"/>
-              <a:cs typeface="Arial" panose="020B0604020202020204" pitchFamily="34" charset="0"/>
-            </a:endParaRPr>
-          </a:p>
-          <a:p>
-            <a:r>
-              <a:rPr lang="en-US" altLang="zh-CN" sz="1200" b="1" dirty="0">
-                <a:latin typeface="Arial" panose="020B0604020202020204" pitchFamily="34" charset="0"/>
-                <a:cs typeface="Arial" panose="020B0604020202020204" pitchFamily="34" charset="0"/>
-              </a:rPr>
-              <a:t>Configure</a:t>
-            </a:r>
-            <a:r>
-              <a:rPr lang="zh-CN" altLang="en-US" sz="1200" b="1" dirty="0">
-                <a:latin typeface="Arial" panose="020B0604020202020204" pitchFamily="34" charset="0"/>
-                <a:cs typeface="Arial" panose="020B0604020202020204" pitchFamily="34" charset="0"/>
-              </a:rPr>
-              <a:t> </a:t>
-            </a:r>
-            <a:r>
-              <a:rPr lang="en-US" altLang="zh-CN" sz="1200" b="1" dirty="0">
-                <a:latin typeface="Arial" panose="020B0604020202020204" pitchFamily="34" charset="0"/>
-                <a:cs typeface="Arial" panose="020B0604020202020204" pitchFamily="34" charset="0"/>
-              </a:rPr>
-              <a:t>the</a:t>
-            </a:r>
-            <a:r>
-              <a:rPr lang="zh-CN" altLang="en-US" sz="1200" b="1" dirty="0">
-                <a:latin typeface="Arial" panose="020B0604020202020204" pitchFamily="34" charset="0"/>
-                <a:cs typeface="Arial" panose="020B0604020202020204" pitchFamily="34" charset="0"/>
-              </a:rPr>
-              <a:t> </a:t>
-            </a:r>
-            <a:r>
-              <a:rPr lang="en-US" altLang="zh-CN" sz="1200" b="1" dirty="0" err="1">
-                <a:latin typeface="Arial" panose="020B0604020202020204" pitchFamily="34" charset="0"/>
-                <a:cs typeface="Arial" panose="020B0604020202020204" pitchFamily="34" charset="0"/>
-              </a:rPr>
-              <a:t>Zowe</a:t>
-            </a:r>
-            <a:r>
-              <a:rPr lang="zh-CN" altLang="en-US" sz="1200" b="1" dirty="0">
-                <a:latin typeface="Arial" panose="020B0604020202020204" pitchFamily="34" charset="0"/>
-                <a:cs typeface="Arial" panose="020B0604020202020204" pitchFamily="34" charset="0"/>
-              </a:rPr>
-              <a:t> </a:t>
-            </a:r>
-            <a:r>
-              <a:rPr lang="en-US" altLang="zh-CN" sz="1200" b="1" dirty="0">
-                <a:latin typeface="Arial" panose="020B0604020202020204" pitchFamily="34" charset="0"/>
-                <a:cs typeface="Arial" panose="020B0604020202020204" pitchFamily="34" charset="0"/>
-              </a:rPr>
-              <a:t>runtime</a:t>
-            </a:r>
-            <a:r>
-              <a:rPr lang="zh-CN" altLang="en-US" sz="1200" b="1" dirty="0">
-                <a:latin typeface="Arial" panose="020B0604020202020204" pitchFamily="34" charset="0"/>
-                <a:cs typeface="Arial" panose="020B0604020202020204" pitchFamily="34" charset="0"/>
-              </a:rPr>
-              <a:t> </a:t>
-            </a:r>
-            <a:r>
-              <a:rPr lang="en-US" altLang="zh-CN" sz="1200" b="1" dirty="0">
-                <a:latin typeface="Arial" panose="020B0604020202020204" pitchFamily="34" charset="0"/>
-                <a:cs typeface="Arial" panose="020B0604020202020204" pitchFamily="34" charset="0"/>
-              </a:rPr>
-              <a:t>and</a:t>
-            </a:r>
-            <a:r>
-              <a:rPr lang="zh-CN" altLang="en-US" sz="1200" b="1" dirty="0">
-                <a:latin typeface="Arial" panose="020B0604020202020204" pitchFamily="34" charset="0"/>
-                <a:cs typeface="Arial" panose="020B0604020202020204" pitchFamily="34" charset="0"/>
-              </a:rPr>
-              <a:t> </a:t>
-            </a:r>
-            <a:r>
-              <a:rPr lang="en-US" altLang="zh-CN" sz="1200" b="1" dirty="0">
-                <a:latin typeface="Arial" panose="020B0604020202020204" pitchFamily="34" charset="0"/>
-                <a:cs typeface="Arial" panose="020B0604020202020204" pitchFamily="34" charset="0"/>
-              </a:rPr>
-              <a:t>start</a:t>
-            </a:r>
-            <a:r>
-              <a:rPr lang="zh-CN" altLang="en-US" sz="1200" b="1" dirty="0">
-                <a:latin typeface="Arial" panose="020B0604020202020204" pitchFamily="34" charset="0"/>
-                <a:cs typeface="Arial" panose="020B0604020202020204" pitchFamily="34" charset="0"/>
-              </a:rPr>
-              <a:t> </a:t>
-            </a:r>
-            <a:r>
-              <a:rPr lang="en-US" altLang="zh-CN" sz="1200" b="1" dirty="0" err="1">
-                <a:latin typeface="Arial" panose="020B0604020202020204" pitchFamily="34" charset="0"/>
-                <a:cs typeface="Arial" panose="020B0604020202020204" pitchFamily="34" charset="0"/>
-              </a:rPr>
-              <a:t>Zowe</a:t>
-            </a:r>
-            <a:endParaRPr lang="en-US" sz="1200" b="1" dirty="0">
-              <a:latin typeface="Arial" panose="020B0604020202020204" pitchFamily="34" charset="0"/>
-              <a:cs typeface="Arial" panose="020B0604020202020204" pitchFamily="34" charset="0"/>
-            </a:endParaRPr>
-          </a:p>
-        </p:txBody>
-      </p:sp>
-      <p:cxnSp>
-        <p:nvCxnSpPr>
-          <p:cNvPr id="65" name="Straight Connector 64">
-            <a:extLst>
-              <a:ext uri="{FF2B5EF4-FFF2-40B4-BE49-F238E27FC236}">
-                <a16:creationId xmlns:a16="http://schemas.microsoft.com/office/drawing/2014/main" id="{A8862446-FD02-634A-B538-2CE6A62F15B5}"/>
-              </a:ext>
-            </a:extLst>
-          </p:cNvPr>
-          <p:cNvCxnSpPr>
-            <a:cxnSpLocks/>
-          </p:cNvCxnSpPr>
-          <p:nvPr/>
-        </p:nvCxnSpPr>
-        <p:spPr>
-          <a:xfrm>
-            <a:off x="1163866" y="14148216"/>
-            <a:ext cx="8072213" cy="0"/>
-          </a:xfrm>
-          <a:prstGeom prst="line">
-            <a:avLst/>
-          </a:prstGeom>
-          <a:ln>
-            <a:solidFill>
-              <a:schemeClr val="bg2">
-                <a:lumMod val="75000"/>
-              </a:schemeClr>
-            </a:solidFill>
-            <a:prstDash val="dash"/>
-          </a:ln>
-        </p:spPr>
-        <p:style>
-          <a:lnRef idx="1">
-            <a:schemeClr val="accent1"/>
-          </a:lnRef>
-          <a:fillRef idx="0">
-            <a:schemeClr val="accent1"/>
-          </a:fillRef>
-          <a:effectRef idx="0">
-            <a:schemeClr val="accent1"/>
-          </a:effectRef>
-          <a:fontRef idx="minor">
-            <a:schemeClr val="tx1"/>
-          </a:fontRef>
-        </p:style>
-      </p:cxnSp>
-      <p:sp>
-        <p:nvSpPr>
-          <p:cNvPr id="67" name="Rectangle 66">
-            <a:extLst>
-              <a:ext uri="{FF2B5EF4-FFF2-40B4-BE49-F238E27FC236}">
-                <a16:creationId xmlns:a16="http://schemas.microsoft.com/office/drawing/2014/main" id="{2A2CA57A-4B49-AB42-94DE-2535D3531CB6}"/>
-              </a:ext>
-            </a:extLst>
-          </p:cNvPr>
-          <p:cNvSpPr/>
-          <p:nvPr/>
-        </p:nvSpPr>
-        <p:spPr>
-          <a:xfrm>
-            <a:off x="3038085" y="14451861"/>
-            <a:ext cx="5171997" cy="558971"/>
-          </a:xfrm>
-          <a:prstGeom prst="rect">
-            <a:avLst/>
-          </a:prstGeom>
-          <a:solidFill>
-            <a:srgbClr val="B4D7EE"/>
-          </a:solidFill>
-          <a:ln>
-            <a:noFill/>
-          </a:ln>
-        </p:spPr>
-        <p:style>
-          <a:lnRef idx="2">
-            <a:schemeClr val="accent1">
-              <a:shade val="50000"/>
-            </a:schemeClr>
-          </a:lnRef>
-          <a:fillRef idx="1">
-            <a:schemeClr val="accent1"/>
-          </a:fillRef>
-          <a:effectRef idx="0">
-            <a:schemeClr val="accent1"/>
-          </a:effectRef>
-          <a:fontRef idx="minor">
-            <a:schemeClr val="lt1"/>
-          </a:fontRef>
-        </p:style>
-        <p:txBody>
-          <a:bodyPr rot="0" spcFirstLastPara="0" vertOverflow="overflow" horzOverflow="overflow" vert="horz" wrap="square" lIns="91440" tIns="45720" rIns="91440" bIns="45720" numCol="1" spcCol="0" rtlCol="0" fromWordArt="0" anchor="ctr" anchorCtr="0" forceAA="0" compatLnSpc="1">
-            <a:prstTxWarp prst="textNoShape">
-              <a:avLst/>
-            </a:prstTxWarp>
-            <a:noAutofit/>
-          </a:bodyPr>
-          <a:lstStyle/>
-          <a:p>
-            <a:pPr algn="ctr"/>
-            <a:r>
-              <a:rPr lang="en-US" altLang="zh-CN" sz="1100" dirty="0">
-                <a:solidFill>
-                  <a:schemeClr val="tx1"/>
-                </a:solidFill>
-                <a:latin typeface="Arial" panose="020B0604020202020204" pitchFamily="34" charset="0"/>
-                <a:cs typeface="Arial" panose="020B0604020202020204" pitchFamily="34" charset="0"/>
-              </a:rPr>
-              <a:t>Verify</a:t>
-            </a:r>
-            <a:r>
-              <a:rPr lang="zh-CN" altLang="en-US" sz="1100" dirty="0">
-                <a:solidFill>
-                  <a:schemeClr val="tx1"/>
-                </a:solidFill>
-                <a:latin typeface="Arial" panose="020B0604020202020204" pitchFamily="34" charset="0"/>
-                <a:cs typeface="Arial" panose="020B0604020202020204" pitchFamily="34" charset="0"/>
-              </a:rPr>
-              <a:t> </a:t>
-            </a:r>
-            <a:r>
-              <a:rPr lang="en-US" altLang="zh-CN" sz="1100" dirty="0">
-                <a:solidFill>
-                  <a:schemeClr val="tx1"/>
-                </a:solidFill>
-                <a:latin typeface="Arial" panose="020B0604020202020204" pitchFamily="34" charset="0"/>
-                <a:cs typeface="Arial" panose="020B0604020202020204" pitchFamily="34" charset="0"/>
-              </a:rPr>
-              <a:t>that</a:t>
-            </a:r>
-            <a:r>
-              <a:rPr lang="zh-CN" altLang="en-US" sz="1100" dirty="0">
-                <a:solidFill>
-                  <a:schemeClr val="tx1"/>
-                </a:solidFill>
-                <a:latin typeface="Arial" panose="020B0604020202020204" pitchFamily="34" charset="0"/>
-                <a:cs typeface="Arial" panose="020B0604020202020204" pitchFamily="34" charset="0"/>
-              </a:rPr>
-              <a:t> </a:t>
-            </a:r>
-            <a:r>
-              <a:rPr lang="en-US" altLang="zh-CN" sz="1100" dirty="0">
-                <a:solidFill>
-                  <a:schemeClr val="tx1"/>
-                </a:solidFill>
-                <a:latin typeface="Arial" panose="020B0604020202020204" pitchFamily="34" charset="0"/>
-                <a:cs typeface="Arial" panose="020B0604020202020204" pitchFamily="34" charset="0"/>
-              </a:rPr>
-              <a:t>Zowe</a:t>
-            </a:r>
-            <a:r>
-              <a:rPr lang="zh-CN" altLang="en-US" sz="1100" dirty="0">
-                <a:solidFill>
-                  <a:schemeClr val="tx1"/>
-                </a:solidFill>
-                <a:latin typeface="Arial" panose="020B0604020202020204" pitchFamily="34" charset="0"/>
-                <a:cs typeface="Arial" panose="020B0604020202020204" pitchFamily="34" charset="0"/>
-              </a:rPr>
-              <a:t> </a:t>
-            </a:r>
-            <a:r>
-              <a:rPr lang="en-US" altLang="zh-CN" sz="1100" dirty="0">
-                <a:solidFill>
-                  <a:schemeClr val="tx1"/>
-                </a:solidFill>
-                <a:latin typeface="Arial" panose="020B0604020202020204" pitchFamily="34" charset="0"/>
-                <a:cs typeface="Arial" panose="020B0604020202020204" pitchFamily="34" charset="0"/>
-              </a:rPr>
-              <a:t>is</a:t>
-            </a:r>
-            <a:r>
-              <a:rPr lang="zh-CN" altLang="en-US" sz="1100" dirty="0">
-                <a:solidFill>
-                  <a:schemeClr val="tx1"/>
-                </a:solidFill>
-                <a:latin typeface="Arial" panose="020B0604020202020204" pitchFamily="34" charset="0"/>
-                <a:cs typeface="Arial" panose="020B0604020202020204" pitchFamily="34" charset="0"/>
-              </a:rPr>
-              <a:t> </a:t>
-            </a:r>
-            <a:r>
-              <a:rPr lang="en-US" altLang="zh-CN" sz="1100" dirty="0">
-                <a:solidFill>
-                  <a:schemeClr val="tx1"/>
-                </a:solidFill>
-                <a:latin typeface="Arial" panose="020B0604020202020204" pitchFamily="34" charset="0"/>
-                <a:cs typeface="Arial" panose="020B0604020202020204" pitchFamily="34" charset="0"/>
-              </a:rPr>
-              <a:t>installed</a:t>
-            </a:r>
-            <a:r>
-              <a:rPr lang="zh-CN" altLang="en-US" sz="1100" dirty="0">
-                <a:solidFill>
-                  <a:schemeClr val="tx1"/>
-                </a:solidFill>
-                <a:latin typeface="Arial" panose="020B0604020202020204" pitchFamily="34" charset="0"/>
-                <a:cs typeface="Arial" panose="020B0604020202020204" pitchFamily="34" charset="0"/>
-              </a:rPr>
-              <a:t> </a:t>
-            </a:r>
-            <a:r>
-              <a:rPr lang="en-US" altLang="zh-CN" sz="1100" dirty="0">
-                <a:solidFill>
-                  <a:schemeClr val="tx1"/>
-                </a:solidFill>
-                <a:latin typeface="Arial" panose="020B0604020202020204" pitchFamily="34" charset="0"/>
-                <a:cs typeface="Arial" panose="020B0604020202020204" pitchFamily="34" charset="0"/>
-              </a:rPr>
-              <a:t>and</a:t>
-            </a:r>
-            <a:r>
-              <a:rPr lang="zh-CN" altLang="en-US" sz="1100" dirty="0">
-                <a:solidFill>
-                  <a:schemeClr val="tx1"/>
-                </a:solidFill>
-                <a:latin typeface="Arial" panose="020B0604020202020204" pitchFamily="34" charset="0"/>
-                <a:cs typeface="Arial" panose="020B0604020202020204" pitchFamily="34" charset="0"/>
-              </a:rPr>
-              <a:t> </a:t>
-            </a:r>
-            <a:r>
-              <a:rPr lang="en-US" altLang="zh-CN" sz="1100" dirty="0">
-                <a:solidFill>
-                  <a:schemeClr val="tx1"/>
-                </a:solidFill>
-                <a:latin typeface="Arial" panose="020B0604020202020204" pitchFamily="34" charset="0"/>
-                <a:cs typeface="Arial" panose="020B0604020202020204" pitchFamily="34" charset="0"/>
-              </a:rPr>
-              <a:t>configured</a:t>
-            </a:r>
-            <a:r>
-              <a:rPr lang="zh-CN" altLang="en-US" sz="1100" dirty="0">
-                <a:solidFill>
-                  <a:schemeClr val="tx1"/>
-                </a:solidFill>
-                <a:latin typeface="Arial" panose="020B0604020202020204" pitchFamily="34" charset="0"/>
-                <a:cs typeface="Arial" panose="020B0604020202020204" pitchFamily="34" charset="0"/>
-              </a:rPr>
-              <a:t> </a:t>
-            </a:r>
-            <a:r>
-              <a:rPr lang="en-US" altLang="zh-CN" sz="1100" dirty="0">
-                <a:solidFill>
-                  <a:schemeClr val="tx1"/>
-                </a:solidFill>
-                <a:latin typeface="Arial" panose="020B0604020202020204" pitchFamily="34" charset="0"/>
-                <a:cs typeface="Arial" panose="020B0604020202020204" pitchFamily="34" charset="0"/>
-              </a:rPr>
-              <a:t>correctly</a:t>
-            </a:r>
-          </a:p>
-        </p:txBody>
-      </p:sp>
-      <p:sp>
-        <p:nvSpPr>
-          <p:cNvPr id="70" name="TextBox 69">
-            <a:extLst>
-              <a:ext uri="{FF2B5EF4-FFF2-40B4-BE49-F238E27FC236}">
-                <a16:creationId xmlns:a16="http://schemas.microsoft.com/office/drawing/2014/main" id="{0BC2C662-8125-0E43-AD52-BDB1749D1FAC}"/>
-              </a:ext>
-            </a:extLst>
-          </p:cNvPr>
-          <p:cNvSpPr txBox="1"/>
-          <p:nvPr/>
-        </p:nvSpPr>
-        <p:spPr>
-          <a:xfrm>
-            <a:off x="1074221" y="14165145"/>
-            <a:ext cx="2566919" cy="276999"/>
-          </a:xfrm>
-          <a:prstGeom prst="rect">
-            <a:avLst/>
-          </a:prstGeom>
-          <a:noFill/>
-        </p:spPr>
-        <p:txBody>
-          <a:bodyPr wrap="square" rtlCol="0">
-            <a:spAutoFit/>
-          </a:bodyPr>
-          <a:lstStyle/>
-          <a:p>
-            <a:r>
-              <a:rPr lang="en-US" altLang="zh-CN" sz="1200" b="1" dirty="0">
-                <a:latin typeface="Arial" panose="020B0604020202020204" pitchFamily="34" charset="0"/>
-                <a:cs typeface="Arial" panose="020B0604020202020204" pitchFamily="34" charset="0"/>
-              </a:rPr>
-              <a:t>Stage</a:t>
-            </a:r>
-            <a:r>
-              <a:rPr lang="zh-CN" altLang="en-US" sz="1200" b="1" dirty="0">
-                <a:latin typeface="Arial" panose="020B0604020202020204" pitchFamily="34" charset="0"/>
-                <a:cs typeface="Arial" panose="020B0604020202020204" pitchFamily="34" charset="0"/>
-              </a:rPr>
-              <a:t> </a:t>
-            </a:r>
-            <a:r>
-              <a:rPr lang="en-US" altLang="zh-CN" sz="1200" b="1" dirty="0">
-                <a:latin typeface="Arial" panose="020B0604020202020204" pitchFamily="34" charset="0"/>
-                <a:cs typeface="Arial" panose="020B0604020202020204" pitchFamily="34" charset="0"/>
-              </a:rPr>
-              <a:t>4:</a:t>
-            </a:r>
-            <a:r>
-              <a:rPr lang="zh-CN" altLang="en-US" sz="1200" b="1" dirty="0">
-                <a:latin typeface="Arial" panose="020B0604020202020204" pitchFamily="34" charset="0"/>
-                <a:cs typeface="Arial" panose="020B0604020202020204" pitchFamily="34" charset="0"/>
-              </a:rPr>
-              <a:t> </a:t>
-            </a:r>
-            <a:r>
-              <a:rPr lang="en-US" altLang="zh-CN" sz="1200" b="1" dirty="0">
-                <a:latin typeface="Arial" panose="020B0604020202020204" pitchFamily="34" charset="0"/>
-                <a:cs typeface="Arial" panose="020B0604020202020204" pitchFamily="34" charset="0"/>
-              </a:rPr>
-              <a:t>Verify</a:t>
-            </a:r>
-            <a:r>
-              <a:rPr lang="zh-CN" altLang="en-US" sz="1200" b="1" dirty="0">
-                <a:latin typeface="Arial" panose="020B0604020202020204" pitchFamily="34" charset="0"/>
-                <a:cs typeface="Arial" panose="020B0604020202020204" pitchFamily="34" charset="0"/>
-              </a:rPr>
-              <a:t> </a:t>
-            </a:r>
-            <a:r>
-              <a:rPr lang="en-US" altLang="zh-CN" sz="1200" b="1" dirty="0">
-                <a:latin typeface="Arial" panose="020B0604020202020204" pitchFamily="34" charset="0"/>
-                <a:cs typeface="Arial" panose="020B0604020202020204" pitchFamily="34" charset="0"/>
-              </a:rPr>
-              <a:t>the</a:t>
-            </a:r>
-            <a:r>
-              <a:rPr lang="zh-CN" altLang="en-US" sz="1200" b="1" dirty="0">
-                <a:latin typeface="Arial" panose="020B0604020202020204" pitchFamily="34" charset="0"/>
-                <a:cs typeface="Arial" panose="020B0604020202020204" pitchFamily="34" charset="0"/>
-              </a:rPr>
-              <a:t> </a:t>
-            </a:r>
-            <a:r>
-              <a:rPr lang="en-US" altLang="zh-CN" sz="1200" b="1" dirty="0">
-                <a:latin typeface="Arial" panose="020B0604020202020204" pitchFamily="34" charset="0"/>
-                <a:cs typeface="Arial" panose="020B0604020202020204" pitchFamily="34" charset="0"/>
-              </a:rPr>
-              <a:t>installation</a:t>
-            </a:r>
-            <a:endParaRPr lang="en-US" sz="1200" b="1" dirty="0">
-              <a:latin typeface="Arial" panose="020B0604020202020204" pitchFamily="34" charset="0"/>
-              <a:cs typeface="Arial" panose="020B0604020202020204" pitchFamily="34" charset="0"/>
-            </a:endParaRPr>
-          </a:p>
-        </p:txBody>
-      </p:sp>
-      <p:sp>
-        <p:nvSpPr>
-          <p:cNvPr id="72" name="Rectangle 71">
-            <a:extLst>
-              <a:ext uri="{FF2B5EF4-FFF2-40B4-BE49-F238E27FC236}">
-                <a16:creationId xmlns:a16="http://schemas.microsoft.com/office/drawing/2014/main" id="{840C4586-194D-EB43-BF82-8A163D579E6A}"/>
-              </a:ext>
-            </a:extLst>
-          </p:cNvPr>
-          <p:cNvSpPr/>
-          <p:nvPr/>
-        </p:nvSpPr>
-        <p:spPr>
-          <a:xfrm>
-            <a:off x="4043743" y="4155837"/>
-            <a:ext cx="1724319" cy="430887"/>
-          </a:xfrm>
-          <a:prstGeom prst="rect">
-            <a:avLst/>
-          </a:prstGeom>
-        </p:spPr>
-        <p:txBody>
-          <a:bodyPr wrap="square">
-            <a:spAutoFit/>
-          </a:bodyPr>
-          <a:lstStyle/>
-          <a:p>
-            <a:pPr lvl="0" algn="ctr"/>
-            <a:r>
-              <a:rPr lang="en-US" sz="1100" i="1" dirty="0">
-                <a:latin typeface="Arial" panose="020B0604020202020204" pitchFamily="34" charset="0"/>
-                <a:cs typeface="Arial" panose="020B0604020202020204" pitchFamily="34" charset="0"/>
-              </a:rPr>
-              <a:t>What is your preferred installation method?</a:t>
-            </a:r>
-          </a:p>
-        </p:txBody>
-      </p:sp>
-      <p:cxnSp>
-        <p:nvCxnSpPr>
-          <p:cNvPr id="83" name="Straight Connector 82">
-            <a:extLst>
-              <a:ext uri="{FF2B5EF4-FFF2-40B4-BE49-F238E27FC236}">
-                <a16:creationId xmlns:a16="http://schemas.microsoft.com/office/drawing/2014/main" id="{39EC7DCA-EDFB-CA4D-91AB-7AAC72E33404}"/>
-              </a:ext>
-            </a:extLst>
-          </p:cNvPr>
-          <p:cNvCxnSpPr>
-            <a:cxnSpLocks/>
-          </p:cNvCxnSpPr>
-          <p:nvPr/>
-        </p:nvCxnSpPr>
-        <p:spPr>
-          <a:xfrm>
-            <a:off x="1163863" y="1257689"/>
-            <a:ext cx="7982472" cy="0"/>
-          </a:xfrm>
-          <a:prstGeom prst="line">
-            <a:avLst/>
-          </a:prstGeom>
-          <a:ln>
-            <a:solidFill>
-              <a:schemeClr val="bg2">
-                <a:lumMod val="75000"/>
-              </a:schemeClr>
-            </a:solidFill>
-            <a:prstDash val="dash"/>
-          </a:ln>
-        </p:spPr>
-        <p:style>
-          <a:lnRef idx="1">
-            <a:schemeClr val="accent1"/>
-          </a:lnRef>
-          <a:fillRef idx="0">
-            <a:schemeClr val="accent1"/>
-          </a:fillRef>
-          <a:effectRef idx="0">
-            <a:schemeClr val="accent1"/>
-          </a:effectRef>
-          <a:fontRef idx="minor">
-            <a:schemeClr val="tx1"/>
-          </a:fontRef>
-        </p:style>
-      </p:cxnSp>
-      <p:sp>
-        <p:nvSpPr>
-          <p:cNvPr id="51" name="Rectangle 50">
-            <a:extLst>
-              <a:ext uri="{FF2B5EF4-FFF2-40B4-BE49-F238E27FC236}">
-                <a16:creationId xmlns:a16="http://schemas.microsoft.com/office/drawing/2014/main" id="{0E337C55-5CEA-7D45-A843-ED3785889B04}"/>
-              </a:ext>
-            </a:extLst>
-          </p:cNvPr>
-          <p:cNvSpPr/>
-          <p:nvPr/>
-        </p:nvSpPr>
-        <p:spPr>
-          <a:xfrm>
-            <a:off x="6956223" y="6731894"/>
-            <a:ext cx="2317702" cy="503314"/>
-          </a:xfrm>
-          <a:prstGeom prst="rect">
-            <a:avLst/>
-          </a:prstGeom>
-          <a:solidFill>
-            <a:schemeClr val="accent4">
-              <a:lumMod val="20000"/>
-              <a:lumOff val="80000"/>
-            </a:schemeClr>
-          </a:solidFill>
-          <a:ln>
-            <a:solidFill>
-              <a:schemeClr val="accent4">
-                <a:lumMod val="60000"/>
-                <a:lumOff val="40000"/>
-              </a:schemeClr>
-            </a:solidFill>
-            <a:prstDash val="dash"/>
-          </a:ln>
-        </p:spPr>
-        <p:style>
-          <a:lnRef idx="2">
-            <a:schemeClr val="accent1">
-              <a:shade val="50000"/>
-            </a:schemeClr>
-          </a:lnRef>
-          <a:fillRef idx="1">
-            <a:schemeClr val="accent1"/>
-          </a:fillRef>
-          <a:effectRef idx="0">
-            <a:schemeClr val="accent1"/>
-          </a:effectRef>
-          <a:fontRef idx="minor">
-            <a:schemeClr val="lt1"/>
-          </a:fontRef>
-        </p:style>
-        <p:txBody>
-          <a:bodyPr rot="0" spcFirstLastPara="0" vertOverflow="overflow" horzOverflow="overflow" vert="horz" wrap="square" lIns="91440" tIns="45720" rIns="91440" bIns="45720" numCol="1" spcCol="0" rtlCol="0" fromWordArt="0" anchor="ctr" anchorCtr="0" forceAA="0" compatLnSpc="1">
-            <a:prstTxWarp prst="textNoShape">
-              <a:avLst/>
-            </a:prstTxWarp>
-            <a:noAutofit/>
-          </a:bodyPr>
-          <a:lstStyle/>
-          <a:p>
-            <a:r>
-              <a:rPr lang="en-US" sz="1100" dirty="0">
-                <a:solidFill>
-                  <a:schemeClr val="tx1"/>
-                </a:solidFill>
-                <a:latin typeface="Arial" panose="020B0604020202020204" pitchFamily="34" charset="0"/>
-                <a:cs typeface="Arial" panose="020B0604020202020204" pitchFamily="34" charset="0"/>
-              </a:rPr>
-              <a:t>Method 1: Use shell script </a:t>
-            </a:r>
-          </a:p>
-          <a:p>
-            <a:r>
-              <a:rPr lang="en-US" sz="1100" dirty="0">
-                <a:solidFill>
-                  <a:schemeClr val="accent1"/>
-                </a:solidFill>
-                <a:latin typeface="Arial" panose="020B0604020202020204" pitchFamily="34" charset="0"/>
-                <a:cs typeface="Arial" panose="020B0604020202020204" pitchFamily="34" charset="0"/>
-              </a:rPr>
-              <a:t>(Script: </a:t>
-            </a:r>
-            <a:r>
-              <a:rPr lang="en-US" sz="1100" dirty="0" err="1">
-                <a:solidFill>
-                  <a:schemeClr val="accent1"/>
-                </a:solidFill>
-                <a:latin typeface="Arial" panose="020B0604020202020204" pitchFamily="34" charset="0"/>
-                <a:cs typeface="Arial" panose="020B0604020202020204" pitchFamily="34" charset="0"/>
-              </a:rPr>
-              <a:t>zowe-install.sh</a:t>
-            </a:r>
-            <a:r>
-              <a:rPr lang="en-US" sz="1100" dirty="0">
-                <a:solidFill>
-                  <a:schemeClr val="accent1"/>
-                </a:solidFill>
-                <a:latin typeface="Arial" panose="020B0604020202020204" pitchFamily="34" charset="0"/>
-                <a:cs typeface="Arial" panose="020B0604020202020204" pitchFamily="34" charset="0"/>
-              </a:rPr>
-              <a:t>)</a:t>
-            </a:r>
-          </a:p>
-        </p:txBody>
-      </p:sp>
-      <p:sp>
-        <p:nvSpPr>
-          <p:cNvPr id="53" name="Rectangle 52">
-            <a:extLst>
-              <a:ext uri="{FF2B5EF4-FFF2-40B4-BE49-F238E27FC236}">
-                <a16:creationId xmlns:a16="http://schemas.microsoft.com/office/drawing/2014/main" id="{20D00F0E-D4CD-F545-8E1F-63A049D7B467}"/>
-              </a:ext>
-            </a:extLst>
-          </p:cNvPr>
-          <p:cNvSpPr/>
-          <p:nvPr/>
-        </p:nvSpPr>
-        <p:spPr>
-          <a:xfrm>
-            <a:off x="6956223" y="7280545"/>
-            <a:ext cx="2317702" cy="307777"/>
-          </a:xfrm>
-          <a:prstGeom prst="rect">
-            <a:avLst/>
-          </a:prstGeom>
-          <a:solidFill>
-            <a:schemeClr val="accent4">
-              <a:lumMod val="20000"/>
-              <a:lumOff val="80000"/>
-            </a:schemeClr>
-          </a:solidFill>
-          <a:ln>
-            <a:solidFill>
-              <a:schemeClr val="accent4">
-                <a:lumMod val="60000"/>
-                <a:lumOff val="40000"/>
-              </a:schemeClr>
-            </a:solidFill>
-            <a:prstDash val="dash"/>
-          </a:ln>
-        </p:spPr>
-        <p:style>
-          <a:lnRef idx="2">
-            <a:schemeClr val="accent1">
-              <a:shade val="50000"/>
-            </a:schemeClr>
-          </a:lnRef>
-          <a:fillRef idx="1">
-            <a:schemeClr val="accent1"/>
-          </a:fillRef>
-          <a:effectRef idx="0">
-            <a:schemeClr val="accent1"/>
-          </a:effectRef>
-          <a:fontRef idx="minor">
-            <a:schemeClr val="lt1"/>
-          </a:fontRef>
-        </p:style>
-        <p:txBody>
-          <a:bodyPr rot="0" spcFirstLastPara="0" vertOverflow="overflow" horzOverflow="overflow" vert="horz" wrap="square" lIns="91440" tIns="45720" rIns="91440" bIns="45720" numCol="1" spcCol="0" rtlCol="0" fromWordArt="0" anchor="ctr" anchorCtr="0" forceAA="0" compatLnSpc="1">
-            <a:prstTxWarp prst="textNoShape">
-              <a:avLst/>
-            </a:prstTxWarp>
-            <a:noAutofit/>
-          </a:bodyPr>
-          <a:lstStyle/>
-          <a:p>
-            <a:r>
-              <a:rPr lang="en-US" sz="1100" dirty="0">
-                <a:solidFill>
-                  <a:schemeClr val="tx1"/>
-                </a:solidFill>
-                <a:latin typeface="Arial" panose="020B0604020202020204" pitchFamily="34" charset="0"/>
-                <a:cs typeface="Arial" panose="020B0604020202020204" pitchFamily="34" charset="0"/>
-              </a:rPr>
-              <a:t>Method 2: Use z/</a:t>
-            </a:r>
-            <a:r>
-              <a:rPr lang="en-US" sz="1100">
-                <a:solidFill>
-                  <a:schemeClr val="tx1"/>
-                </a:solidFill>
-                <a:latin typeface="Arial" panose="020B0604020202020204" pitchFamily="34" charset="0"/>
-                <a:cs typeface="Arial" panose="020B0604020202020204" pitchFamily="34" charset="0"/>
-              </a:rPr>
-              <a:t>OSMF Workflow</a:t>
-            </a:r>
-            <a:endParaRPr lang="en-US" sz="1100" dirty="0">
-              <a:solidFill>
-                <a:schemeClr val="tx1"/>
-              </a:solidFill>
-              <a:latin typeface="Arial" panose="020B0604020202020204" pitchFamily="34" charset="0"/>
-              <a:cs typeface="Arial" panose="020B0604020202020204" pitchFamily="34" charset="0"/>
-            </a:endParaRPr>
-          </a:p>
-        </p:txBody>
-      </p:sp>
-      <p:sp>
-        <p:nvSpPr>
-          <p:cNvPr id="68" name="Rectangle 67">
-            <a:extLst>
-              <a:ext uri="{FF2B5EF4-FFF2-40B4-BE49-F238E27FC236}">
-                <a16:creationId xmlns:a16="http://schemas.microsoft.com/office/drawing/2014/main" id="{D669B208-6833-D847-9550-91D3FC0D2ACA}"/>
-              </a:ext>
-            </a:extLst>
-          </p:cNvPr>
-          <p:cNvSpPr/>
-          <p:nvPr/>
-        </p:nvSpPr>
-        <p:spPr>
-          <a:xfrm>
-            <a:off x="3146093" y="10072357"/>
-            <a:ext cx="2474599" cy="503314"/>
-          </a:xfrm>
-          <a:prstGeom prst="rect">
-            <a:avLst/>
-          </a:prstGeom>
-          <a:solidFill>
-            <a:srgbClr val="DEECF8"/>
-          </a:solidFill>
-          <a:ln>
-            <a:solidFill>
-              <a:schemeClr val="accent5">
-                <a:lumMod val="60000"/>
-                <a:lumOff val="40000"/>
-              </a:schemeClr>
-            </a:solidFill>
-            <a:prstDash val="dash"/>
-          </a:ln>
-        </p:spPr>
-        <p:style>
-          <a:lnRef idx="2">
-            <a:schemeClr val="accent1">
-              <a:shade val="50000"/>
-            </a:schemeClr>
-          </a:lnRef>
-          <a:fillRef idx="1">
-            <a:schemeClr val="accent1"/>
-          </a:fillRef>
-          <a:effectRef idx="0">
-            <a:schemeClr val="accent1"/>
-          </a:effectRef>
-          <a:fontRef idx="minor">
-            <a:schemeClr val="lt1"/>
-          </a:fontRef>
-        </p:style>
-        <p:txBody>
-          <a:bodyPr rot="0" spcFirstLastPara="0" vertOverflow="overflow" horzOverflow="overflow" vert="horz" wrap="square" lIns="91440" tIns="45720" rIns="91440" bIns="45720" numCol="1" spcCol="0" rtlCol="0" fromWordArt="0" anchor="ctr" anchorCtr="0" forceAA="0" compatLnSpc="1">
-            <a:prstTxWarp prst="textNoShape">
-              <a:avLst/>
-            </a:prstTxWarp>
-            <a:noAutofit/>
-          </a:bodyPr>
-          <a:lstStyle/>
-          <a:p>
-            <a:r>
-              <a:rPr lang="en-US" sz="1100" dirty="0">
-                <a:solidFill>
-                  <a:schemeClr val="tx1"/>
-                </a:solidFill>
-                <a:latin typeface="Arial" panose="020B0604020202020204" pitchFamily="34" charset="0"/>
-                <a:cs typeface="Arial" panose="020B0604020202020204" pitchFamily="34" charset="0"/>
-              </a:rPr>
-              <a:t>Method 1: Use shell script </a:t>
-            </a:r>
-          </a:p>
-          <a:p>
-            <a:r>
-              <a:rPr lang="en-US" sz="1100" dirty="0">
-                <a:solidFill>
-                  <a:schemeClr val="accent1"/>
-                </a:solidFill>
-                <a:latin typeface="Arial" panose="020B0604020202020204" pitchFamily="34" charset="0"/>
-                <a:cs typeface="Arial" panose="020B0604020202020204" pitchFamily="34" charset="0"/>
-              </a:rPr>
-              <a:t>(Script: </a:t>
-            </a:r>
-            <a:r>
-              <a:rPr lang="en-US" sz="1100" dirty="0" err="1">
-                <a:solidFill>
-                  <a:schemeClr val="accent1"/>
-                </a:solidFill>
-                <a:latin typeface="Arial" panose="020B0604020202020204" pitchFamily="34" charset="0"/>
-                <a:cs typeface="Arial" panose="020B0604020202020204" pitchFamily="34" charset="0"/>
-              </a:rPr>
-              <a:t>zowe</a:t>
-            </a:r>
-            <a:r>
-              <a:rPr lang="en-US" sz="1100" dirty="0">
-                <a:solidFill>
-                  <a:schemeClr val="accent1"/>
-                </a:solidFill>
-                <a:latin typeface="Arial" panose="020B0604020202020204" pitchFamily="34" charset="0"/>
-                <a:cs typeface="Arial" panose="020B0604020202020204" pitchFamily="34" charset="0"/>
-              </a:rPr>
-              <a:t>-setup-</a:t>
-            </a:r>
-            <a:r>
-              <a:rPr lang="en-US" sz="1100" dirty="0" err="1">
-                <a:solidFill>
-                  <a:schemeClr val="accent1"/>
-                </a:solidFill>
-                <a:latin typeface="Arial" panose="020B0604020202020204" pitchFamily="34" charset="0"/>
-                <a:cs typeface="Arial" panose="020B0604020202020204" pitchFamily="34" charset="0"/>
-              </a:rPr>
-              <a:t>certificates.sh</a:t>
-            </a:r>
-            <a:r>
-              <a:rPr lang="en-US" sz="1100" dirty="0">
-                <a:solidFill>
-                  <a:schemeClr val="accent1"/>
-                </a:solidFill>
-                <a:latin typeface="Arial" panose="020B0604020202020204" pitchFamily="34" charset="0"/>
-                <a:cs typeface="Arial" panose="020B0604020202020204" pitchFamily="34" charset="0"/>
-              </a:rPr>
-              <a:t>)</a:t>
-            </a:r>
-          </a:p>
-        </p:txBody>
-      </p:sp>
-      <p:sp>
-        <p:nvSpPr>
-          <p:cNvPr id="69" name="Rectangle 68">
-            <a:extLst>
-              <a:ext uri="{FF2B5EF4-FFF2-40B4-BE49-F238E27FC236}">
-                <a16:creationId xmlns:a16="http://schemas.microsoft.com/office/drawing/2014/main" id="{58EED663-37F9-F245-802C-26BFB766AD91}"/>
-              </a:ext>
-            </a:extLst>
-          </p:cNvPr>
-          <p:cNvSpPr/>
-          <p:nvPr/>
-        </p:nvSpPr>
-        <p:spPr>
-          <a:xfrm>
-            <a:off x="5738057" y="10072287"/>
-            <a:ext cx="2361039" cy="499558"/>
-          </a:xfrm>
-          <a:prstGeom prst="rect">
-            <a:avLst/>
-          </a:prstGeom>
-          <a:solidFill>
-            <a:srgbClr val="DEECF8"/>
-          </a:solidFill>
-          <a:ln>
-            <a:solidFill>
-              <a:schemeClr val="accent5">
-                <a:lumMod val="60000"/>
-                <a:lumOff val="40000"/>
-              </a:schemeClr>
-            </a:solidFill>
-            <a:prstDash val="dash"/>
-          </a:ln>
-        </p:spPr>
-        <p:style>
-          <a:lnRef idx="2">
-            <a:schemeClr val="accent1">
-              <a:shade val="50000"/>
-            </a:schemeClr>
-          </a:lnRef>
-          <a:fillRef idx="1">
-            <a:schemeClr val="accent1"/>
-          </a:fillRef>
-          <a:effectRef idx="0">
-            <a:schemeClr val="accent1"/>
-          </a:effectRef>
-          <a:fontRef idx="minor">
-            <a:schemeClr val="lt1"/>
-          </a:fontRef>
-        </p:style>
-        <p:txBody>
-          <a:bodyPr rot="0" spcFirstLastPara="0" vertOverflow="overflow" horzOverflow="overflow" vert="horz" wrap="square" lIns="91440" tIns="45720" rIns="91440" bIns="45720" numCol="1" spcCol="0" rtlCol="0" fromWordArt="0" anchor="ctr" anchorCtr="0" forceAA="0" compatLnSpc="1">
-            <a:prstTxWarp prst="textNoShape">
-              <a:avLst/>
-            </a:prstTxWarp>
-            <a:noAutofit/>
-          </a:bodyPr>
-          <a:lstStyle/>
-          <a:p>
-            <a:r>
-              <a:rPr lang="en-US" sz="1100" dirty="0">
-                <a:solidFill>
-                  <a:schemeClr val="tx1"/>
-                </a:solidFill>
-                <a:latin typeface="Arial" panose="020B0604020202020204" pitchFamily="34" charset="0"/>
-                <a:cs typeface="Arial" panose="020B0604020202020204" pitchFamily="34" charset="0"/>
-              </a:rPr>
-              <a:t>Method 2: Use z/OSMF Workflow</a:t>
-            </a:r>
-          </a:p>
-        </p:txBody>
-      </p:sp>
-      <p:sp>
-        <p:nvSpPr>
-          <p:cNvPr id="73" name="Rectangle 72">
-            <a:extLst>
-              <a:ext uri="{FF2B5EF4-FFF2-40B4-BE49-F238E27FC236}">
-                <a16:creationId xmlns:a16="http://schemas.microsoft.com/office/drawing/2014/main" id="{0DD4F608-E798-6F4B-8A90-39D3F7736AB6}"/>
-              </a:ext>
-            </a:extLst>
-          </p:cNvPr>
-          <p:cNvSpPr/>
-          <p:nvPr/>
-        </p:nvSpPr>
-        <p:spPr>
-          <a:xfrm>
-            <a:off x="3120706" y="8610886"/>
-            <a:ext cx="2474599" cy="503314"/>
-          </a:xfrm>
-          <a:prstGeom prst="rect">
-            <a:avLst/>
-          </a:prstGeom>
-          <a:solidFill>
-            <a:srgbClr val="DEECF8"/>
-          </a:solidFill>
-          <a:ln>
-            <a:solidFill>
-              <a:schemeClr val="accent5">
-                <a:lumMod val="60000"/>
-                <a:lumOff val="40000"/>
-              </a:schemeClr>
-            </a:solidFill>
-            <a:prstDash val="dash"/>
-          </a:ln>
-        </p:spPr>
-        <p:style>
-          <a:lnRef idx="2">
-            <a:schemeClr val="accent1">
-              <a:shade val="50000"/>
-            </a:schemeClr>
-          </a:lnRef>
-          <a:fillRef idx="1">
-            <a:schemeClr val="accent1"/>
-          </a:fillRef>
-          <a:effectRef idx="0">
-            <a:schemeClr val="accent1"/>
-          </a:effectRef>
-          <a:fontRef idx="minor">
-            <a:schemeClr val="lt1"/>
-          </a:fontRef>
-        </p:style>
-        <p:txBody>
-          <a:bodyPr rot="0" spcFirstLastPara="0" vertOverflow="overflow" horzOverflow="overflow" vert="horz" wrap="square" lIns="91440" tIns="45720" rIns="91440" bIns="45720" numCol="1" spcCol="0" rtlCol="0" fromWordArt="0" anchor="ctr" anchorCtr="0" forceAA="0" compatLnSpc="1">
-            <a:prstTxWarp prst="textNoShape">
-              <a:avLst/>
-            </a:prstTxWarp>
-            <a:noAutofit/>
-          </a:bodyPr>
-          <a:lstStyle/>
-          <a:p>
-            <a:pPr algn="ctr"/>
-            <a:r>
-              <a:rPr lang="en-US" sz="1100" dirty="0">
-                <a:solidFill>
-                  <a:schemeClr val="tx1"/>
-                </a:solidFill>
-                <a:latin typeface="Arial" panose="020B0604020202020204" pitchFamily="34" charset="0"/>
-                <a:cs typeface="Arial" panose="020B0604020202020204" pitchFamily="34" charset="0"/>
-              </a:rPr>
-              <a:t>Method 1: Use JCL</a:t>
-            </a:r>
-          </a:p>
-          <a:p>
-            <a:pPr algn="ctr"/>
-            <a:r>
-              <a:rPr lang="en-US" sz="1100" dirty="0">
-                <a:solidFill>
-                  <a:schemeClr val="accent1"/>
-                </a:solidFill>
-                <a:latin typeface="Arial" panose="020B0604020202020204" pitchFamily="34" charset="0"/>
-                <a:cs typeface="Arial" panose="020B0604020202020204" pitchFamily="34" charset="0"/>
-              </a:rPr>
-              <a:t>(JCL: ZWESECUR)</a:t>
-            </a:r>
-          </a:p>
-        </p:txBody>
-      </p:sp>
-      <p:sp>
-        <p:nvSpPr>
-          <p:cNvPr id="74" name="Rectangle 73">
-            <a:extLst>
-              <a:ext uri="{FF2B5EF4-FFF2-40B4-BE49-F238E27FC236}">
-                <a16:creationId xmlns:a16="http://schemas.microsoft.com/office/drawing/2014/main" id="{7E0FAF8F-3D46-0F4E-9992-07F484E98B22}"/>
-              </a:ext>
-            </a:extLst>
-          </p:cNvPr>
-          <p:cNvSpPr/>
-          <p:nvPr/>
-        </p:nvSpPr>
-        <p:spPr>
-          <a:xfrm>
-            <a:off x="5697519" y="8601370"/>
-            <a:ext cx="2401577" cy="509885"/>
-          </a:xfrm>
-          <a:prstGeom prst="rect">
-            <a:avLst/>
-          </a:prstGeom>
-          <a:solidFill>
-            <a:srgbClr val="DEECF8"/>
-          </a:solidFill>
-          <a:ln>
-            <a:solidFill>
-              <a:schemeClr val="accent5">
-                <a:lumMod val="60000"/>
-                <a:lumOff val="40000"/>
-              </a:schemeClr>
-            </a:solidFill>
-            <a:prstDash val="dash"/>
-          </a:ln>
-        </p:spPr>
-        <p:style>
-          <a:lnRef idx="2">
-            <a:schemeClr val="accent1">
-              <a:shade val="50000"/>
-            </a:schemeClr>
-          </a:lnRef>
-          <a:fillRef idx="1">
-            <a:schemeClr val="accent1"/>
-          </a:fillRef>
-          <a:effectRef idx="0">
-            <a:schemeClr val="accent1"/>
-          </a:effectRef>
-          <a:fontRef idx="minor">
-            <a:schemeClr val="lt1"/>
-          </a:fontRef>
-        </p:style>
-        <p:txBody>
-          <a:bodyPr rot="0" spcFirstLastPara="0" vertOverflow="overflow" horzOverflow="overflow" vert="horz" wrap="square" lIns="91440" tIns="45720" rIns="91440" bIns="45720" numCol="1" spcCol="0" rtlCol="0" fromWordArt="0" anchor="ctr" anchorCtr="0" forceAA="0" compatLnSpc="1">
-            <a:prstTxWarp prst="textNoShape">
-              <a:avLst/>
-            </a:prstTxWarp>
-            <a:noAutofit/>
-          </a:bodyPr>
-          <a:lstStyle/>
-          <a:p>
-            <a:r>
-              <a:rPr lang="en-US" sz="1100" dirty="0">
-                <a:solidFill>
-                  <a:schemeClr val="tx1"/>
-                </a:solidFill>
-                <a:latin typeface="Arial" panose="020B0604020202020204" pitchFamily="34" charset="0"/>
-                <a:cs typeface="Arial" panose="020B0604020202020204" pitchFamily="34" charset="0"/>
-              </a:rPr>
-              <a:t>Method 2: Use z/OSMF Workflow</a:t>
-            </a:r>
-          </a:p>
-        </p:txBody>
-      </p:sp>
-      <p:sp>
-        <p:nvSpPr>
-          <p:cNvPr id="76" name="Rectangle 75">
-            <a:extLst>
-              <a:ext uri="{FF2B5EF4-FFF2-40B4-BE49-F238E27FC236}">
-                <a16:creationId xmlns:a16="http://schemas.microsoft.com/office/drawing/2014/main" id="{EE3CF47B-5654-8745-9DF1-4AB8E56948E3}"/>
-              </a:ext>
-            </a:extLst>
-          </p:cNvPr>
-          <p:cNvSpPr/>
-          <p:nvPr/>
-        </p:nvSpPr>
-        <p:spPr>
-          <a:xfrm>
-            <a:off x="3165873" y="11353805"/>
-            <a:ext cx="2474599" cy="503314"/>
-          </a:xfrm>
-          <a:prstGeom prst="rect">
-            <a:avLst/>
-          </a:prstGeom>
-          <a:solidFill>
-            <a:srgbClr val="DEECF8"/>
-          </a:solidFill>
-          <a:ln>
-            <a:solidFill>
-              <a:schemeClr val="accent5">
-                <a:lumMod val="60000"/>
-                <a:lumOff val="40000"/>
-              </a:schemeClr>
-            </a:solidFill>
-            <a:prstDash val="dash"/>
-          </a:ln>
-        </p:spPr>
-        <p:style>
-          <a:lnRef idx="2">
-            <a:schemeClr val="accent1">
-              <a:shade val="50000"/>
-            </a:schemeClr>
-          </a:lnRef>
-          <a:fillRef idx="1">
-            <a:schemeClr val="accent1"/>
-          </a:fillRef>
-          <a:effectRef idx="0">
-            <a:schemeClr val="accent1"/>
-          </a:effectRef>
-          <a:fontRef idx="minor">
-            <a:schemeClr val="lt1"/>
-          </a:fontRef>
-        </p:style>
-        <p:txBody>
-          <a:bodyPr rot="0" spcFirstLastPara="0" vertOverflow="overflow" horzOverflow="overflow" vert="horz" wrap="square" lIns="91440" tIns="45720" rIns="91440" bIns="45720" numCol="1" spcCol="0" rtlCol="0" fromWordArt="0" anchor="ctr" anchorCtr="0" forceAA="0" compatLnSpc="1">
-            <a:prstTxWarp prst="textNoShape">
-              <a:avLst/>
-            </a:prstTxWarp>
-            <a:noAutofit/>
-          </a:bodyPr>
-          <a:lstStyle/>
-          <a:p>
-            <a:r>
-              <a:rPr lang="en-US" sz="1100" dirty="0">
-                <a:solidFill>
-                  <a:schemeClr val="tx1"/>
-                </a:solidFill>
-                <a:latin typeface="Arial" panose="020B0604020202020204" pitchFamily="34" charset="0"/>
-                <a:cs typeface="Arial" panose="020B0604020202020204" pitchFamily="34" charset="0"/>
-              </a:rPr>
-              <a:t>Method 1: Use shell script </a:t>
-            </a:r>
-          </a:p>
-          <a:p>
-            <a:r>
-              <a:rPr lang="en-US" sz="1100" dirty="0">
-                <a:solidFill>
-                  <a:schemeClr val="accent1"/>
-                </a:solidFill>
-                <a:latin typeface="Arial" panose="020B0604020202020204" pitchFamily="34" charset="0"/>
-                <a:cs typeface="Arial" panose="020B0604020202020204" pitchFamily="34" charset="0"/>
-              </a:rPr>
-              <a:t>(Script: </a:t>
-            </a:r>
-            <a:r>
-              <a:rPr lang="en-US" sz="1100" dirty="0" err="1">
-                <a:solidFill>
-                  <a:schemeClr val="accent1"/>
-                </a:solidFill>
-                <a:latin typeface="Arial" panose="020B0604020202020204" pitchFamily="34" charset="0"/>
-                <a:cs typeface="Arial" panose="020B0604020202020204" pitchFamily="34" charset="0"/>
-              </a:rPr>
-              <a:t>zowe</a:t>
-            </a:r>
-            <a:r>
-              <a:rPr lang="en-US" sz="1100" dirty="0">
-                <a:solidFill>
-                  <a:schemeClr val="accent1"/>
-                </a:solidFill>
-                <a:latin typeface="Arial" panose="020B0604020202020204" pitchFamily="34" charset="0"/>
-                <a:cs typeface="Arial" panose="020B0604020202020204" pitchFamily="34" charset="0"/>
-              </a:rPr>
-              <a:t>-configure-</a:t>
-            </a:r>
-            <a:r>
-              <a:rPr lang="en-US" sz="1100" dirty="0" err="1">
-                <a:solidFill>
-                  <a:schemeClr val="accent1"/>
-                </a:solidFill>
-                <a:latin typeface="Arial" panose="020B0604020202020204" pitchFamily="34" charset="0"/>
-                <a:cs typeface="Arial" panose="020B0604020202020204" pitchFamily="34" charset="0"/>
-              </a:rPr>
-              <a:t>instance.sh</a:t>
-            </a:r>
-            <a:r>
-              <a:rPr lang="en-US" sz="1100" dirty="0">
-                <a:solidFill>
-                  <a:schemeClr val="accent1"/>
-                </a:solidFill>
-                <a:latin typeface="Arial" panose="020B0604020202020204" pitchFamily="34" charset="0"/>
-                <a:cs typeface="Arial" panose="020B0604020202020204" pitchFamily="34" charset="0"/>
-              </a:rPr>
-              <a:t>)</a:t>
-            </a:r>
-          </a:p>
-        </p:txBody>
-      </p:sp>
-      <p:sp>
-        <p:nvSpPr>
-          <p:cNvPr id="77" name="Rectangle 76">
-            <a:extLst>
-              <a:ext uri="{FF2B5EF4-FFF2-40B4-BE49-F238E27FC236}">
-                <a16:creationId xmlns:a16="http://schemas.microsoft.com/office/drawing/2014/main" id="{72BA429A-185B-6542-80B5-60AC80328BC4}"/>
-              </a:ext>
-            </a:extLst>
-          </p:cNvPr>
-          <p:cNvSpPr/>
-          <p:nvPr/>
-        </p:nvSpPr>
-        <p:spPr>
-          <a:xfrm>
-            <a:off x="5760147" y="11351003"/>
-            <a:ext cx="2338949" cy="515061"/>
-          </a:xfrm>
-          <a:prstGeom prst="rect">
-            <a:avLst/>
-          </a:prstGeom>
-          <a:solidFill>
-            <a:srgbClr val="DEECF8"/>
-          </a:solidFill>
-          <a:ln>
-            <a:solidFill>
-              <a:schemeClr val="accent5">
-                <a:lumMod val="60000"/>
-                <a:lumOff val="40000"/>
-              </a:schemeClr>
-            </a:solidFill>
-            <a:prstDash val="dash"/>
-          </a:ln>
-        </p:spPr>
-        <p:style>
-          <a:lnRef idx="2">
-            <a:schemeClr val="accent1">
-              <a:shade val="50000"/>
-            </a:schemeClr>
-          </a:lnRef>
-          <a:fillRef idx="1">
-            <a:schemeClr val="accent1"/>
-          </a:fillRef>
-          <a:effectRef idx="0">
-            <a:schemeClr val="accent1"/>
-          </a:effectRef>
-          <a:fontRef idx="minor">
-            <a:schemeClr val="lt1"/>
-          </a:fontRef>
-        </p:style>
-        <p:txBody>
-          <a:bodyPr rot="0" spcFirstLastPara="0" vertOverflow="overflow" horzOverflow="overflow" vert="horz" wrap="square" lIns="91440" tIns="45720" rIns="91440" bIns="45720" numCol="1" spcCol="0" rtlCol="0" fromWordArt="0" anchor="ctr" anchorCtr="0" forceAA="0" compatLnSpc="1">
-            <a:prstTxWarp prst="textNoShape">
-              <a:avLst/>
-            </a:prstTxWarp>
-            <a:noAutofit/>
-          </a:bodyPr>
-          <a:lstStyle/>
-          <a:p>
-            <a:r>
-              <a:rPr lang="en-US" sz="1100" dirty="0">
-                <a:solidFill>
-                  <a:schemeClr val="tx1"/>
-                </a:solidFill>
-                <a:latin typeface="Arial" panose="020B0604020202020204" pitchFamily="34" charset="0"/>
-                <a:cs typeface="Arial" panose="020B0604020202020204" pitchFamily="34" charset="0"/>
-              </a:rPr>
-              <a:t>Method 2: Use z/OSMF Workflow</a:t>
-            </a:r>
-          </a:p>
-        </p:txBody>
-      </p:sp>
-      <p:cxnSp>
-        <p:nvCxnSpPr>
-          <p:cNvPr id="60" name="Straight Arrow Connector 59">
-            <a:extLst>
-              <a:ext uri="{FF2B5EF4-FFF2-40B4-BE49-F238E27FC236}">
-                <a16:creationId xmlns:a16="http://schemas.microsoft.com/office/drawing/2014/main" id="{80584741-C0CA-8844-A96F-8DFB5F6261FA}"/>
-              </a:ext>
-            </a:extLst>
-          </p:cNvPr>
-          <p:cNvCxnSpPr>
-            <a:cxnSpLocks/>
-          </p:cNvCxnSpPr>
-          <p:nvPr/>
-        </p:nvCxnSpPr>
-        <p:spPr>
-          <a:xfrm>
-            <a:off x="5624306" y="10711266"/>
-            <a:ext cx="0" cy="340330"/>
-          </a:xfrm>
-          <a:prstGeom prst="straightConnector1">
-            <a:avLst/>
-          </a:prstGeom>
-          <a:ln>
-            <a:solidFill>
-              <a:schemeClr val="tx1">
-                <a:lumMod val="50000"/>
-                <a:lumOff val="50000"/>
-              </a:schemeClr>
-            </a:solidFill>
-            <a:tailEnd type="triangle"/>
-          </a:ln>
-        </p:spPr>
-        <p:style>
-          <a:lnRef idx="1">
-            <a:schemeClr val="accent1"/>
-          </a:lnRef>
-          <a:fillRef idx="0">
-            <a:schemeClr val="accent1"/>
-          </a:fillRef>
-          <a:effectRef idx="0">
-            <a:schemeClr val="accent1"/>
-          </a:effectRef>
-          <a:fontRef idx="minor">
-            <a:schemeClr val="tx1"/>
-          </a:fontRef>
-        </p:style>
-      </p:cxnSp>
-      <p:cxnSp>
-        <p:nvCxnSpPr>
-          <p:cNvPr id="61" name="Straight Arrow Connector 60">
-            <a:extLst>
-              <a:ext uri="{FF2B5EF4-FFF2-40B4-BE49-F238E27FC236}">
-                <a16:creationId xmlns:a16="http://schemas.microsoft.com/office/drawing/2014/main" id="{1428AE51-8321-614B-9F78-E711328B7082}"/>
-              </a:ext>
-            </a:extLst>
-          </p:cNvPr>
-          <p:cNvCxnSpPr>
-            <a:cxnSpLocks/>
-          </p:cNvCxnSpPr>
-          <p:nvPr/>
-        </p:nvCxnSpPr>
-        <p:spPr>
-          <a:xfrm>
-            <a:off x="5596089" y="11958870"/>
-            <a:ext cx="0" cy="340330"/>
-          </a:xfrm>
-          <a:prstGeom prst="straightConnector1">
-            <a:avLst/>
-          </a:prstGeom>
-          <a:ln>
-            <a:solidFill>
-              <a:schemeClr val="tx1">
-                <a:lumMod val="50000"/>
-                <a:lumOff val="50000"/>
-              </a:schemeClr>
-            </a:solidFill>
-            <a:tailEnd type="triangle"/>
-          </a:ln>
-        </p:spPr>
-        <p:style>
-          <a:lnRef idx="1">
-            <a:schemeClr val="accent1"/>
-          </a:lnRef>
-          <a:fillRef idx="0">
-            <a:schemeClr val="accent1"/>
-          </a:fillRef>
-          <a:effectRef idx="0">
-            <a:schemeClr val="accent1"/>
-          </a:effectRef>
-          <a:fontRef idx="minor">
-            <a:schemeClr val="tx1"/>
-          </a:fontRef>
-        </p:style>
-      </p:cxnSp>
-      <p:cxnSp>
-        <p:nvCxnSpPr>
-          <p:cNvPr id="79" name="Straight Arrow Connector 78">
-            <a:extLst>
-              <a:ext uri="{FF2B5EF4-FFF2-40B4-BE49-F238E27FC236}">
-                <a16:creationId xmlns:a16="http://schemas.microsoft.com/office/drawing/2014/main" id="{90624AB8-1AEC-0B4E-9CB1-79D29B4301AE}"/>
-              </a:ext>
-            </a:extLst>
-          </p:cNvPr>
-          <p:cNvCxnSpPr>
-            <a:cxnSpLocks/>
-          </p:cNvCxnSpPr>
-          <p:nvPr/>
-        </p:nvCxnSpPr>
-        <p:spPr>
-          <a:xfrm>
-            <a:off x="5580062" y="13007819"/>
-            <a:ext cx="0" cy="340330"/>
-          </a:xfrm>
-          <a:prstGeom prst="straightConnector1">
-            <a:avLst/>
-          </a:prstGeom>
-          <a:ln>
-            <a:solidFill>
-              <a:schemeClr val="tx1">
-                <a:lumMod val="50000"/>
-                <a:lumOff val="50000"/>
-              </a:schemeClr>
-            </a:solidFill>
-            <a:tailEnd type="triangle"/>
-          </a:ln>
-        </p:spPr>
-        <p:style>
-          <a:lnRef idx="1">
-            <a:schemeClr val="accent1"/>
-          </a:lnRef>
-          <a:fillRef idx="0">
-            <a:schemeClr val="accent1"/>
-          </a:fillRef>
-          <a:effectRef idx="0">
-            <a:schemeClr val="accent1"/>
-          </a:effectRef>
-          <a:fontRef idx="minor">
-            <a:schemeClr val="tx1"/>
-          </a:fontRef>
-        </p:style>
-      </p:cxnSp>
-      <p:cxnSp>
-        <p:nvCxnSpPr>
-          <p:cNvPr id="80" name="Straight Arrow Connector 79">
-            <a:extLst>
-              <a:ext uri="{FF2B5EF4-FFF2-40B4-BE49-F238E27FC236}">
-                <a16:creationId xmlns:a16="http://schemas.microsoft.com/office/drawing/2014/main" id="{30184696-6146-BE47-B491-F25D60E7D167}"/>
-              </a:ext>
-            </a:extLst>
-          </p:cNvPr>
-          <p:cNvCxnSpPr>
-            <a:cxnSpLocks/>
-          </p:cNvCxnSpPr>
-          <p:nvPr/>
-        </p:nvCxnSpPr>
-        <p:spPr>
-          <a:xfrm>
-            <a:off x="5566593" y="13978051"/>
-            <a:ext cx="0" cy="464090"/>
-          </a:xfrm>
-          <a:prstGeom prst="straightConnector1">
-            <a:avLst/>
-          </a:prstGeom>
-          <a:ln>
-            <a:solidFill>
-              <a:schemeClr val="tx1">
-                <a:lumMod val="50000"/>
-                <a:lumOff val="50000"/>
-              </a:schemeClr>
-            </a:solidFill>
-            <a:tailEnd type="triangle"/>
-          </a:ln>
-        </p:spPr>
-        <p:style>
-          <a:lnRef idx="1">
-            <a:schemeClr val="accent1"/>
-          </a:lnRef>
-          <a:fillRef idx="0">
-            <a:schemeClr val="accent1"/>
-          </a:fillRef>
-          <a:effectRef idx="0">
-            <a:schemeClr val="accent1"/>
-          </a:effectRef>
-          <a:fontRef idx="minor">
-            <a:schemeClr val="tx1"/>
-          </a:fontRef>
-        </p:style>
-      </p:cxnSp>
-    </p:spTree>
-    <p:extLst>
-      <p:ext uri="{BB962C8B-B14F-4D97-AF65-F5344CB8AC3E}">
-        <p14:creationId xmlns:p14="http://schemas.microsoft.com/office/powerpoint/2010/main" val="960402841"/>
-      </p:ext>
-    </p:extLst>
-  </p:cSld>
-  <p:clrMapOvr>
-    <a:masterClrMapping/>
-  </p:clrMapOvr>
-  <mc:AlternateContent xmlns:mc="http://schemas.openxmlformats.org/markup-compatibility/2006">
-    <mc:Choice xmlns:p14="http://schemas.microsoft.com/office/powerpoint/2010/main" Requires="p14">
-      <p:transition spd="slow" p14:dur="2000"/>
-    </mc:Choice>
-    <mc:Fallback>
-      <p:transition spd="slow"/>
-    </mc:Fallback>
-  </mc:AlternateContent>
-</p:sld>
-</file>
-
-<file path=ppt/slides/slide2.xml><?xml version="1.0" encoding="utf-8"?>
 <p:sld xmlns:a="http://schemas.openxmlformats.org/drawingml/2006/main" xmlns:r="http://schemas.openxmlformats.org/officeDocument/2006/relationships" xmlns:p="http://schemas.openxmlformats.org/presentationml/2006/main">
   <p:cSld>
     <p:spTree>
@@ -7719,7 +3377,7 @@
         </p:nvSpPr>
         <p:spPr>
           <a:xfrm>
-            <a:off x="1068883" y="3767003"/>
+            <a:off x="846812" y="4158891"/>
             <a:ext cx="2250655" cy="558971"/>
           </a:xfrm>
           <a:prstGeom prst="rect">
@@ -7952,7 +3610,7 @@
         </p:nvSpPr>
         <p:spPr>
           <a:xfrm>
-            <a:off x="1318877" y="4468926"/>
+            <a:off x="1096806" y="4991444"/>
             <a:ext cx="1750668" cy="757568"/>
           </a:xfrm>
           <a:prstGeom prst="rect">
@@ -10356,8 +6014,8 @@
         </p:nvCxnSpPr>
         <p:spPr>
           <a:xfrm rot="10800000" flipV="1">
-            <a:off x="2194212" y="3553835"/>
-            <a:ext cx="1700903" cy="213167"/>
+            <a:off x="1972140" y="3553835"/>
+            <a:ext cx="1922974" cy="605055"/>
           </a:xfrm>
           <a:prstGeom prst="bentConnector2">
             <a:avLst/>
@@ -10750,8 +6408,8 @@
         </p:nvCxnSpPr>
         <p:spPr>
           <a:xfrm>
-            <a:off x="2194211" y="4325974"/>
-            <a:ext cx="0" cy="142952"/>
+            <a:off x="1972140" y="4717862"/>
+            <a:ext cx="0" cy="273582"/>
           </a:xfrm>
           <a:prstGeom prst="straightConnector1">
             <a:avLst/>
@@ -11266,7 +6924,7 @@
         <p:spPr>
           <a:xfrm>
             <a:off x="726470" y="7579011"/>
-            <a:ext cx="7098423" cy="509925"/>
+            <a:ext cx="7183701" cy="509925"/>
           </a:xfrm>
           <a:prstGeom prst="rect">
             <a:avLst/>
@@ -11384,14 +7042,15 @@
             </a:extLst>
           </p:cNvPr>
           <p:cNvCxnSpPr>
+            <a:cxnSpLocks/>
             <a:stCxn id="19" idx="2"/>
           </p:cNvCxnSpPr>
           <p:nvPr/>
         </p:nvCxnSpPr>
         <p:spPr>
           <a:xfrm>
-            <a:off x="2194211" y="5226494"/>
-            <a:ext cx="9507" cy="2396002"/>
+            <a:off x="1972140" y="5749012"/>
+            <a:ext cx="0" cy="1806638"/>
           </a:xfrm>
           <a:prstGeom prst="straightConnector1">
             <a:avLst/>
@@ -11438,8 +7097,8 @@
         </p:nvCxnSpPr>
         <p:spPr>
           <a:xfrm>
-            <a:off x="3567803" y="7162899"/>
-            <a:ext cx="0" cy="432000"/>
+            <a:off x="3567804" y="7162899"/>
+            <a:ext cx="0" cy="392751"/>
           </a:xfrm>
           <a:prstGeom prst="straightConnector1">
             <a:avLst/>
@@ -12507,7 +8166,7 @@
         </p:nvSpPr>
         <p:spPr>
           <a:xfrm>
-            <a:off x="7824893" y="3767003"/>
+            <a:off x="7910175" y="4146586"/>
             <a:ext cx="2243289" cy="558971"/>
           </a:xfrm>
           <a:prstGeom prst="rect">
@@ -12559,27 +8218,7 @@
                 <a:latin typeface="Arial" panose="020B0604020202020204" pitchFamily="34" charset="0"/>
                 <a:cs typeface="Arial" panose="020B0604020202020204" pitchFamily="34" charset="0"/>
               </a:rPr>
-              <a:t>Download the </a:t>
-            </a:r>
-            <a:r>
-              <a:rPr lang="en-US" sz="1100" dirty="0" smtClean="0">
-                <a:solidFill>
-                  <a:schemeClr val="tx1"/>
-                </a:solidFill>
-                <a:latin typeface="Arial" panose="020B0604020202020204" pitchFamily="34" charset="0"/>
-                <a:cs typeface="Arial" panose="020B0604020202020204" pitchFamily="34" charset="0"/>
-              </a:rPr>
-              <a:t>PSWI </a:t>
-            </a:r>
-            <a:r>
-              <a:rPr lang="en-US" sz="1100" dirty="0">
-                <a:solidFill>
-                  <a:schemeClr val="tx1"/>
-                </a:solidFill>
-                <a:latin typeface="Arial" panose="020B0604020202020204" pitchFamily="34" charset="0"/>
-                <a:cs typeface="Arial" panose="020B0604020202020204" pitchFamily="34" charset="0"/>
-              </a:rPr>
-              <a:t>build</a:t>
+              <a:t>Download the PSWI build</a:t>
             </a:r>
           </a:p>
         </p:txBody>
@@ -12602,7 +8241,7 @@
         <p:spPr>
           <a:xfrm>
             <a:off x="6454852" y="3553836"/>
-            <a:ext cx="2491686" cy="213167"/>
+            <a:ext cx="2576968" cy="592750"/>
           </a:xfrm>
           <a:prstGeom prst="bentConnector2">
             <a:avLst/>
@@ -12660,7 +8299,7 @@
           <a:lstStyle/>
           <a:p>
             <a:r>
-              <a:rPr lang="en-US" sz="1100" dirty="0" smtClean="0">
+              <a:rPr lang="en-US" sz="1100" dirty="0">
                 <a:solidFill>
                   <a:schemeClr val="accent2">
                     <a:lumMod val="75000"/>
@@ -12671,15 +8310,6 @@
               </a:rPr>
               <a:t>Portable software instance (PSWI)</a:t>
             </a:r>
-            <a:endParaRPr lang="en-US" sz="1100" dirty="0">
-              <a:solidFill>
-                <a:schemeClr val="accent2">
-                  <a:lumMod val="75000"/>
-                </a:schemeClr>
-              </a:solidFill>
-              <a:latin typeface="Arial" panose="020B0604020202020204" pitchFamily="34" charset="0"/>
-              <a:cs typeface="Arial" panose="020B0604020202020204" pitchFamily="34" charset="0"/>
-            </a:endParaRPr>
           </a:p>
         </p:txBody>
       </p:sp>
@@ -12697,7 +8327,7 @@
         </p:nvSpPr>
         <p:spPr>
           <a:xfrm>
-            <a:off x="7824897" y="4468926"/>
+            <a:off x="7910177" y="4938472"/>
             <a:ext cx="2243285" cy="558971"/>
           </a:xfrm>
           <a:prstGeom prst="rect">
@@ -12764,14 +8394,15 @@
             </a:extLst>
           </p:cNvPr>
           <p:cNvCxnSpPr>
-            <a:endCxn id="109" idx="0"/>
+            <a:cxnSpLocks/>
+            <a:stCxn id="101" idx="2"/>
           </p:cNvCxnSpPr>
           <p:nvPr/>
         </p:nvCxnSpPr>
         <p:spPr>
-          <a:xfrm>
-            <a:off x="8946538" y="4316796"/>
-            <a:ext cx="2" cy="152130"/>
+          <a:xfrm flipH="1">
+            <a:off x="9031818" y="4705557"/>
+            <a:ext cx="2" cy="199054"/>
           </a:xfrm>
           <a:prstGeom prst="straightConnector1">
             <a:avLst/>
@@ -12815,7 +8446,7 @@
         </p:nvSpPr>
         <p:spPr>
           <a:xfrm>
-            <a:off x="7824897" y="5184379"/>
+            <a:off x="7910177" y="5743421"/>
             <a:ext cx="2243285" cy="558971"/>
           </a:xfrm>
           <a:prstGeom prst="rect">
@@ -12860,7 +8491,7 @@
           <a:p>
             <a:pPr algn="ctr"/>
             <a:r>
-              <a:rPr lang="en-US" sz="1100" dirty="0" smtClean="0">
+              <a:rPr lang="en-US" sz="1100" dirty="0">
                 <a:solidFill>
                   <a:schemeClr val="tx1"/>
                 </a:solidFill>
@@ -12870,7 +8501,7 @@
               <a:t>Install the </a:t>
             </a:r>
             <a:r>
-              <a:rPr lang="en-US" sz="1100" dirty="0" err="1" smtClean="0">
+              <a:rPr lang="en-US" sz="1100" dirty="0" err="1">
                 <a:solidFill>
                   <a:schemeClr val="tx1"/>
                 </a:solidFill>
@@ -12880,7 +8511,7 @@
               <a:t>Zowe</a:t>
             </a:r>
             <a:r>
-              <a:rPr lang="en-US" sz="1100" dirty="0" smtClean="0">
+              <a:rPr lang="en-US" sz="1100" dirty="0">
                 <a:solidFill>
                   <a:schemeClr val="tx1"/>
                 </a:solidFill>
@@ -12889,13 +8520,6 @@
               </a:rPr>
               <a:t> SMP/E using PSWI</a:t>
             </a:r>
-            <a:endParaRPr lang="en-US" sz="1100" dirty="0">
-              <a:solidFill>
-                <a:schemeClr val="tx1"/>
-              </a:solidFill>
-              <a:latin typeface="Arial" panose="020B0604020202020204" pitchFamily="34" charset="0"/>
-              <a:cs typeface="Arial" panose="020B0604020202020204" pitchFamily="34" charset="0"/>
-            </a:endParaRPr>
           </a:p>
         </p:txBody>
       </p:sp>
@@ -12909,14 +8533,15 @@
             </a:extLst>
           </p:cNvPr>
           <p:cNvCxnSpPr>
-            <a:endCxn id="111" idx="0"/>
+            <a:cxnSpLocks/>
+            <a:stCxn id="109" idx="2"/>
           </p:cNvCxnSpPr>
           <p:nvPr/>
         </p:nvCxnSpPr>
         <p:spPr>
-          <a:xfrm>
-            <a:off x="8946538" y="5032249"/>
-            <a:ext cx="2" cy="152130"/>
+          <a:xfrm flipH="1">
+            <a:off x="9031818" y="5497443"/>
+            <a:ext cx="2" cy="199054"/>
           </a:xfrm>
           <a:prstGeom prst="straightConnector1">
             <a:avLst/>
@@ -12960,7 +8585,7 @@
         </p:nvSpPr>
         <p:spPr>
           <a:xfrm>
-            <a:off x="7824897" y="5894462"/>
+            <a:off x="7910177" y="6535305"/>
             <a:ext cx="2243285" cy="558971"/>
           </a:xfrm>
           <a:prstGeom prst="rect">
@@ -13005,7 +8630,7 @@
           <a:p>
             <a:pPr algn="ctr"/>
             <a:r>
-              <a:rPr lang="en-US" sz="1100" dirty="0" smtClean="0">
+              <a:rPr lang="en-US" sz="1100" dirty="0">
                 <a:solidFill>
                   <a:schemeClr val="tx1"/>
                 </a:solidFill>
@@ -13015,7 +8640,7 @@
               <a:t>Mount </a:t>
             </a:r>
             <a:r>
-              <a:rPr lang="en-US" sz="1100" dirty="0" err="1" smtClean="0">
+              <a:rPr lang="en-US" sz="1100" dirty="0" err="1">
                 <a:solidFill>
                   <a:schemeClr val="tx1"/>
                 </a:solidFill>
@@ -13025,7 +8650,7 @@
               <a:t>Zowe</a:t>
             </a:r>
             <a:r>
-              <a:rPr lang="en-US" sz="1100" dirty="0" smtClean="0">
+              <a:rPr lang="en-US" sz="1100" dirty="0">
                 <a:solidFill>
                   <a:schemeClr val="tx1"/>
                 </a:solidFill>
@@ -13035,7 +8660,7 @@
               <a:t> </a:t>
             </a:r>
             <a:r>
-              <a:rPr lang="en-US" sz="1100" dirty="0" err="1" smtClean="0">
+              <a:rPr lang="en-US" sz="1100" dirty="0" err="1">
                 <a:solidFill>
                   <a:schemeClr val="tx1"/>
                 </a:solidFill>
@@ -13045,7 +8670,7 @@
               <a:t>zFS</a:t>
             </a:r>
             <a:r>
-              <a:rPr lang="en-US" sz="1100" dirty="0" smtClean="0">
+              <a:rPr lang="en-US" sz="1100" dirty="0">
                 <a:solidFill>
                   <a:schemeClr val="tx1"/>
                 </a:solidFill>
@@ -13054,18 +8679,8 @@
               </a:rPr>
               <a:t> workflow</a:t>
             </a:r>
-            <a:r>
-              <a:rPr lang="en-US" sz="1100" b="1" dirty="0" smtClean="0">
-                <a:solidFill>
-                  <a:schemeClr val="tx1"/>
-                </a:solidFill>
-                <a:latin typeface="Arial" panose="020B0604020202020204" pitchFamily="34" charset="0"/>
-                <a:cs typeface="Arial" panose="020B0604020202020204" pitchFamily="34" charset="0"/>
-              </a:rPr>
-              <a:t/>
-            </a:r>
             <a:br>
-              <a:rPr lang="en-US" sz="1100" b="1" dirty="0" smtClean="0">
+              <a:rPr lang="en-US" sz="1100" b="1" dirty="0">
                 <a:solidFill>
                   <a:schemeClr val="tx1"/>
                 </a:solidFill>
@@ -13074,7 +8689,7 @@
               </a:rPr>
             </a:br>
             <a:r>
-              <a:rPr lang="en-US" sz="1100" b="1" dirty="0" smtClean="0">
+              <a:rPr lang="en-US" sz="1100" b="1" dirty="0">
                 <a:solidFill>
                   <a:schemeClr val="tx1"/>
                 </a:solidFill>
@@ -13083,13 +8698,6 @@
               </a:rPr>
               <a:t>ZWE9MNT</a:t>
             </a:r>
-            <a:endParaRPr lang="en-US" sz="1100" b="1" dirty="0">
-              <a:solidFill>
-                <a:schemeClr val="tx1"/>
-              </a:solidFill>
-              <a:latin typeface="Arial" panose="020B0604020202020204" pitchFamily="34" charset="0"/>
-              <a:cs typeface="Arial" panose="020B0604020202020204" pitchFamily="34" charset="0"/>
-            </a:endParaRPr>
           </a:p>
         </p:txBody>
       </p:sp>
@@ -13103,14 +8711,15 @@
             </a:extLst>
           </p:cNvPr>
           <p:cNvCxnSpPr>
-            <a:endCxn id="113" idx="0"/>
+            <a:cxnSpLocks/>
+            <a:stCxn id="111" idx="2"/>
           </p:cNvCxnSpPr>
           <p:nvPr/>
         </p:nvCxnSpPr>
         <p:spPr>
-          <a:xfrm>
-            <a:off x="8946538" y="5742332"/>
-            <a:ext cx="2" cy="152130"/>
+          <a:xfrm flipH="1">
+            <a:off x="9031818" y="6302392"/>
+            <a:ext cx="2" cy="199054"/>
           </a:xfrm>
           <a:prstGeom prst="straightConnector1">
             <a:avLst/>
@@ -13144,14 +8753,16 @@
         <p:nvCxnSpPr>
           <p:cNvPr id="254" name="Elbow Connector 253"/>
           <p:cNvCxnSpPr>
+            <a:cxnSpLocks/>
+            <a:stCxn id="113" idx="2"/>
             <a:endCxn id="74" idx="0"/>
           </p:cNvCxnSpPr>
           <p:nvPr/>
         </p:nvCxnSpPr>
         <p:spPr>
           <a:xfrm rot="5400000">
-            <a:off x="6959011" y="7906675"/>
-            <a:ext cx="3445603" cy="541046"/>
+            <a:off x="7318693" y="8186873"/>
+            <a:ext cx="2805724" cy="620531"/>
           </a:xfrm>
           <a:prstGeom prst="bentConnector3">
             <a:avLst/>
@@ -13191,17 +8802,10 @@
   <p:clrMapOvr>
     <a:masterClrMapping/>
   </p:clrMapOvr>
-  <p:timing>
-    <p:tnLst>
-      <p:par>
-        <p:cTn id="1" dur="indefinite" restart="never" nodeType="tmRoot"/>
-      </p:par>
-    </p:tnLst>
-  </p:timing>
 </p:sld>
 </file>
 
-<file path=ppt/slides/slide3.xml><?xml version="1.0" encoding="utf-8"?>
+<file path=ppt/slides/slide2.xml><?xml version="1.0" encoding="utf-8"?>
 <p:sld xmlns:a="http://schemas.openxmlformats.org/drawingml/2006/main" xmlns:r="http://schemas.openxmlformats.org/officeDocument/2006/relationships" xmlns:p="http://schemas.openxmlformats.org/presentationml/2006/main">
   <p:cSld>
     <p:spTree>

</xml_diff>